<commit_message>
Syscall write e modificato ppt
</commit_message>
<xml_diff>
--- a/Progetto_SO.pptx
+++ b/Progetto_SO.pptx
@@ -9,24 +9,19 @@
     <p:sldId id="261" r:id="rId3"/>
     <p:sldId id="260" r:id="rId4"/>
     <p:sldId id="257" r:id="rId5"/>
-    <p:sldId id="264" r:id="rId6"/>
-    <p:sldId id="275" r:id="rId7"/>
-    <p:sldId id="276" r:id="rId8"/>
-    <p:sldId id="277" r:id="rId9"/>
-    <p:sldId id="278" r:id="rId10"/>
-    <p:sldId id="258" r:id="rId11"/>
-    <p:sldId id="268" r:id="rId12"/>
-    <p:sldId id="269" r:id="rId13"/>
-    <p:sldId id="270" r:id="rId14"/>
-    <p:sldId id="271" r:id="rId15"/>
-    <p:sldId id="272" r:id="rId16"/>
-    <p:sldId id="259" r:id="rId17"/>
-    <p:sldId id="273" r:id="rId18"/>
-    <p:sldId id="274" r:id="rId19"/>
-    <p:sldId id="279" r:id="rId20"/>
-    <p:sldId id="263" r:id="rId21"/>
-    <p:sldId id="280" r:id="rId22"/>
-    <p:sldId id="281" r:id="rId23"/>
+    <p:sldId id="258" r:id="rId6"/>
+    <p:sldId id="268" r:id="rId7"/>
+    <p:sldId id="269" r:id="rId8"/>
+    <p:sldId id="270" r:id="rId9"/>
+    <p:sldId id="271" r:id="rId10"/>
+    <p:sldId id="272" r:id="rId11"/>
+    <p:sldId id="259" r:id="rId12"/>
+    <p:sldId id="273" r:id="rId13"/>
+    <p:sldId id="274" r:id="rId14"/>
+    <p:sldId id="279" r:id="rId15"/>
+    <p:sldId id="263" r:id="rId16"/>
+    <p:sldId id="280" r:id="rId17"/>
+    <p:sldId id="281" r:id="rId18"/>
   </p:sldIdLst>
   <p:sldSz cx="12192000" cy="6858000"/>
   <p:notesSz cx="6858000" cy="9144000"/>
@@ -280,7 +275,7 @@
           <a:p>
             <a:fld id="{F259A98E-7D3E-4BAE-A284-2CE0D83E33BF}" type="datetimeFigureOut">
               <a:rPr lang="it-IT" smtClean="0"/>
-              <a:t>30/07/2023</a:t>
+              <a:t>02/11/2023</a:t>
             </a:fld>
             <a:endParaRPr lang="it-IT"/>
           </a:p>
@@ -478,7 +473,7 @@
           <a:p>
             <a:fld id="{F259A98E-7D3E-4BAE-A284-2CE0D83E33BF}" type="datetimeFigureOut">
               <a:rPr lang="it-IT" smtClean="0"/>
-              <a:t>30/07/2023</a:t>
+              <a:t>02/11/2023</a:t>
             </a:fld>
             <a:endParaRPr lang="it-IT"/>
           </a:p>
@@ -686,7 +681,7 @@
           <a:p>
             <a:fld id="{F259A98E-7D3E-4BAE-A284-2CE0D83E33BF}" type="datetimeFigureOut">
               <a:rPr lang="it-IT" smtClean="0"/>
-              <a:t>30/07/2023</a:t>
+              <a:t>02/11/2023</a:t>
             </a:fld>
             <a:endParaRPr lang="it-IT"/>
           </a:p>
@@ -884,7 +879,7 @@
           <a:p>
             <a:fld id="{F259A98E-7D3E-4BAE-A284-2CE0D83E33BF}" type="datetimeFigureOut">
               <a:rPr lang="it-IT" smtClean="0"/>
-              <a:t>30/07/2023</a:t>
+              <a:t>02/11/2023</a:t>
             </a:fld>
             <a:endParaRPr lang="it-IT"/>
           </a:p>
@@ -1159,7 +1154,7 @@
           <a:p>
             <a:fld id="{F259A98E-7D3E-4BAE-A284-2CE0D83E33BF}" type="datetimeFigureOut">
               <a:rPr lang="it-IT" smtClean="0"/>
-              <a:t>30/07/2023</a:t>
+              <a:t>02/11/2023</a:t>
             </a:fld>
             <a:endParaRPr lang="it-IT"/>
           </a:p>
@@ -1424,7 +1419,7 @@
           <a:p>
             <a:fld id="{F259A98E-7D3E-4BAE-A284-2CE0D83E33BF}" type="datetimeFigureOut">
               <a:rPr lang="it-IT" smtClean="0"/>
-              <a:t>30/07/2023</a:t>
+              <a:t>02/11/2023</a:t>
             </a:fld>
             <a:endParaRPr lang="it-IT"/>
           </a:p>
@@ -1836,7 +1831,7 @@
           <a:p>
             <a:fld id="{F259A98E-7D3E-4BAE-A284-2CE0D83E33BF}" type="datetimeFigureOut">
               <a:rPr lang="it-IT" smtClean="0"/>
-              <a:t>30/07/2023</a:t>
+              <a:t>02/11/2023</a:t>
             </a:fld>
             <a:endParaRPr lang="it-IT"/>
           </a:p>
@@ -1977,7 +1972,7 @@
           <a:p>
             <a:fld id="{F259A98E-7D3E-4BAE-A284-2CE0D83E33BF}" type="datetimeFigureOut">
               <a:rPr lang="it-IT" smtClean="0"/>
-              <a:t>30/07/2023</a:t>
+              <a:t>02/11/2023</a:t>
             </a:fld>
             <a:endParaRPr lang="it-IT"/>
           </a:p>
@@ -2090,7 +2085,7 @@
           <a:p>
             <a:fld id="{F259A98E-7D3E-4BAE-A284-2CE0D83E33BF}" type="datetimeFigureOut">
               <a:rPr lang="it-IT" smtClean="0"/>
-              <a:t>30/07/2023</a:t>
+              <a:t>02/11/2023</a:t>
             </a:fld>
             <a:endParaRPr lang="it-IT"/>
           </a:p>
@@ -2401,7 +2396,7 @@
           <a:p>
             <a:fld id="{F259A98E-7D3E-4BAE-A284-2CE0D83E33BF}" type="datetimeFigureOut">
               <a:rPr lang="it-IT" smtClean="0"/>
-              <a:t>30/07/2023</a:t>
+              <a:t>02/11/2023</a:t>
             </a:fld>
             <a:endParaRPr lang="it-IT"/>
           </a:p>
@@ -2689,7 +2684,7 @@
           <a:p>
             <a:fld id="{F259A98E-7D3E-4BAE-A284-2CE0D83E33BF}" type="datetimeFigureOut">
               <a:rPr lang="it-IT" smtClean="0"/>
-              <a:t>30/07/2023</a:t>
+              <a:t>02/11/2023</a:t>
             </a:fld>
             <a:endParaRPr lang="it-IT"/>
           </a:p>
@@ -2930,7 +2925,7 @@
           <a:p>
             <a:fld id="{F259A98E-7D3E-4BAE-A284-2CE0D83E33BF}" type="datetimeFigureOut">
               <a:rPr lang="it-IT" smtClean="0"/>
-              <a:t>30/07/2023</a:t>
+              <a:t>02/11/2023</a:t>
             </a:fld>
             <a:endParaRPr lang="it-IT"/>
           </a:p>
@@ -3513,7 +3508,7 @@
           <a:p>
             <a:r>
               <a:rPr lang="it-IT" dirty="0"/>
-              <a:t>Scheduling: Obiettivi</a:t>
+              <a:t>Scheduling: Conclusioni</a:t>
             </a:r>
           </a:p>
         </p:txBody>
@@ -3594,7 +3589,7 @@
           <a:p>
             <a:r>
               <a:rPr lang="it-IT" dirty="0"/>
-              <a:t>MINIX 3</a:t>
+              <a:t>PINTOS</a:t>
             </a:r>
           </a:p>
         </p:txBody>
@@ -3627,7 +3622,7 @@
     </p:spTree>
     <p:extLst>
       <p:ext uri="{BB962C8B-B14F-4D97-AF65-F5344CB8AC3E}">
-        <p14:creationId xmlns:p14="http://schemas.microsoft.com/office/powerpoint/2010/main" val="2070214546"/>
+        <p14:creationId xmlns:p14="http://schemas.microsoft.com/office/powerpoint/2010/main" val="1642301185"/>
       </p:ext>
     </p:extLst>
   </p:cSld>
@@ -3659,7 +3654,7 @@
           <p:cNvPr id="2" name="Titolo 1">
             <a:extLst>
               <a:ext uri="{FF2B5EF4-FFF2-40B4-BE49-F238E27FC236}">
-                <a16:creationId xmlns:a16="http://schemas.microsoft.com/office/drawing/2014/main" id="{69441F67-1949-8EC8-EB98-85670AC3670C}"/>
+                <a16:creationId xmlns:a16="http://schemas.microsoft.com/office/drawing/2014/main" id="{7900EF7C-7285-9CC8-2E3F-795F09433FAC}"/>
               </a:ext>
             </a:extLst>
           </p:cNvPr>
@@ -3672,113 +3667,30 @@
         </p:nvSpPr>
         <p:spPr/>
         <p:txBody>
-          <a:bodyPr>
-            <a:normAutofit/>
-          </a:bodyPr>
+          <a:bodyPr/>
           <a:lstStyle/>
           <a:p>
             <a:r>
               <a:rPr lang="it-IT" dirty="0"/>
-              <a:t>Scheduling: Politiche di scheduling</a:t>
-            </a:r>
-          </a:p>
-        </p:txBody>
-      </p:sp>
-      <p:sp>
-        <p:nvSpPr>
-          <p:cNvPr id="4" name="Segnaposto testo 3">
-            <a:extLst>
-              <a:ext uri="{FF2B5EF4-FFF2-40B4-BE49-F238E27FC236}">
-                <a16:creationId xmlns:a16="http://schemas.microsoft.com/office/drawing/2014/main" id="{3484543A-BB31-0207-182F-1F1C206F0C68}"/>
-              </a:ext>
-            </a:extLst>
-          </p:cNvPr>
-          <p:cNvSpPr>
-            <a:spLocks noGrp="1"/>
-          </p:cNvSpPr>
-          <p:nvPr>
-            <p:ph type="body" idx="1"/>
-          </p:nvPr>
-        </p:nvSpPr>
-        <p:spPr/>
-        <p:txBody>
-          <a:bodyPr/>
-          <a:lstStyle/>
-          <a:p>
-            <a:r>
-              <a:rPr lang="it-IT" dirty="0"/>
-              <a:t>OS161</a:t>
-            </a:r>
-          </a:p>
-        </p:txBody>
-      </p:sp>
-      <p:sp>
-        <p:nvSpPr>
-          <p:cNvPr id="8" name="Segnaposto contenuto 7">
-            <a:extLst>
-              <a:ext uri="{FF2B5EF4-FFF2-40B4-BE49-F238E27FC236}">
-                <a16:creationId xmlns:a16="http://schemas.microsoft.com/office/drawing/2014/main" id="{A1E5DF89-94E7-98C4-F563-B3A43317A1CE}"/>
-              </a:ext>
-            </a:extLst>
-          </p:cNvPr>
-          <p:cNvSpPr>
-            <a:spLocks noGrp="1"/>
-          </p:cNvSpPr>
-          <p:nvPr>
-            <p:ph sz="half" idx="2"/>
-          </p:nvPr>
-        </p:nvSpPr>
-        <p:spPr/>
-        <p:txBody>
-          <a:bodyPr/>
-          <a:lstStyle/>
-          <a:p>
-            <a:endParaRPr lang="it-IT"/>
-          </a:p>
-        </p:txBody>
-      </p:sp>
-      <p:sp>
-        <p:nvSpPr>
-          <p:cNvPr id="9" name="Segnaposto testo 8">
-            <a:extLst>
-              <a:ext uri="{FF2B5EF4-FFF2-40B4-BE49-F238E27FC236}">
-                <a16:creationId xmlns:a16="http://schemas.microsoft.com/office/drawing/2014/main" id="{00842FCF-9A2A-27B3-4ED6-BB0713CE4444}"/>
-              </a:ext>
-            </a:extLst>
-          </p:cNvPr>
-          <p:cNvSpPr>
-            <a:spLocks noGrp="1"/>
-          </p:cNvSpPr>
-          <p:nvPr>
-            <p:ph type="body" sz="quarter" idx="3"/>
-          </p:nvPr>
-        </p:nvSpPr>
-        <p:spPr/>
-        <p:txBody>
-          <a:bodyPr/>
-          <a:lstStyle/>
-          <a:p>
-            <a:r>
-              <a:rPr lang="it-IT" dirty="0"/>
-              <a:t>MINIX 3</a:t>
-            </a:r>
-          </a:p>
-        </p:txBody>
-      </p:sp>
-      <p:sp>
-        <p:nvSpPr>
-          <p:cNvPr id="10" name="Segnaposto contenuto 9">
-            <a:extLst>
-              <a:ext uri="{FF2B5EF4-FFF2-40B4-BE49-F238E27FC236}">
-                <a16:creationId xmlns:a16="http://schemas.microsoft.com/office/drawing/2014/main" id="{3CDA2ECB-1671-3745-42C6-213A778ECD29}"/>
-              </a:ext>
-            </a:extLst>
-          </p:cNvPr>
-          <p:cNvSpPr>
-            <a:spLocks noGrp="1"/>
-          </p:cNvSpPr>
-          <p:nvPr>
-            <p:ph sz="quarter" idx="4"/>
+              <a:t>Gestione della memoria</a:t>
+            </a:r>
+          </a:p>
+        </p:txBody>
+      </p:sp>
+      <p:sp>
+        <p:nvSpPr>
+          <p:cNvPr id="3" name="Segnaposto contenuto 2">
+            <a:extLst>
+              <a:ext uri="{FF2B5EF4-FFF2-40B4-BE49-F238E27FC236}">
+                <a16:creationId xmlns:a16="http://schemas.microsoft.com/office/drawing/2014/main" id="{8582FC7B-01D3-3352-C58E-14891A68BC1C}"/>
+              </a:ext>
+            </a:extLst>
+          </p:cNvPr>
+          <p:cNvSpPr>
+            <a:spLocks noGrp="1"/>
+          </p:cNvSpPr>
+          <p:nvPr>
+            <p:ph idx="1"/>
           </p:nvPr>
         </p:nvSpPr>
         <p:spPr/>
@@ -3793,7 +3705,7 @@
     </p:spTree>
     <p:extLst>
       <p:ext uri="{BB962C8B-B14F-4D97-AF65-F5344CB8AC3E}">
-        <p14:creationId xmlns:p14="http://schemas.microsoft.com/office/powerpoint/2010/main" val="1934289931"/>
+        <p14:creationId xmlns:p14="http://schemas.microsoft.com/office/powerpoint/2010/main" val="3676064560"/>
       </p:ext>
     </p:extLst>
   </p:cSld>
@@ -3844,9 +3756,26 @@
           <a:lstStyle/>
           <a:p>
             <a:r>
+              <a:rPr lang="it-IT" dirty="0" err="1"/>
+              <a:t>Paging</a:t>
+            </a:r>
+            <a:r>
               <a:rPr lang="it-IT" dirty="0"/>
-              <a:t>Scheduling: Implementazione</a:t>
-            </a:r>
+              <a:t> e </a:t>
+            </a:r>
+            <a:r>
+              <a:rPr lang="it-IT" dirty="0" err="1"/>
+              <a:t>virtual</a:t>
+            </a:r>
+            <a:r>
+              <a:rPr lang="it-IT" dirty="0"/>
+              <a:t> </a:t>
+            </a:r>
+            <a:r>
+              <a:rPr lang="it-IT" dirty="0" err="1"/>
+              <a:t>memory</a:t>
+            </a:r>
+            <a:endParaRPr lang="it-IT" dirty="0"/>
           </a:p>
         </p:txBody>
       </p:sp>
@@ -3926,7 +3855,7 @@
           <a:p>
             <a:r>
               <a:rPr lang="it-IT" dirty="0"/>
-              <a:t>MINIX 3</a:t>
+              <a:t>PINTOS</a:t>
             </a:r>
           </a:p>
         </p:txBody>
@@ -3959,7 +3888,7 @@
     </p:spTree>
     <p:extLst>
       <p:ext uri="{BB962C8B-B14F-4D97-AF65-F5344CB8AC3E}">
-        <p14:creationId xmlns:p14="http://schemas.microsoft.com/office/powerpoint/2010/main" val="2975043876"/>
+        <p14:creationId xmlns:p14="http://schemas.microsoft.com/office/powerpoint/2010/main" val="1787713386"/>
       </p:ext>
     </p:extLst>
   </p:cSld>
@@ -4011,7 +3940,7 @@
           <a:p>
             <a:r>
               <a:rPr lang="it-IT" dirty="0"/>
-              <a:t>Scheduling: Gestione delle priorità</a:t>
+              <a:t>Gestione delle chiamate</a:t>
             </a:r>
           </a:p>
         </p:txBody>
@@ -4092,7 +4021,7 @@
           <a:p>
             <a:r>
               <a:rPr lang="it-IT" dirty="0"/>
-              <a:t>MINIX 3</a:t>
+              <a:t>PINTOS</a:t>
             </a:r>
           </a:p>
         </p:txBody>
@@ -4125,7 +4054,7 @@
     </p:spTree>
     <p:extLst>
       <p:ext uri="{BB962C8B-B14F-4D97-AF65-F5344CB8AC3E}">
-        <p14:creationId xmlns:p14="http://schemas.microsoft.com/office/powerpoint/2010/main" val="1587832053"/>
+        <p14:creationId xmlns:p14="http://schemas.microsoft.com/office/powerpoint/2010/main" val="104424725"/>
       </p:ext>
     </p:extLst>
   </p:cSld>
@@ -4177,7 +4106,7 @@
           <a:p>
             <a:r>
               <a:rPr lang="it-IT" dirty="0"/>
-              <a:t>Scheduling: Gestione delle interruzioni</a:t>
+              <a:t>Meccanismi di sincronizzazione</a:t>
             </a:r>
           </a:p>
         </p:txBody>
@@ -4258,7 +4187,7 @@
           <a:p>
             <a:r>
               <a:rPr lang="it-IT" dirty="0"/>
-              <a:t>MINIX 3</a:t>
+              <a:t>PINTOS</a:t>
             </a:r>
           </a:p>
         </p:txBody>
@@ -4291,7 +4220,7 @@
     </p:spTree>
     <p:extLst>
       <p:ext uri="{BB962C8B-B14F-4D97-AF65-F5344CB8AC3E}">
-        <p14:creationId xmlns:p14="http://schemas.microsoft.com/office/powerpoint/2010/main" val="1764962512"/>
+        <p14:creationId xmlns:p14="http://schemas.microsoft.com/office/powerpoint/2010/main" val="151468646"/>
       </p:ext>
     </p:extLst>
   </p:cSld>
@@ -4320,10 +4249,10 @@
       </p:grpSpPr>
       <p:sp>
         <p:nvSpPr>
-          <p:cNvPr id="2" name="Titolo 1">
-            <a:extLst>
-              <a:ext uri="{FF2B5EF4-FFF2-40B4-BE49-F238E27FC236}">
-                <a16:creationId xmlns:a16="http://schemas.microsoft.com/office/drawing/2014/main" id="{69441F67-1949-8EC8-EB98-85670AC3670C}"/>
+          <p:cNvPr id="4" name="Titolo 3">
+            <a:extLst>
+              <a:ext uri="{FF2B5EF4-FFF2-40B4-BE49-F238E27FC236}">
+                <a16:creationId xmlns:a16="http://schemas.microsoft.com/office/drawing/2014/main" id="{4C6958DE-4CE8-5842-7EB3-6A77942BB66B}"/>
               </a:ext>
             </a:extLst>
           </p:cNvPr>
@@ -4336,24 +4265,19 @@
         </p:nvSpPr>
         <p:spPr/>
         <p:txBody>
-          <a:bodyPr>
-            <a:normAutofit/>
-          </a:bodyPr>
-          <a:lstStyle/>
-          <a:p>
-            <a:r>
-              <a:rPr lang="it-IT" dirty="0"/>
-              <a:t>Scheduling: Conclusioni</a:t>
-            </a:r>
-          </a:p>
-        </p:txBody>
-      </p:sp>
-      <p:sp>
-        <p:nvSpPr>
-          <p:cNvPr id="4" name="Segnaposto testo 3">
-            <a:extLst>
-              <a:ext uri="{FF2B5EF4-FFF2-40B4-BE49-F238E27FC236}">
-                <a16:creationId xmlns:a16="http://schemas.microsoft.com/office/drawing/2014/main" id="{3484543A-BB31-0207-182F-1F1C206F0C68}"/>
+          <a:bodyPr/>
+          <a:lstStyle/>
+          <a:p>
+            <a:endParaRPr lang="it-IT"/>
+          </a:p>
+        </p:txBody>
+      </p:sp>
+      <p:sp>
+        <p:nvSpPr>
+          <p:cNvPr id="5" name="Segnaposto testo 4">
+            <a:extLst>
+              <a:ext uri="{FF2B5EF4-FFF2-40B4-BE49-F238E27FC236}">
+                <a16:creationId xmlns:a16="http://schemas.microsoft.com/office/drawing/2014/main" id="{A4B09623-3F65-2A7A-7B90-C83F04115A56}"/>
               </a:ext>
             </a:extLst>
           </p:cNvPr>
@@ -4369,10 +4293,57 @@
           <a:bodyPr/>
           <a:lstStyle/>
           <a:p>
-            <a:r>
-              <a:rPr lang="it-IT" dirty="0"/>
-              <a:t>OS161</a:t>
-            </a:r>
+            <a:endParaRPr lang="it-IT"/>
+          </a:p>
+        </p:txBody>
+      </p:sp>
+      <p:sp>
+        <p:nvSpPr>
+          <p:cNvPr id="6" name="Segnaposto contenuto 5">
+            <a:extLst>
+              <a:ext uri="{FF2B5EF4-FFF2-40B4-BE49-F238E27FC236}">
+                <a16:creationId xmlns:a16="http://schemas.microsoft.com/office/drawing/2014/main" id="{4BCD0132-CD1D-8CC1-F046-77698045EF07}"/>
+              </a:ext>
+            </a:extLst>
+          </p:cNvPr>
+          <p:cNvSpPr>
+            <a:spLocks noGrp="1"/>
+          </p:cNvSpPr>
+          <p:nvPr>
+            <p:ph sz="half" idx="2"/>
+          </p:nvPr>
+        </p:nvSpPr>
+        <p:spPr/>
+        <p:txBody>
+          <a:bodyPr/>
+          <a:lstStyle/>
+          <a:p>
+            <a:endParaRPr lang="it-IT"/>
+          </a:p>
+        </p:txBody>
+      </p:sp>
+      <p:sp>
+        <p:nvSpPr>
+          <p:cNvPr id="7" name="Segnaposto testo 6">
+            <a:extLst>
+              <a:ext uri="{FF2B5EF4-FFF2-40B4-BE49-F238E27FC236}">
+                <a16:creationId xmlns:a16="http://schemas.microsoft.com/office/drawing/2014/main" id="{E1B43DBC-8A47-364D-11EC-72C37033637E}"/>
+              </a:ext>
+            </a:extLst>
+          </p:cNvPr>
+          <p:cNvSpPr>
+            <a:spLocks noGrp="1"/>
+          </p:cNvSpPr>
+          <p:nvPr>
+            <p:ph type="body" sz="quarter" idx="3"/>
+          </p:nvPr>
+        </p:nvSpPr>
+        <p:spPr/>
+        <p:txBody>
+          <a:bodyPr/>
+          <a:lstStyle/>
+          <a:p>
+            <a:endParaRPr lang="it-IT"/>
           </a:p>
         </p:txBody>
       </p:sp>
@@ -4381,60 +4352,7 @@
           <p:cNvPr id="8" name="Segnaposto contenuto 7">
             <a:extLst>
               <a:ext uri="{FF2B5EF4-FFF2-40B4-BE49-F238E27FC236}">
-                <a16:creationId xmlns:a16="http://schemas.microsoft.com/office/drawing/2014/main" id="{A1E5DF89-94E7-98C4-F563-B3A43317A1CE}"/>
-              </a:ext>
-            </a:extLst>
-          </p:cNvPr>
-          <p:cNvSpPr>
-            <a:spLocks noGrp="1"/>
-          </p:cNvSpPr>
-          <p:nvPr>
-            <p:ph sz="half" idx="2"/>
-          </p:nvPr>
-        </p:nvSpPr>
-        <p:spPr/>
-        <p:txBody>
-          <a:bodyPr/>
-          <a:lstStyle/>
-          <a:p>
-            <a:endParaRPr lang="it-IT"/>
-          </a:p>
-        </p:txBody>
-      </p:sp>
-      <p:sp>
-        <p:nvSpPr>
-          <p:cNvPr id="9" name="Segnaposto testo 8">
-            <a:extLst>
-              <a:ext uri="{FF2B5EF4-FFF2-40B4-BE49-F238E27FC236}">
-                <a16:creationId xmlns:a16="http://schemas.microsoft.com/office/drawing/2014/main" id="{00842FCF-9A2A-27B3-4ED6-BB0713CE4444}"/>
-              </a:ext>
-            </a:extLst>
-          </p:cNvPr>
-          <p:cNvSpPr>
-            <a:spLocks noGrp="1"/>
-          </p:cNvSpPr>
-          <p:nvPr>
-            <p:ph type="body" sz="quarter" idx="3"/>
-          </p:nvPr>
-        </p:nvSpPr>
-        <p:spPr/>
-        <p:txBody>
-          <a:bodyPr/>
-          <a:lstStyle/>
-          <a:p>
-            <a:r>
-              <a:rPr lang="it-IT" dirty="0"/>
-              <a:t>MINIX 3</a:t>
-            </a:r>
-          </a:p>
-        </p:txBody>
-      </p:sp>
-      <p:sp>
-        <p:nvSpPr>
-          <p:cNvPr id="10" name="Segnaposto contenuto 9">
-            <a:extLst>
-              <a:ext uri="{FF2B5EF4-FFF2-40B4-BE49-F238E27FC236}">
-                <a16:creationId xmlns:a16="http://schemas.microsoft.com/office/drawing/2014/main" id="{3CDA2ECB-1671-3745-42C6-213A778ECD29}"/>
+                <a16:creationId xmlns:a16="http://schemas.microsoft.com/office/drawing/2014/main" id="{3CBFDA4D-DA92-DE97-0B71-9E459466A516}"/>
               </a:ext>
             </a:extLst>
           </p:cNvPr>
@@ -4457,7 +4375,7 @@
     </p:spTree>
     <p:extLst>
       <p:ext uri="{BB962C8B-B14F-4D97-AF65-F5344CB8AC3E}">
-        <p14:creationId xmlns:p14="http://schemas.microsoft.com/office/powerpoint/2010/main" val="1642301185"/>
+        <p14:creationId xmlns:p14="http://schemas.microsoft.com/office/powerpoint/2010/main" val="1346140153"/>
       </p:ext>
     </p:extLst>
   </p:cSld>
@@ -4486,10 +4404,10 @@
       </p:grpSpPr>
       <p:sp>
         <p:nvSpPr>
-          <p:cNvPr id="2" name="Titolo 1">
-            <a:extLst>
-              <a:ext uri="{FF2B5EF4-FFF2-40B4-BE49-F238E27FC236}">
-                <a16:creationId xmlns:a16="http://schemas.microsoft.com/office/drawing/2014/main" id="{7900EF7C-7285-9CC8-2E3F-795F09433FAC}"/>
+          <p:cNvPr id="4" name="Titolo 3">
+            <a:extLst>
+              <a:ext uri="{FF2B5EF4-FFF2-40B4-BE49-F238E27FC236}">
+                <a16:creationId xmlns:a16="http://schemas.microsoft.com/office/drawing/2014/main" id="{4C6958DE-4CE8-5842-7EB3-6A77942BB66B}"/>
               </a:ext>
             </a:extLst>
           </p:cNvPr>
@@ -4505,27 +4423,99 @@
           <a:bodyPr/>
           <a:lstStyle/>
           <a:p>
-            <a:r>
-              <a:rPr lang="it-IT" dirty="0"/>
-              <a:t>Gestione della memoria</a:t>
-            </a:r>
-          </a:p>
-        </p:txBody>
-      </p:sp>
-      <p:sp>
-        <p:nvSpPr>
-          <p:cNvPr id="3" name="Segnaposto contenuto 2">
-            <a:extLst>
-              <a:ext uri="{FF2B5EF4-FFF2-40B4-BE49-F238E27FC236}">
-                <a16:creationId xmlns:a16="http://schemas.microsoft.com/office/drawing/2014/main" id="{8582FC7B-01D3-3352-C58E-14891A68BC1C}"/>
-              </a:ext>
-            </a:extLst>
-          </p:cNvPr>
-          <p:cNvSpPr>
-            <a:spLocks noGrp="1"/>
-          </p:cNvSpPr>
-          <p:nvPr>
-            <p:ph idx="1"/>
+            <a:endParaRPr lang="it-IT"/>
+          </a:p>
+        </p:txBody>
+      </p:sp>
+      <p:sp>
+        <p:nvSpPr>
+          <p:cNvPr id="5" name="Segnaposto testo 4">
+            <a:extLst>
+              <a:ext uri="{FF2B5EF4-FFF2-40B4-BE49-F238E27FC236}">
+                <a16:creationId xmlns:a16="http://schemas.microsoft.com/office/drawing/2014/main" id="{A4B09623-3F65-2A7A-7B90-C83F04115A56}"/>
+              </a:ext>
+            </a:extLst>
+          </p:cNvPr>
+          <p:cNvSpPr>
+            <a:spLocks noGrp="1"/>
+          </p:cNvSpPr>
+          <p:nvPr>
+            <p:ph type="body" idx="1"/>
+          </p:nvPr>
+        </p:nvSpPr>
+        <p:spPr/>
+        <p:txBody>
+          <a:bodyPr/>
+          <a:lstStyle/>
+          <a:p>
+            <a:endParaRPr lang="it-IT"/>
+          </a:p>
+        </p:txBody>
+      </p:sp>
+      <p:sp>
+        <p:nvSpPr>
+          <p:cNvPr id="6" name="Segnaposto contenuto 5">
+            <a:extLst>
+              <a:ext uri="{FF2B5EF4-FFF2-40B4-BE49-F238E27FC236}">
+                <a16:creationId xmlns:a16="http://schemas.microsoft.com/office/drawing/2014/main" id="{4BCD0132-CD1D-8CC1-F046-77698045EF07}"/>
+              </a:ext>
+            </a:extLst>
+          </p:cNvPr>
+          <p:cNvSpPr>
+            <a:spLocks noGrp="1"/>
+          </p:cNvSpPr>
+          <p:nvPr>
+            <p:ph sz="half" idx="2"/>
+          </p:nvPr>
+        </p:nvSpPr>
+        <p:spPr/>
+        <p:txBody>
+          <a:bodyPr/>
+          <a:lstStyle/>
+          <a:p>
+            <a:endParaRPr lang="it-IT"/>
+          </a:p>
+        </p:txBody>
+      </p:sp>
+      <p:sp>
+        <p:nvSpPr>
+          <p:cNvPr id="7" name="Segnaposto testo 6">
+            <a:extLst>
+              <a:ext uri="{FF2B5EF4-FFF2-40B4-BE49-F238E27FC236}">
+                <a16:creationId xmlns:a16="http://schemas.microsoft.com/office/drawing/2014/main" id="{E1B43DBC-8A47-364D-11EC-72C37033637E}"/>
+              </a:ext>
+            </a:extLst>
+          </p:cNvPr>
+          <p:cNvSpPr>
+            <a:spLocks noGrp="1"/>
+          </p:cNvSpPr>
+          <p:nvPr>
+            <p:ph type="body" sz="quarter" idx="3"/>
+          </p:nvPr>
+        </p:nvSpPr>
+        <p:spPr/>
+        <p:txBody>
+          <a:bodyPr/>
+          <a:lstStyle/>
+          <a:p>
+            <a:endParaRPr lang="it-IT"/>
+          </a:p>
+        </p:txBody>
+      </p:sp>
+      <p:sp>
+        <p:nvSpPr>
+          <p:cNvPr id="8" name="Segnaposto contenuto 7">
+            <a:extLst>
+              <a:ext uri="{FF2B5EF4-FFF2-40B4-BE49-F238E27FC236}">
+                <a16:creationId xmlns:a16="http://schemas.microsoft.com/office/drawing/2014/main" id="{3CBFDA4D-DA92-DE97-0B71-9E459466A516}"/>
+              </a:ext>
+            </a:extLst>
+          </p:cNvPr>
+          <p:cNvSpPr>
+            <a:spLocks noGrp="1"/>
+          </p:cNvSpPr>
+          <p:nvPr>
+            <p:ph sz="quarter" idx="4"/>
           </p:nvPr>
         </p:nvSpPr>
         <p:spPr/>
@@ -4540,7 +4530,7 @@
     </p:spTree>
     <p:extLst>
       <p:ext uri="{BB962C8B-B14F-4D97-AF65-F5344CB8AC3E}">
-        <p14:creationId xmlns:p14="http://schemas.microsoft.com/office/powerpoint/2010/main" val="3676064560"/>
+        <p14:creationId xmlns:p14="http://schemas.microsoft.com/office/powerpoint/2010/main" val="3327742900"/>
       </p:ext>
     </p:extLst>
   </p:cSld>
@@ -4569,10 +4559,10 @@
       </p:grpSpPr>
       <p:sp>
         <p:nvSpPr>
-          <p:cNvPr id="2" name="Titolo 1">
-            <a:extLst>
-              <a:ext uri="{FF2B5EF4-FFF2-40B4-BE49-F238E27FC236}">
-                <a16:creationId xmlns:a16="http://schemas.microsoft.com/office/drawing/2014/main" id="{69441F67-1949-8EC8-EB98-85670AC3670C}"/>
+          <p:cNvPr id="4" name="Titolo 3">
+            <a:extLst>
+              <a:ext uri="{FF2B5EF4-FFF2-40B4-BE49-F238E27FC236}">
+                <a16:creationId xmlns:a16="http://schemas.microsoft.com/office/drawing/2014/main" id="{4C6958DE-4CE8-5842-7EB3-6A77942BB66B}"/>
               </a:ext>
             </a:extLst>
           </p:cNvPr>
@@ -4585,41 +4575,19 @@
         </p:nvSpPr>
         <p:spPr/>
         <p:txBody>
-          <a:bodyPr>
-            <a:normAutofit/>
-          </a:bodyPr>
-          <a:lstStyle/>
-          <a:p>
-            <a:r>
-              <a:rPr lang="it-IT" dirty="0" err="1"/>
-              <a:t>Paging</a:t>
-            </a:r>
-            <a:r>
-              <a:rPr lang="it-IT" dirty="0"/>
-              <a:t> e </a:t>
-            </a:r>
-            <a:r>
-              <a:rPr lang="it-IT" dirty="0" err="1"/>
-              <a:t>virtual</a:t>
-            </a:r>
-            <a:r>
-              <a:rPr lang="it-IT" dirty="0"/>
-              <a:t> </a:t>
-            </a:r>
-            <a:r>
-              <a:rPr lang="it-IT" dirty="0" err="1"/>
-              <a:t>memory</a:t>
-            </a:r>
-            <a:endParaRPr lang="it-IT" dirty="0"/>
-          </a:p>
-        </p:txBody>
-      </p:sp>
-      <p:sp>
-        <p:nvSpPr>
-          <p:cNvPr id="4" name="Segnaposto testo 3">
-            <a:extLst>
-              <a:ext uri="{FF2B5EF4-FFF2-40B4-BE49-F238E27FC236}">
-                <a16:creationId xmlns:a16="http://schemas.microsoft.com/office/drawing/2014/main" id="{3484543A-BB31-0207-182F-1F1C206F0C68}"/>
+          <a:bodyPr/>
+          <a:lstStyle/>
+          <a:p>
+            <a:endParaRPr lang="it-IT"/>
+          </a:p>
+        </p:txBody>
+      </p:sp>
+      <p:sp>
+        <p:nvSpPr>
+          <p:cNvPr id="5" name="Segnaposto testo 4">
+            <a:extLst>
+              <a:ext uri="{FF2B5EF4-FFF2-40B4-BE49-F238E27FC236}">
+                <a16:creationId xmlns:a16="http://schemas.microsoft.com/office/drawing/2014/main" id="{A4B09623-3F65-2A7A-7B90-C83F04115A56}"/>
               </a:ext>
             </a:extLst>
           </p:cNvPr>
@@ -4635,10 +4603,57 @@
           <a:bodyPr/>
           <a:lstStyle/>
           <a:p>
-            <a:r>
-              <a:rPr lang="it-IT" dirty="0"/>
-              <a:t>OS161</a:t>
-            </a:r>
+            <a:endParaRPr lang="it-IT"/>
+          </a:p>
+        </p:txBody>
+      </p:sp>
+      <p:sp>
+        <p:nvSpPr>
+          <p:cNvPr id="6" name="Segnaposto contenuto 5">
+            <a:extLst>
+              <a:ext uri="{FF2B5EF4-FFF2-40B4-BE49-F238E27FC236}">
+                <a16:creationId xmlns:a16="http://schemas.microsoft.com/office/drawing/2014/main" id="{4BCD0132-CD1D-8CC1-F046-77698045EF07}"/>
+              </a:ext>
+            </a:extLst>
+          </p:cNvPr>
+          <p:cNvSpPr>
+            <a:spLocks noGrp="1"/>
+          </p:cNvSpPr>
+          <p:nvPr>
+            <p:ph sz="half" idx="2"/>
+          </p:nvPr>
+        </p:nvSpPr>
+        <p:spPr/>
+        <p:txBody>
+          <a:bodyPr/>
+          <a:lstStyle/>
+          <a:p>
+            <a:endParaRPr lang="it-IT"/>
+          </a:p>
+        </p:txBody>
+      </p:sp>
+      <p:sp>
+        <p:nvSpPr>
+          <p:cNvPr id="7" name="Segnaposto testo 6">
+            <a:extLst>
+              <a:ext uri="{FF2B5EF4-FFF2-40B4-BE49-F238E27FC236}">
+                <a16:creationId xmlns:a16="http://schemas.microsoft.com/office/drawing/2014/main" id="{E1B43DBC-8A47-364D-11EC-72C37033637E}"/>
+              </a:ext>
+            </a:extLst>
+          </p:cNvPr>
+          <p:cNvSpPr>
+            <a:spLocks noGrp="1"/>
+          </p:cNvSpPr>
+          <p:nvPr>
+            <p:ph type="body" sz="quarter" idx="3"/>
+          </p:nvPr>
+        </p:nvSpPr>
+        <p:spPr/>
+        <p:txBody>
+          <a:bodyPr/>
+          <a:lstStyle/>
+          <a:p>
+            <a:endParaRPr lang="it-IT"/>
           </a:p>
         </p:txBody>
       </p:sp>
@@ -4647,60 +4662,7 @@
           <p:cNvPr id="8" name="Segnaposto contenuto 7">
             <a:extLst>
               <a:ext uri="{FF2B5EF4-FFF2-40B4-BE49-F238E27FC236}">
-                <a16:creationId xmlns:a16="http://schemas.microsoft.com/office/drawing/2014/main" id="{A1E5DF89-94E7-98C4-F563-B3A43317A1CE}"/>
-              </a:ext>
-            </a:extLst>
-          </p:cNvPr>
-          <p:cNvSpPr>
-            <a:spLocks noGrp="1"/>
-          </p:cNvSpPr>
-          <p:nvPr>
-            <p:ph sz="half" idx="2"/>
-          </p:nvPr>
-        </p:nvSpPr>
-        <p:spPr/>
-        <p:txBody>
-          <a:bodyPr/>
-          <a:lstStyle/>
-          <a:p>
-            <a:endParaRPr lang="it-IT"/>
-          </a:p>
-        </p:txBody>
-      </p:sp>
-      <p:sp>
-        <p:nvSpPr>
-          <p:cNvPr id="9" name="Segnaposto testo 8">
-            <a:extLst>
-              <a:ext uri="{FF2B5EF4-FFF2-40B4-BE49-F238E27FC236}">
-                <a16:creationId xmlns:a16="http://schemas.microsoft.com/office/drawing/2014/main" id="{00842FCF-9A2A-27B3-4ED6-BB0713CE4444}"/>
-              </a:ext>
-            </a:extLst>
-          </p:cNvPr>
-          <p:cNvSpPr>
-            <a:spLocks noGrp="1"/>
-          </p:cNvSpPr>
-          <p:nvPr>
-            <p:ph type="body" sz="quarter" idx="3"/>
-          </p:nvPr>
-        </p:nvSpPr>
-        <p:spPr/>
-        <p:txBody>
-          <a:bodyPr/>
-          <a:lstStyle/>
-          <a:p>
-            <a:r>
-              <a:rPr lang="it-IT" dirty="0"/>
-              <a:t>MINIX 3</a:t>
-            </a:r>
-          </a:p>
-        </p:txBody>
-      </p:sp>
-      <p:sp>
-        <p:nvSpPr>
-          <p:cNvPr id="10" name="Segnaposto contenuto 9">
-            <a:extLst>
-              <a:ext uri="{FF2B5EF4-FFF2-40B4-BE49-F238E27FC236}">
-                <a16:creationId xmlns:a16="http://schemas.microsoft.com/office/drawing/2014/main" id="{3CDA2ECB-1671-3745-42C6-213A778ECD29}"/>
+                <a16:creationId xmlns:a16="http://schemas.microsoft.com/office/drawing/2014/main" id="{3CBFDA4D-DA92-DE97-0B71-9E459466A516}"/>
               </a:ext>
             </a:extLst>
           </p:cNvPr>
@@ -4723,339 +4685,7 @@
     </p:spTree>
     <p:extLst>
       <p:ext uri="{BB962C8B-B14F-4D97-AF65-F5344CB8AC3E}">
-        <p14:creationId xmlns:p14="http://schemas.microsoft.com/office/powerpoint/2010/main" val="1787713386"/>
-      </p:ext>
-    </p:extLst>
-  </p:cSld>
-  <p:clrMapOvr>
-    <a:masterClrMapping/>
-  </p:clrMapOvr>
-</p:sld>
-</file>
-
-<file path=ppt/slides/slide18.xml><?xml version="1.0" encoding="utf-8"?>
-<p:sld xmlns:a="http://schemas.openxmlformats.org/drawingml/2006/main" xmlns:r="http://schemas.openxmlformats.org/officeDocument/2006/relationships" xmlns:p="http://schemas.openxmlformats.org/presentationml/2006/main">
-  <p:cSld>
-    <p:spTree>
-      <p:nvGrpSpPr>
-        <p:cNvPr id="1" name=""/>
-        <p:cNvGrpSpPr/>
-        <p:nvPr/>
-      </p:nvGrpSpPr>
-      <p:grpSpPr>
-        <a:xfrm>
-          <a:off x="0" y="0"/>
-          <a:ext cx="0" cy="0"/>
-          <a:chOff x="0" y="0"/>
-          <a:chExt cx="0" cy="0"/>
-        </a:xfrm>
-      </p:grpSpPr>
-      <p:sp>
-        <p:nvSpPr>
-          <p:cNvPr id="2" name="Titolo 1">
-            <a:extLst>
-              <a:ext uri="{FF2B5EF4-FFF2-40B4-BE49-F238E27FC236}">
-                <a16:creationId xmlns:a16="http://schemas.microsoft.com/office/drawing/2014/main" id="{69441F67-1949-8EC8-EB98-85670AC3670C}"/>
-              </a:ext>
-            </a:extLst>
-          </p:cNvPr>
-          <p:cNvSpPr>
-            <a:spLocks noGrp="1"/>
-          </p:cNvSpPr>
-          <p:nvPr>
-            <p:ph type="title"/>
-          </p:nvPr>
-        </p:nvSpPr>
-        <p:spPr/>
-        <p:txBody>
-          <a:bodyPr>
-            <a:normAutofit/>
-          </a:bodyPr>
-          <a:lstStyle/>
-          <a:p>
-            <a:r>
-              <a:rPr lang="it-IT" dirty="0"/>
-              <a:t>Gestione delle chiamate</a:t>
-            </a:r>
-          </a:p>
-        </p:txBody>
-      </p:sp>
-      <p:sp>
-        <p:nvSpPr>
-          <p:cNvPr id="4" name="Segnaposto testo 3">
-            <a:extLst>
-              <a:ext uri="{FF2B5EF4-FFF2-40B4-BE49-F238E27FC236}">
-                <a16:creationId xmlns:a16="http://schemas.microsoft.com/office/drawing/2014/main" id="{3484543A-BB31-0207-182F-1F1C206F0C68}"/>
-              </a:ext>
-            </a:extLst>
-          </p:cNvPr>
-          <p:cNvSpPr>
-            <a:spLocks noGrp="1"/>
-          </p:cNvSpPr>
-          <p:nvPr>
-            <p:ph type="body" idx="1"/>
-          </p:nvPr>
-        </p:nvSpPr>
-        <p:spPr/>
-        <p:txBody>
-          <a:bodyPr/>
-          <a:lstStyle/>
-          <a:p>
-            <a:r>
-              <a:rPr lang="it-IT" dirty="0"/>
-              <a:t>OS161</a:t>
-            </a:r>
-          </a:p>
-        </p:txBody>
-      </p:sp>
-      <p:sp>
-        <p:nvSpPr>
-          <p:cNvPr id="8" name="Segnaposto contenuto 7">
-            <a:extLst>
-              <a:ext uri="{FF2B5EF4-FFF2-40B4-BE49-F238E27FC236}">
-                <a16:creationId xmlns:a16="http://schemas.microsoft.com/office/drawing/2014/main" id="{A1E5DF89-94E7-98C4-F563-B3A43317A1CE}"/>
-              </a:ext>
-            </a:extLst>
-          </p:cNvPr>
-          <p:cNvSpPr>
-            <a:spLocks noGrp="1"/>
-          </p:cNvSpPr>
-          <p:nvPr>
-            <p:ph sz="half" idx="2"/>
-          </p:nvPr>
-        </p:nvSpPr>
-        <p:spPr/>
-        <p:txBody>
-          <a:bodyPr/>
-          <a:lstStyle/>
-          <a:p>
-            <a:endParaRPr lang="it-IT"/>
-          </a:p>
-        </p:txBody>
-      </p:sp>
-      <p:sp>
-        <p:nvSpPr>
-          <p:cNvPr id="9" name="Segnaposto testo 8">
-            <a:extLst>
-              <a:ext uri="{FF2B5EF4-FFF2-40B4-BE49-F238E27FC236}">
-                <a16:creationId xmlns:a16="http://schemas.microsoft.com/office/drawing/2014/main" id="{00842FCF-9A2A-27B3-4ED6-BB0713CE4444}"/>
-              </a:ext>
-            </a:extLst>
-          </p:cNvPr>
-          <p:cNvSpPr>
-            <a:spLocks noGrp="1"/>
-          </p:cNvSpPr>
-          <p:nvPr>
-            <p:ph type="body" sz="quarter" idx="3"/>
-          </p:nvPr>
-        </p:nvSpPr>
-        <p:spPr/>
-        <p:txBody>
-          <a:bodyPr/>
-          <a:lstStyle/>
-          <a:p>
-            <a:r>
-              <a:rPr lang="it-IT" dirty="0"/>
-              <a:t>MINIX 3</a:t>
-            </a:r>
-          </a:p>
-        </p:txBody>
-      </p:sp>
-      <p:sp>
-        <p:nvSpPr>
-          <p:cNvPr id="10" name="Segnaposto contenuto 9">
-            <a:extLst>
-              <a:ext uri="{FF2B5EF4-FFF2-40B4-BE49-F238E27FC236}">
-                <a16:creationId xmlns:a16="http://schemas.microsoft.com/office/drawing/2014/main" id="{3CDA2ECB-1671-3745-42C6-213A778ECD29}"/>
-              </a:ext>
-            </a:extLst>
-          </p:cNvPr>
-          <p:cNvSpPr>
-            <a:spLocks noGrp="1"/>
-          </p:cNvSpPr>
-          <p:nvPr>
-            <p:ph sz="quarter" idx="4"/>
-          </p:nvPr>
-        </p:nvSpPr>
-        <p:spPr/>
-        <p:txBody>
-          <a:bodyPr/>
-          <a:lstStyle/>
-          <a:p>
-            <a:endParaRPr lang="it-IT"/>
-          </a:p>
-        </p:txBody>
-      </p:sp>
-    </p:spTree>
-    <p:extLst>
-      <p:ext uri="{BB962C8B-B14F-4D97-AF65-F5344CB8AC3E}">
-        <p14:creationId xmlns:p14="http://schemas.microsoft.com/office/powerpoint/2010/main" val="104424725"/>
-      </p:ext>
-    </p:extLst>
-  </p:cSld>
-  <p:clrMapOvr>
-    <a:masterClrMapping/>
-  </p:clrMapOvr>
-</p:sld>
-</file>
-
-<file path=ppt/slides/slide19.xml><?xml version="1.0" encoding="utf-8"?>
-<p:sld xmlns:a="http://schemas.openxmlformats.org/drawingml/2006/main" xmlns:r="http://schemas.openxmlformats.org/officeDocument/2006/relationships" xmlns:p="http://schemas.openxmlformats.org/presentationml/2006/main">
-  <p:cSld>
-    <p:spTree>
-      <p:nvGrpSpPr>
-        <p:cNvPr id="1" name=""/>
-        <p:cNvGrpSpPr/>
-        <p:nvPr/>
-      </p:nvGrpSpPr>
-      <p:grpSpPr>
-        <a:xfrm>
-          <a:off x="0" y="0"/>
-          <a:ext cx="0" cy="0"/>
-          <a:chOff x="0" y="0"/>
-          <a:chExt cx="0" cy="0"/>
-        </a:xfrm>
-      </p:grpSpPr>
-      <p:sp>
-        <p:nvSpPr>
-          <p:cNvPr id="2" name="Titolo 1">
-            <a:extLst>
-              <a:ext uri="{FF2B5EF4-FFF2-40B4-BE49-F238E27FC236}">
-                <a16:creationId xmlns:a16="http://schemas.microsoft.com/office/drawing/2014/main" id="{69441F67-1949-8EC8-EB98-85670AC3670C}"/>
-              </a:ext>
-            </a:extLst>
-          </p:cNvPr>
-          <p:cNvSpPr>
-            <a:spLocks noGrp="1"/>
-          </p:cNvSpPr>
-          <p:nvPr>
-            <p:ph type="title"/>
-          </p:nvPr>
-        </p:nvSpPr>
-        <p:spPr/>
-        <p:txBody>
-          <a:bodyPr>
-            <a:normAutofit/>
-          </a:bodyPr>
-          <a:lstStyle/>
-          <a:p>
-            <a:r>
-              <a:rPr lang="it-IT" dirty="0"/>
-              <a:t>Meccanismi di sincronizzazione</a:t>
-            </a:r>
-          </a:p>
-        </p:txBody>
-      </p:sp>
-      <p:sp>
-        <p:nvSpPr>
-          <p:cNvPr id="4" name="Segnaposto testo 3">
-            <a:extLst>
-              <a:ext uri="{FF2B5EF4-FFF2-40B4-BE49-F238E27FC236}">
-                <a16:creationId xmlns:a16="http://schemas.microsoft.com/office/drawing/2014/main" id="{3484543A-BB31-0207-182F-1F1C206F0C68}"/>
-              </a:ext>
-            </a:extLst>
-          </p:cNvPr>
-          <p:cNvSpPr>
-            <a:spLocks noGrp="1"/>
-          </p:cNvSpPr>
-          <p:nvPr>
-            <p:ph type="body" idx="1"/>
-          </p:nvPr>
-        </p:nvSpPr>
-        <p:spPr/>
-        <p:txBody>
-          <a:bodyPr/>
-          <a:lstStyle/>
-          <a:p>
-            <a:r>
-              <a:rPr lang="it-IT" dirty="0"/>
-              <a:t>OS161</a:t>
-            </a:r>
-          </a:p>
-        </p:txBody>
-      </p:sp>
-      <p:sp>
-        <p:nvSpPr>
-          <p:cNvPr id="8" name="Segnaposto contenuto 7">
-            <a:extLst>
-              <a:ext uri="{FF2B5EF4-FFF2-40B4-BE49-F238E27FC236}">
-                <a16:creationId xmlns:a16="http://schemas.microsoft.com/office/drawing/2014/main" id="{A1E5DF89-94E7-98C4-F563-B3A43317A1CE}"/>
-              </a:ext>
-            </a:extLst>
-          </p:cNvPr>
-          <p:cNvSpPr>
-            <a:spLocks noGrp="1"/>
-          </p:cNvSpPr>
-          <p:nvPr>
-            <p:ph sz="half" idx="2"/>
-          </p:nvPr>
-        </p:nvSpPr>
-        <p:spPr/>
-        <p:txBody>
-          <a:bodyPr/>
-          <a:lstStyle/>
-          <a:p>
-            <a:endParaRPr lang="it-IT"/>
-          </a:p>
-        </p:txBody>
-      </p:sp>
-      <p:sp>
-        <p:nvSpPr>
-          <p:cNvPr id="9" name="Segnaposto testo 8">
-            <a:extLst>
-              <a:ext uri="{FF2B5EF4-FFF2-40B4-BE49-F238E27FC236}">
-                <a16:creationId xmlns:a16="http://schemas.microsoft.com/office/drawing/2014/main" id="{00842FCF-9A2A-27B3-4ED6-BB0713CE4444}"/>
-              </a:ext>
-            </a:extLst>
-          </p:cNvPr>
-          <p:cNvSpPr>
-            <a:spLocks noGrp="1"/>
-          </p:cNvSpPr>
-          <p:nvPr>
-            <p:ph type="body" sz="quarter" idx="3"/>
-          </p:nvPr>
-        </p:nvSpPr>
-        <p:spPr/>
-        <p:txBody>
-          <a:bodyPr/>
-          <a:lstStyle/>
-          <a:p>
-            <a:r>
-              <a:rPr lang="it-IT" dirty="0"/>
-              <a:t>MINIX 3</a:t>
-            </a:r>
-          </a:p>
-        </p:txBody>
-      </p:sp>
-      <p:sp>
-        <p:nvSpPr>
-          <p:cNvPr id="10" name="Segnaposto contenuto 9">
-            <a:extLst>
-              <a:ext uri="{FF2B5EF4-FFF2-40B4-BE49-F238E27FC236}">
-                <a16:creationId xmlns:a16="http://schemas.microsoft.com/office/drawing/2014/main" id="{3CDA2ECB-1671-3745-42C6-213A778ECD29}"/>
-              </a:ext>
-            </a:extLst>
-          </p:cNvPr>
-          <p:cNvSpPr>
-            <a:spLocks noGrp="1"/>
-          </p:cNvSpPr>
-          <p:nvPr>
-            <p:ph sz="quarter" idx="4"/>
-          </p:nvPr>
-        </p:nvSpPr>
-        <p:spPr/>
-        <p:txBody>
-          <a:bodyPr/>
-          <a:lstStyle/>
-          <a:p>
-            <a:endParaRPr lang="it-IT"/>
-          </a:p>
-        </p:txBody>
-      </p:sp>
-    </p:spTree>
-    <p:extLst>
-      <p:ext uri="{BB962C8B-B14F-4D97-AF65-F5344CB8AC3E}">
-        <p14:creationId xmlns:p14="http://schemas.microsoft.com/office/powerpoint/2010/main" val="151468646"/>
+        <p14:creationId xmlns:p14="http://schemas.microsoft.com/office/powerpoint/2010/main" val="2906817671"/>
       </p:ext>
     </p:extLst>
   </p:cSld>
@@ -5148,471 +4778,6 @@
 </p:sld>
 </file>
 
-<file path=ppt/slides/slide20.xml><?xml version="1.0" encoding="utf-8"?>
-<p:sld xmlns:a="http://schemas.openxmlformats.org/drawingml/2006/main" xmlns:r="http://schemas.openxmlformats.org/officeDocument/2006/relationships" xmlns:p="http://schemas.openxmlformats.org/presentationml/2006/main">
-  <p:cSld>
-    <p:spTree>
-      <p:nvGrpSpPr>
-        <p:cNvPr id="1" name=""/>
-        <p:cNvGrpSpPr/>
-        <p:nvPr/>
-      </p:nvGrpSpPr>
-      <p:grpSpPr>
-        <a:xfrm>
-          <a:off x="0" y="0"/>
-          <a:ext cx="0" cy="0"/>
-          <a:chOff x="0" y="0"/>
-          <a:chExt cx="0" cy="0"/>
-        </a:xfrm>
-      </p:grpSpPr>
-      <p:sp>
-        <p:nvSpPr>
-          <p:cNvPr id="4" name="Titolo 3">
-            <a:extLst>
-              <a:ext uri="{FF2B5EF4-FFF2-40B4-BE49-F238E27FC236}">
-                <a16:creationId xmlns:a16="http://schemas.microsoft.com/office/drawing/2014/main" id="{4C6958DE-4CE8-5842-7EB3-6A77942BB66B}"/>
-              </a:ext>
-            </a:extLst>
-          </p:cNvPr>
-          <p:cNvSpPr>
-            <a:spLocks noGrp="1"/>
-          </p:cNvSpPr>
-          <p:nvPr>
-            <p:ph type="title"/>
-          </p:nvPr>
-        </p:nvSpPr>
-        <p:spPr/>
-        <p:txBody>
-          <a:bodyPr/>
-          <a:lstStyle/>
-          <a:p>
-            <a:endParaRPr lang="it-IT"/>
-          </a:p>
-        </p:txBody>
-      </p:sp>
-      <p:sp>
-        <p:nvSpPr>
-          <p:cNvPr id="5" name="Segnaposto testo 4">
-            <a:extLst>
-              <a:ext uri="{FF2B5EF4-FFF2-40B4-BE49-F238E27FC236}">
-                <a16:creationId xmlns:a16="http://schemas.microsoft.com/office/drawing/2014/main" id="{A4B09623-3F65-2A7A-7B90-C83F04115A56}"/>
-              </a:ext>
-            </a:extLst>
-          </p:cNvPr>
-          <p:cNvSpPr>
-            <a:spLocks noGrp="1"/>
-          </p:cNvSpPr>
-          <p:nvPr>
-            <p:ph type="body" idx="1"/>
-          </p:nvPr>
-        </p:nvSpPr>
-        <p:spPr/>
-        <p:txBody>
-          <a:bodyPr/>
-          <a:lstStyle/>
-          <a:p>
-            <a:endParaRPr lang="it-IT"/>
-          </a:p>
-        </p:txBody>
-      </p:sp>
-      <p:sp>
-        <p:nvSpPr>
-          <p:cNvPr id="6" name="Segnaposto contenuto 5">
-            <a:extLst>
-              <a:ext uri="{FF2B5EF4-FFF2-40B4-BE49-F238E27FC236}">
-                <a16:creationId xmlns:a16="http://schemas.microsoft.com/office/drawing/2014/main" id="{4BCD0132-CD1D-8CC1-F046-77698045EF07}"/>
-              </a:ext>
-            </a:extLst>
-          </p:cNvPr>
-          <p:cNvSpPr>
-            <a:spLocks noGrp="1"/>
-          </p:cNvSpPr>
-          <p:nvPr>
-            <p:ph sz="half" idx="2"/>
-          </p:nvPr>
-        </p:nvSpPr>
-        <p:spPr/>
-        <p:txBody>
-          <a:bodyPr/>
-          <a:lstStyle/>
-          <a:p>
-            <a:endParaRPr lang="it-IT"/>
-          </a:p>
-        </p:txBody>
-      </p:sp>
-      <p:sp>
-        <p:nvSpPr>
-          <p:cNvPr id="7" name="Segnaposto testo 6">
-            <a:extLst>
-              <a:ext uri="{FF2B5EF4-FFF2-40B4-BE49-F238E27FC236}">
-                <a16:creationId xmlns:a16="http://schemas.microsoft.com/office/drawing/2014/main" id="{E1B43DBC-8A47-364D-11EC-72C37033637E}"/>
-              </a:ext>
-            </a:extLst>
-          </p:cNvPr>
-          <p:cNvSpPr>
-            <a:spLocks noGrp="1"/>
-          </p:cNvSpPr>
-          <p:nvPr>
-            <p:ph type="body" sz="quarter" idx="3"/>
-          </p:nvPr>
-        </p:nvSpPr>
-        <p:spPr/>
-        <p:txBody>
-          <a:bodyPr/>
-          <a:lstStyle/>
-          <a:p>
-            <a:endParaRPr lang="it-IT"/>
-          </a:p>
-        </p:txBody>
-      </p:sp>
-      <p:sp>
-        <p:nvSpPr>
-          <p:cNvPr id="8" name="Segnaposto contenuto 7">
-            <a:extLst>
-              <a:ext uri="{FF2B5EF4-FFF2-40B4-BE49-F238E27FC236}">
-                <a16:creationId xmlns:a16="http://schemas.microsoft.com/office/drawing/2014/main" id="{3CBFDA4D-DA92-DE97-0B71-9E459466A516}"/>
-              </a:ext>
-            </a:extLst>
-          </p:cNvPr>
-          <p:cNvSpPr>
-            <a:spLocks noGrp="1"/>
-          </p:cNvSpPr>
-          <p:nvPr>
-            <p:ph sz="quarter" idx="4"/>
-          </p:nvPr>
-        </p:nvSpPr>
-        <p:spPr/>
-        <p:txBody>
-          <a:bodyPr/>
-          <a:lstStyle/>
-          <a:p>
-            <a:endParaRPr lang="it-IT"/>
-          </a:p>
-        </p:txBody>
-      </p:sp>
-    </p:spTree>
-    <p:extLst>
-      <p:ext uri="{BB962C8B-B14F-4D97-AF65-F5344CB8AC3E}">
-        <p14:creationId xmlns:p14="http://schemas.microsoft.com/office/powerpoint/2010/main" val="1346140153"/>
-      </p:ext>
-    </p:extLst>
-  </p:cSld>
-  <p:clrMapOvr>
-    <a:masterClrMapping/>
-  </p:clrMapOvr>
-</p:sld>
-</file>
-
-<file path=ppt/slides/slide21.xml><?xml version="1.0" encoding="utf-8"?>
-<p:sld xmlns:a="http://schemas.openxmlformats.org/drawingml/2006/main" xmlns:r="http://schemas.openxmlformats.org/officeDocument/2006/relationships" xmlns:p="http://schemas.openxmlformats.org/presentationml/2006/main">
-  <p:cSld>
-    <p:spTree>
-      <p:nvGrpSpPr>
-        <p:cNvPr id="1" name=""/>
-        <p:cNvGrpSpPr/>
-        <p:nvPr/>
-      </p:nvGrpSpPr>
-      <p:grpSpPr>
-        <a:xfrm>
-          <a:off x="0" y="0"/>
-          <a:ext cx="0" cy="0"/>
-          <a:chOff x="0" y="0"/>
-          <a:chExt cx="0" cy="0"/>
-        </a:xfrm>
-      </p:grpSpPr>
-      <p:sp>
-        <p:nvSpPr>
-          <p:cNvPr id="4" name="Titolo 3">
-            <a:extLst>
-              <a:ext uri="{FF2B5EF4-FFF2-40B4-BE49-F238E27FC236}">
-                <a16:creationId xmlns:a16="http://schemas.microsoft.com/office/drawing/2014/main" id="{4C6958DE-4CE8-5842-7EB3-6A77942BB66B}"/>
-              </a:ext>
-            </a:extLst>
-          </p:cNvPr>
-          <p:cNvSpPr>
-            <a:spLocks noGrp="1"/>
-          </p:cNvSpPr>
-          <p:nvPr>
-            <p:ph type="title"/>
-          </p:nvPr>
-        </p:nvSpPr>
-        <p:spPr/>
-        <p:txBody>
-          <a:bodyPr/>
-          <a:lstStyle/>
-          <a:p>
-            <a:endParaRPr lang="it-IT"/>
-          </a:p>
-        </p:txBody>
-      </p:sp>
-      <p:sp>
-        <p:nvSpPr>
-          <p:cNvPr id="5" name="Segnaposto testo 4">
-            <a:extLst>
-              <a:ext uri="{FF2B5EF4-FFF2-40B4-BE49-F238E27FC236}">
-                <a16:creationId xmlns:a16="http://schemas.microsoft.com/office/drawing/2014/main" id="{A4B09623-3F65-2A7A-7B90-C83F04115A56}"/>
-              </a:ext>
-            </a:extLst>
-          </p:cNvPr>
-          <p:cNvSpPr>
-            <a:spLocks noGrp="1"/>
-          </p:cNvSpPr>
-          <p:nvPr>
-            <p:ph type="body" idx="1"/>
-          </p:nvPr>
-        </p:nvSpPr>
-        <p:spPr/>
-        <p:txBody>
-          <a:bodyPr/>
-          <a:lstStyle/>
-          <a:p>
-            <a:endParaRPr lang="it-IT"/>
-          </a:p>
-        </p:txBody>
-      </p:sp>
-      <p:sp>
-        <p:nvSpPr>
-          <p:cNvPr id="6" name="Segnaposto contenuto 5">
-            <a:extLst>
-              <a:ext uri="{FF2B5EF4-FFF2-40B4-BE49-F238E27FC236}">
-                <a16:creationId xmlns:a16="http://schemas.microsoft.com/office/drawing/2014/main" id="{4BCD0132-CD1D-8CC1-F046-77698045EF07}"/>
-              </a:ext>
-            </a:extLst>
-          </p:cNvPr>
-          <p:cNvSpPr>
-            <a:spLocks noGrp="1"/>
-          </p:cNvSpPr>
-          <p:nvPr>
-            <p:ph sz="half" idx="2"/>
-          </p:nvPr>
-        </p:nvSpPr>
-        <p:spPr/>
-        <p:txBody>
-          <a:bodyPr/>
-          <a:lstStyle/>
-          <a:p>
-            <a:endParaRPr lang="it-IT"/>
-          </a:p>
-        </p:txBody>
-      </p:sp>
-      <p:sp>
-        <p:nvSpPr>
-          <p:cNvPr id="7" name="Segnaposto testo 6">
-            <a:extLst>
-              <a:ext uri="{FF2B5EF4-FFF2-40B4-BE49-F238E27FC236}">
-                <a16:creationId xmlns:a16="http://schemas.microsoft.com/office/drawing/2014/main" id="{E1B43DBC-8A47-364D-11EC-72C37033637E}"/>
-              </a:ext>
-            </a:extLst>
-          </p:cNvPr>
-          <p:cNvSpPr>
-            <a:spLocks noGrp="1"/>
-          </p:cNvSpPr>
-          <p:nvPr>
-            <p:ph type="body" sz="quarter" idx="3"/>
-          </p:nvPr>
-        </p:nvSpPr>
-        <p:spPr/>
-        <p:txBody>
-          <a:bodyPr/>
-          <a:lstStyle/>
-          <a:p>
-            <a:endParaRPr lang="it-IT"/>
-          </a:p>
-        </p:txBody>
-      </p:sp>
-      <p:sp>
-        <p:nvSpPr>
-          <p:cNvPr id="8" name="Segnaposto contenuto 7">
-            <a:extLst>
-              <a:ext uri="{FF2B5EF4-FFF2-40B4-BE49-F238E27FC236}">
-                <a16:creationId xmlns:a16="http://schemas.microsoft.com/office/drawing/2014/main" id="{3CBFDA4D-DA92-DE97-0B71-9E459466A516}"/>
-              </a:ext>
-            </a:extLst>
-          </p:cNvPr>
-          <p:cNvSpPr>
-            <a:spLocks noGrp="1"/>
-          </p:cNvSpPr>
-          <p:nvPr>
-            <p:ph sz="quarter" idx="4"/>
-          </p:nvPr>
-        </p:nvSpPr>
-        <p:spPr/>
-        <p:txBody>
-          <a:bodyPr/>
-          <a:lstStyle/>
-          <a:p>
-            <a:endParaRPr lang="it-IT"/>
-          </a:p>
-        </p:txBody>
-      </p:sp>
-    </p:spTree>
-    <p:extLst>
-      <p:ext uri="{BB962C8B-B14F-4D97-AF65-F5344CB8AC3E}">
-        <p14:creationId xmlns:p14="http://schemas.microsoft.com/office/powerpoint/2010/main" val="3327742900"/>
-      </p:ext>
-    </p:extLst>
-  </p:cSld>
-  <p:clrMapOvr>
-    <a:masterClrMapping/>
-  </p:clrMapOvr>
-</p:sld>
-</file>
-
-<file path=ppt/slides/slide22.xml><?xml version="1.0" encoding="utf-8"?>
-<p:sld xmlns:a="http://schemas.openxmlformats.org/drawingml/2006/main" xmlns:r="http://schemas.openxmlformats.org/officeDocument/2006/relationships" xmlns:p="http://schemas.openxmlformats.org/presentationml/2006/main">
-  <p:cSld>
-    <p:spTree>
-      <p:nvGrpSpPr>
-        <p:cNvPr id="1" name=""/>
-        <p:cNvGrpSpPr/>
-        <p:nvPr/>
-      </p:nvGrpSpPr>
-      <p:grpSpPr>
-        <a:xfrm>
-          <a:off x="0" y="0"/>
-          <a:ext cx="0" cy="0"/>
-          <a:chOff x="0" y="0"/>
-          <a:chExt cx="0" cy="0"/>
-        </a:xfrm>
-      </p:grpSpPr>
-      <p:sp>
-        <p:nvSpPr>
-          <p:cNvPr id="4" name="Titolo 3">
-            <a:extLst>
-              <a:ext uri="{FF2B5EF4-FFF2-40B4-BE49-F238E27FC236}">
-                <a16:creationId xmlns:a16="http://schemas.microsoft.com/office/drawing/2014/main" id="{4C6958DE-4CE8-5842-7EB3-6A77942BB66B}"/>
-              </a:ext>
-            </a:extLst>
-          </p:cNvPr>
-          <p:cNvSpPr>
-            <a:spLocks noGrp="1"/>
-          </p:cNvSpPr>
-          <p:nvPr>
-            <p:ph type="title"/>
-          </p:nvPr>
-        </p:nvSpPr>
-        <p:spPr/>
-        <p:txBody>
-          <a:bodyPr/>
-          <a:lstStyle/>
-          <a:p>
-            <a:endParaRPr lang="it-IT"/>
-          </a:p>
-        </p:txBody>
-      </p:sp>
-      <p:sp>
-        <p:nvSpPr>
-          <p:cNvPr id="5" name="Segnaposto testo 4">
-            <a:extLst>
-              <a:ext uri="{FF2B5EF4-FFF2-40B4-BE49-F238E27FC236}">
-                <a16:creationId xmlns:a16="http://schemas.microsoft.com/office/drawing/2014/main" id="{A4B09623-3F65-2A7A-7B90-C83F04115A56}"/>
-              </a:ext>
-            </a:extLst>
-          </p:cNvPr>
-          <p:cNvSpPr>
-            <a:spLocks noGrp="1"/>
-          </p:cNvSpPr>
-          <p:nvPr>
-            <p:ph type="body" idx="1"/>
-          </p:nvPr>
-        </p:nvSpPr>
-        <p:spPr/>
-        <p:txBody>
-          <a:bodyPr/>
-          <a:lstStyle/>
-          <a:p>
-            <a:endParaRPr lang="it-IT"/>
-          </a:p>
-        </p:txBody>
-      </p:sp>
-      <p:sp>
-        <p:nvSpPr>
-          <p:cNvPr id="6" name="Segnaposto contenuto 5">
-            <a:extLst>
-              <a:ext uri="{FF2B5EF4-FFF2-40B4-BE49-F238E27FC236}">
-                <a16:creationId xmlns:a16="http://schemas.microsoft.com/office/drawing/2014/main" id="{4BCD0132-CD1D-8CC1-F046-77698045EF07}"/>
-              </a:ext>
-            </a:extLst>
-          </p:cNvPr>
-          <p:cNvSpPr>
-            <a:spLocks noGrp="1"/>
-          </p:cNvSpPr>
-          <p:nvPr>
-            <p:ph sz="half" idx="2"/>
-          </p:nvPr>
-        </p:nvSpPr>
-        <p:spPr/>
-        <p:txBody>
-          <a:bodyPr/>
-          <a:lstStyle/>
-          <a:p>
-            <a:endParaRPr lang="it-IT"/>
-          </a:p>
-        </p:txBody>
-      </p:sp>
-      <p:sp>
-        <p:nvSpPr>
-          <p:cNvPr id="7" name="Segnaposto testo 6">
-            <a:extLst>
-              <a:ext uri="{FF2B5EF4-FFF2-40B4-BE49-F238E27FC236}">
-                <a16:creationId xmlns:a16="http://schemas.microsoft.com/office/drawing/2014/main" id="{E1B43DBC-8A47-364D-11EC-72C37033637E}"/>
-              </a:ext>
-            </a:extLst>
-          </p:cNvPr>
-          <p:cNvSpPr>
-            <a:spLocks noGrp="1"/>
-          </p:cNvSpPr>
-          <p:nvPr>
-            <p:ph type="body" sz="quarter" idx="3"/>
-          </p:nvPr>
-        </p:nvSpPr>
-        <p:spPr/>
-        <p:txBody>
-          <a:bodyPr/>
-          <a:lstStyle/>
-          <a:p>
-            <a:endParaRPr lang="it-IT"/>
-          </a:p>
-        </p:txBody>
-      </p:sp>
-      <p:sp>
-        <p:nvSpPr>
-          <p:cNvPr id="8" name="Segnaposto contenuto 7">
-            <a:extLst>
-              <a:ext uri="{FF2B5EF4-FFF2-40B4-BE49-F238E27FC236}">
-                <a16:creationId xmlns:a16="http://schemas.microsoft.com/office/drawing/2014/main" id="{3CBFDA4D-DA92-DE97-0B71-9E459466A516}"/>
-              </a:ext>
-            </a:extLst>
-          </p:cNvPr>
-          <p:cNvSpPr>
-            <a:spLocks noGrp="1"/>
-          </p:cNvSpPr>
-          <p:nvPr>
-            <p:ph sz="quarter" idx="4"/>
-          </p:nvPr>
-        </p:nvSpPr>
-        <p:spPr/>
-        <p:txBody>
-          <a:bodyPr/>
-          <a:lstStyle/>
-          <a:p>
-            <a:endParaRPr lang="it-IT"/>
-          </a:p>
-        </p:txBody>
-      </p:sp>
-    </p:spTree>
-    <p:extLst>
-      <p:ext uri="{BB962C8B-B14F-4D97-AF65-F5344CB8AC3E}">
-        <p14:creationId xmlns:p14="http://schemas.microsoft.com/office/powerpoint/2010/main" val="2906817671"/>
-      </p:ext>
-    </p:extLst>
-  </p:cSld>
-  <p:clrMapOvr>
-    <a:masterClrMapping/>
-  </p:clrMapOvr>
-</p:sld>
-</file>
-
 <file path=ppt/slides/slide3.xml><?xml version="1.0" encoding="utf-8"?>
 <p:sld xmlns:a="http://schemas.openxmlformats.org/drawingml/2006/main" xmlns:r="http://schemas.openxmlformats.org/officeDocument/2006/relationships" xmlns:p="http://schemas.openxmlformats.org/presentationml/2006/main">
   <p:cSld>
@@ -5734,7 +4899,7 @@
           <a:p>
             <a:r>
               <a:rPr lang="it-IT" dirty="0"/>
-              <a:t>MINIX 3</a:t>
+              <a:t>PINTOS</a:t>
             </a:r>
           </a:p>
         </p:txBody>
@@ -5882,7 +5047,7 @@
           <p:cNvPr id="2" name="Titolo 1">
             <a:extLst>
               <a:ext uri="{FF2B5EF4-FFF2-40B4-BE49-F238E27FC236}">
-                <a16:creationId xmlns:a16="http://schemas.microsoft.com/office/drawing/2014/main" id="{E59A807A-FBE3-B66C-5E76-C14B95235667}"/>
+                <a16:creationId xmlns:a16="http://schemas.microsoft.com/office/drawing/2014/main" id="{69441F67-1949-8EC8-EB98-85670AC3670C}"/>
               </a:ext>
             </a:extLst>
           </p:cNvPr>
@@ -5895,12 +5060,14 @@
         </p:nvSpPr>
         <p:spPr/>
         <p:txBody>
-          <a:bodyPr/>
+          <a:bodyPr>
+            <a:normAutofit/>
+          </a:bodyPr>
           <a:lstStyle/>
           <a:p>
             <a:r>
               <a:rPr lang="it-IT" dirty="0"/>
-              <a:t>Fork</a:t>
+              <a:t>Scheduling: Obiettivi</a:t>
             </a:r>
           </a:p>
         </p:txBody>
@@ -5910,7 +5077,7 @@
           <p:cNvPr id="4" name="Segnaposto testo 3">
             <a:extLst>
               <a:ext uri="{FF2B5EF4-FFF2-40B4-BE49-F238E27FC236}">
-                <a16:creationId xmlns:a16="http://schemas.microsoft.com/office/drawing/2014/main" id="{5E5D57F9-0477-4F76-EB1F-30ADF530B627}"/>
+                <a16:creationId xmlns:a16="http://schemas.microsoft.com/office/drawing/2014/main" id="{3484543A-BB31-0207-182F-1F1C206F0C68}"/>
               </a:ext>
             </a:extLst>
           </p:cNvPr>
@@ -5935,10 +5102,10 @@
       </p:sp>
       <p:sp>
         <p:nvSpPr>
-          <p:cNvPr id="5" name="Segnaposto contenuto 4">
-            <a:extLst>
-              <a:ext uri="{FF2B5EF4-FFF2-40B4-BE49-F238E27FC236}">
-                <a16:creationId xmlns:a16="http://schemas.microsoft.com/office/drawing/2014/main" id="{163BE631-5171-41CB-1651-B8CBA56189FD}"/>
+          <p:cNvPr id="8" name="Segnaposto contenuto 7">
+            <a:extLst>
+              <a:ext uri="{FF2B5EF4-FFF2-40B4-BE49-F238E27FC236}">
+                <a16:creationId xmlns:a16="http://schemas.microsoft.com/office/drawing/2014/main" id="{A1E5DF89-94E7-98C4-F563-B3A43317A1CE}"/>
               </a:ext>
             </a:extLst>
           </p:cNvPr>
@@ -5960,10 +5127,10 @@
       </p:sp>
       <p:sp>
         <p:nvSpPr>
-          <p:cNvPr id="6" name="Segnaposto testo 5">
-            <a:extLst>
-              <a:ext uri="{FF2B5EF4-FFF2-40B4-BE49-F238E27FC236}">
-                <a16:creationId xmlns:a16="http://schemas.microsoft.com/office/drawing/2014/main" id="{6BB84A92-9DB7-C903-13D1-DA423998BE9E}"/>
+          <p:cNvPr id="9" name="Segnaposto testo 8">
+            <a:extLst>
+              <a:ext uri="{FF2B5EF4-FFF2-40B4-BE49-F238E27FC236}">
+                <a16:creationId xmlns:a16="http://schemas.microsoft.com/office/drawing/2014/main" id="{00842FCF-9A2A-27B3-4ED6-BB0713CE4444}"/>
               </a:ext>
             </a:extLst>
           </p:cNvPr>
@@ -5981,17 +5148,17 @@
           <a:p>
             <a:r>
               <a:rPr lang="it-IT" dirty="0"/>
-              <a:t>MINIX 3</a:t>
-            </a:r>
-          </a:p>
-        </p:txBody>
-      </p:sp>
-      <p:sp>
-        <p:nvSpPr>
-          <p:cNvPr id="7" name="Segnaposto contenuto 6">
-            <a:extLst>
-              <a:ext uri="{FF2B5EF4-FFF2-40B4-BE49-F238E27FC236}">
-                <a16:creationId xmlns:a16="http://schemas.microsoft.com/office/drawing/2014/main" id="{57618781-70D6-1FBC-40FF-8F829D20BC33}"/>
+              <a:t>PINTOS</a:t>
+            </a:r>
+          </a:p>
+        </p:txBody>
+      </p:sp>
+      <p:sp>
+        <p:nvSpPr>
+          <p:cNvPr id="10" name="Segnaposto contenuto 9">
+            <a:extLst>
+              <a:ext uri="{FF2B5EF4-FFF2-40B4-BE49-F238E27FC236}">
+                <a16:creationId xmlns:a16="http://schemas.microsoft.com/office/drawing/2014/main" id="{3CDA2ECB-1671-3745-42C6-213A778ECD29}"/>
               </a:ext>
             </a:extLst>
           </p:cNvPr>
@@ -6014,7 +5181,7 @@
     </p:spTree>
     <p:extLst>
       <p:ext uri="{BB962C8B-B14F-4D97-AF65-F5344CB8AC3E}">
-        <p14:creationId xmlns:p14="http://schemas.microsoft.com/office/powerpoint/2010/main" val="39553206"/>
+        <p14:creationId xmlns:p14="http://schemas.microsoft.com/office/powerpoint/2010/main" val="2070214546"/>
       </p:ext>
     </p:extLst>
   </p:cSld>
@@ -6046,7 +5213,7 @@
           <p:cNvPr id="2" name="Titolo 1">
             <a:extLst>
               <a:ext uri="{FF2B5EF4-FFF2-40B4-BE49-F238E27FC236}">
-                <a16:creationId xmlns:a16="http://schemas.microsoft.com/office/drawing/2014/main" id="{E59A807A-FBE3-B66C-5E76-C14B95235667}"/>
+                <a16:creationId xmlns:a16="http://schemas.microsoft.com/office/drawing/2014/main" id="{69441F67-1949-8EC8-EB98-85670AC3670C}"/>
               </a:ext>
             </a:extLst>
           </p:cNvPr>
@@ -6059,12 +5226,14 @@
         </p:nvSpPr>
         <p:spPr/>
         <p:txBody>
-          <a:bodyPr/>
+          <a:bodyPr>
+            <a:normAutofit/>
+          </a:bodyPr>
           <a:lstStyle/>
           <a:p>
             <a:r>
               <a:rPr lang="it-IT" dirty="0"/>
-              <a:t>Exit</a:t>
+              <a:t>Scheduling: Politiche di scheduling</a:t>
             </a:r>
           </a:p>
         </p:txBody>
@@ -6074,7 +5243,7 @@
           <p:cNvPr id="4" name="Segnaposto testo 3">
             <a:extLst>
               <a:ext uri="{FF2B5EF4-FFF2-40B4-BE49-F238E27FC236}">
-                <a16:creationId xmlns:a16="http://schemas.microsoft.com/office/drawing/2014/main" id="{5E5D57F9-0477-4F76-EB1F-30ADF530B627}"/>
+                <a16:creationId xmlns:a16="http://schemas.microsoft.com/office/drawing/2014/main" id="{3484543A-BB31-0207-182F-1F1C206F0C68}"/>
               </a:ext>
             </a:extLst>
           </p:cNvPr>
@@ -6099,10 +5268,10 @@
       </p:sp>
       <p:sp>
         <p:nvSpPr>
-          <p:cNvPr id="5" name="Segnaposto contenuto 4">
-            <a:extLst>
-              <a:ext uri="{FF2B5EF4-FFF2-40B4-BE49-F238E27FC236}">
-                <a16:creationId xmlns:a16="http://schemas.microsoft.com/office/drawing/2014/main" id="{163BE631-5171-41CB-1651-B8CBA56189FD}"/>
+          <p:cNvPr id="8" name="Segnaposto contenuto 7">
+            <a:extLst>
+              <a:ext uri="{FF2B5EF4-FFF2-40B4-BE49-F238E27FC236}">
+                <a16:creationId xmlns:a16="http://schemas.microsoft.com/office/drawing/2014/main" id="{A1E5DF89-94E7-98C4-F563-B3A43317A1CE}"/>
               </a:ext>
             </a:extLst>
           </p:cNvPr>
@@ -6124,10 +5293,10 @@
       </p:sp>
       <p:sp>
         <p:nvSpPr>
-          <p:cNvPr id="6" name="Segnaposto testo 5">
-            <a:extLst>
-              <a:ext uri="{FF2B5EF4-FFF2-40B4-BE49-F238E27FC236}">
-                <a16:creationId xmlns:a16="http://schemas.microsoft.com/office/drawing/2014/main" id="{6BB84A92-9DB7-C903-13D1-DA423998BE9E}"/>
+          <p:cNvPr id="9" name="Segnaposto testo 8">
+            <a:extLst>
+              <a:ext uri="{FF2B5EF4-FFF2-40B4-BE49-F238E27FC236}">
+                <a16:creationId xmlns:a16="http://schemas.microsoft.com/office/drawing/2014/main" id="{00842FCF-9A2A-27B3-4ED6-BB0713CE4444}"/>
               </a:ext>
             </a:extLst>
           </p:cNvPr>
@@ -6145,17 +5314,17 @@
           <a:p>
             <a:r>
               <a:rPr lang="it-IT" dirty="0"/>
-              <a:t>MINIX 3</a:t>
-            </a:r>
-          </a:p>
-        </p:txBody>
-      </p:sp>
-      <p:sp>
-        <p:nvSpPr>
-          <p:cNvPr id="7" name="Segnaposto contenuto 6">
-            <a:extLst>
-              <a:ext uri="{FF2B5EF4-FFF2-40B4-BE49-F238E27FC236}">
-                <a16:creationId xmlns:a16="http://schemas.microsoft.com/office/drawing/2014/main" id="{57618781-70D6-1FBC-40FF-8F829D20BC33}"/>
+              <a:t>PINTOS</a:t>
+            </a:r>
+          </a:p>
+        </p:txBody>
+      </p:sp>
+      <p:sp>
+        <p:nvSpPr>
+          <p:cNvPr id="10" name="Segnaposto contenuto 9">
+            <a:extLst>
+              <a:ext uri="{FF2B5EF4-FFF2-40B4-BE49-F238E27FC236}">
+                <a16:creationId xmlns:a16="http://schemas.microsoft.com/office/drawing/2014/main" id="{3CDA2ECB-1671-3745-42C6-213A778ECD29}"/>
               </a:ext>
             </a:extLst>
           </p:cNvPr>
@@ -6178,7 +5347,7 @@
     </p:spTree>
     <p:extLst>
       <p:ext uri="{BB962C8B-B14F-4D97-AF65-F5344CB8AC3E}">
-        <p14:creationId xmlns:p14="http://schemas.microsoft.com/office/powerpoint/2010/main" val="1786976587"/>
+        <p14:creationId xmlns:p14="http://schemas.microsoft.com/office/powerpoint/2010/main" val="1934289931"/>
       </p:ext>
     </p:extLst>
   </p:cSld>
@@ -6210,7 +5379,7 @@
           <p:cNvPr id="2" name="Titolo 1">
             <a:extLst>
               <a:ext uri="{FF2B5EF4-FFF2-40B4-BE49-F238E27FC236}">
-                <a16:creationId xmlns:a16="http://schemas.microsoft.com/office/drawing/2014/main" id="{E59A807A-FBE3-B66C-5E76-C14B95235667}"/>
+                <a16:creationId xmlns:a16="http://schemas.microsoft.com/office/drawing/2014/main" id="{69441F67-1949-8EC8-EB98-85670AC3670C}"/>
               </a:ext>
             </a:extLst>
           </p:cNvPr>
@@ -6223,14 +5392,15 @@
         </p:nvSpPr>
         <p:spPr/>
         <p:txBody>
-          <a:bodyPr/>
-          <a:lstStyle/>
-          <a:p>
-            <a:r>
-              <a:rPr lang="it-IT" dirty="0" err="1"/>
-              <a:t>Exec</a:t>
-            </a:r>
-            <a:endParaRPr lang="it-IT" dirty="0"/>
+          <a:bodyPr>
+            <a:normAutofit/>
+          </a:bodyPr>
+          <a:lstStyle/>
+          <a:p>
+            <a:r>
+              <a:rPr lang="it-IT" dirty="0"/>
+              <a:t>Scheduling: Implementazione</a:t>
+            </a:r>
           </a:p>
         </p:txBody>
       </p:sp>
@@ -6239,7 +5409,7 @@
           <p:cNvPr id="4" name="Segnaposto testo 3">
             <a:extLst>
               <a:ext uri="{FF2B5EF4-FFF2-40B4-BE49-F238E27FC236}">
-                <a16:creationId xmlns:a16="http://schemas.microsoft.com/office/drawing/2014/main" id="{5E5D57F9-0477-4F76-EB1F-30ADF530B627}"/>
+                <a16:creationId xmlns:a16="http://schemas.microsoft.com/office/drawing/2014/main" id="{3484543A-BB31-0207-182F-1F1C206F0C68}"/>
               </a:ext>
             </a:extLst>
           </p:cNvPr>
@@ -6264,10 +5434,10 @@
       </p:sp>
       <p:sp>
         <p:nvSpPr>
-          <p:cNvPr id="5" name="Segnaposto contenuto 4">
-            <a:extLst>
-              <a:ext uri="{FF2B5EF4-FFF2-40B4-BE49-F238E27FC236}">
-                <a16:creationId xmlns:a16="http://schemas.microsoft.com/office/drawing/2014/main" id="{163BE631-5171-41CB-1651-B8CBA56189FD}"/>
+          <p:cNvPr id="8" name="Segnaposto contenuto 7">
+            <a:extLst>
+              <a:ext uri="{FF2B5EF4-FFF2-40B4-BE49-F238E27FC236}">
+                <a16:creationId xmlns:a16="http://schemas.microsoft.com/office/drawing/2014/main" id="{A1E5DF89-94E7-98C4-F563-B3A43317A1CE}"/>
               </a:ext>
             </a:extLst>
           </p:cNvPr>
@@ -6289,10 +5459,10 @@
       </p:sp>
       <p:sp>
         <p:nvSpPr>
-          <p:cNvPr id="6" name="Segnaposto testo 5">
-            <a:extLst>
-              <a:ext uri="{FF2B5EF4-FFF2-40B4-BE49-F238E27FC236}">
-                <a16:creationId xmlns:a16="http://schemas.microsoft.com/office/drawing/2014/main" id="{6BB84A92-9DB7-C903-13D1-DA423998BE9E}"/>
+          <p:cNvPr id="9" name="Segnaposto testo 8">
+            <a:extLst>
+              <a:ext uri="{FF2B5EF4-FFF2-40B4-BE49-F238E27FC236}">
+                <a16:creationId xmlns:a16="http://schemas.microsoft.com/office/drawing/2014/main" id="{00842FCF-9A2A-27B3-4ED6-BB0713CE4444}"/>
               </a:ext>
             </a:extLst>
           </p:cNvPr>
@@ -6310,17 +5480,17 @@
           <a:p>
             <a:r>
               <a:rPr lang="it-IT" dirty="0"/>
-              <a:t>MINIX 3</a:t>
-            </a:r>
-          </a:p>
-        </p:txBody>
-      </p:sp>
-      <p:sp>
-        <p:nvSpPr>
-          <p:cNvPr id="7" name="Segnaposto contenuto 6">
-            <a:extLst>
-              <a:ext uri="{FF2B5EF4-FFF2-40B4-BE49-F238E27FC236}">
-                <a16:creationId xmlns:a16="http://schemas.microsoft.com/office/drawing/2014/main" id="{57618781-70D6-1FBC-40FF-8F829D20BC33}"/>
+              <a:t>PINTOS</a:t>
+            </a:r>
+          </a:p>
+        </p:txBody>
+      </p:sp>
+      <p:sp>
+        <p:nvSpPr>
+          <p:cNvPr id="10" name="Segnaposto contenuto 9">
+            <a:extLst>
+              <a:ext uri="{FF2B5EF4-FFF2-40B4-BE49-F238E27FC236}">
+                <a16:creationId xmlns:a16="http://schemas.microsoft.com/office/drawing/2014/main" id="{3CDA2ECB-1671-3745-42C6-213A778ECD29}"/>
               </a:ext>
             </a:extLst>
           </p:cNvPr>
@@ -6343,7 +5513,7 @@
     </p:spTree>
     <p:extLst>
       <p:ext uri="{BB962C8B-B14F-4D97-AF65-F5344CB8AC3E}">
-        <p14:creationId xmlns:p14="http://schemas.microsoft.com/office/powerpoint/2010/main" val="3107582510"/>
+        <p14:creationId xmlns:p14="http://schemas.microsoft.com/office/powerpoint/2010/main" val="2975043876"/>
       </p:ext>
     </p:extLst>
   </p:cSld>
@@ -6375,7 +5545,7 @@
           <p:cNvPr id="2" name="Titolo 1">
             <a:extLst>
               <a:ext uri="{FF2B5EF4-FFF2-40B4-BE49-F238E27FC236}">
-                <a16:creationId xmlns:a16="http://schemas.microsoft.com/office/drawing/2014/main" id="{E59A807A-FBE3-B66C-5E76-C14B95235667}"/>
+                <a16:creationId xmlns:a16="http://schemas.microsoft.com/office/drawing/2014/main" id="{69441F67-1949-8EC8-EB98-85670AC3670C}"/>
               </a:ext>
             </a:extLst>
           </p:cNvPr>
@@ -6388,12 +5558,14 @@
         </p:nvSpPr>
         <p:spPr/>
         <p:txBody>
-          <a:bodyPr/>
+          <a:bodyPr>
+            <a:normAutofit/>
+          </a:bodyPr>
           <a:lstStyle/>
           <a:p>
             <a:r>
               <a:rPr lang="it-IT" dirty="0"/>
-              <a:t>Kill</a:t>
+              <a:t>Scheduling: Gestione delle priorità</a:t>
             </a:r>
           </a:p>
         </p:txBody>
@@ -6403,7 +5575,7 @@
           <p:cNvPr id="4" name="Segnaposto testo 3">
             <a:extLst>
               <a:ext uri="{FF2B5EF4-FFF2-40B4-BE49-F238E27FC236}">
-                <a16:creationId xmlns:a16="http://schemas.microsoft.com/office/drawing/2014/main" id="{5E5D57F9-0477-4F76-EB1F-30ADF530B627}"/>
+                <a16:creationId xmlns:a16="http://schemas.microsoft.com/office/drawing/2014/main" id="{3484543A-BB31-0207-182F-1F1C206F0C68}"/>
               </a:ext>
             </a:extLst>
           </p:cNvPr>
@@ -6428,10 +5600,10 @@
       </p:sp>
       <p:sp>
         <p:nvSpPr>
-          <p:cNvPr id="5" name="Segnaposto contenuto 4">
-            <a:extLst>
-              <a:ext uri="{FF2B5EF4-FFF2-40B4-BE49-F238E27FC236}">
-                <a16:creationId xmlns:a16="http://schemas.microsoft.com/office/drawing/2014/main" id="{163BE631-5171-41CB-1651-B8CBA56189FD}"/>
+          <p:cNvPr id="8" name="Segnaposto contenuto 7">
+            <a:extLst>
+              <a:ext uri="{FF2B5EF4-FFF2-40B4-BE49-F238E27FC236}">
+                <a16:creationId xmlns:a16="http://schemas.microsoft.com/office/drawing/2014/main" id="{A1E5DF89-94E7-98C4-F563-B3A43317A1CE}"/>
               </a:ext>
             </a:extLst>
           </p:cNvPr>
@@ -6453,10 +5625,10 @@
       </p:sp>
       <p:sp>
         <p:nvSpPr>
-          <p:cNvPr id="6" name="Segnaposto testo 5">
-            <a:extLst>
-              <a:ext uri="{FF2B5EF4-FFF2-40B4-BE49-F238E27FC236}">
-                <a16:creationId xmlns:a16="http://schemas.microsoft.com/office/drawing/2014/main" id="{6BB84A92-9DB7-C903-13D1-DA423998BE9E}"/>
+          <p:cNvPr id="9" name="Segnaposto testo 8">
+            <a:extLst>
+              <a:ext uri="{FF2B5EF4-FFF2-40B4-BE49-F238E27FC236}">
+                <a16:creationId xmlns:a16="http://schemas.microsoft.com/office/drawing/2014/main" id="{00842FCF-9A2A-27B3-4ED6-BB0713CE4444}"/>
               </a:ext>
             </a:extLst>
           </p:cNvPr>
@@ -6474,17 +5646,17 @@
           <a:p>
             <a:r>
               <a:rPr lang="it-IT" dirty="0"/>
-              <a:t>MINIX 3</a:t>
-            </a:r>
-          </a:p>
-        </p:txBody>
-      </p:sp>
-      <p:sp>
-        <p:nvSpPr>
-          <p:cNvPr id="7" name="Segnaposto contenuto 6">
-            <a:extLst>
-              <a:ext uri="{FF2B5EF4-FFF2-40B4-BE49-F238E27FC236}">
-                <a16:creationId xmlns:a16="http://schemas.microsoft.com/office/drawing/2014/main" id="{57618781-70D6-1FBC-40FF-8F829D20BC33}"/>
+              <a:t>PINTOS</a:t>
+            </a:r>
+          </a:p>
+        </p:txBody>
+      </p:sp>
+      <p:sp>
+        <p:nvSpPr>
+          <p:cNvPr id="10" name="Segnaposto contenuto 9">
+            <a:extLst>
+              <a:ext uri="{FF2B5EF4-FFF2-40B4-BE49-F238E27FC236}">
+                <a16:creationId xmlns:a16="http://schemas.microsoft.com/office/drawing/2014/main" id="{3CDA2ECB-1671-3745-42C6-213A778ECD29}"/>
               </a:ext>
             </a:extLst>
           </p:cNvPr>
@@ -6507,7 +5679,7 @@
     </p:spTree>
     <p:extLst>
       <p:ext uri="{BB962C8B-B14F-4D97-AF65-F5344CB8AC3E}">
-        <p14:creationId xmlns:p14="http://schemas.microsoft.com/office/powerpoint/2010/main" val="472109040"/>
+        <p14:creationId xmlns:p14="http://schemas.microsoft.com/office/powerpoint/2010/main" val="1587832053"/>
       </p:ext>
     </p:extLst>
   </p:cSld>
@@ -6539,7 +5711,7 @@
           <p:cNvPr id="2" name="Titolo 1">
             <a:extLst>
               <a:ext uri="{FF2B5EF4-FFF2-40B4-BE49-F238E27FC236}">
-                <a16:creationId xmlns:a16="http://schemas.microsoft.com/office/drawing/2014/main" id="{E59A807A-FBE3-B66C-5E76-C14B95235667}"/>
+                <a16:creationId xmlns:a16="http://schemas.microsoft.com/office/drawing/2014/main" id="{69441F67-1949-8EC8-EB98-85670AC3670C}"/>
               </a:ext>
             </a:extLst>
           </p:cNvPr>
@@ -6552,14 +5724,15 @@
         </p:nvSpPr>
         <p:spPr/>
         <p:txBody>
-          <a:bodyPr/>
-          <a:lstStyle/>
-          <a:p>
-            <a:r>
-              <a:rPr lang="it-IT" dirty="0" err="1"/>
-              <a:t>Waitpid</a:t>
-            </a:r>
-            <a:endParaRPr lang="it-IT" dirty="0"/>
+          <a:bodyPr>
+            <a:normAutofit/>
+          </a:bodyPr>
+          <a:lstStyle/>
+          <a:p>
+            <a:r>
+              <a:rPr lang="it-IT" dirty="0"/>
+              <a:t>Scheduling: Gestione delle interruzioni</a:t>
+            </a:r>
           </a:p>
         </p:txBody>
       </p:sp>
@@ -6568,7 +5741,7 @@
           <p:cNvPr id="4" name="Segnaposto testo 3">
             <a:extLst>
               <a:ext uri="{FF2B5EF4-FFF2-40B4-BE49-F238E27FC236}">
-                <a16:creationId xmlns:a16="http://schemas.microsoft.com/office/drawing/2014/main" id="{5E5D57F9-0477-4F76-EB1F-30ADF530B627}"/>
+                <a16:creationId xmlns:a16="http://schemas.microsoft.com/office/drawing/2014/main" id="{3484543A-BB31-0207-182F-1F1C206F0C68}"/>
               </a:ext>
             </a:extLst>
           </p:cNvPr>
@@ -6593,10 +5766,10 @@
       </p:sp>
       <p:sp>
         <p:nvSpPr>
-          <p:cNvPr id="5" name="Segnaposto contenuto 4">
-            <a:extLst>
-              <a:ext uri="{FF2B5EF4-FFF2-40B4-BE49-F238E27FC236}">
-                <a16:creationId xmlns:a16="http://schemas.microsoft.com/office/drawing/2014/main" id="{163BE631-5171-41CB-1651-B8CBA56189FD}"/>
+          <p:cNvPr id="8" name="Segnaposto contenuto 7">
+            <a:extLst>
+              <a:ext uri="{FF2B5EF4-FFF2-40B4-BE49-F238E27FC236}">
+                <a16:creationId xmlns:a16="http://schemas.microsoft.com/office/drawing/2014/main" id="{A1E5DF89-94E7-98C4-F563-B3A43317A1CE}"/>
               </a:ext>
             </a:extLst>
           </p:cNvPr>
@@ -6618,10 +5791,10 @@
       </p:sp>
       <p:sp>
         <p:nvSpPr>
-          <p:cNvPr id="6" name="Segnaposto testo 5">
-            <a:extLst>
-              <a:ext uri="{FF2B5EF4-FFF2-40B4-BE49-F238E27FC236}">
-                <a16:creationId xmlns:a16="http://schemas.microsoft.com/office/drawing/2014/main" id="{6BB84A92-9DB7-C903-13D1-DA423998BE9E}"/>
+          <p:cNvPr id="9" name="Segnaposto testo 8">
+            <a:extLst>
+              <a:ext uri="{FF2B5EF4-FFF2-40B4-BE49-F238E27FC236}">
+                <a16:creationId xmlns:a16="http://schemas.microsoft.com/office/drawing/2014/main" id="{00842FCF-9A2A-27B3-4ED6-BB0713CE4444}"/>
               </a:ext>
             </a:extLst>
           </p:cNvPr>
@@ -6639,17 +5812,17 @@
           <a:p>
             <a:r>
               <a:rPr lang="it-IT" dirty="0"/>
-              <a:t>MINIX 3</a:t>
-            </a:r>
-          </a:p>
-        </p:txBody>
-      </p:sp>
-      <p:sp>
-        <p:nvSpPr>
-          <p:cNvPr id="7" name="Segnaposto contenuto 6">
-            <a:extLst>
-              <a:ext uri="{FF2B5EF4-FFF2-40B4-BE49-F238E27FC236}">
-                <a16:creationId xmlns:a16="http://schemas.microsoft.com/office/drawing/2014/main" id="{57618781-70D6-1FBC-40FF-8F829D20BC33}"/>
+              <a:t>PINTOS</a:t>
+            </a:r>
+          </a:p>
+        </p:txBody>
+      </p:sp>
+      <p:sp>
+        <p:nvSpPr>
+          <p:cNvPr id="10" name="Segnaposto contenuto 9">
+            <a:extLst>
+              <a:ext uri="{FF2B5EF4-FFF2-40B4-BE49-F238E27FC236}">
+                <a16:creationId xmlns:a16="http://schemas.microsoft.com/office/drawing/2014/main" id="{3CDA2ECB-1671-3745-42C6-213A778ECD29}"/>
               </a:ext>
             </a:extLst>
           </p:cNvPr>
@@ -6672,7 +5845,7 @@
     </p:spTree>
     <p:extLst>
       <p:ext uri="{BB962C8B-B14F-4D97-AF65-F5344CB8AC3E}">
-        <p14:creationId xmlns:p14="http://schemas.microsoft.com/office/powerpoint/2010/main" val="830413120"/>
+        <p14:creationId xmlns:p14="http://schemas.microsoft.com/office/powerpoint/2010/main" val="1764962512"/>
       </p:ext>
     </p:extLst>
   </p:cSld>

</xml_diff>

<commit_message>
fixed .md file (added missing part about process.h) and updated pptx file
</commit_message>
<xml_diff>
--- a/Progetto_SO.pptx
+++ b/Progetto_SO.pptx
@@ -2,7 +2,7 @@
 <file path=ppt/presentation.xml><?xml version="1.0" encoding="utf-8"?>
 <p:presentation xmlns:a="http://schemas.openxmlformats.org/drawingml/2006/main" xmlns:r="http://schemas.openxmlformats.org/officeDocument/2006/relationships" xmlns:p="http://schemas.openxmlformats.org/presentationml/2006/main" saveSubsetFonts="1">
   <p:sldMasterIdLst>
-    <p:sldMasterId id="2147483648" r:id="rId1"/>
+    <p:sldMasterId id="2147483684" r:id="rId1"/>
   </p:sldMasterIdLst>
   <p:sldIdLst>
     <p:sldId id="256" r:id="rId2"/>
@@ -27,9 +27,9 @@
   <p:notesSz cx="6858000" cy="9144000"/>
   <p:defaultTextStyle>
     <a:defPPr>
-      <a:defRPr lang="it-IT"/>
+      <a:defRPr lang="en-US"/>
     </a:defPPr>
-    <a:lvl1pPr marL="0" algn="l" defTabSz="914400" rtl="0" eaLnBrk="1" latinLnBrk="0" hangingPunct="1">
+    <a:lvl1pPr marL="0" algn="l" defTabSz="457200" rtl="0" eaLnBrk="1" latinLnBrk="0" hangingPunct="1">
       <a:defRPr sz="1800" kern="1200">
         <a:solidFill>
           <a:schemeClr val="tx1"/>
@@ -39,7 +39,7 @@
         <a:cs typeface="+mn-cs"/>
       </a:defRPr>
     </a:lvl1pPr>
-    <a:lvl2pPr marL="457200" algn="l" defTabSz="914400" rtl="0" eaLnBrk="1" latinLnBrk="0" hangingPunct="1">
+    <a:lvl2pPr marL="457200" algn="l" defTabSz="457200" rtl="0" eaLnBrk="1" latinLnBrk="0" hangingPunct="1">
       <a:defRPr sz="1800" kern="1200">
         <a:solidFill>
           <a:schemeClr val="tx1"/>
@@ -49,7 +49,7 @@
         <a:cs typeface="+mn-cs"/>
       </a:defRPr>
     </a:lvl2pPr>
-    <a:lvl3pPr marL="914400" algn="l" defTabSz="914400" rtl="0" eaLnBrk="1" latinLnBrk="0" hangingPunct="1">
+    <a:lvl3pPr marL="914400" algn="l" defTabSz="457200" rtl="0" eaLnBrk="1" latinLnBrk="0" hangingPunct="1">
       <a:defRPr sz="1800" kern="1200">
         <a:solidFill>
           <a:schemeClr val="tx1"/>
@@ -59,7 +59,7 @@
         <a:cs typeface="+mn-cs"/>
       </a:defRPr>
     </a:lvl3pPr>
-    <a:lvl4pPr marL="1371600" algn="l" defTabSz="914400" rtl="0" eaLnBrk="1" latinLnBrk="0" hangingPunct="1">
+    <a:lvl4pPr marL="1371600" algn="l" defTabSz="457200" rtl="0" eaLnBrk="1" latinLnBrk="0" hangingPunct="1">
       <a:defRPr sz="1800" kern="1200">
         <a:solidFill>
           <a:schemeClr val="tx1"/>
@@ -69,7 +69,7 @@
         <a:cs typeface="+mn-cs"/>
       </a:defRPr>
     </a:lvl4pPr>
-    <a:lvl5pPr marL="1828800" algn="l" defTabSz="914400" rtl="0" eaLnBrk="1" latinLnBrk="0" hangingPunct="1">
+    <a:lvl5pPr marL="1828800" algn="l" defTabSz="457200" rtl="0" eaLnBrk="1" latinLnBrk="0" hangingPunct="1">
       <a:defRPr sz="1800" kern="1200">
         <a:solidFill>
           <a:schemeClr val="tx1"/>
@@ -79,7 +79,7 @@
         <a:cs typeface="+mn-cs"/>
       </a:defRPr>
     </a:lvl5pPr>
-    <a:lvl6pPr marL="2286000" algn="l" defTabSz="914400" rtl="0" eaLnBrk="1" latinLnBrk="0" hangingPunct="1">
+    <a:lvl6pPr marL="2286000" algn="l" defTabSz="457200" rtl="0" eaLnBrk="1" latinLnBrk="0" hangingPunct="1">
       <a:defRPr sz="1800" kern="1200">
         <a:solidFill>
           <a:schemeClr val="tx1"/>
@@ -89,7 +89,7 @@
         <a:cs typeface="+mn-cs"/>
       </a:defRPr>
     </a:lvl6pPr>
-    <a:lvl7pPr marL="2743200" algn="l" defTabSz="914400" rtl="0" eaLnBrk="1" latinLnBrk="0" hangingPunct="1">
+    <a:lvl7pPr marL="2743200" algn="l" defTabSz="457200" rtl="0" eaLnBrk="1" latinLnBrk="0" hangingPunct="1">
       <a:defRPr sz="1800" kern="1200">
         <a:solidFill>
           <a:schemeClr val="tx1"/>
@@ -99,7 +99,7 @@
         <a:cs typeface="+mn-cs"/>
       </a:defRPr>
     </a:lvl7pPr>
-    <a:lvl8pPr marL="3200400" algn="l" defTabSz="914400" rtl="0" eaLnBrk="1" latinLnBrk="0" hangingPunct="1">
+    <a:lvl8pPr marL="3200400" algn="l" defTabSz="457200" rtl="0" eaLnBrk="1" latinLnBrk="0" hangingPunct="1">
       <a:defRPr sz="1800" kern="1200">
         <a:solidFill>
           <a:schemeClr val="tx1"/>
@@ -109,7 +109,7 @@
         <a:cs typeface="+mn-cs"/>
       </a:defRPr>
     </a:lvl8pPr>
-    <a:lvl9pPr marL="3657600" algn="l" defTabSz="914400" rtl="0" eaLnBrk="1" latinLnBrk="0" hangingPunct="1">
+    <a:lvl9pPr marL="3657600" algn="l" defTabSz="457200" rtl="0" eaLnBrk="1" latinLnBrk="0" hangingPunct="1">
       <a:defRPr sz="1800" kern="1200">
         <a:solidFill>
           <a:schemeClr val="tx1"/>
@@ -147,101 +147,188 @@
       </p:grpSpPr>
       <p:sp>
         <p:nvSpPr>
-          <p:cNvPr id="2" name="Titolo 1">
-            <a:extLst>
-              <a:ext uri="{FF2B5EF4-FFF2-40B4-BE49-F238E27FC236}">
-                <a16:creationId xmlns:a16="http://schemas.microsoft.com/office/drawing/2014/main" id="{AE3F0C36-A7F2-AB5E-2B84-F626C9063612}"/>
-              </a:ext>
-            </a:extLst>
-          </p:cNvPr>
-          <p:cNvSpPr>
-            <a:spLocks noGrp="1"/>
-          </p:cNvSpPr>
-          <p:nvPr>
-            <p:ph type="ctrTitle"/>
-          </p:nvPr>
+          <p:cNvPr id="7" name="Rectangle 6"/>
+          <p:cNvSpPr/>
+          <p:nvPr/>
         </p:nvSpPr>
         <p:spPr>
           <a:xfrm>
-            <a:off x="1524000" y="1122363"/>
-            <a:ext cx="9144000" cy="2387600"/>
+            <a:off x="446534" y="3085765"/>
+            <a:ext cx="11262866" cy="3304800"/>
+          </a:xfrm>
+          <a:prstGeom prst="rect">
+            <a:avLst/>
+          </a:prstGeom>
+          <a:solidFill>
+            <a:schemeClr val="accent1"/>
+          </a:solidFill>
+          <a:ln>
+            <a:noFill/>
+          </a:ln>
+          <a:effectLst/>
+        </p:spPr>
+        <p:style>
+          <a:lnRef idx="1">
+            <a:schemeClr val="accent1"/>
+          </a:lnRef>
+          <a:fillRef idx="3">
+            <a:schemeClr val="accent1"/>
+          </a:fillRef>
+          <a:effectRef idx="2">
+            <a:schemeClr val="accent1"/>
+          </a:effectRef>
+          <a:fontRef idx="minor">
+            <a:schemeClr val="lt1"/>
+          </a:fontRef>
+        </p:style>
+      </p:sp>
+      <p:sp>
+        <p:nvSpPr>
+          <p:cNvPr id="2" name="Title 1"/>
+          <p:cNvSpPr>
+            <a:spLocks noGrp="1"/>
+          </p:cNvSpPr>
+          <p:nvPr>
+            <p:ph type="ctrTitle"/>
+          </p:nvPr>
+        </p:nvSpPr>
+        <p:spPr>
+          <a:xfrm>
+            <a:off x="581191" y="1020431"/>
+            <a:ext cx="10993549" cy="1475013"/>
+          </a:xfrm>
+          <a:effectLst/>
+        </p:spPr>
+        <p:txBody>
+          <a:bodyPr anchor="b">
+            <a:normAutofit/>
+          </a:bodyPr>
+          <a:lstStyle>
+            <a:lvl1pPr>
+              <a:defRPr sz="3600">
+                <a:solidFill>
+                  <a:schemeClr val="accent1"/>
+                </a:solidFill>
+              </a:defRPr>
+            </a:lvl1pPr>
+          </a:lstStyle>
+          <a:p>
+            <a:r>
+              <a:rPr lang="it-IT"/>
+              <a:t>Fare clic per modificare lo stile del titolo dello schema</a:t>
+            </a:r>
+            <a:endParaRPr lang="en-US" dirty="0"/>
+          </a:p>
+        </p:txBody>
+      </p:sp>
+      <p:sp>
+        <p:nvSpPr>
+          <p:cNvPr id="3" name="Subtitle 2"/>
+          <p:cNvSpPr>
+            <a:spLocks noGrp="1"/>
+          </p:cNvSpPr>
+          <p:nvPr>
+            <p:ph type="subTitle" idx="1"/>
+          </p:nvPr>
+        </p:nvSpPr>
+        <p:spPr>
+          <a:xfrm>
+            <a:off x="581194" y="2495445"/>
+            <a:ext cx="10993546" cy="590321"/>
           </a:xfrm>
         </p:spPr>
         <p:txBody>
-          <a:bodyPr anchor="b"/>
+          <a:bodyPr anchor="t">
+            <a:normAutofit/>
+          </a:bodyPr>
           <a:lstStyle>
-            <a:lvl1pPr algn="ctr">
-              <a:defRPr sz="6000"/>
-            </a:lvl1pPr>
-          </a:lstStyle>
-          <a:p>
-            <a:r>
-              <a:rPr lang="it-IT"/>
-              <a:t>Fare clic per modificare lo stile del titolo dello schema</a:t>
-            </a:r>
-          </a:p>
-        </p:txBody>
-      </p:sp>
-      <p:sp>
-        <p:nvSpPr>
-          <p:cNvPr id="3" name="Sottotitolo 2">
-            <a:extLst>
-              <a:ext uri="{FF2B5EF4-FFF2-40B4-BE49-F238E27FC236}">
-                <a16:creationId xmlns:a16="http://schemas.microsoft.com/office/drawing/2014/main" id="{72672828-6E79-FC45-8E4F-EC0DF88C160D}"/>
-              </a:ext>
-            </a:extLst>
-          </p:cNvPr>
-          <p:cNvSpPr>
-            <a:spLocks noGrp="1"/>
-          </p:cNvSpPr>
-          <p:nvPr>
-            <p:ph type="subTitle" idx="1"/>
-          </p:nvPr>
-        </p:nvSpPr>
-        <p:spPr>
-          <a:xfrm>
-            <a:off x="1524000" y="3602038"/>
-            <a:ext cx="9144000" cy="1655762"/>
-          </a:xfrm>
-        </p:spPr>
-        <p:txBody>
-          <a:bodyPr/>
-          <a:lstStyle>
-            <a:lvl1pPr marL="0" indent="0" algn="ctr">
+            <a:lvl1pPr marL="0" indent="0" algn="l">
               <a:buNone/>
-              <a:defRPr sz="2400"/>
+              <a:defRPr sz="1600" cap="all">
+                <a:solidFill>
+                  <a:schemeClr val="accent2"/>
+                </a:solidFill>
+              </a:defRPr>
             </a:lvl1pPr>
             <a:lvl2pPr marL="457200" indent="0" algn="ctr">
               <a:buNone/>
-              <a:defRPr sz="2000"/>
+              <a:defRPr>
+                <a:solidFill>
+                  <a:schemeClr val="tx1">
+                    <a:tint val="75000"/>
+                  </a:schemeClr>
+                </a:solidFill>
+              </a:defRPr>
             </a:lvl2pPr>
             <a:lvl3pPr marL="914400" indent="0" algn="ctr">
               <a:buNone/>
-              <a:defRPr sz="1800"/>
+              <a:defRPr>
+                <a:solidFill>
+                  <a:schemeClr val="tx1">
+                    <a:tint val="75000"/>
+                  </a:schemeClr>
+                </a:solidFill>
+              </a:defRPr>
             </a:lvl3pPr>
             <a:lvl4pPr marL="1371600" indent="0" algn="ctr">
               <a:buNone/>
-              <a:defRPr sz="1600"/>
+              <a:defRPr>
+                <a:solidFill>
+                  <a:schemeClr val="tx1">
+                    <a:tint val="75000"/>
+                  </a:schemeClr>
+                </a:solidFill>
+              </a:defRPr>
             </a:lvl4pPr>
             <a:lvl5pPr marL="1828800" indent="0" algn="ctr">
               <a:buNone/>
-              <a:defRPr sz="1600"/>
+              <a:defRPr>
+                <a:solidFill>
+                  <a:schemeClr val="tx1">
+                    <a:tint val="75000"/>
+                  </a:schemeClr>
+                </a:solidFill>
+              </a:defRPr>
             </a:lvl5pPr>
             <a:lvl6pPr marL="2286000" indent="0" algn="ctr">
               <a:buNone/>
-              <a:defRPr sz="1600"/>
+              <a:defRPr>
+                <a:solidFill>
+                  <a:schemeClr val="tx1">
+                    <a:tint val="75000"/>
+                  </a:schemeClr>
+                </a:solidFill>
+              </a:defRPr>
             </a:lvl6pPr>
             <a:lvl7pPr marL="2743200" indent="0" algn="ctr">
               <a:buNone/>
-              <a:defRPr sz="1600"/>
+              <a:defRPr>
+                <a:solidFill>
+                  <a:schemeClr val="tx1">
+                    <a:tint val="75000"/>
+                  </a:schemeClr>
+                </a:solidFill>
+              </a:defRPr>
             </a:lvl7pPr>
             <a:lvl8pPr marL="3200400" indent="0" algn="ctr">
               <a:buNone/>
-              <a:defRPr sz="1600"/>
+              <a:defRPr>
+                <a:solidFill>
+                  <a:schemeClr val="tx1">
+                    <a:tint val="75000"/>
+                  </a:schemeClr>
+                </a:solidFill>
+              </a:defRPr>
             </a:lvl8pPr>
             <a:lvl9pPr marL="3657600" indent="0" algn="ctr">
               <a:buNone/>
-              <a:defRPr sz="1600"/>
+              <a:defRPr>
+                <a:solidFill>
+                  <a:schemeClr val="tx1">
+                    <a:tint val="75000"/>
+                  </a:schemeClr>
+                </a:solidFill>
+              </a:defRPr>
             </a:lvl9pPr>
           </a:lstStyle>
           <a:p>
@@ -249,18 +336,13 @@
               <a:rPr lang="it-IT"/>
               <a:t>Fare clic per modificare lo stile del sottotitolo dello schema</a:t>
             </a:r>
-          </a:p>
-        </p:txBody>
-      </p:sp>
-      <p:sp>
-        <p:nvSpPr>
-          <p:cNvPr id="4" name="Segnaposto data 3">
-            <a:extLst>
-              <a:ext uri="{FF2B5EF4-FFF2-40B4-BE49-F238E27FC236}">
-                <a16:creationId xmlns:a16="http://schemas.microsoft.com/office/drawing/2014/main" id="{8D7877E0-CEEA-3D4D-FCB5-F0B53A6FDBC3}"/>
-              </a:ext>
-            </a:extLst>
-          </p:cNvPr>
+            <a:endParaRPr lang="en-US" dirty="0"/>
+          </a:p>
+        </p:txBody>
+      </p:sp>
+      <p:sp>
+        <p:nvSpPr>
+          <p:cNvPr id="4" name="Date Placeholder 3"/>
           <p:cNvSpPr>
             <a:spLocks noGrp="1"/>
           </p:cNvSpPr>
@@ -268,14 +350,30 @@
             <p:ph type="dt" sz="half" idx="10"/>
           </p:nvPr>
         </p:nvSpPr>
-        <p:spPr/>
-        <p:txBody>
-          <a:bodyPr/>
-          <a:lstStyle/>
+        <p:spPr>
+          <a:xfrm>
+            <a:off x="7605951" y="5956137"/>
+            <a:ext cx="2844800" cy="365125"/>
+          </a:xfrm>
+        </p:spPr>
+        <p:txBody>
+          <a:bodyPr/>
+          <a:lstStyle>
+            <a:lvl1pPr>
+              <a:defRPr>
+                <a:solidFill>
+                  <a:schemeClr val="accent1">
+                    <a:lumMod val="75000"/>
+                    <a:lumOff val="25000"/>
+                  </a:schemeClr>
+                </a:solidFill>
+              </a:defRPr>
+            </a:lvl1pPr>
+          </a:lstStyle>
           <a:p>
             <a:fld id="{F259A98E-7D3E-4BAE-A284-2CE0D83E33BF}" type="datetimeFigureOut">
               <a:rPr lang="it-IT" smtClean="0"/>
-              <a:t>02/11/2023</a:t>
+              <a:t>09/12/2023</a:t>
             </a:fld>
             <a:endParaRPr lang="it-IT"/>
           </a:p>
@@ -283,13 +381,7 @@
       </p:sp>
       <p:sp>
         <p:nvSpPr>
-          <p:cNvPr id="5" name="Segnaposto piè di pagina 4">
-            <a:extLst>
-              <a:ext uri="{FF2B5EF4-FFF2-40B4-BE49-F238E27FC236}">
-                <a16:creationId xmlns:a16="http://schemas.microsoft.com/office/drawing/2014/main" id="{456C2B36-4747-989C-A3D0-60B797A698BA}"/>
-              </a:ext>
-            </a:extLst>
-          </p:cNvPr>
+          <p:cNvPr id="5" name="Footer Placeholder 4"/>
           <p:cNvSpPr>
             <a:spLocks noGrp="1"/>
           </p:cNvSpPr>
@@ -297,10 +389,26 @@
             <p:ph type="ftr" sz="quarter" idx="11"/>
           </p:nvPr>
         </p:nvSpPr>
-        <p:spPr/>
-        <p:txBody>
-          <a:bodyPr/>
-          <a:lstStyle/>
+        <p:spPr>
+          <a:xfrm>
+            <a:off x="581192" y="5951811"/>
+            <a:ext cx="6917210" cy="365125"/>
+          </a:xfrm>
+        </p:spPr>
+        <p:txBody>
+          <a:bodyPr/>
+          <a:lstStyle>
+            <a:lvl1pPr>
+              <a:defRPr>
+                <a:solidFill>
+                  <a:schemeClr val="accent1">
+                    <a:lumMod val="75000"/>
+                    <a:lumOff val="25000"/>
+                  </a:schemeClr>
+                </a:solidFill>
+              </a:defRPr>
+            </a:lvl1pPr>
+          </a:lstStyle>
           <a:p>
             <a:endParaRPr lang="it-IT"/>
           </a:p>
@@ -308,13 +416,7 @@
       </p:sp>
       <p:sp>
         <p:nvSpPr>
-          <p:cNvPr id="6" name="Segnaposto numero diapositiva 5">
-            <a:extLst>
-              <a:ext uri="{FF2B5EF4-FFF2-40B4-BE49-F238E27FC236}">
-                <a16:creationId xmlns:a16="http://schemas.microsoft.com/office/drawing/2014/main" id="{2A97095E-E635-945D-2775-A69D4B2C8709}"/>
-              </a:ext>
-            </a:extLst>
-          </p:cNvPr>
+          <p:cNvPr id="6" name="Slide Number Placeholder 5"/>
           <p:cNvSpPr>
             <a:spLocks noGrp="1"/>
           </p:cNvSpPr>
@@ -322,10 +424,26 @@
             <p:ph type="sldNum" sz="quarter" idx="12"/>
           </p:nvPr>
         </p:nvSpPr>
-        <p:spPr/>
-        <p:txBody>
-          <a:bodyPr/>
-          <a:lstStyle/>
+        <p:spPr>
+          <a:xfrm>
+            <a:off x="10558300" y="5956137"/>
+            <a:ext cx="1016440" cy="365125"/>
+          </a:xfrm>
+        </p:spPr>
+        <p:txBody>
+          <a:bodyPr/>
+          <a:lstStyle>
+            <a:lvl1pPr>
+              <a:defRPr>
+                <a:solidFill>
+                  <a:schemeClr val="accent1">
+                    <a:lumMod val="75000"/>
+                    <a:lumOff val="25000"/>
+                  </a:schemeClr>
+                </a:solidFill>
+              </a:defRPr>
+            </a:lvl1pPr>
+          </a:lstStyle>
           <a:p>
             <a:fld id="{FD8D997C-7E66-44D2-B54E-C5D091DF0A81}" type="slidenum">
               <a:rPr lang="it-IT" smtClean="0"/>
@@ -338,7 +456,7 @@
     </p:spTree>
     <p:extLst>
       <p:ext uri="{BB962C8B-B14F-4D97-AF65-F5344CB8AC3E}">
-        <p14:creationId xmlns:p14="http://schemas.microsoft.com/office/powerpoint/2010/main" val="1028901351"/>
+        <p14:creationId xmlns:p14="http://schemas.microsoft.com/office/powerpoint/2010/main" val="1871839915"/>
       </p:ext>
     </p:extLst>
   </p:cSld>
@@ -367,13 +485,46 @@
       </p:grpSpPr>
       <p:sp>
         <p:nvSpPr>
-          <p:cNvPr id="2" name="Titolo 1">
-            <a:extLst>
-              <a:ext uri="{FF2B5EF4-FFF2-40B4-BE49-F238E27FC236}">
-                <a16:creationId xmlns:a16="http://schemas.microsoft.com/office/drawing/2014/main" id="{43401D5F-69EA-1D27-8740-2629834B1365}"/>
-              </a:ext>
-            </a:extLst>
-          </p:cNvPr>
+          <p:cNvPr id="8" name="Rectangle 7"/>
+          <p:cNvSpPr>
+            <a:spLocks noChangeAspect="1"/>
+          </p:cNvSpPr>
+          <p:nvPr/>
+        </p:nvSpPr>
+        <p:spPr>
+          <a:xfrm>
+            <a:off x="440286" y="614407"/>
+            <a:ext cx="11309338" cy="1189298"/>
+          </a:xfrm>
+          <a:prstGeom prst="rect">
+            <a:avLst/>
+          </a:prstGeom>
+          <a:solidFill>
+            <a:schemeClr val="accent1"/>
+          </a:solidFill>
+          <a:ln>
+            <a:noFill/>
+          </a:ln>
+          <a:effectLst/>
+        </p:spPr>
+        <p:style>
+          <a:lnRef idx="1">
+            <a:schemeClr val="accent1"/>
+          </a:lnRef>
+          <a:fillRef idx="3">
+            <a:schemeClr val="accent1"/>
+          </a:fillRef>
+          <a:effectRef idx="2">
+            <a:schemeClr val="accent1"/>
+          </a:effectRef>
+          <a:fontRef idx="minor">
+            <a:schemeClr val="lt1"/>
+          </a:fontRef>
+        </p:style>
+      </p:sp>
+      <p:sp>
+        <p:nvSpPr>
+          <p:cNvPr id="9" name="Title 1"/>
           <p:cNvSpPr>
             <a:spLocks noGrp="1"/>
           </p:cNvSpPr>
@@ -381,7 +532,12 @@
             <p:ph type="title"/>
           </p:nvPr>
         </p:nvSpPr>
-        <p:spPr/>
+        <p:spPr>
+          <a:xfrm>
+            <a:off x="581192" y="702156"/>
+            <a:ext cx="11029616" cy="1013800"/>
+          </a:xfrm>
+        </p:spPr>
         <p:txBody>
           <a:bodyPr/>
           <a:lstStyle/>
@@ -390,18 +546,13 @@
               <a:rPr lang="it-IT"/>
               <a:t>Fare clic per modificare lo stile del titolo dello schema</a:t>
             </a:r>
-          </a:p>
-        </p:txBody>
-      </p:sp>
-      <p:sp>
-        <p:nvSpPr>
-          <p:cNvPr id="3" name="Segnaposto testo verticale 2">
-            <a:extLst>
-              <a:ext uri="{FF2B5EF4-FFF2-40B4-BE49-F238E27FC236}">
-                <a16:creationId xmlns:a16="http://schemas.microsoft.com/office/drawing/2014/main" id="{5DDD5D48-0B39-39C1-90C1-8433D39FAACA}"/>
-              </a:ext>
-            </a:extLst>
-          </p:cNvPr>
+            <a:endParaRPr lang="en-US" dirty="0"/>
+          </a:p>
+        </p:txBody>
+      </p:sp>
+      <p:sp>
+        <p:nvSpPr>
+          <p:cNvPr id="3" name="Vertical Text Placeholder 2"/>
           <p:cNvSpPr>
             <a:spLocks noGrp="1"/>
           </p:cNvSpPr>
@@ -411,8 +562,24 @@
         </p:nvSpPr>
         <p:spPr/>
         <p:txBody>
-          <a:bodyPr vert="eaVert"/>
-          <a:lstStyle/>
+          <a:bodyPr vert="eaVert" anchor="t"/>
+          <a:lstStyle>
+            <a:lvl1pPr algn="l">
+              <a:defRPr/>
+            </a:lvl1pPr>
+            <a:lvl2pPr algn="l">
+              <a:defRPr/>
+            </a:lvl2pPr>
+            <a:lvl3pPr algn="l">
+              <a:defRPr/>
+            </a:lvl3pPr>
+            <a:lvl4pPr algn="l">
+              <a:defRPr/>
+            </a:lvl4pPr>
+            <a:lvl5pPr algn="l">
+              <a:defRPr/>
+            </a:lvl5pPr>
+          </a:lstStyle>
           <a:p>
             <a:pPr lvl="0"/>
             <a:r>
@@ -447,18 +614,13 @@
               <a:rPr lang="it-IT"/>
               <a:t>Quinto livello</a:t>
             </a:r>
-          </a:p>
-        </p:txBody>
-      </p:sp>
-      <p:sp>
-        <p:nvSpPr>
-          <p:cNvPr id="4" name="Segnaposto data 3">
-            <a:extLst>
-              <a:ext uri="{FF2B5EF4-FFF2-40B4-BE49-F238E27FC236}">
-                <a16:creationId xmlns:a16="http://schemas.microsoft.com/office/drawing/2014/main" id="{0B850FDC-ECCC-8FC7-C12D-03550078C3A4}"/>
-              </a:ext>
-            </a:extLst>
-          </p:cNvPr>
+            <a:endParaRPr lang="en-US" dirty="0"/>
+          </a:p>
+        </p:txBody>
+      </p:sp>
+      <p:sp>
+        <p:nvSpPr>
+          <p:cNvPr id="4" name="Date Placeholder 3"/>
           <p:cNvSpPr>
             <a:spLocks noGrp="1"/>
           </p:cNvSpPr>
@@ -473,7 +635,7 @@
           <a:p>
             <a:fld id="{F259A98E-7D3E-4BAE-A284-2CE0D83E33BF}" type="datetimeFigureOut">
               <a:rPr lang="it-IT" smtClean="0"/>
-              <a:t>02/11/2023</a:t>
+              <a:t>09/12/2023</a:t>
             </a:fld>
             <a:endParaRPr lang="it-IT"/>
           </a:p>
@@ -481,13 +643,7 @@
       </p:sp>
       <p:sp>
         <p:nvSpPr>
-          <p:cNvPr id="5" name="Segnaposto piè di pagina 4">
-            <a:extLst>
-              <a:ext uri="{FF2B5EF4-FFF2-40B4-BE49-F238E27FC236}">
-                <a16:creationId xmlns:a16="http://schemas.microsoft.com/office/drawing/2014/main" id="{30981FFA-B7A2-BD05-4DC3-4BF2E0DE8F84}"/>
-              </a:ext>
-            </a:extLst>
-          </p:cNvPr>
+          <p:cNvPr id="5" name="Footer Placeholder 4"/>
           <p:cNvSpPr>
             <a:spLocks noGrp="1"/>
           </p:cNvSpPr>
@@ -506,13 +662,7 @@
       </p:sp>
       <p:sp>
         <p:nvSpPr>
-          <p:cNvPr id="6" name="Segnaposto numero diapositiva 5">
-            <a:extLst>
-              <a:ext uri="{FF2B5EF4-FFF2-40B4-BE49-F238E27FC236}">
-                <a16:creationId xmlns:a16="http://schemas.microsoft.com/office/drawing/2014/main" id="{A9341705-8FB4-6916-C3B5-FEF9A2964E2A}"/>
-              </a:ext>
-            </a:extLst>
-          </p:cNvPr>
+          <p:cNvPr id="6" name="Slide Number Placeholder 5"/>
           <p:cNvSpPr>
             <a:spLocks noGrp="1"/>
           </p:cNvSpPr>
@@ -536,7 +686,7 @@
     </p:spTree>
     <p:extLst>
       <p:ext uri="{BB962C8B-B14F-4D97-AF65-F5344CB8AC3E}">
-        <p14:creationId xmlns:p14="http://schemas.microsoft.com/office/powerpoint/2010/main" val="778523847"/>
+        <p14:creationId xmlns:p14="http://schemas.microsoft.com/office/powerpoint/2010/main" val="3731309586"/>
       </p:ext>
     </p:extLst>
   </p:cSld>
@@ -565,24 +715,57 @@
       </p:grpSpPr>
       <p:sp>
         <p:nvSpPr>
-          <p:cNvPr id="2" name="Titolo verticale 1">
-            <a:extLst>
-              <a:ext uri="{FF2B5EF4-FFF2-40B4-BE49-F238E27FC236}">
-                <a16:creationId xmlns:a16="http://schemas.microsoft.com/office/drawing/2014/main" id="{3B265CED-E3AB-092B-FEA1-FB96B40409BD}"/>
-              </a:ext>
-            </a:extLst>
-          </p:cNvPr>
-          <p:cNvSpPr>
-            <a:spLocks noGrp="1"/>
-          </p:cNvSpPr>
-          <p:nvPr>
-            <p:ph type="title" orient="vert"/>
-          </p:nvPr>
+          <p:cNvPr id="7" name="Rectangle 6"/>
+          <p:cNvSpPr>
+            <a:spLocks noChangeAspect="1"/>
+          </p:cNvSpPr>
+          <p:nvPr/>
         </p:nvSpPr>
         <p:spPr>
           <a:xfrm>
-            <a:off x="8724900" y="365125"/>
-            <a:ext cx="2628900" cy="5811838"/>
+            <a:off x="8839201" y="599725"/>
+            <a:ext cx="2906817" cy="5816950"/>
+          </a:xfrm>
+          <a:prstGeom prst="rect">
+            <a:avLst/>
+          </a:prstGeom>
+          <a:solidFill>
+            <a:schemeClr val="accent1"/>
+          </a:solidFill>
+          <a:ln>
+            <a:noFill/>
+          </a:ln>
+          <a:effectLst/>
+        </p:spPr>
+        <p:style>
+          <a:lnRef idx="1">
+            <a:schemeClr val="accent1"/>
+          </a:lnRef>
+          <a:fillRef idx="3">
+            <a:schemeClr val="accent1"/>
+          </a:fillRef>
+          <a:effectRef idx="2">
+            <a:schemeClr val="accent1"/>
+          </a:effectRef>
+          <a:fontRef idx="minor">
+            <a:schemeClr val="lt1"/>
+          </a:fontRef>
+        </p:style>
+      </p:sp>
+      <p:sp>
+        <p:nvSpPr>
+          <p:cNvPr id="2" name="Vertical Title 1"/>
+          <p:cNvSpPr>
+            <a:spLocks noGrp="1"/>
+          </p:cNvSpPr>
+          <p:nvPr>
+            <p:ph type="title" orient="vert"/>
+          </p:nvPr>
+        </p:nvSpPr>
+        <p:spPr>
+          <a:xfrm>
+            <a:off x="8839201" y="675726"/>
+            <a:ext cx="2004164" cy="5183073"/>
           </a:xfrm>
         </p:spPr>
         <p:txBody>
@@ -593,18 +776,13 @@
               <a:rPr lang="it-IT"/>
               <a:t>Fare clic per modificare lo stile del titolo dello schema</a:t>
             </a:r>
-          </a:p>
-        </p:txBody>
-      </p:sp>
-      <p:sp>
-        <p:nvSpPr>
-          <p:cNvPr id="3" name="Segnaposto testo verticale 2">
-            <a:extLst>
-              <a:ext uri="{FF2B5EF4-FFF2-40B4-BE49-F238E27FC236}">
-                <a16:creationId xmlns:a16="http://schemas.microsoft.com/office/drawing/2014/main" id="{A0328049-8A4B-1138-4715-2381C493D1EB}"/>
-              </a:ext>
-            </a:extLst>
-          </p:cNvPr>
+            <a:endParaRPr lang="en-US" dirty="0"/>
+          </a:p>
+        </p:txBody>
+      </p:sp>
+      <p:sp>
+        <p:nvSpPr>
+          <p:cNvPr id="3" name="Vertical Text Placeholder 2"/>
           <p:cNvSpPr>
             <a:spLocks noGrp="1"/>
           </p:cNvSpPr>
@@ -614,12 +792,12 @@
         </p:nvSpPr>
         <p:spPr>
           <a:xfrm>
-            <a:off x="838200" y="365125"/>
-            <a:ext cx="7734300" cy="5811838"/>
+            <a:off x="774923" y="675726"/>
+            <a:ext cx="7896279" cy="5183073"/>
           </a:xfrm>
         </p:spPr>
         <p:txBody>
-          <a:bodyPr vert="eaVert"/>
+          <a:bodyPr vert="eaVert" anchor="t"/>
           <a:lstStyle/>
           <a:p>
             <a:pPr lvl="0"/>
@@ -655,18 +833,13 @@
               <a:rPr lang="it-IT"/>
               <a:t>Quinto livello</a:t>
             </a:r>
-          </a:p>
-        </p:txBody>
-      </p:sp>
-      <p:sp>
-        <p:nvSpPr>
-          <p:cNvPr id="4" name="Segnaposto data 3">
-            <a:extLst>
-              <a:ext uri="{FF2B5EF4-FFF2-40B4-BE49-F238E27FC236}">
-                <a16:creationId xmlns:a16="http://schemas.microsoft.com/office/drawing/2014/main" id="{0AF99150-18EF-1D2E-4D5C-8FC14D8C0CD2}"/>
-              </a:ext>
-            </a:extLst>
-          </p:cNvPr>
+            <a:endParaRPr lang="en-US" dirty="0"/>
+          </a:p>
+        </p:txBody>
+      </p:sp>
+      <p:sp>
+        <p:nvSpPr>
+          <p:cNvPr id="4" name="Date Placeholder 3"/>
           <p:cNvSpPr>
             <a:spLocks noGrp="1"/>
           </p:cNvSpPr>
@@ -674,14 +847,30 @@
             <p:ph type="dt" sz="half" idx="10"/>
           </p:nvPr>
         </p:nvSpPr>
-        <p:spPr/>
-        <p:txBody>
-          <a:bodyPr/>
-          <a:lstStyle/>
+        <p:spPr>
+          <a:xfrm>
+            <a:off x="8993673" y="5956137"/>
+            <a:ext cx="1328141" cy="365125"/>
+          </a:xfrm>
+        </p:spPr>
+        <p:txBody>
+          <a:bodyPr/>
+          <a:lstStyle>
+            <a:lvl1pPr>
+              <a:defRPr>
+                <a:solidFill>
+                  <a:schemeClr val="accent1">
+                    <a:lumMod val="75000"/>
+                    <a:lumOff val="25000"/>
+                  </a:schemeClr>
+                </a:solidFill>
+              </a:defRPr>
+            </a:lvl1pPr>
+          </a:lstStyle>
           <a:p>
             <a:fld id="{F259A98E-7D3E-4BAE-A284-2CE0D83E33BF}" type="datetimeFigureOut">
               <a:rPr lang="it-IT" smtClean="0"/>
-              <a:t>02/11/2023</a:t>
+              <a:t>09/12/2023</a:t>
             </a:fld>
             <a:endParaRPr lang="it-IT"/>
           </a:p>
@@ -689,13 +878,7 @@
       </p:sp>
       <p:sp>
         <p:nvSpPr>
-          <p:cNvPr id="5" name="Segnaposto piè di pagina 4">
-            <a:extLst>
-              <a:ext uri="{FF2B5EF4-FFF2-40B4-BE49-F238E27FC236}">
-                <a16:creationId xmlns:a16="http://schemas.microsoft.com/office/drawing/2014/main" id="{D85B3B7E-9D4A-4AD8-39FB-BA4D376CE925}"/>
-              </a:ext>
-            </a:extLst>
-          </p:cNvPr>
+          <p:cNvPr id="5" name="Footer Placeholder 4"/>
           <p:cNvSpPr>
             <a:spLocks noGrp="1"/>
           </p:cNvSpPr>
@@ -703,7 +886,12 @@
             <p:ph type="ftr" sz="quarter" idx="11"/>
           </p:nvPr>
         </p:nvSpPr>
-        <p:spPr/>
+        <p:spPr>
+          <a:xfrm>
+            <a:off x="774923" y="5951811"/>
+            <a:ext cx="7896279" cy="365125"/>
+          </a:xfrm>
+        </p:spPr>
         <p:txBody>
           <a:bodyPr/>
           <a:lstStyle/>
@@ -714,13 +902,7 @@
       </p:sp>
       <p:sp>
         <p:nvSpPr>
-          <p:cNvPr id="6" name="Segnaposto numero diapositiva 5">
-            <a:extLst>
-              <a:ext uri="{FF2B5EF4-FFF2-40B4-BE49-F238E27FC236}">
-                <a16:creationId xmlns:a16="http://schemas.microsoft.com/office/drawing/2014/main" id="{32FBB15E-955B-737F-0F0A-531B1C4924DF}"/>
-              </a:ext>
-            </a:extLst>
-          </p:cNvPr>
+          <p:cNvPr id="6" name="Slide Number Placeholder 5"/>
           <p:cNvSpPr>
             <a:spLocks noGrp="1"/>
           </p:cNvSpPr>
@@ -728,10 +910,26 @@
             <p:ph type="sldNum" sz="quarter" idx="12"/>
           </p:nvPr>
         </p:nvSpPr>
-        <p:spPr/>
-        <p:txBody>
-          <a:bodyPr/>
-          <a:lstStyle/>
+        <p:spPr>
+          <a:xfrm>
+            <a:off x="10446615" y="5956137"/>
+            <a:ext cx="1164195" cy="365125"/>
+          </a:xfrm>
+        </p:spPr>
+        <p:txBody>
+          <a:bodyPr/>
+          <a:lstStyle>
+            <a:lvl1pPr>
+              <a:defRPr>
+                <a:solidFill>
+                  <a:schemeClr val="accent1">
+                    <a:lumMod val="75000"/>
+                    <a:lumOff val="25000"/>
+                  </a:schemeClr>
+                </a:solidFill>
+              </a:defRPr>
+            </a:lvl1pPr>
+          </a:lstStyle>
           <a:p>
             <a:fld id="{FD8D997C-7E66-44D2-B54E-C5D091DF0A81}" type="slidenum">
               <a:rPr lang="it-IT" smtClean="0"/>
@@ -744,7 +942,7 @@
     </p:spTree>
     <p:extLst>
       <p:ext uri="{BB962C8B-B14F-4D97-AF65-F5344CB8AC3E}">
-        <p14:creationId xmlns:p14="http://schemas.microsoft.com/office/powerpoint/2010/main" val="2182225760"/>
+        <p14:creationId xmlns:p14="http://schemas.microsoft.com/office/powerpoint/2010/main" val="2307894960"/>
       </p:ext>
     </p:extLst>
   </p:cSld>
@@ -773,13 +971,46 @@
       </p:grpSpPr>
       <p:sp>
         <p:nvSpPr>
-          <p:cNvPr id="2" name="Titolo 1">
-            <a:extLst>
-              <a:ext uri="{FF2B5EF4-FFF2-40B4-BE49-F238E27FC236}">
-                <a16:creationId xmlns:a16="http://schemas.microsoft.com/office/drawing/2014/main" id="{C1649767-C59D-6D0D-EB44-322C06F6EF29}"/>
-              </a:ext>
-            </a:extLst>
-          </p:cNvPr>
+          <p:cNvPr id="7" name="Rectangle 6"/>
+          <p:cNvSpPr>
+            <a:spLocks noChangeAspect="1"/>
+          </p:cNvSpPr>
+          <p:nvPr/>
+        </p:nvSpPr>
+        <p:spPr>
+          <a:xfrm>
+            <a:off x="440286" y="614407"/>
+            <a:ext cx="11309338" cy="1189298"/>
+          </a:xfrm>
+          <a:prstGeom prst="rect">
+            <a:avLst/>
+          </a:prstGeom>
+          <a:solidFill>
+            <a:schemeClr val="accent1"/>
+          </a:solidFill>
+          <a:ln>
+            <a:noFill/>
+          </a:ln>
+          <a:effectLst/>
+        </p:spPr>
+        <p:style>
+          <a:lnRef idx="1">
+            <a:schemeClr val="accent1"/>
+          </a:lnRef>
+          <a:fillRef idx="3">
+            <a:schemeClr val="accent1"/>
+          </a:fillRef>
+          <a:effectRef idx="2">
+            <a:schemeClr val="accent1"/>
+          </a:effectRef>
+          <a:fontRef idx="minor">
+            <a:schemeClr val="lt1"/>
+          </a:fontRef>
+        </p:style>
+      </p:sp>
+      <p:sp>
+        <p:nvSpPr>
+          <p:cNvPr id="2" name="Title 1"/>
           <p:cNvSpPr>
             <a:spLocks noGrp="1"/>
           </p:cNvSpPr>
@@ -787,7 +1018,12 @@
             <p:ph type="title"/>
           </p:nvPr>
         </p:nvSpPr>
-        <p:spPr/>
+        <p:spPr>
+          <a:xfrm>
+            <a:off x="581192" y="702156"/>
+            <a:ext cx="11029616" cy="1013800"/>
+          </a:xfrm>
+        </p:spPr>
         <p:txBody>
           <a:bodyPr/>
           <a:lstStyle/>
@@ -796,18 +1032,13 @@
               <a:rPr lang="it-IT"/>
               <a:t>Fare clic per modificare lo stile del titolo dello schema</a:t>
             </a:r>
-          </a:p>
-        </p:txBody>
-      </p:sp>
-      <p:sp>
-        <p:nvSpPr>
-          <p:cNvPr id="3" name="Segnaposto contenuto 2">
-            <a:extLst>
-              <a:ext uri="{FF2B5EF4-FFF2-40B4-BE49-F238E27FC236}">
-                <a16:creationId xmlns:a16="http://schemas.microsoft.com/office/drawing/2014/main" id="{1C466EAE-7EA5-ABAB-D15C-FA5D3F86616B}"/>
-              </a:ext>
-            </a:extLst>
-          </p:cNvPr>
+            <a:endParaRPr lang="en-US" dirty="0"/>
+          </a:p>
+        </p:txBody>
+      </p:sp>
+      <p:sp>
+        <p:nvSpPr>
+          <p:cNvPr id="3" name="Content Placeholder 2"/>
           <p:cNvSpPr>
             <a:spLocks noGrp="1"/>
           </p:cNvSpPr>
@@ -815,7 +1046,12 @@
             <p:ph idx="1"/>
           </p:nvPr>
         </p:nvSpPr>
-        <p:spPr/>
+        <p:spPr>
+          <a:xfrm>
+            <a:off x="581192" y="2180496"/>
+            <a:ext cx="11029615" cy="3678303"/>
+          </a:xfrm>
+        </p:spPr>
         <p:txBody>
           <a:bodyPr/>
           <a:lstStyle/>
@@ -853,18 +1089,13 @@
               <a:rPr lang="it-IT"/>
               <a:t>Quinto livello</a:t>
             </a:r>
-          </a:p>
-        </p:txBody>
-      </p:sp>
-      <p:sp>
-        <p:nvSpPr>
-          <p:cNvPr id="4" name="Segnaposto data 3">
-            <a:extLst>
-              <a:ext uri="{FF2B5EF4-FFF2-40B4-BE49-F238E27FC236}">
-                <a16:creationId xmlns:a16="http://schemas.microsoft.com/office/drawing/2014/main" id="{DF2B5357-6B57-4016-A018-EBBA3ADB784C}"/>
-              </a:ext>
-            </a:extLst>
-          </p:cNvPr>
+            <a:endParaRPr lang="en-US" dirty="0"/>
+          </a:p>
+        </p:txBody>
+      </p:sp>
+      <p:sp>
+        <p:nvSpPr>
+          <p:cNvPr id="4" name="Date Placeholder 3"/>
           <p:cNvSpPr>
             <a:spLocks noGrp="1"/>
           </p:cNvSpPr>
@@ -879,7 +1110,7 @@
           <a:p>
             <a:fld id="{F259A98E-7D3E-4BAE-A284-2CE0D83E33BF}" type="datetimeFigureOut">
               <a:rPr lang="it-IT" smtClean="0"/>
-              <a:t>02/11/2023</a:t>
+              <a:t>09/12/2023</a:t>
             </a:fld>
             <a:endParaRPr lang="it-IT"/>
           </a:p>
@@ -887,13 +1118,7 @@
       </p:sp>
       <p:sp>
         <p:nvSpPr>
-          <p:cNvPr id="5" name="Segnaposto piè di pagina 4">
-            <a:extLst>
-              <a:ext uri="{FF2B5EF4-FFF2-40B4-BE49-F238E27FC236}">
-                <a16:creationId xmlns:a16="http://schemas.microsoft.com/office/drawing/2014/main" id="{D02F21F1-3F10-AD9A-C203-65BB0106DCC1}"/>
-              </a:ext>
-            </a:extLst>
-          </p:cNvPr>
+          <p:cNvPr id="5" name="Footer Placeholder 4"/>
           <p:cNvSpPr>
             <a:spLocks noGrp="1"/>
           </p:cNvSpPr>
@@ -912,13 +1137,7 @@
       </p:sp>
       <p:sp>
         <p:nvSpPr>
-          <p:cNvPr id="6" name="Segnaposto numero diapositiva 5">
-            <a:extLst>
-              <a:ext uri="{FF2B5EF4-FFF2-40B4-BE49-F238E27FC236}">
-                <a16:creationId xmlns:a16="http://schemas.microsoft.com/office/drawing/2014/main" id="{224A941A-43BA-13C4-13B5-FBAF2738E270}"/>
-              </a:ext>
-            </a:extLst>
-          </p:cNvPr>
+          <p:cNvPr id="6" name="Slide Number Placeholder 5"/>
           <p:cNvSpPr>
             <a:spLocks noGrp="1"/>
           </p:cNvSpPr>
@@ -926,7 +1145,12 @@
             <p:ph type="sldNum" sz="quarter" idx="12"/>
           </p:nvPr>
         </p:nvSpPr>
-        <p:spPr/>
+        <p:spPr>
+          <a:xfrm>
+            <a:off x="10558300" y="5956137"/>
+            <a:ext cx="1052508" cy="365125"/>
+          </a:xfrm>
+        </p:spPr>
         <p:txBody>
           <a:bodyPr/>
           <a:lstStyle/>
@@ -942,7 +1166,7 @@
     </p:spTree>
     <p:extLst>
       <p:ext uri="{BB962C8B-B14F-4D97-AF65-F5344CB8AC3E}">
-        <p14:creationId xmlns:p14="http://schemas.microsoft.com/office/powerpoint/2010/main" val="4114326677"/>
+        <p14:creationId xmlns:p14="http://schemas.microsoft.com/office/powerpoint/2010/main" val="2662309974"/>
       </p:ext>
     </p:extLst>
   </p:cSld>
@@ -971,31 +1195,70 @@
       </p:grpSpPr>
       <p:sp>
         <p:nvSpPr>
-          <p:cNvPr id="2" name="Titolo 1">
-            <a:extLst>
-              <a:ext uri="{FF2B5EF4-FFF2-40B4-BE49-F238E27FC236}">
-                <a16:creationId xmlns:a16="http://schemas.microsoft.com/office/drawing/2014/main" id="{AD5F3EFF-06F1-B07F-C912-66D515EED472}"/>
-              </a:ext>
-            </a:extLst>
-          </p:cNvPr>
-          <p:cNvSpPr>
-            <a:spLocks noGrp="1"/>
-          </p:cNvSpPr>
-          <p:nvPr>
-            <p:ph type="title"/>
-          </p:nvPr>
+          <p:cNvPr id="8" name="Rectangle 7"/>
+          <p:cNvSpPr>
+            <a:spLocks noChangeAspect="1"/>
+          </p:cNvSpPr>
+          <p:nvPr/>
         </p:nvSpPr>
         <p:spPr>
           <a:xfrm>
-            <a:off x="831850" y="1709738"/>
-            <a:ext cx="10515600" cy="2852737"/>
+            <a:off x="447817" y="5141974"/>
+            <a:ext cx="11290860" cy="1258827"/>
+          </a:xfrm>
+          <a:prstGeom prst="rect">
+            <a:avLst/>
+          </a:prstGeom>
+          <a:solidFill>
+            <a:schemeClr val="accent1"/>
+          </a:solidFill>
+          <a:ln>
+            <a:noFill/>
+          </a:ln>
+          <a:effectLst/>
+        </p:spPr>
+        <p:style>
+          <a:lnRef idx="1">
+            <a:schemeClr val="accent1"/>
+          </a:lnRef>
+          <a:fillRef idx="3">
+            <a:schemeClr val="accent1"/>
+          </a:fillRef>
+          <a:effectRef idx="2">
+            <a:schemeClr val="accent1"/>
+          </a:effectRef>
+          <a:fontRef idx="minor">
+            <a:schemeClr val="lt1"/>
+          </a:fontRef>
+        </p:style>
+      </p:sp>
+      <p:sp>
+        <p:nvSpPr>
+          <p:cNvPr id="2" name="Title 1"/>
+          <p:cNvSpPr>
+            <a:spLocks noGrp="1"/>
+          </p:cNvSpPr>
+          <p:nvPr>
+            <p:ph type="title"/>
+          </p:nvPr>
+        </p:nvSpPr>
+        <p:spPr>
+          <a:xfrm>
+            <a:off x="581193" y="3043910"/>
+            <a:ext cx="11029615" cy="1497507"/>
           </a:xfrm>
         </p:spPr>
         <p:txBody>
-          <a:bodyPr anchor="b"/>
+          <a:bodyPr anchor="b">
+            <a:normAutofit/>
+          </a:bodyPr>
           <a:lstStyle>
-            <a:lvl1pPr>
-              <a:defRPr sz="6000"/>
+            <a:lvl1pPr algn="l">
+              <a:defRPr sz="3600" b="0" cap="all">
+                <a:solidFill>
+                  <a:schemeClr val="accent1"/>
+                </a:solidFill>
+              </a:defRPr>
             </a:lvl1pPr>
           </a:lstStyle>
           <a:p>
@@ -1003,18 +1266,13 @@
               <a:rPr lang="it-IT"/>
               <a:t>Fare clic per modificare lo stile del titolo dello schema</a:t>
             </a:r>
-          </a:p>
-        </p:txBody>
-      </p:sp>
-      <p:sp>
-        <p:nvSpPr>
-          <p:cNvPr id="3" name="Segnaposto testo 2">
-            <a:extLst>
-              <a:ext uri="{FF2B5EF4-FFF2-40B4-BE49-F238E27FC236}">
-                <a16:creationId xmlns:a16="http://schemas.microsoft.com/office/drawing/2014/main" id="{2F15BE99-EDDB-43C6-0955-1AE12CB6281F}"/>
-              </a:ext>
-            </a:extLst>
-          </p:cNvPr>
+            <a:endParaRPr lang="en-US" dirty="0"/>
+          </a:p>
+        </p:txBody>
+      </p:sp>
+      <p:sp>
+        <p:nvSpPr>
+          <p:cNvPr id="3" name="Text Placeholder 2"/>
           <p:cNvSpPr>
             <a:spLocks noGrp="1"/>
           </p:cNvSpPr>
@@ -1024,99 +1282,99 @@
         </p:nvSpPr>
         <p:spPr>
           <a:xfrm>
-            <a:off x="831850" y="4589463"/>
-            <a:ext cx="10515600" cy="1500187"/>
+            <a:off x="581192" y="4541417"/>
+            <a:ext cx="11029615" cy="600556"/>
           </a:xfrm>
         </p:spPr>
         <p:txBody>
-          <a:bodyPr/>
+          <a:bodyPr anchor="t">
+            <a:normAutofit/>
+          </a:bodyPr>
           <a:lstStyle>
-            <a:lvl1pPr marL="0" indent="0">
+            <a:lvl1pPr marL="0" indent="0" algn="l">
               <a:buNone/>
-              <a:defRPr sz="2400">
+              <a:defRPr sz="1800" cap="all">
                 <a:solidFill>
-                  <a:schemeClr val="tx1">
-                    <a:tint val="82000"/>
-                  </a:schemeClr>
+                  <a:schemeClr val="accent2"/>
                 </a:solidFill>
               </a:defRPr>
             </a:lvl1pPr>
             <a:lvl2pPr marL="457200" indent="0">
               <a:buNone/>
-              <a:defRPr sz="2000">
+              <a:defRPr sz="1800">
                 <a:solidFill>
                   <a:schemeClr val="tx1">
-                    <a:tint val="82000"/>
+                    <a:tint val="75000"/>
                   </a:schemeClr>
                 </a:solidFill>
               </a:defRPr>
             </a:lvl2pPr>
             <a:lvl3pPr marL="914400" indent="0">
               <a:buNone/>
-              <a:defRPr sz="1800">
+              <a:defRPr sz="1600">
                 <a:solidFill>
                   <a:schemeClr val="tx1">
-                    <a:tint val="82000"/>
+                    <a:tint val="75000"/>
                   </a:schemeClr>
                 </a:solidFill>
               </a:defRPr>
             </a:lvl3pPr>
             <a:lvl4pPr marL="1371600" indent="0">
               <a:buNone/>
-              <a:defRPr sz="1600">
+              <a:defRPr sz="1400">
                 <a:solidFill>
                   <a:schemeClr val="tx1">
-                    <a:tint val="82000"/>
+                    <a:tint val="75000"/>
                   </a:schemeClr>
                 </a:solidFill>
               </a:defRPr>
             </a:lvl4pPr>
             <a:lvl5pPr marL="1828800" indent="0">
               <a:buNone/>
-              <a:defRPr sz="1600">
+              <a:defRPr sz="1400">
                 <a:solidFill>
                   <a:schemeClr val="tx1">
-                    <a:tint val="82000"/>
+                    <a:tint val="75000"/>
                   </a:schemeClr>
                 </a:solidFill>
               </a:defRPr>
             </a:lvl5pPr>
             <a:lvl6pPr marL="2286000" indent="0">
               <a:buNone/>
-              <a:defRPr sz="1600">
+              <a:defRPr sz="1400">
                 <a:solidFill>
                   <a:schemeClr val="tx1">
-                    <a:tint val="82000"/>
+                    <a:tint val="75000"/>
                   </a:schemeClr>
                 </a:solidFill>
               </a:defRPr>
             </a:lvl6pPr>
             <a:lvl7pPr marL="2743200" indent="0">
               <a:buNone/>
-              <a:defRPr sz="1600">
+              <a:defRPr sz="1400">
                 <a:solidFill>
                   <a:schemeClr val="tx1">
-                    <a:tint val="82000"/>
+                    <a:tint val="75000"/>
                   </a:schemeClr>
                 </a:solidFill>
               </a:defRPr>
             </a:lvl7pPr>
             <a:lvl8pPr marL="3200400" indent="0">
               <a:buNone/>
-              <a:defRPr sz="1600">
+              <a:defRPr sz="1400">
                 <a:solidFill>
                   <a:schemeClr val="tx1">
-                    <a:tint val="82000"/>
+                    <a:tint val="75000"/>
                   </a:schemeClr>
                 </a:solidFill>
               </a:defRPr>
             </a:lvl8pPr>
             <a:lvl9pPr marL="3657600" indent="0">
               <a:buNone/>
-              <a:defRPr sz="1600">
+              <a:defRPr sz="1400">
                 <a:solidFill>
                   <a:schemeClr val="tx1">
-                    <a:tint val="82000"/>
+                    <a:tint val="75000"/>
                   </a:schemeClr>
                 </a:solidFill>
               </a:defRPr>
@@ -1133,13 +1391,7 @@
       </p:sp>
       <p:sp>
         <p:nvSpPr>
-          <p:cNvPr id="4" name="Segnaposto data 3">
-            <a:extLst>
-              <a:ext uri="{FF2B5EF4-FFF2-40B4-BE49-F238E27FC236}">
-                <a16:creationId xmlns:a16="http://schemas.microsoft.com/office/drawing/2014/main" id="{BAF85D01-7E03-A89C-51FC-D1EE9436AC58}"/>
-              </a:ext>
-            </a:extLst>
-          </p:cNvPr>
+          <p:cNvPr id="4" name="Date Placeholder 3"/>
           <p:cNvSpPr>
             <a:spLocks noGrp="1"/>
           </p:cNvSpPr>
@@ -1150,11 +1402,22 @@
         <p:spPr/>
         <p:txBody>
           <a:bodyPr/>
-          <a:lstStyle/>
+          <a:lstStyle>
+            <a:lvl1pPr>
+              <a:defRPr>
+                <a:solidFill>
+                  <a:schemeClr val="accent1">
+                    <a:lumMod val="75000"/>
+                    <a:lumOff val="25000"/>
+                  </a:schemeClr>
+                </a:solidFill>
+              </a:defRPr>
+            </a:lvl1pPr>
+          </a:lstStyle>
           <a:p>
             <a:fld id="{F259A98E-7D3E-4BAE-A284-2CE0D83E33BF}" type="datetimeFigureOut">
               <a:rPr lang="it-IT" smtClean="0"/>
-              <a:t>02/11/2023</a:t>
+              <a:t>09/12/2023</a:t>
             </a:fld>
             <a:endParaRPr lang="it-IT"/>
           </a:p>
@@ -1162,13 +1425,7 @@
       </p:sp>
       <p:sp>
         <p:nvSpPr>
-          <p:cNvPr id="5" name="Segnaposto piè di pagina 4">
-            <a:extLst>
-              <a:ext uri="{FF2B5EF4-FFF2-40B4-BE49-F238E27FC236}">
-                <a16:creationId xmlns:a16="http://schemas.microsoft.com/office/drawing/2014/main" id="{5B8ACED2-DB9F-C8DE-29C7-075C3327AF18}"/>
-              </a:ext>
-            </a:extLst>
-          </p:cNvPr>
+          <p:cNvPr id="5" name="Footer Placeholder 4"/>
           <p:cNvSpPr>
             <a:spLocks noGrp="1"/>
           </p:cNvSpPr>
@@ -1179,7 +1436,18 @@
         <p:spPr/>
         <p:txBody>
           <a:bodyPr/>
-          <a:lstStyle/>
+          <a:lstStyle>
+            <a:lvl1pPr>
+              <a:defRPr>
+                <a:solidFill>
+                  <a:schemeClr val="accent1">
+                    <a:lumMod val="75000"/>
+                    <a:lumOff val="25000"/>
+                  </a:schemeClr>
+                </a:solidFill>
+              </a:defRPr>
+            </a:lvl1pPr>
+          </a:lstStyle>
           <a:p>
             <a:endParaRPr lang="it-IT"/>
           </a:p>
@@ -1187,13 +1455,7 @@
       </p:sp>
       <p:sp>
         <p:nvSpPr>
-          <p:cNvPr id="6" name="Segnaposto numero diapositiva 5">
-            <a:extLst>
-              <a:ext uri="{FF2B5EF4-FFF2-40B4-BE49-F238E27FC236}">
-                <a16:creationId xmlns:a16="http://schemas.microsoft.com/office/drawing/2014/main" id="{716D21DB-811C-6DAC-63D7-54D584A36486}"/>
-              </a:ext>
-            </a:extLst>
-          </p:cNvPr>
+          <p:cNvPr id="6" name="Slide Number Placeholder 5"/>
           <p:cNvSpPr>
             <a:spLocks noGrp="1"/>
           </p:cNvSpPr>
@@ -1204,7 +1466,18 @@
         <p:spPr/>
         <p:txBody>
           <a:bodyPr/>
-          <a:lstStyle/>
+          <a:lstStyle>
+            <a:lvl1pPr>
+              <a:defRPr>
+                <a:solidFill>
+                  <a:schemeClr val="accent1">
+                    <a:lumMod val="75000"/>
+                    <a:lumOff val="25000"/>
+                  </a:schemeClr>
+                </a:solidFill>
+              </a:defRPr>
+            </a:lvl1pPr>
+          </a:lstStyle>
           <a:p>
             <a:fld id="{FD8D997C-7E66-44D2-B54E-C5D091DF0A81}" type="slidenum">
               <a:rPr lang="it-IT" smtClean="0"/>
@@ -1217,7 +1490,7 @@
     </p:spTree>
     <p:extLst>
       <p:ext uri="{BB962C8B-B14F-4D97-AF65-F5344CB8AC3E}">
-        <p14:creationId xmlns:p14="http://schemas.microsoft.com/office/powerpoint/2010/main" val="2723013063"/>
+        <p14:creationId xmlns:p14="http://schemas.microsoft.com/office/powerpoint/2010/main" val="1164832240"/>
       </p:ext>
     </p:extLst>
   </p:cSld>
@@ -1246,13 +1519,46 @@
       </p:grpSpPr>
       <p:sp>
         <p:nvSpPr>
-          <p:cNvPr id="2" name="Titolo 1">
-            <a:extLst>
-              <a:ext uri="{FF2B5EF4-FFF2-40B4-BE49-F238E27FC236}">
-                <a16:creationId xmlns:a16="http://schemas.microsoft.com/office/drawing/2014/main" id="{502E9461-C709-72A4-DC27-E7C048C983B5}"/>
-              </a:ext>
-            </a:extLst>
-          </p:cNvPr>
+          <p:cNvPr id="8" name="Rectangle 7"/>
+          <p:cNvSpPr>
+            <a:spLocks noChangeAspect="1"/>
+          </p:cNvSpPr>
+          <p:nvPr/>
+        </p:nvSpPr>
+        <p:spPr>
+          <a:xfrm>
+            <a:off x="445982" y="606554"/>
+            <a:ext cx="11300036" cy="1258827"/>
+          </a:xfrm>
+          <a:prstGeom prst="rect">
+            <a:avLst/>
+          </a:prstGeom>
+          <a:solidFill>
+            <a:schemeClr val="accent1"/>
+          </a:solidFill>
+          <a:ln>
+            <a:noFill/>
+          </a:ln>
+          <a:effectLst/>
+        </p:spPr>
+        <p:style>
+          <a:lnRef idx="1">
+            <a:schemeClr val="accent1"/>
+          </a:lnRef>
+          <a:fillRef idx="3">
+            <a:schemeClr val="accent1"/>
+          </a:fillRef>
+          <a:effectRef idx="2">
+            <a:schemeClr val="accent1"/>
+          </a:effectRef>
+          <a:fontRef idx="minor">
+            <a:schemeClr val="lt1"/>
+          </a:fontRef>
+        </p:style>
+      </p:sp>
+      <p:sp>
+        <p:nvSpPr>
+          <p:cNvPr id="2" name="Title 1"/>
           <p:cNvSpPr>
             <a:spLocks noGrp="1"/>
           </p:cNvSpPr>
@@ -1260,7 +1566,12 @@
             <p:ph type="title"/>
           </p:nvPr>
         </p:nvSpPr>
-        <p:spPr/>
+        <p:spPr>
+          <a:xfrm>
+            <a:off x="581193" y="729658"/>
+            <a:ext cx="11029616" cy="988332"/>
+          </a:xfrm>
+        </p:spPr>
         <p:txBody>
           <a:bodyPr/>
           <a:lstStyle/>
@@ -1269,18 +1580,13 @@
               <a:rPr lang="it-IT"/>
               <a:t>Fare clic per modificare lo stile del titolo dello schema</a:t>
             </a:r>
-          </a:p>
-        </p:txBody>
-      </p:sp>
-      <p:sp>
-        <p:nvSpPr>
-          <p:cNvPr id="3" name="Segnaposto contenuto 2">
-            <a:extLst>
-              <a:ext uri="{FF2B5EF4-FFF2-40B4-BE49-F238E27FC236}">
-                <a16:creationId xmlns:a16="http://schemas.microsoft.com/office/drawing/2014/main" id="{B2314DDC-F6E7-EBAB-4358-126CE9D2274B}"/>
-              </a:ext>
-            </a:extLst>
-          </p:cNvPr>
+            <a:endParaRPr lang="en-US" dirty="0"/>
+          </a:p>
+        </p:txBody>
+      </p:sp>
+      <p:sp>
+        <p:nvSpPr>
+          <p:cNvPr id="3" name="Content Placeholder 2"/>
           <p:cNvSpPr>
             <a:spLocks noGrp="1"/>
           </p:cNvSpPr>
@@ -1290,12 +1596,14 @@
         </p:nvSpPr>
         <p:spPr>
           <a:xfrm>
-            <a:off x="838200" y="1825625"/>
-            <a:ext cx="5181600" cy="4351338"/>
+            <a:off x="581193" y="2228003"/>
+            <a:ext cx="5422390" cy="3633047"/>
           </a:xfrm>
         </p:spPr>
         <p:txBody>
-          <a:bodyPr/>
+          <a:bodyPr>
+            <a:normAutofit/>
+          </a:bodyPr>
           <a:lstStyle/>
           <a:p>
             <a:pPr lvl="0"/>
@@ -1331,18 +1639,13 @@
               <a:rPr lang="it-IT"/>
               <a:t>Quinto livello</a:t>
             </a:r>
-          </a:p>
-        </p:txBody>
-      </p:sp>
-      <p:sp>
-        <p:nvSpPr>
-          <p:cNvPr id="4" name="Segnaposto contenuto 3">
-            <a:extLst>
-              <a:ext uri="{FF2B5EF4-FFF2-40B4-BE49-F238E27FC236}">
-                <a16:creationId xmlns:a16="http://schemas.microsoft.com/office/drawing/2014/main" id="{24DDC6F1-9E00-AA90-2961-6782E3C4FA4A}"/>
-              </a:ext>
-            </a:extLst>
-          </p:cNvPr>
+            <a:endParaRPr lang="en-US" dirty="0"/>
+          </a:p>
+        </p:txBody>
+      </p:sp>
+      <p:sp>
+        <p:nvSpPr>
+          <p:cNvPr id="4" name="Content Placeholder 3"/>
           <p:cNvSpPr>
             <a:spLocks noGrp="1"/>
           </p:cNvSpPr>
@@ -1352,12 +1655,14 @@
         </p:nvSpPr>
         <p:spPr>
           <a:xfrm>
-            <a:off x="6172200" y="1825625"/>
-            <a:ext cx="5181600" cy="4351338"/>
+            <a:off x="6188417" y="2228003"/>
+            <a:ext cx="5422392" cy="3633047"/>
           </a:xfrm>
         </p:spPr>
         <p:txBody>
-          <a:bodyPr/>
+          <a:bodyPr>
+            <a:normAutofit/>
+          </a:bodyPr>
           <a:lstStyle/>
           <a:p>
             <a:pPr lvl="0"/>
@@ -1393,18 +1698,13 @@
               <a:rPr lang="it-IT"/>
               <a:t>Quinto livello</a:t>
             </a:r>
-          </a:p>
-        </p:txBody>
-      </p:sp>
-      <p:sp>
-        <p:nvSpPr>
-          <p:cNvPr id="5" name="Segnaposto data 4">
-            <a:extLst>
-              <a:ext uri="{FF2B5EF4-FFF2-40B4-BE49-F238E27FC236}">
-                <a16:creationId xmlns:a16="http://schemas.microsoft.com/office/drawing/2014/main" id="{95607E2C-C125-CDA1-9670-8EBEB247FE53}"/>
-              </a:ext>
-            </a:extLst>
-          </p:cNvPr>
+            <a:endParaRPr lang="en-US" dirty="0"/>
+          </a:p>
+        </p:txBody>
+      </p:sp>
+      <p:sp>
+        <p:nvSpPr>
+          <p:cNvPr id="5" name="Date Placeholder 4"/>
           <p:cNvSpPr>
             <a:spLocks noGrp="1"/>
           </p:cNvSpPr>
@@ -1419,7 +1719,7 @@
           <a:p>
             <a:fld id="{F259A98E-7D3E-4BAE-A284-2CE0D83E33BF}" type="datetimeFigureOut">
               <a:rPr lang="it-IT" smtClean="0"/>
-              <a:t>02/11/2023</a:t>
+              <a:t>09/12/2023</a:t>
             </a:fld>
             <a:endParaRPr lang="it-IT"/>
           </a:p>
@@ -1427,13 +1727,7 @@
       </p:sp>
       <p:sp>
         <p:nvSpPr>
-          <p:cNvPr id="6" name="Segnaposto piè di pagina 5">
-            <a:extLst>
-              <a:ext uri="{FF2B5EF4-FFF2-40B4-BE49-F238E27FC236}">
-                <a16:creationId xmlns:a16="http://schemas.microsoft.com/office/drawing/2014/main" id="{5C8F9B12-3334-0AA5-5986-7AEF960B8BEF}"/>
-              </a:ext>
-            </a:extLst>
-          </p:cNvPr>
+          <p:cNvPr id="6" name="Footer Placeholder 5"/>
           <p:cNvSpPr>
             <a:spLocks noGrp="1"/>
           </p:cNvSpPr>
@@ -1452,13 +1746,7 @@
       </p:sp>
       <p:sp>
         <p:nvSpPr>
-          <p:cNvPr id="7" name="Segnaposto numero diapositiva 6">
-            <a:extLst>
-              <a:ext uri="{FF2B5EF4-FFF2-40B4-BE49-F238E27FC236}">
-                <a16:creationId xmlns:a16="http://schemas.microsoft.com/office/drawing/2014/main" id="{6B13B765-23F7-26BE-9CE3-701E213BE0ED}"/>
-              </a:ext>
-            </a:extLst>
-          </p:cNvPr>
+          <p:cNvPr id="7" name="Slide Number Placeholder 6"/>
           <p:cNvSpPr>
             <a:spLocks noGrp="1"/>
           </p:cNvSpPr>
@@ -1482,7 +1770,7 @@
     </p:spTree>
     <p:extLst>
       <p:ext uri="{BB962C8B-B14F-4D97-AF65-F5344CB8AC3E}">
-        <p14:creationId xmlns:p14="http://schemas.microsoft.com/office/powerpoint/2010/main" val="287815486"/>
+        <p14:creationId xmlns:p14="http://schemas.microsoft.com/office/powerpoint/2010/main" val="1180512444"/>
       </p:ext>
     </p:extLst>
   </p:cSld>
@@ -1511,24 +1799,57 @@
       </p:grpSpPr>
       <p:sp>
         <p:nvSpPr>
-          <p:cNvPr id="2" name="Titolo 1">
-            <a:extLst>
-              <a:ext uri="{FF2B5EF4-FFF2-40B4-BE49-F238E27FC236}">
-                <a16:creationId xmlns:a16="http://schemas.microsoft.com/office/drawing/2014/main" id="{B75CEF76-307D-58F2-2CCE-3C55B2015376}"/>
-              </a:ext>
-            </a:extLst>
-          </p:cNvPr>
-          <p:cNvSpPr>
-            <a:spLocks noGrp="1"/>
-          </p:cNvSpPr>
-          <p:nvPr>
-            <p:ph type="title"/>
-          </p:nvPr>
+          <p:cNvPr id="11" name="Rectangle 10"/>
+          <p:cNvSpPr>
+            <a:spLocks noChangeAspect="1"/>
+          </p:cNvSpPr>
+          <p:nvPr/>
         </p:nvSpPr>
         <p:spPr>
           <a:xfrm>
-            <a:off x="839788" y="365125"/>
-            <a:ext cx="10515600" cy="1325563"/>
+            <a:off x="445982" y="606554"/>
+            <a:ext cx="11300036" cy="1258827"/>
+          </a:xfrm>
+          <a:prstGeom prst="rect">
+            <a:avLst/>
+          </a:prstGeom>
+          <a:solidFill>
+            <a:schemeClr val="accent1"/>
+          </a:solidFill>
+          <a:ln>
+            <a:noFill/>
+          </a:ln>
+          <a:effectLst/>
+        </p:spPr>
+        <p:style>
+          <a:lnRef idx="1">
+            <a:schemeClr val="accent1"/>
+          </a:lnRef>
+          <a:fillRef idx="3">
+            <a:schemeClr val="accent1"/>
+          </a:fillRef>
+          <a:effectRef idx="2">
+            <a:schemeClr val="accent1"/>
+          </a:effectRef>
+          <a:fontRef idx="minor">
+            <a:schemeClr val="lt1"/>
+          </a:fontRef>
+        </p:style>
+      </p:sp>
+      <p:sp>
+        <p:nvSpPr>
+          <p:cNvPr id="12" name="Title 1"/>
+          <p:cNvSpPr>
+            <a:spLocks noGrp="1"/>
+          </p:cNvSpPr>
+          <p:nvPr>
+            <p:ph type="title"/>
+          </p:nvPr>
+        </p:nvSpPr>
+        <p:spPr>
+          <a:xfrm>
+            <a:off x="581193" y="729658"/>
+            <a:ext cx="11029616" cy="988332"/>
           </a:xfrm>
         </p:spPr>
         <p:txBody>
@@ -1539,18 +1860,13 @@
               <a:rPr lang="it-IT"/>
               <a:t>Fare clic per modificare lo stile del titolo dello schema</a:t>
             </a:r>
-          </a:p>
-        </p:txBody>
-      </p:sp>
-      <p:sp>
-        <p:nvSpPr>
-          <p:cNvPr id="3" name="Segnaposto testo 2">
-            <a:extLst>
-              <a:ext uri="{FF2B5EF4-FFF2-40B4-BE49-F238E27FC236}">
-                <a16:creationId xmlns:a16="http://schemas.microsoft.com/office/drawing/2014/main" id="{01F5EC6B-0E37-603C-5911-F03BEADF6C43}"/>
-              </a:ext>
-            </a:extLst>
-          </p:cNvPr>
+            <a:endParaRPr lang="en-US" dirty="0"/>
+          </a:p>
+        </p:txBody>
+      </p:sp>
+      <p:sp>
+        <p:nvSpPr>
+          <p:cNvPr id="3" name="Text Placeholder 2"/>
           <p:cNvSpPr>
             <a:spLocks noGrp="1"/>
           </p:cNvSpPr>
@@ -1560,16 +1876,22 @@
         </p:nvSpPr>
         <p:spPr>
           <a:xfrm>
-            <a:off x="839788" y="1681163"/>
-            <a:ext cx="5157787" cy="823912"/>
+            <a:off x="887219" y="2250892"/>
+            <a:ext cx="5087075" cy="536005"/>
           </a:xfrm>
         </p:spPr>
         <p:txBody>
-          <a:bodyPr anchor="b"/>
+          <a:bodyPr anchor="b">
+            <a:noAutofit/>
+          </a:bodyPr>
           <a:lstStyle>
             <a:lvl1pPr marL="0" indent="0">
               <a:buNone/>
-              <a:defRPr sz="2400" b="1"/>
+              <a:defRPr sz="2200" b="0">
+                <a:solidFill>
+                  <a:schemeClr val="accent2"/>
+                </a:solidFill>
+              </a:defRPr>
             </a:lvl1pPr>
             <a:lvl2pPr marL="457200" indent="0">
               <a:buNone/>
@@ -1615,13 +1937,7 @@
       </p:sp>
       <p:sp>
         <p:nvSpPr>
-          <p:cNvPr id="4" name="Segnaposto contenuto 3">
-            <a:extLst>
-              <a:ext uri="{FF2B5EF4-FFF2-40B4-BE49-F238E27FC236}">
-                <a16:creationId xmlns:a16="http://schemas.microsoft.com/office/drawing/2014/main" id="{4D058197-60FE-BB19-338B-38FEC43D01A3}"/>
-              </a:ext>
-            </a:extLst>
-          </p:cNvPr>
+          <p:cNvPr id="4" name="Content Placeholder 3"/>
           <p:cNvSpPr>
             <a:spLocks noGrp="1"/>
           </p:cNvSpPr>
@@ -1631,12 +1947,14 @@
         </p:nvSpPr>
         <p:spPr>
           <a:xfrm>
-            <a:off x="839788" y="2505075"/>
-            <a:ext cx="5157787" cy="3684588"/>
+            <a:off x="581194" y="2926052"/>
+            <a:ext cx="5393100" cy="2934999"/>
           </a:xfrm>
         </p:spPr>
         <p:txBody>
-          <a:bodyPr/>
+          <a:bodyPr anchor="t">
+            <a:normAutofit/>
+          </a:bodyPr>
           <a:lstStyle/>
           <a:p>
             <a:pPr lvl="0"/>
@@ -1672,18 +1990,13 @@
               <a:rPr lang="it-IT"/>
               <a:t>Quinto livello</a:t>
             </a:r>
-          </a:p>
-        </p:txBody>
-      </p:sp>
-      <p:sp>
-        <p:nvSpPr>
-          <p:cNvPr id="5" name="Segnaposto testo 4">
-            <a:extLst>
-              <a:ext uri="{FF2B5EF4-FFF2-40B4-BE49-F238E27FC236}">
-                <a16:creationId xmlns:a16="http://schemas.microsoft.com/office/drawing/2014/main" id="{D7B62768-BC13-B60B-7DED-0102FBAB9D75}"/>
-              </a:ext>
-            </a:extLst>
-          </p:cNvPr>
+            <a:endParaRPr lang="en-US" dirty="0"/>
+          </a:p>
+        </p:txBody>
+      </p:sp>
+      <p:sp>
+        <p:nvSpPr>
+          <p:cNvPr id="5" name="Text Placeholder 4"/>
           <p:cNvSpPr>
             <a:spLocks noGrp="1"/>
           </p:cNvSpPr>
@@ -1693,16 +2006,22 @@
         </p:nvSpPr>
         <p:spPr>
           <a:xfrm>
-            <a:off x="6172200" y="1681163"/>
-            <a:ext cx="5183188" cy="823912"/>
+            <a:off x="6523735" y="2250892"/>
+            <a:ext cx="5087073" cy="553373"/>
           </a:xfrm>
         </p:spPr>
         <p:txBody>
-          <a:bodyPr anchor="b"/>
+          <a:bodyPr anchor="b">
+            <a:noAutofit/>
+          </a:bodyPr>
           <a:lstStyle>
             <a:lvl1pPr marL="0" indent="0">
               <a:buNone/>
-              <a:defRPr sz="2400" b="1"/>
+              <a:defRPr sz="2200" b="0">
+                <a:solidFill>
+                  <a:schemeClr val="accent2"/>
+                </a:solidFill>
+              </a:defRPr>
             </a:lvl1pPr>
             <a:lvl2pPr marL="457200" indent="0">
               <a:buNone/>
@@ -1748,13 +2067,7 @@
       </p:sp>
       <p:sp>
         <p:nvSpPr>
-          <p:cNvPr id="6" name="Segnaposto contenuto 5">
-            <a:extLst>
-              <a:ext uri="{FF2B5EF4-FFF2-40B4-BE49-F238E27FC236}">
-                <a16:creationId xmlns:a16="http://schemas.microsoft.com/office/drawing/2014/main" id="{A0C5D8B1-9564-8874-78A8-F9DFF4D86CCE}"/>
-              </a:ext>
-            </a:extLst>
-          </p:cNvPr>
+          <p:cNvPr id="6" name="Content Placeholder 5"/>
           <p:cNvSpPr>
             <a:spLocks noGrp="1"/>
           </p:cNvSpPr>
@@ -1764,12 +2077,14 @@
         </p:nvSpPr>
         <p:spPr>
           <a:xfrm>
-            <a:off x="6172200" y="2505075"/>
-            <a:ext cx="5183188" cy="3684588"/>
+            <a:off x="6217709" y="2926052"/>
+            <a:ext cx="5393100" cy="2934999"/>
           </a:xfrm>
         </p:spPr>
         <p:txBody>
-          <a:bodyPr/>
+          <a:bodyPr anchor="t">
+            <a:normAutofit/>
+          </a:bodyPr>
           <a:lstStyle/>
           <a:p>
             <a:pPr lvl="0"/>
@@ -1805,18 +2120,13 @@
               <a:rPr lang="it-IT"/>
               <a:t>Quinto livello</a:t>
             </a:r>
-          </a:p>
-        </p:txBody>
-      </p:sp>
-      <p:sp>
-        <p:nvSpPr>
-          <p:cNvPr id="7" name="Segnaposto data 6">
-            <a:extLst>
-              <a:ext uri="{FF2B5EF4-FFF2-40B4-BE49-F238E27FC236}">
-                <a16:creationId xmlns:a16="http://schemas.microsoft.com/office/drawing/2014/main" id="{55BC983A-A280-3111-3C96-DD1DD02DC231}"/>
-              </a:ext>
-            </a:extLst>
-          </p:cNvPr>
+            <a:endParaRPr lang="en-US" dirty="0"/>
+          </a:p>
+        </p:txBody>
+      </p:sp>
+      <p:sp>
+        <p:nvSpPr>
+          <p:cNvPr id="7" name="Date Placeholder 6"/>
           <p:cNvSpPr>
             <a:spLocks noGrp="1"/>
           </p:cNvSpPr>
@@ -1831,7 +2141,7 @@
           <a:p>
             <a:fld id="{F259A98E-7D3E-4BAE-A284-2CE0D83E33BF}" type="datetimeFigureOut">
               <a:rPr lang="it-IT" smtClean="0"/>
-              <a:t>02/11/2023</a:t>
+              <a:t>09/12/2023</a:t>
             </a:fld>
             <a:endParaRPr lang="it-IT"/>
           </a:p>
@@ -1839,13 +2149,7 @@
       </p:sp>
       <p:sp>
         <p:nvSpPr>
-          <p:cNvPr id="8" name="Segnaposto piè di pagina 7">
-            <a:extLst>
-              <a:ext uri="{FF2B5EF4-FFF2-40B4-BE49-F238E27FC236}">
-                <a16:creationId xmlns:a16="http://schemas.microsoft.com/office/drawing/2014/main" id="{97BCA1C9-CD85-47A7-EDAA-AC06605E2B85}"/>
-              </a:ext>
-            </a:extLst>
-          </p:cNvPr>
+          <p:cNvPr id="8" name="Footer Placeholder 7"/>
           <p:cNvSpPr>
             <a:spLocks noGrp="1"/>
           </p:cNvSpPr>
@@ -1864,13 +2168,7 @@
       </p:sp>
       <p:sp>
         <p:nvSpPr>
-          <p:cNvPr id="9" name="Segnaposto numero diapositiva 8">
-            <a:extLst>
-              <a:ext uri="{FF2B5EF4-FFF2-40B4-BE49-F238E27FC236}">
-                <a16:creationId xmlns:a16="http://schemas.microsoft.com/office/drawing/2014/main" id="{7B2BE092-0BB3-03EF-8CC3-09DED2AAFA64}"/>
-              </a:ext>
-            </a:extLst>
-          </p:cNvPr>
+          <p:cNvPr id="9" name="Slide Number Placeholder 8"/>
           <p:cNvSpPr>
             <a:spLocks noGrp="1"/>
           </p:cNvSpPr>
@@ -1894,7 +2192,7 @@
     </p:spTree>
     <p:extLst>
       <p:ext uri="{BB962C8B-B14F-4D97-AF65-F5344CB8AC3E}">
-        <p14:creationId xmlns:p14="http://schemas.microsoft.com/office/powerpoint/2010/main" val="3926892728"/>
+        <p14:creationId xmlns:p14="http://schemas.microsoft.com/office/powerpoint/2010/main" val="3688886971"/>
       </p:ext>
     </p:extLst>
   </p:cSld>
@@ -1923,41 +2221,7 @@
       </p:grpSpPr>
       <p:sp>
         <p:nvSpPr>
-          <p:cNvPr id="2" name="Titolo 1">
-            <a:extLst>
-              <a:ext uri="{FF2B5EF4-FFF2-40B4-BE49-F238E27FC236}">
-                <a16:creationId xmlns:a16="http://schemas.microsoft.com/office/drawing/2014/main" id="{A12B19A1-FEE2-A14D-FDED-9B8E3818D910}"/>
-              </a:ext>
-            </a:extLst>
-          </p:cNvPr>
-          <p:cNvSpPr>
-            <a:spLocks noGrp="1"/>
-          </p:cNvSpPr>
-          <p:nvPr>
-            <p:ph type="title"/>
-          </p:nvPr>
-        </p:nvSpPr>
-        <p:spPr/>
-        <p:txBody>
-          <a:bodyPr/>
-          <a:lstStyle/>
-          <a:p>
-            <a:r>
-              <a:rPr lang="it-IT"/>
-              <a:t>Fare clic per modificare lo stile del titolo dello schema</a:t>
-            </a:r>
-          </a:p>
-        </p:txBody>
-      </p:sp>
-      <p:sp>
-        <p:nvSpPr>
-          <p:cNvPr id="3" name="Segnaposto data 2">
-            <a:extLst>
-              <a:ext uri="{FF2B5EF4-FFF2-40B4-BE49-F238E27FC236}">
-                <a16:creationId xmlns:a16="http://schemas.microsoft.com/office/drawing/2014/main" id="{40D01A78-5C58-F103-F85B-C219F576913E}"/>
-              </a:ext>
-            </a:extLst>
-          </p:cNvPr>
+          <p:cNvPr id="3" name="Date Placeholder 2"/>
           <p:cNvSpPr>
             <a:spLocks noGrp="1"/>
           </p:cNvSpPr>
@@ -1972,7 +2236,7 @@
           <a:p>
             <a:fld id="{F259A98E-7D3E-4BAE-A284-2CE0D83E33BF}" type="datetimeFigureOut">
               <a:rPr lang="it-IT" smtClean="0"/>
-              <a:t>02/11/2023</a:t>
+              <a:t>09/12/2023</a:t>
             </a:fld>
             <a:endParaRPr lang="it-IT"/>
           </a:p>
@@ -1980,13 +2244,7 @@
       </p:sp>
       <p:sp>
         <p:nvSpPr>
-          <p:cNvPr id="4" name="Segnaposto piè di pagina 3">
-            <a:extLst>
-              <a:ext uri="{FF2B5EF4-FFF2-40B4-BE49-F238E27FC236}">
-                <a16:creationId xmlns:a16="http://schemas.microsoft.com/office/drawing/2014/main" id="{6DF569C9-745A-5462-4C23-5CC8D9E63FDF}"/>
-              </a:ext>
-            </a:extLst>
-          </p:cNvPr>
+          <p:cNvPr id="4" name="Footer Placeholder 3"/>
           <p:cNvSpPr>
             <a:spLocks noGrp="1"/>
           </p:cNvSpPr>
@@ -2005,13 +2263,7 @@
       </p:sp>
       <p:sp>
         <p:nvSpPr>
-          <p:cNvPr id="5" name="Segnaposto numero diapositiva 4">
-            <a:extLst>
-              <a:ext uri="{FF2B5EF4-FFF2-40B4-BE49-F238E27FC236}">
-                <a16:creationId xmlns:a16="http://schemas.microsoft.com/office/drawing/2014/main" id="{8D791F1A-E87C-B47F-4D0B-A9D59ECF3F1B}"/>
-              </a:ext>
-            </a:extLst>
-          </p:cNvPr>
+          <p:cNvPr id="5" name="Slide Number Placeholder 4"/>
           <p:cNvSpPr>
             <a:spLocks noGrp="1"/>
           </p:cNvSpPr>
@@ -2032,10 +2284,77 @@
           </a:p>
         </p:txBody>
       </p:sp>
+      <p:sp>
+        <p:nvSpPr>
+          <p:cNvPr id="7" name="Rectangle 6"/>
+          <p:cNvSpPr>
+            <a:spLocks noChangeAspect="1"/>
+          </p:cNvSpPr>
+          <p:nvPr/>
+        </p:nvSpPr>
+        <p:spPr>
+          <a:xfrm>
+            <a:off x="440683" y="606554"/>
+            <a:ext cx="11300036" cy="1258827"/>
+          </a:xfrm>
+          <a:prstGeom prst="rect">
+            <a:avLst/>
+          </a:prstGeom>
+          <a:solidFill>
+            <a:schemeClr val="accent1"/>
+          </a:solidFill>
+          <a:ln>
+            <a:noFill/>
+          </a:ln>
+          <a:effectLst/>
+        </p:spPr>
+        <p:style>
+          <a:lnRef idx="1">
+            <a:schemeClr val="accent1"/>
+          </a:lnRef>
+          <a:fillRef idx="3">
+            <a:schemeClr val="accent1"/>
+          </a:fillRef>
+          <a:effectRef idx="2">
+            <a:schemeClr val="accent1"/>
+          </a:effectRef>
+          <a:fontRef idx="minor">
+            <a:schemeClr val="lt1"/>
+          </a:fontRef>
+        </p:style>
+      </p:sp>
+      <p:sp>
+        <p:nvSpPr>
+          <p:cNvPr id="8" name="Title 1"/>
+          <p:cNvSpPr>
+            <a:spLocks noGrp="1"/>
+          </p:cNvSpPr>
+          <p:nvPr>
+            <p:ph type="title"/>
+          </p:nvPr>
+        </p:nvSpPr>
+        <p:spPr>
+          <a:xfrm>
+            <a:off x="575894" y="729658"/>
+            <a:ext cx="11029616" cy="988332"/>
+          </a:xfrm>
+        </p:spPr>
+        <p:txBody>
+          <a:bodyPr/>
+          <a:lstStyle/>
+          <a:p>
+            <a:r>
+              <a:rPr lang="it-IT"/>
+              <a:t>Fare clic per modificare lo stile del titolo dello schema</a:t>
+            </a:r>
+            <a:endParaRPr lang="en-US" dirty="0"/>
+          </a:p>
+        </p:txBody>
+      </p:sp>
     </p:spTree>
     <p:extLst>
       <p:ext uri="{BB962C8B-B14F-4D97-AF65-F5344CB8AC3E}">
-        <p14:creationId xmlns:p14="http://schemas.microsoft.com/office/powerpoint/2010/main" val="3223320241"/>
+        <p14:creationId xmlns:p14="http://schemas.microsoft.com/office/powerpoint/2010/main" val="414737027"/>
       </p:ext>
     </p:extLst>
   </p:cSld>
@@ -2064,13 +2383,7 @@
       </p:grpSpPr>
       <p:sp>
         <p:nvSpPr>
-          <p:cNvPr id="2" name="Segnaposto data 1">
-            <a:extLst>
-              <a:ext uri="{FF2B5EF4-FFF2-40B4-BE49-F238E27FC236}">
-                <a16:creationId xmlns:a16="http://schemas.microsoft.com/office/drawing/2014/main" id="{A052C3D7-DF5F-0DBC-D41C-B9C83BF06605}"/>
-              </a:ext>
-            </a:extLst>
-          </p:cNvPr>
+          <p:cNvPr id="2" name="Date Placeholder 1"/>
           <p:cNvSpPr>
             <a:spLocks noGrp="1"/>
           </p:cNvSpPr>
@@ -2085,7 +2398,7 @@
           <a:p>
             <a:fld id="{F259A98E-7D3E-4BAE-A284-2CE0D83E33BF}" type="datetimeFigureOut">
               <a:rPr lang="it-IT" smtClean="0"/>
-              <a:t>02/11/2023</a:t>
+              <a:t>09/12/2023</a:t>
             </a:fld>
             <a:endParaRPr lang="it-IT"/>
           </a:p>
@@ -2093,13 +2406,7 @@
       </p:sp>
       <p:sp>
         <p:nvSpPr>
-          <p:cNvPr id="3" name="Segnaposto piè di pagina 2">
-            <a:extLst>
-              <a:ext uri="{FF2B5EF4-FFF2-40B4-BE49-F238E27FC236}">
-                <a16:creationId xmlns:a16="http://schemas.microsoft.com/office/drawing/2014/main" id="{2C11137C-011F-A42C-F5C6-9E099F2477A5}"/>
-              </a:ext>
-            </a:extLst>
-          </p:cNvPr>
+          <p:cNvPr id="3" name="Footer Placeholder 2"/>
           <p:cNvSpPr>
             <a:spLocks noGrp="1"/>
           </p:cNvSpPr>
@@ -2118,13 +2425,7 @@
       </p:sp>
       <p:sp>
         <p:nvSpPr>
-          <p:cNvPr id="4" name="Segnaposto numero diapositiva 3">
-            <a:extLst>
-              <a:ext uri="{FF2B5EF4-FFF2-40B4-BE49-F238E27FC236}">
-                <a16:creationId xmlns:a16="http://schemas.microsoft.com/office/drawing/2014/main" id="{5C73B88B-6B35-00F4-1309-4FF3B2FEC32B}"/>
-              </a:ext>
-            </a:extLst>
-          </p:cNvPr>
+          <p:cNvPr id="4" name="Slide Number Placeholder 3"/>
           <p:cNvSpPr>
             <a:spLocks noGrp="1"/>
           </p:cNvSpPr>
@@ -2148,7 +2449,7 @@
     </p:spTree>
     <p:extLst>
       <p:ext uri="{BB962C8B-B14F-4D97-AF65-F5344CB8AC3E}">
-        <p14:creationId xmlns:p14="http://schemas.microsoft.com/office/powerpoint/2010/main" val="1625836196"/>
+        <p14:creationId xmlns:p14="http://schemas.microsoft.com/office/powerpoint/2010/main" val="2632218014"/>
       </p:ext>
     </p:extLst>
   </p:cSld>
@@ -2177,191 +2478,265 @@
       </p:grpSpPr>
       <p:sp>
         <p:nvSpPr>
-          <p:cNvPr id="2" name="Titolo 1">
-            <a:extLst>
-              <a:ext uri="{FF2B5EF4-FFF2-40B4-BE49-F238E27FC236}">
-                <a16:creationId xmlns:a16="http://schemas.microsoft.com/office/drawing/2014/main" id="{0DC167C3-A219-D972-4E89-A129DC05F4A6}"/>
-              </a:ext>
-            </a:extLst>
-          </p:cNvPr>
-          <p:cNvSpPr>
-            <a:spLocks noGrp="1"/>
-          </p:cNvSpPr>
-          <p:nvPr>
-            <p:ph type="title"/>
-          </p:nvPr>
+          <p:cNvPr id="9" name="Rectangle 8"/>
+          <p:cNvSpPr>
+            <a:spLocks noChangeAspect="1"/>
+          </p:cNvSpPr>
+          <p:nvPr/>
         </p:nvSpPr>
         <p:spPr>
           <a:xfrm>
-            <a:off x="839788" y="457200"/>
-            <a:ext cx="3932237" cy="1600200"/>
+            <a:off x="447817" y="5141973"/>
+            <a:ext cx="11298200" cy="1274702"/>
+          </a:xfrm>
+          <a:prstGeom prst="rect">
+            <a:avLst/>
+          </a:prstGeom>
+          <a:solidFill>
+            <a:schemeClr val="accent1"/>
+          </a:solidFill>
+          <a:ln>
+            <a:noFill/>
+          </a:ln>
+          <a:effectLst/>
+        </p:spPr>
+        <p:style>
+          <a:lnRef idx="1">
+            <a:schemeClr val="accent1"/>
+          </a:lnRef>
+          <a:fillRef idx="3">
+            <a:schemeClr val="accent1"/>
+          </a:fillRef>
+          <a:effectRef idx="2">
+            <a:schemeClr val="accent1"/>
+          </a:effectRef>
+          <a:fontRef idx="minor">
+            <a:schemeClr val="lt1"/>
+          </a:fontRef>
+        </p:style>
+      </p:sp>
+      <p:sp>
+        <p:nvSpPr>
+          <p:cNvPr id="2" name="Title 1"/>
+          <p:cNvSpPr>
+            <a:spLocks noGrp="1"/>
+          </p:cNvSpPr>
+          <p:nvPr>
+            <p:ph type="title"/>
+          </p:nvPr>
+        </p:nvSpPr>
+        <p:spPr>
+          <a:xfrm>
+            <a:off x="581192" y="5262296"/>
+            <a:ext cx="4909445" cy="689514"/>
           </a:xfrm>
         </p:spPr>
         <p:txBody>
-          <a:bodyPr anchor="b"/>
+          <a:bodyPr anchor="ctr"/>
+          <a:lstStyle>
+            <a:lvl1pPr algn="l">
+              <a:defRPr sz="2000" b="0">
+                <a:solidFill>
+                  <a:schemeClr val="accent1">
+                    <a:lumMod val="75000"/>
+                    <a:lumOff val="25000"/>
+                  </a:schemeClr>
+                </a:solidFill>
+              </a:defRPr>
+            </a:lvl1pPr>
+          </a:lstStyle>
+          <a:p>
+            <a:r>
+              <a:rPr lang="it-IT"/>
+              <a:t>Fare clic per modificare lo stile del titolo dello schema</a:t>
+            </a:r>
+            <a:endParaRPr lang="en-US" dirty="0"/>
+          </a:p>
+        </p:txBody>
+      </p:sp>
+      <p:sp>
+        <p:nvSpPr>
+          <p:cNvPr id="3" name="Content Placeholder 2"/>
+          <p:cNvSpPr>
+            <a:spLocks noGrp="1"/>
+          </p:cNvSpPr>
+          <p:nvPr>
+            <p:ph idx="1"/>
+          </p:nvPr>
+        </p:nvSpPr>
+        <p:spPr>
+          <a:xfrm>
+            <a:off x="447816" y="601200"/>
+            <a:ext cx="11292840" cy="4204800"/>
+          </a:xfrm>
+        </p:spPr>
+        <p:txBody>
+          <a:bodyPr anchor="ctr">
+            <a:normAutofit/>
+          </a:bodyPr>
           <a:lstStyle>
             <a:lvl1pPr>
-              <a:defRPr sz="3200"/>
+              <a:defRPr sz="2000">
+                <a:solidFill>
+                  <a:schemeClr val="tx2"/>
+                </a:solidFill>
+              </a:defRPr>
             </a:lvl1pPr>
+            <a:lvl2pPr>
+              <a:defRPr sz="1800">
+                <a:solidFill>
+                  <a:schemeClr val="tx2"/>
+                </a:solidFill>
+              </a:defRPr>
+            </a:lvl2pPr>
+            <a:lvl3pPr>
+              <a:defRPr sz="1600">
+                <a:solidFill>
+                  <a:schemeClr val="tx2"/>
+                </a:solidFill>
+              </a:defRPr>
+            </a:lvl3pPr>
+            <a:lvl4pPr>
+              <a:defRPr sz="1400">
+                <a:solidFill>
+                  <a:schemeClr val="tx2"/>
+                </a:solidFill>
+              </a:defRPr>
+            </a:lvl4pPr>
+            <a:lvl5pPr>
+              <a:defRPr sz="1400">
+                <a:solidFill>
+                  <a:schemeClr val="tx2"/>
+                </a:solidFill>
+              </a:defRPr>
+            </a:lvl5pPr>
+            <a:lvl6pPr>
+              <a:defRPr sz="1400">
+                <a:solidFill>
+                  <a:schemeClr val="tx2"/>
+                </a:solidFill>
+              </a:defRPr>
+            </a:lvl6pPr>
+            <a:lvl7pPr>
+              <a:defRPr sz="1400">
+                <a:solidFill>
+                  <a:schemeClr val="tx2"/>
+                </a:solidFill>
+              </a:defRPr>
+            </a:lvl7pPr>
+            <a:lvl8pPr>
+              <a:defRPr sz="1400">
+                <a:solidFill>
+                  <a:schemeClr val="tx2"/>
+                </a:solidFill>
+              </a:defRPr>
+            </a:lvl8pPr>
+            <a:lvl9pPr>
+              <a:defRPr sz="1400">
+                <a:solidFill>
+                  <a:schemeClr val="tx2"/>
+                </a:solidFill>
+              </a:defRPr>
+            </a:lvl9pPr>
           </a:lstStyle>
           <a:p>
+            <a:pPr lvl="0"/>
             <a:r>
               <a:rPr lang="it-IT"/>
-              <a:t>Fare clic per modificare lo stile del titolo dello schema</a:t>
-            </a:r>
-          </a:p>
-        </p:txBody>
-      </p:sp>
-      <p:sp>
-        <p:nvSpPr>
-          <p:cNvPr id="3" name="Segnaposto contenuto 2">
-            <a:extLst>
-              <a:ext uri="{FF2B5EF4-FFF2-40B4-BE49-F238E27FC236}">
-                <a16:creationId xmlns:a16="http://schemas.microsoft.com/office/drawing/2014/main" id="{0D8AF8C0-563D-10F0-FD3E-08DBC363E47E}"/>
-              </a:ext>
-            </a:extLst>
-          </p:cNvPr>
-          <p:cNvSpPr>
-            <a:spLocks noGrp="1"/>
-          </p:cNvSpPr>
-          <p:nvPr>
-            <p:ph idx="1"/>
+              <a:t>Fare clic per modificare gli stili del testo dello schema</a:t>
+            </a:r>
+          </a:p>
+          <a:p>
+            <a:pPr lvl="1"/>
+            <a:r>
+              <a:rPr lang="it-IT"/>
+              <a:t>Secondo livello</a:t>
+            </a:r>
+          </a:p>
+          <a:p>
+            <a:pPr lvl="2"/>
+            <a:r>
+              <a:rPr lang="it-IT"/>
+              <a:t>Terzo livello</a:t>
+            </a:r>
+          </a:p>
+          <a:p>
+            <a:pPr lvl="3"/>
+            <a:r>
+              <a:rPr lang="it-IT"/>
+              <a:t>Quarto livello</a:t>
+            </a:r>
+          </a:p>
+          <a:p>
+            <a:pPr lvl="4"/>
+            <a:r>
+              <a:rPr lang="it-IT"/>
+              <a:t>Quinto livello</a:t>
+            </a:r>
+            <a:endParaRPr lang="en-US" dirty="0"/>
+          </a:p>
+        </p:txBody>
+      </p:sp>
+      <p:sp>
+        <p:nvSpPr>
+          <p:cNvPr id="4" name="Text Placeholder 3"/>
+          <p:cNvSpPr>
+            <a:spLocks noGrp="1"/>
+          </p:cNvSpPr>
+          <p:nvPr>
+            <p:ph type="body" sz="half" idx="2"/>
           </p:nvPr>
         </p:nvSpPr>
         <p:spPr>
           <a:xfrm>
-            <a:off x="5183188" y="987425"/>
-            <a:ext cx="6172200" cy="4873625"/>
+            <a:off x="5740823" y="5262296"/>
+            <a:ext cx="5869987" cy="689515"/>
           </a:xfrm>
         </p:spPr>
         <p:txBody>
-          <a:bodyPr/>
+          <a:bodyPr anchor="ctr">
+            <a:normAutofit/>
+          </a:bodyPr>
           <a:lstStyle>
-            <a:lvl1pPr>
-              <a:defRPr sz="3200"/>
-            </a:lvl1pPr>
-            <a:lvl2pPr>
-              <a:defRPr sz="2800"/>
-            </a:lvl2pPr>
-            <a:lvl3pPr>
-              <a:defRPr sz="2400"/>
-            </a:lvl3pPr>
-            <a:lvl4pPr>
-              <a:defRPr sz="2000"/>
-            </a:lvl4pPr>
-            <a:lvl5pPr>
-              <a:defRPr sz="2000"/>
-            </a:lvl5pPr>
-            <a:lvl6pPr>
-              <a:defRPr sz="2000"/>
-            </a:lvl6pPr>
-            <a:lvl7pPr>
-              <a:defRPr sz="2000"/>
-            </a:lvl7pPr>
-            <a:lvl8pPr>
-              <a:defRPr sz="2000"/>
-            </a:lvl8pPr>
-            <a:lvl9pPr>
-              <a:defRPr sz="2000"/>
-            </a:lvl9pPr>
-          </a:lstStyle>
-          <a:p>
-            <a:pPr lvl="0"/>
-            <a:r>
-              <a:rPr lang="it-IT"/>
-              <a:t>Fare clic per modificare gli stili del testo dello schema</a:t>
-            </a:r>
-          </a:p>
-          <a:p>
-            <a:pPr lvl="1"/>
-            <a:r>
-              <a:rPr lang="it-IT"/>
-              <a:t>Secondo livello</a:t>
-            </a:r>
-          </a:p>
-          <a:p>
-            <a:pPr lvl="2"/>
-            <a:r>
-              <a:rPr lang="it-IT"/>
-              <a:t>Terzo livello</a:t>
-            </a:r>
-          </a:p>
-          <a:p>
-            <a:pPr lvl="3"/>
-            <a:r>
-              <a:rPr lang="it-IT"/>
-              <a:t>Quarto livello</a:t>
-            </a:r>
-          </a:p>
-          <a:p>
-            <a:pPr lvl="4"/>
-            <a:r>
-              <a:rPr lang="it-IT"/>
-              <a:t>Quinto livello</a:t>
-            </a:r>
-          </a:p>
-        </p:txBody>
-      </p:sp>
-      <p:sp>
-        <p:nvSpPr>
-          <p:cNvPr id="4" name="Segnaposto testo 3">
-            <a:extLst>
-              <a:ext uri="{FF2B5EF4-FFF2-40B4-BE49-F238E27FC236}">
-                <a16:creationId xmlns:a16="http://schemas.microsoft.com/office/drawing/2014/main" id="{132F7CE7-690D-8191-1858-55B7C0FB5C09}"/>
-              </a:ext>
-            </a:extLst>
-          </p:cNvPr>
-          <p:cNvSpPr>
-            <a:spLocks noGrp="1"/>
-          </p:cNvSpPr>
-          <p:nvPr>
-            <p:ph type="body" sz="half" idx="2"/>
-          </p:nvPr>
-        </p:nvSpPr>
-        <p:spPr>
-          <a:xfrm>
-            <a:off x="839788" y="2057400"/>
-            <a:ext cx="3932237" cy="3811588"/>
-          </a:xfrm>
-        </p:spPr>
-        <p:txBody>
-          <a:bodyPr/>
-          <a:lstStyle>
-            <a:lvl1pPr marL="0" indent="0">
+            <a:lvl1pPr marL="0" indent="0" algn="r">
               <a:buNone/>
-              <a:defRPr sz="1600"/>
+              <a:defRPr sz="1100">
+                <a:solidFill>
+                  <a:schemeClr val="bg1"/>
+                </a:solidFill>
+              </a:defRPr>
             </a:lvl1pPr>
             <a:lvl2pPr marL="457200" indent="0">
               <a:buNone/>
-              <a:defRPr sz="1400"/>
+              <a:defRPr sz="1100"/>
             </a:lvl2pPr>
             <a:lvl3pPr marL="914400" indent="0">
               <a:buNone/>
-              <a:defRPr sz="1200"/>
+              <a:defRPr sz="1000"/>
             </a:lvl3pPr>
             <a:lvl4pPr marL="1371600" indent="0">
               <a:buNone/>
-              <a:defRPr sz="1000"/>
+              <a:defRPr sz="900"/>
             </a:lvl4pPr>
             <a:lvl5pPr marL="1828800" indent="0">
               <a:buNone/>
-              <a:defRPr sz="1000"/>
+              <a:defRPr sz="900"/>
             </a:lvl5pPr>
             <a:lvl6pPr marL="2286000" indent="0">
               <a:buNone/>
-              <a:defRPr sz="1000"/>
+              <a:defRPr sz="900"/>
             </a:lvl6pPr>
             <a:lvl7pPr marL="2743200" indent="0">
               <a:buNone/>
-              <a:defRPr sz="1000"/>
+              <a:defRPr sz="900"/>
             </a:lvl7pPr>
             <a:lvl8pPr marL="3200400" indent="0">
               <a:buNone/>
-              <a:defRPr sz="1000"/>
+              <a:defRPr sz="900"/>
             </a:lvl8pPr>
             <a:lvl9pPr marL="3657600" indent="0">
               <a:buNone/>
-              <a:defRPr sz="1000"/>
+              <a:defRPr sz="900"/>
             </a:lvl9pPr>
           </a:lstStyle>
           <a:p>
@@ -2375,13 +2750,7 @@
       </p:sp>
       <p:sp>
         <p:nvSpPr>
-          <p:cNvPr id="5" name="Segnaposto data 4">
-            <a:extLst>
-              <a:ext uri="{FF2B5EF4-FFF2-40B4-BE49-F238E27FC236}">
-                <a16:creationId xmlns:a16="http://schemas.microsoft.com/office/drawing/2014/main" id="{46C5469F-A461-44E3-35D5-B7D93DD40CE8}"/>
-              </a:ext>
-            </a:extLst>
-          </p:cNvPr>
+          <p:cNvPr id="5" name="Date Placeholder 4"/>
           <p:cNvSpPr>
             <a:spLocks noGrp="1"/>
           </p:cNvSpPr>
@@ -2392,11 +2761,22 @@
         <p:spPr/>
         <p:txBody>
           <a:bodyPr/>
-          <a:lstStyle/>
+          <a:lstStyle>
+            <a:lvl1pPr>
+              <a:defRPr>
+                <a:solidFill>
+                  <a:schemeClr val="accent1">
+                    <a:lumMod val="75000"/>
+                    <a:lumOff val="25000"/>
+                  </a:schemeClr>
+                </a:solidFill>
+              </a:defRPr>
+            </a:lvl1pPr>
+          </a:lstStyle>
           <a:p>
             <a:fld id="{F259A98E-7D3E-4BAE-A284-2CE0D83E33BF}" type="datetimeFigureOut">
               <a:rPr lang="it-IT" smtClean="0"/>
-              <a:t>02/11/2023</a:t>
+              <a:t>09/12/2023</a:t>
             </a:fld>
             <a:endParaRPr lang="it-IT"/>
           </a:p>
@@ -2404,13 +2784,7 @@
       </p:sp>
       <p:sp>
         <p:nvSpPr>
-          <p:cNvPr id="6" name="Segnaposto piè di pagina 5">
-            <a:extLst>
-              <a:ext uri="{FF2B5EF4-FFF2-40B4-BE49-F238E27FC236}">
-                <a16:creationId xmlns:a16="http://schemas.microsoft.com/office/drawing/2014/main" id="{E65E8112-78AD-A04E-25B4-EE791748DB31}"/>
-              </a:ext>
-            </a:extLst>
-          </p:cNvPr>
+          <p:cNvPr id="6" name="Footer Placeholder 5"/>
           <p:cNvSpPr>
             <a:spLocks noGrp="1"/>
           </p:cNvSpPr>
@@ -2421,7 +2795,18 @@
         <p:spPr/>
         <p:txBody>
           <a:bodyPr/>
-          <a:lstStyle/>
+          <a:lstStyle>
+            <a:lvl1pPr>
+              <a:defRPr>
+                <a:solidFill>
+                  <a:schemeClr val="accent1">
+                    <a:lumMod val="75000"/>
+                    <a:lumOff val="25000"/>
+                  </a:schemeClr>
+                </a:solidFill>
+              </a:defRPr>
+            </a:lvl1pPr>
+          </a:lstStyle>
           <a:p>
             <a:endParaRPr lang="it-IT"/>
           </a:p>
@@ -2429,13 +2814,7 @@
       </p:sp>
       <p:sp>
         <p:nvSpPr>
-          <p:cNvPr id="7" name="Segnaposto numero diapositiva 6">
-            <a:extLst>
-              <a:ext uri="{FF2B5EF4-FFF2-40B4-BE49-F238E27FC236}">
-                <a16:creationId xmlns:a16="http://schemas.microsoft.com/office/drawing/2014/main" id="{C2E6F5CD-A46C-1499-9BF7-8D06753173EC}"/>
-              </a:ext>
-            </a:extLst>
-          </p:cNvPr>
+          <p:cNvPr id="7" name="Slide Number Placeholder 6"/>
           <p:cNvSpPr>
             <a:spLocks noGrp="1"/>
           </p:cNvSpPr>
@@ -2446,7 +2825,18 @@
         <p:spPr/>
         <p:txBody>
           <a:bodyPr/>
-          <a:lstStyle/>
+          <a:lstStyle>
+            <a:lvl1pPr>
+              <a:defRPr>
+                <a:solidFill>
+                  <a:schemeClr val="accent1">
+                    <a:lumMod val="75000"/>
+                    <a:lumOff val="25000"/>
+                  </a:schemeClr>
+                </a:solidFill>
+              </a:defRPr>
+            </a:lvl1pPr>
+          </a:lstStyle>
           <a:p>
             <a:fld id="{FD8D997C-7E66-44D2-B54E-C5D091DF0A81}" type="slidenum">
               <a:rPr lang="it-IT" smtClean="0"/>
@@ -2459,7 +2849,7 @@
     </p:spTree>
     <p:extLst>
       <p:ext uri="{BB962C8B-B14F-4D97-AF65-F5344CB8AC3E}">
-        <p14:creationId xmlns:p14="http://schemas.microsoft.com/office/powerpoint/2010/main" val="1984484521"/>
+        <p14:creationId xmlns:p14="http://schemas.microsoft.com/office/powerpoint/2010/main" val="2350339118"/>
       </p:ext>
     </p:extLst>
   </p:cSld>
@@ -2488,13 +2878,7 @@
       </p:grpSpPr>
       <p:sp>
         <p:nvSpPr>
-          <p:cNvPr id="2" name="Titolo 1">
-            <a:extLst>
-              <a:ext uri="{FF2B5EF4-FFF2-40B4-BE49-F238E27FC236}">
-                <a16:creationId xmlns:a16="http://schemas.microsoft.com/office/drawing/2014/main" id="{57B61C0A-B417-8B6D-59E3-0E9EFA82E0B6}"/>
-              </a:ext>
-            </a:extLst>
-          </p:cNvPr>
+          <p:cNvPr id="2" name="Title 1"/>
           <p:cNvSpPr>
             <a:spLocks noGrp="1"/>
           </p:cNvSpPr>
@@ -2504,15 +2888,21 @@
         </p:nvSpPr>
         <p:spPr>
           <a:xfrm>
-            <a:off x="839788" y="457200"/>
-            <a:ext cx="3932237" cy="1600200"/>
+            <a:off x="581193" y="4693389"/>
+            <a:ext cx="11029616" cy="566738"/>
           </a:xfrm>
         </p:spPr>
         <p:txBody>
-          <a:bodyPr anchor="b"/>
+          <a:bodyPr anchor="b">
+            <a:normAutofit/>
+          </a:bodyPr>
           <a:lstStyle>
-            <a:lvl1pPr>
-              <a:defRPr sz="3200"/>
+            <a:lvl1pPr algn="l">
+              <a:defRPr sz="2400" b="0">
+                <a:solidFill>
+                  <a:schemeClr val="accent1"/>
+                </a:solidFill>
+              </a:defRPr>
             </a:lvl1pPr>
           </a:lstStyle>
           <a:p>
@@ -2520,20 +2910,15 @@
               <a:rPr lang="it-IT"/>
               <a:t>Fare clic per modificare lo stile del titolo dello schema</a:t>
             </a:r>
-          </a:p>
-        </p:txBody>
-      </p:sp>
-      <p:sp>
-        <p:nvSpPr>
-          <p:cNvPr id="3" name="Segnaposto immagine 2">
-            <a:extLst>
-              <a:ext uri="{FF2B5EF4-FFF2-40B4-BE49-F238E27FC236}">
-                <a16:creationId xmlns:a16="http://schemas.microsoft.com/office/drawing/2014/main" id="{2672DB44-04ED-A522-B6EE-2915D1422C8F}"/>
-              </a:ext>
-            </a:extLst>
-          </p:cNvPr>
-          <p:cNvSpPr>
-            <a:spLocks noGrp="1"/>
+            <a:endParaRPr lang="en-US" dirty="0"/>
+          </a:p>
+        </p:txBody>
+      </p:sp>
+      <p:sp>
+        <p:nvSpPr>
+          <p:cNvPr id="3" name="Picture Placeholder 2"/>
+          <p:cNvSpPr>
+            <a:spLocks noGrp="1" noChangeAspect="1"/>
           </p:cNvSpPr>
           <p:nvPr>
             <p:ph type="pic" idx="1"/>
@@ -2541,118 +2926,120 @@
         </p:nvSpPr>
         <p:spPr>
           <a:xfrm>
-            <a:off x="5183188" y="987425"/>
-            <a:ext cx="6172200" cy="4873625"/>
+            <a:off x="447817" y="599725"/>
+            <a:ext cx="11290859" cy="3557252"/>
           </a:xfrm>
         </p:spPr>
         <p:txBody>
-          <a:bodyPr/>
+          <a:bodyPr anchor="t">
+            <a:normAutofit/>
+          </a:bodyPr>
           <a:lstStyle>
-            <a:lvl1pPr marL="0" indent="0">
-              <a:buNone/>
-              <a:defRPr sz="3200"/>
-            </a:lvl1pPr>
-            <a:lvl2pPr marL="457200" indent="0">
-              <a:buNone/>
-              <a:defRPr sz="2800"/>
-            </a:lvl2pPr>
-            <a:lvl3pPr marL="914400" indent="0">
-              <a:buNone/>
-              <a:defRPr sz="2400"/>
-            </a:lvl3pPr>
-            <a:lvl4pPr marL="1371600" indent="0">
-              <a:buNone/>
-              <a:defRPr sz="2000"/>
-            </a:lvl4pPr>
-            <a:lvl5pPr marL="1828800" indent="0">
-              <a:buNone/>
-              <a:defRPr sz="2000"/>
-            </a:lvl5pPr>
-            <a:lvl6pPr marL="2286000" indent="0">
-              <a:buNone/>
-              <a:defRPr sz="2000"/>
-            </a:lvl6pPr>
-            <a:lvl7pPr marL="2743200" indent="0">
-              <a:buNone/>
-              <a:defRPr sz="2000"/>
-            </a:lvl7pPr>
-            <a:lvl8pPr marL="3200400" indent="0">
-              <a:buNone/>
-              <a:defRPr sz="2000"/>
-            </a:lvl8pPr>
-            <a:lvl9pPr marL="3657600" indent="0">
-              <a:buNone/>
-              <a:defRPr sz="2000"/>
-            </a:lvl9pPr>
-          </a:lstStyle>
-          <a:p>
-            <a:endParaRPr lang="it-IT"/>
-          </a:p>
-        </p:txBody>
-      </p:sp>
-      <p:sp>
-        <p:nvSpPr>
-          <p:cNvPr id="4" name="Segnaposto testo 3">
-            <a:extLst>
-              <a:ext uri="{FF2B5EF4-FFF2-40B4-BE49-F238E27FC236}">
-                <a16:creationId xmlns:a16="http://schemas.microsoft.com/office/drawing/2014/main" id="{FF89E8B1-FF88-7604-EA85-927349915E8A}"/>
-              </a:ext>
-            </a:extLst>
-          </p:cNvPr>
-          <p:cNvSpPr>
-            <a:spLocks noGrp="1"/>
-          </p:cNvSpPr>
-          <p:nvPr>
-            <p:ph type="body" sz="half" idx="2"/>
-          </p:nvPr>
-        </p:nvSpPr>
-        <p:spPr>
-          <a:xfrm>
-            <a:off x="839788" y="2057400"/>
-            <a:ext cx="3932237" cy="3811588"/>
-          </a:xfrm>
-        </p:spPr>
-        <p:txBody>
-          <a:bodyPr/>
-          <a:lstStyle>
-            <a:lvl1pPr marL="0" indent="0">
+            <a:lvl1pPr marL="0" indent="0" algn="ctr">
               <a:buNone/>
               <a:defRPr sz="1600"/>
             </a:lvl1pPr>
             <a:lvl2pPr marL="457200" indent="0">
               <a:buNone/>
-              <a:defRPr sz="1400"/>
+              <a:defRPr sz="1600"/>
             </a:lvl2pPr>
             <a:lvl3pPr marL="914400" indent="0">
               <a:buNone/>
-              <a:defRPr sz="1200"/>
+              <a:defRPr sz="1600"/>
             </a:lvl3pPr>
             <a:lvl4pPr marL="1371600" indent="0">
               <a:buNone/>
-              <a:defRPr sz="1000"/>
+              <a:defRPr sz="1600"/>
             </a:lvl4pPr>
             <a:lvl5pPr marL="1828800" indent="0">
               <a:buNone/>
-              <a:defRPr sz="1000"/>
+              <a:defRPr sz="1600"/>
             </a:lvl5pPr>
             <a:lvl6pPr marL="2286000" indent="0">
               <a:buNone/>
-              <a:defRPr sz="1000"/>
+              <a:defRPr sz="1600"/>
             </a:lvl6pPr>
             <a:lvl7pPr marL="2743200" indent="0">
               <a:buNone/>
-              <a:defRPr sz="1000"/>
+              <a:defRPr sz="1600"/>
             </a:lvl7pPr>
             <a:lvl8pPr marL="3200400" indent="0">
               <a:buNone/>
-              <a:defRPr sz="1000"/>
+              <a:defRPr sz="1600"/>
             </a:lvl8pPr>
             <a:lvl9pPr marL="3657600" indent="0">
               <a:buNone/>
-              <a:defRPr sz="1000"/>
+              <a:defRPr sz="1600"/>
             </a:lvl9pPr>
           </a:lstStyle>
           <a:p>
+            <a:r>
+              <a:rPr lang="it-IT"/>
+              <a:t>Fare clic sull'icona per inserire un'immagine</a:t>
+            </a:r>
+            <a:endParaRPr lang="en-US" dirty="0"/>
+          </a:p>
+        </p:txBody>
+      </p:sp>
+      <p:sp>
+        <p:nvSpPr>
+          <p:cNvPr id="4" name="Text Placeholder 3"/>
+          <p:cNvSpPr>
+            <a:spLocks noGrp="1"/>
+          </p:cNvSpPr>
+          <p:nvPr>
+            <p:ph type="body" sz="half" idx="2"/>
+          </p:nvPr>
+        </p:nvSpPr>
+        <p:spPr>
+          <a:xfrm>
+            <a:off x="581192" y="5260127"/>
+            <a:ext cx="11029617" cy="598671"/>
+          </a:xfrm>
+        </p:spPr>
+        <p:txBody>
+          <a:bodyPr>
+            <a:normAutofit/>
+          </a:bodyPr>
+          <a:lstStyle>
+            <a:lvl1pPr marL="0" indent="0">
+              <a:buNone/>
+              <a:defRPr sz="1200"/>
+            </a:lvl1pPr>
+            <a:lvl2pPr marL="457200" indent="0">
+              <a:buNone/>
+              <a:defRPr sz="1200"/>
+            </a:lvl2pPr>
+            <a:lvl3pPr marL="914400" indent="0">
+              <a:buNone/>
+              <a:defRPr sz="1000"/>
+            </a:lvl3pPr>
+            <a:lvl4pPr marL="1371600" indent="0">
+              <a:buNone/>
+              <a:defRPr sz="900"/>
+            </a:lvl4pPr>
+            <a:lvl5pPr marL="1828800" indent="0">
+              <a:buNone/>
+              <a:defRPr sz="900"/>
+            </a:lvl5pPr>
+            <a:lvl6pPr marL="2286000" indent="0">
+              <a:buNone/>
+              <a:defRPr sz="900"/>
+            </a:lvl6pPr>
+            <a:lvl7pPr marL="2743200" indent="0">
+              <a:buNone/>
+              <a:defRPr sz="900"/>
+            </a:lvl7pPr>
+            <a:lvl8pPr marL="3200400" indent="0">
+              <a:buNone/>
+              <a:defRPr sz="900"/>
+            </a:lvl8pPr>
+            <a:lvl9pPr marL="3657600" indent="0">
+              <a:buNone/>
+              <a:defRPr sz="900"/>
+            </a:lvl9pPr>
+          </a:lstStyle>
+          <a:p>
             <a:pPr lvl="0"/>
             <a:r>
               <a:rPr lang="it-IT"/>
@@ -2663,13 +3050,7 @@
       </p:sp>
       <p:sp>
         <p:nvSpPr>
-          <p:cNvPr id="5" name="Segnaposto data 4">
-            <a:extLst>
-              <a:ext uri="{FF2B5EF4-FFF2-40B4-BE49-F238E27FC236}">
-                <a16:creationId xmlns:a16="http://schemas.microsoft.com/office/drawing/2014/main" id="{5423F2D8-47F7-8C99-61AA-048A8FA14AFF}"/>
-              </a:ext>
-            </a:extLst>
-          </p:cNvPr>
+          <p:cNvPr id="5" name="Date Placeholder 4"/>
           <p:cNvSpPr>
             <a:spLocks noGrp="1"/>
           </p:cNvSpPr>
@@ -2684,7 +3065,7 @@
           <a:p>
             <a:fld id="{F259A98E-7D3E-4BAE-A284-2CE0D83E33BF}" type="datetimeFigureOut">
               <a:rPr lang="it-IT" smtClean="0"/>
-              <a:t>02/11/2023</a:t>
+              <a:t>09/12/2023</a:t>
             </a:fld>
             <a:endParaRPr lang="it-IT"/>
           </a:p>
@@ -2692,13 +3073,7 @@
       </p:sp>
       <p:sp>
         <p:nvSpPr>
-          <p:cNvPr id="6" name="Segnaposto piè di pagina 5">
-            <a:extLst>
-              <a:ext uri="{FF2B5EF4-FFF2-40B4-BE49-F238E27FC236}">
-                <a16:creationId xmlns:a16="http://schemas.microsoft.com/office/drawing/2014/main" id="{E59466BE-1C15-6D8B-649D-D82E16E42D68}"/>
-              </a:ext>
-            </a:extLst>
-          </p:cNvPr>
+          <p:cNvPr id="6" name="Footer Placeholder 5"/>
           <p:cNvSpPr>
             <a:spLocks noGrp="1"/>
           </p:cNvSpPr>
@@ -2717,13 +3092,7 @@
       </p:sp>
       <p:sp>
         <p:nvSpPr>
-          <p:cNvPr id="7" name="Segnaposto numero diapositiva 6">
-            <a:extLst>
-              <a:ext uri="{FF2B5EF4-FFF2-40B4-BE49-F238E27FC236}">
-                <a16:creationId xmlns:a16="http://schemas.microsoft.com/office/drawing/2014/main" id="{00961E86-4443-334D-F651-9D82658DBAEA}"/>
-              </a:ext>
-            </a:extLst>
-          </p:cNvPr>
+          <p:cNvPr id="7" name="Slide Number Placeholder 6"/>
           <p:cNvSpPr>
             <a:spLocks noGrp="1"/>
           </p:cNvSpPr>
@@ -2747,7 +3116,7 @@
     </p:spTree>
     <p:extLst>
       <p:ext uri="{BB962C8B-B14F-4D97-AF65-F5344CB8AC3E}">
-        <p14:creationId xmlns:p14="http://schemas.microsoft.com/office/powerpoint/2010/main" val="2283336227"/>
+        <p14:creationId xmlns:p14="http://schemas.microsoft.com/office/powerpoint/2010/main" val="3148190781"/>
       </p:ext>
     </p:extLst>
   </p:cSld>
@@ -2781,13 +3150,7 @@
       </p:grpSpPr>
       <p:sp>
         <p:nvSpPr>
-          <p:cNvPr id="2" name="Segnaposto titolo 1">
-            <a:extLst>
-              <a:ext uri="{FF2B5EF4-FFF2-40B4-BE49-F238E27FC236}">
-                <a16:creationId xmlns:a16="http://schemas.microsoft.com/office/drawing/2014/main" id="{04788C13-B450-8732-67A0-51D6ACBB2C99}"/>
-              </a:ext>
-            </a:extLst>
-          </p:cNvPr>
+          <p:cNvPr id="2" name="Title Placeholder 1"/>
           <p:cNvSpPr>
             <a:spLocks noGrp="1"/>
           </p:cNvSpPr>
@@ -2797,15 +3160,15 @@
         </p:nvSpPr>
         <p:spPr>
           <a:xfrm>
-            <a:off x="838200" y="365125"/>
-            <a:ext cx="10515600" cy="1325563"/>
+            <a:off x="581192" y="705124"/>
+            <a:ext cx="11029616" cy="1189554"/>
           </a:xfrm>
           <a:prstGeom prst="rect">
             <a:avLst/>
           </a:prstGeom>
         </p:spPr>
         <p:txBody>
-          <a:bodyPr vert="horz" lIns="91440" tIns="45720" rIns="91440" bIns="45720" rtlCol="0" anchor="ctr">
+          <a:bodyPr vert="horz" lIns="91440" tIns="45720" rIns="91440" bIns="45720" rtlCol="0" anchor="b">
             <a:normAutofit/>
           </a:bodyPr>
           <a:lstStyle/>
@@ -2814,18 +3177,13 @@
               <a:rPr lang="it-IT"/>
               <a:t>Fare clic per modificare lo stile del titolo dello schema</a:t>
             </a:r>
-          </a:p>
-        </p:txBody>
-      </p:sp>
-      <p:sp>
-        <p:nvSpPr>
-          <p:cNvPr id="3" name="Segnaposto testo 2">
-            <a:extLst>
-              <a:ext uri="{FF2B5EF4-FFF2-40B4-BE49-F238E27FC236}">
-                <a16:creationId xmlns:a16="http://schemas.microsoft.com/office/drawing/2014/main" id="{ADB9AD8D-A112-CB35-084A-DD158DD86095}"/>
-              </a:ext>
-            </a:extLst>
-          </p:cNvPr>
+            <a:endParaRPr lang="en-US" dirty="0"/>
+          </a:p>
+        </p:txBody>
+      </p:sp>
+      <p:sp>
+        <p:nvSpPr>
+          <p:cNvPr id="3" name="Text Placeholder 2"/>
           <p:cNvSpPr>
             <a:spLocks noGrp="1"/>
           </p:cNvSpPr>
@@ -2835,15 +3193,15 @@
         </p:nvSpPr>
         <p:spPr>
           <a:xfrm>
-            <a:off x="838200" y="1825625"/>
-            <a:ext cx="10515600" cy="4351338"/>
+            <a:off x="581192" y="2336003"/>
+            <a:ext cx="11029616" cy="3522794"/>
           </a:xfrm>
           <a:prstGeom prst="rect">
             <a:avLst/>
           </a:prstGeom>
         </p:spPr>
         <p:txBody>
-          <a:bodyPr vert="horz" lIns="91440" tIns="45720" rIns="91440" bIns="45720" rtlCol="0">
+          <a:bodyPr vert="horz" lIns="91440" tIns="45720" rIns="91440" bIns="45720" rtlCol="0" anchor="ctr">
             <a:normAutofit/>
           </a:bodyPr>
           <a:lstStyle/>
@@ -2881,18 +3239,13 @@
               <a:rPr lang="it-IT"/>
               <a:t>Quinto livello</a:t>
             </a:r>
-          </a:p>
-        </p:txBody>
-      </p:sp>
-      <p:sp>
-        <p:nvSpPr>
-          <p:cNvPr id="4" name="Segnaposto data 3">
-            <a:extLst>
-              <a:ext uri="{FF2B5EF4-FFF2-40B4-BE49-F238E27FC236}">
-                <a16:creationId xmlns:a16="http://schemas.microsoft.com/office/drawing/2014/main" id="{36509D51-4462-8C2B-FA6B-28C1CAFB68EA}"/>
-              </a:ext>
-            </a:extLst>
-          </p:cNvPr>
+            <a:endParaRPr lang="en-US" dirty="0"/>
+          </a:p>
+        </p:txBody>
+      </p:sp>
+      <p:sp>
+        <p:nvSpPr>
+          <p:cNvPr id="4" name="Date Placeholder 3"/>
           <p:cNvSpPr>
             <a:spLocks noGrp="1"/>
           </p:cNvSpPr>
@@ -2902,8 +3255,8 @@
         </p:nvSpPr>
         <p:spPr>
           <a:xfrm>
-            <a:off x="838200" y="6356350"/>
-            <a:ext cx="2743200" cy="365125"/>
+            <a:off x="7605951" y="5956137"/>
+            <a:ext cx="2844799" cy="365125"/>
           </a:xfrm>
           <a:prstGeom prst="rect">
             <a:avLst/>
@@ -2912,12 +3265,10 @@
         <p:txBody>
           <a:bodyPr vert="horz" lIns="91440" tIns="45720" rIns="91440" bIns="45720" rtlCol="0" anchor="ctr"/>
           <a:lstStyle>
-            <a:lvl1pPr algn="l">
-              <a:defRPr sz="1200">
+            <a:lvl1pPr algn="r">
+              <a:defRPr sz="900">
                 <a:solidFill>
-                  <a:schemeClr val="tx1">
-                    <a:tint val="82000"/>
-                  </a:schemeClr>
+                  <a:schemeClr val="accent2"/>
                 </a:solidFill>
               </a:defRPr>
             </a:lvl1pPr>
@@ -2925,7 +3276,7 @@
           <a:p>
             <a:fld id="{F259A98E-7D3E-4BAE-A284-2CE0D83E33BF}" type="datetimeFigureOut">
               <a:rPr lang="it-IT" smtClean="0"/>
-              <a:t>02/11/2023</a:t>
+              <a:t>09/12/2023</a:t>
             </a:fld>
             <a:endParaRPr lang="it-IT"/>
           </a:p>
@@ -2933,13 +3284,7 @@
       </p:sp>
       <p:sp>
         <p:nvSpPr>
-          <p:cNvPr id="5" name="Segnaposto piè di pagina 4">
-            <a:extLst>
-              <a:ext uri="{FF2B5EF4-FFF2-40B4-BE49-F238E27FC236}">
-                <a16:creationId xmlns:a16="http://schemas.microsoft.com/office/drawing/2014/main" id="{76508862-526B-7604-9200-F5259530EE32}"/>
-              </a:ext>
-            </a:extLst>
-          </p:cNvPr>
+          <p:cNvPr id="5" name="Footer Placeholder 4"/>
           <p:cNvSpPr>
             <a:spLocks noGrp="1"/>
           </p:cNvSpPr>
@@ -2949,8 +3294,8 @@
         </p:nvSpPr>
         <p:spPr>
           <a:xfrm>
-            <a:off x="4038600" y="6356350"/>
-            <a:ext cx="4114800" cy="365125"/>
+            <a:off x="581192" y="5951811"/>
+            <a:ext cx="6917210" cy="365125"/>
           </a:xfrm>
           <a:prstGeom prst="rect">
             <a:avLst/>
@@ -2959,12 +3304,10 @@
         <p:txBody>
           <a:bodyPr vert="horz" lIns="91440" tIns="45720" rIns="91440" bIns="45720" rtlCol="0" anchor="ctr"/>
           <a:lstStyle>
-            <a:lvl1pPr algn="ctr">
-              <a:defRPr sz="1200">
+            <a:lvl1pPr algn="l">
+              <a:defRPr sz="900" cap="all">
                 <a:solidFill>
-                  <a:schemeClr val="tx1">
-                    <a:tint val="82000"/>
-                  </a:schemeClr>
+                  <a:schemeClr val="accent2"/>
                 </a:solidFill>
               </a:defRPr>
             </a:lvl1pPr>
@@ -2976,13 +3319,7 @@
       </p:sp>
       <p:sp>
         <p:nvSpPr>
-          <p:cNvPr id="6" name="Segnaposto numero diapositiva 5">
-            <a:extLst>
-              <a:ext uri="{FF2B5EF4-FFF2-40B4-BE49-F238E27FC236}">
-                <a16:creationId xmlns:a16="http://schemas.microsoft.com/office/drawing/2014/main" id="{6E1D711C-ECDB-289A-4C61-E4CCCE2F970C}"/>
-              </a:ext>
-            </a:extLst>
-          </p:cNvPr>
+          <p:cNvPr id="6" name="Slide Number Placeholder 5"/>
           <p:cNvSpPr>
             <a:spLocks noGrp="1"/>
           </p:cNvSpPr>
@@ -2992,8 +3329,8 @@
         </p:nvSpPr>
         <p:spPr>
           <a:xfrm>
-            <a:off x="8610600" y="6356350"/>
-            <a:ext cx="2743200" cy="365125"/>
+            <a:off x="10558300" y="5956137"/>
+            <a:ext cx="1052510" cy="365125"/>
           </a:xfrm>
           <a:prstGeom prst="rect">
             <a:avLst/>
@@ -3003,11 +3340,9 @@
           <a:bodyPr vert="horz" lIns="91440" tIns="45720" rIns="91440" bIns="45720" rtlCol="0" anchor="ctr"/>
           <a:lstStyle>
             <a:lvl1pPr algn="r">
-              <a:defRPr sz="1200">
+              <a:defRPr sz="900">
                 <a:solidFill>
-                  <a:schemeClr val="tx1">
-                    <a:tint val="82000"/>
-                  </a:schemeClr>
+                  <a:schemeClr val="accent2"/>
                 </a:solidFill>
               </a:defRPr>
             </a:lvl1pPr>
@@ -3021,58 +3356,417 @@
           </a:p>
         </p:txBody>
       </p:sp>
+      <p:sp>
+        <p:nvSpPr>
+          <p:cNvPr id="9" name="Rectangle 8"/>
+          <p:cNvSpPr/>
+          <p:nvPr/>
+        </p:nvSpPr>
+        <p:spPr>
+          <a:xfrm>
+            <a:off x="446534" y="457200"/>
+            <a:ext cx="3703320" cy="94997"/>
+          </a:xfrm>
+          <a:prstGeom prst="rect">
+            <a:avLst/>
+          </a:prstGeom>
+          <a:solidFill>
+            <a:schemeClr val="accent1"/>
+          </a:solidFill>
+          <a:ln>
+            <a:noFill/>
+          </a:ln>
+          <a:effectLst/>
+        </p:spPr>
+        <p:style>
+          <a:lnRef idx="1">
+            <a:schemeClr val="accent1"/>
+          </a:lnRef>
+          <a:fillRef idx="3">
+            <a:schemeClr val="accent1"/>
+          </a:fillRef>
+          <a:effectRef idx="2">
+            <a:schemeClr val="accent1"/>
+          </a:effectRef>
+          <a:fontRef idx="minor">
+            <a:schemeClr val="lt1"/>
+          </a:fontRef>
+        </p:style>
+      </p:sp>
+      <p:sp>
+        <p:nvSpPr>
+          <p:cNvPr id="10" name="Rectangle 9"/>
+          <p:cNvSpPr/>
+          <p:nvPr/>
+        </p:nvSpPr>
+        <p:spPr>
+          <a:xfrm>
+            <a:off x="8042147" y="453643"/>
+            <a:ext cx="3703320" cy="98554"/>
+          </a:xfrm>
+          <a:prstGeom prst="rect">
+            <a:avLst/>
+          </a:prstGeom>
+          <a:solidFill>
+            <a:schemeClr val="accent4"/>
+          </a:solidFill>
+          <a:ln>
+            <a:noFill/>
+          </a:ln>
+          <a:effectLst/>
+        </p:spPr>
+        <p:style>
+          <a:lnRef idx="1">
+            <a:schemeClr val="accent1"/>
+          </a:lnRef>
+          <a:fillRef idx="3">
+            <a:schemeClr val="accent1"/>
+          </a:fillRef>
+          <a:effectRef idx="2">
+            <a:schemeClr val="accent1"/>
+          </a:effectRef>
+          <a:fontRef idx="minor">
+            <a:schemeClr val="lt1"/>
+          </a:fontRef>
+        </p:style>
+      </p:sp>
+      <p:sp>
+        <p:nvSpPr>
+          <p:cNvPr id="11" name="Rectangle 10"/>
+          <p:cNvSpPr/>
+          <p:nvPr/>
+        </p:nvSpPr>
+        <p:spPr>
+          <a:xfrm>
+            <a:off x="4241830" y="457200"/>
+            <a:ext cx="3703320" cy="91440"/>
+          </a:xfrm>
+          <a:prstGeom prst="rect">
+            <a:avLst/>
+          </a:prstGeom>
+          <a:solidFill>
+            <a:schemeClr val="accent2"/>
+          </a:solidFill>
+          <a:ln>
+            <a:noFill/>
+          </a:ln>
+          <a:effectLst/>
+        </p:spPr>
+        <p:style>
+          <a:lnRef idx="1">
+            <a:schemeClr val="accent1"/>
+          </a:lnRef>
+          <a:fillRef idx="3">
+            <a:schemeClr val="accent1"/>
+          </a:fillRef>
+          <a:effectRef idx="2">
+            <a:schemeClr val="accent1"/>
+          </a:effectRef>
+          <a:fontRef idx="minor">
+            <a:schemeClr val="lt1"/>
+          </a:fontRef>
+        </p:style>
+      </p:sp>
     </p:spTree>
     <p:extLst>
       <p:ext uri="{BB962C8B-B14F-4D97-AF65-F5344CB8AC3E}">
-        <p14:creationId xmlns:p14="http://schemas.microsoft.com/office/powerpoint/2010/main" val="1524621032"/>
+        <p14:creationId xmlns:p14="http://schemas.microsoft.com/office/powerpoint/2010/main" val="1227715547"/>
       </p:ext>
     </p:extLst>
   </p:cSld>
   <p:clrMap bg1="lt1" tx1="dk1" bg2="lt2" tx2="dk2" accent1="accent1" accent2="accent2" accent3="accent3" accent4="accent4" accent5="accent5" accent6="accent6" hlink="hlink" folHlink="folHlink"/>
   <p:sldLayoutIdLst>
-    <p:sldLayoutId id="2147483649" r:id="rId1"/>
-    <p:sldLayoutId id="2147483650" r:id="rId2"/>
-    <p:sldLayoutId id="2147483651" r:id="rId3"/>
-    <p:sldLayoutId id="2147483652" r:id="rId4"/>
-    <p:sldLayoutId id="2147483653" r:id="rId5"/>
-    <p:sldLayoutId id="2147483654" r:id="rId6"/>
-    <p:sldLayoutId id="2147483655" r:id="rId7"/>
-    <p:sldLayoutId id="2147483656" r:id="rId8"/>
-    <p:sldLayoutId id="2147483657" r:id="rId9"/>
-    <p:sldLayoutId id="2147483658" r:id="rId10"/>
-    <p:sldLayoutId id="2147483659" r:id="rId11"/>
+    <p:sldLayoutId id="2147483685" r:id="rId1"/>
+    <p:sldLayoutId id="2147483686" r:id="rId2"/>
+    <p:sldLayoutId id="2147483687" r:id="rId3"/>
+    <p:sldLayoutId id="2147483688" r:id="rId4"/>
+    <p:sldLayoutId id="2147483689" r:id="rId5"/>
+    <p:sldLayoutId id="2147483690" r:id="rId6"/>
+    <p:sldLayoutId id="2147483691" r:id="rId7"/>
+    <p:sldLayoutId id="2147483692" r:id="rId8"/>
+    <p:sldLayoutId id="2147483693" r:id="rId9"/>
+    <p:sldLayoutId id="2147483694" r:id="rId10"/>
+    <p:sldLayoutId id="2147483695" r:id="rId11"/>
   </p:sldLayoutIdLst>
   <p:txStyles>
     <p:titleStyle>
-      <a:lvl1pPr algn="l" defTabSz="914400" rtl="0" eaLnBrk="1" latinLnBrk="0" hangingPunct="1">
-        <a:lnSpc>
-          <a:spcPct val="90000"/>
-        </a:lnSpc>
+      <a:lvl1pPr algn="l" defTabSz="457200" rtl="0" eaLnBrk="1" latinLnBrk="0" hangingPunct="1">
         <a:spcBef>
           <a:spcPct val="0"/>
         </a:spcBef>
         <a:buNone/>
-        <a:defRPr sz="4400" kern="1200">
+        <a:defRPr sz="2800" b="0" kern="1200" cap="all">
           <a:solidFill>
-            <a:schemeClr val="tx1"/>
+            <a:schemeClr val="bg1"/>
           </a:solidFill>
           <a:latin typeface="+mj-lt"/>
           <a:ea typeface="+mj-ea"/>
           <a:cs typeface="+mj-cs"/>
         </a:defRPr>
       </a:lvl1pPr>
+      <a:lvl2pPr eaLnBrk="1" hangingPunct="1">
+        <a:defRPr>
+          <a:solidFill>
+            <a:schemeClr val="tx2"/>
+          </a:solidFill>
+        </a:defRPr>
+      </a:lvl2pPr>
+      <a:lvl3pPr eaLnBrk="1" hangingPunct="1">
+        <a:defRPr>
+          <a:solidFill>
+            <a:schemeClr val="tx2"/>
+          </a:solidFill>
+        </a:defRPr>
+      </a:lvl3pPr>
+      <a:lvl4pPr eaLnBrk="1" hangingPunct="1">
+        <a:defRPr>
+          <a:solidFill>
+            <a:schemeClr val="tx2"/>
+          </a:solidFill>
+        </a:defRPr>
+      </a:lvl4pPr>
+      <a:lvl5pPr eaLnBrk="1" hangingPunct="1">
+        <a:defRPr>
+          <a:solidFill>
+            <a:schemeClr val="tx2"/>
+          </a:solidFill>
+        </a:defRPr>
+      </a:lvl5pPr>
+      <a:lvl6pPr eaLnBrk="1" hangingPunct="1">
+        <a:defRPr>
+          <a:solidFill>
+            <a:schemeClr val="tx2"/>
+          </a:solidFill>
+        </a:defRPr>
+      </a:lvl6pPr>
+      <a:lvl7pPr eaLnBrk="1" hangingPunct="1">
+        <a:defRPr>
+          <a:solidFill>
+            <a:schemeClr val="tx2"/>
+          </a:solidFill>
+        </a:defRPr>
+      </a:lvl7pPr>
+      <a:lvl8pPr eaLnBrk="1" hangingPunct="1">
+        <a:defRPr>
+          <a:solidFill>
+            <a:schemeClr val="tx2"/>
+          </a:solidFill>
+        </a:defRPr>
+      </a:lvl8pPr>
+      <a:lvl9pPr eaLnBrk="1" hangingPunct="1">
+        <a:defRPr>
+          <a:solidFill>
+            <a:schemeClr val="tx2"/>
+          </a:solidFill>
+        </a:defRPr>
+      </a:lvl9pPr>
     </p:titleStyle>
     <p:bodyStyle>
-      <a:lvl1pPr marL="228600" indent="-228600" algn="l" defTabSz="914400" rtl="0" eaLnBrk="1" latinLnBrk="0" hangingPunct="1">
-        <a:lnSpc>
-          <a:spcPct val="90000"/>
-        </a:lnSpc>
+      <a:lvl1pPr marL="306000" indent="-306000" algn="l" defTabSz="457200" rtl="0" eaLnBrk="1" latinLnBrk="0" hangingPunct="1">
         <a:spcBef>
-          <a:spcPts val="1000"/>
+          <a:spcPct val="20000"/>
         </a:spcBef>
-        <a:buFont typeface="Arial" panose="020B0604020202020204" pitchFamily="34" charset="0"/>
-        <a:buChar char="•"/>
-        <a:defRPr sz="2800" kern="1200">
+        <a:spcAft>
+          <a:spcPts val="600"/>
+        </a:spcAft>
+        <a:buClr>
+          <a:schemeClr val="accent2"/>
+        </a:buClr>
+        <a:buSzPct val="92000"/>
+        <a:buFont typeface="Wingdings 2" panose="05020102010507070707" pitchFamily="18" charset="2"/>
+        <a:buChar char=""/>
+        <a:defRPr sz="1800" kern="1200">
+          <a:solidFill>
+            <a:schemeClr val="tx2"/>
+          </a:solidFill>
+          <a:latin typeface="+mn-lt"/>
+          <a:ea typeface="+mn-ea"/>
+          <a:cs typeface="+mn-cs"/>
+        </a:defRPr>
+      </a:lvl1pPr>
+      <a:lvl2pPr marL="630000" indent="-306000" algn="l" defTabSz="457200" rtl="0" eaLnBrk="1" latinLnBrk="0" hangingPunct="1">
+        <a:spcBef>
+          <a:spcPct val="20000"/>
+        </a:spcBef>
+        <a:spcAft>
+          <a:spcPts val="600"/>
+        </a:spcAft>
+        <a:buClr>
+          <a:schemeClr val="accent2"/>
+        </a:buClr>
+        <a:buSzPct val="92000"/>
+        <a:buFont typeface="Wingdings 2" panose="05020102010507070707" pitchFamily="18" charset="2"/>
+        <a:buChar char=""/>
+        <a:defRPr sz="1600" kern="1200">
+          <a:solidFill>
+            <a:schemeClr val="tx2"/>
+          </a:solidFill>
+          <a:latin typeface="+mn-lt"/>
+          <a:ea typeface="+mn-ea"/>
+          <a:cs typeface="+mn-cs"/>
+        </a:defRPr>
+      </a:lvl2pPr>
+      <a:lvl3pPr marL="900000" indent="-270000" algn="l" defTabSz="457200" rtl="0" eaLnBrk="1" latinLnBrk="0" hangingPunct="1">
+        <a:spcBef>
+          <a:spcPct val="20000"/>
+        </a:spcBef>
+        <a:spcAft>
+          <a:spcPts val="600"/>
+        </a:spcAft>
+        <a:buClr>
+          <a:schemeClr val="accent2"/>
+        </a:buClr>
+        <a:buSzPct val="92000"/>
+        <a:buFont typeface="Wingdings 2" panose="05020102010507070707" pitchFamily="18" charset="2"/>
+        <a:buChar char=""/>
+        <a:defRPr sz="1400" kern="1200">
+          <a:solidFill>
+            <a:schemeClr val="tx2"/>
+          </a:solidFill>
+          <a:latin typeface="+mn-lt"/>
+          <a:ea typeface="+mn-ea"/>
+          <a:cs typeface="+mn-cs"/>
+        </a:defRPr>
+      </a:lvl3pPr>
+      <a:lvl4pPr marL="1242000" indent="-234000" algn="l" defTabSz="457200" rtl="0" eaLnBrk="1" latinLnBrk="0" hangingPunct="1">
+        <a:spcBef>
+          <a:spcPct val="20000"/>
+        </a:spcBef>
+        <a:spcAft>
+          <a:spcPts val="600"/>
+        </a:spcAft>
+        <a:buClr>
+          <a:schemeClr val="accent2"/>
+        </a:buClr>
+        <a:buSzPct val="92000"/>
+        <a:buFont typeface="Wingdings 2" panose="05020102010507070707" pitchFamily="18" charset="2"/>
+        <a:buChar char=""/>
+        <a:defRPr sz="1200" kern="1200">
+          <a:solidFill>
+            <a:schemeClr val="tx2"/>
+          </a:solidFill>
+          <a:latin typeface="+mn-lt"/>
+          <a:ea typeface="+mn-ea"/>
+          <a:cs typeface="+mn-cs"/>
+        </a:defRPr>
+      </a:lvl4pPr>
+      <a:lvl5pPr marL="1602000" indent="-234000" algn="l" defTabSz="457200" rtl="0" eaLnBrk="1" latinLnBrk="0" hangingPunct="1">
+        <a:spcBef>
+          <a:spcPct val="20000"/>
+        </a:spcBef>
+        <a:spcAft>
+          <a:spcPts val="600"/>
+        </a:spcAft>
+        <a:buClr>
+          <a:schemeClr val="accent2"/>
+        </a:buClr>
+        <a:buSzPct val="92000"/>
+        <a:buFont typeface="Wingdings 2" panose="05020102010507070707" pitchFamily="18" charset="2"/>
+        <a:buChar char=""/>
+        <a:defRPr sz="1200" kern="1200">
+          <a:solidFill>
+            <a:schemeClr val="tx2"/>
+          </a:solidFill>
+          <a:latin typeface="+mn-lt"/>
+          <a:ea typeface="+mn-ea"/>
+          <a:cs typeface="+mn-cs"/>
+        </a:defRPr>
+      </a:lvl5pPr>
+      <a:lvl6pPr marL="1900000" indent="-228600" algn="l" defTabSz="457200" rtl="0" eaLnBrk="1" latinLnBrk="0" hangingPunct="1">
+        <a:spcBef>
+          <a:spcPct val="20000"/>
+        </a:spcBef>
+        <a:spcAft>
+          <a:spcPts val="600"/>
+        </a:spcAft>
+        <a:buClr>
+          <a:schemeClr val="accent2"/>
+        </a:buClr>
+        <a:buSzPct val="92000"/>
+        <a:buFont typeface="Wingdings 2" panose="05020102010507070707" pitchFamily="18" charset="2"/>
+        <a:buChar char=""/>
+        <a:defRPr sz="1200" kern="1200">
+          <a:solidFill>
+            <a:schemeClr val="tx2"/>
+          </a:solidFill>
+          <a:latin typeface="+mn-lt"/>
+          <a:ea typeface="+mn-ea"/>
+          <a:cs typeface="+mn-cs"/>
+        </a:defRPr>
+      </a:lvl6pPr>
+      <a:lvl7pPr marL="2200000" indent="-228600" algn="l" defTabSz="457200" rtl="0" eaLnBrk="1" latinLnBrk="0" hangingPunct="1">
+        <a:spcBef>
+          <a:spcPct val="20000"/>
+        </a:spcBef>
+        <a:spcAft>
+          <a:spcPts val="600"/>
+        </a:spcAft>
+        <a:buClr>
+          <a:schemeClr val="accent2"/>
+        </a:buClr>
+        <a:buSzPct val="92000"/>
+        <a:buFont typeface="Wingdings 2" panose="05020102010507070707" pitchFamily="18" charset="2"/>
+        <a:buChar char=""/>
+        <a:defRPr sz="1200" kern="1200">
+          <a:solidFill>
+            <a:schemeClr val="tx2"/>
+          </a:solidFill>
+          <a:latin typeface="+mn-lt"/>
+          <a:ea typeface="+mn-ea"/>
+          <a:cs typeface="+mn-cs"/>
+        </a:defRPr>
+      </a:lvl7pPr>
+      <a:lvl8pPr marL="2500000" indent="-228600" algn="l" defTabSz="457200" rtl="0" eaLnBrk="1" latinLnBrk="0" hangingPunct="1">
+        <a:spcBef>
+          <a:spcPct val="20000"/>
+        </a:spcBef>
+        <a:spcAft>
+          <a:spcPts val="600"/>
+        </a:spcAft>
+        <a:buClr>
+          <a:schemeClr val="accent2"/>
+        </a:buClr>
+        <a:buSzPct val="92000"/>
+        <a:buFont typeface="Wingdings 2" panose="05020102010507070707" pitchFamily="18" charset="2"/>
+        <a:buChar char=""/>
+        <a:defRPr sz="1200" kern="1200">
+          <a:solidFill>
+            <a:schemeClr val="tx2"/>
+          </a:solidFill>
+          <a:latin typeface="+mn-lt"/>
+          <a:ea typeface="+mn-ea"/>
+          <a:cs typeface="+mn-cs"/>
+        </a:defRPr>
+      </a:lvl8pPr>
+      <a:lvl9pPr marL="2800000" indent="-228600" algn="l" defTabSz="457200" rtl="0" eaLnBrk="1" latinLnBrk="0" hangingPunct="1">
+        <a:spcBef>
+          <a:spcPct val="20000"/>
+        </a:spcBef>
+        <a:spcAft>
+          <a:spcPts val="600"/>
+        </a:spcAft>
+        <a:buClr>
+          <a:schemeClr val="accent2"/>
+        </a:buClr>
+        <a:buSzPct val="92000"/>
+        <a:buFont typeface="Wingdings 2" panose="05020102010507070707" pitchFamily="18" charset="2"/>
+        <a:buChar char=""/>
+        <a:defRPr sz="1200" kern="1200">
+          <a:solidFill>
+            <a:schemeClr val="tx2"/>
+          </a:solidFill>
+          <a:latin typeface="+mn-lt"/>
+          <a:ea typeface="+mn-ea"/>
+          <a:cs typeface="+mn-cs"/>
+        </a:defRPr>
+      </a:lvl9pPr>
+    </p:bodyStyle>
+    <p:otherStyle>
+      <a:defPPr>
+        <a:defRPr lang="en-US"/>
+      </a:defPPr>
+      <a:lvl1pPr marL="0" algn="l" defTabSz="457200" rtl="0" eaLnBrk="1" latinLnBrk="0" hangingPunct="1">
+        <a:defRPr sz="1800" kern="1200">
           <a:solidFill>
             <a:schemeClr val="tx1"/>
           </a:solidFill>
@@ -3081,16 +3775,8 @@
           <a:cs typeface="+mn-cs"/>
         </a:defRPr>
       </a:lvl1pPr>
-      <a:lvl2pPr marL="685800" indent="-228600" algn="l" defTabSz="914400" rtl="0" eaLnBrk="1" latinLnBrk="0" hangingPunct="1">
-        <a:lnSpc>
-          <a:spcPct val="90000"/>
-        </a:lnSpc>
-        <a:spcBef>
-          <a:spcPts val="500"/>
-        </a:spcBef>
-        <a:buFont typeface="Arial" panose="020B0604020202020204" pitchFamily="34" charset="0"/>
-        <a:buChar char="•"/>
-        <a:defRPr sz="2400" kern="1200">
+      <a:lvl2pPr marL="457200" algn="l" defTabSz="457200" rtl="0" eaLnBrk="1" latinLnBrk="0" hangingPunct="1">
+        <a:defRPr sz="1800" kern="1200">
           <a:solidFill>
             <a:schemeClr val="tx1"/>
           </a:solidFill>
@@ -3099,16 +3785,8 @@
           <a:cs typeface="+mn-cs"/>
         </a:defRPr>
       </a:lvl2pPr>
-      <a:lvl3pPr marL="1143000" indent="-228600" algn="l" defTabSz="914400" rtl="0" eaLnBrk="1" latinLnBrk="0" hangingPunct="1">
-        <a:lnSpc>
-          <a:spcPct val="90000"/>
-        </a:lnSpc>
-        <a:spcBef>
-          <a:spcPts val="500"/>
-        </a:spcBef>
-        <a:buFont typeface="Arial" panose="020B0604020202020204" pitchFamily="34" charset="0"/>
-        <a:buChar char="•"/>
-        <a:defRPr sz="2000" kern="1200">
+      <a:lvl3pPr marL="914400" algn="l" defTabSz="457200" rtl="0" eaLnBrk="1" latinLnBrk="0" hangingPunct="1">
+        <a:defRPr sz="1800" kern="1200">
           <a:solidFill>
             <a:schemeClr val="tx1"/>
           </a:solidFill>
@@ -3117,15 +3795,7 @@
           <a:cs typeface="+mn-cs"/>
         </a:defRPr>
       </a:lvl3pPr>
-      <a:lvl4pPr marL="1600200" indent="-228600" algn="l" defTabSz="914400" rtl="0" eaLnBrk="1" latinLnBrk="0" hangingPunct="1">
-        <a:lnSpc>
-          <a:spcPct val="90000"/>
-        </a:lnSpc>
-        <a:spcBef>
-          <a:spcPts val="500"/>
-        </a:spcBef>
-        <a:buFont typeface="Arial" panose="020B0604020202020204" pitchFamily="34" charset="0"/>
-        <a:buChar char="•"/>
+      <a:lvl4pPr marL="1371600" algn="l" defTabSz="457200" rtl="0" eaLnBrk="1" latinLnBrk="0" hangingPunct="1">
         <a:defRPr sz="1800" kern="1200">
           <a:solidFill>
             <a:schemeClr val="tx1"/>
@@ -3135,15 +3805,7 @@
           <a:cs typeface="+mn-cs"/>
         </a:defRPr>
       </a:lvl4pPr>
-      <a:lvl5pPr marL="2057400" indent="-228600" algn="l" defTabSz="914400" rtl="0" eaLnBrk="1" latinLnBrk="0" hangingPunct="1">
-        <a:lnSpc>
-          <a:spcPct val="90000"/>
-        </a:lnSpc>
-        <a:spcBef>
-          <a:spcPts val="500"/>
-        </a:spcBef>
-        <a:buFont typeface="Arial" panose="020B0604020202020204" pitchFamily="34" charset="0"/>
-        <a:buChar char="•"/>
+      <a:lvl5pPr marL="1828800" algn="l" defTabSz="457200" rtl="0" eaLnBrk="1" latinLnBrk="0" hangingPunct="1">
         <a:defRPr sz="1800" kern="1200">
           <a:solidFill>
             <a:schemeClr val="tx1"/>
@@ -3153,15 +3815,7 @@
           <a:cs typeface="+mn-cs"/>
         </a:defRPr>
       </a:lvl5pPr>
-      <a:lvl6pPr marL="2514600" indent="-228600" algn="l" defTabSz="914400" rtl="0" eaLnBrk="1" latinLnBrk="0" hangingPunct="1">
-        <a:lnSpc>
-          <a:spcPct val="90000"/>
-        </a:lnSpc>
-        <a:spcBef>
-          <a:spcPts val="500"/>
-        </a:spcBef>
-        <a:buFont typeface="Arial" panose="020B0604020202020204" pitchFamily="34" charset="0"/>
-        <a:buChar char="•"/>
+      <a:lvl6pPr marL="2286000" algn="l" defTabSz="457200" rtl="0" eaLnBrk="1" latinLnBrk="0" hangingPunct="1">
         <a:defRPr sz="1800" kern="1200">
           <a:solidFill>
             <a:schemeClr val="tx1"/>
@@ -3171,15 +3825,7 @@
           <a:cs typeface="+mn-cs"/>
         </a:defRPr>
       </a:lvl6pPr>
-      <a:lvl7pPr marL="2971800" indent="-228600" algn="l" defTabSz="914400" rtl="0" eaLnBrk="1" latinLnBrk="0" hangingPunct="1">
-        <a:lnSpc>
-          <a:spcPct val="90000"/>
-        </a:lnSpc>
-        <a:spcBef>
-          <a:spcPts val="500"/>
-        </a:spcBef>
-        <a:buFont typeface="Arial" panose="020B0604020202020204" pitchFamily="34" charset="0"/>
-        <a:buChar char="•"/>
+      <a:lvl7pPr marL="2743200" algn="l" defTabSz="457200" rtl="0" eaLnBrk="1" latinLnBrk="0" hangingPunct="1">
         <a:defRPr sz="1800" kern="1200">
           <a:solidFill>
             <a:schemeClr val="tx1"/>
@@ -3189,15 +3835,7 @@
           <a:cs typeface="+mn-cs"/>
         </a:defRPr>
       </a:lvl7pPr>
-      <a:lvl8pPr marL="3429000" indent="-228600" algn="l" defTabSz="914400" rtl="0" eaLnBrk="1" latinLnBrk="0" hangingPunct="1">
-        <a:lnSpc>
-          <a:spcPct val="90000"/>
-        </a:lnSpc>
-        <a:spcBef>
-          <a:spcPts val="500"/>
-        </a:spcBef>
-        <a:buFont typeface="Arial" panose="020B0604020202020204" pitchFamily="34" charset="0"/>
-        <a:buChar char="•"/>
+      <a:lvl8pPr marL="3200400" algn="l" defTabSz="457200" rtl="0" eaLnBrk="1" latinLnBrk="0" hangingPunct="1">
         <a:defRPr sz="1800" kern="1200">
           <a:solidFill>
             <a:schemeClr val="tx1"/>
@@ -3207,110 +3845,7 @@
           <a:cs typeface="+mn-cs"/>
         </a:defRPr>
       </a:lvl8pPr>
-      <a:lvl9pPr marL="3886200" indent="-228600" algn="l" defTabSz="914400" rtl="0" eaLnBrk="1" latinLnBrk="0" hangingPunct="1">
-        <a:lnSpc>
-          <a:spcPct val="90000"/>
-        </a:lnSpc>
-        <a:spcBef>
-          <a:spcPts val="500"/>
-        </a:spcBef>
-        <a:buFont typeface="Arial" panose="020B0604020202020204" pitchFamily="34" charset="0"/>
-        <a:buChar char="•"/>
-        <a:defRPr sz="1800" kern="1200">
-          <a:solidFill>
-            <a:schemeClr val="tx1"/>
-          </a:solidFill>
-          <a:latin typeface="+mn-lt"/>
-          <a:ea typeface="+mn-ea"/>
-          <a:cs typeface="+mn-cs"/>
-        </a:defRPr>
-      </a:lvl9pPr>
-    </p:bodyStyle>
-    <p:otherStyle>
-      <a:defPPr>
-        <a:defRPr lang="it-IT"/>
-      </a:defPPr>
-      <a:lvl1pPr marL="0" algn="l" defTabSz="914400" rtl="0" eaLnBrk="1" latinLnBrk="0" hangingPunct="1">
-        <a:defRPr sz="1800" kern="1200">
-          <a:solidFill>
-            <a:schemeClr val="tx1"/>
-          </a:solidFill>
-          <a:latin typeface="+mn-lt"/>
-          <a:ea typeface="+mn-ea"/>
-          <a:cs typeface="+mn-cs"/>
-        </a:defRPr>
-      </a:lvl1pPr>
-      <a:lvl2pPr marL="457200" algn="l" defTabSz="914400" rtl="0" eaLnBrk="1" latinLnBrk="0" hangingPunct="1">
-        <a:defRPr sz="1800" kern="1200">
-          <a:solidFill>
-            <a:schemeClr val="tx1"/>
-          </a:solidFill>
-          <a:latin typeface="+mn-lt"/>
-          <a:ea typeface="+mn-ea"/>
-          <a:cs typeface="+mn-cs"/>
-        </a:defRPr>
-      </a:lvl2pPr>
-      <a:lvl3pPr marL="914400" algn="l" defTabSz="914400" rtl="0" eaLnBrk="1" latinLnBrk="0" hangingPunct="1">
-        <a:defRPr sz="1800" kern="1200">
-          <a:solidFill>
-            <a:schemeClr val="tx1"/>
-          </a:solidFill>
-          <a:latin typeface="+mn-lt"/>
-          <a:ea typeface="+mn-ea"/>
-          <a:cs typeface="+mn-cs"/>
-        </a:defRPr>
-      </a:lvl3pPr>
-      <a:lvl4pPr marL="1371600" algn="l" defTabSz="914400" rtl="0" eaLnBrk="1" latinLnBrk="0" hangingPunct="1">
-        <a:defRPr sz="1800" kern="1200">
-          <a:solidFill>
-            <a:schemeClr val="tx1"/>
-          </a:solidFill>
-          <a:latin typeface="+mn-lt"/>
-          <a:ea typeface="+mn-ea"/>
-          <a:cs typeface="+mn-cs"/>
-        </a:defRPr>
-      </a:lvl4pPr>
-      <a:lvl5pPr marL="1828800" algn="l" defTabSz="914400" rtl="0" eaLnBrk="1" latinLnBrk="0" hangingPunct="1">
-        <a:defRPr sz="1800" kern="1200">
-          <a:solidFill>
-            <a:schemeClr val="tx1"/>
-          </a:solidFill>
-          <a:latin typeface="+mn-lt"/>
-          <a:ea typeface="+mn-ea"/>
-          <a:cs typeface="+mn-cs"/>
-        </a:defRPr>
-      </a:lvl5pPr>
-      <a:lvl6pPr marL="2286000" algn="l" defTabSz="914400" rtl="0" eaLnBrk="1" latinLnBrk="0" hangingPunct="1">
-        <a:defRPr sz="1800" kern="1200">
-          <a:solidFill>
-            <a:schemeClr val="tx1"/>
-          </a:solidFill>
-          <a:latin typeface="+mn-lt"/>
-          <a:ea typeface="+mn-ea"/>
-          <a:cs typeface="+mn-cs"/>
-        </a:defRPr>
-      </a:lvl6pPr>
-      <a:lvl7pPr marL="2743200" algn="l" defTabSz="914400" rtl="0" eaLnBrk="1" latinLnBrk="0" hangingPunct="1">
-        <a:defRPr sz="1800" kern="1200">
-          <a:solidFill>
-            <a:schemeClr val="tx1"/>
-          </a:solidFill>
-          <a:latin typeface="+mn-lt"/>
-          <a:ea typeface="+mn-ea"/>
-          <a:cs typeface="+mn-cs"/>
-        </a:defRPr>
-      </a:lvl7pPr>
-      <a:lvl8pPr marL="3200400" algn="l" defTabSz="914400" rtl="0" eaLnBrk="1" latinLnBrk="0" hangingPunct="1">
-        <a:defRPr sz="1800" kern="1200">
-          <a:solidFill>
-            <a:schemeClr val="tx1"/>
-          </a:solidFill>
-          <a:latin typeface="+mn-lt"/>
-          <a:ea typeface="+mn-ea"/>
-          <a:cs typeface="+mn-cs"/>
-        </a:defRPr>
-      </a:lvl8pPr>
-      <a:lvl9pPr marL="3657600" algn="l" defTabSz="914400" rtl="0" eaLnBrk="1" latinLnBrk="0" hangingPunct="1">
+      <a:lvl9pPr marL="3657600" algn="l" defTabSz="457200" rtl="0" eaLnBrk="1" latinLnBrk="0" hangingPunct="1">
         <a:defRPr sz="1800" kern="1200">
           <a:solidFill>
             <a:schemeClr val="tx1"/>
@@ -3360,8 +3895,8 @@
         </p:nvSpPr>
         <p:spPr>
           <a:xfrm>
-            <a:off x="1524000" y="341744"/>
-            <a:ext cx="9144000" cy="4017819"/>
+            <a:off x="1319813" y="381739"/>
+            <a:ext cx="9144000" cy="2839060"/>
           </a:xfrm>
         </p:spPr>
         <p:txBody>
@@ -3371,7 +3906,7 @@
           <a:lstStyle/>
           <a:p>
             <a:r>
-              <a:rPr lang="it-IT" sz="4400" b="1" i="0" dirty="0">
+              <a:rPr lang="it-IT" b="1" i="0" dirty="0">
                 <a:solidFill>
                   <a:srgbClr val="1F2328"/>
                 </a:solidFill>
@@ -3382,7 +3917,7 @@
               <a:t>Progetto 1.1: </a:t>
             </a:r>
             <a:br>
-              <a:rPr lang="it-IT" sz="4400" b="1" i="0" dirty="0">
+              <a:rPr lang="it-IT" b="1" i="0" dirty="0">
                 <a:solidFill>
                   <a:srgbClr val="1F2328"/>
                 </a:solidFill>
@@ -3392,7 +3927,7 @@
               </a:rPr>
             </a:br>
             <a:r>
-              <a:rPr lang="it-IT" sz="4400" b="1" i="0" dirty="0">
+              <a:rPr lang="it-IT" b="1" i="0" dirty="0">
                 <a:solidFill>
                   <a:srgbClr val="1F2328"/>
                 </a:solidFill>
@@ -3403,7 +3938,7 @@
               <a:t>Analisi comparativa tra OS161 e altri sistemi operativi open-source all'avanguardia per sistemi embedded e computer general </a:t>
             </a:r>
             <a:r>
-              <a:rPr lang="it-IT" sz="4400" b="1" i="0" dirty="0" err="1">
+              <a:rPr lang="it-IT" b="1" i="0" dirty="0" err="1">
                 <a:solidFill>
                   <a:srgbClr val="1F2328"/>
                 </a:solidFill>
@@ -3413,7 +3948,7 @@
               </a:rPr>
               <a:t>purpose</a:t>
             </a:r>
-            <a:endParaRPr lang="it-IT" sz="4400" dirty="0">
+            <a:endParaRPr lang="it-IT" dirty="0">
               <a:latin typeface="Calibri" panose="020F0502020204030204" pitchFamily="34" charset="0"/>
               <a:cs typeface="Calibri" panose="020F0502020204030204" pitchFamily="34" charset="0"/>
             </a:endParaRPr>
@@ -3438,7 +3973,7 @@
         </p:nvSpPr>
         <p:spPr>
           <a:xfrm>
-            <a:off x="1524000" y="4525818"/>
+            <a:off x="1319813" y="5511239"/>
             <a:ext cx="9144000" cy="731982"/>
           </a:xfrm>
         </p:spPr>
@@ -3447,7 +3982,11 @@
           <a:lstStyle/>
           <a:p>
             <a:r>
-              <a:rPr lang="it-IT" dirty="0"/>
+              <a:rPr lang="it-IT" dirty="0">
+                <a:solidFill>
+                  <a:srgbClr val="FF0000"/>
+                </a:solidFill>
+              </a:rPr>
               <a:t>Merangolo Maria Francesca, Sinisi Nicola, Wang Li Chen</a:t>
             </a:r>
           </a:p>
@@ -4268,7 +4807,10 @@
           <a:bodyPr/>
           <a:lstStyle/>
           <a:p>
-            <a:endParaRPr lang="it-IT"/>
+            <a:r>
+              <a:rPr lang="it-IT" dirty="0"/>
+              <a:t>Implementazione di nuove funzionalità</a:t>
+            </a:r>
           </a:p>
         </p:txBody>
       </p:sp>
@@ -4423,7 +4965,10 @@
           <a:bodyPr/>
           <a:lstStyle/>
           <a:p>
-            <a:endParaRPr lang="it-IT"/>
+            <a:r>
+              <a:rPr lang="it-IT" dirty="0"/>
+              <a:t>Test</a:t>
+            </a:r>
           </a:p>
         </p:txBody>
       </p:sp>
@@ -4761,7 +5306,47 @@
           <a:bodyPr/>
           <a:lstStyle/>
           <a:p>
-            <a:endParaRPr lang="it-IT"/>
+            <a:r>
+              <a:rPr lang="it-IT" dirty="0"/>
+              <a:t>Il sistema operativo scelto è </a:t>
+            </a:r>
+            <a:r>
+              <a:rPr lang="it-IT" dirty="0" err="1"/>
+              <a:t>PintOS</a:t>
+            </a:r>
+            <a:endParaRPr lang="it-IT" dirty="0"/>
+          </a:p>
+          <a:p>
+            <a:r>
+              <a:rPr lang="it-IT" dirty="0"/>
+              <a:t>Successore di </a:t>
+            </a:r>
+            <a:r>
+              <a:rPr lang="it-IT" dirty="0" err="1"/>
+              <a:t>NachOS</a:t>
+            </a:r>
+            <a:r>
+              <a:rPr lang="it-IT" dirty="0"/>
+              <a:t>, è Unix-like</a:t>
+            </a:r>
+          </a:p>
+          <a:p>
+            <a:r>
+              <a:rPr lang="it-IT" dirty="0"/>
+              <a:t>SO didattico open source con architettura x86</a:t>
+            </a:r>
+          </a:p>
+          <a:p>
+            <a:r>
+              <a:rPr lang="it-IT" dirty="0"/>
+              <a:t>Sviluppato dall'università di Stanford nel 2004, quindi con relativa documentazione </a:t>
+            </a:r>
+          </a:p>
+          <a:p>
+            <a:r>
+              <a:rPr lang="it-IT" dirty="0"/>
+              <a:t>Alcune caratteristiche simili a OS161 ma con differenze visibili (anche nel codice)</a:t>
+            </a:r>
           </a:p>
         </p:txBody>
       </p:sp>
@@ -4872,7 +5457,28 @@
           <a:bodyPr/>
           <a:lstStyle/>
           <a:p>
-            <a:endParaRPr lang="it-IT"/>
+            <a:r>
+              <a:rPr lang="it-IT" dirty="0"/>
+              <a:t>SO monolitico</a:t>
+            </a:r>
+          </a:p>
+          <a:p>
+            <a:r>
+              <a:rPr lang="it-IT" dirty="0"/>
+              <a:t>Spazio d’indirizzamento comune, unico per tutte le funzionalità del sistema operativo</a:t>
+            </a:r>
+          </a:p>
+          <a:p>
+            <a:r>
+              <a:rPr lang="it-IT" dirty="0"/>
+              <a:t>Basato su MIPS</a:t>
+            </a:r>
+          </a:p>
+          <a:p>
+            <a:r>
+              <a:rPr lang="it-IT" dirty="0"/>
+              <a:t>Meno flessibile rispetto ad un SO basato su microkernel</a:t>
+            </a:r>
           </a:p>
         </p:txBody>
       </p:sp>
@@ -4925,7 +5531,28 @@
           <a:bodyPr/>
           <a:lstStyle/>
           <a:p>
-            <a:endParaRPr lang="it-IT"/>
+            <a:r>
+              <a:rPr lang="it-IT" dirty="0"/>
+              <a:t>SO a microkernel</a:t>
+            </a:r>
+          </a:p>
+          <a:p>
+            <a:r>
+              <a:rPr lang="it-IT" dirty="0"/>
+              <a:t>Kernel diviso in componenti più piccoli e indipendenti</a:t>
+            </a:r>
+          </a:p>
+          <a:p>
+            <a:r>
+              <a:rPr lang="it-IT" dirty="0"/>
+              <a:t>Basato su x86</a:t>
+            </a:r>
+          </a:p>
+          <a:p>
+            <a:r>
+              <a:rPr lang="it-IT" dirty="0"/>
+              <a:t>Più modulare e flessibile</a:t>
+            </a:r>
           </a:p>
         </p:txBody>
       </p:sp>
@@ -5008,7 +5635,57 @@
           <a:bodyPr/>
           <a:lstStyle/>
           <a:p>
-            <a:endParaRPr lang="it-IT"/>
+            <a:r>
+              <a:rPr lang="it-IT" dirty="0"/>
+              <a:t>System calls fondamentali per l'interazione tra i programmi utente e il kernel di un sistema operativo.</a:t>
+            </a:r>
+          </a:p>
+          <a:p>
+            <a:r>
+              <a:rPr lang="it-IT" dirty="0" err="1"/>
+              <a:t>SCs</a:t>
+            </a:r>
+            <a:r>
+              <a:rPr lang="it-IT" dirty="0"/>
+              <a:t> implementate direttamente nel kernel monolitico in OS161</a:t>
+            </a:r>
+          </a:p>
+          <a:p>
+            <a:r>
+              <a:rPr lang="it-IT" dirty="0" err="1"/>
+              <a:t>SCs</a:t>
+            </a:r>
+            <a:r>
+              <a:rPr lang="it-IT" dirty="0"/>
+              <a:t> in </a:t>
+            </a:r>
+            <a:r>
+              <a:rPr lang="it-IT" dirty="0" err="1"/>
+              <a:t>PintOS</a:t>
+            </a:r>
+            <a:r>
+              <a:rPr lang="it-IT" dirty="0"/>
+              <a:t> possono operare attraverso il microkernel, tra spazio utente e processi kernel</a:t>
+            </a:r>
+          </a:p>
+          <a:p>
+            <a:r>
+              <a:rPr lang="it-IT" dirty="0" err="1"/>
+              <a:t>SCs</a:t>
+            </a:r>
+            <a:r>
+              <a:rPr lang="it-IT" dirty="0"/>
+              <a:t> più dirette ed immediate in OS161</a:t>
+            </a:r>
+          </a:p>
+          <a:p>
+            <a:r>
+              <a:rPr lang="it-IT" dirty="0"/>
+              <a:t>…</a:t>
+            </a:r>
+          </a:p>
+          <a:p>
+            <a:endParaRPr lang="it-IT" dirty="0"/>
           </a:p>
         </p:txBody>
       </p:sp>
@@ -5121,7 +5798,22 @@
           <a:bodyPr/>
           <a:lstStyle/>
           <a:p>
-            <a:endParaRPr lang="it-IT"/>
+            <a:r>
+              <a:rPr lang="it-IT" dirty="0"/>
+              <a:t>Massimizzare l'utilizzo della CPU </a:t>
+            </a:r>
+          </a:p>
+          <a:p>
+            <a:r>
+              <a:rPr lang="it-IT" dirty="0"/>
+              <a:t>Garantire una distribuzione equa del tempo di CPU tra i vari processi.</a:t>
+            </a:r>
+          </a:p>
+          <a:p>
+            <a:r>
+              <a:rPr lang="it-IT" dirty="0"/>
+              <a:t>Efficienza nell'esecuzione dei processi</a:t>
+            </a:r>
           </a:p>
         </p:txBody>
       </p:sp>
@@ -5174,7 +5866,28 @@
           <a:bodyPr/>
           <a:lstStyle/>
           <a:p>
-            <a:endParaRPr lang="it-IT"/>
+            <a:r>
+              <a:rPr lang="it-IT" dirty="0"/>
+              <a:t>Enfatizzare la fornitura di un'allocazione equa della CPU tra i processi</a:t>
+            </a:r>
+          </a:p>
+          <a:p>
+            <a:r>
+              <a:rPr lang="it-IT" dirty="0"/>
+              <a:t>Massimizzare la responsività del sistema operativo rispetto alle richieste degli utenti</a:t>
+            </a:r>
+          </a:p>
+          <a:p>
+            <a:r>
+              <a:rPr lang="it-IT" dirty="0"/>
+              <a:t>Gestione della modularità</a:t>
+            </a:r>
+          </a:p>
+          <a:p>
+            <a:r>
+              <a:rPr lang="it-IT" dirty="0"/>
+              <a:t>Efficienza nell'utilizzo delle risorse</a:t>
+            </a:r>
           </a:p>
         </p:txBody>
       </p:sp>
@@ -5856,9 +6569,9 @@
 </file>
 
 <file path=ppt/theme/theme1.xml><?xml version="1.0" encoding="utf-8"?>
-<a:theme xmlns:a="http://schemas.openxmlformats.org/drawingml/2006/main" name="Tema di Office">
+<a:theme xmlns:a="http://schemas.openxmlformats.org/drawingml/2006/main" name="Dividendi">
   <a:themeElements>
-    <a:clrScheme name="Office">
+    <a:clrScheme name="Dividendi">
       <a:dk1>
         <a:sysClr val="windowText" lastClr="000000"/>
       </a:dk1>
@@ -5866,98 +6579,48 @@
         <a:sysClr val="window" lastClr="FFFFFF"/>
       </a:lt1>
       <a:dk2>
-        <a:srgbClr val="0E2841"/>
+        <a:srgbClr val="3D3D3D"/>
       </a:dk2>
       <a:lt2>
-        <a:srgbClr val="E8E8E8"/>
+        <a:srgbClr val="EBEBEB"/>
       </a:lt2>
       <a:accent1>
-        <a:srgbClr val="156082"/>
+        <a:srgbClr val="1A3260"/>
       </a:accent1>
       <a:accent2>
-        <a:srgbClr val="E97132"/>
+        <a:srgbClr val="4590B8"/>
       </a:accent2>
       <a:accent3>
-        <a:srgbClr val="196B24"/>
+        <a:srgbClr val="45CBE8"/>
       </a:accent3>
       <a:accent4>
-        <a:srgbClr val="0F9ED5"/>
+        <a:srgbClr val="969FA7"/>
       </a:accent4>
       <a:accent5>
-        <a:srgbClr val="A02B93"/>
+        <a:srgbClr val="A2C777"/>
       </a:accent5>
       <a:accent6>
-        <a:srgbClr val="4EA72E"/>
+        <a:srgbClr val="42955F"/>
       </a:accent6>
       <a:hlink>
-        <a:srgbClr val="467886"/>
+        <a:srgbClr val="828282"/>
       </a:hlink>
       <a:folHlink>
-        <a:srgbClr val="96607D"/>
+        <a:srgbClr val="A5A5A5"/>
       </a:folHlink>
     </a:clrScheme>
-    <a:fontScheme name="Office">
+    <a:fontScheme name="Dividendi">
       <a:majorFont>
-        <a:latin typeface="Aptos Display" panose="02110004020202020204"/>
+        <a:latin typeface="Gill Sans MT" panose="020B0502020104020203"/>
         <a:ea typeface=""/>
         <a:cs typeface=""/>
-        <a:font script="Jpan" typeface="游ゴシック Light"/>
-        <a:font script="Hang" typeface="맑은 고딕"/>
-        <a:font script="Hans" typeface="等线 Light"/>
-        <a:font script="Hant" typeface="新細明體"/>
-        <a:font script="Arab" typeface="Times New Roman"/>
-        <a:font script="Hebr" typeface="Times New Roman"/>
-        <a:font script="Thai" typeface="Angsana New"/>
-        <a:font script="Ethi" typeface="Nyala"/>
-        <a:font script="Beng" typeface="Vrinda"/>
-        <a:font script="Gujr" typeface="Shruti"/>
-        <a:font script="Khmr" typeface="MoolBoran"/>
-        <a:font script="Knda" typeface="Tunga"/>
-        <a:font script="Guru" typeface="Raavi"/>
-        <a:font script="Cans" typeface="Euphemia"/>
-        <a:font script="Cher" typeface="Plantagenet Cherokee"/>
-        <a:font script="Yiii" typeface="Microsoft Yi Baiti"/>
-        <a:font script="Tibt" typeface="Microsoft Himalaya"/>
-        <a:font script="Thaa" typeface="MV Boli"/>
-        <a:font script="Deva" typeface="Mangal"/>
-        <a:font script="Telu" typeface="Gautami"/>
-        <a:font script="Taml" typeface="Latha"/>
-        <a:font script="Syrc" typeface="Estrangelo Edessa"/>
-        <a:font script="Orya" typeface="Kalinga"/>
-        <a:font script="Mlym" typeface="Kartika"/>
-        <a:font script="Laoo" typeface="DokChampa"/>
-        <a:font script="Sinh" typeface="Iskoola Pota"/>
-        <a:font script="Mong" typeface="Mongolian Baiti"/>
-        <a:font script="Viet" typeface="Times New Roman"/>
-        <a:font script="Uigh" typeface="Microsoft Uighur"/>
-        <a:font script="Geor" typeface="Sylfaen"/>
-        <a:font script="Armn" typeface="Arial"/>
-        <a:font script="Bugi" typeface="Leelawadee UI"/>
-        <a:font script="Bopo" typeface="Microsoft JhengHei"/>
-        <a:font script="Java" typeface="Javanese Text"/>
-        <a:font script="Lisu" typeface="Segoe UI"/>
-        <a:font script="Mymr" typeface="Myanmar Text"/>
-        <a:font script="Nkoo" typeface="Ebrima"/>
-        <a:font script="Olck" typeface="Nirmala UI"/>
-        <a:font script="Osma" typeface="Ebrima"/>
-        <a:font script="Phag" typeface="Phagspa"/>
-        <a:font script="Syrn" typeface="Estrangelo Edessa"/>
-        <a:font script="Syrj" typeface="Estrangelo Edessa"/>
-        <a:font script="Syre" typeface="Estrangelo Edessa"/>
-        <a:font script="Sora" typeface="Nirmala UI"/>
-        <a:font script="Tale" typeface="Microsoft Tai Le"/>
-        <a:font script="Talu" typeface="Microsoft New Tai Lue"/>
-        <a:font script="Tfng" typeface="Ebrima"/>
-      </a:majorFont>
-      <a:minorFont>
-        <a:latin typeface="Aptos" panose="02110004020202020204"/>
-        <a:ea typeface=""/>
-        <a:cs typeface=""/>
-        <a:font script="Jpan" typeface="游ゴシック"/>
-        <a:font script="Hang" typeface="맑은 고딕"/>
-        <a:font script="Hans" typeface="等线"/>
-        <a:font script="Hant" typeface="新細明體"/>
-        <a:font script="Arab" typeface="Arial"/>
+        <a:font script="Grek" typeface="Corbel"/>
+        <a:font script="Cyrl" typeface="Corbel"/>
+        <a:font script="Jpan" typeface="HGｺﾞｼｯｸE"/>
+        <a:font script="Hang" typeface="휴먼매직체"/>
+        <a:font script="Hans" typeface="华文中宋"/>
+        <a:font script="Hant" typeface="微軟正黑體"/>
+        <a:font script="Arab" typeface="Majalla UI"/>
         <a:font script="Hebr" typeface="Arial"/>
         <a:font script="Thai" typeface="Cordia New"/>
         <a:font script="Ethi" typeface="Nyala"/>
@@ -5980,29 +6643,49 @@
         <a:font script="Laoo" typeface="DokChampa"/>
         <a:font script="Sinh" typeface="Iskoola Pota"/>
         <a:font script="Mong" typeface="Mongolian Baiti"/>
-        <a:font script="Viet" typeface="Arial"/>
+        <a:font script="Viet" typeface="Tahoma"/>
         <a:font script="Uigh" typeface="Microsoft Uighur"/>
         <a:font script="Geor" typeface="Sylfaen"/>
-        <a:font script="Armn" typeface="Arial"/>
-        <a:font script="Bugi" typeface="Leelawadee UI"/>
-        <a:font script="Bopo" typeface="Microsoft JhengHei"/>
-        <a:font script="Java" typeface="Javanese Text"/>
-        <a:font script="Lisu" typeface="Segoe UI"/>
-        <a:font script="Mymr" typeface="Myanmar Text"/>
-        <a:font script="Nkoo" typeface="Ebrima"/>
-        <a:font script="Olck" typeface="Nirmala UI"/>
-        <a:font script="Osma" typeface="Ebrima"/>
-        <a:font script="Phag" typeface="Phagspa"/>
-        <a:font script="Syrn" typeface="Estrangelo Edessa"/>
-        <a:font script="Syrj" typeface="Estrangelo Edessa"/>
-        <a:font script="Syre" typeface="Estrangelo Edessa"/>
-        <a:font script="Sora" typeface="Nirmala UI"/>
-        <a:font script="Tale" typeface="Microsoft Tai Le"/>
-        <a:font script="Talu" typeface="Microsoft New Tai Lue"/>
-        <a:font script="Tfng" typeface="Ebrima"/>
+      </a:majorFont>
+      <a:minorFont>
+        <a:latin typeface="Gill Sans MT" panose="020B0502020104020203"/>
+        <a:ea typeface=""/>
+        <a:cs typeface=""/>
+        <a:font script="Grek" typeface="Corbel"/>
+        <a:font script="Cyrl" typeface="Corbel"/>
+        <a:font script="Jpan" typeface="HGｺﾞｼｯｸE"/>
+        <a:font script="Hang" typeface="휴먼매직체"/>
+        <a:font script="Hans" typeface="华文中宋"/>
+        <a:font script="Hant" typeface="微軟正黑體"/>
+        <a:font script="Arab" typeface="Majalla UI"/>
+        <a:font script="Hebr" typeface="Arial"/>
+        <a:font script="Thai" typeface="Cordia New"/>
+        <a:font script="Ethi" typeface="Nyala"/>
+        <a:font script="Beng" typeface="Vrinda"/>
+        <a:font script="Gujr" typeface="Shruti"/>
+        <a:font script="Khmr" typeface="DaunPenh"/>
+        <a:font script="Knda" typeface="Tunga"/>
+        <a:font script="Guru" typeface="Raavi"/>
+        <a:font script="Cans" typeface="Euphemia"/>
+        <a:font script="Cher" typeface="Plantagenet Cherokee"/>
+        <a:font script="Yiii" typeface="Microsoft Yi Baiti"/>
+        <a:font script="Tibt" typeface="Microsoft Himalaya"/>
+        <a:font script="Thaa" typeface="MV Boli"/>
+        <a:font script="Deva" typeface="Mangal"/>
+        <a:font script="Telu" typeface="Gautami"/>
+        <a:font script="Taml" typeface="Latha"/>
+        <a:font script="Syrc" typeface="Estrangelo Edessa"/>
+        <a:font script="Orya" typeface="Kalinga"/>
+        <a:font script="Mlym" typeface="Kartika"/>
+        <a:font script="Laoo" typeface="DokChampa"/>
+        <a:font script="Sinh" typeface="Iskoola Pota"/>
+        <a:font script="Mong" typeface="Mongolian Baiti"/>
+        <a:font script="Viet" typeface="Tahoma"/>
+        <a:font script="Uigh" typeface="Microsoft Uighur"/>
+        <a:font script="Geor" typeface="Sylfaen"/>
       </a:minorFont>
     </a:fontScheme>
-    <a:fmtScheme name="Office">
+    <a:fmtScheme name="Dividendi">
       <a:fillStyleLst>
         <a:solidFill>
           <a:schemeClr val="phClr"/>
@@ -6011,23 +6694,111 @@
           <a:gsLst>
             <a:gs pos="0">
               <a:schemeClr val="phClr">
-                <a:lumMod val="110000"/>
-                <a:satMod val="105000"/>
-                <a:tint val="67000"/>
-              </a:schemeClr>
-            </a:gs>
-            <a:gs pos="50000">
-              <a:schemeClr val="phClr">
-                <a:lumMod val="105000"/>
-                <a:satMod val="103000"/>
-                <a:tint val="73000"/>
+                <a:tint val="68000"/>
+                <a:alpha val="90000"/>
+                <a:lumMod val="100000"/>
               </a:schemeClr>
             </a:gs>
             <a:gs pos="100000">
               <a:schemeClr val="phClr">
-                <a:lumMod val="105000"/>
-                <a:satMod val="109000"/>
-                <a:tint val="81000"/>
+                <a:tint val="90000"/>
+                <a:lumMod val="95000"/>
+              </a:schemeClr>
+            </a:gs>
+          </a:gsLst>
+          <a:lin ang="5400000" scaled="1"/>
+        </a:gradFill>
+        <a:gradFill rotWithShape="1">
+          <a:gsLst>
+            <a:gs pos="0">
+              <a:schemeClr val="phClr">
+                <a:tint val="98000"/>
+                <a:lumMod val="110000"/>
+              </a:schemeClr>
+            </a:gs>
+            <a:gs pos="84000">
+              <a:schemeClr val="phClr">
+                <a:shade val="90000"/>
+                <a:lumMod val="88000"/>
+              </a:schemeClr>
+            </a:gs>
+          </a:gsLst>
+          <a:lin ang="5400000" scaled="0"/>
+        </a:gradFill>
+      </a:fillStyleLst>
+      <a:lnStyleLst>
+        <a:ln w="12700" cap="rnd" cmpd="sng" algn="ctr">
+          <a:solidFill>
+            <a:schemeClr val="phClr">
+              <a:lumMod val="90000"/>
+            </a:schemeClr>
+          </a:solidFill>
+          <a:prstDash val="solid"/>
+        </a:ln>
+        <a:ln w="22225" cap="rnd" cmpd="sng" algn="ctr">
+          <a:solidFill>
+            <a:schemeClr val="phClr"/>
+          </a:solidFill>
+          <a:prstDash val="solid"/>
+        </a:ln>
+        <a:ln w="25400" cap="rnd" cmpd="sng" algn="ctr">
+          <a:solidFill>
+            <a:schemeClr val="phClr"/>
+          </a:solidFill>
+          <a:prstDash val="solid"/>
+        </a:ln>
+      </a:lnStyleLst>
+      <a:effectStyleLst>
+        <a:effectStyle>
+          <a:effectLst/>
+        </a:effectStyle>
+        <a:effectStyle>
+          <a:effectLst>
+            <a:outerShdw blurRad="38100" dist="25400" dir="5400000" rotWithShape="0">
+              <a:srgbClr val="000000">
+                <a:alpha val="55000"/>
+              </a:srgbClr>
+            </a:outerShdw>
+          </a:effectLst>
+        </a:effectStyle>
+        <a:effectStyle>
+          <a:effectLst>
+            <a:outerShdw blurRad="88900" dist="38100" dir="5040000" rotWithShape="0">
+              <a:srgbClr val="000000">
+                <a:alpha val="60000"/>
+              </a:srgbClr>
+            </a:outerShdw>
+          </a:effectLst>
+          <a:scene3d>
+            <a:camera prst="orthographicFront">
+              <a:rot lat="0" lon="0" rev="0"/>
+            </a:camera>
+            <a:lightRig rig="threePt" dir="tl">
+              <a:rot lat="0" lon="0" rev="1200000"/>
+            </a:lightRig>
+          </a:scene3d>
+          <a:sp3d>
+            <a:bevelT w="38100" h="50800"/>
+          </a:sp3d>
+        </a:effectStyle>
+      </a:effectStyleLst>
+      <a:bgFillStyleLst>
+        <a:solidFill>
+          <a:schemeClr val="phClr"/>
+        </a:solidFill>
+        <a:gradFill rotWithShape="1">
+          <a:gsLst>
+            <a:gs pos="0">
+              <a:schemeClr val="phClr">
+                <a:tint val="90000"/>
+                <a:lumMod val="110000"/>
+              </a:schemeClr>
+            </a:gs>
+            <a:gs pos="88000">
+              <a:schemeClr val="phClr">
+                <a:shade val="94000"/>
+                <a:satMod val="110000"/>
+                <a:lumMod val="88000"/>
               </a:schemeClr>
             </a:gs>
           </a:gsLst>
@@ -6037,134 +6808,30 @@
           <a:gsLst>
             <a:gs pos="0">
               <a:schemeClr val="phClr">
-                <a:satMod val="103000"/>
-                <a:lumMod val="102000"/>
-                <a:tint val="94000"/>
-              </a:schemeClr>
-            </a:gs>
-            <a:gs pos="50000">
-              <a:schemeClr val="phClr">
-                <a:satMod val="110000"/>
-                <a:lumMod val="100000"/>
-                <a:shade val="100000"/>
+                <a:tint val="90000"/>
+                <a:lumMod val="110000"/>
               </a:schemeClr>
             </a:gs>
             <a:gs pos="100000">
               <a:schemeClr val="phClr">
-                <a:lumMod val="99000"/>
-                <a:satMod val="120000"/>
-                <a:shade val="78000"/>
+                <a:shade val="98000"/>
+                <a:satMod val="110000"/>
+                <a:lumMod val="86000"/>
               </a:schemeClr>
             </a:gs>
           </a:gsLst>
-          <a:lin ang="5400000" scaled="0"/>
-        </a:gradFill>
-      </a:fillStyleLst>
-      <a:lnStyleLst>
-        <a:ln w="12700" cap="flat" cmpd="sng" algn="ctr">
-          <a:solidFill>
-            <a:schemeClr val="phClr"/>
-          </a:solidFill>
-          <a:prstDash val="solid"/>
-          <a:miter lim="800000"/>
-        </a:ln>
-        <a:ln w="19050" cap="flat" cmpd="sng" algn="ctr">
-          <a:solidFill>
-            <a:schemeClr val="phClr"/>
-          </a:solidFill>
-          <a:prstDash val="solid"/>
-          <a:miter lim="800000"/>
-        </a:ln>
-        <a:ln w="25400" cap="flat" cmpd="sng" algn="ctr">
-          <a:solidFill>
-            <a:schemeClr val="phClr"/>
-          </a:solidFill>
-          <a:prstDash val="solid"/>
-          <a:miter lim="800000"/>
-        </a:ln>
-      </a:lnStyleLst>
-      <a:effectStyleLst>
-        <a:effectStyle>
-          <a:effectLst/>
-        </a:effectStyle>
-        <a:effectStyle>
-          <a:effectLst/>
-        </a:effectStyle>
-        <a:effectStyle>
-          <a:effectLst>
-            <a:outerShdw blurRad="57150" dist="19050" dir="5400000" algn="ctr" rotWithShape="0">
-              <a:srgbClr val="000000">
-                <a:alpha val="63000"/>
-              </a:srgbClr>
-            </a:outerShdw>
-          </a:effectLst>
-        </a:effectStyle>
-      </a:effectStyleLst>
-      <a:bgFillStyleLst>
-        <a:solidFill>
-          <a:schemeClr val="phClr"/>
-        </a:solidFill>
-        <a:solidFill>
-          <a:schemeClr val="phClr">
-            <a:tint val="95000"/>
-            <a:satMod val="170000"/>
-          </a:schemeClr>
-        </a:solidFill>
-        <a:gradFill rotWithShape="1">
-          <a:gsLst>
-            <a:gs pos="0">
-              <a:schemeClr val="phClr">
-                <a:tint val="93000"/>
-                <a:satMod val="150000"/>
-                <a:shade val="98000"/>
-                <a:lumMod val="102000"/>
-              </a:schemeClr>
-            </a:gs>
-            <a:gs pos="50000">
-              <a:schemeClr val="phClr">
-                <a:tint val="98000"/>
-                <a:satMod val="130000"/>
-                <a:shade val="90000"/>
-                <a:lumMod val="103000"/>
-              </a:schemeClr>
-            </a:gs>
-            <a:gs pos="100000">
-              <a:schemeClr val="phClr">
-                <a:shade val="63000"/>
-                <a:satMod val="120000"/>
-              </a:schemeClr>
-            </a:gs>
-          </a:gsLst>
-          <a:lin ang="5400000" scaled="0"/>
+          <a:path path="circle">
+            <a:fillToRect l="50000" t="50000" r="100000" b="100000"/>
+          </a:path>
         </a:gradFill>
       </a:bgFillStyleLst>
     </a:fmtScheme>
   </a:themeElements>
-  <a:objectDefaults>
-    <a:lnDef>
-      <a:spPr/>
-      <a:bodyPr/>
-      <a:lstStyle/>
-      <a:style>
-        <a:lnRef idx="2">
-          <a:schemeClr val="accent1"/>
-        </a:lnRef>
-        <a:fillRef idx="0">
-          <a:schemeClr val="accent1"/>
-        </a:fillRef>
-        <a:effectRef idx="1">
-          <a:schemeClr val="accent1"/>
-        </a:effectRef>
-        <a:fontRef idx="minor">
-          <a:schemeClr val="tx1"/>
-        </a:fontRef>
-      </a:style>
-    </a:lnDef>
-  </a:objectDefaults>
+  <a:objectDefaults/>
   <a:extraClrSchemeLst/>
   <a:extLst>
     <a:ext uri="{05A4C25C-085E-4340-85A3-A5531E510DB2}">
-      <thm15:themeFamily xmlns:thm15="http://schemas.microsoft.com/office/thememl/2012/main" name="Office Theme" id="{2E142A2C-CD16-42D6-873A-C26D2A0506FA}" vid="{1BDDFF52-6CD6-40A5-AB3C-68EB2F1E4D0A}"/>
+      <thm15:themeFamily xmlns:thm15="http://schemas.microsoft.com/office/thememl/2012/main" name="Dividend" id="{9697A71B-4AB7-4A1A-BD5B-BB2D22835B57}" vid="{66F1C100-1D2B-4BEA-AD01-C4F230B3B965}"/>
     </a:ext>
   </a:extLst>
 </a:theme>

</xml_diff>

<commit_message>
adding sync in ppt
</commit_message>
<xml_diff>
--- a/Progetto_SO.pptx
+++ b/Progetto_SO.pptx
@@ -15,7 +15,10 @@
     <p:sldId id="269" r:id="rId9"/>
     <p:sldId id="286" r:id="rId10"/>
     <p:sldId id="279" r:id="rId11"/>
-    <p:sldId id="284" r:id="rId12"/>
+    <p:sldId id="287" r:id="rId12"/>
+    <p:sldId id="288" r:id="rId13"/>
+    <p:sldId id="289" r:id="rId14"/>
+    <p:sldId id="284" r:id="rId15"/>
   </p:sldIdLst>
   <p:sldSz cx="12192000" cy="6858000"/>
   <p:notesSz cx="6858000" cy="9144000"/>
@@ -6555,7 +6558,7 @@
           <a:p>
             <a:fld id="{F259A98E-7D3E-4BAE-A284-2CE0D83E33BF}" type="datetimeFigureOut">
               <a:rPr lang="it-IT" smtClean="0"/>
-              <a:t>03/01/2024</a:t>
+              <a:t>04/01/2024</a:t>
             </a:fld>
             <a:endParaRPr lang="it-IT"/>
           </a:p>
@@ -6817,7 +6820,7 @@
           <a:p>
             <a:fld id="{F259A98E-7D3E-4BAE-A284-2CE0D83E33BF}" type="datetimeFigureOut">
               <a:rPr lang="it-IT" smtClean="0"/>
-              <a:t>03/01/2024</a:t>
+              <a:t>04/01/2024</a:t>
             </a:fld>
             <a:endParaRPr lang="it-IT"/>
           </a:p>
@@ -7052,7 +7055,7 @@
           <a:p>
             <a:fld id="{F259A98E-7D3E-4BAE-A284-2CE0D83E33BF}" type="datetimeFigureOut">
               <a:rPr lang="it-IT" smtClean="0"/>
-              <a:t>03/01/2024</a:t>
+              <a:t>04/01/2024</a:t>
             </a:fld>
             <a:endParaRPr lang="it-IT"/>
           </a:p>
@@ -7292,7 +7295,7 @@
           <a:p>
             <a:fld id="{F259A98E-7D3E-4BAE-A284-2CE0D83E33BF}" type="datetimeFigureOut">
               <a:rPr lang="it-IT" smtClean="0"/>
-              <a:t>03/01/2024</a:t>
+              <a:t>04/01/2024</a:t>
             </a:fld>
             <a:endParaRPr lang="it-IT"/>
           </a:p>
@@ -7599,7 +7602,7 @@
           <a:p>
             <a:fld id="{F259A98E-7D3E-4BAE-A284-2CE0D83E33BF}" type="datetimeFigureOut">
               <a:rPr lang="it-IT" smtClean="0"/>
-              <a:t>03/01/2024</a:t>
+              <a:t>04/01/2024</a:t>
             </a:fld>
             <a:endParaRPr lang="it-IT"/>
           </a:p>
@@ -7901,7 +7904,7 @@
           <a:p>
             <a:fld id="{F259A98E-7D3E-4BAE-A284-2CE0D83E33BF}" type="datetimeFigureOut">
               <a:rPr lang="it-IT" smtClean="0"/>
-              <a:t>03/01/2024</a:t>
+              <a:t>04/01/2024</a:t>
             </a:fld>
             <a:endParaRPr lang="it-IT"/>
           </a:p>
@@ -8323,7 +8326,7 @@
           <a:p>
             <a:fld id="{F259A98E-7D3E-4BAE-A284-2CE0D83E33BF}" type="datetimeFigureOut">
               <a:rPr lang="it-IT" smtClean="0"/>
-              <a:t>03/01/2024</a:t>
+              <a:t>04/01/2024</a:t>
             </a:fld>
             <a:endParaRPr lang="it-IT"/>
           </a:p>
@@ -8418,7 +8421,7 @@
           <a:p>
             <a:fld id="{F259A98E-7D3E-4BAE-A284-2CE0D83E33BF}" type="datetimeFigureOut">
               <a:rPr lang="it-IT" smtClean="0"/>
-              <a:t>03/01/2024</a:t>
+              <a:t>04/01/2024</a:t>
             </a:fld>
             <a:endParaRPr lang="it-IT"/>
           </a:p>
@@ -8580,7 +8583,7 @@
           <a:p>
             <a:fld id="{F259A98E-7D3E-4BAE-A284-2CE0D83E33BF}" type="datetimeFigureOut">
               <a:rPr lang="it-IT" smtClean="0"/>
-              <a:t>03/01/2024</a:t>
+              <a:t>04/01/2024</a:t>
             </a:fld>
             <a:endParaRPr lang="it-IT"/>
           </a:p>
@@ -8958,7 +8961,7 @@
           <a:p>
             <a:fld id="{F259A98E-7D3E-4BAE-A284-2CE0D83E33BF}" type="datetimeFigureOut">
               <a:rPr lang="it-IT" smtClean="0"/>
-              <a:t>03/01/2024</a:t>
+              <a:t>04/01/2024</a:t>
             </a:fld>
             <a:endParaRPr lang="it-IT"/>
           </a:p>
@@ -9247,7 +9250,7 @@
           <a:p>
             <a:fld id="{F259A98E-7D3E-4BAE-A284-2CE0D83E33BF}" type="datetimeFigureOut">
               <a:rPr lang="it-IT" smtClean="0"/>
-              <a:t>03/01/2024</a:t>
+              <a:t>04/01/2024</a:t>
             </a:fld>
             <a:endParaRPr lang="it-IT"/>
           </a:p>
@@ -9458,7 +9461,7 @@
           <a:p>
             <a:fld id="{F259A98E-7D3E-4BAE-A284-2CE0D83E33BF}" type="datetimeFigureOut">
               <a:rPr lang="it-IT" smtClean="0"/>
-              <a:t>03/01/2024</a:t>
+              <a:t>04/01/2024</a:t>
             </a:fld>
             <a:endParaRPr lang="it-IT"/>
           </a:p>
@@ -10239,8 +10242,17 @@
           <a:p>
             <a:r>
               <a:rPr lang="it-IT" dirty="0"/>
-              <a:t>Meccanismi di sincronizzazione</a:t>
-            </a:r>
+              <a:t>Meccanismi di sincronizzazione </a:t>
+            </a:r>
+            <a:r>
+              <a:rPr lang="it-IT" sz="1600" dirty="0"/>
+              <a:t>– Interrupt </a:t>
+            </a:r>
+            <a:r>
+              <a:rPr lang="it-IT" sz="1600" dirty="0" err="1"/>
+              <a:t>disable</a:t>
+            </a:r>
+            <a:endParaRPr lang="it-IT" dirty="0"/>
           </a:p>
         </p:txBody>
       </p:sp>
@@ -10260,7 +10272,12 @@
             <p:ph type="body" idx="1"/>
           </p:nvPr>
         </p:nvSpPr>
-        <p:spPr/>
+        <p:spPr>
+          <a:xfrm>
+            <a:off x="887219" y="2913503"/>
+            <a:ext cx="5087075" cy="536005"/>
+          </a:xfrm>
+        </p:spPr>
         <p:txBody>
           <a:bodyPr/>
           <a:lstStyle/>
@@ -10288,12 +10305,104 @@
             <p:ph sz="half" idx="2"/>
           </p:nvPr>
         </p:nvSpPr>
-        <p:spPr/>
+        <p:spPr>
+          <a:xfrm>
+            <a:off x="581194" y="3588663"/>
+            <a:ext cx="5393100" cy="2934999"/>
+          </a:xfrm>
+        </p:spPr>
         <p:txBody>
-          <a:bodyPr/>
+          <a:bodyPr>
+            <a:normAutofit lnSpcReduction="10000"/>
+          </a:bodyPr>
           <a:lstStyle/>
           <a:p>
-            <a:endParaRPr lang="it-IT"/>
+            <a:r>
+              <a:rPr lang="it-IT" dirty="0"/>
+              <a:t>Dà la possibilità di modificare la priorità degli interrupt e di abilitarli/disabilitarli</a:t>
+            </a:r>
+          </a:p>
+          <a:p>
+            <a:r>
+              <a:rPr lang="it-IT" b="1" dirty="0"/>
+              <a:t>spl0</a:t>
+            </a:r>
+            <a:r>
+              <a:rPr lang="it-IT" dirty="0"/>
+              <a:t>() </a:t>
+            </a:r>
+            <a:r>
+              <a:rPr lang="it-IT" dirty="0">
+                <a:sym typeface="Wingdings" panose="05000000000000000000" pitchFamily="2" charset="2"/>
+              </a:rPr>
+              <a:t> </a:t>
+            </a:r>
+            <a:r>
+              <a:rPr lang="it-IT" altLang="it-IT" dirty="0"/>
+              <a:t>imposta IPL su 0, abilitando tutti gli interrupt </a:t>
+            </a:r>
+            <a:endParaRPr lang="it-IT" dirty="0"/>
+          </a:p>
+          <a:p>
+            <a:r>
+              <a:rPr lang="it-IT" b="1" dirty="0" err="1"/>
+              <a:t>splhigh</a:t>
+            </a:r>
+            <a:r>
+              <a:rPr lang="it-IT" dirty="0"/>
+              <a:t>() </a:t>
+            </a:r>
+            <a:r>
+              <a:rPr lang="it-IT" dirty="0">
+                <a:sym typeface="Wingdings" panose="05000000000000000000" pitchFamily="2" charset="2"/>
+              </a:rPr>
+              <a:t> i</a:t>
+            </a:r>
+            <a:r>
+              <a:rPr lang="it-IT" altLang="it-IT" dirty="0"/>
+              <a:t>mposta IPL al valore più alto, disabilitando tutti gli interrupt. </a:t>
+            </a:r>
+            <a:endParaRPr lang="it-IT" dirty="0"/>
+          </a:p>
+          <a:p>
+            <a:r>
+              <a:rPr lang="it-IT" b="1" dirty="0" err="1"/>
+              <a:t>splx</a:t>
+            </a:r>
+            <a:r>
+              <a:rPr lang="it-IT" dirty="0"/>
+              <a:t>(S) </a:t>
+            </a:r>
+            <a:r>
+              <a:rPr lang="it-IT" dirty="0">
+                <a:sym typeface="Wingdings" panose="05000000000000000000" pitchFamily="2" charset="2"/>
+              </a:rPr>
+              <a:t> imposta IPL al valore S, abilitando lo stato rappresentato da S</a:t>
+            </a:r>
+          </a:p>
+          <a:p>
+            <a:r>
+              <a:rPr lang="it-IT" sz="1400" i="1" dirty="0" err="1">
+                <a:sym typeface="Wingdings" panose="05000000000000000000" pitchFamily="2" charset="2"/>
+              </a:rPr>
+              <a:t>kern</a:t>
+            </a:r>
+            <a:r>
+              <a:rPr lang="it-IT" sz="1400" i="1" dirty="0">
+                <a:sym typeface="Wingdings" panose="05000000000000000000" pitchFamily="2" charset="2"/>
+              </a:rPr>
+              <a:t>/include/</a:t>
+            </a:r>
+            <a:r>
+              <a:rPr lang="it-IT" sz="1400" i="1" dirty="0" err="1">
+                <a:sym typeface="Wingdings" panose="05000000000000000000" pitchFamily="2" charset="2"/>
+              </a:rPr>
+              <a:t>spl.h</a:t>
+            </a:r>
+            <a:endParaRPr lang="it-IT" sz="1400" i="1" dirty="0"/>
+          </a:p>
+          <a:p>
+            <a:endParaRPr lang="it-IT" dirty="0"/>
           </a:p>
         </p:txBody>
       </p:sp>
@@ -10313,7 +10422,12 @@
             <p:ph type="body" sz="quarter" idx="3"/>
           </p:nvPr>
         </p:nvSpPr>
-        <p:spPr/>
+        <p:spPr>
+          <a:xfrm>
+            <a:off x="6523735" y="2913503"/>
+            <a:ext cx="5087073" cy="553373"/>
+          </a:xfrm>
+        </p:spPr>
         <p:txBody>
           <a:bodyPr/>
           <a:lstStyle/>
@@ -10341,12 +10455,351 @@
             <p:ph sz="quarter" idx="4"/>
           </p:nvPr>
         </p:nvSpPr>
-        <p:spPr/>
+        <p:spPr>
+          <a:xfrm>
+            <a:off x="6217709" y="3588663"/>
+            <a:ext cx="5393100" cy="2934999"/>
+          </a:xfrm>
+        </p:spPr>
         <p:txBody>
-          <a:bodyPr/>
+          <a:bodyPr>
+            <a:normAutofit lnSpcReduction="10000"/>
+          </a:bodyPr>
           <a:lstStyle/>
           <a:p>
-            <a:endParaRPr lang="it-IT"/>
+            <a:r>
+              <a:rPr lang="it-IT" dirty="0"/>
+              <a:t>Dà la possibilità di abilitare/disabilitare gli interrupt ma </a:t>
+            </a:r>
+            <a:r>
+              <a:rPr lang="it-IT" b="1" dirty="0"/>
+              <a:t>non</a:t>
+            </a:r>
+            <a:r>
+              <a:rPr lang="it-IT" dirty="0"/>
+              <a:t> dà la possibilità di controllare la priorità degli interrupt</a:t>
+            </a:r>
+          </a:p>
+          <a:p>
+            <a:r>
+              <a:rPr lang="it-IT" b="1" dirty="0" err="1"/>
+              <a:t>intr_enable</a:t>
+            </a:r>
+            <a:r>
+              <a:rPr lang="it-IT" dirty="0"/>
+              <a:t>() </a:t>
+            </a:r>
+            <a:r>
+              <a:rPr lang="it-IT" dirty="0">
+                <a:sym typeface="Wingdings" panose="05000000000000000000" pitchFamily="2" charset="2"/>
+              </a:rPr>
+              <a:t> abilita gli interrupt</a:t>
+            </a:r>
+            <a:endParaRPr lang="it-IT" dirty="0"/>
+          </a:p>
+          <a:p>
+            <a:r>
+              <a:rPr lang="it-IT" b="1" dirty="0" err="1"/>
+              <a:t>intr_disable</a:t>
+            </a:r>
+            <a:r>
+              <a:rPr lang="it-IT" dirty="0"/>
+              <a:t>() </a:t>
+            </a:r>
+            <a:r>
+              <a:rPr lang="it-IT" dirty="0">
+                <a:sym typeface="Wingdings" panose="05000000000000000000" pitchFamily="2" charset="2"/>
+              </a:rPr>
+              <a:t> disabilita gli interrupt</a:t>
+            </a:r>
+          </a:p>
+          <a:p>
+            <a:r>
+              <a:rPr lang="it-IT" sz="1400" i="1" dirty="0" err="1">
+                <a:sym typeface="Wingdings" panose="05000000000000000000" pitchFamily="2" charset="2"/>
+              </a:rPr>
+              <a:t>src</a:t>
+            </a:r>
+            <a:r>
+              <a:rPr lang="it-IT" sz="1400" i="1" dirty="0">
+                <a:sym typeface="Wingdings" panose="05000000000000000000" pitchFamily="2" charset="2"/>
+              </a:rPr>
+              <a:t>/</a:t>
+            </a:r>
+            <a:r>
+              <a:rPr lang="it-IT" sz="1400" i="1" dirty="0" err="1">
+                <a:sym typeface="Wingdings" panose="05000000000000000000" pitchFamily="2" charset="2"/>
+              </a:rPr>
+              <a:t>thread</a:t>
+            </a:r>
+            <a:r>
+              <a:rPr lang="it-IT" sz="1400" i="1" dirty="0">
+                <a:sym typeface="Wingdings" panose="05000000000000000000" pitchFamily="2" charset="2"/>
+              </a:rPr>
+              <a:t>/</a:t>
+            </a:r>
+            <a:r>
+              <a:rPr lang="it-IT" sz="1400" i="1" dirty="0" err="1">
+                <a:sym typeface="Wingdings" panose="05000000000000000000" pitchFamily="2" charset="2"/>
+              </a:rPr>
+              <a:t>interrupt.h</a:t>
+            </a:r>
+            <a:endParaRPr lang="it-IT" sz="1400" dirty="0"/>
+          </a:p>
+        </p:txBody>
+      </p:sp>
+      <p:sp>
+        <p:nvSpPr>
+          <p:cNvPr id="3" name="Segnaposto testo 3">
+            <a:extLst>
+              <a:ext uri="{FF2B5EF4-FFF2-40B4-BE49-F238E27FC236}">
+                <a16:creationId xmlns:a16="http://schemas.microsoft.com/office/drawing/2014/main" id="{DD092F63-1123-8337-F4DC-4B5BF08C3E1F}"/>
+              </a:ext>
+            </a:extLst>
+          </p:cNvPr>
+          <p:cNvSpPr txBox="1">
+            <a:spLocks/>
+          </p:cNvSpPr>
+          <p:nvPr/>
+        </p:nvSpPr>
+        <p:spPr>
+          <a:xfrm>
+            <a:off x="615548" y="1999040"/>
+            <a:ext cx="11245148" cy="921080"/>
+          </a:xfrm>
+          <a:prstGeom prst="rect">
+            <a:avLst/>
+          </a:prstGeom>
+        </p:spPr>
+        <p:txBody>
+          <a:bodyPr vert="horz" lIns="91440" tIns="45720" rIns="91440" bIns="45720" rtlCol="0" anchor="b">
+            <a:noAutofit/>
+          </a:bodyPr>
+          <a:lstStyle>
+            <a:lvl1pPr marL="0" indent="0" algn="l" defTabSz="457200" rtl="0" eaLnBrk="1" latinLnBrk="0" hangingPunct="1">
+              <a:spcBef>
+                <a:spcPct val="20000"/>
+              </a:spcBef>
+              <a:spcAft>
+                <a:spcPts val="600"/>
+              </a:spcAft>
+              <a:buClr>
+                <a:schemeClr val="accent2"/>
+              </a:buClr>
+              <a:buSzPct val="92000"/>
+              <a:buFont typeface="Wingdings 2" panose="05020102010507070707" pitchFamily="18" charset="2"/>
+              <a:buNone/>
+              <a:defRPr sz="2200" b="0" kern="1200">
+                <a:solidFill>
+                  <a:schemeClr val="accent2"/>
+                </a:solidFill>
+                <a:latin typeface="+mn-lt"/>
+                <a:ea typeface="+mn-ea"/>
+                <a:cs typeface="+mn-cs"/>
+              </a:defRPr>
+            </a:lvl1pPr>
+            <a:lvl2pPr marL="457200" indent="0" algn="l" defTabSz="457200" rtl="0" eaLnBrk="1" latinLnBrk="0" hangingPunct="1">
+              <a:spcBef>
+                <a:spcPct val="20000"/>
+              </a:spcBef>
+              <a:spcAft>
+                <a:spcPts val="600"/>
+              </a:spcAft>
+              <a:buClr>
+                <a:schemeClr val="accent2"/>
+              </a:buClr>
+              <a:buSzPct val="92000"/>
+              <a:buFont typeface="Wingdings 2" panose="05020102010507070707" pitchFamily="18" charset="2"/>
+              <a:buNone/>
+              <a:defRPr sz="2000" b="1" kern="1200">
+                <a:solidFill>
+                  <a:schemeClr val="tx2"/>
+                </a:solidFill>
+                <a:latin typeface="+mn-lt"/>
+                <a:ea typeface="+mn-ea"/>
+                <a:cs typeface="+mn-cs"/>
+              </a:defRPr>
+            </a:lvl2pPr>
+            <a:lvl3pPr marL="914400" indent="0" algn="l" defTabSz="457200" rtl="0" eaLnBrk="1" latinLnBrk="0" hangingPunct="1">
+              <a:spcBef>
+                <a:spcPct val="20000"/>
+              </a:spcBef>
+              <a:spcAft>
+                <a:spcPts val="600"/>
+              </a:spcAft>
+              <a:buClr>
+                <a:schemeClr val="accent2"/>
+              </a:buClr>
+              <a:buSzPct val="92000"/>
+              <a:buFont typeface="Wingdings 2" panose="05020102010507070707" pitchFamily="18" charset="2"/>
+              <a:buNone/>
+              <a:defRPr sz="1800" b="1" kern="1200">
+                <a:solidFill>
+                  <a:schemeClr val="tx2"/>
+                </a:solidFill>
+                <a:latin typeface="+mn-lt"/>
+                <a:ea typeface="+mn-ea"/>
+                <a:cs typeface="+mn-cs"/>
+              </a:defRPr>
+            </a:lvl3pPr>
+            <a:lvl4pPr marL="1371600" indent="0" algn="l" defTabSz="457200" rtl="0" eaLnBrk="1" latinLnBrk="0" hangingPunct="1">
+              <a:spcBef>
+                <a:spcPct val="20000"/>
+              </a:spcBef>
+              <a:spcAft>
+                <a:spcPts val="600"/>
+              </a:spcAft>
+              <a:buClr>
+                <a:schemeClr val="accent2"/>
+              </a:buClr>
+              <a:buSzPct val="92000"/>
+              <a:buFont typeface="Wingdings 2" panose="05020102010507070707" pitchFamily="18" charset="2"/>
+              <a:buNone/>
+              <a:defRPr sz="1600" b="1" kern="1200">
+                <a:solidFill>
+                  <a:schemeClr val="tx2"/>
+                </a:solidFill>
+                <a:latin typeface="+mn-lt"/>
+                <a:ea typeface="+mn-ea"/>
+                <a:cs typeface="+mn-cs"/>
+              </a:defRPr>
+            </a:lvl4pPr>
+            <a:lvl5pPr marL="1828800" indent="0" algn="l" defTabSz="457200" rtl="0" eaLnBrk="1" latinLnBrk="0" hangingPunct="1">
+              <a:spcBef>
+                <a:spcPct val="20000"/>
+              </a:spcBef>
+              <a:spcAft>
+                <a:spcPts val="600"/>
+              </a:spcAft>
+              <a:buClr>
+                <a:schemeClr val="accent2"/>
+              </a:buClr>
+              <a:buSzPct val="92000"/>
+              <a:buFont typeface="Wingdings 2" panose="05020102010507070707" pitchFamily="18" charset="2"/>
+              <a:buNone/>
+              <a:defRPr sz="1600" b="1" kern="1200">
+                <a:solidFill>
+                  <a:schemeClr val="tx2"/>
+                </a:solidFill>
+                <a:latin typeface="+mn-lt"/>
+                <a:ea typeface="+mn-ea"/>
+                <a:cs typeface="+mn-cs"/>
+              </a:defRPr>
+            </a:lvl5pPr>
+            <a:lvl6pPr marL="2286000" indent="0" algn="l" defTabSz="457200" rtl="0" eaLnBrk="1" latinLnBrk="0" hangingPunct="1">
+              <a:spcBef>
+                <a:spcPct val="20000"/>
+              </a:spcBef>
+              <a:spcAft>
+                <a:spcPts val="600"/>
+              </a:spcAft>
+              <a:buClr>
+                <a:schemeClr val="accent2"/>
+              </a:buClr>
+              <a:buSzPct val="92000"/>
+              <a:buFont typeface="Wingdings 2" panose="05020102010507070707" pitchFamily="18" charset="2"/>
+              <a:buNone/>
+              <a:defRPr sz="1600" b="1" kern="1200">
+                <a:solidFill>
+                  <a:schemeClr val="tx2"/>
+                </a:solidFill>
+                <a:latin typeface="+mn-lt"/>
+                <a:ea typeface="+mn-ea"/>
+                <a:cs typeface="+mn-cs"/>
+              </a:defRPr>
+            </a:lvl6pPr>
+            <a:lvl7pPr marL="2743200" indent="0" algn="l" defTabSz="457200" rtl="0" eaLnBrk="1" latinLnBrk="0" hangingPunct="1">
+              <a:spcBef>
+                <a:spcPct val="20000"/>
+              </a:spcBef>
+              <a:spcAft>
+                <a:spcPts val="600"/>
+              </a:spcAft>
+              <a:buClr>
+                <a:schemeClr val="accent2"/>
+              </a:buClr>
+              <a:buSzPct val="92000"/>
+              <a:buFont typeface="Wingdings 2" panose="05020102010507070707" pitchFamily="18" charset="2"/>
+              <a:buNone/>
+              <a:defRPr sz="1600" b="1" kern="1200">
+                <a:solidFill>
+                  <a:schemeClr val="tx2"/>
+                </a:solidFill>
+                <a:latin typeface="+mn-lt"/>
+                <a:ea typeface="+mn-ea"/>
+                <a:cs typeface="+mn-cs"/>
+              </a:defRPr>
+            </a:lvl7pPr>
+            <a:lvl8pPr marL="3200400" indent="0" algn="l" defTabSz="457200" rtl="0" eaLnBrk="1" latinLnBrk="0" hangingPunct="1">
+              <a:spcBef>
+                <a:spcPct val="20000"/>
+              </a:spcBef>
+              <a:spcAft>
+                <a:spcPts val="600"/>
+              </a:spcAft>
+              <a:buClr>
+                <a:schemeClr val="accent2"/>
+              </a:buClr>
+              <a:buSzPct val="92000"/>
+              <a:buFont typeface="Wingdings 2" panose="05020102010507070707" pitchFamily="18" charset="2"/>
+              <a:buNone/>
+              <a:defRPr sz="1600" b="1" kern="1200">
+                <a:solidFill>
+                  <a:schemeClr val="tx2"/>
+                </a:solidFill>
+                <a:latin typeface="+mn-lt"/>
+                <a:ea typeface="+mn-ea"/>
+                <a:cs typeface="+mn-cs"/>
+              </a:defRPr>
+            </a:lvl8pPr>
+            <a:lvl9pPr marL="3657600" indent="0" algn="l" defTabSz="457200" rtl="0" eaLnBrk="1" latinLnBrk="0" hangingPunct="1">
+              <a:spcBef>
+                <a:spcPct val="20000"/>
+              </a:spcBef>
+              <a:spcAft>
+                <a:spcPts val="600"/>
+              </a:spcAft>
+              <a:buClr>
+                <a:schemeClr val="accent2"/>
+              </a:buClr>
+              <a:buSzPct val="92000"/>
+              <a:buFont typeface="Wingdings 2" panose="05020102010507070707" pitchFamily="18" charset="2"/>
+              <a:buNone/>
+              <a:defRPr sz="1600" b="1" kern="1200">
+                <a:solidFill>
+                  <a:schemeClr val="tx2"/>
+                </a:solidFill>
+                <a:latin typeface="+mn-lt"/>
+                <a:ea typeface="+mn-ea"/>
+                <a:cs typeface="+mn-cs"/>
+              </a:defRPr>
+            </a:lvl9pPr>
+          </a:lstStyle>
+          <a:p>
+            <a:r>
+              <a:rPr lang="it-IT" sz="2000" dirty="0">
+                <a:solidFill>
+                  <a:schemeClr val="tx1"/>
+                </a:solidFill>
+              </a:rPr>
+              <a:t>Sia OS161 che </a:t>
+            </a:r>
+            <a:r>
+              <a:rPr lang="it-IT" sz="2000" dirty="0" err="1">
+                <a:solidFill>
+                  <a:schemeClr val="tx1"/>
+                </a:solidFill>
+              </a:rPr>
+              <a:t>PintOS</a:t>
+            </a:r>
+            <a:r>
+              <a:rPr lang="it-IT" sz="2000" dirty="0">
+                <a:solidFill>
+                  <a:schemeClr val="tx1"/>
+                </a:solidFill>
+              </a:rPr>
+              <a:t> danno la possibilità di abilitare/disabilitare gli interrupt per poter gestire le sezioni critiche</a:t>
+            </a:r>
           </a:p>
         </p:txBody>
       </p:sp>
@@ -10364,6 +10817,1708 @@
 </file>
 
 <file path=ppt/slides/slide11.xml><?xml version="1.0" encoding="utf-8"?>
+<p:sld xmlns:a="http://schemas.openxmlformats.org/drawingml/2006/main" xmlns:r="http://schemas.openxmlformats.org/officeDocument/2006/relationships" xmlns:p="http://schemas.openxmlformats.org/presentationml/2006/main">
+  <p:cSld>
+    <p:spTree>
+      <p:nvGrpSpPr>
+        <p:cNvPr id="1" name=""/>
+        <p:cNvGrpSpPr/>
+        <p:nvPr/>
+      </p:nvGrpSpPr>
+      <p:grpSpPr>
+        <a:xfrm>
+          <a:off x="0" y="0"/>
+          <a:ext cx="0" cy="0"/>
+          <a:chOff x="0" y="0"/>
+          <a:chExt cx="0" cy="0"/>
+        </a:xfrm>
+      </p:grpSpPr>
+      <p:sp>
+        <p:nvSpPr>
+          <p:cNvPr id="2" name="Titolo 1">
+            <a:extLst>
+              <a:ext uri="{FF2B5EF4-FFF2-40B4-BE49-F238E27FC236}">
+                <a16:creationId xmlns:a16="http://schemas.microsoft.com/office/drawing/2014/main" id="{69441F67-1949-8EC8-EB98-85670AC3670C}"/>
+              </a:ext>
+            </a:extLst>
+          </p:cNvPr>
+          <p:cNvSpPr>
+            <a:spLocks noGrp="1"/>
+          </p:cNvSpPr>
+          <p:nvPr>
+            <p:ph type="title"/>
+          </p:nvPr>
+        </p:nvSpPr>
+        <p:spPr/>
+        <p:txBody>
+          <a:bodyPr>
+            <a:normAutofit/>
+          </a:bodyPr>
+          <a:lstStyle/>
+          <a:p>
+            <a:r>
+              <a:rPr lang="it-IT" dirty="0"/>
+              <a:t>Meccanismi di sincronizzazione </a:t>
+            </a:r>
+            <a:r>
+              <a:rPr lang="it-IT" sz="1600" dirty="0"/>
+              <a:t>- </a:t>
+            </a:r>
+            <a:r>
+              <a:rPr lang="it-IT" sz="1600" dirty="0" err="1"/>
+              <a:t>SEmaphore</a:t>
+            </a:r>
+            <a:endParaRPr lang="it-IT" dirty="0"/>
+          </a:p>
+        </p:txBody>
+      </p:sp>
+      <p:sp>
+        <p:nvSpPr>
+          <p:cNvPr id="4" name="Segnaposto testo 3">
+            <a:extLst>
+              <a:ext uri="{FF2B5EF4-FFF2-40B4-BE49-F238E27FC236}">
+                <a16:creationId xmlns:a16="http://schemas.microsoft.com/office/drawing/2014/main" id="{3484543A-BB31-0207-182F-1F1C206F0C68}"/>
+              </a:ext>
+            </a:extLst>
+          </p:cNvPr>
+          <p:cNvSpPr>
+            <a:spLocks noGrp="1"/>
+          </p:cNvSpPr>
+          <p:nvPr>
+            <p:ph type="body" idx="1"/>
+          </p:nvPr>
+        </p:nvSpPr>
+        <p:spPr>
+          <a:xfrm>
+            <a:off x="887219" y="2794235"/>
+            <a:ext cx="5087075" cy="536005"/>
+          </a:xfrm>
+        </p:spPr>
+        <p:txBody>
+          <a:bodyPr/>
+          <a:lstStyle/>
+          <a:p>
+            <a:r>
+              <a:rPr lang="it-IT" dirty="0"/>
+              <a:t>OS161</a:t>
+            </a:r>
+          </a:p>
+        </p:txBody>
+      </p:sp>
+      <p:sp>
+        <p:nvSpPr>
+          <p:cNvPr id="8" name="Segnaposto contenuto 7">
+            <a:extLst>
+              <a:ext uri="{FF2B5EF4-FFF2-40B4-BE49-F238E27FC236}">
+                <a16:creationId xmlns:a16="http://schemas.microsoft.com/office/drawing/2014/main" id="{A1E5DF89-94E7-98C4-F563-B3A43317A1CE}"/>
+              </a:ext>
+            </a:extLst>
+          </p:cNvPr>
+          <p:cNvSpPr>
+            <a:spLocks noGrp="1"/>
+          </p:cNvSpPr>
+          <p:nvPr>
+            <p:ph sz="half" idx="2"/>
+          </p:nvPr>
+        </p:nvSpPr>
+        <p:spPr>
+          <a:xfrm>
+            <a:off x="581194" y="3469395"/>
+            <a:ext cx="5393100" cy="2934999"/>
+          </a:xfrm>
+        </p:spPr>
+        <p:txBody>
+          <a:bodyPr>
+            <a:noAutofit/>
+          </a:bodyPr>
+          <a:lstStyle/>
+          <a:p>
+            <a:r>
+              <a:rPr lang="it-IT" sz="1600" dirty="0"/>
+              <a:t>Semafori implementati come </a:t>
+            </a:r>
+            <a:r>
+              <a:rPr lang="it-IT" sz="1600" dirty="0" err="1"/>
+              <a:t>struct</a:t>
+            </a:r>
+            <a:r>
+              <a:rPr lang="it-IT" sz="1600" dirty="0"/>
+              <a:t> contenente:</a:t>
+            </a:r>
+          </a:p>
+          <a:p>
+            <a:pPr lvl="1"/>
+            <a:r>
+              <a:rPr lang="it-IT" dirty="0"/>
+              <a:t>nome: utilizzato per identificarlo</a:t>
+            </a:r>
+          </a:p>
+          <a:p>
+            <a:pPr lvl="1"/>
+            <a:r>
+              <a:rPr lang="it-IT" dirty="0" err="1"/>
+              <a:t>wchan</a:t>
+            </a:r>
+            <a:r>
+              <a:rPr lang="it-IT" dirty="0"/>
+              <a:t>: per memorizzare i </a:t>
+            </a:r>
+            <a:r>
+              <a:rPr lang="it-IT" dirty="0" err="1"/>
+              <a:t>threads</a:t>
+            </a:r>
+            <a:r>
+              <a:rPr lang="it-IT" dirty="0"/>
+              <a:t> in attesa</a:t>
+            </a:r>
+          </a:p>
+          <a:p>
+            <a:pPr lvl="1"/>
+            <a:r>
+              <a:rPr lang="it-IT" dirty="0" err="1"/>
+              <a:t>spinlock</a:t>
+            </a:r>
+            <a:r>
+              <a:rPr lang="it-IT" dirty="0"/>
+              <a:t>: per mettere un lock sul semaforo (protegge il contatore)</a:t>
+            </a:r>
+          </a:p>
+          <a:p>
+            <a:pPr lvl="1"/>
+            <a:r>
+              <a:rPr lang="it-IT" dirty="0"/>
+              <a:t>contatore: numero di </a:t>
+            </a:r>
+            <a:r>
+              <a:rPr lang="it-IT" dirty="0" err="1"/>
+              <a:t>threads</a:t>
+            </a:r>
+            <a:r>
+              <a:rPr lang="it-IT" dirty="0"/>
+              <a:t> che possono accedere alla risorsa</a:t>
+            </a:r>
+          </a:p>
+          <a:p>
+            <a:r>
+              <a:rPr lang="it-IT" sz="1600" dirty="0"/>
+              <a:t>Sono usate le funzioni </a:t>
+            </a:r>
+            <a:r>
+              <a:rPr lang="it-IT" sz="1600" b="1" dirty="0"/>
+              <a:t>P </a:t>
+            </a:r>
+            <a:r>
+              <a:rPr lang="it-IT" sz="1600" dirty="0"/>
+              <a:t>(decrementa il contatore e blocca il </a:t>
+            </a:r>
+            <a:r>
+              <a:rPr lang="it-IT" sz="1600" dirty="0" err="1"/>
+              <a:t>thread</a:t>
+            </a:r>
+            <a:r>
+              <a:rPr lang="it-IT" sz="1600" dirty="0"/>
+              <a:t> se </a:t>
+            </a:r>
+            <a:r>
+              <a:rPr lang="it-IT" sz="1600" dirty="0" err="1"/>
+              <a:t>cont</a:t>
+            </a:r>
+            <a:r>
+              <a:rPr lang="it-IT" sz="1600" dirty="0"/>
+              <a:t>=0) e </a:t>
+            </a:r>
+            <a:r>
+              <a:rPr lang="it-IT" sz="1600" b="1" dirty="0"/>
+              <a:t>V</a:t>
+            </a:r>
+            <a:r>
+              <a:rPr lang="it-IT" sz="1600" dirty="0"/>
+              <a:t> (incrementa il contatore e sveglia un </a:t>
+            </a:r>
+            <a:r>
+              <a:rPr lang="it-IT" sz="1600" dirty="0" err="1"/>
+              <a:t>thread</a:t>
+            </a:r>
+            <a:r>
+              <a:rPr lang="it-IT" sz="1600" dirty="0"/>
+              <a:t> in attesa)</a:t>
+            </a:r>
+            <a:endParaRPr lang="it-IT" sz="1600" b="1" dirty="0"/>
+          </a:p>
+          <a:p>
+            <a:endParaRPr lang="it-IT" sz="1600" dirty="0"/>
+          </a:p>
+        </p:txBody>
+      </p:sp>
+      <p:sp>
+        <p:nvSpPr>
+          <p:cNvPr id="9" name="Segnaposto testo 8">
+            <a:extLst>
+              <a:ext uri="{FF2B5EF4-FFF2-40B4-BE49-F238E27FC236}">
+                <a16:creationId xmlns:a16="http://schemas.microsoft.com/office/drawing/2014/main" id="{00842FCF-9A2A-27B3-4ED6-BB0713CE4444}"/>
+              </a:ext>
+            </a:extLst>
+          </p:cNvPr>
+          <p:cNvSpPr>
+            <a:spLocks noGrp="1"/>
+          </p:cNvSpPr>
+          <p:nvPr>
+            <p:ph type="body" sz="quarter" idx="3"/>
+          </p:nvPr>
+        </p:nvSpPr>
+        <p:spPr>
+          <a:xfrm>
+            <a:off x="6523735" y="2794235"/>
+            <a:ext cx="5087073" cy="553373"/>
+          </a:xfrm>
+        </p:spPr>
+        <p:txBody>
+          <a:bodyPr/>
+          <a:lstStyle/>
+          <a:p>
+            <a:r>
+              <a:rPr lang="it-IT" dirty="0"/>
+              <a:t>PINTOS</a:t>
+            </a:r>
+          </a:p>
+        </p:txBody>
+      </p:sp>
+      <p:sp>
+        <p:nvSpPr>
+          <p:cNvPr id="10" name="Segnaposto contenuto 9">
+            <a:extLst>
+              <a:ext uri="{FF2B5EF4-FFF2-40B4-BE49-F238E27FC236}">
+                <a16:creationId xmlns:a16="http://schemas.microsoft.com/office/drawing/2014/main" id="{3CDA2ECB-1671-3745-42C6-213A778ECD29}"/>
+              </a:ext>
+            </a:extLst>
+          </p:cNvPr>
+          <p:cNvSpPr>
+            <a:spLocks noGrp="1"/>
+          </p:cNvSpPr>
+          <p:nvPr>
+            <p:ph sz="quarter" idx="4"/>
+          </p:nvPr>
+        </p:nvSpPr>
+        <p:spPr>
+          <a:xfrm>
+            <a:off x="6217709" y="3469395"/>
+            <a:ext cx="5393100" cy="2934999"/>
+          </a:xfrm>
+        </p:spPr>
+        <p:txBody>
+          <a:bodyPr>
+            <a:noAutofit/>
+          </a:bodyPr>
+          <a:lstStyle/>
+          <a:p>
+            <a:r>
+              <a:rPr lang="it-IT" sz="1600" dirty="0"/>
+              <a:t>Semafori implementati come </a:t>
+            </a:r>
+            <a:r>
+              <a:rPr lang="it-IT" sz="1600" dirty="0" err="1"/>
+              <a:t>struct</a:t>
+            </a:r>
+            <a:r>
+              <a:rPr lang="it-IT" sz="1600" dirty="0"/>
+              <a:t> contenente:</a:t>
+            </a:r>
+          </a:p>
+          <a:p>
+            <a:pPr lvl="1"/>
+            <a:r>
+              <a:rPr lang="it-IT" dirty="0"/>
+              <a:t>valore: non negativo che indica il numero di </a:t>
+            </a:r>
+            <a:r>
+              <a:rPr lang="it-IT" dirty="0" err="1"/>
+              <a:t>threads</a:t>
+            </a:r>
+            <a:r>
+              <a:rPr lang="it-IT" dirty="0"/>
+              <a:t> che possono accedere alla risorsa</a:t>
+            </a:r>
+          </a:p>
+          <a:p>
+            <a:pPr lvl="1"/>
+            <a:r>
+              <a:rPr lang="it-IT" dirty="0"/>
+              <a:t>lista: </a:t>
+            </a:r>
+            <a:r>
+              <a:rPr lang="it-IT" dirty="0" err="1"/>
+              <a:t>linked</a:t>
+            </a:r>
+            <a:r>
+              <a:rPr lang="it-IT" dirty="0"/>
+              <a:t> list che memorizza i </a:t>
+            </a:r>
+            <a:r>
+              <a:rPr lang="it-IT" dirty="0" err="1"/>
+              <a:t>threads</a:t>
+            </a:r>
+            <a:r>
+              <a:rPr lang="it-IT" dirty="0"/>
+              <a:t> in attesa</a:t>
+            </a:r>
+          </a:p>
+          <a:p>
+            <a:r>
+              <a:rPr lang="it-IT" sz="1600" dirty="0"/>
+              <a:t>Sono usate le funzioni </a:t>
+            </a:r>
+            <a:r>
+              <a:rPr lang="it-IT" sz="1600" b="1" dirty="0" err="1"/>
+              <a:t>sema_down</a:t>
+            </a:r>
+            <a:r>
+              <a:rPr lang="it-IT" sz="1600" b="1" dirty="0"/>
+              <a:t> </a:t>
+            </a:r>
+            <a:r>
+              <a:rPr lang="it-IT" sz="1600" dirty="0"/>
+              <a:t>(decrementa il contatore e blocca il </a:t>
+            </a:r>
+            <a:r>
+              <a:rPr lang="it-IT" sz="1600" dirty="0" err="1"/>
+              <a:t>thread</a:t>
+            </a:r>
+            <a:r>
+              <a:rPr lang="it-IT" sz="1600" dirty="0"/>
+              <a:t> se </a:t>
+            </a:r>
+            <a:r>
+              <a:rPr lang="it-IT" sz="1600" dirty="0" err="1"/>
+              <a:t>cont</a:t>
+            </a:r>
+            <a:r>
+              <a:rPr lang="it-IT" sz="1600" dirty="0"/>
+              <a:t>=0) e </a:t>
+            </a:r>
+            <a:r>
+              <a:rPr lang="it-IT" sz="1600" b="1" dirty="0" err="1"/>
+              <a:t>sema_up</a:t>
+            </a:r>
+            <a:r>
+              <a:rPr lang="it-IT" sz="1600" dirty="0"/>
+              <a:t> (incrementa il contatore e sveglia un </a:t>
+            </a:r>
+            <a:r>
+              <a:rPr lang="it-IT" sz="1600" dirty="0" err="1"/>
+              <a:t>thread</a:t>
+            </a:r>
+            <a:r>
+              <a:rPr lang="it-IT" sz="1600" dirty="0"/>
+              <a:t> in attesa)</a:t>
+            </a:r>
+          </a:p>
+          <a:p>
+            <a:r>
+              <a:rPr lang="it-IT" sz="1600" dirty="0"/>
+              <a:t>È presente la funzione </a:t>
+            </a:r>
+            <a:r>
+              <a:rPr lang="it-IT" sz="1600" b="1" dirty="0" err="1"/>
+              <a:t>sema_try_down</a:t>
+            </a:r>
+            <a:r>
+              <a:rPr lang="it-IT" sz="1600" dirty="0"/>
+              <a:t> che prova ad abbassare il valore del semaforo senza attendere. Se il </a:t>
+            </a:r>
+            <a:r>
+              <a:rPr lang="it-IT" sz="1600" dirty="0" err="1"/>
+              <a:t>value</a:t>
+            </a:r>
+            <a:r>
+              <a:rPr lang="it-IT" sz="1600" dirty="0"/>
+              <a:t> è 0 il </a:t>
+            </a:r>
+            <a:r>
+              <a:rPr lang="it-IT" sz="1600" dirty="0" err="1"/>
+              <a:t>thread</a:t>
+            </a:r>
+            <a:r>
+              <a:rPr lang="it-IT" sz="1600" dirty="0"/>
+              <a:t> è bloccato e messo in attesa; altrimenti viene decrementato e la funzione restituisce </a:t>
+            </a:r>
+            <a:r>
+              <a:rPr lang="it-IT" sz="1600" dirty="0" err="1"/>
+              <a:t>true</a:t>
+            </a:r>
+            <a:endParaRPr lang="it-IT" sz="1600" dirty="0"/>
+          </a:p>
+        </p:txBody>
+      </p:sp>
+      <p:sp>
+        <p:nvSpPr>
+          <p:cNvPr id="3" name="Segnaposto testo 3">
+            <a:extLst>
+              <a:ext uri="{FF2B5EF4-FFF2-40B4-BE49-F238E27FC236}">
+                <a16:creationId xmlns:a16="http://schemas.microsoft.com/office/drawing/2014/main" id="{DD092F63-1123-8337-F4DC-4B5BF08C3E1F}"/>
+              </a:ext>
+            </a:extLst>
+          </p:cNvPr>
+          <p:cNvSpPr txBox="1">
+            <a:spLocks/>
+          </p:cNvSpPr>
+          <p:nvPr/>
+        </p:nvSpPr>
+        <p:spPr>
+          <a:xfrm>
+            <a:off x="615548" y="1879772"/>
+            <a:ext cx="11245148" cy="921080"/>
+          </a:xfrm>
+          <a:prstGeom prst="rect">
+            <a:avLst/>
+          </a:prstGeom>
+        </p:spPr>
+        <p:txBody>
+          <a:bodyPr vert="horz" lIns="91440" tIns="45720" rIns="91440" bIns="45720" rtlCol="0" anchor="b">
+            <a:noAutofit/>
+          </a:bodyPr>
+          <a:lstStyle>
+            <a:lvl1pPr marL="0" indent="0" algn="l" defTabSz="457200" rtl="0" eaLnBrk="1" latinLnBrk="0" hangingPunct="1">
+              <a:spcBef>
+                <a:spcPct val="20000"/>
+              </a:spcBef>
+              <a:spcAft>
+                <a:spcPts val="600"/>
+              </a:spcAft>
+              <a:buClr>
+                <a:schemeClr val="accent2"/>
+              </a:buClr>
+              <a:buSzPct val="92000"/>
+              <a:buFont typeface="Wingdings 2" panose="05020102010507070707" pitchFamily="18" charset="2"/>
+              <a:buNone/>
+              <a:defRPr sz="2200" b="0" kern="1200">
+                <a:solidFill>
+                  <a:schemeClr val="accent2"/>
+                </a:solidFill>
+                <a:latin typeface="+mn-lt"/>
+                <a:ea typeface="+mn-ea"/>
+                <a:cs typeface="+mn-cs"/>
+              </a:defRPr>
+            </a:lvl1pPr>
+            <a:lvl2pPr marL="457200" indent="0" algn="l" defTabSz="457200" rtl="0" eaLnBrk="1" latinLnBrk="0" hangingPunct="1">
+              <a:spcBef>
+                <a:spcPct val="20000"/>
+              </a:spcBef>
+              <a:spcAft>
+                <a:spcPts val="600"/>
+              </a:spcAft>
+              <a:buClr>
+                <a:schemeClr val="accent2"/>
+              </a:buClr>
+              <a:buSzPct val="92000"/>
+              <a:buFont typeface="Wingdings 2" panose="05020102010507070707" pitchFamily="18" charset="2"/>
+              <a:buNone/>
+              <a:defRPr sz="2000" b="1" kern="1200">
+                <a:solidFill>
+                  <a:schemeClr val="tx2"/>
+                </a:solidFill>
+                <a:latin typeface="+mn-lt"/>
+                <a:ea typeface="+mn-ea"/>
+                <a:cs typeface="+mn-cs"/>
+              </a:defRPr>
+            </a:lvl2pPr>
+            <a:lvl3pPr marL="914400" indent="0" algn="l" defTabSz="457200" rtl="0" eaLnBrk="1" latinLnBrk="0" hangingPunct="1">
+              <a:spcBef>
+                <a:spcPct val="20000"/>
+              </a:spcBef>
+              <a:spcAft>
+                <a:spcPts val="600"/>
+              </a:spcAft>
+              <a:buClr>
+                <a:schemeClr val="accent2"/>
+              </a:buClr>
+              <a:buSzPct val="92000"/>
+              <a:buFont typeface="Wingdings 2" panose="05020102010507070707" pitchFamily="18" charset="2"/>
+              <a:buNone/>
+              <a:defRPr sz="1800" b="1" kern="1200">
+                <a:solidFill>
+                  <a:schemeClr val="tx2"/>
+                </a:solidFill>
+                <a:latin typeface="+mn-lt"/>
+                <a:ea typeface="+mn-ea"/>
+                <a:cs typeface="+mn-cs"/>
+              </a:defRPr>
+            </a:lvl3pPr>
+            <a:lvl4pPr marL="1371600" indent="0" algn="l" defTabSz="457200" rtl="0" eaLnBrk="1" latinLnBrk="0" hangingPunct="1">
+              <a:spcBef>
+                <a:spcPct val="20000"/>
+              </a:spcBef>
+              <a:spcAft>
+                <a:spcPts val="600"/>
+              </a:spcAft>
+              <a:buClr>
+                <a:schemeClr val="accent2"/>
+              </a:buClr>
+              <a:buSzPct val="92000"/>
+              <a:buFont typeface="Wingdings 2" panose="05020102010507070707" pitchFamily="18" charset="2"/>
+              <a:buNone/>
+              <a:defRPr sz="1600" b="1" kern="1200">
+                <a:solidFill>
+                  <a:schemeClr val="tx2"/>
+                </a:solidFill>
+                <a:latin typeface="+mn-lt"/>
+                <a:ea typeface="+mn-ea"/>
+                <a:cs typeface="+mn-cs"/>
+              </a:defRPr>
+            </a:lvl4pPr>
+            <a:lvl5pPr marL="1828800" indent="0" algn="l" defTabSz="457200" rtl="0" eaLnBrk="1" latinLnBrk="0" hangingPunct="1">
+              <a:spcBef>
+                <a:spcPct val="20000"/>
+              </a:spcBef>
+              <a:spcAft>
+                <a:spcPts val="600"/>
+              </a:spcAft>
+              <a:buClr>
+                <a:schemeClr val="accent2"/>
+              </a:buClr>
+              <a:buSzPct val="92000"/>
+              <a:buFont typeface="Wingdings 2" panose="05020102010507070707" pitchFamily="18" charset="2"/>
+              <a:buNone/>
+              <a:defRPr sz="1600" b="1" kern="1200">
+                <a:solidFill>
+                  <a:schemeClr val="tx2"/>
+                </a:solidFill>
+                <a:latin typeface="+mn-lt"/>
+                <a:ea typeface="+mn-ea"/>
+                <a:cs typeface="+mn-cs"/>
+              </a:defRPr>
+            </a:lvl5pPr>
+            <a:lvl6pPr marL="2286000" indent="0" algn="l" defTabSz="457200" rtl="0" eaLnBrk="1" latinLnBrk="0" hangingPunct="1">
+              <a:spcBef>
+                <a:spcPct val="20000"/>
+              </a:spcBef>
+              <a:spcAft>
+                <a:spcPts val="600"/>
+              </a:spcAft>
+              <a:buClr>
+                <a:schemeClr val="accent2"/>
+              </a:buClr>
+              <a:buSzPct val="92000"/>
+              <a:buFont typeface="Wingdings 2" panose="05020102010507070707" pitchFamily="18" charset="2"/>
+              <a:buNone/>
+              <a:defRPr sz="1600" b="1" kern="1200">
+                <a:solidFill>
+                  <a:schemeClr val="tx2"/>
+                </a:solidFill>
+                <a:latin typeface="+mn-lt"/>
+                <a:ea typeface="+mn-ea"/>
+                <a:cs typeface="+mn-cs"/>
+              </a:defRPr>
+            </a:lvl6pPr>
+            <a:lvl7pPr marL="2743200" indent="0" algn="l" defTabSz="457200" rtl="0" eaLnBrk="1" latinLnBrk="0" hangingPunct="1">
+              <a:spcBef>
+                <a:spcPct val="20000"/>
+              </a:spcBef>
+              <a:spcAft>
+                <a:spcPts val="600"/>
+              </a:spcAft>
+              <a:buClr>
+                <a:schemeClr val="accent2"/>
+              </a:buClr>
+              <a:buSzPct val="92000"/>
+              <a:buFont typeface="Wingdings 2" panose="05020102010507070707" pitchFamily="18" charset="2"/>
+              <a:buNone/>
+              <a:defRPr sz="1600" b="1" kern="1200">
+                <a:solidFill>
+                  <a:schemeClr val="tx2"/>
+                </a:solidFill>
+                <a:latin typeface="+mn-lt"/>
+                <a:ea typeface="+mn-ea"/>
+                <a:cs typeface="+mn-cs"/>
+              </a:defRPr>
+            </a:lvl7pPr>
+            <a:lvl8pPr marL="3200400" indent="0" algn="l" defTabSz="457200" rtl="0" eaLnBrk="1" latinLnBrk="0" hangingPunct="1">
+              <a:spcBef>
+                <a:spcPct val="20000"/>
+              </a:spcBef>
+              <a:spcAft>
+                <a:spcPts val="600"/>
+              </a:spcAft>
+              <a:buClr>
+                <a:schemeClr val="accent2"/>
+              </a:buClr>
+              <a:buSzPct val="92000"/>
+              <a:buFont typeface="Wingdings 2" panose="05020102010507070707" pitchFamily="18" charset="2"/>
+              <a:buNone/>
+              <a:defRPr sz="1600" b="1" kern="1200">
+                <a:solidFill>
+                  <a:schemeClr val="tx2"/>
+                </a:solidFill>
+                <a:latin typeface="+mn-lt"/>
+                <a:ea typeface="+mn-ea"/>
+                <a:cs typeface="+mn-cs"/>
+              </a:defRPr>
+            </a:lvl8pPr>
+            <a:lvl9pPr marL="3657600" indent="0" algn="l" defTabSz="457200" rtl="0" eaLnBrk="1" latinLnBrk="0" hangingPunct="1">
+              <a:spcBef>
+                <a:spcPct val="20000"/>
+              </a:spcBef>
+              <a:spcAft>
+                <a:spcPts val="600"/>
+              </a:spcAft>
+              <a:buClr>
+                <a:schemeClr val="accent2"/>
+              </a:buClr>
+              <a:buSzPct val="92000"/>
+              <a:buFont typeface="Wingdings 2" panose="05020102010507070707" pitchFamily="18" charset="2"/>
+              <a:buNone/>
+              <a:defRPr sz="1600" b="1" kern="1200">
+                <a:solidFill>
+                  <a:schemeClr val="tx2"/>
+                </a:solidFill>
+                <a:latin typeface="+mn-lt"/>
+                <a:ea typeface="+mn-ea"/>
+                <a:cs typeface="+mn-cs"/>
+              </a:defRPr>
+            </a:lvl9pPr>
+          </a:lstStyle>
+          <a:p>
+            <a:r>
+              <a:rPr lang="it-IT" sz="2000" b="0" dirty="0">
+                <a:solidFill>
+                  <a:schemeClr val="tx1"/>
+                </a:solidFill>
+                <a:effectLst/>
+              </a:rPr>
+              <a:t>Sia OS161 che </a:t>
+            </a:r>
+            <a:r>
+              <a:rPr lang="it-IT" sz="2000" b="0" dirty="0" err="1">
+                <a:solidFill>
+                  <a:schemeClr val="tx1"/>
+                </a:solidFill>
+                <a:effectLst/>
+              </a:rPr>
+              <a:t>PintOS</a:t>
+            </a:r>
+            <a:r>
+              <a:rPr lang="it-IT" sz="2000" b="0" dirty="0">
+                <a:solidFill>
+                  <a:schemeClr val="tx1"/>
+                </a:solidFill>
+                <a:effectLst/>
+              </a:rPr>
+              <a:t> implementano i semafori seguono il modello classico di semafori di </a:t>
+            </a:r>
+            <a:r>
+              <a:rPr lang="it-IT" sz="2000" b="0" dirty="0" err="1">
+                <a:solidFill>
+                  <a:schemeClr val="tx1"/>
+                </a:solidFill>
+                <a:effectLst/>
+              </a:rPr>
+              <a:t>Dijkstra</a:t>
+            </a:r>
+            <a:r>
+              <a:rPr lang="it-IT" sz="2000" b="0" dirty="0">
+                <a:solidFill>
+                  <a:schemeClr val="tx1"/>
+                </a:solidFill>
+                <a:effectLst/>
+              </a:rPr>
+              <a:t>, con operazioni atomiche di "down" e "up" per garantire la sincronizzazione.</a:t>
+            </a:r>
+          </a:p>
+        </p:txBody>
+      </p:sp>
+    </p:spTree>
+    <p:extLst>
+      <p:ext uri="{BB962C8B-B14F-4D97-AF65-F5344CB8AC3E}">
+        <p14:creationId xmlns:p14="http://schemas.microsoft.com/office/powerpoint/2010/main" val="4198586686"/>
+      </p:ext>
+    </p:extLst>
+  </p:cSld>
+  <p:clrMapOvr>
+    <a:masterClrMapping/>
+  </p:clrMapOvr>
+</p:sld>
+</file>
+
+<file path=ppt/slides/slide12.xml><?xml version="1.0" encoding="utf-8"?>
+<p:sld xmlns:a="http://schemas.openxmlformats.org/drawingml/2006/main" xmlns:r="http://schemas.openxmlformats.org/officeDocument/2006/relationships" xmlns:p="http://schemas.openxmlformats.org/presentationml/2006/main">
+  <p:cSld>
+    <p:spTree>
+      <p:nvGrpSpPr>
+        <p:cNvPr id="1" name=""/>
+        <p:cNvGrpSpPr/>
+        <p:nvPr/>
+      </p:nvGrpSpPr>
+      <p:grpSpPr>
+        <a:xfrm>
+          <a:off x="0" y="0"/>
+          <a:ext cx="0" cy="0"/>
+          <a:chOff x="0" y="0"/>
+          <a:chExt cx="0" cy="0"/>
+        </a:xfrm>
+      </p:grpSpPr>
+      <p:sp>
+        <p:nvSpPr>
+          <p:cNvPr id="2" name="Titolo 1">
+            <a:extLst>
+              <a:ext uri="{FF2B5EF4-FFF2-40B4-BE49-F238E27FC236}">
+                <a16:creationId xmlns:a16="http://schemas.microsoft.com/office/drawing/2014/main" id="{69441F67-1949-8EC8-EB98-85670AC3670C}"/>
+              </a:ext>
+            </a:extLst>
+          </p:cNvPr>
+          <p:cNvSpPr>
+            <a:spLocks noGrp="1"/>
+          </p:cNvSpPr>
+          <p:nvPr>
+            <p:ph type="title"/>
+          </p:nvPr>
+        </p:nvSpPr>
+        <p:spPr/>
+        <p:txBody>
+          <a:bodyPr>
+            <a:normAutofit/>
+          </a:bodyPr>
+          <a:lstStyle/>
+          <a:p>
+            <a:r>
+              <a:rPr lang="it-IT" dirty="0"/>
+              <a:t>Meccanismi di sincronizzazione </a:t>
+            </a:r>
+            <a:r>
+              <a:rPr lang="it-IT" sz="1600" dirty="0"/>
+              <a:t>– lock (</a:t>
+            </a:r>
+            <a:r>
+              <a:rPr lang="it-IT" sz="1600" dirty="0" err="1"/>
+              <a:t>mutex</a:t>
+            </a:r>
+            <a:r>
+              <a:rPr lang="it-IT" sz="1600" dirty="0"/>
+              <a:t>)</a:t>
+            </a:r>
+            <a:endParaRPr lang="it-IT" dirty="0"/>
+          </a:p>
+        </p:txBody>
+      </p:sp>
+      <p:sp>
+        <p:nvSpPr>
+          <p:cNvPr id="4" name="Segnaposto testo 3">
+            <a:extLst>
+              <a:ext uri="{FF2B5EF4-FFF2-40B4-BE49-F238E27FC236}">
+                <a16:creationId xmlns:a16="http://schemas.microsoft.com/office/drawing/2014/main" id="{3484543A-BB31-0207-182F-1F1C206F0C68}"/>
+              </a:ext>
+            </a:extLst>
+          </p:cNvPr>
+          <p:cNvSpPr>
+            <a:spLocks noGrp="1"/>
+          </p:cNvSpPr>
+          <p:nvPr>
+            <p:ph type="body" idx="1"/>
+          </p:nvPr>
+        </p:nvSpPr>
+        <p:spPr>
+          <a:xfrm>
+            <a:off x="887219" y="2794235"/>
+            <a:ext cx="5087075" cy="536005"/>
+          </a:xfrm>
+        </p:spPr>
+        <p:txBody>
+          <a:bodyPr/>
+          <a:lstStyle/>
+          <a:p>
+            <a:r>
+              <a:rPr lang="it-IT" dirty="0"/>
+              <a:t>OS161</a:t>
+            </a:r>
+          </a:p>
+        </p:txBody>
+      </p:sp>
+      <p:sp>
+        <p:nvSpPr>
+          <p:cNvPr id="8" name="Segnaposto contenuto 7">
+            <a:extLst>
+              <a:ext uri="{FF2B5EF4-FFF2-40B4-BE49-F238E27FC236}">
+                <a16:creationId xmlns:a16="http://schemas.microsoft.com/office/drawing/2014/main" id="{A1E5DF89-94E7-98C4-F563-B3A43317A1CE}"/>
+              </a:ext>
+            </a:extLst>
+          </p:cNvPr>
+          <p:cNvSpPr>
+            <a:spLocks noGrp="1"/>
+          </p:cNvSpPr>
+          <p:nvPr>
+            <p:ph sz="half" idx="2"/>
+          </p:nvPr>
+        </p:nvSpPr>
+        <p:spPr>
+          <a:xfrm>
+            <a:off x="581194" y="3469395"/>
+            <a:ext cx="5393100" cy="2934999"/>
+          </a:xfrm>
+        </p:spPr>
+        <p:txBody>
+          <a:bodyPr>
+            <a:noAutofit/>
+          </a:bodyPr>
+          <a:lstStyle/>
+          <a:p>
+            <a:endParaRPr lang="it-IT" sz="1600" dirty="0"/>
+          </a:p>
+        </p:txBody>
+      </p:sp>
+      <p:sp>
+        <p:nvSpPr>
+          <p:cNvPr id="9" name="Segnaposto testo 8">
+            <a:extLst>
+              <a:ext uri="{FF2B5EF4-FFF2-40B4-BE49-F238E27FC236}">
+                <a16:creationId xmlns:a16="http://schemas.microsoft.com/office/drawing/2014/main" id="{00842FCF-9A2A-27B3-4ED6-BB0713CE4444}"/>
+              </a:ext>
+            </a:extLst>
+          </p:cNvPr>
+          <p:cNvSpPr>
+            <a:spLocks noGrp="1"/>
+          </p:cNvSpPr>
+          <p:nvPr>
+            <p:ph type="body" sz="quarter" idx="3"/>
+          </p:nvPr>
+        </p:nvSpPr>
+        <p:spPr>
+          <a:xfrm>
+            <a:off x="6523735" y="2794235"/>
+            <a:ext cx="5087073" cy="553373"/>
+          </a:xfrm>
+        </p:spPr>
+        <p:txBody>
+          <a:bodyPr/>
+          <a:lstStyle/>
+          <a:p>
+            <a:r>
+              <a:rPr lang="it-IT" dirty="0"/>
+              <a:t>PINTOS</a:t>
+            </a:r>
+          </a:p>
+        </p:txBody>
+      </p:sp>
+      <p:sp>
+        <p:nvSpPr>
+          <p:cNvPr id="10" name="Segnaposto contenuto 9">
+            <a:extLst>
+              <a:ext uri="{FF2B5EF4-FFF2-40B4-BE49-F238E27FC236}">
+                <a16:creationId xmlns:a16="http://schemas.microsoft.com/office/drawing/2014/main" id="{3CDA2ECB-1671-3745-42C6-213A778ECD29}"/>
+              </a:ext>
+            </a:extLst>
+          </p:cNvPr>
+          <p:cNvSpPr>
+            <a:spLocks noGrp="1"/>
+          </p:cNvSpPr>
+          <p:nvPr>
+            <p:ph sz="quarter" idx="4"/>
+          </p:nvPr>
+        </p:nvSpPr>
+        <p:spPr>
+          <a:xfrm>
+            <a:off x="6217709" y="3469395"/>
+            <a:ext cx="5393100" cy="2934999"/>
+          </a:xfrm>
+        </p:spPr>
+        <p:txBody>
+          <a:bodyPr>
+            <a:noAutofit/>
+          </a:bodyPr>
+          <a:lstStyle/>
+          <a:p>
+            <a:endParaRPr lang="it-IT" sz="1600" dirty="0"/>
+          </a:p>
+        </p:txBody>
+      </p:sp>
+      <p:sp>
+        <p:nvSpPr>
+          <p:cNvPr id="3" name="Segnaposto testo 3">
+            <a:extLst>
+              <a:ext uri="{FF2B5EF4-FFF2-40B4-BE49-F238E27FC236}">
+                <a16:creationId xmlns:a16="http://schemas.microsoft.com/office/drawing/2014/main" id="{DD092F63-1123-8337-F4DC-4B5BF08C3E1F}"/>
+              </a:ext>
+            </a:extLst>
+          </p:cNvPr>
+          <p:cNvSpPr txBox="1">
+            <a:spLocks/>
+          </p:cNvSpPr>
+          <p:nvPr/>
+        </p:nvSpPr>
+        <p:spPr>
+          <a:xfrm>
+            <a:off x="615548" y="1879772"/>
+            <a:ext cx="11245148" cy="921080"/>
+          </a:xfrm>
+          <a:prstGeom prst="rect">
+            <a:avLst/>
+          </a:prstGeom>
+        </p:spPr>
+        <p:txBody>
+          <a:bodyPr vert="horz" lIns="91440" tIns="45720" rIns="91440" bIns="45720" rtlCol="0" anchor="b">
+            <a:noAutofit/>
+          </a:bodyPr>
+          <a:lstStyle>
+            <a:lvl1pPr marL="0" indent="0" algn="l" defTabSz="457200" rtl="0" eaLnBrk="1" latinLnBrk="0" hangingPunct="1">
+              <a:spcBef>
+                <a:spcPct val="20000"/>
+              </a:spcBef>
+              <a:spcAft>
+                <a:spcPts val="600"/>
+              </a:spcAft>
+              <a:buClr>
+                <a:schemeClr val="accent2"/>
+              </a:buClr>
+              <a:buSzPct val="92000"/>
+              <a:buFont typeface="Wingdings 2" panose="05020102010507070707" pitchFamily="18" charset="2"/>
+              <a:buNone/>
+              <a:defRPr sz="2200" b="0" kern="1200">
+                <a:solidFill>
+                  <a:schemeClr val="accent2"/>
+                </a:solidFill>
+                <a:latin typeface="+mn-lt"/>
+                <a:ea typeface="+mn-ea"/>
+                <a:cs typeface="+mn-cs"/>
+              </a:defRPr>
+            </a:lvl1pPr>
+            <a:lvl2pPr marL="457200" indent="0" algn="l" defTabSz="457200" rtl="0" eaLnBrk="1" latinLnBrk="0" hangingPunct="1">
+              <a:spcBef>
+                <a:spcPct val="20000"/>
+              </a:spcBef>
+              <a:spcAft>
+                <a:spcPts val="600"/>
+              </a:spcAft>
+              <a:buClr>
+                <a:schemeClr val="accent2"/>
+              </a:buClr>
+              <a:buSzPct val="92000"/>
+              <a:buFont typeface="Wingdings 2" panose="05020102010507070707" pitchFamily="18" charset="2"/>
+              <a:buNone/>
+              <a:defRPr sz="2000" b="1" kern="1200">
+                <a:solidFill>
+                  <a:schemeClr val="tx2"/>
+                </a:solidFill>
+                <a:latin typeface="+mn-lt"/>
+                <a:ea typeface="+mn-ea"/>
+                <a:cs typeface="+mn-cs"/>
+              </a:defRPr>
+            </a:lvl2pPr>
+            <a:lvl3pPr marL="914400" indent="0" algn="l" defTabSz="457200" rtl="0" eaLnBrk="1" latinLnBrk="0" hangingPunct="1">
+              <a:spcBef>
+                <a:spcPct val="20000"/>
+              </a:spcBef>
+              <a:spcAft>
+                <a:spcPts val="600"/>
+              </a:spcAft>
+              <a:buClr>
+                <a:schemeClr val="accent2"/>
+              </a:buClr>
+              <a:buSzPct val="92000"/>
+              <a:buFont typeface="Wingdings 2" panose="05020102010507070707" pitchFamily="18" charset="2"/>
+              <a:buNone/>
+              <a:defRPr sz="1800" b="1" kern="1200">
+                <a:solidFill>
+                  <a:schemeClr val="tx2"/>
+                </a:solidFill>
+                <a:latin typeface="+mn-lt"/>
+                <a:ea typeface="+mn-ea"/>
+                <a:cs typeface="+mn-cs"/>
+              </a:defRPr>
+            </a:lvl3pPr>
+            <a:lvl4pPr marL="1371600" indent="0" algn="l" defTabSz="457200" rtl="0" eaLnBrk="1" latinLnBrk="0" hangingPunct="1">
+              <a:spcBef>
+                <a:spcPct val="20000"/>
+              </a:spcBef>
+              <a:spcAft>
+                <a:spcPts val="600"/>
+              </a:spcAft>
+              <a:buClr>
+                <a:schemeClr val="accent2"/>
+              </a:buClr>
+              <a:buSzPct val="92000"/>
+              <a:buFont typeface="Wingdings 2" panose="05020102010507070707" pitchFamily="18" charset="2"/>
+              <a:buNone/>
+              <a:defRPr sz="1600" b="1" kern="1200">
+                <a:solidFill>
+                  <a:schemeClr val="tx2"/>
+                </a:solidFill>
+                <a:latin typeface="+mn-lt"/>
+                <a:ea typeface="+mn-ea"/>
+                <a:cs typeface="+mn-cs"/>
+              </a:defRPr>
+            </a:lvl4pPr>
+            <a:lvl5pPr marL="1828800" indent="0" algn="l" defTabSz="457200" rtl="0" eaLnBrk="1" latinLnBrk="0" hangingPunct="1">
+              <a:spcBef>
+                <a:spcPct val="20000"/>
+              </a:spcBef>
+              <a:spcAft>
+                <a:spcPts val="600"/>
+              </a:spcAft>
+              <a:buClr>
+                <a:schemeClr val="accent2"/>
+              </a:buClr>
+              <a:buSzPct val="92000"/>
+              <a:buFont typeface="Wingdings 2" panose="05020102010507070707" pitchFamily="18" charset="2"/>
+              <a:buNone/>
+              <a:defRPr sz="1600" b="1" kern="1200">
+                <a:solidFill>
+                  <a:schemeClr val="tx2"/>
+                </a:solidFill>
+                <a:latin typeface="+mn-lt"/>
+                <a:ea typeface="+mn-ea"/>
+                <a:cs typeface="+mn-cs"/>
+              </a:defRPr>
+            </a:lvl5pPr>
+            <a:lvl6pPr marL="2286000" indent="0" algn="l" defTabSz="457200" rtl="0" eaLnBrk="1" latinLnBrk="0" hangingPunct="1">
+              <a:spcBef>
+                <a:spcPct val="20000"/>
+              </a:spcBef>
+              <a:spcAft>
+                <a:spcPts val="600"/>
+              </a:spcAft>
+              <a:buClr>
+                <a:schemeClr val="accent2"/>
+              </a:buClr>
+              <a:buSzPct val="92000"/>
+              <a:buFont typeface="Wingdings 2" panose="05020102010507070707" pitchFamily="18" charset="2"/>
+              <a:buNone/>
+              <a:defRPr sz="1600" b="1" kern="1200">
+                <a:solidFill>
+                  <a:schemeClr val="tx2"/>
+                </a:solidFill>
+                <a:latin typeface="+mn-lt"/>
+                <a:ea typeface="+mn-ea"/>
+                <a:cs typeface="+mn-cs"/>
+              </a:defRPr>
+            </a:lvl6pPr>
+            <a:lvl7pPr marL="2743200" indent="0" algn="l" defTabSz="457200" rtl="0" eaLnBrk="1" latinLnBrk="0" hangingPunct="1">
+              <a:spcBef>
+                <a:spcPct val="20000"/>
+              </a:spcBef>
+              <a:spcAft>
+                <a:spcPts val="600"/>
+              </a:spcAft>
+              <a:buClr>
+                <a:schemeClr val="accent2"/>
+              </a:buClr>
+              <a:buSzPct val="92000"/>
+              <a:buFont typeface="Wingdings 2" panose="05020102010507070707" pitchFamily="18" charset="2"/>
+              <a:buNone/>
+              <a:defRPr sz="1600" b="1" kern="1200">
+                <a:solidFill>
+                  <a:schemeClr val="tx2"/>
+                </a:solidFill>
+                <a:latin typeface="+mn-lt"/>
+                <a:ea typeface="+mn-ea"/>
+                <a:cs typeface="+mn-cs"/>
+              </a:defRPr>
+            </a:lvl7pPr>
+            <a:lvl8pPr marL="3200400" indent="0" algn="l" defTabSz="457200" rtl="0" eaLnBrk="1" latinLnBrk="0" hangingPunct="1">
+              <a:spcBef>
+                <a:spcPct val="20000"/>
+              </a:spcBef>
+              <a:spcAft>
+                <a:spcPts val="600"/>
+              </a:spcAft>
+              <a:buClr>
+                <a:schemeClr val="accent2"/>
+              </a:buClr>
+              <a:buSzPct val="92000"/>
+              <a:buFont typeface="Wingdings 2" panose="05020102010507070707" pitchFamily="18" charset="2"/>
+              <a:buNone/>
+              <a:defRPr sz="1600" b="1" kern="1200">
+                <a:solidFill>
+                  <a:schemeClr val="tx2"/>
+                </a:solidFill>
+                <a:latin typeface="+mn-lt"/>
+                <a:ea typeface="+mn-ea"/>
+                <a:cs typeface="+mn-cs"/>
+              </a:defRPr>
+            </a:lvl8pPr>
+            <a:lvl9pPr marL="3657600" indent="0" algn="l" defTabSz="457200" rtl="0" eaLnBrk="1" latinLnBrk="0" hangingPunct="1">
+              <a:spcBef>
+                <a:spcPct val="20000"/>
+              </a:spcBef>
+              <a:spcAft>
+                <a:spcPts val="600"/>
+              </a:spcAft>
+              <a:buClr>
+                <a:schemeClr val="accent2"/>
+              </a:buClr>
+              <a:buSzPct val="92000"/>
+              <a:buFont typeface="Wingdings 2" panose="05020102010507070707" pitchFamily="18" charset="2"/>
+              <a:buNone/>
+              <a:defRPr sz="1600" b="1" kern="1200">
+                <a:solidFill>
+                  <a:schemeClr val="tx2"/>
+                </a:solidFill>
+                <a:latin typeface="+mn-lt"/>
+                <a:ea typeface="+mn-ea"/>
+                <a:cs typeface="+mn-cs"/>
+              </a:defRPr>
+            </a:lvl9pPr>
+          </a:lstStyle>
+          <a:p>
+            <a:r>
+              <a:rPr lang="it-IT" sz="2000" b="0" dirty="0">
+                <a:solidFill>
+                  <a:schemeClr val="tx1"/>
+                </a:solidFill>
+                <a:effectLst/>
+              </a:rPr>
+              <a:t>Un </a:t>
+            </a:r>
+            <a:r>
+              <a:rPr lang="it-IT" sz="2000" dirty="0">
+                <a:solidFill>
+                  <a:schemeClr val="tx1"/>
+                </a:solidFill>
+                <a:effectLst/>
+              </a:rPr>
+              <a:t>lock</a:t>
+            </a:r>
+            <a:r>
+              <a:rPr lang="it-IT" sz="2000" b="0" dirty="0">
+                <a:solidFill>
+                  <a:schemeClr val="tx1"/>
+                </a:solidFill>
+                <a:effectLst/>
+              </a:rPr>
+              <a:t> è analogo a un semaforo con un valore iniziale di 1, equivalente al verde di un semaforo. L'azione "up" di un lock è chiamata "rilascio", mentre l'azione "down" è detta "acquisizione".</a:t>
+            </a:r>
+          </a:p>
+        </p:txBody>
+      </p:sp>
+    </p:spTree>
+    <p:extLst>
+      <p:ext uri="{BB962C8B-B14F-4D97-AF65-F5344CB8AC3E}">
+        <p14:creationId xmlns:p14="http://schemas.microsoft.com/office/powerpoint/2010/main" val="1952330264"/>
+      </p:ext>
+    </p:extLst>
+  </p:cSld>
+  <p:clrMapOvr>
+    <a:masterClrMapping/>
+  </p:clrMapOvr>
+</p:sld>
+</file>
+
+<file path=ppt/slides/slide13.xml><?xml version="1.0" encoding="utf-8"?>
+<p:sld xmlns:a="http://schemas.openxmlformats.org/drawingml/2006/main" xmlns:r="http://schemas.openxmlformats.org/officeDocument/2006/relationships" xmlns:p="http://schemas.openxmlformats.org/presentationml/2006/main">
+  <p:cSld>
+    <p:spTree>
+      <p:nvGrpSpPr>
+        <p:cNvPr id="1" name=""/>
+        <p:cNvGrpSpPr/>
+        <p:nvPr/>
+      </p:nvGrpSpPr>
+      <p:grpSpPr>
+        <a:xfrm>
+          <a:off x="0" y="0"/>
+          <a:ext cx="0" cy="0"/>
+          <a:chOff x="0" y="0"/>
+          <a:chExt cx="0" cy="0"/>
+        </a:xfrm>
+      </p:grpSpPr>
+      <p:sp>
+        <p:nvSpPr>
+          <p:cNvPr id="2" name="Titolo 1">
+            <a:extLst>
+              <a:ext uri="{FF2B5EF4-FFF2-40B4-BE49-F238E27FC236}">
+                <a16:creationId xmlns:a16="http://schemas.microsoft.com/office/drawing/2014/main" id="{69441F67-1949-8EC8-EB98-85670AC3670C}"/>
+              </a:ext>
+            </a:extLst>
+          </p:cNvPr>
+          <p:cNvSpPr>
+            <a:spLocks noGrp="1"/>
+          </p:cNvSpPr>
+          <p:nvPr>
+            <p:ph type="title"/>
+          </p:nvPr>
+        </p:nvSpPr>
+        <p:spPr/>
+        <p:txBody>
+          <a:bodyPr>
+            <a:normAutofit/>
+          </a:bodyPr>
+          <a:lstStyle/>
+          <a:p>
+            <a:r>
+              <a:rPr lang="it-IT" dirty="0"/>
+              <a:t>Meccanismi di sincronizzazione </a:t>
+            </a:r>
+            <a:r>
+              <a:rPr lang="it-IT" sz="1600" dirty="0"/>
+              <a:t>– </a:t>
+            </a:r>
+            <a:r>
+              <a:rPr lang="it-IT" sz="1600" dirty="0" err="1"/>
+              <a:t>condition</a:t>
+            </a:r>
+            <a:r>
+              <a:rPr lang="it-IT" sz="1600" dirty="0"/>
+              <a:t> </a:t>
+            </a:r>
+            <a:r>
+              <a:rPr lang="it-IT" sz="1600" dirty="0" err="1"/>
+              <a:t>variables</a:t>
+            </a:r>
+            <a:endParaRPr lang="it-IT" dirty="0"/>
+          </a:p>
+        </p:txBody>
+      </p:sp>
+      <p:sp>
+        <p:nvSpPr>
+          <p:cNvPr id="4" name="Segnaposto testo 3">
+            <a:extLst>
+              <a:ext uri="{FF2B5EF4-FFF2-40B4-BE49-F238E27FC236}">
+                <a16:creationId xmlns:a16="http://schemas.microsoft.com/office/drawing/2014/main" id="{3484543A-BB31-0207-182F-1F1C206F0C68}"/>
+              </a:ext>
+            </a:extLst>
+          </p:cNvPr>
+          <p:cNvSpPr>
+            <a:spLocks noGrp="1"/>
+          </p:cNvSpPr>
+          <p:nvPr>
+            <p:ph type="body" idx="1"/>
+          </p:nvPr>
+        </p:nvSpPr>
+        <p:spPr>
+          <a:xfrm>
+            <a:off x="887219" y="2794235"/>
+            <a:ext cx="5087075" cy="536005"/>
+          </a:xfrm>
+        </p:spPr>
+        <p:txBody>
+          <a:bodyPr/>
+          <a:lstStyle/>
+          <a:p>
+            <a:r>
+              <a:rPr lang="it-IT" dirty="0"/>
+              <a:t>OS161</a:t>
+            </a:r>
+          </a:p>
+        </p:txBody>
+      </p:sp>
+      <p:sp>
+        <p:nvSpPr>
+          <p:cNvPr id="8" name="Segnaposto contenuto 7">
+            <a:extLst>
+              <a:ext uri="{FF2B5EF4-FFF2-40B4-BE49-F238E27FC236}">
+                <a16:creationId xmlns:a16="http://schemas.microsoft.com/office/drawing/2014/main" id="{A1E5DF89-94E7-98C4-F563-B3A43317A1CE}"/>
+              </a:ext>
+            </a:extLst>
+          </p:cNvPr>
+          <p:cNvSpPr>
+            <a:spLocks noGrp="1"/>
+          </p:cNvSpPr>
+          <p:nvPr>
+            <p:ph sz="half" idx="2"/>
+          </p:nvPr>
+        </p:nvSpPr>
+        <p:spPr>
+          <a:xfrm>
+            <a:off x="581194" y="3469395"/>
+            <a:ext cx="5393100" cy="2934999"/>
+          </a:xfrm>
+        </p:spPr>
+        <p:txBody>
+          <a:bodyPr>
+            <a:noAutofit/>
+          </a:bodyPr>
+          <a:lstStyle/>
+          <a:p>
+            <a:endParaRPr lang="it-IT" sz="1600" dirty="0"/>
+          </a:p>
+        </p:txBody>
+      </p:sp>
+      <p:sp>
+        <p:nvSpPr>
+          <p:cNvPr id="9" name="Segnaposto testo 8">
+            <a:extLst>
+              <a:ext uri="{FF2B5EF4-FFF2-40B4-BE49-F238E27FC236}">
+                <a16:creationId xmlns:a16="http://schemas.microsoft.com/office/drawing/2014/main" id="{00842FCF-9A2A-27B3-4ED6-BB0713CE4444}"/>
+              </a:ext>
+            </a:extLst>
+          </p:cNvPr>
+          <p:cNvSpPr>
+            <a:spLocks noGrp="1"/>
+          </p:cNvSpPr>
+          <p:nvPr>
+            <p:ph type="body" sz="quarter" idx="3"/>
+          </p:nvPr>
+        </p:nvSpPr>
+        <p:spPr>
+          <a:xfrm>
+            <a:off x="6523735" y="2794235"/>
+            <a:ext cx="5087073" cy="553373"/>
+          </a:xfrm>
+        </p:spPr>
+        <p:txBody>
+          <a:bodyPr/>
+          <a:lstStyle/>
+          <a:p>
+            <a:r>
+              <a:rPr lang="it-IT" dirty="0"/>
+              <a:t>PINTOS</a:t>
+            </a:r>
+          </a:p>
+        </p:txBody>
+      </p:sp>
+      <p:sp>
+        <p:nvSpPr>
+          <p:cNvPr id="10" name="Segnaposto contenuto 9">
+            <a:extLst>
+              <a:ext uri="{FF2B5EF4-FFF2-40B4-BE49-F238E27FC236}">
+                <a16:creationId xmlns:a16="http://schemas.microsoft.com/office/drawing/2014/main" id="{3CDA2ECB-1671-3745-42C6-213A778ECD29}"/>
+              </a:ext>
+            </a:extLst>
+          </p:cNvPr>
+          <p:cNvSpPr>
+            <a:spLocks noGrp="1"/>
+          </p:cNvSpPr>
+          <p:nvPr>
+            <p:ph sz="quarter" idx="4"/>
+          </p:nvPr>
+        </p:nvSpPr>
+        <p:spPr>
+          <a:xfrm>
+            <a:off x="6217709" y="3469395"/>
+            <a:ext cx="5393100" cy="2934999"/>
+          </a:xfrm>
+        </p:spPr>
+        <p:txBody>
+          <a:bodyPr>
+            <a:noAutofit/>
+          </a:bodyPr>
+          <a:lstStyle/>
+          <a:p>
+            <a:endParaRPr lang="it-IT" sz="1600" dirty="0"/>
+          </a:p>
+        </p:txBody>
+      </p:sp>
+      <p:sp>
+        <p:nvSpPr>
+          <p:cNvPr id="3" name="Segnaposto testo 3">
+            <a:extLst>
+              <a:ext uri="{FF2B5EF4-FFF2-40B4-BE49-F238E27FC236}">
+                <a16:creationId xmlns:a16="http://schemas.microsoft.com/office/drawing/2014/main" id="{DD092F63-1123-8337-F4DC-4B5BF08C3E1F}"/>
+              </a:ext>
+            </a:extLst>
+          </p:cNvPr>
+          <p:cNvSpPr txBox="1">
+            <a:spLocks/>
+          </p:cNvSpPr>
+          <p:nvPr/>
+        </p:nvSpPr>
+        <p:spPr>
+          <a:xfrm>
+            <a:off x="615548" y="1879772"/>
+            <a:ext cx="11245148" cy="921080"/>
+          </a:xfrm>
+          <a:prstGeom prst="rect">
+            <a:avLst/>
+          </a:prstGeom>
+        </p:spPr>
+        <p:txBody>
+          <a:bodyPr vert="horz" lIns="91440" tIns="45720" rIns="91440" bIns="45720" rtlCol="0" anchor="b">
+            <a:noAutofit/>
+          </a:bodyPr>
+          <a:lstStyle>
+            <a:lvl1pPr marL="0" indent="0" algn="l" defTabSz="457200" rtl="0" eaLnBrk="1" latinLnBrk="0" hangingPunct="1">
+              <a:spcBef>
+                <a:spcPct val="20000"/>
+              </a:spcBef>
+              <a:spcAft>
+                <a:spcPts val="600"/>
+              </a:spcAft>
+              <a:buClr>
+                <a:schemeClr val="accent2"/>
+              </a:buClr>
+              <a:buSzPct val="92000"/>
+              <a:buFont typeface="Wingdings 2" panose="05020102010507070707" pitchFamily="18" charset="2"/>
+              <a:buNone/>
+              <a:defRPr sz="2200" b="0" kern="1200">
+                <a:solidFill>
+                  <a:schemeClr val="accent2"/>
+                </a:solidFill>
+                <a:latin typeface="+mn-lt"/>
+                <a:ea typeface="+mn-ea"/>
+                <a:cs typeface="+mn-cs"/>
+              </a:defRPr>
+            </a:lvl1pPr>
+            <a:lvl2pPr marL="457200" indent="0" algn="l" defTabSz="457200" rtl="0" eaLnBrk="1" latinLnBrk="0" hangingPunct="1">
+              <a:spcBef>
+                <a:spcPct val="20000"/>
+              </a:spcBef>
+              <a:spcAft>
+                <a:spcPts val="600"/>
+              </a:spcAft>
+              <a:buClr>
+                <a:schemeClr val="accent2"/>
+              </a:buClr>
+              <a:buSzPct val="92000"/>
+              <a:buFont typeface="Wingdings 2" panose="05020102010507070707" pitchFamily="18" charset="2"/>
+              <a:buNone/>
+              <a:defRPr sz="2000" b="1" kern="1200">
+                <a:solidFill>
+                  <a:schemeClr val="tx2"/>
+                </a:solidFill>
+                <a:latin typeface="+mn-lt"/>
+                <a:ea typeface="+mn-ea"/>
+                <a:cs typeface="+mn-cs"/>
+              </a:defRPr>
+            </a:lvl2pPr>
+            <a:lvl3pPr marL="914400" indent="0" algn="l" defTabSz="457200" rtl="0" eaLnBrk="1" latinLnBrk="0" hangingPunct="1">
+              <a:spcBef>
+                <a:spcPct val="20000"/>
+              </a:spcBef>
+              <a:spcAft>
+                <a:spcPts val="600"/>
+              </a:spcAft>
+              <a:buClr>
+                <a:schemeClr val="accent2"/>
+              </a:buClr>
+              <a:buSzPct val="92000"/>
+              <a:buFont typeface="Wingdings 2" panose="05020102010507070707" pitchFamily="18" charset="2"/>
+              <a:buNone/>
+              <a:defRPr sz="1800" b="1" kern="1200">
+                <a:solidFill>
+                  <a:schemeClr val="tx2"/>
+                </a:solidFill>
+                <a:latin typeface="+mn-lt"/>
+                <a:ea typeface="+mn-ea"/>
+                <a:cs typeface="+mn-cs"/>
+              </a:defRPr>
+            </a:lvl3pPr>
+            <a:lvl4pPr marL="1371600" indent="0" algn="l" defTabSz="457200" rtl="0" eaLnBrk="1" latinLnBrk="0" hangingPunct="1">
+              <a:spcBef>
+                <a:spcPct val="20000"/>
+              </a:spcBef>
+              <a:spcAft>
+                <a:spcPts val="600"/>
+              </a:spcAft>
+              <a:buClr>
+                <a:schemeClr val="accent2"/>
+              </a:buClr>
+              <a:buSzPct val="92000"/>
+              <a:buFont typeface="Wingdings 2" panose="05020102010507070707" pitchFamily="18" charset="2"/>
+              <a:buNone/>
+              <a:defRPr sz="1600" b="1" kern="1200">
+                <a:solidFill>
+                  <a:schemeClr val="tx2"/>
+                </a:solidFill>
+                <a:latin typeface="+mn-lt"/>
+                <a:ea typeface="+mn-ea"/>
+                <a:cs typeface="+mn-cs"/>
+              </a:defRPr>
+            </a:lvl4pPr>
+            <a:lvl5pPr marL="1828800" indent="0" algn="l" defTabSz="457200" rtl="0" eaLnBrk="1" latinLnBrk="0" hangingPunct="1">
+              <a:spcBef>
+                <a:spcPct val="20000"/>
+              </a:spcBef>
+              <a:spcAft>
+                <a:spcPts val="600"/>
+              </a:spcAft>
+              <a:buClr>
+                <a:schemeClr val="accent2"/>
+              </a:buClr>
+              <a:buSzPct val="92000"/>
+              <a:buFont typeface="Wingdings 2" panose="05020102010507070707" pitchFamily="18" charset="2"/>
+              <a:buNone/>
+              <a:defRPr sz="1600" b="1" kern="1200">
+                <a:solidFill>
+                  <a:schemeClr val="tx2"/>
+                </a:solidFill>
+                <a:latin typeface="+mn-lt"/>
+                <a:ea typeface="+mn-ea"/>
+                <a:cs typeface="+mn-cs"/>
+              </a:defRPr>
+            </a:lvl5pPr>
+            <a:lvl6pPr marL="2286000" indent="0" algn="l" defTabSz="457200" rtl="0" eaLnBrk="1" latinLnBrk="0" hangingPunct="1">
+              <a:spcBef>
+                <a:spcPct val="20000"/>
+              </a:spcBef>
+              <a:spcAft>
+                <a:spcPts val="600"/>
+              </a:spcAft>
+              <a:buClr>
+                <a:schemeClr val="accent2"/>
+              </a:buClr>
+              <a:buSzPct val="92000"/>
+              <a:buFont typeface="Wingdings 2" panose="05020102010507070707" pitchFamily="18" charset="2"/>
+              <a:buNone/>
+              <a:defRPr sz="1600" b="1" kern="1200">
+                <a:solidFill>
+                  <a:schemeClr val="tx2"/>
+                </a:solidFill>
+                <a:latin typeface="+mn-lt"/>
+                <a:ea typeface="+mn-ea"/>
+                <a:cs typeface="+mn-cs"/>
+              </a:defRPr>
+            </a:lvl6pPr>
+            <a:lvl7pPr marL="2743200" indent="0" algn="l" defTabSz="457200" rtl="0" eaLnBrk="1" latinLnBrk="0" hangingPunct="1">
+              <a:spcBef>
+                <a:spcPct val="20000"/>
+              </a:spcBef>
+              <a:spcAft>
+                <a:spcPts val="600"/>
+              </a:spcAft>
+              <a:buClr>
+                <a:schemeClr val="accent2"/>
+              </a:buClr>
+              <a:buSzPct val="92000"/>
+              <a:buFont typeface="Wingdings 2" panose="05020102010507070707" pitchFamily="18" charset="2"/>
+              <a:buNone/>
+              <a:defRPr sz="1600" b="1" kern="1200">
+                <a:solidFill>
+                  <a:schemeClr val="tx2"/>
+                </a:solidFill>
+                <a:latin typeface="+mn-lt"/>
+                <a:ea typeface="+mn-ea"/>
+                <a:cs typeface="+mn-cs"/>
+              </a:defRPr>
+            </a:lvl7pPr>
+            <a:lvl8pPr marL="3200400" indent="0" algn="l" defTabSz="457200" rtl="0" eaLnBrk="1" latinLnBrk="0" hangingPunct="1">
+              <a:spcBef>
+                <a:spcPct val="20000"/>
+              </a:spcBef>
+              <a:spcAft>
+                <a:spcPts val="600"/>
+              </a:spcAft>
+              <a:buClr>
+                <a:schemeClr val="accent2"/>
+              </a:buClr>
+              <a:buSzPct val="92000"/>
+              <a:buFont typeface="Wingdings 2" panose="05020102010507070707" pitchFamily="18" charset="2"/>
+              <a:buNone/>
+              <a:defRPr sz="1600" b="1" kern="1200">
+                <a:solidFill>
+                  <a:schemeClr val="tx2"/>
+                </a:solidFill>
+                <a:latin typeface="+mn-lt"/>
+                <a:ea typeface="+mn-ea"/>
+                <a:cs typeface="+mn-cs"/>
+              </a:defRPr>
+            </a:lvl8pPr>
+            <a:lvl9pPr marL="3657600" indent="0" algn="l" defTabSz="457200" rtl="0" eaLnBrk="1" latinLnBrk="0" hangingPunct="1">
+              <a:spcBef>
+                <a:spcPct val="20000"/>
+              </a:spcBef>
+              <a:spcAft>
+                <a:spcPts val="600"/>
+              </a:spcAft>
+              <a:buClr>
+                <a:schemeClr val="accent2"/>
+              </a:buClr>
+              <a:buSzPct val="92000"/>
+              <a:buFont typeface="Wingdings 2" panose="05020102010507070707" pitchFamily="18" charset="2"/>
+              <a:buNone/>
+              <a:defRPr sz="1600" b="1" kern="1200">
+                <a:solidFill>
+                  <a:schemeClr val="tx2"/>
+                </a:solidFill>
+                <a:latin typeface="+mn-lt"/>
+                <a:ea typeface="+mn-ea"/>
+                <a:cs typeface="+mn-cs"/>
+              </a:defRPr>
+            </a:lvl9pPr>
+          </a:lstStyle>
+          <a:p>
+            <a:r>
+              <a:rPr lang="it-IT" sz="2000" b="0" dirty="0">
+                <a:solidFill>
+                  <a:schemeClr val="tx1"/>
+                </a:solidFill>
+                <a:effectLst/>
+              </a:rPr>
+              <a:t>Sia in OS161 che in </a:t>
+            </a:r>
+            <a:r>
+              <a:rPr lang="it-IT" sz="2000" b="0" dirty="0" err="1">
+                <a:solidFill>
+                  <a:schemeClr val="tx1"/>
+                </a:solidFill>
+                <a:effectLst/>
+              </a:rPr>
+              <a:t>PintOS</a:t>
+            </a:r>
+            <a:r>
+              <a:rPr lang="it-IT" sz="2000" b="0" dirty="0">
+                <a:solidFill>
+                  <a:schemeClr val="tx1"/>
+                </a:solidFill>
+                <a:effectLst/>
+              </a:rPr>
+              <a:t>, l'obiettivo delle </a:t>
+            </a:r>
+            <a:r>
+              <a:rPr lang="it-IT" sz="2000" b="0" dirty="0" err="1">
+                <a:solidFill>
+                  <a:schemeClr val="tx1"/>
+                </a:solidFill>
+                <a:effectLst/>
+              </a:rPr>
+              <a:t>condition</a:t>
+            </a:r>
+            <a:r>
+              <a:rPr lang="it-IT" sz="2000" b="0" dirty="0">
+                <a:solidFill>
+                  <a:schemeClr val="tx1"/>
+                </a:solidFill>
+                <a:effectLst/>
+              </a:rPr>
+              <a:t> </a:t>
+            </a:r>
+            <a:r>
+              <a:rPr lang="it-IT" sz="2000" b="0" dirty="0" err="1">
+                <a:solidFill>
+                  <a:schemeClr val="tx1"/>
+                </a:solidFill>
+                <a:effectLst/>
+              </a:rPr>
+              <a:t>variables</a:t>
+            </a:r>
+            <a:r>
+              <a:rPr lang="it-IT" sz="2000" b="0" dirty="0">
+                <a:solidFill>
+                  <a:schemeClr val="tx1"/>
+                </a:solidFill>
+                <a:effectLst/>
+              </a:rPr>
+              <a:t> è consentire ai </a:t>
+            </a:r>
+            <a:r>
+              <a:rPr lang="it-IT" sz="2000" b="0" dirty="0" err="1">
+                <a:solidFill>
+                  <a:schemeClr val="tx1"/>
+                </a:solidFill>
+                <a:effectLst/>
+              </a:rPr>
+              <a:t>thread</a:t>
+            </a:r>
+            <a:r>
+              <a:rPr lang="it-IT" sz="2000" b="0" dirty="0">
+                <a:solidFill>
+                  <a:schemeClr val="tx1"/>
+                </a:solidFill>
+                <a:effectLst/>
+              </a:rPr>
+              <a:t> di aspettare che determinate condizioni diventino vere, migliorando l'efficienza della sincronizzazione. </a:t>
+            </a:r>
+          </a:p>
+        </p:txBody>
+      </p:sp>
+    </p:spTree>
+    <p:extLst>
+      <p:ext uri="{BB962C8B-B14F-4D97-AF65-F5344CB8AC3E}">
+        <p14:creationId xmlns:p14="http://schemas.microsoft.com/office/powerpoint/2010/main" val="3980170520"/>
+      </p:ext>
+    </p:extLst>
+  </p:cSld>
+  <p:clrMapOvr>
+    <a:masterClrMapping/>
+  </p:clrMapOvr>
+</p:sld>
+</file>
+
+<file path=ppt/slides/slide14.xml><?xml version="1.0" encoding="utf-8"?>
 <p:sld xmlns:a="http://schemas.openxmlformats.org/drawingml/2006/main" xmlns:r="http://schemas.openxmlformats.org/officeDocument/2006/relationships" xmlns:p="http://schemas.openxmlformats.org/presentationml/2006/main">
   <p:cSld>
     <p:spTree>

</xml_diff>

<commit_message>
finish sync in ppt
</commit_message>
<xml_diff>
--- a/Progetto_SO.pptx
+++ b/Progetto_SO.pptx
@@ -6558,7 +6558,7 @@
           <a:p>
             <a:fld id="{F259A98E-7D3E-4BAE-A284-2CE0D83E33BF}" type="datetimeFigureOut">
               <a:rPr lang="it-IT" smtClean="0"/>
-              <a:t>04/01/2024</a:t>
+              <a:t>05/01/2024</a:t>
             </a:fld>
             <a:endParaRPr lang="it-IT"/>
           </a:p>
@@ -6820,7 +6820,7 @@
           <a:p>
             <a:fld id="{F259A98E-7D3E-4BAE-A284-2CE0D83E33BF}" type="datetimeFigureOut">
               <a:rPr lang="it-IT" smtClean="0"/>
-              <a:t>04/01/2024</a:t>
+              <a:t>05/01/2024</a:t>
             </a:fld>
             <a:endParaRPr lang="it-IT"/>
           </a:p>
@@ -7055,7 +7055,7 @@
           <a:p>
             <a:fld id="{F259A98E-7D3E-4BAE-A284-2CE0D83E33BF}" type="datetimeFigureOut">
               <a:rPr lang="it-IT" smtClean="0"/>
-              <a:t>04/01/2024</a:t>
+              <a:t>05/01/2024</a:t>
             </a:fld>
             <a:endParaRPr lang="it-IT"/>
           </a:p>
@@ -7295,7 +7295,7 @@
           <a:p>
             <a:fld id="{F259A98E-7D3E-4BAE-A284-2CE0D83E33BF}" type="datetimeFigureOut">
               <a:rPr lang="it-IT" smtClean="0"/>
-              <a:t>04/01/2024</a:t>
+              <a:t>05/01/2024</a:t>
             </a:fld>
             <a:endParaRPr lang="it-IT"/>
           </a:p>
@@ -7602,7 +7602,7 @@
           <a:p>
             <a:fld id="{F259A98E-7D3E-4BAE-A284-2CE0D83E33BF}" type="datetimeFigureOut">
               <a:rPr lang="it-IT" smtClean="0"/>
-              <a:t>04/01/2024</a:t>
+              <a:t>05/01/2024</a:t>
             </a:fld>
             <a:endParaRPr lang="it-IT"/>
           </a:p>
@@ -7904,7 +7904,7 @@
           <a:p>
             <a:fld id="{F259A98E-7D3E-4BAE-A284-2CE0D83E33BF}" type="datetimeFigureOut">
               <a:rPr lang="it-IT" smtClean="0"/>
-              <a:t>04/01/2024</a:t>
+              <a:t>05/01/2024</a:t>
             </a:fld>
             <a:endParaRPr lang="it-IT"/>
           </a:p>
@@ -8326,7 +8326,7 @@
           <a:p>
             <a:fld id="{F259A98E-7D3E-4BAE-A284-2CE0D83E33BF}" type="datetimeFigureOut">
               <a:rPr lang="it-IT" smtClean="0"/>
-              <a:t>04/01/2024</a:t>
+              <a:t>05/01/2024</a:t>
             </a:fld>
             <a:endParaRPr lang="it-IT"/>
           </a:p>
@@ -8421,7 +8421,7 @@
           <a:p>
             <a:fld id="{F259A98E-7D3E-4BAE-A284-2CE0D83E33BF}" type="datetimeFigureOut">
               <a:rPr lang="it-IT" smtClean="0"/>
-              <a:t>04/01/2024</a:t>
+              <a:t>05/01/2024</a:t>
             </a:fld>
             <a:endParaRPr lang="it-IT"/>
           </a:p>
@@ -8583,7 +8583,7 @@
           <a:p>
             <a:fld id="{F259A98E-7D3E-4BAE-A284-2CE0D83E33BF}" type="datetimeFigureOut">
               <a:rPr lang="it-IT" smtClean="0"/>
-              <a:t>04/01/2024</a:t>
+              <a:t>05/01/2024</a:t>
             </a:fld>
             <a:endParaRPr lang="it-IT"/>
           </a:p>
@@ -8961,7 +8961,7 @@
           <a:p>
             <a:fld id="{F259A98E-7D3E-4BAE-A284-2CE0D83E33BF}" type="datetimeFigureOut">
               <a:rPr lang="it-IT" smtClean="0"/>
-              <a:t>04/01/2024</a:t>
+              <a:t>05/01/2024</a:t>
             </a:fld>
             <a:endParaRPr lang="it-IT"/>
           </a:p>
@@ -9250,7 +9250,7 @@
           <a:p>
             <a:fld id="{F259A98E-7D3E-4BAE-A284-2CE0D83E33BF}" type="datetimeFigureOut">
               <a:rPr lang="it-IT" smtClean="0"/>
-              <a:t>04/01/2024</a:t>
+              <a:t>05/01/2024</a:t>
             </a:fld>
             <a:endParaRPr lang="it-IT"/>
           </a:p>
@@ -9461,7 +9461,7 @@
           <a:p>
             <a:fld id="{F259A98E-7D3E-4BAE-A284-2CE0D83E33BF}" type="datetimeFigureOut">
               <a:rPr lang="it-IT" smtClean="0"/>
-              <a:t>04/01/2024</a:t>
+              <a:t>05/01/2024</a:t>
             </a:fld>
             <a:endParaRPr lang="it-IT"/>
           </a:p>
@@ -11616,7 +11616,7 @@
         </p:nvSpPr>
         <p:spPr>
           <a:xfrm>
-            <a:off x="887219" y="2794235"/>
+            <a:off x="887219" y="2555699"/>
             <a:ext cx="5087075" cy="536005"/>
           </a:xfrm>
         </p:spPr>
@@ -11649,7 +11649,7 @@
         </p:nvSpPr>
         <p:spPr>
           <a:xfrm>
-            <a:off x="581194" y="3469395"/>
+            <a:off x="581194" y="3230859"/>
             <a:ext cx="5393100" cy="2934999"/>
           </a:xfrm>
         </p:spPr>
@@ -11658,6 +11658,66 @@
             <a:noAutofit/>
           </a:bodyPr>
           <a:lstStyle/>
+          <a:p>
+            <a:r>
+              <a:rPr lang="it-IT" sz="1600" dirty="0"/>
+              <a:t>Lock implementato come </a:t>
+            </a:r>
+            <a:r>
+              <a:rPr lang="it-IT" sz="1600" dirty="0" err="1"/>
+              <a:t>struct</a:t>
+            </a:r>
+            <a:r>
+              <a:rPr lang="it-IT" sz="1600" dirty="0"/>
+              <a:t> contenente:</a:t>
+            </a:r>
+          </a:p>
+          <a:p>
+            <a:pPr lvl="1"/>
+            <a:r>
+              <a:rPr lang="it-IT" dirty="0"/>
+              <a:t>nome: per identificare il lock</a:t>
+            </a:r>
+          </a:p>
+          <a:p>
+            <a:pPr lvl="1"/>
+            <a:r>
+              <a:rPr lang="it-IT" dirty="0"/>
+              <a:t>HANGMAN_LOCKABLE: per rilevare i deadlock</a:t>
+            </a:r>
+          </a:p>
+          <a:p>
+            <a:r>
+              <a:rPr lang="it-IT" sz="1600" dirty="0"/>
+              <a:t>Le operazioni sui Lock sono simili a quelle che offre </a:t>
+            </a:r>
+            <a:r>
+              <a:rPr lang="it-IT" sz="1600" dirty="0" err="1"/>
+              <a:t>PintOS</a:t>
+            </a:r>
+            <a:endParaRPr lang="it-IT" sz="1600" dirty="0"/>
+          </a:p>
+          <a:p>
+            <a:r>
+              <a:rPr lang="it-IT" sz="1600" dirty="0"/>
+              <a:t>La differenza principale è che OS161 utilizza anche un hook per riconoscere e prevenire i deadlock</a:t>
+            </a:r>
+          </a:p>
+          <a:p>
+            <a:pPr lvl="1"/>
+            <a:r>
+              <a:rPr lang="it-IT" dirty="0"/>
+              <a:t>Il rilevatore di deadlock di OS161 utilizza un approccio basato sul grafo per rilevare i deadlock. I </a:t>
+            </a:r>
+            <a:r>
+              <a:rPr lang="it-IT" dirty="0" err="1"/>
+              <a:t>thread</a:t>
+            </a:r>
+            <a:r>
+              <a:rPr lang="it-IT" dirty="0"/>
+              <a:t> e i lock vengono rappresentati come nodi e archi in un grafo. Il codice di rilevamento dei deadlock controlla il grafo per rilevare cicli. Se viene rilevato un ciclo, significa che esiste un deadlock</a:t>
+            </a:r>
+          </a:p>
           <a:p>
             <a:endParaRPr lang="it-IT" sz="1600" dirty="0"/>
           </a:p>
@@ -11681,7 +11741,7 @@
         </p:nvSpPr>
         <p:spPr>
           <a:xfrm>
-            <a:off x="6523735" y="2794235"/>
+            <a:off x="6523735" y="2555699"/>
             <a:ext cx="5087073" cy="553373"/>
           </a:xfrm>
         </p:spPr>
@@ -11714,7 +11774,7 @@
         </p:nvSpPr>
         <p:spPr>
           <a:xfrm>
-            <a:off x="6217709" y="3469395"/>
+            <a:off x="6217709" y="3230859"/>
             <a:ext cx="5393100" cy="2934999"/>
           </a:xfrm>
         </p:spPr>
@@ -11724,7 +11784,123 @@
           </a:bodyPr>
           <a:lstStyle/>
           <a:p>
-            <a:endParaRPr lang="it-IT" sz="1600" dirty="0"/>
+            <a:r>
+              <a:rPr lang="it-IT" sz="1600" dirty="0"/>
+              <a:t>Lock implementato come </a:t>
+            </a:r>
+            <a:r>
+              <a:rPr lang="it-IT" sz="1600" dirty="0" err="1"/>
+              <a:t>struct</a:t>
+            </a:r>
+            <a:r>
+              <a:rPr lang="it-IT" sz="1600" dirty="0"/>
+              <a:t> contenente:</a:t>
+            </a:r>
+          </a:p>
+          <a:p>
+            <a:pPr lvl="1"/>
+            <a:r>
+              <a:rPr lang="it-IT" dirty="0" err="1"/>
+              <a:t>thread</a:t>
+            </a:r>
+            <a:r>
+              <a:rPr lang="it-IT" dirty="0"/>
+              <a:t>: chi detiene il lock</a:t>
+            </a:r>
+          </a:p>
+          <a:p>
+            <a:pPr lvl="1"/>
+            <a:r>
+              <a:rPr lang="it-IT" dirty="0" err="1"/>
+              <a:t>semaphore</a:t>
+            </a:r>
+            <a:r>
+              <a:rPr lang="it-IT" dirty="0"/>
+              <a:t>: struttura semaforo binario per il controllo degli accessi</a:t>
+            </a:r>
+          </a:p>
+          <a:p>
+            <a:r>
+              <a:rPr lang="it-IT" sz="1600" dirty="0"/>
+              <a:t>Le funzioni sui Lock sono: </a:t>
+            </a:r>
+          </a:p>
+          <a:p>
+            <a:pPr lvl="1"/>
+            <a:r>
+              <a:rPr lang="it-IT" sz="1200" b="1" dirty="0" err="1"/>
+              <a:t>lock_init</a:t>
+            </a:r>
+            <a:r>
+              <a:rPr lang="it-IT" sz="1200" dirty="0"/>
+              <a:t> : Inizializza un nuovo lock.</a:t>
+            </a:r>
+          </a:p>
+          <a:p>
+            <a:pPr lvl="1"/>
+            <a:r>
+              <a:rPr lang="it-IT" sz="1200" b="1" dirty="0" err="1"/>
+              <a:t>lock_acquire</a:t>
+            </a:r>
+            <a:r>
+              <a:rPr lang="it-IT" sz="1200" dirty="0"/>
+              <a:t> : Acquisisce il lock, aspettando, se necessario, il suo rilascio.</a:t>
+            </a:r>
+          </a:p>
+          <a:p>
+            <a:pPr lvl="1"/>
+            <a:r>
+              <a:rPr lang="it-IT" sz="1200" b="1" dirty="0" err="1"/>
+              <a:t>lock_try_acquire</a:t>
+            </a:r>
+            <a:r>
+              <a:rPr lang="it-IT" sz="1200" dirty="0"/>
+              <a:t> : Prova ad acquisire il lock senza attendere.</a:t>
+            </a:r>
+          </a:p>
+          <a:p>
+            <a:pPr lvl="1"/>
+            <a:r>
+              <a:rPr lang="it-IT" sz="1200" b="1" dirty="0" err="1"/>
+              <a:t>lock_release</a:t>
+            </a:r>
+            <a:r>
+              <a:rPr lang="it-IT" sz="1200" dirty="0"/>
+              <a:t> : Rilascia il lock detenuto dal </a:t>
+            </a:r>
+            <a:r>
+              <a:rPr lang="it-IT" sz="1200" dirty="0" err="1"/>
+              <a:t>thread</a:t>
+            </a:r>
+            <a:r>
+              <a:rPr lang="it-IT" sz="1200" dirty="0"/>
+              <a:t> corrente.</a:t>
+            </a:r>
+          </a:p>
+          <a:p>
+            <a:pPr lvl="1"/>
+            <a:r>
+              <a:rPr lang="it-IT" sz="1200" b="1" dirty="0" err="1"/>
+              <a:t>lock_held_by_current_thread</a:t>
+            </a:r>
+            <a:r>
+              <a:rPr lang="it-IT" sz="1200" dirty="0"/>
+              <a:t> : Verifica se il </a:t>
+            </a:r>
+            <a:r>
+              <a:rPr lang="it-IT" sz="1200" dirty="0" err="1"/>
+              <a:t>thread</a:t>
+            </a:r>
+            <a:r>
+              <a:rPr lang="it-IT" sz="1200" dirty="0"/>
+              <a:t> in esecuzione possiede il lock.</a:t>
+            </a:r>
+          </a:p>
+          <a:p>
+            <a:pPr marL="324000" lvl="1" indent="0">
+              <a:buNone/>
+            </a:pPr>
+            <a:endParaRPr lang="it-IT" dirty="0"/>
           </a:p>
         </p:txBody>
       </p:sp>
@@ -11744,7 +11920,7 @@
         </p:nvSpPr>
         <p:spPr>
           <a:xfrm>
-            <a:off x="615548" y="1879772"/>
+            <a:off x="615548" y="1641236"/>
             <a:ext cx="11245148" cy="921080"/>
           </a:xfrm>
           <a:prstGeom prst="rect">
@@ -12045,19 +12221,7 @@
             </a:r>
             <a:r>
               <a:rPr lang="it-IT" sz="1600" dirty="0"/>
-              <a:t>– </a:t>
-            </a:r>
-            <a:r>
-              <a:rPr lang="it-IT" sz="1600" dirty="0" err="1"/>
-              <a:t>condition</a:t>
-            </a:r>
-            <a:r>
-              <a:rPr lang="it-IT" sz="1600" dirty="0"/>
-              <a:t> </a:t>
-            </a:r>
-            <a:r>
-              <a:rPr lang="it-IT" sz="1600" dirty="0" err="1"/>
-              <a:t>variables</a:t>
+              <a:t>– SPINLOCK</a:t>
             </a:r>
             <a:endParaRPr lang="it-IT" dirty="0"/>
           </a:p>
@@ -12065,10 +12229,10 @@
       </p:sp>
       <p:sp>
         <p:nvSpPr>
-          <p:cNvPr id="4" name="Segnaposto testo 3">
+          <p:cNvPr id="13" name="Segnaposto testo 12">
             <a:extLst>
               <a:ext uri="{FF2B5EF4-FFF2-40B4-BE49-F238E27FC236}">
-                <a16:creationId xmlns:a16="http://schemas.microsoft.com/office/drawing/2014/main" id="{3484543A-BB31-0207-182F-1F1C206F0C68}"/>
+                <a16:creationId xmlns:a16="http://schemas.microsoft.com/office/drawing/2014/main" id="{B3C55E6E-7F1D-E8ED-D1E0-70C0CB3A6DEB}"/>
               </a:ext>
             </a:extLst>
           </p:cNvPr>
@@ -12081,7 +12245,7 @@
         </p:nvSpPr>
         <p:spPr>
           <a:xfrm>
-            <a:off x="887219" y="2794235"/>
+            <a:off x="581193" y="2065293"/>
             <a:ext cx="5087075" cy="536005"/>
           </a:xfrm>
         </p:spPr>
@@ -12090,18 +12254,19 @@
           <a:lstStyle/>
           <a:p>
             <a:r>
-              <a:rPr lang="it-IT" dirty="0"/>
-              <a:t>OS161</a:t>
-            </a:r>
+              <a:rPr lang="it-IT" dirty="0" err="1"/>
+              <a:t>Spinlock</a:t>
+            </a:r>
+            <a:endParaRPr lang="it-IT" dirty="0"/>
           </a:p>
         </p:txBody>
       </p:sp>
       <p:sp>
         <p:nvSpPr>
-          <p:cNvPr id="8" name="Segnaposto contenuto 7">
+          <p:cNvPr id="15" name="Segnaposto contenuto 14">
             <a:extLst>
               <a:ext uri="{FF2B5EF4-FFF2-40B4-BE49-F238E27FC236}">
-                <a16:creationId xmlns:a16="http://schemas.microsoft.com/office/drawing/2014/main" id="{A1E5DF89-94E7-98C4-F563-B3A43317A1CE}"/>
+                <a16:creationId xmlns:a16="http://schemas.microsoft.com/office/drawing/2014/main" id="{DF74071F-8B8B-B999-4850-42BA71FE86B6}"/>
               </a:ext>
             </a:extLst>
           </p:cNvPr>
@@ -12112,93 +12277,119 @@
             <p:ph sz="half" idx="2"/>
           </p:nvPr>
         </p:nvSpPr>
-        <p:spPr>
-          <a:xfrm>
-            <a:off x="581194" y="3469395"/>
-            <a:ext cx="5393100" cy="2934999"/>
-          </a:xfrm>
-        </p:spPr>
+        <p:spPr/>
         <p:txBody>
           <a:bodyPr>
-            <a:noAutofit/>
+            <a:normAutofit lnSpcReduction="10000"/>
           </a:bodyPr>
           <a:lstStyle/>
           <a:p>
-            <a:endParaRPr lang="it-IT" sz="1600" dirty="0"/>
+            <a:pPr marL="0" indent="0">
+              <a:buNone/>
+            </a:pPr>
+            <a:r>
+              <a:rPr lang="it-IT" dirty="0"/>
+              <a:t>A differenza di </a:t>
+            </a:r>
+            <a:r>
+              <a:rPr lang="it-IT" dirty="0" err="1"/>
+              <a:t>PintOS</a:t>
+            </a:r>
+            <a:r>
+              <a:rPr lang="it-IT" dirty="0"/>
+              <a:t>, </a:t>
+            </a:r>
+            <a:r>
+              <a:rPr lang="it-IT" b="1" dirty="0"/>
+              <a:t>OS161</a:t>
+            </a:r>
+            <a:r>
+              <a:rPr lang="it-IT" dirty="0"/>
+              <a:t> introduce anche gli </a:t>
+            </a:r>
+            <a:r>
+              <a:rPr lang="it-IT" b="1" dirty="0" err="1"/>
+              <a:t>spinlock</a:t>
+            </a:r>
+            <a:r>
+              <a:rPr lang="it-IT" dirty="0"/>
+              <a:t>.</a:t>
+            </a:r>
+          </a:p>
+          <a:p>
+            <a:pPr marL="0" indent="0">
+              <a:buNone/>
+            </a:pPr>
+            <a:r>
+              <a:rPr lang="it-IT" dirty="0"/>
+              <a:t>Gli </a:t>
+            </a:r>
+            <a:r>
+              <a:rPr lang="it-IT" dirty="0" err="1"/>
+              <a:t>spinlock</a:t>
+            </a:r>
+            <a:r>
+              <a:rPr lang="it-IT" dirty="0"/>
+              <a:t> sono un meccanismo di sincronizzazione che consente a più </a:t>
+            </a:r>
+            <a:r>
+              <a:rPr lang="it-IT" dirty="0" err="1"/>
+              <a:t>thread</a:t>
+            </a:r>
+            <a:r>
+              <a:rPr lang="it-IT" dirty="0"/>
+              <a:t> di accedere a un dato oggetto in modo esclusivo. </a:t>
+            </a:r>
+          </a:p>
+          <a:p>
+            <a:pPr marL="0" indent="0">
+              <a:buNone/>
+            </a:pPr>
+            <a:r>
+              <a:rPr lang="it-IT" dirty="0"/>
+              <a:t>A differenza dei </a:t>
+            </a:r>
+            <a:r>
+              <a:rPr lang="it-IT" dirty="0" err="1"/>
+              <a:t>mutex</a:t>
+            </a:r>
+            <a:r>
+              <a:rPr lang="it-IT" dirty="0"/>
+              <a:t>, che mettono in attesa passiva i </a:t>
+            </a:r>
+            <a:r>
+              <a:rPr lang="it-IT" dirty="0" err="1"/>
+              <a:t>thread</a:t>
+            </a:r>
+            <a:r>
+              <a:rPr lang="it-IT" dirty="0"/>
+              <a:t> che non possono acquisire il lock, gli </a:t>
+            </a:r>
+            <a:r>
+              <a:rPr lang="it-IT" dirty="0" err="1"/>
+              <a:t>spinlock</a:t>
+            </a:r>
+            <a:r>
+              <a:rPr lang="it-IT" dirty="0"/>
+              <a:t> consentono ai </a:t>
+            </a:r>
+            <a:r>
+              <a:rPr lang="it-IT" dirty="0" err="1"/>
+              <a:t>thread</a:t>
+            </a:r>
+            <a:r>
+              <a:rPr lang="it-IT" dirty="0"/>
+              <a:t> di continuare a eseguire in modo attivo, verificando periodicamente se il lock è disponibile.</a:t>
+            </a:r>
           </a:p>
         </p:txBody>
       </p:sp>
       <p:sp>
         <p:nvSpPr>
-          <p:cNvPr id="9" name="Segnaposto testo 8">
+          <p:cNvPr id="17" name="Segnaposto contenuto 14">
             <a:extLst>
               <a:ext uri="{FF2B5EF4-FFF2-40B4-BE49-F238E27FC236}">
-                <a16:creationId xmlns:a16="http://schemas.microsoft.com/office/drawing/2014/main" id="{00842FCF-9A2A-27B3-4ED6-BB0713CE4444}"/>
-              </a:ext>
-            </a:extLst>
-          </p:cNvPr>
-          <p:cNvSpPr>
-            <a:spLocks noGrp="1"/>
-          </p:cNvSpPr>
-          <p:nvPr>
-            <p:ph type="body" sz="quarter" idx="3"/>
-          </p:nvPr>
-        </p:nvSpPr>
-        <p:spPr>
-          <a:xfrm>
-            <a:off x="6523735" y="2794235"/>
-            <a:ext cx="5087073" cy="553373"/>
-          </a:xfrm>
-        </p:spPr>
-        <p:txBody>
-          <a:bodyPr/>
-          <a:lstStyle/>
-          <a:p>
-            <a:r>
-              <a:rPr lang="it-IT" dirty="0"/>
-              <a:t>PINTOS</a:t>
-            </a:r>
-          </a:p>
-        </p:txBody>
-      </p:sp>
-      <p:sp>
-        <p:nvSpPr>
-          <p:cNvPr id="10" name="Segnaposto contenuto 9">
-            <a:extLst>
-              <a:ext uri="{FF2B5EF4-FFF2-40B4-BE49-F238E27FC236}">
-                <a16:creationId xmlns:a16="http://schemas.microsoft.com/office/drawing/2014/main" id="{3CDA2ECB-1671-3745-42C6-213A778ECD29}"/>
-              </a:ext>
-            </a:extLst>
-          </p:cNvPr>
-          <p:cNvSpPr>
-            <a:spLocks noGrp="1"/>
-          </p:cNvSpPr>
-          <p:nvPr>
-            <p:ph sz="quarter" idx="4"/>
-          </p:nvPr>
-        </p:nvSpPr>
-        <p:spPr>
-          <a:xfrm>
-            <a:off x="6217709" y="3469395"/>
-            <a:ext cx="5393100" cy="2934999"/>
-          </a:xfrm>
-        </p:spPr>
-        <p:txBody>
-          <a:bodyPr>
-            <a:noAutofit/>
-          </a:bodyPr>
-          <a:lstStyle/>
-          <a:p>
-            <a:endParaRPr lang="it-IT" sz="1600" dirty="0"/>
-          </a:p>
-        </p:txBody>
-      </p:sp>
-      <p:sp>
-        <p:nvSpPr>
-          <p:cNvPr id="3" name="Segnaposto testo 3">
-            <a:extLst>
-              <a:ext uri="{FF2B5EF4-FFF2-40B4-BE49-F238E27FC236}">
-                <a16:creationId xmlns:a16="http://schemas.microsoft.com/office/drawing/2014/main" id="{DD092F63-1123-8337-F4DC-4B5BF08C3E1F}"/>
+                <a16:creationId xmlns:a16="http://schemas.microsoft.com/office/drawing/2014/main" id="{BDB5703A-5D14-1779-07EE-1FC3B49E9925}"/>
               </a:ext>
             </a:extLst>
           </p:cNvPr>
@@ -12209,19 +12400,19 @@
         </p:nvSpPr>
         <p:spPr>
           <a:xfrm>
-            <a:off x="615548" y="1879772"/>
-            <a:ext cx="11245148" cy="921080"/>
+            <a:off x="5974294" y="2065293"/>
+            <a:ext cx="5393100" cy="4680064"/>
           </a:xfrm>
           <a:prstGeom prst="rect">
             <a:avLst/>
           </a:prstGeom>
         </p:spPr>
         <p:txBody>
-          <a:bodyPr vert="horz" lIns="91440" tIns="45720" rIns="91440" bIns="45720" rtlCol="0" anchor="b">
-            <a:noAutofit/>
+          <a:bodyPr vert="horz" lIns="91440" tIns="45720" rIns="91440" bIns="45720" rtlCol="0" anchor="t">
+            <a:normAutofit fontScale="47500" lnSpcReduction="20000"/>
           </a:bodyPr>
           <a:lstStyle>
-            <a:lvl1pPr marL="0" indent="0" algn="l" defTabSz="457200" rtl="0" eaLnBrk="1" latinLnBrk="0" hangingPunct="1">
+            <a:lvl1pPr marL="306000" indent="-306000" algn="l" defTabSz="457200" rtl="0" eaLnBrk="1" latinLnBrk="0" hangingPunct="1">
               <a:spcBef>
                 <a:spcPct val="20000"/>
               </a:spcBef>
@@ -12233,17 +12424,17 @@
               </a:buClr>
               <a:buSzPct val="92000"/>
               <a:buFont typeface="Wingdings 2" panose="05020102010507070707" pitchFamily="18" charset="2"/>
-              <a:buNone/>
-              <a:defRPr sz="2200" b="0" kern="1200">
-                <a:solidFill>
-                  <a:schemeClr val="accent2"/>
+              <a:buChar char=""/>
+              <a:defRPr sz="1800" kern="1200">
+                <a:solidFill>
+                  <a:schemeClr val="tx2"/>
                 </a:solidFill>
                 <a:latin typeface="+mn-lt"/>
                 <a:ea typeface="+mn-ea"/>
                 <a:cs typeface="+mn-cs"/>
               </a:defRPr>
             </a:lvl1pPr>
-            <a:lvl2pPr marL="457200" indent="0" algn="l" defTabSz="457200" rtl="0" eaLnBrk="1" latinLnBrk="0" hangingPunct="1">
+            <a:lvl2pPr marL="630000" indent="-306000" algn="l" defTabSz="457200" rtl="0" eaLnBrk="1" latinLnBrk="0" hangingPunct="1">
               <a:spcBef>
                 <a:spcPct val="20000"/>
               </a:spcBef>
@@ -12255,8 +12446,8 @@
               </a:buClr>
               <a:buSzPct val="92000"/>
               <a:buFont typeface="Wingdings 2" panose="05020102010507070707" pitchFamily="18" charset="2"/>
-              <a:buNone/>
-              <a:defRPr sz="2000" b="1" kern="1200">
+              <a:buChar char=""/>
+              <a:defRPr sz="1600" kern="1200">
                 <a:solidFill>
                   <a:schemeClr val="tx2"/>
                 </a:solidFill>
@@ -12265,7 +12456,7 @@
                 <a:cs typeface="+mn-cs"/>
               </a:defRPr>
             </a:lvl2pPr>
-            <a:lvl3pPr marL="914400" indent="0" algn="l" defTabSz="457200" rtl="0" eaLnBrk="1" latinLnBrk="0" hangingPunct="1">
+            <a:lvl3pPr marL="900000" indent="-270000" algn="l" defTabSz="457200" rtl="0" eaLnBrk="1" latinLnBrk="0" hangingPunct="1">
               <a:spcBef>
                 <a:spcPct val="20000"/>
               </a:spcBef>
@@ -12277,8 +12468,8 @@
               </a:buClr>
               <a:buSzPct val="92000"/>
               <a:buFont typeface="Wingdings 2" panose="05020102010507070707" pitchFamily="18" charset="2"/>
-              <a:buNone/>
-              <a:defRPr sz="1800" b="1" kern="1200">
+              <a:buChar char=""/>
+              <a:defRPr sz="1400" kern="1200">
                 <a:solidFill>
                   <a:schemeClr val="tx2"/>
                 </a:solidFill>
@@ -12287,7 +12478,7 @@
                 <a:cs typeface="+mn-cs"/>
               </a:defRPr>
             </a:lvl3pPr>
-            <a:lvl4pPr marL="1371600" indent="0" algn="l" defTabSz="457200" rtl="0" eaLnBrk="1" latinLnBrk="0" hangingPunct="1">
+            <a:lvl4pPr marL="1242000" indent="-234000" algn="l" defTabSz="457200" rtl="0" eaLnBrk="1" latinLnBrk="0" hangingPunct="1">
               <a:spcBef>
                 <a:spcPct val="20000"/>
               </a:spcBef>
@@ -12299,8 +12490,8 @@
               </a:buClr>
               <a:buSzPct val="92000"/>
               <a:buFont typeface="Wingdings 2" panose="05020102010507070707" pitchFamily="18" charset="2"/>
-              <a:buNone/>
-              <a:defRPr sz="1600" b="1" kern="1200">
+              <a:buChar char=""/>
+              <a:defRPr sz="1200" kern="1200">
                 <a:solidFill>
                   <a:schemeClr val="tx2"/>
                 </a:solidFill>
@@ -12309,7 +12500,7 @@
                 <a:cs typeface="+mn-cs"/>
               </a:defRPr>
             </a:lvl4pPr>
-            <a:lvl5pPr marL="1828800" indent="0" algn="l" defTabSz="457200" rtl="0" eaLnBrk="1" latinLnBrk="0" hangingPunct="1">
+            <a:lvl5pPr marL="1602000" indent="-234000" algn="l" defTabSz="457200" rtl="0" eaLnBrk="1" latinLnBrk="0" hangingPunct="1">
               <a:spcBef>
                 <a:spcPct val="20000"/>
               </a:spcBef>
@@ -12321,8 +12512,8 @@
               </a:buClr>
               <a:buSzPct val="92000"/>
               <a:buFont typeface="Wingdings 2" panose="05020102010507070707" pitchFamily="18" charset="2"/>
-              <a:buNone/>
-              <a:defRPr sz="1600" b="1" kern="1200">
+              <a:buChar char=""/>
+              <a:defRPr sz="1200" kern="1200">
                 <a:solidFill>
                   <a:schemeClr val="tx2"/>
                 </a:solidFill>
@@ -12331,7 +12522,7 @@
                 <a:cs typeface="+mn-cs"/>
               </a:defRPr>
             </a:lvl5pPr>
-            <a:lvl6pPr marL="2286000" indent="0" algn="l" defTabSz="457200" rtl="0" eaLnBrk="1" latinLnBrk="0" hangingPunct="1">
+            <a:lvl6pPr marL="1900000" indent="-228600" algn="l" defTabSz="457200" rtl="0" eaLnBrk="1" latinLnBrk="0" hangingPunct="1">
               <a:spcBef>
                 <a:spcPct val="20000"/>
               </a:spcBef>
@@ -12343,8 +12534,8 @@
               </a:buClr>
               <a:buSzPct val="92000"/>
               <a:buFont typeface="Wingdings 2" panose="05020102010507070707" pitchFamily="18" charset="2"/>
-              <a:buNone/>
-              <a:defRPr sz="1600" b="1" kern="1200">
+              <a:buChar char=""/>
+              <a:defRPr sz="1200" kern="1200">
                 <a:solidFill>
                   <a:schemeClr val="tx2"/>
                 </a:solidFill>
@@ -12353,7 +12544,7 @@
                 <a:cs typeface="+mn-cs"/>
               </a:defRPr>
             </a:lvl6pPr>
-            <a:lvl7pPr marL="2743200" indent="0" algn="l" defTabSz="457200" rtl="0" eaLnBrk="1" latinLnBrk="0" hangingPunct="1">
+            <a:lvl7pPr marL="2200000" indent="-228600" algn="l" defTabSz="457200" rtl="0" eaLnBrk="1" latinLnBrk="0" hangingPunct="1">
               <a:spcBef>
                 <a:spcPct val="20000"/>
               </a:spcBef>
@@ -12365,8 +12556,8 @@
               </a:buClr>
               <a:buSzPct val="92000"/>
               <a:buFont typeface="Wingdings 2" panose="05020102010507070707" pitchFamily="18" charset="2"/>
-              <a:buNone/>
-              <a:defRPr sz="1600" b="1" kern="1200">
+              <a:buChar char=""/>
+              <a:defRPr sz="1200" kern="1200">
                 <a:solidFill>
                   <a:schemeClr val="tx2"/>
                 </a:solidFill>
@@ -12375,7 +12566,7 @@
                 <a:cs typeface="+mn-cs"/>
               </a:defRPr>
             </a:lvl7pPr>
-            <a:lvl8pPr marL="3200400" indent="0" algn="l" defTabSz="457200" rtl="0" eaLnBrk="1" latinLnBrk="0" hangingPunct="1">
+            <a:lvl8pPr marL="2500000" indent="-228600" algn="l" defTabSz="457200" rtl="0" eaLnBrk="1" latinLnBrk="0" hangingPunct="1">
               <a:spcBef>
                 <a:spcPct val="20000"/>
               </a:spcBef>
@@ -12387,8 +12578,8 @@
               </a:buClr>
               <a:buSzPct val="92000"/>
               <a:buFont typeface="Wingdings 2" panose="05020102010507070707" pitchFamily="18" charset="2"/>
-              <a:buNone/>
-              <a:defRPr sz="1600" b="1" kern="1200">
+              <a:buChar char=""/>
+              <a:defRPr sz="1200" kern="1200">
                 <a:solidFill>
                   <a:schemeClr val="tx2"/>
                 </a:solidFill>
@@ -12397,7 +12588,7 @@
                 <a:cs typeface="+mn-cs"/>
               </a:defRPr>
             </a:lvl8pPr>
-            <a:lvl9pPr marL="3657600" indent="0" algn="l" defTabSz="457200" rtl="0" eaLnBrk="1" latinLnBrk="0" hangingPunct="1">
+            <a:lvl9pPr marL="2800000" indent="-228600" algn="l" defTabSz="457200" rtl="0" eaLnBrk="1" latinLnBrk="0" hangingPunct="1">
               <a:spcBef>
                 <a:spcPct val="20000"/>
               </a:spcBef>
@@ -12409,8 +12600,8 @@
               </a:buClr>
               <a:buSzPct val="92000"/>
               <a:buFont typeface="Wingdings 2" panose="05020102010507070707" pitchFamily="18" charset="2"/>
-              <a:buNone/>
-              <a:defRPr sz="1600" b="1" kern="1200">
+              <a:buChar char=""/>
+              <a:defRPr sz="1200" kern="1200">
                 <a:solidFill>
                   <a:schemeClr val="tx2"/>
                 </a:solidFill>
@@ -12421,94 +12612,1272 @@
             </a:lvl9pPr>
           </a:lstStyle>
           <a:p>
-            <a:r>
-              <a:rPr lang="it-IT" sz="2000" b="0" dirty="0">
-                <a:solidFill>
-                  <a:schemeClr val="tx1"/>
+            <a:pPr marL="0" indent="0">
+              <a:lnSpc>
+                <a:spcPct val="107000"/>
+              </a:lnSpc>
+              <a:spcAft>
+                <a:spcPts val="800"/>
+              </a:spcAft>
+              <a:buNone/>
+            </a:pPr>
+            <a:r>
+              <a:rPr lang="en-US" sz="1800" dirty="0">
+                <a:solidFill>
+                  <a:srgbClr val="006A00"/>
                 </a:solidFill>
                 <a:effectLst/>
+                <a:latin typeface="Courier New" panose="02070309020205020404" pitchFamily="49" charset="0"/>
+                <a:ea typeface="Times New Roman" panose="02020603050405020304" pitchFamily="18" charset="0"/>
+                <a:cs typeface="Times New Roman" panose="02020603050405020304" pitchFamily="18" charset="0"/>
               </a:rPr>
-              <a:t>Sia in OS161 che in </a:t>
-            </a:r>
-            <a:r>
-              <a:rPr lang="it-IT" sz="2000" b="0" dirty="0" err="1">
-                <a:solidFill>
-                  <a:schemeClr val="tx1"/>
+              <a:t>/*</a:t>
+            </a:r>
+            <a:endParaRPr lang="it-IT" sz="1800" dirty="0">
+              <a:effectLst/>
+              <a:latin typeface="Calibri" panose="020F0502020204030204" pitchFamily="34" charset="0"/>
+              <a:ea typeface="Calibri" panose="020F0502020204030204" pitchFamily="34" charset="0"/>
+              <a:cs typeface="Times New Roman" panose="02020603050405020304" pitchFamily="18" charset="0"/>
+            </a:endParaRPr>
+          </a:p>
+          <a:p>
+            <a:pPr marL="0" indent="0">
+              <a:lnSpc>
+                <a:spcPct val="107000"/>
+              </a:lnSpc>
+              <a:spcAft>
+                <a:spcPts val="800"/>
+              </a:spcAft>
+              <a:buNone/>
+            </a:pPr>
+            <a:r>
+              <a:rPr lang="en-US" sz="1800" dirty="0">
+                <a:solidFill>
+                  <a:srgbClr val="006A00"/>
                 </a:solidFill>
                 <a:effectLst/>
+                <a:latin typeface="Courier New" panose="02070309020205020404" pitchFamily="49" charset="0"/>
+                <a:ea typeface="Times New Roman" panose="02020603050405020304" pitchFamily="18" charset="0"/>
+                <a:cs typeface="Times New Roman" panose="02020603050405020304" pitchFamily="18" charset="0"/>
               </a:rPr>
-              <a:t>PintOS</a:t>
-            </a:r>
-            <a:r>
-              <a:rPr lang="it-IT" sz="2000" b="0" dirty="0">
-                <a:solidFill>
-                  <a:schemeClr val="tx1"/>
+              <a:t> * Basic spinlock.</a:t>
+            </a:r>
+            <a:endParaRPr lang="it-IT" sz="1800" dirty="0">
+              <a:effectLst/>
+              <a:latin typeface="Calibri" panose="020F0502020204030204" pitchFamily="34" charset="0"/>
+              <a:ea typeface="Calibri" panose="020F0502020204030204" pitchFamily="34" charset="0"/>
+              <a:cs typeface="Times New Roman" panose="02020603050405020304" pitchFamily="18" charset="0"/>
+            </a:endParaRPr>
+          </a:p>
+          <a:p>
+            <a:pPr marL="0" indent="0">
+              <a:lnSpc>
+                <a:spcPct val="107000"/>
+              </a:lnSpc>
+              <a:spcAft>
+                <a:spcPts val="800"/>
+              </a:spcAft>
+              <a:buNone/>
+            </a:pPr>
+            <a:r>
+              <a:rPr lang="en-US" sz="1800" dirty="0">
+                <a:solidFill>
+                  <a:srgbClr val="006A00"/>
                 </a:solidFill>
                 <a:effectLst/>
+                <a:latin typeface="Courier New" panose="02070309020205020404" pitchFamily="49" charset="0"/>
+                <a:ea typeface="Times New Roman" panose="02020603050405020304" pitchFamily="18" charset="0"/>
+                <a:cs typeface="Times New Roman" panose="02020603050405020304" pitchFamily="18" charset="0"/>
               </a:rPr>
-              <a:t>, l'obiettivo delle </a:t>
-            </a:r>
-            <a:r>
-              <a:rPr lang="it-IT" sz="2000" b="0" dirty="0" err="1">
-                <a:solidFill>
-                  <a:schemeClr val="tx1"/>
+              <a:t>*/</a:t>
+            </a:r>
+            <a:endParaRPr lang="it-IT" sz="1800" dirty="0">
+              <a:effectLst/>
+              <a:latin typeface="Calibri" panose="020F0502020204030204" pitchFamily="34" charset="0"/>
+              <a:ea typeface="Calibri" panose="020F0502020204030204" pitchFamily="34" charset="0"/>
+              <a:cs typeface="Times New Roman" panose="02020603050405020304" pitchFamily="18" charset="0"/>
+            </a:endParaRPr>
+          </a:p>
+          <a:p>
+            <a:pPr marL="0" indent="0">
+              <a:lnSpc>
+                <a:spcPct val="107000"/>
+              </a:lnSpc>
+              <a:spcAft>
+                <a:spcPts val="800"/>
+              </a:spcAft>
+              <a:buNone/>
+            </a:pPr>
+            <a:r>
+              <a:rPr lang="en-US" sz="1800" dirty="0">
+                <a:solidFill>
+                  <a:srgbClr val="AA0D91"/>
                 </a:solidFill>
                 <a:effectLst/>
+                <a:latin typeface="Courier New" panose="02070309020205020404" pitchFamily="49" charset="0"/>
+                <a:ea typeface="Times New Roman" panose="02020603050405020304" pitchFamily="18" charset="0"/>
+                <a:cs typeface="Times New Roman" panose="02020603050405020304" pitchFamily="18" charset="0"/>
               </a:rPr>
-              <a:t>condition</a:t>
-            </a:r>
-            <a:r>
-              <a:rPr lang="it-IT" sz="2000" b="0" dirty="0">
-                <a:solidFill>
-                  <a:schemeClr val="tx1"/>
+              <a:t>struct</a:t>
+            </a:r>
+            <a:r>
+              <a:rPr lang="en-US" sz="1800" dirty="0">
+                <a:solidFill>
+                  <a:srgbClr val="000000"/>
                 </a:solidFill>
                 <a:effectLst/>
+                <a:latin typeface="Courier New" panose="02070309020205020404" pitchFamily="49" charset="0"/>
+                <a:ea typeface="Times New Roman" panose="02020603050405020304" pitchFamily="18" charset="0"/>
+                <a:cs typeface="Times New Roman" panose="02020603050405020304" pitchFamily="18" charset="0"/>
+              </a:rPr>
+              <a:t> spinlock {</a:t>
+            </a:r>
+            <a:endParaRPr lang="it-IT" sz="1800" dirty="0">
+              <a:effectLst/>
+              <a:latin typeface="Calibri" panose="020F0502020204030204" pitchFamily="34" charset="0"/>
+              <a:ea typeface="Calibri" panose="020F0502020204030204" pitchFamily="34" charset="0"/>
+              <a:cs typeface="Times New Roman" panose="02020603050405020304" pitchFamily="18" charset="0"/>
+            </a:endParaRPr>
+          </a:p>
+          <a:p>
+            <a:pPr marL="0" indent="0">
+              <a:lnSpc>
+                <a:spcPct val="107000"/>
+              </a:lnSpc>
+              <a:spcAft>
+                <a:spcPts val="800"/>
+              </a:spcAft>
+              <a:buNone/>
+            </a:pPr>
+            <a:r>
+              <a:rPr lang="en-US" sz="1800" dirty="0">
+                <a:solidFill>
+                  <a:srgbClr val="000000"/>
+                </a:solidFill>
+                <a:effectLst/>
+                <a:latin typeface="Courier New" panose="02070309020205020404" pitchFamily="49" charset="0"/>
+                <a:ea typeface="Times New Roman" panose="02020603050405020304" pitchFamily="18" charset="0"/>
+                <a:cs typeface="Times New Roman" panose="02020603050405020304" pitchFamily="18" charset="0"/>
+              </a:rPr>
+              <a:t>	</a:t>
+            </a:r>
+            <a:r>
+              <a:rPr lang="en-US" sz="1800" dirty="0">
+                <a:solidFill>
+                  <a:srgbClr val="AA0D91"/>
+                </a:solidFill>
+                <a:effectLst/>
+                <a:latin typeface="Courier New" panose="02070309020205020404" pitchFamily="49" charset="0"/>
+                <a:ea typeface="Times New Roman" panose="02020603050405020304" pitchFamily="18" charset="0"/>
+                <a:cs typeface="Times New Roman" panose="02020603050405020304" pitchFamily="18" charset="0"/>
+              </a:rPr>
+              <a:t>volatile</a:t>
+            </a:r>
+            <a:r>
+              <a:rPr lang="en-US" sz="1800" dirty="0">
+                <a:solidFill>
+                  <a:srgbClr val="000000"/>
+                </a:solidFill>
+                <a:effectLst/>
+                <a:latin typeface="Courier New" panose="02070309020205020404" pitchFamily="49" charset="0"/>
+                <a:ea typeface="Times New Roman" panose="02020603050405020304" pitchFamily="18" charset="0"/>
+                <a:cs typeface="Times New Roman" panose="02020603050405020304" pitchFamily="18" charset="0"/>
               </a:rPr>
               <a:t> </a:t>
             </a:r>
             <a:r>
-              <a:rPr lang="it-IT" sz="2000" b="0" dirty="0" err="1">
-                <a:solidFill>
-                  <a:schemeClr val="tx1"/>
+              <a:rPr lang="en-US" sz="1800" dirty="0" err="1">
+                <a:solidFill>
+                  <a:srgbClr val="AA0D91"/>
                 </a:solidFill>
                 <a:effectLst/>
+                <a:latin typeface="Courier New" panose="02070309020205020404" pitchFamily="49" charset="0"/>
+                <a:ea typeface="Times New Roman" panose="02020603050405020304" pitchFamily="18" charset="0"/>
+                <a:cs typeface="Times New Roman" panose="02020603050405020304" pitchFamily="18" charset="0"/>
               </a:rPr>
-              <a:t>variables</a:t>
-            </a:r>
-            <a:r>
-              <a:rPr lang="it-IT" sz="2000" b="0" dirty="0">
-                <a:solidFill>
-                  <a:schemeClr val="tx1"/>
+              <a:t>spinlock_data_t</a:t>
+            </a:r>
+            <a:r>
+              <a:rPr lang="en-US" sz="1800" dirty="0">
+                <a:solidFill>
+                  <a:srgbClr val="000000"/>
                 </a:solidFill>
                 <a:effectLst/>
+                <a:latin typeface="Courier New" panose="02070309020205020404" pitchFamily="49" charset="0"/>
+                <a:ea typeface="Times New Roman" panose="02020603050405020304" pitchFamily="18" charset="0"/>
+                <a:cs typeface="Times New Roman" panose="02020603050405020304" pitchFamily="18" charset="0"/>
               </a:rPr>
-              <a:t> è consentire ai </a:t>
-            </a:r>
-            <a:r>
-              <a:rPr lang="it-IT" sz="2000" b="0" dirty="0" err="1">
-                <a:solidFill>
-                  <a:schemeClr val="tx1"/>
+              <a:t> </a:t>
+            </a:r>
+            <a:r>
+              <a:rPr lang="en-US" sz="1800" dirty="0" err="1">
+                <a:solidFill>
+                  <a:srgbClr val="000000"/>
                 </a:solidFill>
                 <a:effectLst/>
+                <a:latin typeface="Courier New" panose="02070309020205020404" pitchFamily="49" charset="0"/>
+                <a:ea typeface="Times New Roman" panose="02020603050405020304" pitchFamily="18" charset="0"/>
+                <a:cs typeface="Times New Roman" panose="02020603050405020304" pitchFamily="18" charset="0"/>
               </a:rPr>
-              <a:t>thread</a:t>
-            </a:r>
-            <a:r>
-              <a:rPr lang="it-IT" sz="2000" b="0" dirty="0">
-                <a:solidFill>
-                  <a:schemeClr val="tx1"/>
+              <a:t>splk_lock</a:t>
+            </a:r>
+            <a:r>
+              <a:rPr lang="en-US" sz="1800" dirty="0">
+                <a:solidFill>
+                  <a:srgbClr val="000000"/>
                 </a:solidFill>
                 <a:effectLst/>
+                <a:latin typeface="Courier New" panose="02070309020205020404" pitchFamily="49" charset="0"/>
+                <a:ea typeface="Times New Roman" panose="02020603050405020304" pitchFamily="18" charset="0"/>
+                <a:cs typeface="Times New Roman" panose="02020603050405020304" pitchFamily="18" charset="0"/>
               </a:rPr>
-              <a:t> di aspettare che determinate condizioni diventino vere, migliorando l'efficienza della sincronizzazione. </a:t>
-            </a:r>
+              <a:t>; </a:t>
+            </a:r>
+            <a:r>
+              <a:rPr lang="en-US" sz="1800" dirty="0">
+                <a:solidFill>
+                  <a:srgbClr val="006A00"/>
+                </a:solidFill>
+                <a:effectLst/>
+                <a:latin typeface="Courier New" panose="02070309020205020404" pitchFamily="49" charset="0"/>
+                <a:ea typeface="Times New Roman" panose="02020603050405020304" pitchFamily="18" charset="0"/>
+                <a:cs typeface="Times New Roman" panose="02020603050405020304" pitchFamily="18" charset="0"/>
+              </a:rPr>
+              <a:t>/* Memory word where we spin. */</a:t>
+            </a:r>
+            <a:endParaRPr lang="it-IT" sz="1800" dirty="0">
+              <a:effectLst/>
+              <a:latin typeface="Calibri" panose="020F0502020204030204" pitchFamily="34" charset="0"/>
+              <a:ea typeface="Calibri" panose="020F0502020204030204" pitchFamily="34" charset="0"/>
+              <a:cs typeface="Times New Roman" panose="02020603050405020304" pitchFamily="18" charset="0"/>
+            </a:endParaRPr>
+          </a:p>
+          <a:p>
+            <a:pPr marL="0" indent="0">
+              <a:lnSpc>
+                <a:spcPct val="107000"/>
+              </a:lnSpc>
+              <a:spcAft>
+                <a:spcPts val="800"/>
+              </a:spcAft>
+              <a:buNone/>
+            </a:pPr>
+            <a:r>
+              <a:rPr lang="en-US" sz="1800" dirty="0">
+                <a:solidFill>
+                  <a:srgbClr val="000000"/>
+                </a:solidFill>
+                <a:effectLst/>
+                <a:latin typeface="Courier New" panose="02070309020205020404" pitchFamily="49" charset="0"/>
+                <a:ea typeface="Times New Roman" panose="02020603050405020304" pitchFamily="18" charset="0"/>
+                <a:cs typeface="Times New Roman" panose="02020603050405020304" pitchFamily="18" charset="0"/>
+              </a:rPr>
+              <a:t>	</a:t>
+            </a:r>
+            <a:r>
+              <a:rPr lang="en-US" sz="1800" dirty="0">
+                <a:solidFill>
+                  <a:srgbClr val="AA0D91"/>
+                </a:solidFill>
+                <a:effectLst/>
+                <a:latin typeface="Courier New" panose="02070309020205020404" pitchFamily="49" charset="0"/>
+                <a:ea typeface="Times New Roman" panose="02020603050405020304" pitchFamily="18" charset="0"/>
+                <a:cs typeface="Times New Roman" panose="02020603050405020304" pitchFamily="18" charset="0"/>
+              </a:rPr>
+              <a:t>struct</a:t>
+            </a:r>
+            <a:r>
+              <a:rPr lang="en-US" sz="1800" dirty="0">
+                <a:solidFill>
+                  <a:srgbClr val="000000"/>
+                </a:solidFill>
+                <a:effectLst/>
+                <a:latin typeface="Courier New" panose="02070309020205020404" pitchFamily="49" charset="0"/>
+                <a:ea typeface="Times New Roman" panose="02020603050405020304" pitchFamily="18" charset="0"/>
+                <a:cs typeface="Times New Roman" panose="02020603050405020304" pitchFamily="18" charset="0"/>
+              </a:rPr>
+              <a:t> </a:t>
+            </a:r>
+            <a:r>
+              <a:rPr lang="en-US" sz="1800" dirty="0" err="1">
+                <a:solidFill>
+                  <a:srgbClr val="000000"/>
+                </a:solidFill>
+                <a:effectLst/>
+                <a:latin typeface="Courier New" panose="02070309020205020404" pitchFamily="49" charset="0"/>
+                <a:ea typeface="Times New Roman" panose="02020603050405020304" pitchFamily="18" charset="0"/>
+                <a:cs typeface="Times New Roman" panose="02020603050405020304" pitchFamily="18" charset="0"/>
+              </a:rPr>
+              <a:t>cpu</a:t>
+            </a:r>
+            <a:r>
+              <a:rPr lang="en-US" sz="1800" dirty="0">
+                <a:solidFill>
+                  <a:srgbClr val="000000"/>
+                </a:solidFill>
+                <a:effectLst/>
+                <a:latin typeface="Courier New" panose="02070309020205020404" pitchFamily="49" charset="0"/>
+                <a:ea typeface="Times New Roman" panose="02020603050405020304" pitchFamily="18" charset="0"/>
+                <a:cs typeface="Times New Roman" panose="02020603050405020304" pitchFamily="18" charset="0"/>
+              </a:rPr>
+              <a:t> *</a:t>
+            </a:r>
+            <a:r>
+              <a:rPr lang="en-US" sz="1800" dirty="0" err="1">
+                <a:solidFill>
+                  <a:srgbClr val="000000"/>
+                </a:solidFill>
+                <a:effectLst/>
+                <a:latin typeface="Courier New" panose="02070309020205020404" pitchFamily="49" charset="0"/>
+                <a:ea typeface="Times New Roman" panose="02020603050405020304" pitchFamily="18" charset="0"/>
+                <a:cs typeface="Times New Roman" panose="02020603050405020304" pitchFamily="18" charset="0"/>
+              </a:rPr>
+              <a:t>splk_holder</a:t>
+            </a:r>
+            <a:r>
+              <a:rPr lang="en-US" sz="1800" dirty="0">
+                <a:solidFill>
+                  <a:srgbClr val="000000"/>
+                </a:solidFill>
+                <a:effectLst/>
+                <a:latin typeface="Courier New" panose="02070309020205020404" pitchFamily="49" charset="0"/>
+                <a:ea typeface="Times New Roman" panose="02020603050405020304" pitchFamily="18" charset="0"/>
+                <a:cs typeface="Times New Roman" panose="02020603050405020304" pitchFamily="18" charset="0"/>
+              </a:rPr>
+              <a:t>;	    </a:t>
+            </a:r>
+            <a:r>
+              <a:rPr lang="en-US" sz="1800" dirty="0">
+                <a:solidFill>
+                  <a:srgbClr val="006A00"/>
+                </a:solidFill>
+                <a:effectLst/>
+                <a:latin typeface="Courier New" panose="02070309020205020404" pitchFamily="49" charset="0"/>
+                <a:ea typeface="Times New Roman" panose="02020603050405020304" pitchFamily="18" charset="0"/>
+                <a:cs typeface="Times New Roman" panose="02020603050405020304" pitchFamily="18" charset="0"/>
+              </a:rPr>
+              <a:t>/* CPU holding this lock. */</a:t>
+            </a:r>
+            <a:endParaRPr lang="it-IT" sz="1800" dirty="0">
+              <a:effectLst/>
+              <a:latin typeface="Calibri" panose="020F0502020204030204" pitchFamily="34" charset="0"/>
+              <a:ea typeface="Calibri" panose="020F0502020204030204" pitchFamily="34" charset="0"/>
+              <a:cs typeface="Times New Roman" panose="02020603050405020304" pitchFamily="18" charset="0"/>
+            </a:endParaRPr>
+          </a:p>
+          <a:p>
+            <a:pPr marL="0" indent="0">
+              <a:lnSpc>
+                <a:spcPct val="107000"/>
+              </a:lnSpc>
+              <a:spcAft>
+                <a:spcPts val="800"/>
+              </a:spcAft>
+              <a:buNone/>
+            </a:pPr>
+            <a:r>
+              <a:rPr lang="en-US" sz="1800" dirty="0">
+                <a:solidFill>
+                  <a:srgbClr val="000000"/>
+                </a:solidFill>
+                <a:effectLst/>
+                <a:latin typeface="Courier New" panose="02070309020205020404" pitchFamily="49" charset="0"/>
+                <a:ea typeface="Times New Roman" panose="02020603050405020304" pitchFamily="18" charset="0"/>
+                <a:cs typeface="Times New Roman" panose="02020603050405020304" pitchFamily="18" charset="0"/>
+              </a:rPr>
+              <a:t>	HANGMAN_LOCKABLE(</a:t>
+            </a:r>
+            <a:r>
+              <a:rPr lang="en-US" sz="1800" dirty="0" err="1">
+                <a:solidFill>
+                  <a:srgbClr val="000000"/>
+                </a:solidFill>
+                <a:effectLst/>
+                <a:latin typeface="Courier New" panose="02070309020205020404" pitchFamily="49" charset="0"/>
+                <a:ea typeface="Times New Roman" panose="02020603050405020304" pitchFamily="18" charset="0"/>
+                <a:cs typeface="Times New Roman" panose="02020603050405020304" pitchFamily="18" charset="0"/>
+              </a:rPr>
+              <a:t>splk_hangman</a:t>
+            </a:r>
+            <a:r>
+              <a:rPr lang="en-US" sz="1800" dirty="0">
+                <a:solidFill>
+                  <a:srgbClr val="000000"/>
+                </a:solidFill>
+                <a:effectLst/>
+                <a:latin typeface="Courier New" panose="02070309020205020404" pitchFamily="49" charset="0"/>
+                <a:ea typeface="Times New Roman" panose="02020603050405020304" pitchFamily="18" charset="0"/>
+                <a:cs typeface="Times New Roman" panose="02020603050405020304" pitchFamily="18" charset="0"/>
+              </a:rPr>
+              <a:t>);     </a:t>
+            </a:r>
+            <a:r>
+              <a:rPr lang="en-US" sz="1800" dirty="0">
+                <a:solidFill>
+                  <a:srgbClr val="006A00"/>
+                </a:solidFill>
+                <a:effectLst/>
+                <a:latin typeface="Courier New" panose="02070309020205020404" pitchFamily="49" charset="0"/>
+                <a:ea typeface="Times New Roman" panose="02020603050405020304" pitchFamily="18" charset="0"/>
+                <a:cs typeface="Times New Roman" panose="02020603050405020304" pitchFamily="18" charset="0"/>
+              </a:rPr>
+              <a:t>/* Deadlock detector hook. */</a:t>
+            </a:r>
+            <a:endParaRPr lang="it-IT" sz="1800" dirty="0">
+              <a:effectLst/>
+              <a:latin typeface="Calibri" panose="020F0502020204030204" pitchFamily="34" charset="0"/>
+              <a:ea typeface="Calibri" panose="020F0502020204030204" pitchFamily="34" charset="0"/>
+              <a:cs typeface="Times New Roman" panose="02020603050405020304" pitchFamily="18" charset="0"/>
+            </a:endParaRPr>
+          </a:p>
+          <a:p>
+            <a:pPr marL="0" indent="0">
+              <a:lnSpc>
+                <a:spcPct val="107000"/>
+              </a:lnSpc>
+              <a:spcAft>
+                <a:spcPts val="800"/>
+              </a:spcAft>
+              <a:buNone/>
+            </a:pPr>
+            <a:r>
+              <a:rPr lang="en-US" sz="1800" dirty="0">
+                <a:solidFill>
+                  <a:srgbClr val="000000"/>
+                </a:solidFill>
+                <a:effectLst/>
+                <a:latin typeface="Courier New" panose="02070309020205020404" pitchFamily="49" charset="0"/>
+                <a:ea typeface="Times New Roman" panose="02020603050405020304" pitchFamily="18" charset="0"/>
+                <a:cs typeface="Times New Roman" panose="02020603050405020304" pitchFamily="18" charset="0"/>
+              </a:rPr>
+              <a:t>};</a:t>
+            </a:r>
+            <a:endParaRPr lang="it-IT" sz="1800" dirty="0">
+              <a:effectLst/>
+              <a:latin typeface="Calibri" panose="020F0502020204030204" pitchFamily="34" charset="0"/>
+              <a:ea typeface="Calibri" panose="020F0502020204030204" pitchFamily="34" charset="0"/>
+              <a:cs typeface="Times New Roman" panose="02020603050405020304" pitchFamily="18" charset="0"/>
+            </a:endParaRPr>
+          </a:p>
+          <a:p>
+            <a:pPr marL="0" indent="0">
+              <a:lnSpc>
+                <a:spcPct val="107000"/>
+              </a:lnSpc>
+              <a:spcAft>
+                <a:spcPts val="800"/>
+              </a:spcAft>
+              <a:buNone/>
+            </a:pPr>
+            <a:r>
+              <a:rPr lang="en-US" sz="1800" dirty="0">
+                <a:solidFill>
+                  <a:srgbClr val="006A00"/>
+                </a:solidFill>
+                <a:effectLst/>
+                <a:latin typeface="Courier New" panose="02070309020205020404" pitchFamily="49" charset="0"/>
+                <a:ea typeface="Times New Roman" panose="02020603050405020304" pitchFamily="18" charset="0"/>
+                <a:cs typeface="Times New Roman" panose="02020603050405020304" pitchFamily="18" charset="0"/>
+              </a:rPr>
+              <a:t>/*</a:t>
+            </a:r>
+            <a:endParaRPr lang="it-IT" sz="1800" dirty="0">
+              <a:effectLst/>
+              <a:latin typeface="Calibri" panose="020F0502020204030204" pitchFamily="34" charset="0"/>
+              <a:ea typeface="Calibri" panose="020F0502020204030204" pitchFamily="34" charset="0"/>
+              <a:cs typeface="Times New Roman" panose="02020603050405020304" pitchFamily="18" charset="0"/>
+            </a:endParaRPr>
+          </a:p>
+          <a:p>
+            <a:pPr marL="0" indent="0">
+              <a:lnSpc>
+                <a:spcPct val="107000"/>
+              </a:lnSpc>
+              <a:spcAft>
+                <a:spcPts val="800"/>
+              </a:spcAft>
+              <a:buNone/>
+            </a:pPr>
+            <a:r>
+              <a:rPr lang="en-US" sz="1800" dirty="0">
+                <a:solidFill>
+                  <a:srgbClr val="006A00"/>
+                </a:solidFill>
+                <a:effectLst/>
+                <a:latin typeface="Courier New" panose="02070309020205020404" pitchFamily="49" charset="0"/>
+                <a:ea typeface="Times New Roman" panose="02020603050405020304" pitchFamily="18" charset="0"/>
+                <a:cs typeface="Times New Roman" panose="02020603050405020304" pitchFamily="18" charset="0"/>
+              </a:rPr>
+              <a:t> * Spinlock functions.</a:t>
+            </a:r>
+            <a:endParaRPr lang="it-IT" sz="1800" dirty="0">
+              <a:effectLst/>
+              <a:latin typeface="Calibri" panose="020F0502020204030204" pitchFamily="34" charset="0"/>
+              <a:ea typeface="Calibri" panose="020F0502020204030204" pitchFamily="34" charset="0"/>
+              <a:cs typeface="Times New Roman" panose="02020603050405020304" pitchFamily="18" charset="0"/>
+            </a:endParaRPr>
+          </a:p>
+          <a:p>
+            <a:pPr marL="0" indent="0">
+              <a:lnSpc>
+                <a:spcPct val="107000"/>
+              </a:lnSpc>
+              <a:spcAft>
+                <a:spcPts val="800"/>
+              </a:spcAft>
+              <a:buNone/>
+            </a:pPr>
+            <a:r>
+              <a:rPr lang="en-US" sz="1800" dirty="0">
+                <a:solidFill>
+                  <a:srgbClr val="006A00"/>
+                </a:solidFill>
+                <a:effectLst/>
+                <a:latin typeface="Courier New" panose="02070309020205020404" pitchFamily="49" charset="0"/>
+                <a:ea typeface="Times New Roman" panose="02020603050405020304" pitchFamily="18" charset="0"/>
+                <a:cs typeface="Times New Roman" panose="02020603050405020304" pitchFamily="18" charset="0"/>
+              </a:rPr>
+              <a:t>*/</a:t>
+            </a:r>
+            <a:endParaRPr lang="it-IT" sz="1800" dirty="0">
+              <a:effectLst/>
+              <a:latin typeface="Calibri" panose="020F0502020204030204" pitchFamily="34" charset="0"/>
+              <a:ea typeface="Calibri" panose="020F0502020204030204" pitchFamily="34" charset="0"/>
+              <a:cs typeface="Times New Roman" panose="02020603050405020304" pitchFamily="18" charset="0"/>
+            </a:endParaRPr>
+          </a:p>
+          <a:p>
+            <a:pPr marL="0" indent="0">
+              <a:lnSpc>
+                <a:spcPct val="107000"/>
+              </a:lnSpc>
+              <a:spcAft>
+                <a:spcPts val="800"/>
+              </a:spcAft>
+              <a:buNone/>
+            </a:pPr>
+            <a:r>
+              <a:rPr lang="en-US" sz="1800" dirty="0">
+                <a:solidFill>
+                  <a:srgbClr val="AA0D91"/>
+                </a:solidFill>
+                <a:effectLst/>
+                <a:latin typeface="Courier New" panose="02070309020205020404" pitchFamily="49" charset="0"/>
+                <a:ea typeface="Times New Roman" panose="02020603050405020304" pitchFamily="18" charset="0"/>
+                <a:cs typeface="Times New Roman" panose="02020603050405020304" pitchFamily="18" charset="0"/>
+              </a:rPr>
+              <a:t>void</a:t>
+            </a:r>
+            <a:r>
+              <a:rPr lang="en-US" sz="1800" dirty="0">
+                <a:solidFill>
+                  <a:srgbClr val="000000"/>
+                </a:solidFill>
+                <a:effectLst/>
+                <a:latin typeface="Courier New" panose="02070309020205020404" pitchFamily="49" charset="0"/>
+                <a:ea typeface="Times New Roman" panose="02020603050405020304" pitchFamily="18" charset="0"/>
+                <a:cs typeface="Times New Roman" panose="02020603050405020304" pitchFamily="18" charset="0"/>
+              </a:rPr>
+              <a:t> </a:t>
+            </a:r>
+            <a:r>
+              <a:rPr lang="en-US" sz="1800" dirty="0" err="1">
+                <a:solidFill>
+                  <a:srgbClr val="1C00CF"/>
+                </a:solidFill>
+                <a:effectLst/>
+                <a:latin typeface="Courier New" panose="02070309020205020404" pitchFamily="49" charset="0"/>
+                <a:ea typeface="Times New Roman" panose="02020603050405020304" pitchFamily="18" charset="0"/>
+                <a:cs typeface="Times New Roman" panose="02020603050405020304" pitchFamily="18" charset="0"/>
+              </a:rPr>
+              <a:t>spinlock_init</a:t>
+            </a:r>
+            <a:r>
+              <a:rPr lang="en-US" sz="1800" dirty="0">
+                <a:solidFill>
+                  <a:srgbClr val="5C2699"/>
+                </a:solidFill>
+                <a:effectLst/>
+                <a:latin typeface="Courier New" panose="02070309020205020404" pitchFamily="49" charset="0"/>
+                <a:ea typeface="Times New Roman" panose="02020603050405020304" pitchFamily="18" charset="0"/>
+                <a:cs typeface="Times New Roman" panose="02020603050405020304" pitchFamily="18" charset="0"/>
+              </a:rPr>
+              <a:t>(</a:t>
+            </a:r>
+            <a:r>
+              <a:rPr lang="en-US" sz="1800" dirty="0">
+                <a:solidFill>
+                  <a:srgbClr val="AA0D91"/>
+                </a:solidFill>
+                <a:effectLst/>
+                <a:latin typeface="Courier New" panose="02070309020205020404" pitchFamily="49" charset="0"/>
+                <a:ea typeface="Times New Roman" panose="02020603050405020304" pitchFamily="18" charset="0"/>
+                <a:cs typeface="Times New Roman" panose="02020603050405020304" pitchFamily="18" charset="0"/>
+              </a:rPr>
+              <a:t>struct</a:t>
+            </a:r>
+            <a:r>
+              <a:rPr lang="en-US" sz="1800" dirty="0">
+                <a:solidFill>
+                  <a:srgbClr val="5C2699"/>
+                </a:solidFill>
+                <a:effectLst/>
+                <a:latin typeface="Courier New" panose="02070309020205020404" pitchFamily="49" charset="0"/>
+                <a:ea typeface="Times New Roman" panose="02020603050405020304" pitchFamily="18" charset="0"/>
+                <a:cs typeface="Times New Roman" panose="02020603050405020304" pitchFamily="18" charset="0"/>
+              </a:rPr>
+              <a:t> spinlock *</a:t>
+            </a:r>
+            <a:r>
+              <a:rPr lang="en-US" sz="1800" dirty="0" err="1">
+                <a:solidFill>
+                  <a:srgbClr val="5C2699"/>
+                </a:solidFill>
+                <a:effectLst/>
+                <a:latin typeface="Courier New" panose="02070309020205020404" pitchFamily="49" charset="0"/>
+                <a:ea typeface="Times New Roman" panose="02020603050405020304" pitchFamily="18" charset="0"/>
+                <a:cs typeface="Times New Roman" panose="02020603050405020304" pitchFamily="18" charset="0"/>
+              </a:rPr>
+              <a:t>lk</a:t>
+            </a:r>
+            <a:r>
+              <a:rPr lang="en-US" sz="1800" dirty="0">
+                <a:solidFill>
+                  <a:srgbClr val="5C2699"/>
+                </a:solidFill>
+                <a:effectLst/>
+                <a:latin typeface="Courier New" panose="02070309020205020404" pitchFamily="49" charset="0"/>
+                <a:ea typeface="Times New Roman" panose="02020603050405020304" pitchFamily="18" charset="0"/>
+                <a:cs typeface="Times New Roman" panose="02020603050405020304" pitchFamily="18" charset="0"/>
+              </a:rPr>
+              <a:t>)</a:t>
+            </a:r>
+            <a:r>
+              <a:rPr lang="en-US" sz="1800" dirty="0">
+                <a:solidFill>
+                  <a:srgbClr val="000000"/>
+                </a:solidFill>
+                <a:effectLst/>
+                <a:latin typeface="Courier New" panose="02070309020205020404" pitchFamily="49" charset="0"/>
+                <a:ea typeface="Times New Roman" panose="02020603050405020304" pitchFamily="18" charset="0"/>
+                <a:cs typeface="Times New Roman" panose="02020603050405020304" pitchFamily="18" charset="0"/>
+              </a:rPr>
+              <a:t>; </a:t>
+            </a:r>
+            <a:r>
+              <a:rPr lang="en-US" sz="1800" dirty="0">
+                <a:solidFill>
+                  <a:srgbClr val="006A00"/>
+                </a:solidFill>
+                <a:effectLst/>
+                <a:latin typeface="Courier New" panose="02070309020205020404" pitchFamily="49" charset="0"/>
+                <a:ea typeface="Times New Roman" panose="02020603050405020304" pitchFamily="18" charset="0"/>
+                <a:cs typeface="Times New Roman" panose="02020603050405020304" pitchFamily="18" charset="0"/>
+              </a:rPr>
+              <a:t>/* Initialize the contents of a spinlock. */</a:t>
+            </a:r>
+            <a:endParaRPr lang="it-IT" sz="1800" dirty="0">
+              <a:effectLst/>
+              <a:latin typeface="Calibri" panose="020F0502020204030204" pitchFamily="34" charset="0"/>
+              <a:ea typeface="Calibri" panose="020F0502020204030204" pitchFamily="34" charset="0"/>
+              <a:cs typeface="Times New Roman" panose="02020603050405020304" pitchFamily="18" charset="0"/>
+            </a:endParaRPr>
+          </a:p>
+          <a:p>
+            <a:pPr marL="0" indent="0">
+              <a:lnSpc>
+                <a:spcPct val="107000"/>
+              </a:lnSpc>
+              <a:spcAft>
+                <a:spcPts val="800"/>
+              </a:spcAft>
+              <a:buNone/>
+            </a:pPr>
+            <a:r>
+              <a:rPr lang="en-US" sz="1800" dirty="0">
+                <a:solidFill>
+                  <a:srgbClr val="AA0D91"/>
+                </a:solidFill>
+                <a:effectLst/>
+                <a:latin typeface="Courier New" panose="02070309020205020404" pitchFamily="49" charset="0"/>
+                <a:ea typeface="Times New Roman" panose="02020603050405020304" pitchFamily="18" charset="0"/>
+                <a:cs typeface="Times New Roman" panose="02020603050405020304" pitchFamily="18" charset="0"/>
+              </a:rPr>
+              <a:t>void</a:t>
+            </a:r>
+            <a:r>
+              <a:rPr lang="en-US" sz="1800" dirty="0">
+                <a:solidFill>
+                  <a:srgbClr val="000000"/>
+                </a:solidFill>
+                <a:effectLst/>
+                <a:latin typeface="Courier New" panose="02070309020205020404" pitchFamily="49" charset="0"/>
+                <a:ea typeface="Times New Roman" panose="02020603050405020304" pitchFamily="18" charset="0"/>
+                <a:cs typeface="Times New Roman" panose="02020603050405020304" pitchFamily="18" charset="0"/>
+              </a:rPr>
+              <a:t> </a:t>
+            </a:r>
+            <a:r>
+              <a:rPr lang="en-US" sz="1800" dirty="0" err="1">
+                <a:solidFill>
+                  <a:srgbClr val="1C00CF"/>
+                </a:solidFill>
+                <a:effectLst/>
+                <a:latin typeface="Courier New" panose="02070309020205020404" pitchFamily="49" charset="0"/>
+                <a:ea typeface="Times New Roman" panose="02020603050405020304" pitchFamily="18" charset="0"/>
+                <a:cs typeface="Times New Roman" panose="02020603050405020304" pitchFamily="18" charset="0"/>
+              </a:rPr>
+              <a:t>spinlock_cleanup</a:t>
+            </a:r>
+            <a:r>
+              <a:rPr lang="en-US" sz="1800" dirty="0">
+                <a:solidFill>
+                  <a:srgbClr val="5C2699"/>
+                </a:solidFill>
+                <a:effectLst/>
+                <a:latin typeface="Courier New" panose="02070309020205020404" pitchFamily="49" charset="0"/>
+                <a:ea typeface="Times New Roman" panose="02020603050405020304" pitchFamily="18" charset="0"/>
+                <a:cs typeface="Times New Roman" panose="02020603050405020304" pitchFamily="18" charset="0"/>
+              </a:rPr>
+              <a:t>(</a:t>
+            </a:r>
+            <a:r>
+              <a:rPr lang="en-US" sz="1800" dirty="0">
+                <a:solidFill>
+                  <a:srgbClr val="AA0D91"/>
+                </a:solidFill>
+                <a:effectLst/>
+                <a:latin typeface="Courier New" panose="02070309020205020404" pitchFamily="49" charset="0"/>
+                <a:ea typeface="Times New Roman" panose="02020603050405020304" pitchFamily="18" charset="0"/>
+                <a:cs typeface="Times New Roman" panose="02020603050405020304" pitchFamily="18" charset="0"/>
+              </a:rPr>
+              <a:t>struct</a:t>
+            </a:r>
+            <a:r>
+              <a:rPr lang="en-US" sz="1800" dirty="0">
+                <a:solidFill>
+                  <a:srgbClr val="5C2699"/>
+                </a:solidFill>
+                <a:effectLst/>
+                <a:latin typeface="Courier New" panose="02070309020205020404" pitchFamily="49" charset="0"/>
+                <a:ea typeface="Times New Roman" panose="02020603050405020304" pitchFamily="18" charset="0"/>
+                <a:cs typeface="Times New Roman" panose="02020603050405020304" pitchFamily="18" charset="0"/>
+              </a:rPr>
+              <a:t> spinlock *</a:t>
+            </a:r>
+            <a:r>
+              <a:rPr lang="en-US" sz="1800" dirty="0" err="1">
+                <a:solidFill>
+                  <a:srgbClr val="5C2699"/>
+                </a:solidFill>
+                <a:effectLst/>
+                <a:latin typeface="Courier New" panose="02070309020205020404" pitchFamily="49" charset="0"/>
+                <a:ea typeface="Times New Roman" panose="02020603050405020304" pitchFamily="18" charset="0"/>
+                <a:cs typeface="Times New Roman" panose="02020603050405020304" pitchFamily="18" charset="0"/>
+              </a:rPr>
+              <a:t>lk</a:t>
+            </a:r>
+            <a:r>
+              <a:rPr lang="en-US" sz="1800" dirty="0">
+                <a:solidFill>
+                  <a:srgbClr val="5C2699"/>
+                </a:solidFill>
+                <a:effectLst/>
+                <a:latin typeface="Courier New" panose="02070309020205020404" pitchFamily="49" charset="0"/>
+                <a:ea typeface="Times New Roman" panose="02020603050405020304" pitchFamily="18" charset="0"/>
+                <a:cs typeface="Times New Roman" panose="02020603050405020304" pitchFamily="18" charset="0"/>
+              </a:rPr>
+              <a:t>)</a:t>
+            </a:r>
+            <a:r>
+              <a:rPr lang="en-US" sz="1800" dirty="0">
+                <a:solidFill>
+                  <a:srgbClr val="000000"/>
+                </a:solidFill>
+                <a:effectLst/>
+                <a:latin typeface="Courier New" panose="02070309020205020404" pitchFamily="49" charset="0"/>
+                <a:ea typeface="Times New Roman" panose="02020603050405020304" pitchFamily="18" charset="0"/>
+                <a:cs typeface="Times New Roman" panose="02020603050405020304" pitchFamily="18" charset="0"/>
+              </a:rPr>
+              <a:t>; </a:t>
+            </a:r>
+            <a:r>
+              <a:rPr lang="en-US" sz="1800" dirty="0">
+                <a:solidFill>
+                  <a:srgbClr val="006A00"/>
+                </a:solidFill>
+                <a:effectLst/>
+                <a:latin typeface="Courier New" panose="02070309020205020404" pitchFamily="49" charset="0"/>
+                <a:ea typeface="Times New Roman" panose="02020603050405020304" pitchFamily="18" charset="0"/>
+                <a:cs typeface="Times New Roman" panose="02020603050405020304" pitchFamily="18" charset="0"/>
+              </a:rPr>
+              <a:t>/* Opposite of </a:t>
+            </a:r>
+            <a:r>
+              <a:rPr lang="en-US" sz="1800" dirty="0" err="1">
+                <a:solidFill>
+                  <a:srgbClr val="006A00"/>
+                </a:solidFill>
+                <a:effectLst/>
+                <a:latin typeface="Courier New" panose="02070309020205020404" pitchFamily="49" charset="0"/>
+                <a:ea typeface="Times New Roman" panose="02020603050405020304" pitchFamily="18" charset="0"/>
+                <a:cs typeface="Times New Roman" panose="02020603050405020304" pitchFamily="18" charset="0"/>
+              </a:rPr>
+              <a:t>init.</a:t>
+            </a:r>
+            <a:r>
+              <a:rPr lang="en-US" sz="1800" dirty="0">
+                <a:solidFill>
+                  <a:srgbClr val="006A00"/>
+                </a:solidFill>
+                <a:effectLst/>
+                <a:latin typeface="Courier New" panose="02070309020205020404" pitchFamily="49" charset="0"/>
+                <a:ea typeface="Times New Roman" panose="02020603050405020304" pitchFamily="18" charset="0"/>
+                <a:cs typeface="Times New Roman" panose="02020603050405020304" pitchFamily="18" charset="0"/>
+              </a:rPr>
+              <a:t> Lock must be unlocked. */</a:t>
+            </a:r>
+            <a:endParaRPr lang="it-IT" sz="1800" dirty="0">
+              <a:effectLst/>
+              <a:latin typeface="Calibri" panose="020F0502020204030204" pitchFamily="34" charset="0"/>
+              <a:ea typeface="Calibri" panose="020F0502020204030204" pitchFamily="34" charset="0"/>
+              <a:cs typeface="Times New Roman" panose="02020603050405020304" pitchFamily="18" charset="0"/>
+            </a:endParaRPr>
+          </a:p>
+          <a:p>
+            <a:pPr marL="0" indent="0">
+              <a:lnSpc>
+                <a:spcPct val="107000"/>
+              </a:lnSpc>
+              <a:spcAft>
+                <a:spcPts val="800"/>
+              </a:spcAft>
+              <a:buNone/>
+            </a:pPr>
+            <a:r>
+              <a:rPr lang="en-US" sz="1800" dirty="0">
+                <a:solidFill>
+                  <a:srgbClr val="AA0D91"/>
+                </a:solidFill>
+                <a:effectLst/>
+                <a:latin typeface="Courier New" panose="02070309020205020404" pitchFamily="49" charset="0"/>
+                <a:ea typeface="Times New Roman" panose="02020603050405020304" pitchFamily="18" charset="0"/>
+                <a:cs typeface="Times New Roman" panose="02020603050405020304" pitchFamily="18" charset="0"/>
+              </a:rPr>
+              <a:t>void</a:t>
+            </a:r>
+            <a:r>
+              <a:rPr lang="en-US" sz="1800" dirty="0">
+                <a:solidFill>
+                  <a:srgbClr val="000000"/>
+                </a:solidFill>
+                <a:effectLst/>
+                <a:latin typeface="Courier New" panose="02070309020205020404" pitchFamily="49" charset="0"/>
+                <a:ea typeface="Times New Roman" panose="02020603050405020304" pitchFamily="18" charset="0"/>
+                <a:cs typeface="Times New Roman" panose="02020603050405020304" pitchFamily="18" charset="0"/>
+              </a:rPr>
+              <a:t> </a:t>
+            </a:r>
+            <a:r>
+              <a:rPr lang="en-US" sz="1800" dirty="0" err="1">
+                <a:solidFill>
+                  <a:srgbClr val="1C00CF"/>
+                </a:solidFill>
+                <a:effectLst/>
+                <a:latin typeface="Courier New" panose="02070309020205020404" pitchFamily="49" charset="0"/>
+                <a:ea typeface="Times New Roman" panose="02020603050405020304" pitchFamily="18" charset="0"/>
+                <a:cs typeface="Times New Roman" panose="02020603050405020304" pitchFamily="18" charset="0"/>
+              </a:rPr>
+              <a:t>spinlock_acquire</a:t>
+            </a:r>
+            <a:r>
+              <a:rPr lang="en-US" sz="1800" dirty="0">
+                <a:solidFill>
+                  <a:srgbClr val="5C2699"/>
+                </a:solidFill>
+                <a:effectLst/>
+                <a:latin typeface="Courier New" panose="02070309020205020404" pitchFamily="49" charset="0"/>
+                <a:ea typeface="Times New Roman" panose="02020603050405020304" pitchFamily="18" charset="0"/>
+                <a:cs typeface="Times New Roman" panose="02020603050405020304" pitchFamily="18" charset="0"/>
+              </a:rPr>
+              <a:t>(</a:t>
+            </a:r>
+            <a:r>
+              <a:rPr lang="en-US" sz="1800" dirty="0">
+                <a:solidFill>
+                  <a:srgbClr val="AA0D91"/>
+                </a:solidFill>
+                <a:effectLst/>
+                <a:latin typeface="Courier New" panose="02070309020205020404" pitchFamily="49" charset="0"/>
+                <a:ea typeface="Times New Roman" panose="02020603050405020304" pitchFamily="18" charset="0"/>
+                <a:cs typeface="Times New Roman" panose="02020603050405020304" pitchFamily="18" charset="0"/>
+              </a:rPr>
+              <a:t>struct</a:t>
+            </a:r>
+            <a:r>
+              <a:rPr lang="en-US" sz="1800" dirty="0">
+                <a:solidFill>
+                  <a:srgbClr val="5C2699"/>
+                </a:solidFill>
+                <a:effectLst/>
+                <a:latin typeface="Courier New" panose="02070309020205020404" pitchFamily="49" charset="0"/>
+                <a:ea typeface="Times New Roman" panose="02020603050405020304" pitchFamily="18" charset="0"/>
+                <a:cs typeface="Times New Roman" panose="02020603050405020304" pitchFamily="18" charset="0"/>
+              </a:rPr>
+              <a:t> spinlock *</a:t>
+            </a:r>
+            <a:r>
+              <a:rPr lang="en-US" sz="1800" dirty="0" err="1">
+                <a:solidFill>
+                  <a:srgbClr val="5C2699"/>
+                </a:solidFill>
+                <a:effectLst/>
+                <a:latin typeface="Courier New" panose="02070309020205020404" pitchFamily="49" charset="0"/>
+                <a:ea typeface="Times New Roman" panose="02020603050405020304" pitchFamily="18" charset="0"/>
+                <a:cs typeface="Times New Roman" panose="02020603050405020304" pitchFamily="18" charset="0"/>
+              </a:rPr>
+              <a:t>lk</a:t>
+            </a:r>
+            <a:r>
+              <a:rPr lang="en-US" sz="1800" dirty="0">
+                <a:solidFill>
+                  <a:srgbClr val="5C2699"/>
+                </a:solidFill>
+                <a:effectLst/>
+                <a:latin typeface="Courier New" panose="02070309020205020404" pitchFamily="49" charset="0"/>
+                <a:ea typeface="Times New Roman" panose="02020603050405020304" pitchFamily="18" charset="0"/>
+                <a:cs typeface="Times New Roman" panose="02020603050405020304" pitchFamily="18" charset="0"/>
+              </a:rPr>
+              <a:t>)</a:t>
+            </a:r>
+            <a:r>
+              <a:rPr lang="en-US" sz="1800" dirty="0">
+                <a:solidFill>
+                  <a:srgbClr val="000000"/>
+                </a:solidFill>
+                <a:effectLst/>
+                <a:latin typeface="Courier New" panose="02070309020205020404" pitchFamily="49" charset="0"/>
+                <a:ea typeface="Times New Roman" panose="02020603050405020304" pitchFamily="18" charset="0"/>
+                <a:cs typeface="Times New Roman" panose="02020603050405020304" pitchFamily="18" charset="0"/>
+              </a:rPr>
+              <a:t>; </a:t>
+            </a:r>
+            <a:r>
+              <a:rPr lang="en-US" sz="1800" dirty="0">
+                <a:solidFill>
+                  <a:srgbClr val="006A00"/>
+                </a:solidFill>
+                <a:effectLst/>
+                <a:latin typeface="Courier New" panose="02070309020205020404" pitchFamily="49" charset="0"/>
+                <a:ea typeface="Times New Roman" panose="02020603050405020304" pitchFamily="18" charset="0"/>
+                <a:cs typeface="Times New Roman" panose="02020603050405020304" pitchFamily="18" charset="0"/>
+              </a:rPr>
+              <a:t>/* Get the lock, spinning as necessary. Also disables interrupts. */</a:t>
+            </a:r>
+            <a:endParaRPr lang="it-IT" sz="1800" dirty="0">
+              <a:effectLst/>
+              <a:latin typeface="Calibri" panose="020F0502020204030204" pitchFamily="34" charset="0"/>
+              <a:ea typeface="Calibri" panose="020F0502020204030204" pitchFamily="34" charset="0"/>
+              <a:cs typeface="Times New Roman" panose="02020603050405020304" pitchFamily="18" charset="0"/>
+            </a:endParaRPr>
+          </a:p>
+          <a:p>
+            <a:pPr marL="0" indent="0">
+              <a:lnSpc>
+                <a:spcPct val="107000"/>
+              </a:lnSpc>
+              <a:spcAft>
+                <a:spcPts val="800"/>
+              </a:spcAft>
+              <a:buNone/>
+            </a:pPr>
+            <a:r>
+              <a:rPr lang="en-US" sz="1800" dirty="0">
+                <a:solidFill>
+                  <a:srgbClr val="AA0D91"/>
+                </a:solidFill>
+                <a:effectLst/>
+                <a:latin typeface="Courier New" panose="02070309020205020404" pitchFamily="49" charset="0"/>
+                <a:ea typeface="Times New Roman" panose="02020603050405020304" pitchFamily="18" charset="0"/>
+                <a:cs typeface="Times New Roman" panose="02020603050405020304" pitchFamily="18" charset="0"/>
+              </a:rPr>
+              <a:t>void</a:t>
+            </a:r>
+            <a:r>
+              <a:rPr lang="en-US" sz="1800" dirty="0">
+                <a:solidFill>
+                  <a:srgbClr val="000000"/>
+                </a:solidFill>
+                <a:effectLst/>
+                <a:latin typeface="Courier New" panose="02070309020205020404" pitchFamily="49" charset="0"/>
+                <a:ea typeface="Times New Roman" panose="02020603050405020304" pitchFamily="18" charset="0"/>
+                <a:cs typeface="Times New Roman" panose="02020603050405020304" pitchFamily="18" charset="0"/>
+              </a:rPr>
+              <a:t> </a:t>
+            </a:r>
+            <a:r>
+              <a:rPr lang="en-US" sz="1800" dirty="0" err="1">
+                <a:solidFill>
+                  <a:srgbClr val="1C00CF"/>
+                </a:solidFill>
+                <a:effectLst/>
+                <a:latin typeface="Courier New" panose="02070309020205020404" pitchFamily="49" charset="0"/>
+                <a:ea typeface="Times New Roman" panose="02020603050405020304" pitchFamily="18" charset="0"/>
+                <a:cs typeface="Times New Roman" panose="02020603050405020304" pitchFamily="18" charset="0"/>
+              </a:rPr>
+              <a:t>spinlock_release</a:t>
+            </a:r>
+            <a:r>
+              <a:rPr lang="en-US" sz="1800" dirty="0">
+                <a:solidFill>
+                  <a:srgbClr val="5C2699"/>
+                </a:solidFill>
+                <a:effectLst/>
+                <a:latin typeface="Courier New" panose="02070309020205020404" pitchFamily="49" charset="0"/>
+                <a:ea typeface="Times New Roman" panose="02020603050405020304" pitchFamily="18" charset="0"/>
+                <a:cs typeface="Times New Roman" panose="02020603050405020304" pitchFamily="18" charset="0"/>
+              </a:rPr>
+              <a:t>(</a:t>
+            </a:r>
+            <a:r>
+              <a:rPr lang="en-US" sz="1800" dirty="0">
+                <a:solidFill>
+                  <a:srgbClr val="AA0D91"/>
+                </a:solidFill>
+                <a:effectLst/>
+                <a:latin typeface="Courier New" panose="02070309020205020404" pitchFamily="49" charset="0"/>
+                <a:ea typeface="Times New Roman" panose="02020603050405020304" pitchFamily="18" charset="0"/>
+                <a:cs typeface="Times New Roman" panose="02020603050405020304" pitchFamily="18" charset="0"/>
+              </a:rPr>
+              <a:t>struct</a:t>
+            </a:r>
+            <a:r>
+              <a:rPr lang="en-US" sz="1800" dirty="0">
+                <a:solidFill>
+                  <a:srgbClr val="5C2699"/>
+                </a:solidFill>
+                <a:effectLst/>
+                <a:latin typeface="Courier New" panose="02070309020205020404" pitchFamily="49" charset="0"/>
+                <a:ea typeface="Times New Roman" panose="02020603050405020304" pitchFamily="18" charset="0"/>
+                <a:cs typeface="Times New Roman" panose="02020603050405020304" pitchFamily="18" charset="0"/>
+              </a:rPr>
+              <a:t> spinlock *</a:t>
+            </a:r>
+            <a:r>
+              <a:rPr lang="en-US" sz="1800" dirty="0" err="1">
+                <a:solidFill>
+                  <a:srgbClr val="5C2699"/>
+                </a:solidFill>
+                <a:effectLst/>
+                <a:latin typeface="Courier New" panose="02070309020205020404" pitchFamily="49" charset="0"/>
+                <a:ea typeface="Times New Roman" panose="02020603050405020304" pitchFamily="18" charset="0"/>
+                <a:cs typeface="Times New Roman" panose="02020603050405020304" pitchFamily="18" charset="0"/>
+              </a:rPr>
+              <a:t>lk</a:t>
+            </a:r>
+            <a:r>
+              <a:rPr lang="en-US" sz="1800" dirty="0">
+                <a:solidFill>
+                  <a:srgbClr val="5C2699"/>
+                </a:solidFill>
+                <a:effectLst/>
+                <a:latin typeface="Courier New" panose="02070309020205020404" pitchFamily="49" charset="0"/>
+                <a:ea typeface="Times New Roman" panose="02020603050405020304" pitchFamily="18" charset="0"/>
+                <a:cs typeface="Times New Roman" panose="02020603050405020304" pitchFamily="18" charset="0"/>
+              </a:rPr>
+              <a:t>)</a:t>
+            </a:r>
+            <a:r>
+              <a:rPr lang="en-US" sz="1800" dirty="0">
+                <a:solidFill>
+                  <a:srgbClr val="000000"/>
+                </a:solidFill>
+                <a:effectLst/>
+                <a:latin typeface="Courier New" panose="02070309020205020404" pitchFamily="49" charset="0"/>
+                <a:ea typeface="Times New Roman" panose="02020603050405020304" pitchFamily="18" charset="0"/>
+                <a:cs typeface="Times New Roman" panose="02020603050405020304" pitchFamily="18" charset="0"/>
+              </a:rPr>
+              <a:t>; </a:t>
+            </a:r>
+            <a:r>
+              <a:rPr lang="en-US" sz="1800" dirty="0">
+                <a:solidFill>
+                  <a:srgbClr val="006A00"/>
+                </a:solidFill>
+                <a:effectLst/>
+                <a:latin typeface="Courier New" panose="02070309020205020404" pitchFamily="49" charset="0"/>
+                <a:ea typeface="Times New Roman" panose="02020603050405020304" pitchFamily="18" charset="0"/>
+                <a:cs typeface="Times New Roman" panose="02020603050405020304" pitchFamily="18" charset="0"/>
+              </a:rPr>
+              <a:t>/* Release the lock. May re-enable interrupts. */</a:t>
+            </a:r>
+            <a:endParaRPr lang="it-IT" sz="1800" dirty="0">
+              <a:effectLst/>
+              <a:latin typeface="Calibri" panose="020F0502020204030204" pitchFamily="34" charset="0"/>
+              <a:ea typeface="Calibri" panose="020F0502020204030204" pitchFamily="34" charset="0"/>
+              <a:cs typeface="Times New Roman" panose="02020603050405020304" pitchFamily="18" charset="0"/>
+            </a:endParaRPr>
+          </a:p>
+          <a:p>
+            <a:pPr marL="0" indent="0">
+              <a:lnSpc>
+                <a:spcPct val="107000"/>
+              </a:lnSpc>
+              <a:spcAft>
+                <a:spcPts val="800"/>
+              </a:spcAft>
+              <a:buNone/>
+            </a:pPr>
+            <a:r>
+              <a:rPr lang="en-US" sz="1800" dirty="0">
+                <a:solidFill>
+                  <a:srgbClr val="AA0D91"/>
+                </a:solidFill>
+                <a:effectLst/>
+                <a:latin typeface="Courier New" panose="02070309020205020404" pitchFamily="49" charset="0"/>
+                <a:ea typeface="Times New Roman" panose="02020603050405020304" pitchFamily="18" charset="0"/>
+                <a:cs typeface="Times New Roman" panose="02020603050405020304" pitchFamily="18" charset="0"/>
+              </a:rPr>
+              <a:t>bool</a:t>
+            </a:r>
+            <a:r>
+              <a:rPr lang="en-US" sz="1800" dirty="0">
+                <a:solidFill>
+                  <a:srgbClr val="000000"/>
+                </a:solidFill>
+                <a:effectLst/>
+                <a:latin typeface="Courier New" panose="02070309020205020404" pitchFamily="49" charset="0"/>
+                <a:ea typeface="Times New Roman" panose="02020603050405020304" pitchFamily="18" charset="0"/>
+                <a:cs typeface="Times New Roman" panose="02020603050405020304" pitchFamily="18" charset="0"/>
+              </a:rPr>
+              <a:t> </a:t>
+            </a:r>
+            <a:r>
+              <a:rPr lang="en-US" sz="1800" dirty="0" err="1">
+                <a:solidFill>
+                  <a:srgbClr val="1C00CF"/>
+                </a:solidFill>
+                <a:effectLst/>
+                <a:latin typeface="Courier New" panose="02070309020205020404" pitchFamily="49" charset="0"/>
+                <a:ea typeface="Times New Roman" panose="02020603050405020304" pitchFamily="18" charset="0"/>
+                <a:cs typeface="Times New Roman" panose="02020603050405020304" pitchFamily="18" charset="0"/>
+              </a:rPr>
+              <a:t>spinlock_do_i_hold</a:t>
+            </a:r>
+            <a:r>
+              <a:rPr lang="en-US" sz="1800" dirty="0">
+                <a:solidFill>
+                  <a:srgbClr val="5C2699"/>
+                </a:solidFill>
+                <a:effectLst/>
+                <a:latin typeface="Courier New" panose="02070309020205020404" pitchFamily="49" charset="0"/>
+                <a:ea typeface="Times New Roman" panose="02020603050405020304" pitchFamily="18" charset="0"/>
+                <a:cs typeface="Times New Roman" panose="02020603050405020304" pitchFamily="18" charset="0"/>
+              </a:rPr>
+              <a:t>(</a:t>
+            </a:r>
+            <a:r>
+              <a:rPr lang="en-US" sz="1800" dirty="0">
+                <a:solidFill>
+                  <a:srgbClr val="AA0D91"/>
+                </a:solidFill>
+                <a:effectLst/>
+                <a:latin typeface="Courier New" panose="02070309020205020404" pitchFamily="49" charset="0"/>
+                <a:ea typeface="Times New Roman" panose="02020603050405020304" pitchFamily="18" charset="0"/>
+                <a:cs typeface="Times New Roman" panose="02020603050405020304" pitchFamily="18" charset="0"/>
+              </a:rPr>
+              <a:t>struct</a:t>
+            </a:r>
+            <a:r>
+              <a:rPr lang="en-US" sz="1800" dirty="0">
+                <a:solidFill>
+                  <a:srgbClr val="5C2699"/>
+                </a:solidFill>
+                <a:effectLst/>
+                <a:latin typeface="Courier New" panose="02070309020205020404" pitchFamily="49" charset="0"/>
+                <a:ea typeface="Times New Roman" panose="02020603050405020304" pitchFamily="18" charset="0"/>
+                <a:cs typeface="Times New Roman" panose="02020603050405020304" pitchFamily="18" charset="0"/>
+              </a:rPr>
+              <a:t> spinlock *</a:t>
+            </a:r>
+            <a:r>
+              <a:rPr lang="en-US" sz="1800" dirty="0" err="1">
+                <a:solidFill>
+                  <a:srgbClr val="5C2699"/>
+                </a:solidFill>
+                <a:effectLst/>
+                <a:latin typeface="Courier New" panose="02070309020205020404" pitchFamily="49" charset="0"/>
+                <a:ea typeface="Times New Roman" panose="02020603050405020304" pitchFamily="18" charset="0"/>
+                <a:cs typeface="Times New Roman" panose="02020603050405020304" pitchFamily="18" charset="0"/>
+              </a:rPr>
+              <a:t>lk</a:t>
+            </a:r>
+            <a:r>
+              <a:rPr lang="en-US" sz="1800" dirty="0">
+                <a:solidFill>
+                  <a:srgbClr val="5C2699"/>
+                </a:solidFill>
+                <a:effectLst/>
+                <a:latin typeface="Courier New" panose="02070309020205020404" pitchFamily="49" charset="0"/>
+                <a:ea typeface="Times New Roman" panose="02020603050405020304" pitchFamily="18" charset="0"/>
+                <a:cs typeface="Times New Roman" panose="02020603050405020304" pitchFamily="18" charset="0"/>
+              </a:rPr>
+              <a:t>)</a:t>
+            </a:r>
+            <a:r>
+              <a:rPr lang="en-US" sz="1800" dirty="0">
+                <a:solidFill>
+                  <a:srgbClr val="000000"/>
+                </a:solidFill>
+                <a:effectLst/>
+                <a:latin typeface="Courier New" panose="02070309020205020404" pitchFamily="49" charset="0"/>
+                <a:ea typeface="Times New Roman" panose="02020603050405020304" pitchFamily="18" charset="0"/>
+                <a:cs typeface="Times New Roman" panose="02020603050405020304" pitchFamily="18" charset="0"/>
+              </a:rPr>
+              <a:t>; </a:t>
+            </a:r>
+            <a:r>
+              <a:rPr lang="en-US" sz="1800" dirty="0">
+                <a:solidFill>
+                  <a:srgbClr val="006A00"/>
+                </a:solidFill>
+                <a:effectLst/>
+                <a:latin typeface="Courier New" panose="02070309020205020404" pitchFamily="49" charset="0"/>
+                <a:ea typeface="Times New Roman" panose="02020603050405020304" pitchFamily="18" charset="0"/>
+                <a:cs typeface="Times New Roman" panose="02020603050405020304" pitchFamily="18" charset="0"/>
+              </a:rPr>
+              <a:t>/*Check if the current CPU holds the lock. */</a:t>
+            </a:r>
+            <a:endParaRPr lang="it-IT" sz="1800" dirty="0">
+              <a:effectLst/>
+              <a:latin typeface="Calibri" panose="020F0502020204030204" pitchFamily="34" charset="0"/>
+              <a:ea typeface="Calibri" panose="020F0502020204030204" pitchFamily="34" charset="0"/>
+              <a:cs typeface="Times New Roman" panose="02020603050405020304" pitchFamily="18" charset="0"/>
+            </a:endParaRPr>
+          </a:p>
+          <a:p>
+            <a:pPr marL="0" indent="0">
+              <a:lnSpc>
+                <a:spcPct val="107000"/>
+              </a:lnSpc>
+              <a:spcAft>
+                <a:spcPts val="800"/>
+              </a:spcAft>
+              <a:buNone/>
+            </a:pPr>
+            <a:endParaRPr lang="it-IT" sz="1800" dirty="0">
+              <a:effectLst/>
+              <a:latin typeface="Calibri" panose="020F0502020204030204" pitchFamily="34" charset="0"/>
+              <a:ea typeface="Calibri" panose="020F0502020204030204" pitchFamily="34" charset="0"/>
+              <a:cs typeface="Times New Roman" panose="02020603050405020304" pitchFamily="18" charset="0"/>
+            </a:endParaRPr>
           </a:p>
         </p:txBody>
       </p:sp>
     </p:spTree>
     <p:extLst>
       <p:ext uri="{BB962C8B-B14F-4D97-AF65-F5344CB8AC3E}">
-        <p14:creationId xmlns:p14="http://schemas.microsoft.com/office/powerpoint/2010/main" val="3980170520"/>
+        <p14:creationId xmlns:p14="http://schemas.microsoft.com/office/powerpoint/2010/main" val="3698987389"/>
       </p:ext>
     </p:extLst>
   </p:cSld>

</xml_diff>

<commit_message>
Modifiche in scheduling e finito ppt
</commit_message>
<xml_diff>
--- a/Progetto_SO.pptx
+++ b/Progetto_SO.pptx
@@ -13,12 +13,13 @@
     <p:sldId id="271" r:id="rId7"/>
     <p:sldId id="285" r:id="rId8"/>
     <p:sldId id="269" r:id="rId9"/>
-    <p:sldId id="286" r:id="rId10"/>
-    <p:sldId id="279" r:id="rId11"/>
-    <p:sldId id="287" r:id="rId12"/>
-    <p:sldId id="288" r:id="rId13"/>
-    <p:sldId id="289" r:id="rId14"/>
-    <p:sldId id="284" r:id="rId15"/>
+    <p:sldId id="290" r:id="rId10"/>
+    <p:sldId id="286" r:id="rId11"/>
+    <p:sldId id="279" r:id="rId12"/>
+    <p:sldId id="287" r:id="rId13"/>
+    <p:sldId id="288" r:id="rId14"/>
+    <p:sldId id="289" r:id="rId15"/>
+    <p:sldId id="284" r:id="rId16"/>
   </p:sldIdLst>
   <p:sldSz cx="12192000" cy="6858000"/>
   <p:notesSz cx="6858000" cy="9144000"/>
@@ -6558,7 +6559,7 @@
           <a:p>
             <a:fld id="{F259A98E-7D3E-4BAE-A284-2CE0D83E33BF}" type="datetimeFigureOut">
               <a:rPr lang="it-IT" smtClean="0"/>
-              <a:t>05/01/2024</a:t>
+              <a:t>07/01/2024</a:t>
             </a:fld>
             <a:endParaRPr lang="it-IT"/>
           </a:p>
@@ -6820,7 +6821,7 @@
           <a:p>
             <a:fld id="{F259A98E-7D3E-4BAE-A284-2CE0D83E33BF}" type="datetimeFigureOut">
               <a:rPr lang="it-IT" smtClean="0"/>
-              <a:t>05/01/2024</a:t>
+              <a:t>07/01/2024</a:t>
             </a:fld>
             <a:endParaRPr lang="it-IT"/>
           </a:p>
@@ -7055,7 +7056,7 @@
           <a:p>
             <a:fld id="{F259A98E-7D3E-4BAE-A284-2CE0D83E33BF}" type="datetimeFigureOut">
               <a:rPr lang="it-IT" smtClean="0"/>
-              <a:t>05/01/2024</a:t>
+              <a:t>07/01/2024</a:t>
             </a:fld>
             <a:endParaRPr lang="it-IT"/>
           </a:p>
@@ -7295,7 +7296,7 @@
           <a:p>
             <a:fld id="{F259A98E-7D3E-4BAE-A284-2CE0D83E33BF}" type="datetimeFigureOut">
               <a:rPr lang="it-IT" smtClean="0"/>
-              <a:t>05/01/2024</a:t>
+              <a:t>07/01/2024</a:t>
             </a:fld>
             <a:endParaRPr lang="it-IT"/>
           </a:p>
@@ -7602,7 +7603,7 @@
           <a:p>
             <a:fld id="{F259A98E-7D3E-4BAE-A284-2CE0D83E33BF}" type="datetimeFigureOut">
               <a:rPr lang="it-IT" smtClean="0"/>
-              <a:t>05/01/2024</a:t>
+              <a:t>07/01/2024</a:t>
             </a:fld>
             <a:endParaRPr lang="it-IT"/>
           </a:p>
@@ -7904,7 +7905,7 @@
           <a:p>
             <a:fld id="{F259A98E-7D3E-4BAE-A284-2CE0D83E33BF}" type="datetimeFigureOut">
               <a:rPr lang="it-IT" smtClean="0"/>
-              <a:t>05/01/2024</a:t>
+              <a:t>07/01/2024</a:t>
             </a:fld>
             <a:endParaRPr lang="it-IT"/>
           </a:p>
@@ -8326,7 +8327,7 @@
           <a:p>
             <a:fld id="{F259A98E-7D3E-4BAE-A284-2CE0D83E33BF}" type="datetimeFigureOut">
               <a:rPr lang="it-IT" smtClean="0"/>
-              <a:t>05/01/2024</a:t>
+              <a:t>07/01/2024</a:t>
             </a:fld>
             <a:endParaRPr lang="it-IT"/>
           </a:p>
@@ -8421,7 +8422,7 @@
           <a:p>
             <a:fld id="{F259A98E-7D3E-4BAE-A284-2CE0D83E33BF}" type="datetimeFigureOut">
               <a:rPr lang="it-IT" smtClean="0"/>
-              <a:t>05/01/2024</a:t>
+              <a:t>07/01/2024</a:t>
             </a:fld>
             <a:endParaRPr lang="it-IT"/>
           </a:p>
@@ -8583,7 +8584,7 @@
           <a:p>
             <a:fld id="{F259A98E-7D3E-4BAE-A284-2CE0D83E33BF}" type="datetimeFigureOut">
               <a:rPr lang="it-IT" smtClean="0"/>
-              <a:t>05/01/2024</a:t>
+              <a:t>07/01/2024</a:t>
             </a:fld>
             <a:endParaRPr lang="it-IT"/>
           </a:p>
@@ -8961,7 +8962,7 @@
           <a:p>
             <a:fld id="{F259A98E-7D3E-4BAE-A284-2CE0D83E33BF}" type="datetimeFigureOut">
               <a:rPr lang="it-IT" smtClean="0"/>
-              <a:t>05/01/2024</a:t>
+              <a:t>07/01/2024</a:t>
             </a:fld>
             <a:endParaRPr lang="it-IT"/>
           </a:p>
@@ -9250,7 +9251,7 @@
           <a:p>
             <a:fld id="{F259A98E-7D3E-4BAE-A284-2CE0D83E33BF}" type="datetimeFigureOut">
               <a:rPr lang="it-IT" smtClean="0"/>
-              <a:t>05/01/2024</a:t>
+              <a:t>07/01/2024</a:t>
             </a:fld>
             <a:endParaRPr lang="it-IT"/>
           </a:p>
@@ -9461,7 +9462,7 @@
           <a:p>
             <a:fld id="{F259A98E-7D3E-4BAE-A284-2CE0D83E33BF}" type="datetimeFigureOut">
               <a:rPr lang="it-IT" smtClean="0"/>
-              <a:t>05/01/2024</a:t>
+              <a:t>07/01/2024</a:t>
             </a:fld>
             <a:endParaRPr lang="it-IT"/>
           </a:p>
@@ -10222,7 +10223,7 @@
           <p:cNvPr id="2" name="Titolo 1">
             <a:extLst>
               <a:ext uri="{FF2B5EF4-FFF2-40B4-BE49-F238E27FC236}">
-                <a16:creationId xmlns:a16="http://schemas.microsoft.com/office/drawing/2014/main" id="{69441F67-1949-8EC8-EB98-85670AC3670C}"/>
+                <a16:creationId xmlns:a16="http://schemas.microsoft.com/office/drawing/2014/main" id="{A8407669-AD4A-530A-308F-4AD673D020A5}"/>
               </a:ext>
             </a:extLst>
           </p:cNvPr>
@@ -10235,22 +10236,28 @@
         </p:nvSpPr>
         <p:spPr/>
         <p:txBody>
-          <a:bodyPr>
-            <a:normAutofit/>
-          </a:bodyPr>
+          <a:bodyPr/>
           <a:lstStyle/>
           <a:p>
             <a:r>
+              <a:rPr lang="it-IT" dirty="0" err="1"/>
+              <a:t>Paging</a:t>
+            </a:r>
+            <a:r>
               <a:rPr lang="it-IT" dirty="0"/>
-              <a:t>Meccanismi di sincronizzazione </a:t>
-            </a:r>
-            <a:r>
-              <a:rPr lang="it-IT" sz="1600" dirty="0"/>
-              <a:t>– Interrupt </a:t>
-            </a:r>
-            <a:r>
-              <a:rPr lang="it-IT" sz="1600" dirty="0" err="1"/>
-              <a:t>disable</a:t>
+              <a:t> e  </a:t>
+            </a:r>
+            <a:r>
+              <a:rPr lang="it-IT" dirty="0" err="1"/>
+              <a:t>virtual</a:t>
+            </a:r>
+            <a:r>
+              <a:rPr lang="it-IT" dirty="0"/>
+              <a:t> </a:t>
+            </a:r>
+            <a:r>
+              <a:rPr lang="it-IT" dirty="0" err="1"/>
+              <a:t>memory</a:t>
             </a:r>
             <a:endParaRPr lang="it-IT" dirty="0"/>
           </a:p>
@@ -10258,10 +10265,10 @@
       </p:sp>
       <p:sp>
         <p:nvSpPr>
-          <p:cNvPr id="4" name="Segnaposto testo 3">
+          <p:cNvPr id="3" name="Segnaposto contenuto 2">
             <a:extLst>
               <a:ext uri="{FF2B5EF4-FFF2-40B4-BE49-F238E27FC236}">
-                <a16:creationId xmlns:a16="http://schemas.microsoft.com/office/drawing/2014/main" id="{3484543A-BB31-0207-182F-1F1C206F0C68}"/>
+                <a16:creationId xmlns:a16="http://schemas.microsoft.com/office/drawing/2014/main" id="{81551D5C-43AF-6C06-2D96-A6CA08117673}"/>
               </a:ext>
             </a:extLst>
           </p:cNvPr>
@@ -10269,536 +10276,83 @@
             <a:spLocks noGrp="1"/>
           </p:cNvSpPr>
           <p:nvPr>
-            <p:ph type="body" idx="1"/>
+            <p:ph idx="1"/>
           </p:nvPr>
         </p:nvSpPr>
-        <p:spPr>
-          <a:xfrm>
-            <a:off x="887219" y="2913503"/>
-            <a:ext cx="5087075" cy="536005"/>
-          </a:xfrm>
-        </p:spPr>
-        <p:txBody>
-          <a:bodyPr/>
-          <a:lstStyle/>
-          <a:p>
-            <a:r>
-              <a:rPr lang="it-IT" dirty="0"/>
-              <a:t>OS161</a:t>
-            </a:r>
-          </a:p>
-        </p:txBody>
-      </p:sp>
-      <p:sp>
-        <p:nvSpPr>
-          <p:cNvPr id="8" name="Segnaposto contenuto 7">
-            <a:extLst>
-              <a:ext uri="{FF2B5EF4-FFF2-40B4-BE49-F238E27FC236}">
-                <a16:creationId xmlns:a16="http://schemas.microsoft.com/office/drawing/2014/main" id="{A1E5DF89-94E7-98C4-F563-B3A43317A1CE}"/>
-              </a:ext>
-            </a:extLst>
-          </p:cNvPr>
-          <p:cNvSpPr>
-            <a:spLocks noGrp="1"/>
-          </p:cNvSpPr>
-          <p:nvPr>
-            <p:ph sz="half" idx="2"/>
-          </p:nvPr>
-        </p:nvSpPr>
-        <p:spPr>
-          <a:xfrm>
-            <a:off x="581194" y="3588663"/>
-            <a:ext cx="5393100" cy="2934999"/>
-          </a:xfrm>
-        </p:spPr>
+        <p:spPr/>
         <p:txBody>
           <a:bodyPr>
-            <a:normAutofit lnSpcReduction="10000"/>
+            <a:normAutofit/>
           </a:bodyPr>
           <a:lstStyle/>
           <a:p>
             <a:r>
               <a:rPr lang="it-IT" dirty="0"/>
-              <a:t>Dà la possibilità di modificare la priorità degli interrupt e di abilitarli/disabilitarli</a:t>
-            </a:r>
-          </a:p>
-          <a:p>
-            <a:r>
-              <a:rPr lang="it-IT" b="1" dirty="0"/>
-              <a:t>spl0</a:t>
-            </a:r>
+              <a:t>La gestione della memoria virtuale è simile in entrambi i SO</a:t>
+            </a:r>
+          </a:p>
+          <a:p>
+            <a:pPr lvl="1"/>
             <a:r>
               <a:rPr lang="it-IT" dirty="0"/>
-              <a:t>() </a:t>
-            </a:r>
-            <a:r>
-              <a:rPr lang="it-IT" dirty="0">
-                <a:sym typeface="Wingdings" panose="05000000000000000000" pitchFamily="2" charset="2"/>
-              </a:rPr>
-              <a:t> </a:t>
-            </a:r>
-            <a:r>
-              <a:rPr lang="it-IT" altLang="it-IT" dirty="0"/>
-              <a:t>imposta IPL su 0, abilitando tutti gli interrupt </a:t>
+              <a:t>Uso della paginazione, perciò della Page </a:t>
+            </a:r>
+            <a:r>
+              <a:rPr lang="it-IT" dirty="0" err="1"/>
+              <a:t>Table</a:t>
             </a:r>
             <a:endParaRPr lang="it-IT" dirty="0"/>
           </a:p>
           <a:p>
-            <a:r>
-              <a:rPr lang="it-IT" b="1" dirty="0" err="1"/>
-              <a:t>splhigh</a:t>
-            </a:r>
+            <a:pPr lvl="1"/>
             <a:r>
               <a:rPr lang="it-IT" dirty="0"/>
-              <a:t>() </a:t>
-            </a:r>
-            <a:r>
-              <a:rPr lang="it-IT" dirty="0">
-                <a:sym typeface="Wingdings" panose="05000000000000000000" pitchFamily="2" charset="2"/>
-              </a:rPr>
-              <a:t> i</a:t>
-            </a:r>
-            <a:r>
-              <a:rPr lang="it-IT" altLang="it-IT" dirty="0"/>
-              <a:t>mposta IPL al valore più alto, disabilitando tutti gli interrupt. </a:t>
+              <a:t>Gestione similare della Frame </a:t>
+            </a:r>
+            <a:r>
+              <a:rPr lang="it-IT" dirty="0" err="1"/>
+              <a:t>Table</a:t>
             </a:r>
             <a:endParaRPr lang="it-IT" dirty="0"/>
           </a:p>
           <a:p>
-            <a:r>
-              <a:rPr lang="it-IT" b="1" dirty="0" err="1"/>
-              <a:t>splx</a:t>
-            </a:r>
+            <a:pPr lvl="1"/>
             <a:r>
               <a:rPr lang="it-IT" dirty="0"/>
-              <a:t>(S) </a:t>
-            </a:r>
-            <a:r>
-              <a:rPr lang="it-IT" dirty="0">
-                <a:sym typeface="Wingdings" panose="05000000000000000000" pitchFamily="2" charset="2"/>
-              </a:rPr>
-              <a:t> imposta IPL al valore S, abilitando lo stato rappresentato da S</a:t>
-            </a:r>
-          </a:p>
-          <a:p>
-            <a:r>
-              <a:rPr lang="it-IT" sz="1400" i="1" dirty="0" err="1">
-                <a:sym typeface="Wingdings" panose="05000000000000000000" pitchFamily="2" charset="2"/>
-              </a:rPr>
-              <a:t>kern</a:t>
-            </a:r>
-            <a:r>
-              <a:rPr lang="it-IT" sz="1400" i="1" dirty="0">
-                <a:sym typeface="Wingdings" panose="05000000000000000000" pitchFamily="2" charset="2"/>
-              </a:rPr>
-              <a:t>/include/</a:t>
-            </a:r>
-            <a:r>
-              <a:rPr lang="it-IT" sz="1400" i="1" dirty="0" err="1">
-                <a:sym typeface="Wingdings" panose="05000000000000000000" pitchFamily="2" charset="2"/>
-              </a:rPr>
-              <a:t>spl.h</a:t>
-            </a:r>
-            <a:endParaRPr lang="it-IT" sz="1400" i="1" dirty="0"/>
-          </a:p>
-          <a:p>
-            <a:endParaRPr lang="it-IT" dirty="0"/>
-          </a:p>
-        </p:txBody>
-      </p:sp>
-      <p:sp>
-        <p:nvSpPr>
-          <p:cNvPr id="9" name="Segnaposto testo 8">
-            <a:extLst>
-              <a:ext uri="{FF2B5EF4-FFF2-40B4-BE49-F238E27FC236}">
-                <a16:creationId xmlns:a16="http://schemas.microsoft.com/office/drawing/2014/main" id="{00842FCF-9A2A-27B3-4ED6-BB0713CE4444}"/>
-              </a:ext>
-            </a:extLst>
-          </p:cNvPr>
-          <p:cNvSpPr>
-            <a:spLocks noGrp="1"/>
-          </p:cNvSpPr>
-          <p:nvPr>
-            <p:ph type="body" sz="quarter" idx="3"/>
-          </p:nvPr>
-        </p:nvSpPr>
-        <p:spPr>
-          <a:xfrm>
-            <a:off x="6523735" y="2913503"/>
-            <a:ext cx="5087073" cy="553373"/>
-          </a:xfrm>
-        </p:spPr>
-        <p:txBody>
-          <a:bodyPr/>
-          <a:lstStyle/>
+              <a:t>Stessa gestione dello spazio degli indirizzi dei processi</a:t>
+            </a:r>
+          </a:p>
           <a:p>
             <a:r>
               <a:rPr lang="it-IT" dirty="0"/>
-              <a:t>PINTOS</a:t>
-            </a:r>
-          </a:p>
-        </p:txBody>
-      </p:sp>
-      <p:sp>
-        <p:nvSpPr>
-          <p:cNvPr id="10" name="Segnaposto contenuto 9">
-            <a:extLst>
-              <a:ext uri="{FF2B5EF4-FFF2-40B4-BE49-F238E27FC236}">
-                <a16:creationId xmlns:a16="http://schemas.microsoft.com/office/drawing/2014/main" id="{3CDA2ECB-1671-3745-42C6-213A778ECD29}"/>
-              </a:ext>
-            </a:extLst>
-          </p:cNvPr>
-          <p:cNvSpPr>
-            <a:spLocks noGrp="1"/>
-          </p:cNvSpPr>
-          <p:nvPr>
-            <p:ph sz="quarter" idx="4"/>
-          </p:nvPr>
-        </p:nvSpPr>
-        <p:spPr>
-          <a:xfrm>
-            <a:off x="6217709" y="3588663"/>
-            <a:ext cx="5393100" cy="2934999"/>
-          </a:xfrm>
-        </p:spPr>
-        <p:txBody>
-          <a:bodyPr>
-            <a:normAutofit lnSpcReduction="10000"/>
-          </a:bodyPr>
-          <a:lstStyle/>
-          <a:p>
+              <a:t>Uso di strutture dati analoghe</a:t>
+            </a:r>
+          </a:p>
+          <a:p>
+            <a:pPr lvl="1"/>
             <a:r>
               <a:rPr lang="it-IT" dirty="0"/>
-              <a:t>Dà la possibilità di abilitare/disabilitare gli interrupt ma </a:t>
-            </a:r>
-            <a:r>
-              <a:rPr lang="it-IT" b="1" dirty="0"/>
-              <a:t>non</a:t>
-            </a:r>
+              <a:t>Vettori</a:t>
+            </a:r>
+          </a:p>
+          <a:p>
+            <a:pPr lvl="1"/>
             <a:r>
               <a:rPr lang="it-IT" dirty="0"/>
-              <a:t> dà la possibilità di controllare la priorità degli interrupt</a:t>
-            </a:r>
-          </a:p>
-          <a:p>
-            <a:r>
-              <a:rPr lang="it-IT" b="1" dirty="0" err="1"/>
-              <a:t>intr_enable</a:t>
-            </a:r>
+              <a:t>Bitmap</a:t>
+            </a:r>
+          </a:p>
+          <a:p>
+            <a:pPr lvl="1"/>
             <a:r>
               <a:rPr lang="it-IT" dirty="0"/>
-              <a:t>() </a:t>
-            </a:r>
-            <a:r>
-              <a:rPr lang="it-IT" dirty="0">
-                <a:sym typeface="Wingdings" panose="05000000000000000000" pitchFamily="2" charset="2"/>
-              </a:rPr>
-              <a:t> abilita gli interrupt</a:t>
-            </a:r>
-            <a:endParaRPr lang="it-IT" dirty="0"/>
-          </a:p>
-          <a:p>
-            <a:r>
-              <a:rPr lang="it-IT" b="1" dirty="0" err="1"/>
-              <a:t>intr_disable</a:t>
-            </a:r>
+              <a:t>Liste</a:t>
+            </a:r>
+          </a:p>
+          <a:p>
             <a:r>
               <a:rPr lang="it-IT" dirty="0"/>
-              <a:t>() </a:t>
-            </a:r>
-            <a:r>
-              <a:rPr lang="it-IT" dirty="0">
-                <a:sym typeface="Wingdings" panose="05000000000000000000" pitchFamily="2" charset="2"/>
-              </a:rPr>
-              <a:t> disabilita gli interrupt</a:t>
-            </a:r>
-          </a:p>
-          <a:p>
-            <a:r>
-              <a:rPr lang="it-IT" sz="1400" i="1" dirty="0" err="1">
-                <a:sym typeface="Wingdings" panose="05000000000000000000" pitchFamily="2" charset="2"/>
-              </a:rPr>
-              <a:t>src</a:t>
-            </a:r>
-            <a:r>
-              <a:rPr lang="it-IT" sz="1400" i="1" dirty="0">
-                <a:sym typeface="Wingdings" panose="05000000000000000000" pitchFamily="2" charset="2"/>
-              </a:rPr>
-              <a:t>/</a:t>
-            </a:r>
-            <a:r>
-              <a:rPr lang="it-IT" sz="1400" i="1" dirty="0" err="1">
-                <a:sym typeface="Wingdings" panose="05000000000000000000" pitchFamily="2" charset="2"/>
-              </a:rPr>
-              <a:t>thread</a:t>
-            </a:r>
-            <a:r>
-              <a:rPr lang="it-IT" sz="1400" i="1" dirty="0">
-                <a:sym typeface="Wingdings" panose="05000000000000000000" pitchFamily="2" charset="2"/>
-              </a:rPr>
-              <a:t>/</a:t>
-            </a:r>
-            <a:r>
-              <a:rPr lang="it-IT" sz="1400" i="1" dirty="0" err="1">
-                <a:sym typeface="Wingdings" panose="05000000000000000000" pitchFamily="2" charset="2"/>
-              </a:rPr>
-              <a:t>interrupt.h</a:t>
-            </a:r>
-            <a:endParaRPr lang="it-IT" sz="1400" dirty="0"/>
-          </a:p>
-        </p:txBody>
-      </p:sp>
-      <p:sp>
-        <p:nvSpPr>
-          <p:cNvPr id="3" name="Segnaposto testo 3">
-            <a:extLst>
-              <a:ext uri="{FF2B5EF4-FFF2-40B4-BE49-F238E27FC236}">
-                <a16:creationId xmlns:a16="http://schemas.microsoft.com/office/drawing/2014/main" id="{DD092F63-1123-8337-F4DC-4B5BF08C3E1F}"/>
-              </a:ext>
-            </a:extLst>
-          </p:cNvPr>
-          <p:cNvSpPr txBox="1">
-            <a:spLocks/>
-          </p:cNvSpPr>
-          <p:nvPr/>
-        </p:nvSpPr>
-        <p:spPr>
-          <a:xfrm>
-            <a:off x="615548" y="1999040"/>
-            <a:ext cx="11245148" cy="921080"/>
-          </a:xfrm>
-          <a:prstGeom prst="rect">
-            <a:avLst/>
-          </a:prstGeom>
-        </p:spPr>
-        <p:txBody>
-          <a:bodyPr vert="horz" lIns="91440" tIns="45720" rIns="91440" bIns="45720" rtlCol="0" anchor="b">
-            <a:noAutofit/>
-          </a:bodyPr>
-          <a:lstStyle>
-            <a:lvl1pPr marL="0" indent="0" algn="l" defTabSz="457200" rtl="0" eaLnBrk="1" latinLnBrk="0" hangingPunct="1">
-              <a:spcBef>
-                <a:spcPct val="20000"/>
-              </a:spcBef>
-              <a:spcAft>
-                <a:spcPts val="600"/>
-              </a:spcAft>
-              <a:buClr>
-                <a:schemeClr val="accent2"/>
-              </a:buClr>
-              <a:buSzPct val="92000"/>
-              <a:buFont typeface="Wingdings 2" panose="05020102010507070707" pitchFamily="18" charset="2"/>
-              <a:buNone/>
-              <a:defRPr sz="2200" b="0" kern="1200">
-                <a:solidFill>
-                  <a:schemeClr val="accent2"/>
-                </a:solidFill>
-                <a:latin typeface="+mn-lt"/>
-                <a:ea typeface="+mn-ea"/>
-                <a:cs typeface="+mn-cs"/>
-              </a:defRPr>
-            </a:lvl1pPr>
-            <a:lvl2pPr marL="457200" indent="0" algn="l" defTabSz="457200" rtl="0" eaLnBrk="1" latinLnBrk="0" hangingPunct="1">
-              <a:spcBef>
-                <a:spcPct val="20000"/>
-              </a:spcBef>
-              <a:spcAft>
-                <a:spcPts val="600"/>
-              </a:spcAft>
-              <a:buClr>
-                <a:schemeClr val="accent2"/>
-              </a:buClr>
-              <a:buSzPct val="92000"/>
-              <a:buFont typeface="Wingdings 2" panose="05020102010507070707" pitchFamily="18" charset="2"/>
-              <a:buNone/>
-              <a:defRPr sz="2000" b="1" kern="1200">
-                <a:solidFill>
-                  <a:schemeClr val="tx2"/>
-                </a:solidFill>
-                <a:latin typeface="+mn-lt"/>
-                <a:ea typeface="+mn-ea"/>
-                <a:cs typeface="+mn-cs"/>
-              </a:defRPr>
-            </a:lvl2pPr>
-            <a:lvl3pPr marL="914400" indent="0" algn="l" defTabSz="457200" rtl="0" eaLnBrk="1" latinLnBrk="0" hangingPunct="1">
-              <a:spcBef>
-                <a:spcPct val="20000"/>
-              </a:spcBef>
-              <a:spcAft>
-                <a:spcPts val="600"/>
-              </a:spcAft>
-              <a:buClr>
-                <a:schemeClr val="accent2"/>
-              </a:buClr>
-              <a:buSzPct val="92000"/>
-              <a:buFont typeface="Wingdings 2" panose="05020102010507070707" pitchFamily="18" charset="2"/>
-              <a:buNone/>
-              <a:defRPr sz="1800" b="1" kern="1200">
-                <a:solidFill>
-                  <a:schemeClr val="tx2"/>
-                </a:solidFill>
-                <a:latin typeface="+mn-lt"/>
-                <a:ea typeface="+mn-ea"/>
-                <a:cs typeface="+mn-cs"/>
-              </a:defRPr>
-            </a:lvl3pPr>
-            <a:lvl4pPr marL="1371600" indent="0" algn="l" defTabSz="457200" rtl="0" eaLnBrk="1" latinLnBrk="0" hangingPunct="1">
-              <a:spcBef>
-                <a:spcPct val="20000"/>
-              </a:spcBef>
-              <a:spcAft>
-                <a:spcPts val="600"/>
-              </a:spcAft>
-              <a:buClr>
-                <a:schemeClr val="accent2"/>
-              </a:buClr>
-              <a:buSzPct val="92000"/>
-              <a:buFont typeface="Wingdings 2" panose="05020102010507070707" pitchFamily="18" charset="2"/>
-              <a:buNone/>
-              <a:defRPr sz="1600" b="1" kern="1200">
-                <a:solidFill>
-                  <a:schemeClr val="tx2"/>
-                </a:solidFill>
-                <a:latin typeface="+mn-lt"/>
-                <a:ea typeface="+mn-ea"/>
-                <a:cs typeface="+mn-cs"/>
-              </a:defRPr>
-            </a:lvl4pPr>
-            <a:lvl5pPr marL="1828800" indent="0" algn="l" defTabSz="457200" rtl="0" eaLnBrk="1" latinLnBrk="0" hangingPunct="1">
-              <a:spcBef>
-                <a:spcPct val="20000"/>
-              </a:spcBef>
-              <a:spcAft>
-                <a:spcPts val="600"/>
-              </a:spcAft>
-              <a:buClr>
-                <a:schemeClr val="accent2"/>
-              </a:buClr>
-              <a:buSzPct val="92000"/>
-              <a:buFont typeface="Wingdings 2" panose="05020102010507070707" pitchFamily="18" charset="2"/>
-              <a:buNone/>
-              <a:defRPr sz="1600" b="1" kern="1200">
-                <a:solidFill>
-                  <a:schemeClr val="tx2"/>
-                </a:solidFill>
-                <a:latin typeface="+mn-lt"/>
-                <a:ea typeface="+mn-ea"/>
-                <a:cs typeface="+mn-cs"/>
-              </a:defRPr>
-            </a:lvl5pPr>
-            <a:lvl6pPr marL="2286000" indent="0" algn="l" defTabSz="457200" rtl="0" eaLnBrk="1" latinLnBrk="0" hangingPunct="1">
-              <a:spcBef>
-                <a:spcPct val="20000"/>
-              </a:spcBef>
-              <a:spcAft>
-                <a:spcPts val="600"/>
-              </a:spcAft>
-              <a:buClr>
-                <a:schemeClr val="accent2"/>
-              </a:buClr>
-              <a:buSzPct val="92000"/>
-              <a:buFont typeface="Wingdings 2" panose="05020102010507070707" pitchFamily="18" charset="2"/>
-              <a:buNone/>
-              <a:defRPr sz="1600" b="1" kern="1200">
-                <a:solidFill>
-                  <a:schemeClr val="tx2"/>
-                </a:solidFill>
-                <a:latin typeface="+mn-lt"/>
-                <a:ea typeface="+mn-ea"/>
-                <a:cs typeface="+mn-cs"/>
-              </a:defRPr>
-            </a:lvl6pPr>
-            <a:lvl7pPr marL="2743200" indent="0" algn="l" defTabSz="457200" rtl="0" eaLnBrk="1" latinLnBrk="0" hangingPunct="1">
-              <a:spcBef>
-                <a:spcPct val="20000"/>
-              </a:spcBef>
-              <a:spcAft>
-                <a:spcPts val="600"/>
-              </a:spcAft>
-              <a:buClr>
-                <a:schemeClr val="accent2"/>
-              </a:buClr>
-              <a:buSzPct val="92000"/>
-              <a:buFont typeface="Wingdings 2" panose="05020102010507070707" pitchFamily="18" charset="2"/>
-              <a:buNone/>
-              <a:defRPr sz="1600" b="1" kern="1200">
-                <a:solidFill>
-                  <a:schemeClr val="tx2"/>
-                </a:solidFill>
-                <a:latin typeface="+mn-lt"/>
-                <a:ea typeface="+mn-ea"/>
-                <a:cs typeface="+mn-cs"/>
-              </a:defRPr>
-            </a:lvl7pPr>
-            <a:lvl8pPr marL="3200400" indent="0" algn="l" defTabSz="457200" rtl="0" eaLnBrk="1" latinLnBrk="0" hangingPunct="1">
-              <a:spcBef>
-                <a:spcPct val="20000"/>
-              </a:spcBef>
-              <a:spcAft>
-                <a:spcPts val="600"/>
-              </a:spcAft>
-              <a:buClr>
-                <a:schemeClr val="accent2"/>
-              </a:buClr>
-              <a:buSzPct val="92000"/>
-              <a:buFont typeface="Wingdings 2" panose="05020102010507070707" pitchFamily="18" charset="2"/>
-              <a:buNone/>
-              <a:defRPr sz="1600" b="1" kern="1200">
-                <a:solidFill>
-                  <a:schemeClr val="tx2"/>
-                </a:solidFill>
-                <a:latin typeface="+mn-lt"/>
-                <a:ea typeface="+mn-ea"/>
-                <a:cs typeface="+mn-cs"/>
-              </a:defRPr>
-            </a:lvl8pPr>
-            <a:lvl9pPr marL="3657600" indent="0" algn="l" defTabSz="457200" rtl="0" eaLnBrk="1" latinLnBrk="0" hangingPunct="1">
-              <a:spcBef>
-                <a:spcPct val="20000"/>
-              </a:spcBef>
-              <a:spcAft>
-                <a:spcPts val="600"/>
-              </a:spcAft>
-              <a:buClr>
-                <a:schemeClr val="accent2"/>
-              </a:buClr>
-              <a:buSzPct val="92000"/>
-              <a:buFont typeface="Wingdings 2" panose="05020102010507070707" pitchFamily="18" charset="2"/>
-              <a:buNone/>
-              <a:defRPr sz="1600" b="1" kern="1200">
-                <a:solidFill>
-                  <a:schemeClr val="tx2"/>
-                </a:solidFill>
-                <a:latin typeface="+mn-lt"/>
-                <a:ea typeface="+mn-ea"/>
-                <a:cs typeface="+mn-cs"/>
-              </a:defRPr>
-            </a:lvl9pPr>
-          </a:lstStyle>
-          <a:p>
-            <a:r>
-              <a:rPr lang="it-IT" sz="2000" dirty="0">
-                <a:solidFill>
-                  <a:schemeClr val="tx1"/>
-                </a:solidFill>
-              </a:rPr>
-              <a:t>Sia OS161 che </a:t>
-            </a:r>
-            <a:r>
-              <a:rPr lang="it-IT" sz="2000" dirty="0" err="1">
-                <a:solidFill>
-                  <a:schemeClr val="tx1"/>
-                </a:solidFill>
-              </a:rPr>
-              <a:t>PintOS</a:t>
-            </a:r>
-            <a:r>
-              <a:rPr lang="it-IT" sz="2000" dirty="0">
-                <a:solidFill>
-                  <a:schemeClr val="tx1"/>
-                </a:solidFill>
-              </a:rPr>
-              <a:t> danno la possibilità di abilitare/disabilitare gli interrupt per poter gestire le sezioni critiche</a:t>
+              <a:t>Paginazione più complessa su OS161, quindi con più funzionalità</a:t>
             </a:r>
           </a:p>
         </p:txBody>
@@ -10806,7 +10360,7 @@
     </p:spTree>
     <p:extLst>
       <p:ext uri="{BB962C8B-B14F-4D97-AF65-F5344CB8AC3E}">
-        <p14:creationId xmlns:p14="http://schemas.microsoft.com/office/powerpoint/2010/main" val="151468646"/>
+        <p14:creationId xmlns:p14="http://schemas.microsoft.com/office/powerpoint/2010/main" val="450538825"/>
       </p:ext>
     </p:extLst>
   </p:cSld>
@@ -10862,11 +10416,11 @@
             </a:r>
             <a:r>
               <a:rPr lang="it-IT" sz="1600" dirty="0"/>
-              <a:t>- </a:t>
+              <a:t>– Interrupt </a:t>
             </a:r>
             <a:r>
               <a:rPr lang="it-IT" sz="1600" dirty="0" err="1"/>
-              <a:t>SEmaphore</a:t>
+              <a:t>disable</a:t>
             </a:r>
             <a:endParaRPr lang="it-IT" dirty="0"/>
           </a:p>
@@ -10890,7 +10444,7 @@
         </p:nvSpPr>
         <p:spPr>
           <a:xfrm>
-            <a:off x="887219" y="2794235"/>
+            <a:off x="887219" y="2913503"/>
             <a:ext cx="5087075" cy="536005"/>
           </a:xfrm>
         </p:spPr>
@@ -10923,130 +10477,102 @@
         </p:nvSpPr>
         <p:spPr>
           <a:xfrm>
-            <a:off x="581194" y="3469395"/>
+            <a:off x="581194" y="3588663"/>
             <a:ext cx="5393100" cy="2934999"/>
           </a:xfrm>
         </p:spPr>
         <p:txBody>
           <a:bodyPr>
-            <a:noAutofit/>
+            <a:normAutofit lnSpcReduction="10000"/>
           </a:bodyPr>
           <a:lstStyle/>
           <a:p>
             <a:r>
-              <a:rPr lang="it-IT" sz="1600" dirty="0"/>
-              <a:t>Semafori implementati come </a:t>
-            </a:r>
-            <a:r>
-              <a:rPr lang="it-IT" sz="1600" dirty="0" err="1"/>
-              <a:t>struct</a:t>
-            </a:r>
-            <a:r>
-              <a:rPr lang="it-IT" sz="1600" dirty="0"/>
-              <a:t> contenente:</a:t>
-            </a:r>
-          </a:p>
-          <a:p>
-            <a:pPr lvl="1"/>
-            <a:r>
               <a:rPr lang="it-IT" dirty="0"/>
-              <a:t>nome: utilizzato per identificarlo</a:t>
-            </a:r>
-          </a:p>
-          <a:p>
-            <a:pPr lvl="1"/>
-            <a:r>
-              <a:rPr lang="it-IT" dirty="0" err="1"/>
-              <a:t>wchan</a:t>
+              <a:t>Dà la possibilità di modificare la priorità degli interrupt e di abilitarli/disabilitarli</a:t>
+            </a:r>
+          </a:p>
+          <a:p>
+            <a:r>
+              <a:rPr lang="it-IT" b="1" dirty="0"/>
+              <a:t>spl0</a:t>
             </a:r>
             <a:r>
               <a:rPr lang="it-IT" dirty="0"/>
-              <a:t>: per memorizzare i </a:t>
-            </a:r>
-            <a:r>
-              <a:rPr lang="it-IT" dirty="0" err="1"/>
-              <a:t>threads</a:t>
+              <a:t>() </a:t>
+            </a:r>
+            <a:r>
+              <a:rPr lang="it-IT" dirty="0">
+                <a:sym typeface="Wingdings" panose="05000000000000000000" pitchFamily="2" charset="2"/>
+              </a:rPr>
+              <a:t> </a:t>
+            </a:r>
+            <a:r>
+              <a:rPr lang="it-IT" altLang="it-IT" dirty="0"/>
+              <a:t>imposta IPL su 0, abilitando tutti gli interrupt </a:t>
+            </a:r>
+            <a:endParaRPr lang="it-IT" dirty="0"/>
+          </a:p>
+          <a:p>
+            <a:r>
+              <a:rPr lang="it-IT" b="1" dirty="0" err="1"/>
+              <a:t>splhigh</a:t>
             </a:r>
             <a:r>
               <a:rPr lang="it-IT" dirty="0"/>
-              <a:t> in attesa</a:t>
-            </a:r>
-          </a:p>
-          <a:p>
-            <a:pPr lvl="1"/>
-            <a:r>
-              <a:rPr lang="it-IT" dirty="0" err="1"/>
-              <a:t>spinlock</a:t>
+              <a:t>() </a:t>
+            </a:r>
+            <a:r>
+              <a:rPr lang="it-IT" dirty="0">
+                <a:sym typeface="Wingdings" panose="05000000000000000000" pitchFamily="2" charset="2"/>
+              </a:rPr>
+              <a:t> i</a:t>
+            </a:r>
+            <a:r>
+              <a:rPr lang="it-IT" altLang="it-IT" dirty="0"/>
+              <a:t>mposta IPL al valore più alto, disabilitando tutti gli interrupt. </a:t>
+            </a:r>
+            <a:endParaRPr lang="it-IT" dirty="0"/>
+          </a:p>
+          <a:p>
+            <a:r>
+              <a:rPr lang="it-IT" b="1" dirty="0" err="1"/>
+              <a:t>splx</a:t>
             </a:r>
             <a:r>
               <a:rPr lang="it-IT" dirty="0"/>
-              <a:t>: per mettere un lock sul semaforo (protegge il contatore)</a:t>
-            </a:r>
-          </a:p>
-          <a:p>
-            <a:pPr lvl="1"/>
-            <a:r>
-              <a:rPr lang="it-IT" dirty="0"/>
-              <a:t>contatore: numero di </a:t>
-            </a:r>
-            <a:r>
-              <a:rPr lang="it-IT" dirty="0" err="1"/>
-              <a:t>threads</a:t>
-            </a:r>
-            <a:r>
-              <a:rPr lang="it-IT" dirty="0"/>
-              <a:t> che possono accedere alla risorsa</a:t>
-            </a:r>
-          </a:p>
-          <a:p>
-            <a:r>
-              <a:rPr lang="it-IT" sz="1600" dirty="0"/>
-              <a:t>Sono usate le funzioni </a:t>
-            </a:r>
-            <a:r>
-              <a:rPr lang="it-IT" sz="1600" b="1" dirty="0"/>
-              <a:t>P </a:t>
-            </a:r>
-            <a:r>
-              <a:rPr lang="it-IT" sz="1600" dirty="0"/>
-              <a:t>(decrementa il contatore e blocca il </a:t>
-            </a:r>
-            <a:r>
-              <a:rPr lang="it-IT" sz="1600" dirty="0" err="1"/>
-              <a:t>thread</a:t>
-            </a:r>
-            <a:r>
-              <a:rPr lang="it-IT" sz="1600" dirty="0"/>
-              <a:t> se </a:t>
-            </a:r>
-            <a:r>
-              <a:rPr lang="it-IT" sz="1600" dirty="0" err="1"/>
-              <a:t>cont</a:t>
-            </a:r>
-            <a:r>
-              <a:rPr lang="it-IT" sz="1600" dirty="0"/>
-              <a:t>=0) e </a:t>
-            </a:r>
-            <a:r>
-              <a:rPr lang="it-IT" sz="1600" b="1" dirty="0"/>
-              <a:t>V</a:t>
-            </a:r>
-            <a:r>
-              <a:rPr lang="it-IT" sz="1600" dirty="0"/>
-              <a:t> (incrementa il contatore e sveglia un </a:t>
-            </a:r>
-            <a:r>
-              <a:rPr lang="it-IT" sz="1600" dirty="0" err="1"/>
-              <a:t>thread</a:t>
-            </a:r>
-            <a:r>
-              <a:rPr lang="it-IT" sz="1600" dirty="0"/>
-              <a:t> in attesa)</a:t>
-            </a:r>
-            <a:endParaRPr lang="it-IT" sz="1600" b="1" dirty="0"/>
-          </a:p>
-          <a:p>
-            <a:endParaRPr lang="it-IT" sz="1600" dirty="0"/>
+              <a:t>(S) </a:t>
+            </a:r>
+            <a:r>
+              <a:rPr lang="it-IT" dirty="0">
+                <a:sym typeface="Wingdings" panose="05000000000000000000" pitchFamily="2" charset="2"/>
+              </a:rPr>
+              <a:t> imposta IPL al valore S, abilitando lo stato rappresentato da S</a:t>
+            </a:r>
+          </a:p>
+          <a:p>
+            <a:r>
+              <a:rPr lang="it-IT" sz="1400" i="1" dirty="0" err="1">
+                <a:sym typeface="Wingdings" panose="05000000000000000000" pitchFamily="2" charset="2"/>
+              </a:rPr>
+              <a:t>kern</a:t>
+            </a:r>
+            <a:r>
+              <a:rPr lang="it-IT" sz="1400" i="1" dirty="0">
+                <a:sym typeface="Wingdings" panose="05000000000000000000" pitchFamily="2" charset="2"/>
+              </a:rPr>
+              <a:t>/include/</a:t>
+            </a:r>
+            <a:r>
+              <a:rPr lang="it-IT" sz="1400" i="1" dirty="0" err="1">
+                <a:sym typeface="Wingdings" panose="05000000000000000000" pitchFamily="2" charset="2"/>
+              </a:rPr>
+              <a:t>spl.h</a:t>
+            </a:r>
+            <a:endParaRPr lang="it-IT" sz="1400" i="1" dirty="0"/>
+          </a:p>
+          <a:p>
+            <a:endParaRPr lang="it-IT" dirty="0"/>
           </a:p>
         </p:txBody>
       </p:sp>
@@ -11068,7 +10594,7 @@
         </p:nvSpPr>
         <p:spPr>
           <a:xfrm>
-            <a:off x="6523735" y="2794235"/>
+            <a:off x="6523735" y="2913503"/>
             <a:ext cx="5087073" cy="553373"/>
           </a:xfrm>
         </p:spPr>
@@ -11101,151 +10627,94 @@
         </p:nvSpPr>
         <p:spPr>
           <a:xfrm>
-            <a:off x="6217709" y="3469395"/>
+            <a:off x="6217709" y="3588663"/>
             <a:ext cx="5393100" cy="2934999"/>
           </a:xfrm>
         </p:spPr>
         <p:txBody>
           <a:bodyPr>
-            <a:noAutofit/>
+            <a:normAutofit lnSpcReduction="10000"/>
           </a:bodyPr>
           <a:lstStyle/>
           <a:p>
             <a:r>
-              <a:rPr lang="it-IT" sz="1600" dirty="0"/>
-              <a:t>Semafori implementati come </a:t>
-            </a:r>
-            <a:r>
-              <a:rPr lang="it-IT" sz="1600" dirty="0" err="1"/>
-              <a:t>struct</a:t>
-            </a:r>
-            <a:r>
-              <a:rPr lang="it-IT" sz="1600" dirty="0"/>
-              <a:t> contenente:</a:t>
-            </a:r>
-          </a:p>
-          <a:p>
-            <a:pPr lvl="1"/>
-            <a:r>
               <a:rPr lang="it-IT" dirty="0"/>
-              <a:t>valore: non negativo che indica il numero di </a:t>
-            </a:r>
-            <a:r>
-              <a:rPr lang="it-IT" dirty="0" err="1"/>
-              <a:t>threads</a:t>
+              <a:t>Dà la possibilità di abilitare/disabilitare gli interrupt ma </a:t>
+            </a:r>
+            <a:r>
+              <a:rPr lang="it-IT" b="1" dirty="0"/>
+              <a:t>non</a:t>
             </a:r>
             <a:r>
               <a:rPr lang="it-IT" dirty="0"/>
-              <a:t> che possono accedere alla risorsa</a:t>
-            </a:r>
-          </a:p>
-          <a:p>
-            <a:pPr lvl="1"/>
+              <a:t> dà la possibilità di controllare la priorità degli interrupt</a:t>
+            </a:r>
+          </a:p>
+          <a:p>
+            <a:r>
+              <a:rPr lang="it-IT" b="1" dirty="0" err="1"/>
+              <a:t>intr_enable</a:t>
+            </a:r>
             <a:r>
               <a:rPr lang="it-IT" dirty="0"/>
-              <a:t>lista: </a:t>
-            </a:r>
-            <a:r>
-              <a:rPr lang="it-IT" dirty="0" err="1"/>
-              <a:t>linked</a:t>
+              <a:t>() </a:t>
+            </a:r>
+            <a:r>
+              <a:rPr lang="it-IT" dirty="0">
+                <a:sym typeface="Wingdings" panose="05000000000000000000" pitchFamily="2" charset="2"/>
+              </a:rPr>
+              <a:t> abilita gli interrupt</a:t>
+            </a:r>
+            <a:endParaRPr lang="it-IT" dirty="0"/>
+          </a:p>
+          <a:p>
+            <a:r>
+              <a:rPr lang="it-IT" b="1" dirty="0" err="1"/>
+              <a:t>intr_disable</a:t>
             </a:r>
             <a:r>
               <a:rPr lang="it-IT" dirty="0"/>
-              <a:t> list che memorizza i </a:t>
-            </a:r>
-            <a:r>
-              <a:rPr lang="it-IT" dirty="0" err="1"/>
-              <a:t>threads</a:t>
-            </a:r>
-            <a:r>
-              <a:rPr lang="it-IT" dirty="0"/>
-              <a:t> in attesa</a:t>
-            </a:r>
-          </a:p>
-          <a:p>
-            <a:r>
-              <a:rPr lang="it-IT" sz="1600" dirty="0"/>
-              <a:t>Sono usate le funzioni </a:t>
-            </a:r>
-            <a:r>
-              <a:rPr lang="it-IT" sz="1600" b="1" dirty="0" err="1"/>
-              <a:t>sema_down</a:t>
-            </a:r>
-            <a:r>
-              <a:rPr lang="it-IT" sz="1600" b="1" dirty="0"/>
-              <a:t> </a:t>
-            </a:r>
-            <a:r>
-              <a:rPr lang="it-IT" sz="1600" dirty="0"/>
-              <a:t>(decrementa il contatore e blocca il </a:t>
-            </a:r>
-            <a:r>
-              <a:rPr lang="it-IT" sz="1600" dirty="0" err="1"/>
+              <a:t>() </a:t>
+            </a:r>
+            <a:r>
+              <a:rPr lang="it-IT" dirty="0">
+                <a:sym typeface="Wingdings" panose="05000000000000000000" pitchFamily="2" charset="2"/>
+              </a:rPr>
+              <a:t> disabilita gli interrupt</a:t>
+            </a:r>
+          </a:p>
+          <a:p>
+            <a:r>
+              <a:rPr lang="it-IT" sz="1400" i="1" dirty="0" err="1">
+                <a:sym typeface="Wingdings" panose="05000000000000000000" pitchFamily="2" charset="2"/>
+              </a:rPr>
+              <a:t>src</a:t>
+            </a:r>
+            <a:r>
+              <a:rPr lang="it-IT" sz="1400" i="1" dirty="0">
+                <a:sym typeface="Wingdings" panose="05000000000000000000" pitchFamily="2" charset="2"/>
+              </a:rPr>
+              <a:t>/</a:t>
+            </a:r>
+            <a:r>
+              <a:rPr lang="it-IT" sz="1400" i="1" dirty="0" err="1">
+                <a:sym typeface="Wingdings" panose="05000000000000000000" pitchFamily="2" charset="2"/>
+              </a:rPr>
               <a:t>thread</a:t>
             </a:r>
             <a:r>
-              <a:rPr lang="it-IT" sz="1600" dirty="0"/>
-              <a:t> se </a:t>
-            </a:r>
-            <a:r>
-              <a:rPr lang="it-IT" sz="1600" dirty="0" err="1"/>
-              <a:t>cont</a:t>
-            </a:r>
-            <a:r>
-              <a:rPr lang="it-IT" sz="1600" dirty="0"/>
-              <a:t>=0) e </a:t>
-            </a:r>
-            <a:r>
-              <a:rPr lang="it-IT" sz="1600" b="1" dirty="0" err="1"/>
-              <a:t>sema_up</a:t>
-            </a:r>
-            <a:r>
-              <a:rPr lang="it-IT" sz="1600" dirty="0"/>
-              <a:t> (incrementa il contatore e sveglia un </a:t>
-            </a:r>
-            <a:r>
-              <a:rPr lang="it-IT" sz="1600" dirty="0" err="1"/>
-              <a:t>thread</a:t>
-            </a:r>
-            <a:r>
-              <a:rPr lang="it-IT" sz="1600" dirty="0"/>
-              <a:t> in attesa)</a:t>
-            </a:r>
-          </a:p>
-          <a:p>
-            <a:r>
-              <a:rPr lang="it-IT" sz="1600" dirty="0"/>
-              <a:t>È presente la funzione </a:t>
-            </a:r>
-            <a:r>
-              <a:rPr lang="it-IT" sz="1600" b="1" dirty="0" err="1"/>
-              <a:t>sema_try_down</a:t>
-            </a:r>
-            <a:r>
-              <a:rPr lang="it-IT" sz="1600" dirty="0"/>
-              <a:t> che prova ad abbassare il valore del semaforo senza attendere. Se il </a:t>
-            </a:r>
-            <a:r>
-              <a:rPr lang="it-IT" sz="1600" dirty="0" err="1"/>
-              <a:t>value</a:t>
-            </a:r>
-            <a:r>
-              <a:rPr lang="it-IT" sz="1600" dirty="0"/>
-              <a:t> è 0 il </a:t>
-            </a:r>
-            <a:r>
-              <a:rPr lang="it-IT" sz="1600" dirty="0" err="1"/>
-              <a:t>thread</a:t>
-            </a:r>
-            <a:r>
-              <a:rPr lang="it-IT" sz="1600" dirty="0"/>
-              <a:t> è bloccato e messo in attesa; altrimenti viene decrementato e la funzione restituisce </a:t>
-            </a:r>
-            <a:r>
-              <a:rPr lang="it-IT" sz="1600" dirty="0" err="1"/>
-              <a:t>true</a:t>
-            </a:r>
-            <a:endParaRPr lang="it-IT" sz="1600" dirty="0"/>
+              <a:rPr lang="it-IT" sz="1400" i="1" dirty="0">
+                <a:sym typeface="Wingdings" panose="05000000000000000000" pitchFamily="2" charset="2"/>
+              </a:rPr>
+              <a:t>/</a:t>
+            </a:r>
+            <a:r>
+              <a:rPr lang="it-IT" sz="1400" i="1" dirty="0" err="1">
+                <a:sym typeface="Wingdings" panose="05000000000000000000" pitchFamily="2" charset="2"/>
+              </a:rPr>
+              <a:t>interrupt.h</a:t>
+            </a:r>
+            <a:endParaRPr lang="it-IT" sz="1400" dirty="0"/>
           </a:p>
         </p:txBody>
       </p:sp>
@@ -11265,7 +10734,7 @@
         </p:nvSpPr>
         <p:spPr>
           <a:xfrm>
-            <a:off x="615548" y="1879772"/>
+            <a:off x="615548" y="1999040"/>
             <a:ext cx="11245148" cy="921080"/>
           </a:xfrm>
           <a:prstGeom prst="rect">
@@ -11478,49 +10947,28 @@
           </a:lstStyle>
           <a:p>
             <a:r>
-              <a:rPr lang="it-IT" sz="2000" b="0" dirty="0">
+              <a:rPr lang="it-IT" sz="2000" dirty="0">
                 <a:solidFill>
                   <a:schemeClr val="tx1"/>
                 </a:solidFill>
-                <a:effectLst/>
               </a:rPr>
               <a:t>Sia OS161 che </a:t>
             </a:r>
             <a:r>
-              <a:rPr lang="it-IT" sz="2000" b="0" dirty="0" err="1">
+              <a:rPr lang="it-IT" sz="2000" dirty="0" err="1">
                 <a:solidFill>
                   <a:schemeClr val="tx1"/>
                 </a:solidFill>
-                <a:effectLst/>
               </a:rPr>
               <a:t>PintOS</a:t>
             </a:r>
             <a:r>
-              <a:rPr lang="it-IT" sz="2000" b="0" dirty="0">
+              <a:rPr lang="it-IT" sz="2000" dirty="0">
                 <a:solidFill>
                   <a:schemeClr val="tx1"/>
                 </a:solidFill>
-                <a:effectLst/>
               </a:rPr>
-              <a:t> implementano i semafori seguono il modello classico di semafori di </a:t>
-            </a:r>
-            <a:r>
-              <a:rPr lang="it-IT" sz="2000" b="0" dirty="0" err="1">
-                <a:solidFill>
-                  <a:schemeClr val="tx1"/>
-                </a:solidFill>
-                <a:effectLst/>
-              </a:rPr>
-              <a:t>Dijkstra</a:t>
-            </a:r>
-            <a:r>
-              <a:rPr lang="it-IT" sz="2000" b="0" dirty="0">
-                <a:solidFill>
-                  <a:schemeClr val="tx1"/>
-                </a:solidFill>
-                <a:effectLst/>
-              </a:rPr>
-              <a:t>, con operazioni atomiche di "down" e "up" per garantire la sincronizzazione.</a:t>
+              <a:t> danno la possibilità di abilitare/disabilitare gli interrupt per poter gestire le sezioni critiche</a:t>
             </a:r>
           </a:p>
         </p:txBody>
@@ -11528,7 +10976,7 @@
     </p:spTree>
     <p:extLst>
       <p:ext uri="{BB962C8B-B14F-4D97-AF65-F5344CB8AC3E}">
-        <p14:creationId xmlns:p14="http://schemas.microsoft.com/office/powerpoint/2010/main" val="4198586686"/>
+        <p14:creationId xmlns:p14="http://schemas.microsoft.com/office/powerpoint/2010/main" val="151468646"/>
       </p:ext>
     </p:extLst>
   </p:cSld>
@@ -11584,15 +11032,11 @@
             </a:r>
             <a:r>
               <a:rPr lang="it-IT" sz="1600" dirty="0"/>
-              <a:t>– lock (</a:t>
+              <a:t>- </a:t>
             </a:r>
             <a:r>
               <a:rPr lang="it-IT" sz="1600" dirty="0" err="1"/>
-              <a:t>mutex</a:t>
-            </a:r>
-            <a:r>
-              <a:rPr lang="it-IT" sz="1600" dirty="0"/>
-              <a:t>)</a:t>
+              <a:t>SEmaphore</a:t>
             </a:r>
             <a:endParaRPr lang="it-IT" dirty="0"/>
           </a:p>
@@ -11616,7 +11060,7 @@
         </p:nvSpPr>
         <p:spPr>
           <a:xfrm>
-            <a:off x="887219" y="2555699"/>
+            <a:off x="887219" y="2794235"/>
             <a:ext cx="5087075" cy="536005"/>
           </a:xfrm>
         </p:spPr>
@@ -11649,7 +11093,7 @@
         </p:nvSpPr>
         <p:spPr>
           <a:xfrm>
-            <a:off x="581194" y="3230859"/>
+            <a:off x="581194" y="3469395"/>
             <a:ext cx="5393100" cy="2934999"/>
           </a:xfrm>
         </p:spPr>
@@ -11661,7 +11105,7 @@
           <a:p>
             <a:r>
               <a:rPr lang="it-IT" sz="1600" dirty="0"/>
-              <a:t>Lock implementato come </a:t>
+              <a:t>Semafori implementati come </a:t>
             </a:r>
             <a:r>
               <a:rPr lang="it-IT" sz="1600" dirty="0" err="1"/>
@@ -11676,47 +11120,100 @@
             <a:pPr lvl="1"/>
             <a:r>
               <a:rPr lang="it-IT" dirty="0"/>
-              <a:t>nome: per identificare il lock</a:t>
+              <a:t>nome: utilizzato per identificarlo</a:t>
             </a:r>
           </a:p>
           <a:p>
             <a:pPr lvl="1"/>
             <a:r>
+              <a:rPr lang="it-IT" dirty="0" err="1"/>
+              <a:t>wchan</a:t>
+            </a:r>
+            <a:r>
               <a:rPr lang="it-IT" dirty="0"/>
-              <a:t>HANGMAN_LOCKABLE: per rilevare i deadlock</a:t>
+              <a:t>: per memorizzare i </a:t>
+            </a:r>
+            <a:r>
+              <a:rPr lang="it-IT" dirty="0" err="1"/>
+              <a:t>threads</a:t>
+            </a:r>
+            <a:r>
+              <a:rPr lang="it-IT" dirty="0"/>
+              <a:t> in attesa</a:t>
+            </a:r>
+          </a:p>
+          <a:p>
+            <a:pPr lvl="1"/>
+            <a:r>
+              <a:rPr lang="it-IT" dirty="0" err="1"/>
+              <a:t>spinlock</a:t>
+            </a:r>
+            <a:r>
+              <a:rPr lang="it-IT" dirty="0"/>
+              <a:t>: per mettere un lock sul semaforo (protegge il contatore)</a:t>
+            </a:r>
+          </a:p>
+          <a:p>
+            <a:pPr lvl="1"/>
+            <a:r>
+              <a:rPr lang="it-IT" dirty="0"/>
+              <a:t>contatore: numero di </a:t>
+            </a:r>
+            <a:r>
+              <a:rPr lang="it-IT" dirty="0" err="1"/>
+              <a:t>threads</a:t>
+            </a:r>
+            <a:r>
+              <a:rPr lang="it-IT" dirty="0"/>
+              <a:t> che possono accedere alla risorsa</a:t>
             </a:r>
           </a:p>
           <a:p>
             <a:r>
               <a:rPr lang="it-IT" sz="1600" dirty="0"/>
-              <a:t>Le operazioni sui Lock sono simili a quelle che offre </a:t>
+              <a:t>Sono usate le funzioni </a:t>
+            </a:r>
+            <a:r>
+              <a:rPr lang="it-IT" sz="1600" b="1" dirty="0"/>
+              <a:t>P </a:t>
+            </a:r>
+            <a:r>
+              <a:rPr lang="it-IT" sz="1600" dirty="0"/>
+              <a:t>(decrementa il contatore e blocca il </a:t>
             </a:r>
             <a:r>
               <a:rPr lang="it-IT" sz="1600" dirty="0" err="1"/>
-              <a:t>PintOS</a:t>
-            </a:r>
-            <a:endParaRPr lang="it-IT" sz="1600" dirty="0"/>
-          </a:p>
-          <a:p>
+              <a:t>thread</a:t>
+            </a:r>
             <a:r>
               <a:rPr lang="it-IT" sz="1600" dirty="0"/>
-              <a:t>La differenza principale è che OS161 utilizza anche un hook per riconoscere e prevenire i deadlock</a:t>
-            </a:r>
-          </a:p>
-          <a:p>
-            <a:pPr lvl="1"/>
-            <a:r>
-              <a:rPr lang="it-IT" dirty="0"/>
-              <a:t>Il rilevatore di deadlock di OS161 utilizza un approccio basato sul grafo per rilevare i deadlock. I </a:t>
-            </a:r>
-            <a:r>
-              <a:rPr lang="it-IT" dirty="0" err="1"/>
+              <a:t> se </a:t>
+            </a:r>
+            <a:r>
+              <a:rPr lang="it-IT" sz="1600" dirty="0" err="1"/>
+              <a:t>cont</a:t>
+            </a:r>
+            <a:r>
+              <a:rPr lang="it-IT" sz="1600" dirty="0"/>
+              <a:t>=0) e </a:t>
+            </a:r>
+            <a:r>
+              <a:rPr lang="it-IT" sz="1600" b="1" dirty="0"/>
+              <a:t>V</a:t>
+            </a:r>
+            <a:r>
+              <a:rPr lang="it-IT" sz="1600" dirty="0"/>
+              <a:t> (incrementa il contatore e sveglia un </a:t>
+            </a:r>
+            <a:r>
+              <a:rPr lang="it-IT" sz="1600" dirty="0" err="1"/>
               <a:t>thread</a:t>
             </a:r>
             <a:r>
-              <a:rPr lang="it-IT" dirty="0"/>
-              <a:t> e i lock vengono rappresentati come nodi e archi in un grafo. Il codice di rilevamento dei deadlock controlla il grafo per rilevare cicli. Se viene rilevato un ciclo, significa che esiste un deadlock</a:t>
-            </a:r>
+              <a:rPr lang="it-IT" sz="1600" dirty="0"/>
+              <a:t> in attesa)</a:t>
+            </a:r>
+            <a:endParaRPr lang="it-IT" sz="1600" b="1" dirty="0"/>
           </a:p>
           <a:p>
             <a:endParaRPr lang="it-IT" sz="1600" dirty="0"/>
@@ -11741,7 +11238,7 @@
         </p:nvSpPr>
         <p:spPr>
           <a:xfrm>
-            <a:off x="6523735" y="2555699"/>
+            <a:off x="6523735" y="2794235"/>
             <a:ext cx="5087073" cy="553373"/>
           </a:xfrm>
         </p:spPr>
@@ -11774,7 +11271,7 @@
         </p:nvSpPr>
         <p:spPr>
           <a:xfrm>
-            <a:off x="6217709" y="3230859"/>
+            <a:off x="6217709" y="3469395"/>
             <a:ext cx="5393100" cy="2934999"/>
           </a:xfrm>
         </p:spPr>
@@ -11786,7 +11283,7 @@
           <a:p>
             <a:r>
               <a:rPr lang="it-IT" sz="1600" dirty="0"/>
-              <a:t>Lock implementato come </a:t>
+              <a:t>Semafori implementati come </a:t>
             </a:r>
             <a:r>
               <a:rPr lang="it-IT" sz="1600" dirty="0" err="1"/>
@@ -11800,107 +11297,125 @@
           <a:p>
             <a:pPr lvl="1"/>
             <a:r>
+              <a:rPr lang="it-IT" dirty="0"/>
+              <a:t>valore: non negativo che indica il numero di </a:t>
+            </a:r>
+            <a:r>
               <a:rPr lang="it-IT" dirty="0" err="1"/>
+              <a:t>threads</a:t>
+            </a:r>
+            <a:r>
+              <a:rPr lang="it-IT" dirty="0"/>
+              <a:t> che possono accedere alla risorsa</a:t>
+            </a:r>
+          </a:p>
+          <a:p>
+            <a:pPr lvl="1"/>
+            <a:r>
+              <a:rPr lang="it-IT" dirty="0"/>
+              <a:t>lista: </a:t>
+            </a:r>
+            <a:r>
+              <a:rPr lang="it-IT" dirty="0" err="1"/>
+              <a:t>linked</a:t>
+            </a:r>
+            <a:r>
+              <a:rPr lang="it-IT" dirty="0"/>
+              <a:t> list che memorizza i </a:t>
+            </a:r>
+            <a:r>
+              <a:rPr lang="it-IT" dirty="0" err="1"/>
+              <a:t>threads</a:t>
+            </a:r>
+            <a:r>
+              <a:rPr lang="it-IT" dirty="0"/>
+              <a:t> in attesa</a:t>
+            </a:r>
+          </a:p>
+          <a:p>
+            <a:r>
+              <a:rPr lang="it-IT" sz="1600" dirty="0"/>
+              <a:t>Sono usate le funzioni </a:t>
+            </a:r>
+            <a:r>
+              <a:rPr lang="it-IT" sz="1600" b="1" dirty="0" err="1"/>
+              <a:t>sema_down</a:t>
+            </a:r>
+            <a:r>
+              <a:rPr lang="it-IT" sz="1600" b="1" dirty="0"/>
+              <a:t> </a:t>
+            </a:r>
+            <a:r>
+              <a:rPr lang="it-IT" sz="1600" dirty="0"/>
+              <a:t>(decrementa il contatore e blocca il </a:t>
+            </a:r>
+            <a:r>
+              <a:rPr lang="it-IT" sz="1600" dirty="0" err="1"/>
               <a:t>thread</a:t>
             </a:r>
             <a:r>
-              <a:rPr lang="it-IT" dirty="0"/>
-              <a:t>: chi detiene il lock</a:t>
-            </a:r>
-          </a:p>
-          <a:p>
-            <a:pPr lvl="1"/>
-            <a:r>
-              <a:rPr lang="it-IT" dirty="0" err="1"/>
-              <a:t>semaphore</a:t>
-            </a:r>
-            <a:r>
-              <a:rPr lang="it-IT" dirty="0"/>
-              <a:t>: struttura semaforo binario per il controllo degli accessi</a:t>
-            </a:r>
-          </a:p>
-          <a:p>
-            <a:r>
               <a:rPr lang="it-IT" sz="1600" dirty="0"/>
-              <a:t>Le funzioni sui Lock sono: </a:t>
-            </a:r>
-          </a:p>
-          <a:p>
-            <a:pPr lvl="1"/>
-            <a:r>
-              <a:rPr lang="it-IT" sz="1200" b="1" dirty="0" err="1"/>
-              <a:t>lock_init</a:t>
-            </a:r>
-            <a:r>
-              <a:rPr lang="it-IT" sz="1200" dirty="0"/>
-              <a:t> : Inizializza un nuovo lock.</a:t>
-            </a:r>
-          </a:p>
-          <a:p>
-            <a:pPr lvl="1"/>
-            <a:r>
-              <a:rPr lang="it-IT" sz="1200" b="1" dirty="0" err="1"/>
-              <a:t>lock_acquire</a:t>
-            </a:r>
-            <a:r>
-              <a:rPr lang="it-IT" sz="1200" dirty="0"/>
-              <a:t> : Acquisisce il lock, aspettando, se necessario, il suo rilascio.</a:t>
-            </a:r>
-          </a:p>
-          <a:p>
-            <a:pPr lvl="1"/>
-            <a:r>
-              <a:rPr lang="it-IT" sz="1200" b="1" dirty="0" err="1"/>
-              <a:t>lock_try_acquire</a:t>
-            </a:r>
-            <a:r>
-              <a:rPr lang="it-IT" sz="1200" dirty="0"/>
-              <a:t> : Prova ad acquisire il lock senza attendere.</a:t>
-            </a:r>
-          </a:p>
-          <a:p>
-            <a:pPr lvl="1"/>
-            <a:r>
-              <a:rPr lang="it-IT" sz="1200" b="1" dirty="0" err="1"/>
-              <a:t>lock_release</a:t>
-            </a:r>
-            <a:r>
-              <a:rPr lang="it-IT" sz="1200" dirty="0"/>
-              <a:t> : Rilascia il lock detenuto dal </a:t>
-            </a:r>
-            <a:r>
-              <a:rPr lang="it-IT" sz="1200" dirty="0" err="1"/>
+              <a:t> se </a:t>
+            </a:r>
+            <a:r>
+              <a:rPr lang="it-IT" sz="1600" dirty="0" err="1"/>
+              <a:t>cont</a:t>
+            </a:r>
+            <a:r>
+              <a:rPr lang="it-IT" sz="1600" dirty="0"/>
+              <a:t>=0) e </a:t>
+            </a:r>
+            <a:r>
+              <a:rPr lang="it-IT" sz="1600" b="1" dirty="0" err="1"/>
+              <a:t>sema_up</a:t>
+            </a:r>
+            <a:r>
+              <a:rPr lang="it-IT" sz="1600" dirty="0"/>
+              <a:t> (incrementa il contatore e sveglia un </a:t>
+            </a:r>
+            <a:r>
+              <a:rPr lang="it-IT" sz="1600" dirty="0" err="1"/>
               <a:t>thread</a:t>
             </a:r>
             <a:r>
-              <a:rPr lang="it-IT" sz="1200" dirty="0"/>
-              <a:t> corrente.</a:t>
-            </a:r>
-          </a:p>
-          <a:p>
-            <a:pPr lvl="1"/>
-            <a:r>
-              <a:rPr lang="it-IT" sz="1200" b="1" dirty="0" err="1"/>
-              <a:t>lock_held_by_current_thread</a:t>
-            </a:r>
-            <a:r>
-              <a:rPr lang="it-IT" sz="1200" dirty="0"/>
-              <a:t> : Verifica se il </a:t>
-            </a:r>
-            <a:r>
-              <a:rPr lang="it-IT" sz="1200" dirty="0" err="1"/>
+              <a:rPr lang="it-IT" sz="1600" dirty="0"/>
+              <a:t> in attesa)</a:t>
+            </a:r>
+          </a:p>
+          <a:p>
+            <a:r>
+              <a:rPr lang="it-IT" sz="1600" dirty="0"/>
+              <a:t>È presente la funzione </a:t>
+            </a:r>
+            <a:r>
+              <a:rPr lang="it-IT" sz="1600" b="1" dirty="0" err="1"/>
+              <a:t>sema_try_down</a:t>
+            </a:r>
+            <a:r>
+              <a:rPr lang="it-IT" sz="1600" dirty="0"/>
+              <a:t> che prova ad abbassare il valore del semaforo senza attendere. Se il </a:t>
+            </a:r>
+            <a:r>
+              <a:rPr lang="it-IT" sz="1600" dirty="0" err="1"/>
+              <a:t>value</a:t>
+            </a:r>
+            <a:r>
+              <a:rPr lang="it-IT" sz="1600" dirty="0"/>
+              <a:t> è 0 il </a:t>
+            </a:r>
+            <a:r>
+              <a:rPr lang="it-IT" sz="1600" dirty="0" err="1"/>
               <a:t>thread</a:t>
             </a:r>
             <a:r>
-              <a:rPr lang="it-IT" sz="1200" dirty="0"/>
-              <a:t> in esecuzione possiede il lock.</a:t>
-            </a:r>
-          </a:p>
-          <a:p>
-            <a:pPr marL="324000" lvl="1" indent="0">
-              <a:buNone/>
-            </a:pPr>
-            <a:endParaRPr lang="it-IT" dirty="0"/>
+              <a:rPr lang="it-IT" sz="1600" dirty="0"/>
+              <a:t> è bloccato e messo in attesa; altrimenti viene decrementato e la funzione restituisce </a:t>
+            </a:r>
+            <a:r>
+              <a:rPr lang="it-IT" sz="1600" dirty="0" err="1"/>
+              <a:t>true</a:t>
+            </a:r>
+            <a:endParaRPr lang="it-IT" sz="1600" dirty="0"/>
           </a:p>
         </p:txBody>
       </p:sp>
@@ -11920,7 +11435,7 @@
         </p:nvSpPr>
         <p:spPr>
           <a:xfrm>
-            <a:off x="615548" y="1641236"/>
+            <a:off x="615548" y="1879772"/>
             <a:ext cx="11245148" cy="921080"/>
           </a:xfrm>
           <a:prstGeom prst="rect">
@@ -12139,16 +11654,16 @@
                 </a:solidFill>
                 <a:effectLst/>
               </a:rPr>
-              <a:t>Un </a:t>
-            </a:r>
-            <a:r>
-              <a:rPr lang="it-IT" sz="2000" dirty="0">
+              <a:t>Sia OS161 che </a:t>
+            </a:r>
+            <a:r>
+              <a:rPr lang="it-IT" sz="2000" b="0" dirty="0" err="1">
                 <a:solidFill>
                   <a:schemeClr val="tx1"/>
                 </a:solidFill>
                 <a:effectLst/>
               </a:rPr>
-              <a:t>lock</a:t>
+              <a:t>PintOS</a:t>
             </a:r>
             <a:r>
               <a:rPr lang="it-IT" sz="2000" b="0" dirty="0">
@@ -12157,7 +11672,25 @@
                 </a:solidFill>
                 <a:effectLst/>
               </a:rPr>
-              <a:t> è analogo a un semaforo con un valore iniziale di 1, equivalente al verde di un semaforo. L'azione "up" di un lock è chiamata "rilascio", mentre l'azione "down" è detta "acquisizione".</a:t>
+              <a:t> implementano i semafori seguono il modello classico di semafori di </a:t>
+            </a:r>
+            <a:r>
+              <a:rPr lang="it-IT" sz="2000" b="0" dirty="0" err="1">
+                <a:solidFill>
+                  <a:schemeClr val="tx1"/>
+                </a:solidFill>
+                <a:effectLst/>
+              </a:rPr>
+              <a:t>Dijkstra</a:t>
+            </a:r>
+            <a:r>
+              <a:rPr lang="it-IT" sz="2000" b="0" dirty="0">
+                <a:solidFill>
+                  <a:schemeClr val="tx1"/>
+                </a:solidFill>
+                <a:effectLst/>
+              </a:rPr>
+              <a:t>, con operazioni atomiche di "down" e "up" per garantire la sincronizzazione.</a:t>
             </a:r>
           </a:p>
         </p:txBody>
@@ -12165,7 +11698,7 @@
     </p:spTree>
     <p:extLst>
       <p:ext uri="{BB962C8B-B14F-4D97-AF65-F5344CB8AC3E}">
-        <p14:creationId xmlns:p14="http://schemas.microsoft.com/office/powerpoint/2010/main" val="1952330264"/>
+        <p14:creationId xmlns:p14="http://schemas.microsoft.com/office/powerpoint/2010/main" val="4198586686"/>
       </p:ext>
     </p:extLst>
   </p:cSld>
@@ -12221,6 +11754,643 @@
             </a:r>
             <a:r>
               <a:rPr lang="it-IT" sz="1600" dirty="0"/>
+              <a:t>– lock (</a:t>
+            </a:r>
+            <a:r>
+              <a:rPr lang="it-IT" sz="1600" dirty="0" err="1"/>
+              <a:t>mutex</a:t>
+            </a:r>
+            <a:r>
+              <a:rPr lang="it-IT" sz="1600" dirty="0"/>
+              <a:t>)</a:t>
+            </a:r>
+            <a:endParaRPr lang="it-IT" dirty="0"/>
+          </a:p>
+        </p:txBody>
+      </p:sp>
+      <p:sp>
+        <p:nvSpPr>
+          <p:cNvPr id="4" name="Segnaposto testo 3">
+            <a:extLst>
+              <a:ext uri="{FF2B5EF4-FFF2-40B4-BE49-F238E27FC236}">
+                <a16:creationId xmlns:a16="http://schemas.microsoft.com/office/drawing/2014/main" id="{3484543A-BB31-0207-182F-1F1C206F0C68}"/>
+              </a:ext>
+            </a:extLst>
+          </p:cNvPr>
+          <p:cNvSpPr>
+            <a:spLocks noGrp="1"/>
+          </p:cNvSpPr>
+          <p:nvPr>
+            <p:ph type="body" idx="1"/>
+          </p:nvPr>
+        </p:nvSpPr>
+        <p:spPr>
+          <a:xfrm>
+            <a:off x="887219" y="2555699"/>
+            <a:ext cx="5087075" cy="536005"/>
+          </a:xfrm>
+        </p:spPr>
+        <p:txBody>
+          <a:bodyPr/>
+          <a:lstStyle/>
+          <a:p>
+            <a:r>
+              <a:rPr lang="it-IT" dirty="0"/>
+              <a:t>OS161</a:t>
+            </a:r>
+          </a:p>
+        </p:txBody>
+      </p:sp>
+      <p:sp>
+        <p:nvSpPr>
+          <p:cNvPr id="8" name="Segnaposto contenuto 7">
+            <a:extLst>
+              <a:ext uri="{FF2B5EF4-FFF2-40B4-BE49-F238E27FC236}">
+                <a16:creationId xmlns:a16="http://schemas.microsoft.com/office/drawing/2014/main" id="{A1E5DF89-94E7-98C4-F563-B3A43317A1CE}"/>
+              </a:ext>
+            </a:extLst>
+          </p:cNvPr>
+          <p:cNvSpPr>
+            <a:spLocks noGrp="1"/>
+          </p:cNvSpPr>
+          <p:nvPr>
+            <p:ph sz="half" idx="2"/>
+          </p:nvPr>
+        </p:nvSpPr>
+        <p:spPr>
+          <a:xfrm>
+            <a:off x="581194" y="3230859"/>
+            <a:ext cx="5393100" cy="2934999"/>
+          </a:xfrm>
+        </p:spPr>
+        <p:txBody>
+          <a:bodyPr>
+            <a:noAutofit/>
+          </a:bodyPr>
+          <a:lstStyle/>
+          <a:p>
+            <a:r>
+              <a:rPr lang="it-IT" sz="1600" dirty="0"/>
+              <a:t>Lock implementato come </a:t>
+            </a:r>
+            <a:r>
+              <a:rPr lang="it-IT" sz="1600" dirty="0" err="1"/>
+              <a:t>struct</a:t>
+            </a:r>
+            <a:r>
+              <a:rPr lang="it-IT" sz="1600" dirty="0"/>
+              <a:t> contenente:</a:t>
+            </a:r>
+          </a:p>
+          <a:p>
+            <a:pPr lvl="1"/>
+            <a:r>
+              <a:rPr lang="it-IT" dirty="0"/>
+              <a:t>nome: per identificare il lock</a:t>
+            </a:r>
+          </a:p>
+          <a:p>
+            <a:pPr lvl="1"/>
+            <a:r>
+              <a:rPr lang="it-IT" dirty="0"/>
+              <a:t>HANGMAN_LOCKABLE: per rilevare i deadlock</a:t>
+            </a:r>
+          </a:p>
+          <a:p>
+            <a:r>
+              <a:rPr lang="it-IT" sz="1600" dirty="0"/>
+              <a:t>Le operazioni sui Lock sono simili a quelle che offre </a:t>
+            </a:r>
+            <a:r>
+              <a:rPr lang="it-IT" sz="1600" dirty="0" err="1"/>
+              <a:t>PintOS</a:t>
+            </a:r>
+            <a:endParaRPr lang="it-IT" sz="1600" dirty="0"/>
+          </a:p>
+          <a:p>
+            <a:r>
+              <a:rPr lang="it-IT" sz="1600" dirty="0"/>
+              <a:t>La differenza principale è che OS161 utilizza anche un hook per riconoscere e prevenire i deadlock</a:t>
+            </a:r>
+          </a:p>
+          <a:p>
+            <a:pPr lvl="1"/>
+            <a:r>
+              <a:rPr lang="it-IT" dirty="0"/>
+              <a:t>Il rilevatore di deadlock di OS161 utilizza un approccio basato sul grafo per rilevare i deadlock. I </a:t>
+            </a:r>
+            <a:r>
+              <a:rPr lang="it-IT" dirty="0" err="1"/>
+              <a:t>thread</a:t>
+            </a:r>
+            <a:r>
+              <a:rPr lang="it-IT" dirty="0"/>
+              <a:t> e i lock vengono rappresentati come nodi e archi in un grafo. Il codice di rilevamento dei deadlock controlla il grafo per rilevare cicli. Se viene rilevato un ciclo, significa che esiste un deadlock</a:t>
+            </a:r>
+          </a:p>
+          <a:p>
+            <a:endParaRPr lang="it-IT" sz="1600" dirty="0"/>
+          </a:p>
+        </p:txBody>
+      </p:sp>
+      <p:sp>
+        <p:nvSpPr>
+          <p:cNvPr id="9" name="Segnaposto testo 8">
+            <a:extLst>
+              <a:ext uri="{FF2B5EF4-FFF2-40B4-BE49-F238E27FC236}">
+                <a16:creationId xmlns:a16="http://schemas.microsoft.com/office/drawing/2014/main" id="{00842FCF-9A2A-27B3-4ED6-BB0713CE4444}"/>
+              </a:ext>
+            </a:extLst>
+          </p:cNvPr>
+          <p:cNvSpPr>
+            <a:spLocks noGrp="1"/>
+          </p:cNvSpPr>
+          <p:nvPr>
+            <p:ph type="body" sz="quarter" idx="3"/>
+          </p:nvPr>
+        </p:nvSpPr>
+        <p:spPr>
+          <a:xfrm>
+            <a:off x="6523735" y="2555699"/>
+            <a:ext cx="5087073" cy="553373"/>
+          </a:xfrm>
+        </p:spPr>
+        <p:txBody>
+          <a:bodyPr/>
+          <a:lstStyle/>
+          <a:p>
+            <a:r>
+              <a:rPr lang="it-IT" dirty="0"/>
+              <a:t>PINTOS</a:t>
+            </a:r>
+          </a:p>
+        </p:txBody>
+      </p:sp>
+      <p:sp>
+        <p:nvSpPr>
+          <p:cNvPr id="10" name="Segnaposto contenuto 9">
+            <a:extLst>
+              <a:ext uri="{FF2B5EF4-FFF2-40B4-BE49-F238E27FC236}">
+                <a16:creationId xmlns:a16="http://schemas.microsoft.com/office/drawing/2014/main" id="{3CDA2ECB-1671-3745-42C6-213A778ECD29}"/>
+              </a:ext>
+            </a:extLst>
+          </p:cNvPr>
+          <p:cNvSpPr>
+            <a:spLocks noGrp="1"/>
+          </p:cNvSpPr>
+          <p:nvPr>
+            <p:ph sz="quarter" idx="4"/>
+          </p:nvPr>
+        </p:nvSpPr>
+        <p:spPr>
+          <a:xfrm>
+            <a:off x="6217709" y="3230859"/>
+            <a:ext cx="5393100" cy="2934999"/>
+          </a:xfrm>
+        </p:spPr>
+        <p:txBody>
+          <a:bodyPr>
+            <a:noAutofit/>
+          </a:bodyPr>
+          <a:lstStyle/>
+          <a:p>
+            <a:r>
+              <a:rPr lang="it-IT" sz="1600" dirty="0"/>
+              <a:t>Lock implementato come </a:t>
+            </a:r>
+            <a:r>
+              <a:rPr lang="it-IT" sz="1600" dirty="0" err="1"/>
+              <a:t>struct</a:t>
+            </a:r>
+            <a:r>
+              <a:rPr lang="it-IT" sz="1600" dirty="0"/>
+              <a:t> contenente:</a:t>
+            </a:r>
+          </a:p>
+          <a:p>
+            <a:pPr lvl="1"/>
+            <a:r>
+              <a:rPr lang="it-IT" dirty="0" err="1"/>
+              <a:t>thread</a:t>
+            </a:r>
+            <a:r>
+              <a:rPr lang="it-IT" dirty="0"/>
+              <a:t>: chi detiene il lock</a:t>
+            </a:r>
+          </a:p>
+          <a:p>
+            <a:pPr lvl="1"/>
+            <a:r>
+              <a:rPr lang="it-IT" dirty="0" err="1"/>
+              <a:t>semaphore</a:t>
+            </a:r>
+            <a:r>
+              <a:rPr lang="it-IT" dirty="0"/>
+              <a:t>: struttura semaforo binario per il controllo degli accessi</a:t>
+            </a:r>
+          </a:p>
+          <a:p>
+            <a:r>
+              <a:rPr lang="it-IT" sz="1600" dirty="0"/>
+              <a:t>Le funzioni sui Lock sono: </a:t>
+            </a:r>
+          </a:p>
+          <a:p>
+            <a:pPr lvl="1"/>
+            <a:r>
+              <a:rPr lang="it-IT" sz="1200" b="1" dirty="0" err="1"/>
+              <a:t>lock_init</a:t>
+            </a:r>
+            <a:r>
+              <a:rPr lang="it-IT" sz="1200" dirty="0"/>
+              <a:t> : Inizializza un nuovo lock.</a:t>
+            </a:r>
+          </a:p>
+          <a:p>
+            <a:pPr lvl="1"/>
+            <a:r>
+              <a:rPr lang="it-IT" sz="1200" b="1" dirty="0" err="1"/>
+              <a:t>lock_acquire</a:t>
+            </a:r>
+            <a:r>
+              <a:rPr lang="it-IT" sz="1200" dirty="0"/>
+              <a:t> : Acquisisce il lock, aspettando, se necessario, il suo rilascio.</a:t>
+            </a:r>
+          </a:p>
+          <a:p>
+            <a:pPr lvl="1"/>
+            <a:r>
+              <a:rPr lang="it-IT" sz="1200" b="1" dirty="0" err="1"/>
+              <a:t>lock_try_acquire</a:t>
+            </a:r>
+            <a:r>
+              <a:rPr lang="it-IT" sz="1200" dirty="0"/>
+              <a:t> : Prova ad acquisire il lock senza attendere.</a:t>
+            </a:r>
+          </a:p>
+          <a:p>
+            <a:pPr lvl="1"/>
+            <a:r>
+              <a:rPr lang="it-IT" sz="1200" b="1" dirty="0" err="1"/>
+              <a:t>lock_release</a:t>
+            </a:r>
+            <a:r>
+              <a:rPr lang="it-IT" sz="1200" dirty="0"/>
+              <a:t> : Rilascia il lock detenuto dal </a:t>
+            </a:r>
+            <a:r>
+              <a:rPr lang="it-IT" sz="1200" dirty="0" err="1"/>
+              <a:t>thread</a:t>
+            </a:r>
+            <a:r>
+              <a:rPr lang="it-IT" sz="1200" dirty="0"/>
+              <a:t> corrente.</a:t>
+            </a:r>
+          </a:p>
+          <a:p>
+            <a:pPr lvl="1"/>
+            <a:r>
+              <a:rPr lang="it-IT" sz="1200" b="1" dirty="0" err="1"/>
+              <a:t>lock_held_by_current_thread</a:t>
+            </a:r>
+            <a:r>
+              <a:rPr lang="it-IT" sz="1200" dirty="0"/>
+              <a:t> : Verifica se il </a:t>
+            </a:r>
+            <a:r>
+              <a:rPr lang="it-IT" sz="1200" dirty="0" err="1"/>
+              <a:t>thread</a:t>
+            </a:r>
+            <a:r>
+              <a:rPr lang="it-IT" sz="1200" dirty="0"/>
+              <a:t> in esecuzione possiede il lock.</a:t>
+            </a:r>
+          </a:p>
+          <a:p>
+            <a:pPr marL="324000" lvl="1" indent="0">
+              <a:buNone/>
+            </a:pPr>
+            <a:endParaRPr lang="it-IT" dirty="0"/>
+          </a:p>
+        </p:txBody>
+      </p:sp>
+      <p:sp>
+        <p:nvSpPr>
+          <p:cNvPr id="3" name="Segnaposto testo 3">
+            <a:extLst>
+              <a:ext uri="{FF2B5EF4-FFF2-40B4-BE49-F238E27FC236}">
+                <a16:creationId xmlns:a16="http://schemas.microsoft.com/office/drawing/2014/main" id="{DD092F63-1123-8337-F4DC-4B5BF08C3E1F}"/>
+              </a:ext>
+            </a:extLst>
+          </p:cNvPr>
+          <p:cNvSpPr txBox="1">
+            <a:spLocks/>
+          </p:cNvSpPr>
+          <p:nvPr/>
+        </p:nvSpPr>
+        <p:spPr>
+          <a:xfrm>
+            <a:off x="615548" y="1641236"/>
+            <a:ext cx="11245148" cy="921080"/>
+          </a:xfrm>
+          <a:prstGeom prst="rect">
+            <a:avLst/>
+          </a:prstGeom>
+        </p:spPr>
+        <p:txBody>
+          <a:bodyPr vert="horz" lIns="91440" tIns="45720" rIns="91440" bIns="45720" rtlCol="0" anchor="b">
+            <a:noAutofit/>
+          </a:bodyPr>
+          <a:lstStyle>
+            <a:lvl1pPr marL="0" indent="0" algn="l" defTabSz="457200" rtl="0" eaLnBrk="1" latinLnBrk="0" hangingPunct="1">
+              <a:spcBef>
+                <a:spcPct val="20000"/>
+              </a:spcBef>
+              <a:spcAft>
+                <a:spcPts val="600"/>
+              </a:spcAft>
+              <a:buClr>
+                <a:schemeClr val="accent2"/>
+              </a:buClr>
+              <a:buSzPct val="92000"/>
+              <a:buFont typeface="Wingdings 2" panose="05020102010507070707" pitchFamily="18" charset="2"/>
+              <a:buNone/>
+              <a:defRPr sz="2200" b="0" kern="1200">
+                <a:solidFill>
+                  <a:schemeClr val="accent2"/>
+                </a:solidFill>
+                <a:latin typeface="+mn-lt"/>
+                <a:ea typeface="+mn-ea"/>
+                <a:cs typeface="+mn-cs"/>
+              </a:defRPr>
+            </a:lvl1pPr>
+            <a:lvl2pPr marL="457200" indent="0" algn="l" defTabSz="457200" rtl="0" eaLnBrk="1" latinLnBrk="0" hangingPunct="1">
+              <a:spcBef>
+                <a:spcPct val="20000"/>
+              </a:spcBef>
+              <a:spcAft>
+                <a:spcPts val="600"/>
+              </a:spcAft>
+              <a:buClr>
+                <a:schemeClr val="accent2"/>
+              </a:buClr>
+              <a:buSzPct val="92000"/>
+              <a:buFont typeface="Wingdings 2" panose="05020102010507070707" pitchFamily="18" charset="2"/>
+              <a:buNone/>
+              <a:defRPr sz="2000" b="1" kern="1200">
+                <a:solidFill>
+                  <a:schemeClr val="tx2"/>
+                </a:solidFill>
+                <a:latin typeface="+mn-lt"/>
+                <a:ea typeface="+mn-ea"/>
+                <a:cs typeface="+mn-cs"/>
+              </a:defRPr>
+            </a:lvl2pPr>
+            <a:lvl3pPr marL="914400" indent="0" algn="l" defTabSz="457200" rtl="0" eaLnBrk="1" latinLnBrk="0" hangingPunct="1">
+              <a:spcBef>
+                <a:spcPct val="20000"/>
+              </a:spcBef>
+              <a:spcAft>
+                <a:spcPts val="600"/>
+              </a:spcAft>
+              <a:buClr>
+                <a:schemeClr val="accent2"/>
+              </a:buClr>
+              <a:buSzPct val="92000"/>
+              <a:buFont typeface="Wingdings 2" panose="05020102010507070707" pitchFamily="18" charset="2"/>
+              <a:buNone/>
+              <a:defRPr sz="1800" b="1" kern="1200">
+                <a:solidFill>
+                  <a:schemeClr val="tx2"/>
+                </a:solidFill>
+                <a:latin typeface="+mn-lt"/>
+                <a:ea typeface="+mn-ea"/>
+                <a:cs typeface="+mn-cs"/>
+              </a:defRPr>
+            </a:lvl3pPr>
+            <a:lvl4pPr marL="1371600" indent="0" algn="l" defTabSz="457200" rtl="0" eaLnBrk="1" latinLnBrk="0" hangingPunct="1">
+              <a:spcBef>
+                <a:spcPct val="20000"/>
+              </a:spcBef>
+              <a:spcAft>
+                <a:spcPts val="600"/>
+              </a:spcAft>
+              <a:buClr>
+                <a:schemeClr val="accent2"/>
+              </a:buClr>
+              <a:buSzPct val="92000"/>
+              <a:buFont typeface="Wingdings 2" panose="05020102010507070707" pitchFamily="18" charset="2"/>
+              <a:buNone/>
+              <a:defRPr sz="1600" b="1" kern="1200">
+                <a:solidFill>
+                  <a:schemeClr val="tx2"/>
+                </a:solidFill>
+                <a:latin typeface="+mn-lt"/>
+                <a:ea typeface="+mn-ea"/>
+                <a:cs typeface="+mn-cs"/>
+              </a:defRPr>
+            </a:lvl4pPr>
+            <a:lvl5pPr marL="1828800" indent="0" algn="l" defTabSz="457200" rtl="0" eaLnBrk="1" latinLnBrk="0" hangingPunct="1">
+              <a:spcBef>
+                <a:spcPct val="20000"/>
+              </a:spcBef>
+              <a:spcAft>
+                <a:spcPts val="600"/>
+              </a:spcAft>
+              <a:buClr>
+                <a:schemeClr val="accent2"/>
+              </a:buClr>
+              <a:buSzPct val="92000"/>
+              <a:buFont typeface="Wingdings 2" panose="05020102010507070707" pitchFamily="18" charset="2"/>
+              <a:buNone/>
+              <a:defRPr sz="1600" b="1" kern="1200">
+                <a:solidFill>
+                  <a:schemeClr val="tx2"/>
+                </a:solidFill>
+                <a:latin typeface="+mn-lt"/>
+                <a:ea typeface="+mn-ea"/>
+                <a:cs typeface="+mn-cs"/>
+              </a:defRPr>
+            </a:lvl5pPr>
+            <a:lvl6pPr marL="2286000" indent="0" algn="l" defTabSz="457200" rtl="0" eaLnBrk="1" latinLnBrk="0" hangingPunct="1">
+              <a:spcBef>
+                <a:spcPct val="20000"/>
+              </a:spcBef>
+              <a:spcAft>
+                <a:spcPts val="600"/>
+              </a:spcAft>
+              <a:buClr>
+                <a:schemeClr val="accent2"/>
+              </a:buClr>
+              <a:buSzPct val="92000"/>
+              <a:buFont typeface="Wingdings 2" panose="05020102010507070707" pitchFamily="18" charset="2"/>
+              <a:buNone/>
+              <a:defRPr sz="1600" b="1" kern="1200">
+                <a:solidFill>
+                  <a:schemeClr val="tx2"/>
+                </a:solidFill>
+                <a:latin typeface="+mn-lt"/>
+                <a:ea typeface="+mn-ea"/>
+                <a:cs typeface="+mn-cs"/>
+              </a:defRPr>
+            </a:lvl6pPr>
+            <a:lvl7pPr marL="2743200" indent="0" algn="l" defTabSz="457200" rtl="0" eaLnBrk="1" latinLnBrk="0" hangingPunct="1">
+              <a:spcBef>
+                <a:spcPct val="20000"/>
+              </a:spcBef>
+              <a:spcAft>
+                <a:spcPts val="600"/>
+              </a:spcAft>
+              <a:buClr>
+                <a:schemeClr val="accent2"/>
+              </a:buClr>
+              <a:buSzPct val="92000"/>
+              <a:buFont typeface="Wingdings 2" panose="05020102010507070707" pitchFamily="18" charset="2"/>
+              <a:buNone/>
+              <a:defRPr sz="1600" b="1" kern="1200">
+                <a:solidFill>
+                  <a:schemeClr val="tx2"/>
+                </a:solidFill>
+                <a:latin typeface="+mn-lt"/>
+                <a:ea typeface="+mn-ea"/>
+                <a:cs typeface="+mn-cs"/>
+              </a:defRPr>
+            </a:lvl7pPr>
+            <a:lvl8pPr marL="3200400" indent="0" algn="l" defTabSz="457200" rtl="0" eaLnBrk="1" latinLnBrk="0" hangingPunct="1">
+              <a:spcBef>
+                <a:spcPct val="20000"/>
+              </a:spcBef>
+              <a:spcAft>
+                <a:spcPts val="600"/>
+              </a:spcAft>
+              <a:buClr>
+                <a:schemeClr val="accent2"/>
+              </a:buClr>
+              <a:buSzPct val="92000"/>
+              <a:buFont typeface="Wingdings 2" panose="05020102010507070707" pitchFamily="18" charset="2"/>
+              <a:buNone/>
+              <a:defRPr sz="1600" b="1" kern="1200">
+                <a:solidFill>
+                  <a:schemeClr val="tx2"/>
+                </a:solidFill>
+                <a:latin typeface="+mn-lt"/>
+                <a:ea typeface="+mn-ea"/>
+                <a:cs typeface="+mn-cs"/>
+              </a:defRPr>
+            </a:lvl8pPr>
+            <a:lvl9pPr marL="3657600" indent="0" algn="l" defTabSz="457200" rtl="0" eaLnBrk="1" latinLnBrk="0" hangingPunct="1">
+              <a:spcBef>
+                <a:spcPct val="20000"/>
+              </a:spcBef>
+              <a:spcAft>
+                <a:spcPts val="600"/>
+              </a:spcAft>
+              <a:buClr>
+                <a:schemeClr val="accent2"/>
+              </a:buClr>
+              <a:buSzPct val="92000"/>
+              <a:buFont typeface="Wingdings 2" panose="05020102010507070707" pitchFamily="18" charset="2"/>
+              <a:buNone/>
+              <a:defRPr sz="1600" b="1" kern="1200">
+                <a:solidFill>
+                  <a:schemeClr val="tx2"/>
+                </a:solidFill>
+                <a:latin typeface="+mn-lt"/>
+                <a:ea typeface="+mn-ea"/>
+                <a:cs typeface="+mn-cs"/>
+              </a:defRPr>
+            </a:lvl9pPr>
+          </a:lstStyle>
+          <a:p>
+            <a:r>
+              <a:rPr lang="it-IT" sz="2000" b="0" dirty="0">
+                <a:solidFill>
+                  <a:schemeClr val="tx1"/>
+                </a:solidFill>
+                <a:effectLst/>
+              </a:rPr>
+              <a:t>Un </a:t>
+            </a:r>
+            <a:r>
+              <a:rPr lang="it-IT" sz="2000" dirty="0">
+                <a:solidFill>
+                  <a:schemeClr val="tx1"/>
+                </a:solidFill>
+                <a:effectLst/>
+              </a:rPr>
+              <a:t>lock</a:t>
+            </a:r>
+            <a:r>
+              <a:rPr lang="it-IT" sz="2000" b="0" dirty="0">
+                <a:solidFill>
+                  <a:schemeClr val="tx1"/>
+                </a:solidFill>
+                <a:effectLst/>
+              </a:rPr>
+              <a:t> è analogo a un semaforo con un valore iniziale di 1, equivalente al verde di un semaforo. L'azione "up" di un lock è chiamata "rilascio", mentre l'azione "down" è detta "acquisizione".</a:t>
+            </a:r>
+          </a:p>
+        </p:txBody>
+      </p:sp>
+    </p:spTree>
+    <p:extLst>
+      <p:ext uri="{BB962C8B-B14F-4D97-AF65-F5344CB8AC3E}">
+        <p14:creationId xmlns:p14="http://schemas.microsoft.com/office/powerpoint/2010/main" val="1952330264"/>
+      </p:ext>
+    </p:extLst>
+  </p:cSld>
+  <p:clrMapOvr>
+    <a:masterClrMapping/>
+  </p:clrMapOvr>
+</p:sld>
+</file>
+
+<file path=ppt/slides/slide14.xml><?xml version="1.0" encoding="utf-8"?>
+<p:sld xmlns:a="http://schemas.openxmlformats.org/drawingml/2006/main" xmlns:r="http://schemas.openxmlformats.org/officeDocument/2006/relationships" xmlns:p="http://schemas.openxmlformats.org/presentationml/2006/main">
+  <p:cSld>
+    <p:spTree>
+      <p:nvGrpSpPr>
+        <p:cNvPr id="1" name=""/>
+        <p:cNvGrpSpPr/>
+        <p:nvPr/>
+      </p:nvGrpSpPr>
+      <p:grpSpPr>
+        <a:xfrm>
+          <a:off x="0" y="0"/>
+          <a:ext cx="0" cy="0"/>
+          <a:chOff x="0" y="0"/>
+          <a:chExt cx="0" cy="0"/>
+        </a:xfrm>
+      </p:grpSpPr>
+      <p:sp>
+        <p:nvSpPr>
+          <p:cNvPr id="2" name="Titolo 1">
+            <a:extLst>
+              <a:ext uri="{FF2B5EF4-FFF2-40B4-BE49-F238E27FC236}">
+                <a16:creationId xmlns:a16="http://schemas.microsoft.com/office/drawing/2014/main" id="{69441F67-1949-8EC8-EB98-85670AC3670C}"/>
+              </a:ext>
+            </a:extLst>
+          </p:cNvPr>
+          <p:cNvSpPr>
+            <a:spLocks noGrp="1"/>
+          </p:cNvSpPr>
+          <p:nvPr>
+            <p:ph type="title"/>
+          </p:nvPr>
+        </p:nvSpPr>
+        <p:spPr/>
+        <p:txBody>
+          <a:bodyPr>
+            <a:normAutofit/>
+          </a:bodyPr>
+          <a:lstStyle/>
+          <a:p>
+            <a:r>
+              <a:rPr lang="it-IT" dirty="0"/>
+              <a:t>Meccanismi di sincronizzazione </a:t>
+            </a:r>
+            <a:r>
+              <a:rPr lang="it-IT" sz="1600" dirty="0"/>
               <a:t>– SPINLOCK</a:t>
             </a:r>
             <a:endParaRPr lang="it-IT" dirty="0"/>
@@ -13887,7 +14057,7 @@
 </p:sld>
 </file>
 
-<file path=ppt/slides/slide14.xml><?xml version="1.0" encoding="utf-8"?>
+<file path=ppt/slides/slide15.xml><?xml version="1.0" encoding="utf-8"?>
 <p:sld xmlns:a="http://schemas.openxmlformats.org/drawingml/2006/main" xmlns:r="http://schemas.openxmlformats.org/officeDocument/2006/relationships" xmlns:p="http://schemas.openxmlformats.org/presentationml/2006/main">
   <p:cSld>
     <p:spTree>
@@ -14916,8 +15086,8 @@
         </p:nvSpPr>
         <p:spPr>
           <a:xfrm>
-            <a:off x="581025" y="2181224"/>
-            <a:ext cx="11029950" cy="3905539"/>
+            <a:off x="581025" y="2041236"/>
+            <a:ext cx="11029950" cy="4027055"/>
           </a:xfrm>
         </p:spPr>
         <p:txBody>
@@ -14928,17 +15098,28 @@
           <a:p>
             <a:r>
               <a:rPr lang="it-IT" dirty="0"/>
-              <a:t>Le politiche di scheduling risultano simili </a:t>
-            </a:r>
-            <a:r>
-              <a:rPr lang="it-IT" dirty="0">
-                <a:sym typeface="Wingdings" panose="05000000000000000000" pitchFamily="2" charset="2"/>
-              </a:rPr>
-              <a:t> </a:t>
+              <a:t>Sia OS161 che </a:t>
+            </a:r>
+            <a:r>
+              <a:rPr lang="it-IT" dirty="0" err="1"/>
+              <a:t>Pintos</a:t>
             </a:r>
             <a:r>
               <a:rPr lang="it-IT" dirty="0"/>
-              <a:t>approccio base Round Robin (RR)</a:t>
+              <a:t> implementano l'algoritmo Round Robin (RR), un metodo di scheduling in cui i processi vengono eseguiti in modo circolare</a:t>
+            </a:r>
+          </a:p>
+          <a:p>
+            <a:pPr lvl="1"/>
+            <a:r>
+              <a:rPr lang="it-IT" dirty="0"/>
+              <a:t>Ogni processo riceve un quantum di tempo assegnato, e quando il quantum scade, il processo viene messo in coda, permettendo l'esecuzione del successivo processo pronto.</a:t>
+            </a:r>
+          </a:p>
+          <a:p>
+            <a:r>
+              <a:rPr lang="it-IT" dirty="0"/>
+              <a:t>Nella versione base, per entrambi i sistemi non esiste il concetto di priorità: tutti i thread sono trattati allo stesso modo</a:t>
             </a:r>
           </a:p>
           <a:p>
@@ -14982,12 +15163,6 @@
             <a:r>
               <a:rPr lang="it-IT" dirty="0"/>
               <a:t> Scheduling</a:t>
-            </a:r>
-          </a:p>
-          <a:p>
-            <a:r>
-              <a:rPr lang="it-IT" dirty="0"/>
-              <a:t>Nella versione base, per entrambi i sistemi non esiste il concetto di priorità: tutti i thread sono trattati allo stesso modo</a:t>
             </a:r>
           </a:p>
         </p:txBody>
@@ -15053,7 +15228,11 @@
           <a:p>
             <a:r>
               <a:rPr lang="it-IT" dirty="0"/>
-              <a:t>Scheduling: implementazione</a:t>
+              <a:t>Scheduling - </a:t>
+            </a:r>
+            <a:r>
+              <a:rPr lang="it-IT" sz="1600" dirty="0"/>
+              <a:t>implementazione</a:t>
             </a:r>
           </a:p>
         </p:txBody>
@@ -15074,7 +15253,12 @@
             <p:ph type="body" idx="1"/>
           </p:nvPr>
         </p:nvSpPr>
-        <p:spPr/>
+        <p:spPr>
+          <a:xfrm>
+            <a:off x="757915" y="2010756"/>
+            <a:ext cx="5087075" cy="536005"/>
+          </a:xfrm>
+        </p:spPr>
         <p:txBody>
           <a:bodyPr/>
           <a:lstStyle/>
@@ -15102,11 +15286,50 @@
             <p:ph sz="half" idx="2"/>
           </p:nvPr>
         </p:nvSpPr>
-        <p:spPr/>
+        <p:spPr>
+          <a:xfrm>
+            <a:off x="451890" y="2612020"/>
+            <a:ext cx="5393100" cy="1064054"/>
+          </a:xfrm>
+        </p:spPr>
         <p:txBody>
-          <a:bodyPr/>
+          <a:bodyPr>
+            <a:normAutofit/>
+          </a:bodyPr>
           <a:lstStyle/>
           <a:p>
+            <a:r>
+              <a:rPr lang="it-IT" sz="1700" dirty="0"/>
+              <a:t>Il meccanismo del Round Robin viene gestito tramite la funzione </a:t>
+            </a:r>
+            <a:r>
+              <a:rPr lang="en-GB" sz="1700" kern="0" dirty="0" err="1">
+                <a:solidFill>
+                  <a:srgbClr val="1C00CF"/>
+                </a:solidFill>
+                <a:effectLst/>
+                <a:latin typeface="Consolas" panose="020B0609020204030204" pitchFamily="49" charset="0"/>
+                <a:ea typeface="Times New Roman" panose="02020603050405020304" pitchFamily="18" charset="0"/>
+                <a:cs typeface="Courier New" panose="02070309020205020404" pitchFamily="49" charset="0"/>
+              </a:rPr>
+              <a:t>hardclock</a:t>
+            </a:r>
+            <a:r>
+              <a:rPr lang="en-GB" sz="1700" kern="0" dirty="0">
+                <a:solidFill>
+                  <a:srgbClr val="1C00CF"/>
+                </a:solidFill>
+                <a:effectLst/>
+                <a:latin typeface="Consolas" panose="020B0609020204030204" pitchFamily="49" charset="0"/>
+                <a:ea typeface="Times New Roman" panose="02020603050405020304" pitchFamily="18" charset="0"/>
+                <a:cs typeface="Courier New" panose="02070309020205020404" pitchFamily="49" charset="0"/>
+              </a:rPr>
+              <a:t>()</a:t>
+            </a:r>
+            <a:r>
+              <a:rPr lang="it-IT" sz="1700" dirty="0"/>
+              <a:t>, periodicamente chiamata dal gestore delle interruzioni del clock hardware.</a:t>
+            </a:r>
             <a:endParaRPr lang="it-IT" dirty="0"/>
           </a:p>
         </p:txBody>
@@ -15127,7 +15350,12 @@
             <p:ph type="body" sz="quarter" idx="3"/>
           </p:nvPr>
         </p:nvSpPr>
-        <p:spPr/>
+        <p:spPr>
+          <a:xfrm>
+            <a:off x="6523735" y="2010756"/>
+            <a:ext cx="5087073" cy="553373"/>
+          </a:xfrm>
+        </p:spPr>
         <p:txBody>
           <a:bodyPr/>
           <a:lstStyle/>
@@ -15139,12 +15367,42 @@
           </a:p>
         </p:txBody>
       </p:sp>
+      <p:pic>
+        <p:nvPicPr>
+          <p:cNvPr id="19" name="Immagine 18">
+            <a:extLst>
+              <a:ext uri="{FF2B5EF4-FFF2-40B4-BE49-F238E27FC236}">
+                <a16:creationId xmlns:a16="http://schemas.microsoft.com/office/drawing/2014/main" id="{29505993-EDE1-B360-A580-1C8E2FDF6673}"/>
+              </a:ext>
+            </a:extLst>
+          </p:cNvPr>
+          <p:cNvPicPr>
+            <a:picLocks noChangeAspect="1"/>
+          </p:cNvPicPr>
+          <p:nvPr/>
+        </p:nvPicPr>
+        <p:blipFill>
+          <a:blip r:embed="rId2"/>
+          <a:stretch>
+            <a:fillRect/>
+          </a:stretch>
+        </p:blipFill>
+        <p:spPr>
+          <a:xfrm>
+            <a:off x="670649" y="4193310"/>
+            <a:ext cx="5261606" cy="2400329"/>
+          </a:xfrm>
+          <a:prstGeom prst="rect">
+            <a:avLst/>
+          </a:prstGeom>
+        </p:spPr>
+      </p:pic>
       <p:sp>
         <p:nvSpPr>
-          <p:cNvPr id="9" name="Segnaposto contenuto 8">
+          <p:cNvPr id="4" name="Segnaposto contenuto 3">
             <a:extLst>
               <a:ext uri="{FF2B5EF4-FFF2-40B4-BE49-F238E27FC236}">
-                <a16:creationId xmlns:a16="http://schemas.microsoft.com/office/drawing/2014/main" id="{B12A5F1B-40EE-DC65-C3E0-378C1057B7AC}"/>
+                <a16:creationId xmlns:a16="http://schemas.microsoft.com/office/drawing/2014/main" id="{39338A3F-5D44-2086-005D-7FD332C6F7C1}"/>
               </a:ext>
             </a:extLst>
           </p:cNvPr>
@@ -15155,12 +15413,312 @@
             <p:ph sz="quarter" idx="4"/>
           </p:nvPr>
         </p:nvSpPr>
-        <p:spPr/>
+        <p:spPr>
+          <a:xfrm>
+            <a:off x="6217708" y="2612020"/>
+            <a:ext cx="5614073" cy="1459084"/>
+          </a:xfrm>
+        </p:spPr>
         <p:txBody>
-          <a:bodyPr/>
+          <a:bodyPr>
+            <a:normAutofit/>
+          </a:bodyPr>
           <a:lstStyle/>
           <a:p>
-            <a:endParaRPr lang="it-IT"/>
+            <a:r>
+              <a:rPr lang="it-IT" sz="1700" dirty="0"/>
+              <a:t>Ad ogni interrupt del timer, la variabile globale </a:t>
+            </a:r>
+            <a:r>
+              <a:rPr lang="it-IT" sz="1700" kern="0" dirty="0" err="1">
+                <a:solidFill>
+                  <a:srgbClr val="1C00CF"/>
+                </a:solidFill>
+                <a:latin typeface="Consolas" panose="020B0609020204030204" pitchFamily="49" charset="0"/>
+                <a:cs typeface="Courier New" panose="02070309020205020404" pitchFamily="49" charset="0"/>
+              </a:rPr>
+              <a:t>ticks</a:t>
+            </a:r>
+            <a:r>
+              <a:rPr lang="it-IT" sz="1700" dirty="0"/>
+              <a:t> viene incrementata di uno. Quando un thread esaurisce il suo quantum temporale, </a:t>
+            </a:r>
+            <a:r>
+              <a:rPr lang="it-IT" sz="1700" kern="0" dirty="0" err="1">
+                <a:solidFill>
+                  <a:srgbClr val="1C00CF"/>
+                </a:solidFill>
+                <a:latin typeface="Consolas" panose="020B0609020204030204" pitchFamily="49" charset="0"/>
+                <a:cs typeface="Courier New" panose="02070309020205020404" pitchFamily="49" charset="0"/>
+              </a:rPr>
+              <a:t>thread_tick</a:t>
+            </a:r>
+            <a:r>
+              <a:rPr lang="it-IT" sz="1700" dirty="0"/>
+              <a:t> chiama la funzione </a:t>
+            </a:r>
+            <a:r>
+              <a:rPr lang="it-IT" sz="1700" kern="0" dirty="0" err="1">
+                <a:solidFill>
+                  <a:srgbClr val="1C00CF"/>
+                </a:solidFill>
+                <a:latin typeface="Consolas" panose="020B0609020204030204" pitchFamily="49" charset="0"/>
+                <a:cs typeface="Courier New" panose="02070309020205020404" pitchFamily="49" charset="0"/>
+              </a:rPr>
+              <a:t>intr_yield_on_return</a:t>
+            </a:r>
+            <a:r>
+              <a:rPr lang="it-IT" sz="1700" kern="0" dirty="0">
+                <a:solidFill>
+                  <a:srgbClr val="1C00CF"/>
+                </a:solidFill>
+                <a:latin typeface="Consolas" panose="020B0609020204030204" pitchFamily="49" charset="0"/>
+                <a:cs typeface="Courier New" panose="02070309020205020404" pitchFamily="49" charset="0"/>
+              </a:rPr>
+              <a:t>()</a:t>
+            </a:r>
+            <a:r>
+              <a:rPr lang="it-IT" sz="1700" dirty="0"/>
+              <a:t> per effettuare uno switch di contesto</a:t>
+            </a:r>
+          </a:p>
+        </p:txBody>
+      </p:sp>
+      <p:pic>
+        <p:nvPicPr>
+          <p:cNvPr id="20" name="Immagine 19">
+            <a:extLst>
+              <a:ext uri="{FF2B5EF4-FFF2-40B4-BE49-F238E27FC236}">
+                <a16:creationId xmlns:a16="http://schemas.microsoft.com/office/drawing/2014/main" id="{CC4EBF07-F29B-14AC-E188-DED201948AAC}"/>
+              </a:ext>
+            </a:extLst>
+          </p:cNvPr>
+          <p:cNvPicPr>
+            <a:picLocks noChangeAspect="1"/>
+          </p:cNvPicPr>
+          <p:nvPr/>
+        </p:nvPicPr>
+        <p:blipFill rotWithShape="1">
+          <a:blip r:embed="rId3"/>
+          <a:srcRect r="14239"/>
+          <a:stretch/>
+        </p:blipFill>
+        <p:spPr>
+          <a:xfrm>
+            <a:off x="6708461" y="4193310"/>
+            <a:ext cx="4689212" cy="900862"/>
+          </a:xfrm>
+          <a:prstGeom prst="rect">
+            <a:avLst/>
+          </a:prstGeom>
+        </p:spPr>
+      </p:pic>
+      <p:pic>
+        <p:nvPicPr>
+          <p:cNvPr id="30" name="Immagine 29">
+            <a:extLst>
+              <a:ext uri="{FF2B5EF4-FFF2-40B4-BE49-F238E27FC236}">
+                <a16:creationId xmlns:a16="http://schemas.microsoft.com/office/drawing/2014/main" id="{37AD17E6-70CE-CD69-1998-BAA7AD052C71}"/>
+              </a:ext>
+            </a:extLst>
+          </p:cNvPr>
+          <p:cNvPicPr>
+            <a:picLocks noChangeAspect="1"/>
+          </p:cNvPicPr>
+          <p:nvPr/>
+        </p:nvPicPr>
+        <p:blipFill rotWithShape="1">
+          <a:blip r:embed="rId4"/>
+          <a:srcRect r="41372"/>
+          <a:stretch/>
+        </p:blipFill>
+        <p:spPr>
+          <a:xfrm>
+            <a:off x="6708461" y="5285117"/>
+            <a:ext cx="3349939" cy="1500271"/>
+          </a:xfrm>
+          <a:prstGeom prst="rect">
+            <a:avLst/>
+          </a:prstGeom>
+        </p:spPr>
+      </p:pic>
+      <p:sp>
+        <p:nvSpPr>
+          <p:cNvPr id="31" name="CasellaDiTesto 30">
+            <a:extLst>
+              <a:ext uri="{FF2B5EF4-FFF2-40B4-BE49-F238E27FC236}">
+                <a16:creationId xmlns:a16="http://schemas.microsoft.com/office/drawing/2014/main" id="{D8C638DF-3451-DE7A-8467-E132B7CC68B3}"/>
+              </a:ext>
+            </a:extLst>
+          </p:cNvPr>
+          <p:cNvSpPr txBox="1"/>
+          <p:nvPr/>
+        </p:nvSpPr>
+        <p:spPr>
+          <a:xfrm>
+            <a:off x="670649" y="3766908"/>
+            <a:ext cx="2854036" cy="338554"/>
+          </a:xfrm>
+          <a:prstGeom prst="rect">
+            <a:avLst/>
+          </a:prstGeom>
+          <a:noFill/>
+        </p:spPr>
+        <p:txBody>
+          <a:bodyPr wrap="square" rtlCol="0">
+            <a:spAutoFit/>
+          </a:bodyPr>
+          <a:lstStyle/>
+          <a:p>
+            <a:r>
+              <a:rPr lang="it-IT" sz="1600" dirty="0" err="1">
+                <a:solidFill>
+                  <a:schemeClr val="tx2"/>
+                </a:solidFill>
+              </a:rPr>
+              <a:t>kern</a:t>
+            </a:r>
+            <a:r>
+              <a:rPr lang="it-IT" sz="1600" dirty="0">
+                <a:solidFill>
+                  <a:schemeClr val="tx2"/>
+                </a:solidFill>
+              </a:rPr>
+              <a:t>/thread/</a:t>
+            </a:r>
+            <a:r>
+              <a:rPr lang="it-IT" sz="1600" dirty="0" err="1">
+                <a:solidFill>
+                  <a:schemeClr val="tx2"/>
+                </a:solidFill>
+              </a:rPr>
+              <a:t>clock.c</a:t>
+            </a:r>
+            <a:endParaRPr lang="it-IT" sz="1600" dirty="0">
+              <a:solidFill>
+                <a:schemeClr val="tx2"/>
+              </a:solidFill>
+            </a:endParaRPr>
+          </a:p>
+        </p:txBody>
+      </p:sp>
+      <p:sp>
+        <p:nvSpPr>
+          <p:cNvPr id="32" name="CasellaDiTesto 31">
+            <a:extLst>
+              <a:ext uri="{FF2B5EF4-FFF2-40B4-BE49-F238E27FC236}">
+                <a16:creationId xmlns:a16="http://schemas.microsoft.com/office/drawing/2014/main" id="{5944CDBB-5E16-0F9D-A244-989075A6FCA3}"/>
+              </a:ext>
+            </a:extLst>
+          </p:cNvPr>
+          <p:cNvSpPr txBox="1"/>
+          <p:nvPr/>
+        </p:nvSpPr>
+        <p:spPr>
+          <a:xfrm>
+            <a:off x="10058400" y="3854756"/>
+            <a:ext cx="2854036" cy="338554"/>
+          </a:xfrm>
+          <a:prstGeom prst="rect">
+            <a:avLst/>
+          </a:prstGeom>
+          <a:noFill/>
+        </p:spPr>
+        <p:txBody>
+          <a:bodyPr wrap="square" rtlCol="0">
+            <a:spAutoFit/>
+          </a:bodyPr>
+          <a:lstStyle/>
+          <a:p>
+            <a:r>
+              <a:rPr lang="it-IT" sz="1600" dirty="0" err="1">
+                <a:solidFill>
+                  <a:schemeClr val="tx2"/>
+                </a:solidFill>
+              </a:rPr>
+              <a:t>src</a:t>
+            </a:r>
+            <a:r>
+              <a:rPr lang="it-IT" sz="1600" dirty="0">
+                <a:solidFill>
+                  <a:schemeClr val="tx2"/>
+                </a:solidFill>
+              </a:rPr>
+              <a:t>/devices/</a:t>
+            </a:r>
+            <a:r>
+              <a:rPr lang="it-IT" sz="1600" dirty="0" err="1">
+                <a:solidFill>
+                  <a:schemeClr val="tx2"/>
+                </a:solidFill>
+              </a:rPr>
+              <a:t>timer.c</a:t>
+            </a:r>
+            <a:endParaRPr lang="it-IT" sz="1600" dirty="0">
+              <a:solidFill>
+                <a:schemeClr val="tx2"/>
+              </a:solidFill>
+            </a:endParaRPr>
+          </a:p>
+        </p:txBody>
+      </p:sp>
+      <p:sp>
+        <p:nvSpPr>
+          <p:cNvPr id="33" name="CasellaDiTesto 32">
+            <a:extLst>
+              <a:ext uri="{FF2B5EF4-FFF2-40B4-BE49-F238E27FC236}">
+                <a16:creationId xmlns:a16="http://schemas.microsoft.com/office/drawing/2014/main" id="{850B6FBD-C53C-E4F1-B453-E7A4E82195E5}"/>
+              </a:ext>
+            </a:extLst>
+          </p:cNvPr>
+          <p:cNvSpPr txBox="1"/>
+          <p:nvPr/>
+        </p:nvSpPr>
+        <p:spPr>
+          <a:xfrm>
+            <a:off x="9925486" y="5054920"/>
+            <a:ext cx="2549237" cy="338554"/>
+          </a:xfrm>
+          <a:prstGeom prst="rect">
+            <a:avLst/>
+          </a:prstGeom>
+          <a:noFill/>
+        </p:spPr>
+        <p:txBody>
+          <a:bodyPr wrap="square" rtlCol="0">
+            <a:spAutoFit/>
+          </a:bodyPr>
+          <a:lstStyle/>
+          <a:p>
+            <a:r>
+              <a:rPr lang="it-IT" sz="1600" dirty="0" err="1">
+                <a:solidFill>
+                  <a:schemeClr val="tx2"/>
+                </a:solidFill>
+              </a:rPr>
+              <a:t>src</a:t>
+            </a:r>
+            <a:r>
+              <a:rPr lang="it-IT" sz="1600" dirty="0">
+                <a:solidFill>
+                  <a:schemeClr val="tx2"/>
+                </a:solidFill>
+              </a:rPr>
+              <a:t>/threads/</a:t>
+            </a:r>
+            <a:r>
+              <a:rPr lang="it-IT" sz="1600" dirty="0" err="1">
+                <a:solidFill>
+                  <a:schemeClr val="tx2"/>
+                </a:solidFill>
+              </a:rPr>
+              <a:t>thread.c</a:t>
+            </a:r>
+            <a:endParaRPr lang="it-IT" sz="1600" dirty="0">
+              <a:solidFill>
+                <a:schemeClr val="tx2"/>
+              </a:solidFill>
+            </a:endParaRPr>
           </a:p>
         </p:txBody>
       </p:sp>
@@ -15196,10 +15754,10 @@
       </p:grpSpPr>
       <p:sp>
         <p:nvSpPr>
-          <p:cNvPr id="9" name="Segnaposto testo 8">
+          <p:cNvPr id="33" name="Titolo 32">
             <a:extLst>
               <a:ext uri="{FF2B5EF4-FFF2-40B4-BE49-F238E27FC236}">
-                <a16:creationId xmlns:a16="http://schemas.microsoft.com/office/drawing/2014/main" id="{00842FCF-9A2A-27B3-4ED6-BB0713CE4444}"/>
+                <a16:creationId xmlns:a16="http://schemas.microsoft.com/office/drawing/2014/main" id="{8F1499F5-A73C-5715-A022-479D6D672320}"/>
               </a:ext>
             </a:extLst>
           </p:cNvPr>
@@ -15207,31 +15765,21 @@
             <a:spLocks noGrp="1"/>
           </p:cNvSpPr>
           <p:nvPr>
-            <p:ph type="body" sz="quarter" idx="4294967295"/>
+            <p:ph type="title"/>
           </p:nvPr>
         </p:nvSpPr>
-        <p:spPr>
-          <a:xfrm>
-            <a:off x="8765309" y="627510"/>
-            <a:ext cx="1241645" cy="552450"/>
-          </a:xfrm>
-        </p:spPr>
+        <p:spPr/>
         <p:txBody>
-          <a:bodyPr>
-            <a:normAutofit/>
-          </a:bodyPr>
+          <a:bodyPr/>
           <a:lstStyle/>
           <a:p>
-            <a:pPr marL="0" indent="0">
-              <a:buNone/>
-            </a:pPr>
-            <a:r>
-              <a:rPr lang="it-IT" sz="2200" dirty="0">
-                <a:solidFill>
-                  <a:schemeClr val="accent2"/>
-                </a:solidFill>
-              </a:rPr>
-              <a:t>PINTOS</a:t>
+            <a:r>
+              <a:rPr lang="it-IT" dirty="0"/>
+              <a:t>Scheduling </a:t>
+            </a:r>
+            <a:r>
+              <a:rPr lang="it-IT" sz="1600" dirty="0"/>
+              <a:t>- implementazione</a:t>
             </a:r>
           </a:p>
         </p:txBody>
@@ -15249,13 +15797,13 @@
             <a:spLocks noGrp="1"/>
           </p:cNvSpPr>
           <p:nvPr>
-            <p:ph type="body" idx="4294967295"/>
+            <p:ph type="body" idx="3"/>
           </p:nvPr>
         </p:nvSpPr>
         <p:spPr>
           <a:xfrm>
-            <a:off x="2124927" y="643385"/>
-            <a:ext cx="1132874" cy="536575"/>
+            <a:off x="6680747" y="2697019"/>
+            <a:ext cx="2721867" cy="862994"/>
           </a:xfrm>
         </p:spPr>
         <p:txBody>
@@ -15266,139 +15814,43 @@
               <a:buNone/>
             </a:pPr>
             <a:r>
-              <a:rPr lang="it-IT" sz="2200" dirty="0">
-                <a:solidFill>
-                  <a:schemeClr val="accent2"/>
+              <a:rPr lang="it-IT" dirty="0"/>
+              <a:t>PINTOS</a:t>
+            </a:r>
+          </a:p>
+          <a:p>
+            <a:pPr marL="0" indent="0">
+              <a:buNone/>
+            </a:pPr>
+            <a:r>
+              <a:rPr lang="it-IT" sz="1800" dirty="0" err="1">
+                <a:solidFill>
+                  <a:schemeClr val="tx2"/>
                 </a:solidFill>
               </a:rPr>
-              <a:t>OS161</a:t>
-            </a:r>
-          </a:p>
-        </p:txBody>
-      </p:sp>
-      <p:sp>
-        <p:nvSpPr>
-          <p:cNvPr id="13" name="CasellaDiTesto 12">
-            <a:extLst>
-              <a:ext uri="{FF2B5EF4-FFF2-40B4-BE49-F238E27FC236}">
-                <a16:creationId xmlns:a16="http://schemas.microsoft.com/office/drawing/2014/main" id="{8AB031D8-5771-1B7A-C8F6-21435769AF4F}"/>
-              </a:ext>
-            </a:extLst>
-          </p:cNvPr>
-          <p:cNvSpPr txBox="1"/>
-          <p:nvPr/>
-        </p:nvSpPr>
-        <p:spPr>
-          <a:xfrm>
-            <a:off x="1477818" y="2170545"/>
-            <a:ext cx="3269673" cy="1625600"/>
-          </a:xfrm>
-          <a:prstGeom prst="rect">
-            <a:avLst/>
-          </a:prstGeom>
-          <a:noFill/>
-        </p:spPr>
-        <p:txBody>
-          <a:bodyPr wrap="square" rtlCol="0">
-            <a:spAutoFit/>
-          </a:bodyPr>
-          <a:lstStyle/>
-          <a:p>
-            <a:endParaRPr lang="it-IT" dirty="0"/>
-          </a:p>
-        </p:txBody>
-      </p:sp>
-      <p:sp>
-        <p:nvSpPr>
-          <p:cNvPr id="16" name="CasellaDiTesto 15">
-            <a:extLst>
-              <a:ext uri="{FF2B5EF4-FFF2-40B4-BE49-F238E27FC236}">
-                <a16:creationId xmlns:a16="http://schemas.microsoft.com/office/drawing/2014/main" id="{DF923670-E929-E821-2DCE-4EEA84267A27}"/>
-              </a:ext>
-            </a:extLst>
-          </p:cNvPr>
-          <p:cNvSpPr txBox="1"/>
-          <p:nvPr/>
-        </p:nvSpPr>
-        <p:spPr>
-          <a:xfrm>
-            <a:off x="1477818" y="1976581"/>
-            <a:ext cx="2318327" cy="1246909"/>
-          </a:xfrm>
-          <a:prstGeom prst="rect">
-            <a:avLst/>
-          </a:prstGeom>
-          <a:noFill/>
-        </p:spPr>
-        <p:txBody>
-          <a:bodyPr wrap="square" rtlCol="0">
-            <a:spAutoFit/>
-          </a:bodyPr>
-          <a:lstStyle/>
-          <a:p>
-            <a:endParaRPr lang="it-IT" dirty="0"/>
-          </a:p>
-        </p:txBody>
-      </p:sp>
-      <p:pic>
-        <p:nvPicPr>
-          <p:cNvPr id="18" name="Immagine 17">
-            <a:extLst>
-              <a:ext uri="{FF2B5EF4-FFF2-40B4-BE49-F238E27FC236}">
-                <a16:creationId xmlns:a16="http://schemas.microsoft.com/office/drawing/2014/main" id="{9231CEA0-BE6A-96A5-CED9-D931BC44A05B}"/>
-              </a:ext>
-            </a:extLst>
-          </p:cNvPr>
-          <p:cNvPicPr>
-            <a:picLocks noChangeAspect="1"/>
-          </p:cNvPicPr>
-          <p:nvPr/>
-        </p:nvPicPr>
-        <p:blipFill>
-          <a:blip r:embed="rId2"/>
-          <a:stretch>
-            <a:fillRect/>
-          </a:stretch>
-        </p:blipFill>
-        <p:spPr>
-          <a:xfrm>
-            <a:off x="521309" y="1276942"/>
-            <a:ext cx="5388564" cy="4971480"/>
-          </a:xfrm>
-          <a:prstGeom prst="rect">
-            <a:avLst/>
-          </a:prstGeom>
-        </p:spPr>
-      </p:pic>
-      <p:sp>
-        <p:nvSpPr>
-          <p:cNvPr id="19" name="CasellaDiTesto 18">
-            <a:extLst>
-              <a:ext uri="{FF2B5EF4-FFF2-40B4-BE49-F238E27FC236}">
-                <a16:creationId xmlns:a16="http://schemas.microsoft.com/office/drawing/2014/main" id="{EBBB4B28-F125-4571-5BAB-D88782E9010A}"/>
-              </a:ext>
-            </a:extLst>
-          </p:cNvPr>
-          <p:cNvSpPr txBox="1"/>
-          <p:nvPr/>
-        </p:nvSpPr>
-        <p:spPr>
-          <a:xfrm>
-            <a:off x="7002463" y="2410690"/>
-            <a:ext cx="1762846" cy="1246909"/>
-          </a:xfrm>
-          <a:prstGeom prst="rect">
-            <a:avLst/>
-          </a:prstGeom>
-          <a:noFill/>
-        </p:spPr>
-        <p:txBody>
-          <a:bodyPr wrap="square" rtlCol="0">
-            <a:spAutoFit/>
-          </a:bodyPr>
-          <a:lstStyle/>
-          <a:p>
-            <a:endParaRPr lang="it-IT" dirty="0"/>
+              <a:t>src</a:t>
+            </a:r>
+            <a:r>
+              <a:rPr lang="it-IT" sz="1800" dirty="0">
+                <a:solidFill>
+                  <a:schemeClr val="tx2"/>
+                </a:solidFill>
+              </a:rPr>
+              <a:t>/threads/</a:t>
+            </a:r>
+            <a:r>
+              <a:rPr lang="it-IT" sz="1800" dirty="0" err="1">
+                <a:solidFill>
+                  <a:schemeClr val="tx2"/>
+                </a:solidFill>
+              </a:rPr>
+              <a:t>thread.c</a:t>
+            </a:r>
+            <a:endParaRPr lang="it-IT" sz="1800" dirty="0">
+              <a:solidFill>
+                <a:schemeClr val="tx2"/>
+              </a:solidFill>
+            </a:endParaRPr>
           </a:p>
         </p:txBody>
       </p:sp>
@@ -15416,22 +15868,578 @@
           </p:cNvPicPr>
           <p:nvPr/>
         </p:nvPicPr>
-        <p:blipFill>
-          <a:blip r:embed="rId3"/>
-          <a:stretch>
-            <a:fillRect/>
-          </a:stretch>
+        <p:blipFill rotWithShape="1">
+          <a:blip r:embed="rId2"/>
+          <a:srcRect t="4823" r="27512" b="47359"/>
+          <a:stretch/>
         </p:blipFill>
         <p:spPr>
           <a:xfrm>
-            <a:off x="6410349" y="1276942"/>
-            <a:ext cx="5549718" cy="5495053"/>
+            <a:off x="6680747" y="3735363"/>
+            <a:ext cx="4589653" cy="2997810"/>
           </a:xfrm>
           <a:prstGeom prst="rect">
             <a:avLst/>
           </a:prstGeom>
         </p:spPr>
       </p:pic>
+      <p:sp>
+        <p:nvSpPr>
+          <p:cNvPr id="15" name="Segnaposto contenuto 3">
+            <a:extLst>
+              <a:ext uri="{FF2B5EF4-FFF2-40B4-BE49-F238E27FC236}">
+                <a16:creationId xmlns:a16="http://schemas.microsoft.com/office/drawing/2014/main" id="{FCA804C0-F24D-50D4-D44C-5A5612A99909}"/>
+              </a:ext>
+            </a:extLst>
+          </p:cNvPr>
+          <p:cNvSpPr txBox="1">
+            <a:spLocks/>
+          </p:cNvSpPr>
+          <p:nvPr/>
+        </p:nvSpPr>
+        <p:spPr>
+          <a:xfrm>
+            <a:off x="581193" y="1949204"/>
+            <a:ext cx="10400843" cy="716370"/>
+          </a:xfrm>
+          <a:prstGeom prst="rect">
+            <a:avLst/>
+          </a:prstGeom>
+        </p:spPr>
+        <p:txBody>
+          <a:bodyPr>
+            <a:normAutofit/>
+          </a:bodyPr>
+          <a:lstStyle>
+            <a:lvl1pPr marL="306000" indent="-306000" algn="l" defTabSz="457200" rtl="0" eaLnBrk="1" latinLnBrk="0" hangingPunct="1">
+              <a:spcBef>
+                <a:spcPct val="20000"/>
+              </a:spcBef>
+              <a:spcAft>
+                <a:spcPts val="600"/>
+              </a:spcAft>
+              <a:buClr>
+                <a:schemeClr val="accent2"/>
+              </a:buClr>
+              <a:buSzPct val="92000"/>
+              <a:buFont typeface="Wingdings 2" panose="05020102010507070707" pitchFamily="18" charset="2"/>
+              <a:buChar char=""/>
+              <a:defRPr sz="1800" kern="1200">
+                <a:solidFill>
+                  <a:schemeClr val="tx2"/>
+                </a:solidFill>
+                <a:latin typeface="+mn-lt"/>
+                <a:ea typeface="+mn-ea"/>
+                <a:cs typeface="+mn-cs"/>
+              </a:defRPr>
+            </a:lvl1pPr>
+            <a:lvl2pPr marL="630000" indent="-306000" algn="l" defTabSz="457200" rtl="0" eaLnBrk="1" latinLnBrk="0" hangingPunct="1">
+              <a:spcBef>
+                <a:spcPct val="20000"/>
+              </a:spcBef>
+              <a:spcAft>
+                <a:spcPts val="600"/>
+              </a:spcAft>
+              <a:buClr>
+                <a:schemeClr val="accent2"/>
+              </a:buClr>
+              <a:buSzPct val="92000"/>
+              <a:buFont typeface="Wingdings 2" panose="05020102010507070707" pitchFamily="18" charset="2"/>
+              <a:buChar char=""/>
+              <a:defRPr sz="1600" kern="1200">
+                <a:solidFill>
+                  <a:schemeClr val="tx2"/>
+                </a:solidFill>
+                <a:latin typeface="+mn-lt"/>
+                <a:ea typeface="+mn-ea"/>
+                <a:cs typeface="+mn-cs"/>
+              </a:defRPr>
+            </a:lvl2pPr>
+            <a:lvl3pPr marL="900000" indent="-270000" algn="l" defTabSz="457200" rtl="0" eaLnBrk="1" latinLnBrk="0" hangingPunct="1">
+              <a:spcBef>
+                <a:spcPct val="20000"/>
+              </a:spcBef>
+              <a:spcAft>
+                <a:spcPts val="600"/>
+              </a:spcAft>
+              <a:buClr>
+                <a:schemeClr val="accent2"/>
+              </a:buClr>
+              <a:buSzPct val="92000"/>
+              <a:buFont typeface="Wingdings 2" panose="05020102010507070707" pitchFamily="18" charset="2"/>
+              <a:buChar char=""/>
+              <a:defRPr sz="1400" kern="1200">
+                <a:solidFill>
+                  <a:schemeClr val="tx2"/>
+                </a:solidFill>
+                <a:latin typeface="+mn-lt"/>
+                <a:ea typeface="+mn-ea"/>
+                <a:cs typeface="+mn-cs"/>
+              </a:defRPr>
+            </a:lvl3pPr>
+            <a:lvl4pPr marL="1242000" indent="-234000" algn="l" defTabSz="457200" rtl="0" eaLnBrk="1" latinLnBrk="0" hangingPunct="1">
+              <a:spcBef>
+                <a:spcPct val="20000"/>
+              </a:spcBef>
+              <a:spcAft>
+                <a:spcPts val="600"/>
+              </a:spcAft>
+              <a:buClr>
+                <a:schemeClr val="accent2"/>
+              </a:buClr>
+              <a:buSzPct val="92000"/>
+              <a:buFont typeface="Wingdings 2" panose="05020102010507070707" pitchFamily="18" charset="2"/>
+              <a:buChar char=""/>
+              <a:defRPr sz="1200" kern="1200">
+                <a:solidFill>
+                  <a:schemeClr val="tx2"/>
+                </a:solidFill>
+                <a:latin typeface="+mn-lt"/>
+                <a:ea typeface="+mn-ea"/>
+                <a:cs typeface="+mn-cs"/>
+              </a:defRPr>
+            </a:lvl4pPr>
+            <a:lvl5pPr marL="1602000" indent="-234000" algn="l" defTabSz="457200" rtl="0" eaLnBrk="1" latinLnBrk="0" hangingPunct="1">
+              <a:spcBef>
+                <a:spcPct val="20000"/>
+              </a:spcBef>
+              <a:spcAft>
+                <a:spcPts val="600"/>
+              </a:spcAft>
+              <a:buClr>
+                <a:schemeClr val="accent2"/>
+              </a:buClr>
+              <a:buSzPct val="92000"/>
+              <a:buFont typeface="Wingdings 2" panose="05020102010507070707" pitchFamily="18" charset="2"/>
+              <a:buChar char=""/>
+              <a:defRPr sz="1200" kern="1200">
+                <a:solidFill>
+                  <a:schemeClr val="tx2"/>
+                </a:solidFill>
+                <a:latin typeface="+mn-lt"/>
+                <a:ea typeface="+mn-ea"/>
+                <a:cs typeface="+mn-cs"/>
+              </a:defRPr>
+            </a:lvl5pPr>
+            <a:lvl6pPr marL="1900000" indent="-228600" algn="l" defTabSz="457200" rtl="0" eaLnBrk="1" latinLnBrk="0" hangingPunct="1">
+              <a:spcBef>
+                <a:spcPct val="20000"/>
+              </a:spcBef>
+              <a:spcAft>
+                <a:spcPts val="600"/>
+              </a:spcAft>
+              <a:buClr>
+                <a:schemeClr val="accent2"/>
+              </a:buClr>
+              <a:buSzPct val="92000"/>
+              <a:buFont typeface="Wingdings 2" panose="05020102010507070707" pitchFamily="18" charset="2"/>
+              <a:buChar char=""/>
+              <a:defRPr sz="1200" kern="1200">
+                <a:solidFill>
+                  <a:schemeClr val="tx2"/>
+                </a:solidFill>
+                <a:latin typeface="+mn-lt"/>
+                <a:ea typeface="+mn-ea"/>
+                <a:cs typeface="+mn-cs"/>
+              </a:defRPr>
+            </a:lvl6pPr>
+            <a:lvl7pPr marL="2200000" indent="-228600" algn="l" defTabSz="457200" rtl="0" eaLnBrk="1" latinLnBrk="0" hangingPunct="1">
+              <a:spcBef>
+                <a:spcPct val="20000"/>
+              </a:spcBef>
+              <a:spcAft>
+                <a:spcPts val="600"/>
+              </a:spcAft>
+              <a:buClr>
+                <a:schemeClr val="accent2"/>
+              </a:buClr>
+              <a:buSzPct val="92000"/>
+              <a:buFont typeface="Wingdings 2" panose="05020102010507070707" pitchFamily="18" charset="2"/>
+              <a:buChar char=""/>
+              <a:defRPr sz="1200" kern="1200">
+                <a:solidFill>
+                  <a:schemeClr val="tx2"/>
+                </a:solidFill>
+                <a:latin typeface="+mn-lt"/>
+                <a:ea typeface="+mn-ea"/>
+                <a:cs typeface="+mn-cs"/>
+              </a:defRPr>
+            </a:lvl7pPr>
+            <a:lvl8pPr marL="2500000" indent="-228600" algn="l" defTabSz="457200" rtl="0" eaLnBrk="1" latinLnBrk="0" hangingPunct="1">
+              <a:spcBef>
+                <a:spcPct val="20000"/>
+              </a:spcBef>
+              <a:spcAft>
+                <a:spcPts val="600"/>
+              </a:spcAft>
+              <a:buClr>
+                <a:schemeClr val="accent2"/>
+              </a:buClr>
+              <a:buSzPct val="92000"/>
+              <a:buFont typeface="Wingdings 2" panose="05020102010507070707" pitchFamily="18" charset="2"/>
+              <a:buChar char=""/>
+              <a:defRPr sz="1200" kern="1200">
+                <a:solidFill>
+                  <a:schemeClr val="tx2"/>
+                </a:solidFill>
+                <a:latin typeface="+mn-lt"/>
+                <a:ea typeface="+mn-ea"/>
+                <a:cs typeface="+mn-cs"/>
+              </a:defRPr>
+            </a:lvl8pPr>
+            <a:lvl9pPr marL="2800000" indent="-228600" algn="l" defTabSz="457200" rtl="0" eaLnBrk="1" latinLnBrk="0" hangingPunct="1">
+              <a:spcBef>
+                <a:spcPct val="20000"/>
+              </a:spcBef>
+              <a:spcAft>
+                <a:spcPts val="600"/>
+              </a:spcAft>
+              <a:buClr>
+                <a:schemeClr val="accent2"/>
+              </a:buClr>
+              <a:buSzPct val="92000"/>
+              <a:buFont typeface="Wingdings 2" panose="05020102010507070707" pitchFamily="18" charset="2"/>
+              <a:buChar char=""/>
+              <a:defRPr sz="1200" kern="1200">
+                <a:solidFill>
+                  <a:schemeClr val="tx2"/>
+                </a:solidFill>
+                <a:latin typeface="+mn-lt"/>
+                <a:ea typeface="+mn-ea"/>
+                <a:cs typeface="+mn-cs"/>
+              </a:defRPr>
+            </a:lvl9pPr>
+          </a:lstStyle>
+          <a:p>
+            <a:pPr marL="0" indent="0">
+              <a:buNone/>
+            </a:pPr>
+            <a:r>
+              <a:rPr lang="it-IT" dirty="0"/>
+              <a:t>La funzione responsabile di cedere volontariamente la CPU allo scheduler e consentire al successivo thread pronto di essere eseguito è la </a:t>
+            </a:r>
+            <a:r>
+              <a:rPr lang="it-IT" kern="0" dirty="0" err="1">
+                <a:solidFill>
+                  <a:srgbClr val="1C00CF"/>
+                </a:solidFill>
+                <a:latin typeface="Consolas" panose="020B0609020204030204" pitchFamily="49" charset="0"/>
+                <a:cs typeface="Courier New" panose="02070309020205020404" pitchFamily="49" charset="0"/>
+              </a:rPr>
+              <a:t>thread_yield</a:t>
+            </a:r>
+            <a:r>
+              <a:rPr lang="it-IT" kern="0" dirty="0">
+                <a:solidFill>
+                  <a:srgbClr val="1C00CF"/>
+                </a:solidFill>
+                <a:latin typeface="Consolas" panose="020B0609020204030204" pitchFamily="49" charset="0"/>
+                <a:cs typeface="Courier New" panose="02070309020205020404" pitchFamily="49" charset="0"/>
+              </a:rPr>
+              <a:t>()</a:t>
+            </a:r>
+            <a:r>
+              <a:rPr lang="it-IT" dirty="0"/>
+              <a:t> per entrambi i sistemi operativi</a:t>
+            </a:r>
+          </a:p>
+        </p:txBody>
+      </p:sp>
+      <p:pic>
+        <p:nvPicPr>
+          <p:cNvPr id="41" name="Immagine 40">
+            <a:extLst>
+              <a:ext uri="{FF2B5EF4-FFF2-40B4-BE49-F238E27FC236}">
+                <a16:creationId xmlns:a16="http://schemas.microsoft.com/office/drawing/2014/main" id="{7899F936-062D-A239-2F55-D291938D6220}"/>
+              </a:ext>
+            </a:extLst>
+          </p:cNvPr>
+          <p:cNvPicPr>
+            <a:picLocks noChangeAspect="1"/>
+          </p:cNvPicPr>
+          <p:nvPr/>
+        </p:nvPicPr>
+        <p:blipFill rotWithShape="1">
+          <a:blip r:embed="rId3"/>
+          <a:srcRect r="18839"/>
+          <a:stretch/>
+        </p:blipFill>
+        <p:spPr>
+          <a:xfrm>
+            <a:off x="581193" y="3735363"/>
+            <a:ext cx="5087076" cy="914127"/>
+          </a:xfrm>
+          <a:prstGeom prst="rect">
+            <a:avLst/>
+          </a:prstGeom>
+        </p:spPr>
+      </p:pic>
+      <p:sp>
+        <p:nvSpPr>
+          <p:cNvPr id="44" name="Segnaposto testo 3">
+            <a:extLst>
+              <a:ext uri="{FF2B5EF4-FFF2-40B4-BE49-F238E27FC236}">
+                <a16:creationId xmlns:a16="http://schemas.microsoft.com/office/drawing/2014/main" id="{DB01AAE8-91D9-A99A-F76D-7A96287760FC}"/>
+              </a:ext>
+            </a:extLst>
+          </p:cNvPr>
+          <p:cNvSpPr txBox="1">
+            <a:spLocks/>
+          </p:cNvSpPr>
+          <p:nvPr/>
+        </p:nvSpPr>
+        <p:spPr>
+          <a:xfrm>
+            <a:off x="581193" y="2697019"/>
+            <a:ext cx="2721867" cy="862994"/>
+          </a:xfrm>
+          <a:prstGeom prst="rect">
+            <a:avLst/>
+          </a:prstGeom>
+        </p:spPr>
+        <p:txBody>
+          <a:bodyPr vert="horz" lIns="91440" tIns="45720" rIns="91440" bIns="45720" rtlCol="0" anchor="b">
+            <a:noAutofit/>
+          </a:bodyPr>
+          <a:lstStyle>
+            <a:lvl1pPr marL="0" indent="0" algn="l" defTabSz="457200" rtl="0" eaLnBrk="1" latinLnBrk="0" hangingPunct="1">
+              <a:spcBef>
+                <a:spcPct val="20000"/>
+              </a:spcBef>
+              <a:spcAft>
+                <a:spcPts val="600"/>
+              </a:spcAft>
+              <a:buClr>
+                <a:schemeClr val="accent2"/>
+              </a:buClr>
+              <a:buSzPct val="92000"/>
+              <a:buFont typeface="Wingdings 2" panose="05020102010507070707" pitchFamily="18" charset="2"/>
+              <a:buNone/>
+              <a:defRPr sz="2200" b="0" kern="1200">
+                <a:solidFill>
+                  <a:schemeClr val="accent2"/>
+                </a:solidFill>
+                <a:latin typeface="+mn-lt"/>
+                <a:ea typeface="+mn-ea"/>
+                <a:cs typeface="+mn-cs"/>
+              </a:defRPr>
+            </a:lvl1pPr>
+            <a:lvl2pPr marL="457200" indent="0" algn="l" defTabSz="457200" rtl="0" eaLnBrk="1" latinLnBrk="0" hangingPunct="1">
+              <a:spcBef>
+                <a:spcPct val="20000"/>
+              </a:spcBef>
+              <a:spcAft>
+                <a:spcPts val="600"/>
+              </a:spcAft>
+              <a:buClr>
+                <a:schemeClr val="accent2"/>
+              </a:buClr>
+              <a:buSzPct val="92000"/>
+              <a:buFont typeface="Wingdings 2" panose="05020102010507070707" pitchFamily="18" charset="2"/>
+              <a:buNone/>
+              <a:defRPr sz="2000" b="1" kern="1200">
+                <a:solidFill>
+                  <a:schemeClr val="tx2"/>
+                </a:solidFill>
+                <a:latin typeface="+mn-lt"/>
+                <a:ea typeface="+mn-ea"/>
+                <a:cs typeface="+mn-cs"/>
+              </a:defRPr>
+            </a:lvl2pPr>
+            <a:lvl3pPr marL="914400" indent="0" algn="l" defTabSz="457200" rtl="0" eaLnBrk="1" latinLnBrk="0" hangingPunct="1">
+              <a:spcBef>
+                <a:spcPct val="20000"/>
+              </a:spcBef>
+              <a:spcAft>
+                <a:spcPts val="600"/>
+              </a:spcAft>
+              <a:buClr>
+                <a:schemeClr val="accent2"/>
+              </a:buClr>
+              <a:buSzPct val="92000"/>
+              <a:buFont typeface="Wingdings 2" panose="05020102010507070707" pitchFamily="18" charset="2"/>
+              <a:buNone/>
+              <a:defRPr sz="1800" b="1" kern="1200">
+                <a:solidFill>
+                  <a:schemeClr val="tx2"/>
+                </a:solidFill>
+                <a:latin typeface="+mn-lt"/>
+                <a:ea typeface="+mn-ea"/>
+                <a:cs typeface="+mn-cs"/>
+              </a:defRPr>
+            </a:lvl3pPr>
+            <a:lvl4pPr marL="1371600" indent="0" algn="l" defTabSz="457200" rtl="0" eaLnBrk="1" latinLnBrk="0" hangingPunct="1">
+              <a:spcBef>
+                <a:spcPct val="20000"/>
+              </a:spcBef>
+              <a:spcAft>
+                <a:spcPts val="600"/>
+              </a:spcAft>
+              <a:buClr>
+                <a:schemeClr val="accent2"/>
+              </a:buClr>
+              <a:buSzPct val="92000"/>
+              <a:buFont typeface="Wingdings 2" panose="05020102010507070707" pitchFamily="18" charset="2"/>
+              <a:buNone/>
+              <a:defRPr sz="1600" b="1" kern="1200">
+                <a:solidFill>
+                  <a:schemeClr val="tx2"/>
+                </a:solidFill>
+                <a:latin typeface="+mn-lt"/>
+                <a:ea typeface="+mn-ea"/>
+                <a:cs typeface="+mn-cs"/>
+              </a:defRPr>
+            </a:lvl4pPr>
+            <a:lvl5pPr marL="1828800" indent="0" algn="l" defTabSz="457200" rtl="0" eaLnBrk="1" latinLnBrk="0" hangingPunct="1">
+              <a:spcBef>
+                <a:spcPct val="20000"/>
+              </a:spcBef>
+              <a:spcAft>
+                <a:spcPts val="600"/>
+              </a:spcAft>
+              <a:buClr>
+                <a:schemeClr val="accent2"/>
+              </a:buClr>
+              <a:buSzPct val="92000"/>
+              <a:buFont typeface="Wingdings 2" panose="05020102010507070707" pitchFamily="18" charset="2"/>
+              <a:buNone/>
+              <a:defRPr sz="1600" b="1" kern="1200">
+                <a:solidFill>
+                  <a:schemeClr val="tx2"/>
+                </a:solidFill>
+                <a:latin typeface="+mn-lt"/>
+                <a:ea typeface="+mn-ea"/>
+                <a:cs typeface="+mn-cs"/>
+              </a:defRPr>
+            </a:lvl5pPr>
+            <a:lvl6pPr marL="2286000" indent="0" algn="l" defTabSz="457200" rtl="0" eaLnBrk="1" latinLnBrk="0" hangingPunct="1">
+              <a:spcBef>
+                <a:spcPct val="20000"/>
+              </a:spcBef>
+              <a:spcAft>
+                <a:spcPts val="600"/>
+              </a:spcAft>
+              <a:buClr>
+                <a:schemeClr val="accent2"/>
+              </a:buClr>
+              <a:buSzPct val="92000"/>
+              <a:buFont typeface="Wingdings 2" panose="05020102010507070707" pitchFamily="18" charset="2"/>
+              <a:buNone/>
+              <a:defRPr sz="1600" b="1" kern="1200">
+                <a:solidFill>
+                  <a:schemeClr val="tx2"/>
+                </a:solidFill>
+                <a:latin typeface="+mn-lt"/>
+                <a:ea typeface="+mn-ea"/>
+                <a:cs typeface="+mn-cs"/>
+              </a:defRPr>
+            </a:lvl6pPr>
+            <a:lvl7pPr marL="2743200" indent="0" algn="l" defTabSz="457200" rtl="0" eaLnBrk="1" latinLnBrk="0" hangingPunct="1">
+              <a:spcBef>
+                <a:spcPct val="20000"/>
+              </a:spcBef>
+              <a:spcAft>
+                <a:spcPts val="600"/>
+              </a:spcAft>
+              <a:buClr>
+                <a:schemeClr val="accent2"/>
+              </a:buClr>
+              <a:buSzPct val="92000"/>
+              <a:buFont typeface="Wingdings 2" panose="05020102010507070707" pitchFamily="18" charset="2"/>
+              <a:buNone/>
+              <a:defRPr sz="1600" b="1" kern="1200">
+                <a:solidFill>
+                  <a:schemeClr val="tx2"/>
+                </a:solidFill>
+                <a:latin typeface="+mn-lt"/>
+                <a:ea typeface="+mn-ea"/>
+                <a:cs typeface="+mn-cs"/>
+              </a:defRPr>
+            </a:lvl7pPr>
+            <a:lvl8pPr marL="3200400" indent="0" algn="l" defTabSz="457200" rtl="0" eaLnBrk="1" latinLnBrk="0" hangingPunct="1">
+              <a:spcBef>
+                <a:spcPct val="20000"/>
+              </a:spcBef>
+              <a:spcAft>
+                <a:spcPts val="600"/>
+              </a:spcAft>
+              <a:buClr>
+                <a:schemeClr val="accent2"/>
+              </a:buClr>
+              <a:buSzPct val="92000"/>
+              <a:buFont typeface="Wingdings 2" panose="05020102010507070707" pitchFamily="18" charset="2"/>
+              <a:buNone/>
+              <a:defRPr sz="1600" b="1" kern="1200">
+                <a:solidFill>
+                  <a:schemeClr val="tx2"/>
+                </a:solidFill>
+                <a:latin typeface="+mn-lt"/>
+                <a:ea typeface="+mn-ea"/>
+                <a:cs typeface="+mn-cs"/>
+              </a:defRPr>
+            </a:lvl8pPr>
+            <a:lvl9pPr marL="3657600" indent="0" algn="l" defTabSz="457200" rtl="0" eaLnBrk="1" latinLnBrk="0" hangingPunct="1">
+              <a:spcBef>
+                <a:spcPct val="20000"/>
+              </a:spcBef>
+              <a:spcAft>
+                <a:spcPts val="600"/>
+              </a:spcAft>
+              <a:buClr>
+                <a:schemeClr val="accent2"/>
+              </a:buClr>
+              <a:buSzPct val="92000"/>
+              <a:buFont typeface="Wingdings 2" panose="05020102010507070707" pitchFamily="18" charset="2"/>
+              <a:buNone/>
+              <a:defRPr sz="1600" b="1" kern="1200">
+                <a:solidFill>
+                  <a:schemeClr val="tx2"/>
+                </a:solidFill>
+                <a:latin typeface="+mn-lt"/>
+                <a:ea typeface="+mn-ea"/>
+                <a:cs typeface="+mn-cs"/>
+              </a:defRPr>
+            </a:lvl9pPr>
+          </a:lstStyle>
+          <a:p>
+            <a:r>
+              <a:rPr lang="it-IT" dirty="0"/>
+              <a:t>OS161</a:t>
+            </a:r>
+          </a:p>
+          <a:p>
+            <a:r>
+              <a:rPr lang="it-IT" sz="1800" dirty="0" err="1">
+                <a:solidFill>
+                  <a:schemeClr val="tx2"/>
+                </a:solidFill>
+              </a:rPr>
+              <a:t>kern</a:t>
+            </a:r>
+            <a:r>
+              <a:rPr lang="it-IT" sz="1800" dirty="0">
+                <a:solidFill>
+                  <a:schemeClr val="tx2"/>
+                </a:solidFill>
+              </a:rPr>
+              <a:t>/thread/</a:t>
+            </a:r>
+            <a:r>
+              <a:rPr lang="it-IT" sz="1800" dirty="0" err="1">
+                <a:solidFill>
+                  <a:schemeClr val="tx2"/>
+                </a:solidFill>
+              </a:rPr>
+              <a:t>thread.c</a:t>
+            </a:r>
+            <a:endParaRPr lang="it-IT" sz="1800" dirty="0">
+              <a:solidFill>
+                <a:schemeClr val="tx2"/>
+              </a:solidFill>
+            </a:endParaRPr>
+          </a:p>
+        </p:txBody>
+      </p:sp>
     </p:spTree>
     <p:extLst>
       <p:ext uri="{BB962C8B-B14F-4D97-AF65-F5344CB8AC3E}">
@@ -15464,10 +16472,10 @@
       </p:grpSpPr>
       <p:sp>
         <p:nvSpPr>
-          <p:cNvPr id="2" name="Titolo 1">
+          <p:cNvPr id="8" name="Titolo 7">
             <a:extLst>
               <a:ext uri="{FF2B5EF4-FFF2-40B4-BE49-F238E27FC236}">
-                <a16:creationId xmlns:a16="http://schemas.microsoft.com/office/drawing/2014/main" id="{A8407669-AD4A-530A-308F-4AD673D020A5}"/>
+                <a16:creationId xmlns:a16="http://schemas.microsoft.com/office/drawing/2014/main" id="{064988E0-DEF4-1D6D-6DBE-7F09F55F537D}"/>
               </a:ext>
             </a:extLst>
           </p:cNvPr>
@@ -15484,127 +16492,610 @@
           <a:lstStyle/>
           <a:p>
             <a:r>
-              <a:rPr lang="it-IT" dirty="0" err="1"/>
-              <a:t>Paging</a:t>
-            </a:r>
-            <a:r>
               <a:rPr lang="it-IT" dirty="0"/>
-              <a:t> e  </a:t>
-            </a:r>
-            <a:r>
-              <a:rPr lang="it-IT" dirty="0" err="1"/>
-              <a:t>virtual</a:t>
-            </a:r>
+              <a:t>Scheduling </a:t>
+            </a:r>
+            <a:r>
+              <a:rPr lang="it-IT" sz="1600" dirty="0"/>
+              <a:t>- implementazione</a:t>
+            </a:r>
+          </a:p>
+        </p:txBody>
+      </p:sp>
+      <p:pic>
+        <p:nvPicPr>
+          <p:cNvPr id="20" name="Immagine 19">
+            <a:extLst>
+              <a:ext uri="{FF2B5EF4-FFF2-40B4-BE49-F238E27FC236}">
+                <a16:creationId xmlns:a16="http://schemas.microsoft.com/office/drawing/2014/main" id="{1E817B1A-2606-2857-7596-1C4194E3592A}"/>
+              </a:ext>
+            </a:extLst>
+          </p:cNvPr>
+          <p:cNvPicPr>
+            <a:picLocks noChangeAspect="1"/>
+          </p:cNvPicPr>
+          <p:nvPr/>
+        </p:nvPicPr>
+        <p:blipFill rotWithShape="1">
+          <a:blip r:embed="rId2"/>
+          <a:srcRect r="29336"/>
+          <a:stretch/>
+        </p:blipFill>
+        <p:spPr>
+          <a:xfrm>
+            <a:off x="6523734" y="3492307"/>
+            <a:ext cx="4914314" cy="2636035"/>
+          </a:xfrm>
+          <a:prstGeom prst="rect">
+            <a:avLst/>
+          </a:prstGeom>
+        </p:spPr>
+      </p:pic>
+      <p:pic>
+        <p:nvPicPr>
+          <p:cNvPr id="24" name="Immagine 23">
+            <a:extLst>
+              <a:ext uri="{FF2B5EF4-FFF2-40B4-BE49-F238E27FC236}">
+                <a16:creationId xmlns:a16="http://schemas.microsoft.com/office/drawing/2014/main" id="{6B753CFD-671C-0A35-85D7-2565A316605D}"/>
+              </a:ext>
+            </a:extLst>
+          </p:cNvPr>
+          <p:cNvPicPr>
+            <a:picLocks noChangeAspect="1"/>
+          </p:cNvPicPr>
+          <p:nvPr/>
+        </p:nvPicPr>
+        <p:blipFill rotWithShape="1">
+          <a:blip r:embed="rId3"/>
+          <a:srcRect r="33771"/>
+          <a:stretch/>
+        </p:blipFill>
+        <p:spPr>
+          <a:xfrm>
+            <a:off x="581192" y="3657082"/>
+            <a:ext cx="5087075" cy="896573"/>
+          </a:xfrm>
+          <a:prstGeom prst="rect">
+            <a:avLst/>
+          </a:prstGeom>
+        </p:spPr>
+      </p:pic>
+      <p:sp>
+        <p:nvSpPr>
+          <p:cNvPr id="25" name="Segnaposto testo 3">
+            <a:extLst>
+              <a:ext uri="{FF2B5EF4-FFF2-40B4-BE49-F238E27FC236}">
+                <a16:creationId xmlns:a16="http://schemas.microsoft.com/office/drawing/2014/main" id="{42CFD057-0819-2FA4-37D1-BE9B183ACE67}"/>
+              </a:ext>
+            </a:extLst>
+          </p:cNvPr>
+          <p:cNvSpPr txBox="1">
+            <a:spLocks/>
+          </p:cNvSpPr>
+          <p:nvPr/>
+        </p:nvSpPr>
+        <p:spPr>
+          <a:xfrm>
+            <a:off x="6523734" y="2250892"/>
+            <a:ext cx="2721867" cy="862994"/>
+          </a:xfrm>
+          <a:prstGeom prst="rect">
+            <a:avLst/>
+          </a:prstGeom>
+        </p:spPr>
+        <p:txBody>
+          <a:bodyPr vert="horz" lIns="91440" tIns="45720" rIns="91440" bIns="45720" rtlCol="0" anchor="b">
+            <a:noAutofit/>
+          </a:bodyPr>
+          <a:lstStyle>
+            <a:lvl1pPr marL="0" indent="0" algn="l" defTabSz="457200" rtl="0" eaLnBrk="1" latinLnBrk="0" hangingPunct="1">
+              <a:spcBef>
+                <a:spcPct val="20000"/>
+              </a:spcBef>
+              <a:spcAft>
+                <a:spcPts val="600"/>
+              </a:spcAft>
+              <a:buClr>
+                <a:schemeClr val="accent2"/>
+              </a:buClr>
+              <a:buSzPct val="92000"/>
+              <a:buFont typeface="Wingdings 2" panose="05020102010507070707" pitchFamily="18" charset="2"/>
+              <a:buNone/>
+              <a:defRPr sz="2200" b="0" kern="1200">
+                <a:solidFill>
+                  <a:schemeClr val="accent2"/>
+                </a:solidFill>
+                <a:latin typeface="+mn-lt"/>
+                <a:ea typeface="+mn-ea"/>
+                <a:cs typeface="+mn-cs"/>
+              </a:defRPr>
+            </a:lvl1pPr>
+            <a:lvl2pPr marL="457200" indent="0" algn="l" defTabSz="457200" rtl="0" eaLnBrk="1" latinLnBrk="0" hangingPunct="1">
+              <a:spcBef>
+                <a:spcPct val="20000"/>
+              </a:spcBef>
+              <a:spcAft>
+                <a:spcPts val="600"/>
+              </a:spcAft>
+              <a:buClr>
+                <a:schemeClr val="accent2"/>
+              </a:buClr>
+              <a:buSzPct val="92000"/>
+              <a:buFont typeface="Wingdings 2" panose="05020102010507070707" pitchFamily="18" charset="2"/>
+              <a:buNone/>
+              <a:defRPr sz="2000" b="1" kern="1200">
+                <a:solidFill>
+                  <a:schemeClr val="tx2"/>
+                </a:solidFill>
+                <a:latin typeface="+mn-lt"/>
+                <a:ea typeface="+mn-ea"/>
+                <a:cs typeface="+mn-cs"/>
+              </a:defRPr>
+            </a:lvl2pPr>
+            <a:lvl3pPr marL="914400" indent="0" algn="l" defTabSz="457200" rtl="0" eaLnBrk="1" latinLnBrk="0" hangingPunct="1">
+              <a:spcBef>
+                <a:spcPct val="20000"/>
+              </a:spcBef>
+              <a:spcAft>
+                <a:spcPts val="600"/>
+              </a:spcAft>
+              <a:buClr>
+                <a:schemeClr val="accent2"/>
+              </a:buClr>
+              <a:buSzPct val="92000"/>
+              <a:buFont typeface="Wingdings 2" panose="05020102010507070707" pitchFamily="18" charset="2"/>
+              <a:buNone/>
+              <a:defRPr sz="1800" b="1" kern="1200">
+                <a:solidFill>
+                  <a:schemeClr val="tx2"/>
+                </a:solidFill>
+                <a:latin typeface="+mn-lt"/>
+                <a:ea typeface="+mn-ea"/>
+                <a:cs typeface="+mn-cs"/>
+              </a:defRPr>
+            </a:lvl3pPr>
+            <a:lvl4pPr marL="1371600" indent="0" algn="l" defTabSz="457200" rtl="0" eaLnBrk="1" latinLnBrk="0" hangingPunct="1">
+              <a:spcBef>
+                <a:spcPct val="20000"/>
+              </a:spcBef>
+              <a:spcAft>
+                <a:spcPts val="600"/>
+              </a:spcAft>
+              <a:buClr>
+                <a:schemeClr val="accent2"/>
+              </a:buClr>
+              <a:buSzPct val="92000"/>
+              <a:buFont typeface="Wingdings 2" panose="05020102010507070707" pitchFamily="18" charset="2"/>
+              <a:buNone/>
+              <a:defRPr sz="1600" b="1" kern="1200">
+                <a:solidFill>
+                  <a:schemeClr val="tx2"/>
+                </a:solidFill>
+                <a:latin typeface="+mn-lt"/>
+                <a:ea typeface="+mn-ea"/>
+                <a:cs typeface="+mn-cs"/>
+              </a:defRPr>
+            </a:lvl4pPr>
+            <a:lvl5pPr marL="1828800" indent="0" algn="l" defTabSz="457200" rtl="0" eaLnBrk="1" latinLnBrk="0" hangingPunct="1">
+              <a:spcBef>
+                <a:spcPct val="20000"/>
+              </a:spcBef>
+              <a:spcAft>
+                <a:spcPts val="600"/>
+              </a:spcAft>
+              <a:buClr>
+                <a:schemeClr val="accent2"/>
+              </a:buClr>
+              <a:buSzPct val="92000"/>
+              <a:buFont typeface="Wingdings 2" panose="05020102010507070707" pitchFamily="18" charset="2"/>
+              <a:buNone/>
+              <a:defRPr sz="1600" b="1" kern="1200">
+                <a:solidFill>
+                  <a:schemeClr val="tx2"/>
+                </a:solidFill>
+                <a:latin typeface="+mn-lt"/>
+                <a:ea typeface="+mn-ea"/>
+                <a:cs typeface="+mn-cs"/>
+              </a:defRPr>
+            </a:lvl5pPr>
+            <a:lvl6pPr marL="2286000" indent="0" algn="l" defTabSz="457200" rtl="0" eaLnBrk="1" latinLnBrk="0" hangingPunct="1">
+              <a:spcBef>
+                <a:spcPct val="20000"/>
+              </a:spcBef>
+              <a:spcAft>
+                <a:spcPts val="600"/>
+              </a:spcAft>
+              <a:buClr>
+                <a:schemeClr val="accent2"/>
+              </a:buClr>
+              <a:buSzPct val="92000"/>
+              <a:buFont typeface="Wingdings 2" panose="05020102010507070707" pitchFamily="18" charset="2"/>
+              <a:buNone/>
+              <a:defRPr sz="1600" b="1" kern="1200">
+                <a:solidFill>
+                  <a:schemeClr val="tx2"/>
+                </a:solidFill>
+                <a:latin typeface="+mn-lt"/>
+                <a:ea typeface="+mn-ea"/>
+                <a:cs typeface="+mn-cs"/>
+              </a:defRPr>
+            </a:lvl6pPr>
+            <a:lvl7pPr marL="2743200" indent="0" algn="l" defTabSz="457200" rtl="0" eaLnBrk="1" latinLnBrk="0" hangingPunct="1">
+              <a:spcBef>
+                <a:spcPct val="20000"/>
+              </a:spcBef>
+              <a:spcAft>
+                <a:spcPts val="600"/>
+              </a:spcAft>
+              <a:buClr>
+                <a:schemeClr val="accent2"/>
+              </a:buClr>
+              <a:buSzPct val="92000"/>
+              <a:buFont typeface="Wingdings 2" panose="05020102010507070707" pitchFamily="18" charset="2"/>
+              <a:buNone/>
+              <a:defRPr sz="1600" b="1" kern="1200">
+                <a:solidFill>
+                  <a:schemeClr val="tx2"/>
+                </a:solidFill>
+                <a:latin typeface="+mn-lt"/>
+                <a:ea typeface="+mn-ea"/>
+                <a:cs typeface="+mn-cs"/>
+              </a:defRPr>
+            </a:lvl7pPr>
+            <a:lvl8pPr marL="3200400" indent="0" algn="l" defTabSz="457200" rtl="0" eaLnBrk="1" latinLnBrk="0" hangingPunct="1">
+              <a:spcBef>
+                <a:spcPct val="20000"/>
+              </a:spcBef>
+              <a:spcAft>
+                <a:spcPts val="600"/>
+              </a:spcAft>
+              <a:buClr>
+                <a:schemeClr val="accent2"/>
+              </a:buClr>
+              <a:buSzPct val="92000"/>
+              <a:buFont typeface="Wingdings 2" panose="05020102010507070707" pitchFamily="18" charset="2"/>
+              <a:buNone/>
+              <a:defRPr sz="1600" b="1" kern="1200">
+                <a:solidFill>
+                  <a:schemeClr val="tx2"/>
+                </a:solidFill>
+                <a:latin typeface="+mn-lt"/>
+                <a:ea typeface="+mn-ea"/>
+                <a:cs typeface="+mn-cs"/>
+              </a:defRPr>
+            </a:lvl8pPr>
+            <a:lvl9pPr marL="3657600" indent="0" algn="l" defTabSz="457200" rtl="0" eaLnBrk="1" latinLnBrk="0" hangingPunct="1">
+              <a:spcBef>
+                <a:spcPct val="20000"/>
+              </a:spcBef>
+              <a:spcAft>
+                <a:spcPts val="600"/>
+              </a:spcAft>
+              <a:buClr>
+                <a:schemeClr val="accent2"/>
+              </a:buClr>
+              <a:buSzPct val="92000"/>
+              <a:buFont typeface="Wingdings 2" panose="05020102010507070707" pitchFamily="18" charset="2"/>
+              <a:buNone/>
+              <a:defRPr sz="1600" b="1" kern="1200">
+                <a:solidFill>
+                  <a:schemeClr val="tx2"/>
+                </a:solidFill>
+                <a:latin typeface="+mn-lt"/>
+                <a:ea typeface="+mn-ea"/>
+                <a:cs typeface="+mn-cs"/>
+              </a:defRPr>
+            </a:lvl9pPr>
+          </a:lstStyle>
+          <a:p>
             <a:r>
               <a:rPr lang="it-IT" dirty="0"/>
-              <a:t> </a:t>
-            </a:r>
-            <a:r>
-              <a:rPr lang="it-IT" dirty="0" err="1"/>
-              <a:t>memory</a:t>
-            </a:r>
-            <a:endParaRPr lang="it-IT" dirty="0"/>
+              <a:t>PINTOS</a:t>
+            </a:r>
+          </a:p>
+          <a:p>
+            <a:r>
+              <a:rPr lang="it-IT" sz="1800" dirty="0" err="1">
+                <a:solidFill>
+                  <a:schemeClr val="tx2"/>
+                </a:solidFill>
+              </a:rPr>
+              <a:t>src</a:t>
+            </a:r>
+            <a:r>
+              <a:rPr lang="it-IT" sz="1800" dirty="0">
+                <a:solidFill>
+                  <a:schemeClr val="tx2"/>
+                </a:solidFill>
+              </a:rPr>
+              <a:t>/threads/</a:t>
+            </a:r>
+            <a:r>
+              <a:rPr lang="it-IT" sz="1800" dirty="0" err="1">
+                <a:solidFill>
+                  <a:schemeClr val="tx2"/>
+                </a:solidFill>
+              </a:rPr>
+              <a:t>thread.c</a:t>
+            </a:r>
+            <a:endParaRPr lang="it-IT" sz="1800" dirty="0">
+              <a:solidFill>
+                <a:schemeClr val="tx2"/>
+              </a:solidFill>
+            </a:endParaRPr>
           </a:p>
         </p:txBody>
       </p:sp>
       <p:sp>
         <p:nvSpPr>
-          <p:cNvPr id="3" name="Segnaposto contenuto 2">
+          <p:cNvPr id="28" name="Segnaposto testo 3">
             <a:extLst>
               <a:ext uri="{FF2B5EF4-FFF2-40B4-BE49-F238E27FC236}">
-                <a16:creationId xmlns:a16="http://schemas.microsoft.com/office/drawing/2014/main" id="{81551D5C-43AF-6C06-2D96-A6CA08117673}"/>
+                <a16:creationId xmlns:a16="http://schemas.microsoft.com/office/drawing/2014/main" id="{B0B24CDF-9D03-780B-BE7B-FBB9EAEF3063}"/>
               </a:ext>
             </a:extLst>
           </p:cNvPr>
-          <p:cNvSpPr>
-            <a:spLocks noGrp="1"/>
+          <p:cNvSpPr txBox="1">
+            <a:spLocks/>
           </p:cNvSpPr>
-          <p:nvPr>
-            <p:ph idx="1"/>
-          </p:nvPr>
+          <p:nvPr/>
         </p:nvSpPr>
-        <p:spPr/>
+        <p:spPr>
+          <a:xfrm>
+            <a:off x="581192" y="2337925"/>
+            <a:ext cx="2721867" cy="862994"/>
+          </a:xfrm>
+          <a:prstGeom prst="rect">
+            <a:avLst/>
+          </a:prstGeom>
+        </p:spPr>
         <p:txBody>
-          <a:bodyPr>
-            <a:normAutofit/>
+          <a:bodyPr vert="horz" lIns="91440" tIns="45720" rIns="91440" bIns="45720" rtlCol="0" anchor="b">
+            <a:noAutofit/>
           </a:bodyPr>
-          <a:lstStyle/>
+          <a:lstStyle>
+            <a:lvl1pPr marL="0" indent="0" algn="l" defTabSz="457200" rtl="0" eaLnBrk="1" latinLnBrk="0" hangingPunct="1">
+              <a:spcBef>
+                <a:spcPct val="20000"/>
+              </a:spcBef>
+              <a:spcAft>
+                <a:spcPts val="600"/>
+              </a:spcAft>
+              <a:buClr>
+                <a:schemeClr val="accent2"/>
+              </a:buClr>
+              <a:buSzPct val="92000"/>
+              <a:buFont typeface="Wingdings 2" panose="05020102010507070707" pitchFamily="18" charset="2"/>
+              <a:buNone/>
+              <a:defRPr sz="2200" b="0" kern="1200">
+                <a:solidFill>
+                  <a:schemeClr val="accent2"/>
+                </a:solidFill>
+                <a:latin typeface="+mn-lt"/>
+                <a:ea typeface="+mn-ea"/>
+                <a:cs typeface="+mn-cs"/>
+              </a:defRPr>
+            </a:lvl1pPr>
+            <a:lvl2pPr marL="457200" indent="0" algn="l" defTabSz="457200" rtl="0" eaLnBrk="1" latinLnBrk="0" hangingPunct="1">
+              <a:spcBef>
+                <a:spcPct val="20000"/>
+              </a:spcBef>
+              <a:spcAft>
+                <a:spcPts val="600"/>
+              </a:spcAft>
+              <a:buClr>
+                <a:schemeClr val="accent2"/>
+              </a:buClr>
+              <a:buSzPct val="92000"/>
+              <a:buFont typeface="Wingdings 2" panose="05020102010507070707" pitchFamily="18" charset="2"/>
+              <a:buNone/>
+              <a:defRPr sz="2000" b="1" kern="1200">
+                <a:solidFill>
+                  <a:schemeClr val="tx2"/>
+                </a:solidFill>
+                <a:latin typeface="+mn-lt"/>
+                <a:ea typeface="+mn-ea"/>
+                <a:cs typeface="+mn-cs"/>
+              </a:defRPr>
+            </a:lvl2pPr>
+            <a:lvl3pPr marL="914400" indent="0" algn="l" defTabSz="457200" rtl="0" eaLnBrk="1" latinLnBrk="0" hangingPunct="1">
+              <a:spcBef>
+                <a:spcPct val="20000"/>
+              </a:spcBef>
+              <a:spcAft>
+                <a:spcPts val="600"/>
+              </a:spcAft>
+              <a:buClr>
+                <a:schemeClr val="accent2"/>
+              </a:buClr>
+              <a:buSzPct val="92000"/>
+              <a:buFont typeface="Wingdings 2" panose="05020102010507070707" pitchFamily="18" charset="2"/>
+              <a:buNone/>
+              <a:defRPr sz="1800" b="1" kern="1200">
+                <a:solidFill>
+                  <a:schemeClr val="tx2"/>
+                </a:solidFill>
+                <a:latin typeface="+mn-lt"/>
+                <a:ea typeface="+mn-ea"/>
+                <a:cs typeface="+mn-cs"/>
+              </a:defRPr>
+            </a:lvl3pPr>
+            <a:lvl4pPr marL="1371600" indent="0" algn="l" defTabSz="457200" rtl="0" eaLnBrk="1" latinLnBrk="0" hangingPunct="1">
+              <a:spcBef>
+                <a:spcPct val="20000"/>
+              </a:spcBef>
+              <a:spcAft>
+                <a:spcPts val="600"/>
+              </a:spcAft>
+              <a:buClr>
+                <a:schemeClr val="accent2"/>
+              </a:buClr>
+              <a:buSzPct val="92000"/>
+              <a:buFont typeface="Wingdings 2" panose="05020102010507070707" pitchFamily="18" charset="2"/>
+              <a:buNone/>
+              <a:defRPr sz="1600" b="1" kern="1200">
+                <a:solidFill>
+                  <a:schemeClr val="tx2"/>
+                </a:solidFill>
+                <a:latin typeface="+mn-lt"/>
+                <a:ea typeface="+mn-ea"/>
+                <a:cs typeface="+mn-cs"/>
+              </a:defRPr>
+            </a:lvl4pPr>
+            <a:lvl5pPr marL="1828800" indent="0" algn="l" defTabSz="457200" rtl="0" eaLnBrk="1" latinLnBrk="0" hangingPunct="1">
+              <a:spcBef>
+                <a:spcPct val="20000"/>
+              </a:spcBef>
+              <a:spcAft>
+                <a:spcPts val="600"/>
+              </a:spcAft>
+              <a:buClr>
+                <a:schemeClr val="accent2"/>
+              </a:buClr>
+              <a:buSzPct val="92000"/>
+              <a:buFont typeface="Wingdings 2" panose="05020102010507070707" pitchFamily="18" charset="2"/>
+              <a:buNone/>
+              <a:defRPr sz="1600" b="1" kern="1200">
+                <a:solidFill>
+                  <a:schemeClr val="tx2"/>
+                </a:solidFill>
+                <a:latin typeface="+mn-lt"/>
+                <a:ea typeface="+mn-ea"/>
+                <a:cs typeface="+mn-cs"/>
+              </a:defRPr>
+            </a:lvl5pPr>
+            <a:lvl6pPr marL="2286000" indent="0" algn="l" defTabSz="457200" rtl="0" eaLnBrk="1" latinLnBrk="0" hangingPunct="1">
+              <a:spcBef>
+                <a:spcPct val="20000"/>
+              </a:spcBef>
+              <a:spcAft>
+                <a:spcPts val="600"/>
+              </a:spcAft>
+              <a:buClr>
+                <a:schemeClr val="accent2"/>
+              </a:buClr>
+              <a:buSzPct val="92000"/>
+              <a:buFont typeface="Wingdings 2" panose="05020102010507070707" pitchFamily="18" charset="2"/>
+              <a:buNone/>
+              <a:defRPr sz="1600" b="1" kern="1200">
+                <a:solidFill>
+                  <a:schemeClr val="tx2"/>
+                </a:solidFill>
+                <a:latin typeface="+mn-lt"/>
+                <a:ea typeface="+mn-ea"/>
+                <a:cs typeface="+mn-cs"/>
+              </a:defRPr>
+            </a:lvl6pPr>
+            <a:lvl7pPr marL="2743200" indent="0" algn="l" defTabSz="457200" rtl="0" eaLnBrk="1" latinLnBrk="0" hangingPunct="1">
+              <a:spcBef>
+                <a:spcPct val="20000"/>
+              </a:spcBef>
+              <a:spcAft>
+                <a:spcPts val="600"/>
+              </a:spcAft>
+              <a:buClr>
+                <a:schemeClr val="accent2"/>
+              </a:buClr>
+              <a:buSzPct val="92000"/>
+              <a:buFont typeface="Wingdings 2" panose="05020102010507070707" pitchFamily="18" charset="2"/>
+              <a:buNone/>
+              <a:defRPr sz="1600" b="1" kern="1200">
+                <a:solidFill>
+                  <a:schemeClr val="tx2"/>
+                </a:solidFill>
+                <a:latin typeface="+mn-lt"/>
+                <a:ea typeface="+mn-ea"/>
+                <a:cs typeface="+mn-cs"/>
+              </a:defRPr>
+            </a:lvl7pPr>
+            <a:lvl8pPr marL="3200400" indent="0" algn="l" defTabSz="457200" rtl="0" eaLnBrk="1" latinLnBrk="0" hangingPunct="1">
+              <a:spcBef>
+                <a:spcPct val="20000"/>
+              </a:spcBef>
+              <a:spcAft>
+                <a:spcPts val="600"/>
+              </a:spcAft>
+              <a:buClr>
+                <a:schemeClr val="accent2"/>
+              </a:buClr>
+              <a:buSzPct val="92000"/>
+              <a:buFont typeface="Wingdings 2" panose="05020102010507070707" pitchFamily="18" charset="2"/>
+              <a:buNone/>
+              <a:defRPr sz="1600" b="1" kern="1200">
+                <a:solidFill>
+                  <a:schemeClr val="tx2"/>
+                </a:solidFill>
+                <a:latin typeface="+mn-lt"/>
+                <a:ea typeface="+mn-ea"/>
+                <a:cs typeface="+mn-cs"/>
+              </a:defRPr>
+            </a:lvl8pPr>
+            <a:lvl9pPr marL="3657600" indent="0" algn="l" defTabSz="457200" rtl="0" eaLnBrk="1" latinLnBrk="0" hangingPunct="1">
+              <a:spcBef>
+                <a:spcPct val="20000"/>
+              </a:spcBef>
+              <a:spcAft>
+                <a:spcPts val="600"/>
+              </a:spcAft>
+              <a:buClr>
+                <a:schemeClr val="accent2"/>
+              </a:buClr>
+              <a:buSzPct val="92000"/>
+              <a:buFont typeface="Wingdings 2" panose="05020102010507070707" pitchFamily="18" charset="2"/>
+              <a:buNone/>
+              <a:defRPr sz="1600" b="1" kern="1200">
+                <a:solidFill>
+                  <a:schemeClr val="tx2"/>
+                </a:solidFill>
+                <a:latin typeface="+mn-lt"/>
+                <a:ea typeface="+mn-ea"/>
+                <a:cs typeface="+mn-cs"/>
+              </a:defRPr>
+            </a:lvl9pPr>
+          </a:lstStyle>
           <a:p>
             <a:r>
               <a:rPr lang="it-IT" dirty="0"/>
-              <a:t>La gestione della memoria virtuale è simile in entrambi i SO</a:t>
-            </a:r>
-          </a:p>
-          <a:p>
-            <a:pPr lvl="1"/>
-            <a:r>
-              <a:rPr lang="it-IT" dirty="0"/>
-              <a:t>Uso della paginazione, perciò della Page </a:t>
-            </a:r>
-            <a:r>
-              <a:rPr lang="it-IT" dirty="0" err="1"/>
-              <a:t>Table</a:t>
-            </a:r>
-            <a:endParaRPr lang="it-IT" dirty="0"/>
-          </a:p>
-          <a:p>
-            <a:pPr lvl="1"/>
-            <a:r>
-              <a:rPr lang="it-IT" dirty="0"/>
-              <a:t>Gestione similare della Frame </a:t>
-            </a:r>
-            <a:r>
-              <a:rPr lang="it-IT" dirty="0" err="1"/>
-              <a:t>Table</a:t>
-            </a:r>
-            <a:endParaRPr lang="it-IT" dirty="0"/>
-          </a:p>
-          <a:p>
-            <a:pPr lvl="1"/>
-            <a:r>
-              <a:rPr lang="it-IT" dirty="0"/>
-              <a:t>Stessa gestione dello spazio degli indirizzi dei processi</a:t>
-            </a:r>
-          </a:p>
-          <a:p>
-            <a:r>
-              <a:rPr lang="it-IT" dirty="0"/>
-              <a:t>Uso di strutture dati analoghe</a:t>
-            </a:r>
-          </a:p>
-          <a:p>
-            <a:pPr lvl="1"/>
-            <a:r>
-              <a:rPr lang="it-IT" dirty="0"/>
-              <a:t>Vettori</a:t>
-            </a:r>
-          </a:p>
-          <a:p>
-            <a:pPr lvl="1"/>
-            <a:r>
-              <a:rPr lang="it-IT" dirty="0"/>
-              <a:t>Bitmap</a:t>
-            </a:r>
-          </a:p>
-          <a:p>
-            <a:pPr lvl="1"/>
-            <a:r>
-              <a:rPr lang="it-IT" dirty="0"/>
-              <a:t>Liste</a:t>
-            </a:r>
-          </a:p>
-          <a:p>
-            <a:r>
-              <a:rPr lang="it-IT" dirty="0"/>
-              <a:t>Paginazione più complessa su OS161, quindi con più funzionalità</a:t>
-            </a:r>
+              <a:t>OS161</a:t>
+            </a:r>
+          </a:p>
+          <a:p>
+            <a:r>
+              <a:rPr lang="it-IT" sz="1800" dirty="0" err="1">
+                <a:solidFill>
+                  <a:schemeClr val="tx2"/>
+                </a:solidFill>
+              </a:rPr>
+              <a:t>kern</a:t>
+            </a:r>
+            <a:r>
+              <a:rPr lang="it-IT" sz="1800" dirty="0">
+                <a:solidFill>
+                  <a:schemeClr val="tx2"/>
+                </a:solidFill>
+              </a:rPr>
+              <a:t>/thread/</a:t>
+            </a:r>
+            <a:r>
+              <a:rPr lang="it-IT" sz="1800" dirty="0" err="1">
+                <a:solidFill>
+                  <a:schemeClr val="tx2"/>
+                </a:solidFill>
+              </a:rPr>
+              <a:t>thread.c</a:t>
+            </a:r>
+            <a:endParaRPr lang="it-IT" sz="1800" dirty="0">
+              <a:solidFill>
+                <a:schemeClr val="tx2"/>
+              </a:solidFill>
+            </a:endParaRPr>
           </a:p>
         </p:txBody>
       </p:sp>
     </p:spTree>
     <p:extLst>
       <p:ext uri="{BB962C8B-B14F-4D97-AF65-F5344CB8AC3E}">
-        <p14:creationId xmlns:p14="http://schemas.microsoft.com/office/powerpoint/2010/main" val="450538825"/>
+        <p14:creationId xmlns:p14="http://schemas.microsoft.com/office/powerpoint/2010/main" val="3203019218"/>
       </p:ext>
     </p:extLst>
   </p:cSld>

</xml_diff>

<commit_message>
fixing slides of ppt
</commit_message>
<xml_diff>
--- a/Progetto_SO.pptx
+++ b/Progetto_SO.pptx
@@ -8,17 +8,17 @@
     <p:sldId id="256" r:id="rId2"/>
     <p:sldId id="261" r:id="rId3"/>
     <p:sldId id="260" r:id="rId4"/>
-    <p:sldId id="257" r:id="rId5"/>
-    <p:sldId id="283" r:id="rId6"/>
-    <p:sldId id="271" r:id="rId7"/>
-    <p:sldId id="285" r:id="rId8"/>
-    <p:sldId id="269" r:id="rId9"/>
-    <p:sldId id="290" r:id="rId10"/>
-    <p:sldId id="286" r:id="rId11"/>
-    <p:sldId id="279" r:id="rId12"/>
-    <p:sldId id="287" r:id="rId13"/>
-    <p:sldId id="288" r:id="rId14"/>
-    <p:sldId id="289" r:id="rId15"/>
+    <p:sldId id="271" r:id="rId5"/>
+    <p:sldId id="285" r:id="rId6"/>
+    <p:sldId id="269" r:id="rId7"/>
+    <p:sldId id="290" r:id="rId8"/>
+    <p:sldId id="286" r:id="rId9"/>
+    <p:sldId id="279" r:id="rId10"/>
+    <p:sldId id="287" r:id="rId11"/>
+    <p:sldId id="288" r:id="rId12"/>
+    <p:sldId id="289" r:id="rId13"/>
+    <p:sldId id="291" r:id="rId14"/>
+    <p:sldId id="292" r:id="rId15"/>
     <p:sldId id="284" r:id="rId16"/>
   </p:sldIdLst>
   <p:sldSz cx="12192000" cy="6858000"/>
@@ -6559,7 +6559,7 @@
           <a:p>
             <a:fld id="{F259A98E-7D3E-4BAE-A284-2CE0D83E33BF}" type="datetimeFigureOut">
               <a:rPr lang="it-IT" smtClean="0"/>
-              <a:t>07/01/2024</a:t>
+              <a:t>15/01/2024</a:t>
             </a:fld>
             <a:endParaRPr lang="it-IT"/>
           </a:p>
@@ -6821,7 +6821,7 @@
           <a:p>
             <a:fld id="{F259A98E-7D3E-4BAE-A284-2CE0D83E33BF}" type="datetimeFigureOut">
               <a:rPr lang="it-IT" smtClean="0"/>
-              <a:t>07/01/2024</a:t>
+              <a:t>15/01/2024</a:t>
             </a:fld>
             <a:endParaRPr lang="it-IT"/>
           </a:p>
@@ -7056,7 +7056,7 @@
           <a:p>
             <a:fld id="{F259A98E-7D3E-4BAE-A284-2CE0D83E33BF}" type="datetimeFigureOut">
               <a:rPr lang="it-IT" smtClean="0"/>
-              <a:t>07/01/2024</a:t>
+              <a:t>15/01/2024</a:t>
             </a:fld>
             <a:endParaRPr lang="it-IT"/>
           </a:p>
@@ -7296,7 +7296,7 @@
           <a:p>
             <a:fld id="{F259A98E-7D3E-4BAE-A284-2CE0D83E33BF}" type="datetimeFigureOut">
               <a:rPr lang="it-IT" smtClean="0"/>
-              <a:t>07/01/2024</a:t>
+              <a:t>15/01/2024</a:t>
             </a:fld>
             <a:endParaRPr lang="it-IT"/>
           </a:p>
@@ -7603,7 +7603,7 @@
           <a:p>
             <a:fld id="{F259A98E-7D3E-4BAE-A284-2CE0D83E33BF}" type="datetimeFigureOut">
               <a:rPr lang="it-IT" smtClean="0"/>
-              <a:t>07/01/2024</a:t>
+              <a:t>15/01/2024</a:t>
             </a:fld>
             <a:endParaRPr lang="it-IT"/>
           </a:p>
@@ -7905,7 +7905,7 @@
           <a:p>
             <a:fld id="{F259A98E-7D3E-4BAE-A284-2CE0D83E33BF}" type="datetimeFigureOut">
               <a:rPr lang="it-IT" smtClean="0"/>
-              <a:t>07/01/2024</a:t>
+              <a:t>15/01/2024</a:t>
             </a:fld>
             <a:endParaRPr lang="it-IT"/>
           </a:p>
@@ -8327,7 +8327,7 @@
           <a:p>
             <a:fld id="{F259A98E-7D3E-4BAE-A284-2CE0D83E33BF}" type="datetimeFigureOut">
               <a:rPr lang="it-IT" smtClean="0"/>
-              <a:t>07/01/2024</a:t>
+              <a:t>15/01/2024</a:t>
             </a:fld>
             <a:endParaRPr lang="it-IT"/>
           </a:p>
@@ -8422,7 +8422,7 @@
           <a:p>
             <a:fld id="{F259A98E-7D3E-4BAE-A284-2CE0D83E33BF}" type="datetimeFigureOut">
               <a:rPr lang="it-IT" smtClean="0"/>
-              <a:t>07/01/2024</a:t>
+              <a:t>15/01/2024</a:t>
             </a:fld>
             <a:endParaRPr lang="it-IT"/>
           </a:p>
@@ -8584,7 +8584,7 @@
           <a:p>
             <a:fld id="{F259A98E-7D3E-4BAE-A284-2CE0D83E33BF}" type="datetimeFigureOut">
               <a:rPr lang="it-IT" smtClean="0"/>
-              <a:t>07/01/2024</a:t>
+              <a:t>15/01/2024</a:t>
             </a:fld>
             <a:endParaRPr lang="it-IT"/>
           </a:p>
@@ -8962,7 +8962,7 @@
           <a:p>
             <a:fld id="{F259A98E-7D3E-4BAE-A284-2CE0D83E33BF}" type="datetimeFigureOut">
               <a:rPr lang="it-IT" smtClean="0"/>
-              <a:t>07/01/2024</a:t>
+              <a:t>15/01/2024</a:t>
             </a:fld>
             <a:endParaRPr lang="it-IT"/>
           </a:p>
@@ -9251,7 +9251,7 @@
           <a:p>
             <a:fld id="{F259A98E-7D3E-4BAE-A284-2CE0D83E33BF}" type="datetimeFigureOut">
               <a:rPr lang="it-IT" smtClean="0"/>
-              <a:t>07/01/2024</a:t>
+              <a:t>15/01/2024</a:t>
             </a:fld>
             <a:endParaRPr lang="it-IT"/>
           </a:p>
@@ -9462,7 +9462,7 @@
           <a:p>
             <a:fld id="{F259A98E-7D3E-4BAE-A284-2CE0D83E33BF}" type="datetimeFigureOut">
               <a:rPr lang="it-IT" smtClean="0"/>
-              <a:t>07/01/2024</a:t>
+              <a:t>15/01/2024</a:t>
             </a:fld>
             <a:endParaRPr lang="it-IT"/>
           </a:p>
@@ -10223,7 +10223,7 @@
           <p:cNvPr id="2" name="Titolo 1">
             <a:extLst>
               <a:ext uri="{FF2B5EF4-FFF2-40B4-BE49-F238E27FC236}">
-                <a16:creationId xmlns:a16="http://schemas.microsoft.com/office/drawing/2014/main" id="{A8407669-AD4A-530A-308F-4AD673D020A5}"/>
+                <a16:creationId xmlns:a16="http://schemas.microsoft.com/office/drawing/2014/main" id="{69441F67-1949-8EC8-EB98-85670AC3670C}"/>
               </a:ext>
             </a:extLst>
           </p:cNvPr>
@@ -10236,28 +10236,22 @@
         </p:nvSpPr>
         <p:spPr/>
         <p:txBody>
-          <a:bodyPr/>
+          <a:bodyPr>
+            <a:normAutofit/>
+          </a:bodyPr>
           <a:lstStyle/>
           <a:p>
             <a:r>
-              <a:rPr lang="it-IT" dirty="0" err="1"/>
-              <a:t>Paging</a:t>
-            </a:r>
-            <a:r>
               <a:rPr lang="it-IT" dirty="0"/>
-              <a:t> e  </a:t>
-            </a:r>
-            <a:r>
-              <a:rPr lang="it-IT" dirty="0" err="1"/>
-              <a:t>virtual</a:t>
-            </a:r>
-            <a:r>
-              <a:rPr lang="it-IT" dirty="0"/>
-              <a:t> </a:t>
-            </a:r>
-            <a:r>
-              <a:rPr lang="it-IT" dirty="0" err="1"/>
-              <a:t>memory</a:t>
+              <a:t>Meccanismi di sincronizzazione </a:t>
+            </a:r>
+            <a:r>
+              <a:rPr lang="it-IT" sz="1600" dirty="0"/>
+              <a:t>- </a:t>
+            </a:r>
+            <a:r>
+              <a:rPr lang="it-IT" sz="1600" dirty="0" err="1"/>
+              <a:t>SEmaphore</a:t>
             </a:r>
             <a:endParaRPr lang="it-IT" dirty="0"/>
           </a:p>
@@ -10265,10 +10259,10 @@
       </p:sp>
       <p:sp>
         <p:nvSpPr>
-          <p:cNvPr id="3" name="Segnaposto contenuto 2">
+          <p:cNvPr id="4" name="Segnaposto testo 3">
             <a:extLst>
               <a:ext uri="{FF2B5EF4-FFF2-40B4-BE49-F238E27FC236}">
-                <a16:creationId xmlns:a16="http://schemas.microsoft.com/office/drawing/2014/main" id="{81551D5C-43AF-6C06-2D96-A6CA08117673}"/>
+                <a16:creationId xmlns:a16="http://schemas.microsoft.com/office/drawing/2014/main" id="{3484543A-BB31-0207-182F-1F1C206F0C68}"/>
               </a:ext>
             </a:extLst>
           </p:cNvPr>
@@ -10276,83 +10270,642 @@
             <a:spLocks noGrp="1"/>
           </p:cNvSpPr>
           <p:nvPr>
-            <p:ph idx="1"/>
+            <p:ph type="body" idx="1"/>
           </p:nvPr>
         </p:nvSpPr>
-        <p:spPr/>
+        <p:spPr>
+          <a:xfrm>
+            <a:off x="887219" y="2794235"/>
+            <a:ext cx="5087075" cy="536005"/>
+          </a:xfrm>
+        </p:spPr>
+        <p:txBody>
+          <a:bodyPr/>
+          <a:lstStyle/>
+          <a:p>
+            <a:r>
+              <a:rPr lang="it-IT" dirty="0"/>
+              <a:t>OS161</a:t>
+            </a:r>
+          </a:p>
+        </p:txBody>
+      </p:sp>
+      <p:sp>
+        <p:nvSpPr>
+          <p:cNvPr id="8" name="Segnaposto contenuto 7">
+            <a:extLst>
+              <a:ext uri="{FF2B5EF4-FFF2-40B4-BE49-F238E27FC236}">
+                <a16:creationId xmlns:a16="http://schemas.microsoft.com/office/drawing/2014/main" id="{A1E5DF89-94E7-98C4-F563-B3A43317A1CE}"/>
+              </a:ext>
+            </a:extLst>
+          </p:cNvPr>
+          <p:cNvSpPr>
+            <a:spLocks noGrp="1"/>
+          </p:cNvSpPr>
+          <p:nvPr>
+            <p:ph sz="half" idx="2"/>
+          </p:nvPr>
+        </p:nvSpPr>
+        <p:spPr>
+          <a:xfrm>
+            <a:off x="581194" y="3469395"/>
+            <a:ext cx="5393100" cy="2934999"/>
+          </a:xfrm>
+        </p:spPr>
         <p:txBody>
           <a:bodyPr>
-            <a:normAutofit/>
+            <a:noAutofit/>
           </a:bodyPr>
           <a:lstStyle/>
           <a:p>
             <a:r>
+              <a:rPr lang="it-IT" sz="1600" dirty="0"/>
+              <a:t>Semafori implementati come </a:t>
+            </a:r>
+            <a:r>
+              <a:rPr lang="it-IT" sz="1600" dirty="0" err="1"/>
+              <a:t>struct</a:t>
+            </a:r>
+            <a:r>
+              <a:rPr lang="it-IT" sz="1600" dirty="0"/>
+              <a:t> contenente:</a:t>
+            </a:r>
+          </a:p>
+          <a:p>
+            <a:pPr lvl="1"/>
+            <a:r>
               <a:rPr lang="it-IT" dirty="0"/>
-              <a:t>La gestione della memoria virtuale è simile in entrambi i SO</a:t>
+              <a:t>nome: utilizzato per identificarlo</a:t>
             </a:r>
           </a:p>
           <a:p>
             <a:pPr lvl="1"/>
             <a:r>
+              <a:rPr lang="it-IT" dirty="0" err="1"/>
+              <a:t>wchan</a:t>
+            </a:r>
+            <a:r>
               <a:rPr lang="it-IT" dirty="0"/>
-              <a:t>Uso della paginazione, perciò della Page </a:t>
+              <a:t>: per memorizzare i </a:t>
             </a:r>
             <a:r>
               <a:rPr lang="it-IT" dirty="0" err="1"/>
-              <a:t>Table</a:t>
-            </a:r>
-            <a:endParaRPr lang="it-IT" dirty="0"/>
+              <a:t>threads</a:t>
+            </a:r>
+            <a:r>
+              <a:rPr lang="it-IT" dirty="0"/>
+              <a:t> in attesa</a:t>
+            </a:r>
           </a:p>
           <a:p>
             <a:pPr lvl="1"/>
             <a:r>
+              <a:rPr lang="it-IT" dirty="0" err="1"/>
+              <a:t>spinlock</a:t>
+            </a:r>
+            <a:r>
               <a:rPr lang="it-IT" dirty="0"/>
-              <a:t>Gestione similare della Frame </a:t>
+              <a:t>: per mettere un lock sul semaforo (protegge il contatore)</a:t>
+            </a:r>
+          </a:p>
+          <a:p>
+            <a:pPr lvl="1"/>
+            <a:r>
+              <a:rPr lang="it-IT" dirty="0"/>
+              <a:t>contatore: numero di </a:t>
             </a:r>
             <a:r>
               <a:rPr lang="it-IT" dirty="0" err="1"/>
-              <a:t>Table</a:t>
-            </a:r>
-            <a:endParaRPr lang="it-IT" dirty="0"/>
+              <a:t>threads</a:t>
+            </a:r>
+            <a:r>
+              <a:rPr lang="it-IT" dirty="0"/>
+              <a:t> che possono accedere alla risorsa</a:t>
+            </a:r>
+          </a:p>
+          <a:p>
+            <a:r>
+              <a:rPr lang="it-IT" sz="1600" dirty="0"/>
+              <a:t>Sono usate le funzioni </a:t>
+            </a:r>
+            <a:r>
+              <a:rPr lang="it-IT" sz="1600" b="1" dirty="0"/>
+              <a:t>P </a:t>
+            </a:r>
+            <a:r>
+              <a:rPr lang="it-IT" sz="1600" dirty="0"/>
+              <a:t>(decrementa il contatore e blocca il </a:t>
+            </a:r>
+            <a:r>
+              <a:rPr lang="it-IT" sz="1600" dirty="0" err="1"/>
+              <a:t>thread</a:t>
+            </a:r>
+            <a:r>
+              <a:rPr lang="it-IT" sz="1600" dirty="0"/>
+              <a:t> se </a:t>
+            </a:r>
+            <a:r>
+              <a:rPr lang="it-IT" sz="1600" dirty="0" err="1"/>
+              <a:t>cont</a:t>
+            </a:r>
+            <a:r>
+              <a:rPr lang="it-IT" sz="1600" dirty="0"/>
+              <a:t>=0) e </a:t>
+            </a:r>
+            <a:r>
+              <a:rPr lang="it-IT" sz="1600" b="1" dirty="0"/>
+              <a:t>V</a:t>
+            </a:r>
+            <a:r>
+              <a:rPr lang="it-IT" sz="1600" dirty="0"/>
+              <a:t> (incrementa il contatore e sveglia un </a:t>
+            </a:r>
+            <a:r>
+              <a:rPr lang="it-IT" sz="1600" dirty="0" err="1"/>
+              <a:t>thread</a:t>
+            </a:r>
+            <a:r>
+              <a:rPr lang="it-IT" sz="1600" dirty="0"/>
+              <a:t> in attesa)</a:t>
+            </a:r>
+            <a:endParaRPr lang="it-IT" sz="1600" b="1" dirty="0"/>
+          </a:p>
+          <a:p>
+            <a:endParaRPr lang="it-IT" sz="1600" dirty="0"/>
+          </a:p>
+        </p:txBody>
+      </p:sp>
+      <p:sp>
+        <p:nvSpPr>
+          <p:cNvPr id="9" name="Segnaposto testo 8">
+            <a:extLst>
+              <a:ext uri="{FF2B5EF4-FFF2-40B4-BE49-F238E27FC236}">
+                <a16:creationId xmlns:a16="http://schemas.microsoft.com/office/drawing/2014/main" id="{00842FCF-9A2A-27B3-4ED6-BB0713CE4444}"/>
+              </a:ext>
+            </a:extLst>
+          </p:cNvPr>
+          <p:cNvSpPr>
+            <a:spLocks noGrp="1"/>
+          </p:cNvSpPr>
+          <p:nvPr>
+            <p:ph type="body" sz="quarter" idx="3"/>
+          </p:nvPr>
+        </p:nvSpPr>
+        <p:spPr>
+          <a:xfrm>
+            <a:off x="6523735" y="2794235"/>
+            <a:ext cx="5087073" cy="553373"/>
+          </a:xfrm>
+        </p:spPr>
+        <p:txBody>
+          <a:bodyPr/>
+          <a:lstStyle/>
+          <a:p>
+            <a:r>
+              <a:rPr lang="it-IT" dirty="0"/>
+              <a:t>PINTOS</a:t>
+            </a:r>
+          </a:p>
+        </p:txBody>
+      </p:sp>
+      <p:sp>
+        <p:nvSpPr>
+          <p:cNvPr id="10" name="Segnaposto contenuto 9">
+            <a:extLst>
+              <a:ext uri="{FF2B5EF4-FFF2-40B4-BE49-F238E27FC236}">
+                <a16:creationId xmlns:a16="http://schemas.microsoft.com/office/drawing/2014/main" id="{3CDA2ECB-1671-3745-42C6-213A778ECD29}"/>
+              </a:ext>
+            </a:extLst>
+          </p:cNvPr>
+          <p:cNvSpPr>
+            <a:spLocks noGrp="1"/>
+          </p:cNvSpPr>
+          <p:nvPr>
+            <p:ph sz="quarter" idx="4"/>
+          </p:nvPr>
+        </p:nvSpPr>
+        <p:spPr>
+          <a:xfrm>
+            <a:off x="6217709" y="3469395"/>
+            <a:ext cx="5393100" cy="2934999"/>
+          </a:xfrm>
+        </p:spPr>
+        <p:txBody>
+          <a:bodyPr>
+            <a:noAutofit/>
+          </a:bodyPr>
+          <a:lstStyle/>
+          <a:p>
+            <a:r>
+              <a:rPr lang="it-IT" sz="1600" dirty="0"/>
+              <a:t>Semafori implementati come </a:t>
+            </a:r>
+            <a:r>
+              <a:rPr lang="it-IT" sz="1600" dirty="0" err="1"/>
+              <a:t>struct</a:t>
+            </a:r>
+            <a:r>
+              <a:rPr lang="it-IT" sz="1600" dirty="0"/>
+              <a:t> contenente:</a:t>
+            </a:r>
           </a:p>
           <a:p>
             <a:pPr lvl="1"/>
             <a:r>
               <a:rPr lang="it-IT" dirty="0"/>
-              <a:t>Stessa gestione dello spazio degli indirizzi dei processi</a:t>
-            </a:r>
-          </a:p>
-          <a:p>
+              <a:t>valore: non negativo che indica il numero di </a:t>
+            </a:r>
+            <a:r>
+              <a:rPr lang="it-IT" dirty="0" err="1"/>
+              <a:t>threads</a:t>
+            </a:r>
             <a:r>
               <a:rPr lang="it-IT" dirty="0"/>
-              <a:t>Uso di strutture dati analoghe</a:t>
+              <a:t> che possono accedere alla risorsa</a:t>
             </a:r>
           </a:p>
           <a:p>
             <a:pPr lvl="1"/>
             <a:r>
               <a:rPr lang="it-IT" dirty="0"/>
-              <a:t>Vettori</a:t>
-            </a:r>
-          </a:p>
-          <a:p>
-            <a:pPr lvl="1"/>
+              <a:t>lista: </a:t>
+            </a:r>
+            <a:r>
+              <a:rPr lang="it-IT" dirty="0" err="1"/>
+              <a:t>linked</a:t>
+            </a:r>
             <a:r>
               <a:rPr lang="it-IT" dirty="0"/>
-              <a:t>Bitmap</a:t>
-            </a:r>
-          </a:p>
-          <a:p>
-            <a:pPr lvl="1"/>
+              <a:t> list che memorizza i </a:t>
+            </a:r>
+            <a:r>
+              <a:rPr lang="it-IT" dirty="0" err="1"/>
+              <a:t>threads</a:t>
+            </a:r>
             <a:r>
               <a:rPr lang="it-IT" dirty="0"/>
-              <a:t>Liste</a:t>
-            </a:r>
-          </a:p>
-          <a:p>
-            <a:r>
-              <a:rPr lang="it-IT" dirty="0"/>
-              <a:t>Paginazione più complessa su OS161, quindi con più funzionalità</a:t>
+              <a:t> in attesa</a:t>
+            </a:r>
+          </a:p>
+          <a:p>
+            <a:r>
+              <a:rPr lang="it-IT" sz="1600" dirty="0"/>
+              <a:t>Sono usate le funzioni </a:t>
+            </a:r>
+            <a:r>
+              <a:rPr lang="it-IT" sz="1600" b="1" dirty="0" err="1"/>
+              <a:t>sema_down</a:t>
+            </a:r>
+            <a:r>
+              <a:rPr lang="it-IT" sz="1600" b="1" dirty="0"/>
+              <a:t> </a:t>
+            </a:r>
+            <a:r>
+              <a:rPr lang="it-IT" sz="1600" dirty="0"/>
+              <a:t>(decrementa il contatore e blocca il </a:t>
+            </a:r>
+            <a:r>
+              <a:rPr lang="it-IT" sz="1600" dirty="0" err="1"/>
+              <a:t>thread</a:t>
+            </a:r>
+            <a:r>
+              <a:rPr lang="it-IT" sz="1600" dirty="0"/>
+              <a:t> se </a:t>
+            </a:r>
+            <a:r>
+              <a:rPr lang="it-IT" sz="1600" dirty="0" err="1"/>
+              <a:t>cont</a:t>
+            </a:r>
+            <a:r>
+              <a:rPr lang="it-IT" sz="1600" dirty="0"/>
+              <a:t>=0) e </a:t>
+            </a:r>
+            <a:r>
+              <a:rPr lang="it-IT" sz="1600" b="1" dirty="0" err="1"/>
+              <a:t>sema_up</a:t>
+            </a:r>
+            <a:r>
+              <a:rPr lang="it-IT" sz="1600" dirty="0"/>
+              <a:t> (incrementa il contatore e sveglia un </a:t>
+            </a:r>
+            <a:r>
+              <a:rPr lang="it-IT" sz="1600" dirty="0" err="1"/>
+              <a:t>thread</a:t>
+            </a:r>
+            <a:r>
+              <a:rPr lang="it-IT" sz="1600" dirty="0"/>
+              <a:t> in attesa)</a:t>
+            </a:r>
+          </a:p>
+          <a:p>
+            <a:r>
+              <a:rPr lang="it-IT" sz="1600" dirty="0"/>
+              <a:t>È presente la funzione </a:t>
+            </a:r>
+            <a:r>
+              <a:rPr lang="it-IT" sz="1600" b="1" dirty="0" err="1"/>
+              <a:t>sema_try_down</a:t>
+            </a:r>
+            <a:r>
+              <a:rPr lang="it-IT" sz="1600" dirty="0"/>
+              <a:t> che prova ad abbassare il valore del semaforo senza attendere. Se il </a:t>
+            </a:r>
+            <a:r>
+              <a:rPr lang="it-IT" sz="1600" dirty="0" err="1"/>
+              <a:t>value</a:t>
+            </a:r>
+            <a:r>
+              <a:rPr lang="it-IT" sz="1600" dirty="0"/>
+              <a:t> è 0 il </a:t>
+            </a:r>
+            <a:r>
+              <a:rPr lang="it-IT" sz="1600" dirty="0" err="1"/>
+              <a:t>thread</a:t>
+            </a:r>
+            <a:r>
+              <a:rPr lang="it-IT" sz="1600" dirty="0"/>
+              <a:t> è bloccato e messo in attesa; altrimenti viene decrementato e la funzione restituisce </a:t>
+            </a:r>
+            <a:r>
+              <a:rPr lang="it-IT" sz="1600" dirty="0" err="1"/>
+              <a:t>true</a:t>
+            </a:r>
+            <a:endParaRPr lang="it-IT" sz="1600" dirty="0"/>
+          </a:p>
+        </p:txBody>
+      </p:sp>
+      <p:sp>
+        <p:nvSpPr>
+          <p:cNvPr id="3" name="Segnaposto testo 3">
+            <a:extLst>
+              <a:ext uri="{FF2B5EF4-FFF2-40B4-BE49-F238E27FC236}">
+                <a16:creationId xmlns:a16="http://schemas.microsoft.com/office/drawing/2014/main" id="{DD092F63-1123-8337-F4DC-4B5BF08C3E1F}"/>
+              </a:ext>
+            </a:extLst>
+          </p:cNvPr>
+          <p:cNvSpPr txBox="1">
+            <a:spLocks/>
+          </p:cNvSpPr>
+          <p:nvPr/>
+        </p:nvSpPr>
+        <p:spPr>
+          <a:xfrm>
+            <a:off x="615548" y="1879772"/>
+            <a:ext cx="11245148" cy="921080"/>
+          </a:xfrm>
+          <a:prstGeom prst="rect">
+            <a:avLst/>
+          </a:prstGeom>
+        </p:spPr>
+        <p:txBody>
+          <a:bodyPr vert="horz" lIns="91440" tIns="45720" rIns="91440" bIns="45720" rtlCol="0" anchor="b">
+            <a:noAutofit/>
+          </a:bodyPr>
+          <a:lstStyle>
+            <a:lvl1pPr marL="0" indent="0" algn="l" defTabSz="457200" rtl="0" eaLnBrk="1" latinLnBrk="0" hangingPunct="1">
+              <a:spcBef>
+                <a:spcPct val="20000"/>
+              </a:spcBef>
+              <a:spcAft>
+                <a:spcPts val="600"/>
+              </a:spcAft>
+              <a:buClr>
+                <a:schemeClr val="accent2"/>
+              </a:buClr>
+              <a:buSzPct val="92000"/>
+              <a:buFont typeface="Wingdings 2" panose="05020102010507070707" pitchFamily="18" charset="2"/>
+              <a:buNone/>
+              <a:defRPr sz="2200" b="0" kern="1200">
+                <a:solidFill>
+                  <a:schemeClr val="accent2"/>
+                </a:solidFill>
+                <a:latin typeface="+mn-lt"/>
+                <a:ea typeface="+mn-ea"/>
+                <a:cs typeface="+mn-cs"/>
+              </a:defRPr>
+            </a:lvl1pPr>
+            <a:lvl2pPr marL="457200" indent="0" algn="l" defTabSz="457200" rtl="0" eaLnBrk="1" latinLnBrk="0" hangingPunct="1">
+              <a:spcBef>
+                <a:spcPct val="20000"/>
+              </a:spcBef>
+              <a:spcAft>
+                <a:spcPts val="600"/>
+              </a:spcAft>
+              <a:buClr>
+                <a:schemeClr val="accent2"/>
+              </a:buClr>
+              <a:buSzPct val="92000"/>
+              <a:buFont typeface="Wingdings 2" panose="05020102010507070707" pitchFamily="18" charset="2"/>
+              <a:buNone/>
+              <a:defRPr sz="2000" b="1" kern="1200">
+                <a:solidFill>
+                  <a:schemeClr val="tx2"/>
+                </a:solidFill>
+                <a:latin typeface="+mn-lt"/>
+                <a:ea typeface="+mn-ea"/>
+                <a:cs typeface="+mn-cs"/>
+              </a:defRPr>
+            </a:lvl2pPr>
+            <a:lvl3pPr marL="914400" indent="0" algn="l" defTabSz="457200" rtl="0" eaLnBrk="1" latinLnBrk="0" hangingPunct="1">
+              <a:spcBef>
+                <a:spcPct val="20000"/>
+              </a:spcBef>
+              <a:spcAft>
+                <a:spcPts val="600"/>
+              </a:spcAft>
+              <a:buClr>
+                <a:schemeClr val="accent2"/>
+              </a:buClr>
+              <a:buSzPct val="92000"/>
+              <a:buFont typeface="Wingdings 2" panose="05020102010507070707" pitchFamily="18" charset="2"/>
+              <a:buNone/>
+              <a:defRPr sz="1800" b="1" kern="1200">
+                <a:solidFill>
+                  <a:schemeClr val="tx2"/>
+                </a:solidFill>
+                <a:latin typeface="+mn-lt"/>
+                <a:ea typeface="+mn-ea"/>
+                <a:cs typeface="+mn-cs"/>
+              </a:defRPr>
+            </a:lvl3pPr>
+            <a:lvl4pPr marL="1371600" indent="0" algn="l" defTabSz="457200" rtl="0" eaLnBrk="1" latinLnBrk="0" hangingPunct="1">
+              <a:spcBef>
+                <a:spcPct val="20000"/>
+              </a:spcBef>
+              <a:spcAft>
+                <a:spcPts val="600"/>
+              </a:spcAft>
+              <a:buClr>
+                <a:schemeClr val="accent2"/>
+              </a:buClr>
+              <a:buSzPct val="92000"/>
+              <a:buFont typeface="Wingdings 2" panose="05020102010507070707" pitchFamily="18" charset="2"/>
+              <a:buNone/>
+              <a:defRPr sz="1600" b="1" kern="1200">
+                <a:solidFill>
+                  <a:schemeClr val="tx2"/>
+                </a:solidFill>
+                <a:latin typeface="+mn-lt"/>
+                <a:ea typeface="+mn-ea"/>
+                <a:cs typeface="+mn-cs"/>
+              </a:defRPr>
+            </a:lvl4pPr>
+            <a:lvl5pPr marL="1828800" indent="0" algn="l" defTabSz="457200" rtl="0" eaLnBrk="1" latinLnBrk="0" hangingPunct="1">
+              <a:spcBef>
+                <a:spcPct val="20000"/>
+              </a:spcBef>
+              <a:spcAft>
+                <a:spcPts val="600"/>
+              </a:spcAft>
+              <a:buClr>
+                <a:schemeClr val="accent2"/>
+              </a:buClr>
+              <a:buSzPct val="92000"/>
+              <a:buFont typeface="Wingdings 2" panose="05020102010507070707" pitchFamily="18" charset="2"/>
+              <a:buNone/>
+              <a:defRPr sz="1600" b="1" kern="1200">
+                <a:solidFill>
+                  <a:schemeClr val="tx2"/>
+                </a:solidFill>
+                <a:latin typeface="+mn-lt"/>
+                <a:ea typeface="+mn-ea"/>
+                <a:cs typeface="+mn-cs"/>
+              </a:defRPr>
+            </a:lvl5pPr>
+            <a:lvl6pPr marL="2286000" indent="0" algn="l" defTabSz="457200" rtl="0" eaLnBrk="1" latinLnBrk="0" hangingPunct="1">
+              <a:spcBef>
+                <a:spcPct val="20000"/>
+              </a:spcBef>
+              <a:spcAft>
+                <a:spcPts val="600"/>
+              </a:spcAft>
+              <a:buClr>
+                <a:schemeClr val="accent2"/>
+              </a:buClr>
+              <a:buSzPct val="92000"/>
+              <a:buFont typeface="Wingdings 2" panose="05020102010507070707" pitchFamily="18" charset="2"/>
+              <a:buNone/>
+              <a:defRPr sz="1600" b="1" kern="1200">
+                <a:solidFill>
+                  <a:schemeClr val="tx2"/>
+                </a:solidFill>
+                <a:latin typeface="+mn-lt"/>
+                <a:ea typeface="+mn-ea"/>
+                <a:cs typeface="+mn-cs"/>
+              </a:defRPr>
+            </a:lvl6pPr>
+            <a:lvl7pPr marL="2743200" indent="0" algn="l" defTabSz="457200" rtl="0" eaLnBrk="1" latinLnBrk="0" hangingPunct="1">
+              <a:spcBef>
+                <a:spcPct val="20000"/>
+              </a:spcBef>
+              <a:spcAft>
+                <a:spcPts val="600"/>
+              </a:spcAft>
+              <a:buClr>
+                <a:schemeClr val="accent2"/>
+              </a:buClr>
+              <a:buSzPct val="92000"/>
+              <a:buFont typeface="Wingdings 2" panose="05020102010507070707" pitchFamily="18" charset="2"/>
+              <a:buNone/>
+              <a:defRPr sz="1600" b="1" kern="1200">
+                <a:solidFill>
+                  <a:schemeClr val="tx2"/>
+                </a:solidFill>
+                <a:latin typeface="+mn-lt"/>
+                <a:ea typeface="+mn-ea"/>
+                <a:cs typeface="+mn-cs"/>
+              </a:defRPr>
+            </a:lvl7pPr>
+            <a:lvl8pPr marL="3200400" indent="0" algn="l" defTabSz="457200" rtl="0" eaLnBrk="1" latinLnBrk="0" hangingPunct="1">
+              <a:spcBef>
+                <a:spcPct val="20000"/>
+              </a:spcBef>
+              <a:spcAft>
+                <a:spcPts val="600"/>
+              </a:spcAft>
+              <a:buClr>
+                <a:schemeClr val="accent2"/>
+              </a:buClr>
+              <a:buSzPct val="92000"/>
+              <a:buFont typeface="Wingdings 2" panose="05020102010507070707" pitchFamily="18" charset="2"/>
+              <a:buNone/>
+              <a:defRPr sz="1600" b="1" kern="1200">
+                <a:solidFill>
+                  <a:schemeClr val="tx2"/>
+                </a:solidFill>
+                <a:latin typeface="+mn-lt"/>
+                <a:ea typeface="+mn-ea"/>
+                <a:cs typeface="+mn-cs"/>
+              </a:defRPr>
+            </a:lvl8pPr>
+            <a:lvl9pPr marL="3657600" indent="0" algn="l" defTabSz="457200" rtl="0" eaLnBrk="1" latinLnBrk="0" hangingPunct="1">
+              <a:spcBef>
+                <a:spcPct val="20000"/>
+              </a:spcBef>
+              <a:spcAft>
+                <a:spcPts val="600"/>
+              </a:spcAft>
+              <a:buClr>
+                <a:schemeClr val="accent2"/>
+              </a:buClr>
+              <a:buSzPct val="92000"/>
+              <a:buFont typeface="Wingdings 2" panose="05020102010507070707" pitchFamily="18" charset="2"/>
+              <a:buNone/>
+              <a:defRPr sz="1600" b="1" kern="1200">
+                <a:solidFill>
+                  <a:schemeClr val="tx2"/>
+                </a:solidFill>
+                <a:latin typeface="+mn-lt"/>
+                <a:ea typeface="+mn-ea"/>
+                <a:cs typeface="+mn-cs"/>
+              </a:defRPr>
+            </a:lvl9pPr>
+          </a:lstStyle>
+          <a:p>
+            <a:r>
+              <a:rPr lang="it-IT" sz="2000" b="0" dirty="0">
+                <a:solidFill>
+                  <a:schemeClr val="tx1"/>
+                </a:solidFill>
+                <a:effectLst/>
+              </a:rPr>
+              <a:t>Sia OS161 che </a:t>
+            </a:r>
+            <a:r>
+              <a:rPr lang="it-IT" sz="2000" b="0" dirty="0" err="1">
+                <a:solidFill>
+                  <a:schemeClr val="tx1"/>
+                </a:solidFill>
+                <a:effectLst/>
+              </a:rPr>
+              <a:t>PintOS</a:t>
+            </a:r>
+            <a:r>
+              <a:rPr lang="it-IT" sz="2000" b="0" dirty="0">
+                <a:solidFill>
+                  <a:schemeClr val="tx1"/>
+                </a:solidFill>
+                <a:effectLst/>
+              </a:rPr>
+              <a:t> implementano i semafori seguono il modello classico di semafori di </a:t>
+            </a:r>
+            <a:r>
+              <a:rPr lang="it-IT" sz="2000" b="0" dirty="0" err="1">
+                <a:solidFill>
+                  <a:schemeClr val="tx1"/>
+                </a:solidFill>
+                <a:effectLst/>
+              </a:rPr>
+              <a:t>Dijkstra</a:t>
+            </a:r>
+            <a:r>
+              <a:rPr lang="it-IT" sz="2000" b="0" dirty="0">
+                <a:solidFill>
+                  <a:schemeClr val="tx1"/>
+                </a:solidFill>
+                <a:effectLst/>
+              </a:rPr>
+              <a:t>, con operazioni atomiche di "down" e "up" per garantire la sincronizzazione.</a:t>
             </a:r>
           </a:p>
         </p:txBody>
@@ -10360,7 +10913,7 @@
     </p:spTree>
     <p:extLst>
       <p:ext uri="{BB962C8B-B14F-4D97-AF65-F5344CB8AC3E}">
-        <p14:creationId xmlns:p14="http://schemas.microsoft.com/office/powerpoint/2010/main" val="450538825"/>
+        <p14:creationId xmlns:p14="http://schemas.microsoft.com/office/powerpoint/2010/main" val="4198586686"/>
       </p:ext>
     </p:extLst>
   </p:cSld>
@@ -10416,11 +10969,15 @@
             </a:r>
             <a:r>
               <a:rPr lang="it-IT" sz="1600" dirty="0"/>
-              <a:t>– Interrupt </a:t>
+              <a:t>– lock (</a:t>
             </a:r>
             <a:r>
               <a:rPr lang="it-IT" sz="1600" dirty="0" err="1"/>
-              <a:t>disable</a:t>
+              <a:t>mutex</a:t>
+            </a:r>
+            <a:r>
+              <a:rPr lang="it-IT" sz="1600" dirty="0"/>
+              <a:t>)</a:t>
             </a:r>
             <a:endParaRPr lang="it-IT" dirty="0"/>
           </a:p>
@@ -10444,7 +11001,7 @@
         </p:nvSpPr>
         <p:spPr>
           <a:xfrm>
-            <a:off x="887219" y="2913503"/>
+            <a:off x="887219" y="2555699"/>
             <a:ext cx="5087075" cy="536005"/>
           </a:xfrm>
         </p:spPr>
@@ -10477,102 +11034,77 @@
         </p:nvSpPr>
         <p:spPr>
           <a:xfrm>
-            <a:off x="581194" y="3588663"/>
+            <a:off x="581194" y="3230859"/>
             <a:ext cx="5393100" cy="2934999"/>
           </a:xfrm>
         </p:spPr>
         <p:txBody>
           <a:bodyPr>
-            <a:normAutofit lnSpcReduction="10000"/>
+            <a:noAutofit/>
           </a:bodyPr>
           <a:lstStyle/>
           <a:p>
             <a:r>
+              <a:rPr lang="it-IT" sz="1600" dirty="0"/>
+              <a:t>Lock implementato come </a:t>
+            </a:r>
+            <a:r>
+              <a:rPr lang="it-IT" sz="1600" dirty="0" err="1"/>
+              <a:t>struct</a:t>
+            </a:r>
+            <a:r>
+              <a:rPr lang="it-IT" sz="1600" dirty="0"/>
+              <a:t> contenente:</a:t>
+            </a:r>
+          </a:p>
+          <a:p>
+            <a:pPr lvl="1"/>
+            <a:r>
               <a:rPr lang="it-IT" dirty="0"/>
-              <a:t>Dà la possibilità di modificare la priorità degli interrupt e di abilitarli/disabilitarli</a:t>
-            </a:r>
-          </a:p>
-          <a:p>
-            <a:r>
-              <a:rPr lang="it-IT" b="1" dirty="0"/>
-              <a:t>spl0</a:t>
-            </a:r>
+              <a:t>nome: per identificare il lock</a:t>
+            </a:r>
+          </a:p>
+          <a:p>
+            <a:pPr lvl="1"/>
             <a:r>
               <a:rPr lang="it-IT" dirty="0"/>
-              <a:t>() </a:t>
-            </a:r>
-            <a:r>
-              <a:rPr lang="it-IT" dirty="0">
-                <a:sym typeface="Wingdings" panose="05000000000000000000" pitchFamily="2" charset="2"/>
-              </a:rPr>
-              <a:t> </a:t>
-            </a:r>
-            <a:r>
-              <a:rPr lang="it-IT" altLang="it-IT" dirty="0"/>
-              <a:t>imposta IPL su 0, abilitando tutti gli interrupt </a:t>
-            </a:r>
-            <a:endParaRPr lang="it-IT" dirty="0"/>
-          </a:p>
-          <a:p>
-            <a:r>
-              <a:rPr lang="it-IT" b="1" dirty="0" err="1"/>
-              <a:t>splhigh</a:t>
-            </a:r>
+              <a:t>HANGMAN_LOCKABLE: per rilevare i deadlock</a:t>
+            </a:r>
+          </a:p>
+          <a:p>
+            <a:r>
+              <a:rPr lang="it-IT" sz="1600" dirty="0"/>
+              <a:t>Le operazioni sui Lock sono simili a quelle che offre </a:t>
+            </a:r>
+            <a:r>
+              <a:rPr lang="it-IT" sz="1600" dirty="0" err="1"/>
+              <a:t>PintOS</a:t>
+            </a:r>
+            <a:endParaRPr lang="it-IT" sz="1600" dirty="0"/>
+          </a:p>
+          <a:p>
+            <a:r>
+              <a:rPr lang="it-IT" sz="1600" dirty="0"/>
+              <a:t>La differenza principale è che OS161 utilizza anche un hook per riconoscere e prevenire i deadlock</a:t>
+            </a:r>
+          </a:p>
+          <a:p>
+            <a:pPr lvl="1"/>
             <a:r>
               <a:rPr lang="it-IT" dirty="0"/>
-              <a:t>() </a:t>
-            </a:r>
-            <a:r>
-              <a:rPr lang="it-IT" dirty="0">
-                <a:sym typeface="Wingdings" panose="05000000000000000000" pitchFamily="2" charset="2"/>
-              </a:rPr>
-              <a:t> i</a:t>
-            </a:r>
-            <a:r>
-              <a:rPr lang="it-IT" altLang="it-IT" dirty="0"/>
-              <a:t>mposta IPL al valore più alto, disabilitando tutti gli interrupt. </a:t>
-            </a:r>
-            <a:endParaRPr lang="it-IT" dirty="0"/>
-          </a:p>
-          <a:p>
-            <a:r>
-              <a:rPr lang="it-IT" b="1" dirty="0" err="1"/>
-              <a:t>splx</a:t>
+              <a:t>Il rilevatore di deadlock di OS161 utilizza un approccio basato sul grafo per rilevare i deadlock. I </a:t>
+            </a:r>
+            <a:r>
+              <a:rPr lang="it-IT" dirty="0" err="1"/>
+              <a:t>thread</a:t>
             </a:r>
             <a:r>
               <a:rPr lang="it-IT" dirty="0"/>
-              <a:t>(S) </a:t>
-            </a:r>
-            <a:r>
-              <a:rPr lang="it-IT" dirty="0">
-                <a:sym typeface="Wingdings" panose="05000000000000000000" pitchFamily="2" charset="2"/>
-              </a:rPr>
-              <a:t> imposta IPL al valore S, abilitando lo stato rappresentato da S</a:t>
-            </a:r>
-          </a:p>
-          <a:p>
-            <a:r>
-              <a:rPr lang="it-IT" sz="1400" i="1" dirty="0" err="1">
-                <a:sym typeface="Wingdings" panose="05000000000000000000" pitchFamily="2" charset="2"/>
-              </a:rPr>
-              <a:t>kern</a:t>
-            </a:r>
-            <a:r>
-              <a:rPr lang="it-IT" sz="1400" i="1" dirty="0">
-                <a:sym typeface="Wingdings" panose="05000000000000000000" pitchFamily="2" charset="2"/>
-              </a:rPr>
-              <a:t>/include/</a:t>
-            </a:r>
-            <a:r>
-              <a:rPr lang="it-IT" sz="1400" i="1" dirty="0" err="1">
-                <a:sym typeface="Wingdings" panose="05000000000000000000" pitchFamily="2" charset="2"/>
-              </a:rPr>
-              <a:t>spl.h</a:t>
-            </a:r>
-            <a:endParaRPr lang="it-IT" sz="1400" i="1" dirty="0"/>
-          </a:p>
-          <a:p>
-            <a:endParaRPr lang="it-IT" dirty="0"/>
+              <a:t> e i lock vengono rappresentati come nodi e archi in un grafo. Il codice di rilevamento dei deadlock controlla il grafo per rilevare cicli. Se viene rilevato un ciclo, significa che esiste un deadlock</a:t>
+            </a:r>
+          </a:p>
+          <a:p>
+            <a:endParaRPr lang="it-IT" sz="1600" dirty="0"/>
           </a:p>
         </p:txBody>
       </p:sp>
@@ -10594,7 +11126,7 @@
         </p:nvSpPr>
         <p:spPr>
           <a:xfrm>
-            <a:off x="6523735" y="2913503"/>
+            <a:off x="6523735" y="2555699"/>
             <a:ext cx="5087073" cy="553373"/>
           </a:xfrm>
         </p:spPr>
@@ -10627,94 +11159,133 @@
         </p:nvSpPr>
         <p:spPr>
           <a:xfrm>
-            <a:off x="6217709" y="3588663"/>
+            <a:off x="6217709" y="3230859"/>
             <a:ext cx="5393100" cy="2934999"/>
           </a:xfrm>
         </p:spPr>
         <p:txBody>
           <a:bodyPr>
-            <a:normAutofit lnSpcReduction="10000"/>
+            <a:noAutofit/>
           </a:bodyPr>
           <a:lstStyle/>
           <a:p>
             <a:r>
+              <a:rPr lang="it-IT" sz="1600" dirty="0"/>
+              <a:t>Lock implementato come </a:t>
+            </a:r>
+            <a:r>
+              <a:rPr lang="it-IT" sz="1600" dirty="0" err="1"/>
+              <a:t>struct</a:t>
+            </a:r>
+            <a:r>
+              <a:rPr lang="it-IT" sz="1600" dirty="0"/>
+              <a:t> contenente:</a:t>
+            </a:r>
+          </a:p>
+          <a:p>
+            <a:pPr lvl="1"/>
+            <a:r>
+              <a:rPr lang="it-IT" dirty="0" err="1"/>
+              <a:t>thread</a:t>
+            </a:r>
+            <a:r>
               <a:rPr lang="it-IT" dirty="0"/>
-              <a:t>Dà la possibilità di abilitare/disabilitare gli interrupt ma </a:t>
-            </a:r>
-            <a:r>
-              <a:rPr lang="it-IT" b="1" dirty="0"/>
-              <a:t>non</a:t>
+              <a:t>: chi detiene il lock</a:t>
+            </a:r>
+          </a:p>
+          <a:p>
+            <a:pPr lvl="1"/>
+            <a:r>
+              <a:rPr lang="it-IT" dirty="0" err="1"/>
+              <a:t>semaphore</a:t>
             </a:r>
             <a:r>
               <a:rPr lang="it-IT" dirty="0"/>
-              <a:t> dà la possibilità di controllare la priorità degli interrupt</a:t>
-            </a:r>
-          </a:p>
-          <a:p>
-            <a:r>
-              <a:rPr lang="it-IT" b="1" dirty="0" err="1"/>
-              <a:t>intr_enable</a:t>
-            </a:r>
-            <a:r>
-              <a:rPr lang="it-IT" dirty="0"/>
-              <a:t>() </a:t>
-            </a:r>
-            <a:r>
-              <a:rPr lang="it-IT" dirty="0">
-                <a:sym typeface="Wingdings" panose="05000000000000000000" pitchFamily="2" charset="2"/>
-              </a:rPr>
-              <a:t> abilita gli interrupt</a:t>
-            </a:r>
+              <a:t>: struttura semaforo binario per il controllo degli accessi</a:t>
+            </a:r>
+          </a:p>
+          <a:p>
+            <a:r>
+              <a:rPr lang="it-IT" sz="1600" dirty="0"/>
+              <a:t>Le funzioni sui Lock sono: </a:t>
+            </a:r>
+          </a:p>
+          <a:p>
+            <a:pPr lvl="1"/>
+            <a:r>
+              <a:rPr lang="it-IT" sz="1200" b="1" dirty="0" err="1"/>
+              <a:t>lock_init</a:t>
+            </a:r>
+            <a:r>
+              <a:rPr lang="it-IT" sz="1200" dirty="0"/>
+              <a:t> : Inizializza un nuovo lock.</a:t>
+            </a:r>
+          </a:p>
+          <a:p>
+            <a:pPr lvl="1"/>
+            <a:r>
+              <a:rPr lang="it-IT" sz="1200" b="1" dirty="0" err="1"/>
+              <a:t>lock_acquire</a:t>
+            </a:r>
+            <a:r>
+              <a:rPr lang="it-IT" sz="1200" dirty="0"/>
+              <a:t> : Acquisisce il lock, aspettando, se necessario, il suo rilascio.</a:t>
+            </a:r>
+          </a:p>
+          <a:p>
+            <a:pPr lvl="1"/>
+            <a:r>
+              <a:rPr lang="it-IT" sz="1200" b="1" dirty="0" err="1"/>
+              <a:t>lock_try_acquire</a:t>
+            </a:r>
+            <a:r>
+              <a:rPr lang="it-IT" sz="1200" dirty="0"/>
+              <a:t> : Prova ad acquisire il lock senza attendere.</a:t>
+            </a:r>
+          </a:p>
+          <a:p>
+            <a:pPr lvl="1"/>
+            <a:r>
+              <a:rPr lang="it-IT" sz="1200" b="1" dirty="0" err="1"/>
+              <a:t>lock_release</a:t>
+            </a:r>
+            <a:r>
+              <a:rPr lang="it-IT" sz="1200" dirty="0"/>
+              <a:t> : Rilascia il lock detenuto dal </a:t>
+            </a:r>
+            <a:r>
+              <a:rPr lang="it-IT" sz="1200" dirty="0" err="1"/>
+              <a:t>thread</a:t>
+            </a:r>
+            <a:r>
+              <a:rPr lang="it-IT" sz="1200" dirty="0"/>
+              <a:t> corrente.</a:t>
+            </a:r>
+          </a:p>
+          <a:p>
+            <a:pPr lvl="1"/>
+            <a:r>
+              <a:rPr lang="it-IT" sz="1200" b="1" dirty="0" err="1"/>
+              <a:t>lock_held_by_current_thread</a:t>
+            </a:r>
+            <a:r>
+              <a:rPr lang="it-IT" sz="1200" dirty="0"/>
+              <a:t> : Verifica se il </a:t>
+            </a:r>
+            <a:r>
+              <a:rPr lang="it-IT" sz="1200" dirty="0" err="1"/>
+              <a:t>thread</a:t>
+            </a:r>
+            <a:r>
+              <a:rPr lang="it-IT" sz="1200" dirty="0"/>
+              <a:t> in esecuzione possiede il lock.</a:t>
+            </a:r>
+          </a:p>
+          <a:p>
+            <a:pPr marL="324000" lvl="1" indent="0">
+              <a:buNone/>
+            </a:pPr>
             <a:endParaRPr lang="it-IT" dirty="0"/>
-          </a:p>
-          <a:p>
-            <a:r>
-              <a:rPr lang="it-IT" b="1" dirty="0" err="1"/>
-              <a:t>intr_disable</a:t>
-            </a:r>
-            <a:r>
-              <a:rPr lang="it-IT" dirty="0"/>
-              <a:t>() </a:t>
-            </a:r>
-            <a:r>
-              <a:rPr lang="it-IT" dirty="0">
-                <a:sym typeface="Wingdings" panose="05000000000000000000" pitchFamily="2" charset="2"/>
-              </a:rPr>
-              <a:t> disabilita gli interrupt</a:t>
-            </a:r>
-          </a:p>
-          <a:p>
-            <a:r>
-              <a:rPr lang="it-IT" sz="1400" i="1" dirty="0" err="1">
-                <a:sym typeface="Wingdings" panose="05000000000000000000" pitchFamily="2" charset="2"/>
-              </a:rPr>
-              <a:t>src</a:t>
-            </a:r>
-            <a:r>
-              <a:rPr lang="it-IT" sz="1400" i="1" dirty="0">
-                <a:sym typeface="Wingdings" panose="05000000000000000000" pitchFamily="2" charset="2"/>
-              </a:rPr>
-              <a:t>/</a:t>
-            </a:r>
-            <a:r>
-              <a:rPr lang="it-IT" sz="1400" i="1" dirty="0" err="1">
-                <a:sym typeface="Wingdings" panose="05000000000000000000" pitchFamily="2" charset="2"/>
-              </a:rPr>
-              <a:t>thread</a:t>
-            </a:r>
-            <a:r>
-              <a:rPr lang="it-IT" sz="1400" i="1" dirty="0">
-                <a:sym typeface="Wingdings" panose="05000000000000000000" pitchFamily="2" charset="2"/>
-              </a:rPr>
-              <a:t>/</a:t>
-            </a:r>
-            <a:r>
-              <a:rPr lang="it-IT" sz="1400" i="1" dirty="0" err="1">
-                <a:sym typeface="Wingdings" panose="05000000000000000000" pitchFamily="2" charset="2"/>
-              </a:rPr>
-              <a:t>interrupt.h</a:t>
-            </a:r>
-            <a:endParaRPr lang="it-IT" sz="1400" dirty="0"/>
           </a:p>
         </p:txBody>
       </p:sp>
@@ -10734,7 +11305,7 @@
         </p:nvSpPr>
         <p:spPr>
           <a:xfrm>
-            <a:off x="615548" y="1999040"/>
+            <a:off x="615548" y="1641236"/>
             <a:ext cx="11245148" cy="921080"/>
           </a:xfrm>
           <a:prstGeom prst="rect">
@@ -10947,28 +11518,31 @@
           </a:lstStyle>
           <a:p>
             <a:r>
+              <a:rPr lang="it-IT" sz="2000" b="0" dirty="0">
+                <a:solidFill>
+                  <a:schemeClr val="tx1"/>
+                </a:solidFill>
+                <a:effectLst/>
+              </a:rPr>
+              <a:t>Un </a:t>
+            </a:r>
+            <a:r>
               <a:rPr lang="it-IT" sz="2000" dirty="0">
                 <a:solidFill>
                   <a:schemeClr val="tx1"/>
                 </a:solidFill>
+                <a:effectLst/>
               </a:rPr>
-              <a:t>Sia OS161 che </a:t>
-            </a:r>
-            <a:r>
-              <a:rPr lang="it-IT" sz="2000" dirty="0" err="1">
+              <a:t>lock</a:t>
+            </a:r>
+            <a:r>
+              <a:rPr lang="it-IT" sz="2000" b="0" dirty="0">
                 <a:solidFill>
                   <a:schemeClr val="tx1"/>
                 </a:solidFill>
+                <a:effectLst/>
               </a:rPr>
-              <a:t>PintOS</a:t>
-            </a:r>
-            <a:r>
-              <a:rPr lang="it-IT" sz="2000" dirty="0">
-                <a:solidFill>
-                  <a:schemeClr val="tx1"/>
-                </a:solidFill>
-              </a:rPr>
-              <a:t> danno la possibilità di abilitare/disabilitare gli interrupt per poter gestire le sezioni critiche</a:t>
+              <a:t> è analogo a un semaforo con un valore iniziale di 1, equivalente al verde di un semaforo. L'azione "up" di un lock è chiamata "rilascio", mentre l'azione "down" è detta "acquisizione".</a:t>
             </a:r>
           </a:p>
         </p:txBody>
@@ -10976,7 +11550,7 @@
     </p:spTree>
     <p:extLst>
       <p:ext uri="{BB962C8B-B14F-4D97-AF65-F5344CB8AC3E}">
-        <p14:creationId xmlns:p14="http://schemas.microsoft.com/office/powerpoint/2010/main" val="151468646"/>
+        <p14:creationId xmlns:p14="http://schemas.microsoft.com/office/powerpoint/2010/main" val="1952330264"/>
       </p:ext>
     </p:extLst>
   </p:cSld>
@@ -11032,1365 +11606,6 @@
             </a:r>
             <a:r>
               <a:rPr lang="it-IT" sz="1600" dirty="0"/>
-              <a:t>- </a:t>
-            </a:r>
-            <a:r>
-              <a:rPr lang="it-IT" sz="1600" dirty="0" err="1"/>
-              <a:t>SEmaphore</a:t>
-            </a:r>
-            <a:endParaRPr lang="it-IT" dirty="0"/>
-          </a:p>
-        </p:txBody>
-      </p:sp>
-      <p:sp>
-        <p:nvSpPr>
-          <p:cNvPr id="4" name="Segnaposto testo 3">
-            <a:extLst>
-              <a:ext uri="{FF2B5EF4-FFF2-40B4-BE49-F238E27FC236}">
-                <a16:creationId xmlns:a16="http://schemas.microsoft.com/office/drawing/2014/main" id="{3484543A-BB31-0207-182F-1F1C206F0C68}"/>
-              </a:ext>
-            </a:extLst>
-          </p:cNvPr>
-          <p:cNvSpPr>
-            <a:spLocks noGrp="1"/>
-          </p:cNvSpPr>
-          <p:nvPr>
-            <p:ph type="body" idx="1"/>
-          </p:nvPr>
-        </p:nvSpPr>
-        <p:spPr>
-          <a:xfrm>
-            <a:off x="887219" y="2794235"/>
-            <a:ext cx="5087075" cy="536005"/>
-          </a:xfrm>
-        </p:spPr>
-        <p:txBody>
-          <a:bodyPr/>
-          <a:lstStyle/>
-          <a:p>
-            <a:r>
-              <a:rPr lang="it-IT" dirty="0"/>
-              <a:t>OS161</a:t>
-            </a:r>
-          </a:p>
-        </p:txBody>
-      </p:sp>
-      <p:sp>
-        <p:nvSpPr>
-          <p:cNvPr id="8" name="Segnaposto contenuto 7">
-            <a:extLst>
-              <a:ext uri="{FF2B5EF4-FFF2-40B4-BE49-F238E27FC236}">
-                <a16:creationId xmlns:a16="http://schemas.microsoft.com/office/drawing/2014/main" id="{A1E5DF89-94E7-98C4-F563-B3A43317A1CE}"/>
-              </a:ext>
-            </a:extLst>
-          </p:cNvPr>
-          <p:cNvSpPr>
-            <a:spLocks noGrp="1"/>
-          </p:cNvSpPr>
-          <p:nvPr>
-            <p:ph sz="half" idx="2"/>
-          </p:nvPr>
-        </p:nvSpPr>
-        <p:spPr>
-          <a:xfrm>
-            <a:off x="581194" y="3469395"/>
-            <a:ext cx="5393100" cy="2934999"/>
-          </a:xfrm>
-        </p:spPr>
-        <p:txBody>
-          <a:bodyPr>
-            <a:noAutofit/>
-          </a:bodyPr>
-          <a:lstStyle/>
-          <a:p>
-            <a:r>
-              <a:rPr lang="it-IT" sz="1600" dirty="0"/>
-              <a:t>Semafori implementati come </a:t>
-            </a:r>
-            <a:r>
-              <a:rPr lang="it-IT" sz="1600" dirty="0" err="1"/>
-              <a:t>struct</a:t>
-            </a:r>
-            <a:r>
-              <a:rPr lang="it-IT" sz="1600" dirty="0"/>
-              <a:t> contenente:</a:t>
-            </a:r>
-          </a:p>
-          <a:p>
-            <a:pPr lvl="1"/>
-            <a:r>
-              <a:rPr lang="it-IT" dirty="0"/>
-              <a:t>nome: utilizzato per identificarlo</a:t>
-            </a:r>
-          </a:p>
-          <a:p>
-            <a:pPr lvl="1"/>
-            <a:r>
-              <a:rPr lang="it-IT" dirty="0" err="1"/>
-              <a:t>wchan</a:t>
-            </a:r>
-            <a:r>
-              <a:rPr lang="it-IT" dirty="0"/>
-              <a:t>: per memorizzare i </a:t>
-            </a:r>
-            <a:r>
-              <a:rPr lang="it-IT" dirty="0" err="1"/>
-              <a:t>threads</a:t>
-            </a:r>
-            <a:r>
-              <a:rPr lang="it-IT" dirty="0"/>
-              <a:t> in attesa</a:t>
-            </a:r>
-          </a:p>
-          <a:p>
-            <a:pPr lvl="1"/>
-            <a:r>
-              <a:rPr lang="it-IT" dirty="0" err="1"/>
-              <a:t>spinlock</a:t>
-            </a:r>
-            <a:r>
-              <a:rPr lang="it-IT" dirty="0"/>
-              <a:t>: per mettere un lock sul semaforo (protegge il contatore)</a:t>
-            </a:r>
-          </a:p>
-          <a:p>
-            <a:pPr lvl="1"/>
-            <a:r>
-              <a:rPr lang="it-IT" dirty="0"/>
-              <a:t>contatore: numero di </a:t>
-            </a:r>
-            <a:r>
-              <a:rPr lang="it-IT" dirty="0" err="1"/>
-              <a:t>threads</a:t>
-            </a:r>
-            <a:r>
-              <a:rPr lang="it-IT" dirty="0"/>
-              <a:t> che possono accedere alla risorsa</a:t>
-            </a:r>
-          </a:p>
-          <a:p>
-            <a:r>
-              <a:rPr lang="it-IT" sz="1600" dirty="0"/>
-              <a:t>Sono usate le funzioni </a:t>
-            </a:r>
-            <a:r>
-              <a:rPr lang="it-IT" sz="1600" b="1" dirty="0"/>
-              <a:t>P </a:t>
-            </a:r>
-            <a:r>
-              <a:rPr lang="it-IT" sz="1600" dirty="0"/>
-              <a:t>(decrementa il contatore e blocca il </a:t>
-            </a:r>
-            <a:r>
-              <a:rPr lang="it-IT" sz="1600" dirty="0" err="1"/>
-              <a:t>thread</a:t>
-            </a:r>
-            <a:r>
-              <a:rPr lang="it-IT" sz="1600" dirty="0"/>
-              <a:t> se </a:t>
-            </a:r>
-            <a:r>
-              <a:rPr lang="it-IT" sz="1600" dirty="0" err="1"/>
-              <a:t>cont</a:t>
-            </a:r>
-            <a:r>
-              <a:rPr lang="it-IT" sz="1600" dirty="0"/>
-              <a:t>=0) e </a:t>
-            </a:r>
-            <a:r>
-              <a:rPr lang="it-IT" sz="1600" b="1" dirty="0"/>
-              <a:t>V</a:t>
-            </a:r>
-            <a:r>
-              <a:rPr lang="it-IT" sz="1600" dirty="0"/>
-              <a:t> (incrementa il contatore e sveglia un </a:t>
-            </a:r>
-            <a:r>
-              <a:rPr lang="it-IT" sz="1600" dirty="0" err="1"/>
-              <a:t>thread</a:t>
-            </a:r>
-            <a:r>
-              <a:rPr lang="it-IT" sz="1600" dirty="0"/>
-              <a:t> in attesa)</a:t>
-            </a:r>
-            <a:endParaRPr lang="it-IT" sz="1600" b="1" dirty="0"/>
-          </a:p>
-          <a:p>
-            <a:endParaRPr lang="it-IT" sz="1600" dirty="0"/>
-          </a:p>
-        </p:txBody>
-      </p:sp>
-      <p:sp>
-        <p:nvSpPr>
-          <p:cNvPr id="9" name="Segnaposto testo 8">
-            <a:extLst>
-              <a:ext uri="{FF2B5EF4-FFF2-40B4-BE49-F238E27FC236}">
-                <a16:creationId xmlns:a16="http://schemas.microsoft.com/office/drawing/2014/main" id="{00842FCF-9A2A-27B3-4ED6-BB0713CE4444}"/>
-              </a:ext>
-            </a:extLst>
-          </p:cNvPr>
-          <p:cNvSpPr>
-            <a:spLocks noGrp="1"/>
-          </p:cNvSpPr>
-          <p:nvPr>
-            <p:ph type="body" sz="quarter" idx="3"/>
-          </p:nvPr>
-        </p:nvSpPr>
-        <p:spPr>
-          <a:xfrm>
-            <a:off x="6523735" y="2794235"/>
-            <a:ext cx="5087073" cy="553373"/>
-          </a:xfrm>
-        </p:spPr>
-        <p:txBody>
-          <a:bodyPr/>
-          <a:lstStyle/>
-          <a:p>
-            <a:r>
-              <a:rPr lang="it-IT" dirty="0"/>
-              <a:t>PINTOS</a:t>
-            </a:r>
-          </a:p>
-        </p:txBody>
-      </p:sp>
-      <p:sp>
-        <p:nvSpPr>
-          <p:cNvPr id="10" name="Segnaposto contenuto 9">
-            <a:extLst>
-              <a:ext uri="{FF2B5EF4-FFF2-40B4-BE49-F238E27FC236}">
-                <a16:creationId xmlns:a16="http://schemas.microsoft.com/office/drawing/2014/main" id="{3CDA2ECB-1671-3745-42C6-213A778ECD29}"/>
-              </a:ext>
-            </a:extLst>
-          </p:cNvPr>
-          <p:cNvSpPr>
-            <a:spLocks noGrp="1"/>
-          </p:cNvSpPr>
-          <p:nvPr>
-            <p:ph sz="quarter" idx="4"/>
-          </p:nvPr>
-        </p:nvSpPr>
-        <p:spPr>
-          <a:xfrm>
-            <a:off x="6217709" y="3469395"/>
-            <a:ext cx="5393100" cy="2934999"/>
-          </a:xfrm>
-        </p:spPr>
-        <p:txBody>
-          <a:bodyPr>
-            <a:noAutofit/>
-          </a:bodyPr>
-          <a:lstStyle/>
-          <a:p>
-            <a:r>
-              <a:rPr lang="it-IT" sz="1600" dirty="0"/>
-              <a:t>Semafori implementati come </a:t>
-            </a:r>
-            <a:r>
-              <a:rPr lang="it-IT" sz="1600" dirty="0" err="1"/>
-              <a:t>struct</a:t>
-            </a:r>
-            <a:r>
-              <a:rPr lang="it-IT" sz="1600" dirty="0"/>
-              <a:t> contenente:</a:t>
-            </a:r>
-          </a:p>
-          <a:p>
-            <a:pPr lvl="1"/>
-            <a:r>
-              <a:rPr lang="it-IT" dirty="0"/>
-              <a:t>valore: non negativo che indica il numero di </a:t>
-            </a:r>
-            <a:r>
-              <a:rPr lang="it-IT" dirty="0" err="1"/>
-              <a:t>threads</a:t>
-            </a:r>
-            <a:r>
-              <a:rPr lang="it-IT" dirty="0"/>
-              <a:t> che possono accedere alla risorsa</a:t>
-            </a:r>
-          </a:p>
-          <a:p>
-            <a:pPr lvl="1"/>
-            <a:r>
-              <a:rPr lang="it-IT" dirty="0"/>
-              <a:t>lista: </a:t>
-            </a:r>
-            <a:r>
-              <a:rPr lang="it-IT" dirty="0" err="1"/>
-              <a:t>linked</a:t>
-            </a:r>
-            <a:r>
-              <a:rPr lang="it-IT" dirty="0"/>
-              <a:t> list che memorizza i </a:t>
-            </a:r>
-            <a:r>
-              <a:rPr lang="it-IT" dirty="0" err="1"/>
-              <a:t>threads</a:t>
-            </a:r>
-            <a:r>
-              <a:rPr lang="it-IT" dirty="0"/>
-              <a:t> in attesa</a:t>
-            </a:r>
-          </a:p>
-          <a:p>
-            <a:r>
-              <a:rPr lang="it-IT" sz="1600" dirty="0"/>
-              <a:t>Sono usate le funzioni </a:t>
-            </a:r>
-            <a:r>
-              <a:rPr lang="it-IT" sz="1600" b="1" dirty="0" err="1"/>
-              <a:t>sema_down</a:t>
-            </a:r>
-            <a:r>
-              <a:rPr lang="it-IT" sz="1600" b="1" dirty="0"/>
-              <a:t> </a:t>
-            </a:r>
-            <a:r>
-              <a:rPr lang="it-IT" sz="1600" dirty="0"/>
-              <a:t>(decrementa il contatore e blocca il </a:t>
-            </a:r>
-            <a:r>
-              <a:rPr lang="it-IT" sz="1600" dirty="0" err="1"/>
-              <a:t>thread</a:t>
-            </a:r>
-            <a:r>
-              <a:rPr lang="it-IT" sz="1600" dirty="0"/>
-              <a:t> se </a:t>
-            </a:r>
-            <a:r>
-              <a:rPr lang="it-IT" sz="1600" dirty="0" err="1"/>
-              <a:t>cont</a:t>
-            </a:r>
-            <a:r>
-              <a:rPr lang="it-IT" sz="1600" dirty="0"/>
-              <a:t>=0) e </a:t>
-            </a:r>
-            <a:r>
-              <a:rPr lang="it-IT" sz="1600" b="1" dirty="0" err="1"/>
-              <a:t>sema_up</a:t>
-            </a:r>
-            <a:r>
-              <a:rPr lang="it-IT" sz="1600" dirty="0"/>
-              <a:t> (incrementa il contatore e sveglia un </a:t>
-            </a:r>
-            <a:r>
-              <a:rPr lang="it-IT" sz="1600" dirty="0" err="1"/>
-              <a:t>thread</a:t>
-            </a:r>
-            <a:r>
-              <a:rPr lang="it-IT" sz="1600" dirty="0"/>
-              <a:t> in attesa)</a:t>
-            </a:r>
-          </a:p>
-          <a:p>
-            <a:r>
-              <a:rPr lang="it-IT" sz="1600" dirty="0"/>
-              <a:t>È presente la funzione </a:t>
-            </a:r>
-            <a:r>
-              <a:rPr lang="it-IT" sz="1600" b="1" dirty="0" err="1"/>
-              <a:t>sema_try_down</a:t>
-            </a:r>
-            <a:r>
-              <a:rPr lang="it-IT" sz="1600" dirty="0"/>
-              <a:t> che prova ad abbassare il valore del semaforo senza attendere. Se il </a:t>
-            </a:r>
-            <a:r>
-              <a:rPr lang="it-IT" sz="1600" dirty="0" err="1"/>
-              <a:t>value</a:t>
-            </a:r>
-            <a:r>
-              <a:rPr lang="it-IT" sz="1600" dirty="0"/>
-              <a:t> è 0 il </a:t>
-            </a:r>
-            <a:r>
-              <a:rPr lang="it-IT" sz="1600" dirty="0" err="1"/>
-              <a:t>thread</a:t>
-            </a:r>
-            <a:r>
-              <a:rPr lang="it-IT" sz="1600" dirty="0"/>
-              <a:t> è bloccato e messo in attesa; altrimenti viene decrementato e la funzione restituisce </a:t>
-            </a:r>
-            <a:r>
-              <a:rPr lang="it-IT" sz="1600" dirty="0" err="1"/>
-              <a:t>true</a:t>
-            </a:r>
-            <a:endParaRPr lang="it-IT" sz="1600" dirty="0"/>
-          </a:p>
-        </p:txBody>
-      </p:sp>
-      <p:sp>
-        <p:nvSpPr>
-          <p:cNvPr id="3" name="Segnaposto testo 3">
-            <a:extLst>
-              <a:ext uri="{FF2B5EF4-FFF2-40B4-BE49-F238E27FC236}">
-                <a16:creationId xmlns:a16="http://schemas.microsoft.com/office/drawing/2014/main" id="{DD092F63-1123-8337-F4DC-4B5BF08C3E1F}"/>
-              </a:ext>
-            </a:extLst>
-          </p:cNvPr>
-          <p:cNvSpPr txBox="1">
-            <a:spLocks/>
-          </p:cNvSpPr>
-          <p:nvPr/>
-        </p:nvSpPr>
-        <p:spPr>
-          <a:xfrm>
-            <a:off x="615548" y="1879772"/>
-            <a:ext cx="11245148" cy="921080"/>
-          </a:xfrm>
-          <a:prstGeom prst="rect">
-            <a:avLst/>
-          </a:prstGeom>
-        </p:spPr>
-        <p:txBody>
-          <a:bodyPr vert="horz" lIns="91440" tIns="45720" rIns="91440" bIns="45720" rtlCol="0" anchor="b">
-            <a:noAutofit/>
-          </a:bodyPr>
-          <a:lstStyle>
-            <a:lvl1pPr marL="0" indent="0" algn="l" defTabSz="457200" rtl="0" eaLnBrk="1" latinLnBrk="0" hangingPunct="1">
-              <a:spcBef>
-                <a:spcPct val="20000"/>
-              </a:spcBef>
-              <a:spcAft>
-                <a:spcPts val="600"/>
-              </a:spcAft>
-              <a:buClr>
-                <a:schemeClr val="accent2"/>
-              </a:buClr>
-              <a:buSzPct val="92000"/>
-              <a:buFont typeface="Wingdings 2" panose="05020102010507070707" pitchFamily="18" charset="2"/>
-              <a:buNone/>
-              <a:defRPr sz="2200" b="0" kern="1200">
-                <a:solidFill>
-                  <a:schemeClr val="accent2"/>
-                </a:solidFill>
-                <a:latin typeface="+mn-lt"/>
-                <a:ea typeface="+mn-ea"/>
-                <a:cs typeface="+mn-cs"/>
-              </a:defRPr>
-            </a:lvl1pPr>
-            <a:lvl2pPr marL="457200" indent="0" algn="l" defTabSz="457200" rtl="0" eaLnBrk="1" latinLnBrk="0" hangingPunct="1">
-              <a:spcBef>
-                <a:spcPct val="20000"/>
-              </a:spcBef>
-              <a:spcAft>
-                <a:spcPts val="600"/>
-              </a:spcAft>
-              <a:buClr>
-                <a:schemeClr val="accent2"/>
-              </a:buClr>
-              <a:buSzPct val="92000"/>
-              <a:buFont typeface="Wingdings 2" panose="05020102010507070707" pitchFamily="18" charset="2"/>
-              <a:buNone/>
-              <a:defRPr sz="2000" b="1" kern="1200">
-                <a:solidFill>
-                  <a:schemeClr val="tx2"/>
-                </a:solidFill>
-                <a:latin typeface="+mn-lt"/>
-                <a:ea typeface="+mn-ea"/>
-                <a:cs typeface="+mn-cs"/>
-              </a:defRPr>
-            </a:lvl2pPr>
-            <a:lvl3pPr marL="914400" indent="0" algn="l" defTabSz="457200" rtl="0" eaLnBrk="1" latinLnBrk="0" hangingPunct="1">
-              <a:spcBef>
-                <a:spcPct val="20000"/>
-              </a:spcBef>
-              <a:spcAft>
-                <a:spcPts val="600"/>
-              </a:spcAft>
-              <a:buClr>
-                <a:schemeClr val="accent2"/>
-              </a:buClr>
-              <a:buSzPct val="92000"/>
-              <a:buFont typeface="Wingdings 2" panose="05020102010507070707" pitchFamily="18" charset="2"/>
-              <a:buNone/>
-              <a:defRPr sz="1800" b="1" kern="1200">
-                <a:solidFill>
-                  <a:schemeClr val="tx2"/>
-                </a:solidFill>
-                <a:latin typeface="+mn-lt"/>
-                <a:ea typeface="+mn-ea"/>
-                <a:cs typeface="+mn-cs"/>
-              </a:defRPr>
-            </a:lvl3pPr>
-            <a:lvl4pPr marL="1371600" indent="0" algn="l" defTabSz="457200" rtl="0" eaLnBrk="1" latinLnBrk="0" hangingPunct="1">
-              <a:spcBef>
-                <a:spcPct val="20000"/>
-              </a:spcBef>
-              <a:spcAft>
-                <a:spcPts val="600"/>
-              </a:spcAft>
-              <a:buClr>
-                <a:schemeClr val="accent2"/>
-              </a:buClr>
-              <a:buSzPct val="92000"/>
-              <a:buFont typeface="Wingdings 2" panose="05020102010507070707" pitchFamily="18" charset="2"/>
-              <a:buNone/>
-              <a:defRPr sz="1600" b="1" kern="1200">
-                <a:solidFill>
-                  <a:schemeClr val="tx2"/>
-                </a:solidFill>
-                <a:latin typeface="+mn-lt"/>
-                <a:ea typeface="+mn-ea"/>
-                <a:cs typeface="+mn-cs"/>
-              </a:defRPr>
-            </a:lvl4pPr>
-            <a:lvl5pPr marL="1828800" indent="0" algn="l" defTabSz="457200" rtl="0" eaLnBrk="1" latinLnBrk="0" hangingPunct="1">
-              <a:spcBef>
-                <a:spcPct val="20000"/>
-              </a:spcBef>
-              <a:spcAft>
-                <a:spcPts val="600"/>
-              </a:spcAft>
-              <a:buClr>
-                <a:schemeClr val="accent2"/>
-              </a:buClr>
-              <a:buSzPct val="92000"/>
-              <a:buFont typeface="Wingdings 2" panose="05020102010507070707" pitchFamily="18" charset="2"/>
-              <a:buNone/>
-              <a:defRPr sz="1600" b="1" kern="1200">
-                <a:solidFill>
-                  <a:schemeClr val="tx2"/>
-                </a:solidFill>
-                <a:latin typeface="+mn-lt"/>
-                <a:ea typeface="+mn-ea"/>
-                <a:cs typeface="+mn-cs"/>
-              </a:defRPr>
-            </a:lvl5pPr>
-            <a:lvl6pPr marL="2286000" indent="0" algn="l" defTabSz="457200" rtl="0" eaLnBrk="1" latinLnBrk="0" hangingPunct="1">
-              <a:spcBef>
-                <a:spcPct val="20000"/>
-              </a:spcBef>
-              <a:spcAft>
-                <a:spcPts val="600"/>
-              </a:spcAft>
-              <a:buClr>
-                <a:schemeClr val="accent2"/>
-              </a:buClr>
-              <a:buSzPct val="92000"/>
-              <a:buFont typeface="Wingdings 2" panose="05020102010507070707" pitchFamily="18" charset="2"/>
-              <a:buNone/>
-              <a:defRPr sz="1600" b="1" kern="1200">
-                <a:solidFill>
-                  <a:schemeClr val="tx2"/>
-                </a:solidFill>
-                <a:latin typeface="+mn-lt"/>
-                <a:ea typeface="+mn-ea"/>
-                <a:cs typeface="+mn-cs"/>
-              </a:defRPr>
-            </a:lvl6pPr>
-            <a:lvl7pPr marL="2743200" indent="0" algn="l" defTabSz="457200" rtl="0" eaLnBrk="1" latinLnBrk="0" hangingPunct="1">
-              <a:spcBef>
-                <a:spcPct val="20000"/>
-              </a:spcBef>
-              <a:spcAft>
-                <a:spcPts val="600"/>
-              </a:spcAft>
-              <a:buClr>
-                <a:schemeClr val="accent2"/>
-              </a:buClr>
-              <a:buSzPct val="92000"/>
-              <a:buFont typeface="Wingdings 2" panose="05020102010507070707" pitchFamily="18" charset="2"/>
-              <a:buNone/>
-              <a:defRPr sz="1600" b="1" kern="1200">
-                <a:solidFill>
-                  <a:schemeClr val="tx2"/>
-                </a:solidFill>
-                <a:latin typeface="+mn-lt"/>
-                <a:ea typeface="+mn-ea"/>
-                <a:cs typeface="+mn-cs"/>
-              </a:defRPr>
-            </a:lvl7pPr>
-            <a:lvl8pPr marL="3200400" indent="0" algn="l" defTabSz="457200" rtl="0" eaLnBrk="1" latinLnBrk="0" hangingPunct="1">
-              <a:spcBef>
-                <a:spcPct val="20000"/>
-              </a:spcBef>
-              <a:spcAft>
-                <a:spcPts val="600"/>
-              </a:spcAft>
-              <a:buClr>
-                <a:schemeClr val="accent2"/>
-              </a:buClr>
-              <a:buSzPct val="92000"/>
-              <a:buFont typeface="Wingdings 2" panose="05020102010507070707" pitchFamily="18" charset="2"/>
-              <a:buNone/>
-              <a:defRPr sz="1600" b="1" kern="1200">
-                <a:solidFill>
-                  <a:schemeClr val="tx2"/>
-                </a:solidFill>
-                <a:latin typeface="+mn-lt"/>
-                <a:ea typeface="+mn-ea"/>
-                <a:cs typeface="+mn-cs"/>
-              </a:defRPr>
-            </a:lvl8pPr>
-            <a:lvl9pPr marL="3657600" indent="0" algn="l" defTabSz="457200" rtl="0" eaLnBrk="1" latinLnBrk="0" hangingPunct="1">
-              <a:spcBef>
-                <a:spcPct val="20000"/>
-              </a:spcBef>
-              <a:spcAft>
-                <a:spcPts val="600"/>
-              </a:spcAft>
-              <a:buClr>
-                <a:schemeClr val="accent2"/>
-              </a:buClr>
-              <a:buSzPct val="92000"/>
-              <a:buFont typeface="Wingdings 2" panose="05020102010507070707" pitchFamily="18" charset="2"/>
-              <a:buNone/>
-              <a:defRPr sz="1600" b="1" kern="1200">
-                <a:solidFill>
-                  <a:schemeClr val="tx2"/>
-                </a:solidFill>
-                <a:latin typeface="+mn-lt"/>
-                <a:ea typeface="+mn-ea"/>
-                <a:cs typeface="+mn-cs"/>
-              </a:defRPr>
-            </a:lvl9pPr>
-          </a:lstStyle>
-          <a:p>
-            <a:r>
-              <a:rPr lang="it-IT" sz="2000" b="0" dirty="0">
-                <a:solidFill>
-                  <a:schemeClr val="tx1"/>
-                </a:solidFill>
-                <a:effectLst/>
-              </a:rPr>
-              <a:t>Sia OS161 che </a:t>
-            </a:r>
-            <a:r>
-              <a:rPr lang="it-IT" sz="2000" b="0" dirty="0" err="1">
-                <a:solidFill>
-                  <a:schemeClr val="tx1"/>
-                </a:solidFill>
-                <a:effectLst/>
-              </a:rPr>
-              <a:t>PintOS</a:t>
-            </a:r>
-            <a:r>
-              <a:rPr lang="it-IT" sz="2000" b="0" dirty="0">
-                <a:solidFill>
-                  <a:schemeClr val="tx1"/>
-                </a:solidFill>
-                <a:effectLst/>
-              </a:rPr>
-              <a:t> implementano i semafori seguono il modello classico di semafori di </a:t>
-            </a:r>
-            <a:r>
-              <a:rPr lang="it-IT" sz="2000" b="0" dirty="0" err="1">
-                <a:solidFill>
-                  <a:schemeClr val="tx1"/>
-                </a:solidFill>
-                <a:effectLst/>
-              </a:rPr>
-              <a:t>Dijkstra</a:t>
-            </a:r>
-            <a:r>
-              <a:rPr lang="it-IT" sz="2000" b="0" dirty="0">
-                <a:solidFill>
-                  <a:schemeClr val="tx1"/>
-                </a:solidFill>
-                <a:effectLst/>
-              </a:rPr>
-              <a:t>, con operazioni atomiche di "down" e "up" per garantire la sincronizzazione.</a:t>
-            </a:r>
-          </a:p>
-        </p:txBody>
-      </p:sp>
-    </p:spTree>
-    <p:extLst>
-      <p:ext uri="{BB962C8B-B14F-4D97-AF65-F5344CB8AC3E}">
-        <p14:creationId xmlns:p14="http://schemas.microsoft.com/office/powerpoint/2010/main" val="4198586686"/>
-      </p:ext>
-    </p:extLst>
-  </p:cSld>
-  <p:clrMapOvr>
-    <a:masterClrMapping/>
-  </p:clrMapOvr>
-</p:sld>
-</file>
-
-<file path=ppt/slides/slide13.xml><?xml version="1.0" encoding="utf-8"?>
-<p:sld xmlns:a="http://schemas.openxmlformats.org/drawingml/2006/main" xmlns:r="http://schemas.openxmlformats.org/officeDocument/2006/relationships" xmlns:p="http://schemas.openxmlformats.org/presentationml/2006/main">
-  <p:cSld>
-    <p:spTree>
-      <p:nvGrpSpPr>
-        <p:cNvPr id="1" name=""/>
-        <p:cNvGrpSpPr/>
-        <p:nvPr/>
-      </p:nvGrpSpPr>
-      <p:grpSpPr>
-        <a:xfrm>
-          <a:off x="0" y="0"/>
-          <a:ext cx="0" cy="0"/>
-          <a:chOff x="0" y="0"/>
-          <a:chExt cx="0" cy="0"/>
-        </a:xfrm>
-      </p:grpSpPr>
-      <p:sp>
-        <p:nvSpPr>
-          <p:cNvPr id="2" name="Titolo 1">
-            <a:extLst>
-              <a:ext uri="{FF2B5EF4-FFF2-40B4-BE49-F238E27FC236}">
-                <a16:creationId xmlns:a16="http://schemas.microsoft.com/office/drawing/2014/main" id="{69441F67-1949-8EC8-EB98-85670AC3670C}"/>
-              </a:ext>
-            </a:extLst>
-          </p:cNvPr>
-          <p:cNvSpPr>
-            <a:spLocks noGrp="1"/>
-          </p:cNvSpPr>
-          <p:nvPr>
-            <p:ph type="title"/>
-          </p:nvPr>
-        </p:nvSpPr>
-        <p:spPr/>
-        <p:txBody>
-          <a:bodyPr>
-            <a:normAutofit/>
-          </a:bodyPr>
-          <a:lstStyle/>
-          <a:p>
-            <a:r>
-              <a:rPr lang="it-IT" dirty="0"/>
-              <a:t>Meccanismi di sincronizzazione </a:t>
-            </a:r>
-            <a:r>
-              <a:rPr lang="it-IT" sz="1600" dirty="0"/>
-              <a:t>– lock (</a:t>
-            </a:r>
-            <a:r>
-              <a:rPr lang="it-IT" sz="1600" dirty="0" err="1"/>
-              <a:t>mutex</a:t>
-            </a:r>
-            <a:r>
-              <a:rPr lang="it-IT" sz="1600" dirty="0"/>
-              <a:t>)</a:t>
-            </a:r>
-            <a:endParaRPr lang="it-IT" dirty="0"/>
-          </a:p>
-        </p:txBody>
-      </p:sp>
-      <p:sp>
-        <p:nvSpPr>
-          <p:cNvPr id="4" name="Segnaposto testo 3">
-            <a:extLst>
-              <a:ext uri="{FF2B5EF4-FFF2-40B4-BE49-F238E27FC236}">
-                <a16:creationId xmlns:a16="http://schemas.microsoft.com/office/drawing/2014/main" id="{3484543A-BB31-0207-182F-1F1C206F0C68}"/>
-              </a:ext>
-            </a:extLst>
-          </p:cNvPr>
-          <p:cNvSpPr>
-            <a:spLocks noGrp="1"/>
-          </p:cNvSpPr>
-          <p:nvPr>
-            <p:ph type="body" idx="1"/>
-          </p:nvPr>
-        </p:nvSpPr>
-        <p:spPr>
-          <a:xfrm>
-            <a:off x="887219" y="2555699"/>
-            <a:ext cx="5087075" cy="536005"/>
-          </a:xfrm>
-        </p:spPr>
-        <p:txBody>
-          <a:bodyPr/>
-          <a:lstStyle/>
-          <a:p>
-            <a:r>
-              <a:rPr lang="it-IT" dirty="0"/>
-              <a:t>OS161</a:t>
-            </a:r>
-          </a:p>
-        </p:txBody>
-      </p:sp>
-      <p:sp>
-        <p:nvSpPr>
-          <p:cNvPr id="8" name="Segnaposto contenuto 7">
-            <a:extLst>
-              <a:ext uri="{FF2B5EF4-FFF2-40B4-BE49-F238E27FC236}">
-                <a16:creationId xmlns:a16="http://schemas.microsoft.com/office/drawing/2014/main" id="{A1E5DF89-94E7-98C4-F563-B3A43317A1CE}"/>
-              </a:ext>
-            </a:extLst>
-          </p:cNvPr>
-          <p:cNvSpPr>
-            <a:spLocks noGrp="1"/>
-          </p:cNvSpPr>
-          <p:nvPr>
-            <p:ph sz="half" idx="2"/>
-          </p:nvPr>
-        </p:nvSpPr>
-        <p:spPr>
-          <a:xfrm>
-            <a:off x="581194" y="3230859"/>
-            <a:ext cx="5393100" cy="2934999"/>
-          </a:xfrm>
-        </p:spPr>
-        <p:txBody>
-          <a:bodyPr>
-            <a:noAutofit/>
-          </a:bodyPr>
-          <a:lstStyle/>
-          <a:p>
-            <a:r>
-              <a:rPr lang="it-IT" sz="1600" dirty="0"/>
-              <a:t>Lock implementato come </a:t>
-            </a:r>
-            <a:r>
-              <a:rPr lang="it-IT" sz="1600" dirty="0" err="1"/>
-              <a:t>struct</a:t>
-            </a:r>
-            <a:r>
-              <a:rPr lang="it-IT" sz="1600" dirty="0"/>
-              <a:t> contenente:</a:t>
-            </a:r>
-          </a:p>
-          <a:p>
-            <a:pPr lvl="1"/>
-            <a:r>
-              <a:rPr lang="it-IT" dirty="0"/>
-              <a:t>nome: per identificare il lock</a:t>
-            </a:r>
-          </a:p>
-          <a:p>
-            <a:pPr lvl="1"/>
-            <a:r>
-              <a:rPr lang="it-IT" dirty="0"/>
-              <a:t>HANGMAN_LOCKABLE: per rilevare i deadlock</a:t>
-            </a:r>
-          </a:p>
-          <a:p>
-            <a:r>
-              <a:rPr lang="it-IT" sz="1600" dirty="0"/>
-              <a:t>Le operazioni sui Lock sono simili a quelle che offre </a:t>
-            </a:r>
-            <a:r>
-              <a:rPr lang="it-IT" sz="1600" dirty="0" err="1"/>
-              <a:t>PintOS</a:t>
-            </a:r>
-            <a:endParaRPr lang="it-IT" sz="1600" dirty="0"/>
-          </a:p>
-          <a:p>
-            <a:r>
-              <a:rPr lang="it-IT" sz="1600" dirty="0"/>
-              <a:t>La differenza principale è che OS161 utilizza anche un hook per riconoscere e prevenire i deadlock</a:t>
-            </a:r>
-          </a:p>
-          <a:p>
-            <a:pPr lvl="1"/>
-            <a:r>
-              <a:rPr lang="it-IT" dirty="0"/>
-              <a:t>Il rilevatore di deadlock di OS161 utilizza un approccio basato sul grafo per rilevare i deadlock. I </a:t>
-            </a:r>
-            <a:r>
-              <a:rPr lang="it-IT" dirty="0" err="1"/>
-              <a:t>thread</a:t>
-            </a:r>
-            <a:r>
-              <a:rPr lang="it-IT" dirty="0"/>
-              <a:t> e i lock vengono rappresentati come nodi e archi in un grafo. Il codice di rilevamento dei deadlock controlla il grafo per rilevare cicli. Se viene rilevato un ciclo, significa che esiste un deadlock</a:t>
-            </a:r>
-          </a:p>
-          <a:p>
-            <a:endParaRPr lang="it-IT" sz="1600" dirty="0"/>
-          </a:p>
-        </p:txBody>
-      </p:sp>
-      <p:sp>
-        <p:nvSpPr>
-          <p:cNvPr id="9" name="Segnaposto testo 8">
-            <a:extLst>
-              <a:ext uri="{FF2B5EF4-FFF2-40B4-BE49-F238E27FC236}">
-                <a16:creationId xmlns:a16="http://schemas.microsoft.com/office/drawing/2014/main" id="{00842FCF-9A2A-27B3-4ED6-BB0713CE4444}"/>
-              </a:ext>
-            </a:extLst>
-          </p:cNvPr>
-          <p:cNvSpPr>
-            <a:spLocks noGrp="1"/>
-          </p:cNvSpPr>
-          <p:nvPr>
-            <p:ph type="body" sz="quarter" idx="3"/>
-          </p:nvPr>
-        </p:nvSpPr>
-        <p:spPr>
-          <a:xfrm>
-            <a:off x="6523735" y="2555699"/>
-            <a:ext cx="5087073" cy="553373"/>
-          </a:xfrm>
-        </p:spPr>
-        <p:txBody>
-          <a:bodyPr/>
-          <a:lstStyle/>
-          <a:p>
-            <a:r>
-              <a:rPr lang="it-IT" dirty="0"/>
-              <a:t>PINTOS</a:t>
-            </a:r>
-          </a:p>
-        </p:txBody>
-      </p:sp>
-      <p:sp>
-        <p:nvSpPr>
-          <p:cNvPr id="10" name="Segnaposto contenuto 9">
-            <a:extLst>
-              <a:ext uri="{FF2B5EF4-FFF2-40B4-BE49-F238E27FC236}">
-                <a16:creationId xmlns:a16="http://schemas.microsoft.com/office/drawing/2014/main" id="{3CDA2ECB-1671-3745-42C6-213A778ECD29}"/>
-              </a:ext>
-            </a:extLst>
-          </p:cNvPr>
-          <p:cNvSpPr>
-            <a:spLocks noGrp="1"/>
-          </p:cNvSpPr>
-          <p:nvPr>
-            <p:ph sz="quarter" idx="4"/>
-          </p:nvPr>
-        </p:nvSpPr>
-        <p:spPr>
-          <a:xfrm>
-            <a:off x="6217709" y="3230859"/>
-            <a:ext cx="5393100" cy="2934999"/>
-          </a:xfrm>
-        </p:spPr>
-        <p:txBody>
-          <a:bodyPr>
-            <a:noAutofit/>
-          </a:bodyPr>
-          <a:lstStyle/>
-          <a:p>
-            <a:r>
-              <a:rPr lang="it-IT" sz="1600" dirty="0"/>
-              <a:t>Lock implementato come </a:t>
-            </a:r>
-            <a:r>
-              <a:rPr lang="it-IT" sz="1600" dirty="0" err="1"/>
-              <a:t>struct</a:t>
-            </a:r>
-            <a:r>
-              <a:rPr lang="it-IT" sz="1600" dirty="0"/>
-              <a:t> contenente:</a:t>
-            </a:r>
-          </a:p>
-          <a:p>
-            <a:pPr lvl="1"/>
-            <a:r>
-              <a:rPr lang="it-IT" dirty="0" err="1"/>
-              <a:t>thread</a:t>
-            </a:r>
-            <a:r>
-              <a:rPr lang="it-IT" dirty="0"/>
-              <a:t>: chi detiene il lock</a:t>
-            </a:r>
-          </a:p>
-          <a:p>
-            <a:pPr lvl="1"/>
-            <a:r>
-              <a:rPr lang="it-IT" dirty="0" err="1"/>
-              <a:t>semaphore</a:t>
-            </a:r>
-            <a:r>
-              <a:rPr lang="it-IT" dirty="0"/>
-              <a:t>: struttura semaforo binario per il controllo degli accessi</a:t>
-            </a:r>
-          </a:p>
-          <a:p>
-            <a:r>
-              <a:rPr lang="it-IT" sz="1600" dirty="0"/>
-              <a:t>Le funzioni sui Lock sono: </a:t>
-            </a:r>
-          </a:p>
-          <a:p>
-            <a:pPr lvl="1"/>
-            <a:r>
-              <a:rPr lang="it-IT" sz="1200" b="1" dirty="0" err="1"/>
-              <a:t>lock_init</a:t>
-            </a:r>
-            <a:r>
-              <a:rPr lang="it-IT" sz="1200" dirty="0"/>
-              <a:t> : Inizializza un nuovo lock.</a:t>
-            </a:r>
-          </a:p>
-          <a:p>
-            <a:pPr lvl="1"/>
-            <a:r>
-              <a:rPr lang="it-IT" sz="1200" b="1" dirty="0" err="1"/>
-              <a:t>lock_acquire</a:t>
-            </a:r>
-            <a:r>
-              <a:rPr lang="it-IT" sz="1200" dirty="0"/>
-              <a:t> : Acquisisce il lock, aspettando, se necessario, il suo rilascio.</a:t>
-            </a:r>
-          </a:p>
-          <a:p>
-            <a:pPr lvl="1"/>
-            <a:r>
-              <a:rPr lang="it-IT" sz="1200" b="1" dirty="0" err="1"/>
-              <a:t>lock_try_acquire</a:t>
-            </a:r>
-            <a:r>
-              <a:rPr lang="it-IT" sz="1200" dirty="0"/>
-              <a:t> : Prova ad acquisire il lock senza attendere.</a:t>
-            </a:r>
-          </a:p>
-          <a:p>
-            <a:pPr lvl="1"/>
-            <a:r>
-              <a:rPr lang="it-IT" sz="1200" b="1" dirty="0" err="1"/>
-              <a:t>lock_release</a:t>
-            </a:r>
-            <a:r>
-              <a:rPr lang="it-IT" sz="1200" dirty="0"/>
-              <a:t> : Rilascia il lock detenuto dal </a:t>
-            </a:r>
-            <a:r>
-              <a:rPr lang="it-IT" sz="1200" dirty="0" err="1"/>
-              <a:t>thread</a:t>
-            </a:r>
-            <a:r>
-              <a:rPr lang="it-IT" sz="1200" dirty="0"/>
-              <a:t> corrente.</a:t>
-            </a:r>
-          </a:p>
-          <a:p>
-            <a:pPr lvl="1"/>
-            <a:r>
-              <a:rPr lang="it-IT" sz="1200" b="1" dirty="0" err="1"/>
-              <a:t>lock_held_by_current_thread</a:t>
-            </a:r>
-            <a:r>
-              <a:rPr lang="it-IT" sz="1200" dirty="0"/>
-              <a:t> : Verifica se il </a:t>
-            </a:r>
-            <a:r>
-              <a:rPr lang="it-IT" sz="1200" dirty="0" err="1"/>
-              <a:t>thread</a:t>
-            </a:r>
-            <a:r>
-              <a:rPr lang="it-IT" sz="1200" dirty="0"/>
-              <a:t> in esecuzione possiede il lock.</a:t>
-            </a:r>
-          </a:p>
-          <a:p>
-            <a:pPr marL="324000" lvl="1" indent="0">
-              <a:buNone/>
-            </a:pPr>
-            <a:endParaRPr lang="it-IT" dirty="0"/>
-          </a:p>
-        </p:txBody>
-      </p:sp>
-      <p:sp>
-        <p:nvSpPr>
-          <p:cNvPr id="3" name="Segnaposto testo 3">
-            <a:extLst>
-              <a:ext uri="{FF2B5EF4-FFF2-40B4-BE49-F238E27FC236}">
-                <a16:creationId xmlns:a16="http://schemas.microsoft.com/office/drawing/2014/main" id="{DD092F63-1123-8337-F4DC-4B5BF08C3E1F}"/>
-              </a:ext>
-            </a:extLst>
-          </p:cNvPr>
-          <p:cNvSpPr txBox="1">
-            <a:spLocks/>
-          </p:cNvSpPr>
-          <p:nvPr/>
-        </p:nvSpPr>
-        <p:spPr>
-          <a:xfrm>
-            <a:off x="615548" y="1641236"/>
-            <a:ext cx="11245148" cy="921080"/>
-          </a:xfrm>
-          <a:prstGeom prst="rect">
-            <a:avLst/>
-          </a:prstGeom>
-        </p:spPr>
-        <p:txBody>
-          <a:bodyPr vert="horz" lIns="91440" tIns="45720" rIns="91440" bIns="45720" rtlCol="0" anchor="b">
-            <a:noAutofit/>
-          </a:bodyPr>
-          <a:lstStyle>
-            <a:lvl1pPr marL="0" indent="0" algn="l" defTabSz="457200" rtl="0" eaLnBrk="1" latinLnBrk="0" hangingPunct="1">
-              <a:spcBef>
-                <a:spcPct val="20000"/>
-              </a:spcBef>
-              <a:spcAft>
-                <a:spcPts val="600"/>
-              </a:spcAft>
-              <a:buClr>
-                <a:schemeClr val="accent2"/>
-              </a:buClr>
-              <a:buSzPct val="92000"/>
-              <a:buFont typeface="Wingdings 2" panose="05020102010507070707" pitchFamily="18" charset="2"/>
-              <a:buNone/>
-              <a:defRPr sz="2200" b="0" kern="1200">
-                <a:solidFill>
-                  <a:schemeClr val="accent2"/>
-                </a:solidFill>
-                <a:latin typeface="+mn-lt"/>
-                <a:ea typeface="+mn-ea"/>
-                <a:cs typeface="+mn-cs"/>
-              </a:defRPr>
-            </a:lvl1pPr>
-            <a:lvl2pPr marL="457200" indent="0" algn="l" defTabSz="457200" rtl="0" eaLnBrk="1" latinLnBrk="0" hangingPunct="1">
-              <a:spcBef>
-                <a:spcPct val="20000"/>
-              </a:spcBef>
-              <a:spcAft>
-                <a:spcPts val="600"/>
-              </a:spcAft>
-              <a:buClr>
-                <a:schemeClr val="accent2"/>
-              </a:buClr>
-              <a:buSzPct val="92000"/>
-              <a:buFont typeface="Wingdings 2" panose="05020102010507070707" pitchFamily="18" charset="2"/>
-              <a:buNone/>
-              <a:defRPr sz="2000" b="1" kern="1200">
-                <a:solidFill>
-                  <a:schemeClr val="tx2"/>
-                </a:solidFill>
-                <a:latin typeface="+mn-lt"/>
-                <a:ea typeface="+mn-ea"/>
-                <a:cs typeface="+mn-cs"/>
-              </a:defRPr>
-            </a:lvl2pPr>
-            <a:lvl3pPr marL="914400" indent="0" algn="l" defTabSz="457200" rtl="0" eaLnBrk="1" latinLnBrk="0" hangingPunct="1">
-              <a:spcBef>
-                <a:spcPct val="20000"/>
-              </a:spcBef>
-              <a:spcAft>
-                <a:spcPts val="600"/>
-              </a:spcAft>
-              <a:buClr>
-                <a:schemeClr val="accent2"/>
-              </a:buClr>
-              <a:buSzPct val="92000"/>
-              <a:buFont typeface="Wingdings 2" panose="05020102010507070707" pitchFamily="18" charset="2"/>
-              <a:buNone/>
-              <a:defRPr sz="1800" b="1" kern="1200">
-                <a:solidFill>
-                  <a:schemeClr val="tx2"/>
-                </a:solidFill>
-                <a:latin typeface="+mn-lt"/>
-                <a:ea typeface="+mn-ea"/>
-                <a:cs typeface="+mn-cs"/>
-              </a:defRPr>
-            </a:lvl3pPr>
-            <a:lvl4pPr marL="1371600" indent="0" algn="l" defTabSz="457200" rtl="0" eaLnBrk="1" latinLnBrk="0" hangingPunct="1">
-              <a:spcBef>
-                <a:spcPct val="20000"/>
-              </a:spcBef>
-              <a:spcAft>
-                <a:spcPts val="600"/>
-              </a:spcAft>
-              <a:buClr>
-                <a:schemeClr val="accent2"/>
-              </a:buClr>
-              <a:buSzPct val="92000"/>
-              <a:buFont typeface="Wingdings 2" panose="05020102010507070707" pitchFamily="18" charset="2"/>
-              <a:buNone/>
-              <a:defRPr sz="1600" b="1" kern="1200">
-                <a:solidFill>
-                  <a:schemeClr val="tx2"/>
-                </a:solidFill>
-                <a:latin typeface="+mn-lt"/>
-                <a:ea typeface="+mn-ea"/>
-                <a:cs typeface="+mn-cs"/>
-              </a:defRPr>
-            </a:lvl4pPr>
-            <a:lvl5pPr marL="1828800" indent="0" algn="l" defTabSz="457200" rtl="0" eaLnBrk="1" latinLnBrk="0" hangingPunct="1">
-              <a:spcBef>
-                <a:spcPct val="20000"/>
-              </a:spcBef>
-              <a:spcAft>
-                <a:spcPts val="600"/>
-              </a:spcAft>
-              <a:buClr>
-                <a:schemeClr val="accent2"/>
-              </a:buClr>
-              <a:buSzPct val="92000"/>
-              <a:buFont typeface="Wingdings 2" panose="05020102010507070707" pitchFamily="18" charset="2"/>
-              <a:buNone/>
-              <a:defRPr sz="1600" b="1" kern="1200">
-                <a:solidFill>
-                  <a:schemeClr val="tx2"/>
-                </a:solidFill>
-                <a:latin typeface="+mn-lt"/>
-                <a:ea typeface="+mn-ea"/>
-                <a:cs typeface="+mn-cs"/>
-              </a:defRPr>
-            </a:lvl5pPr>
-            <a:lvl6pPr marL="2286000" indent="0" algn="l" defTabSz="457200" rtl="0" eaLnBrk="1" latinLnBrk="0" hangingPunct="1">
-              <a:spcBef>
-                <a:spcPct val="20000"/>
-              </a:spcBef>
-              <a:spcAft>
-                <a:spcPts val="600"/>
-              </a:spcAft>
-              <a:buClr>
-                <a:schemeClr val="accent2"/>
-              </a:buClr>
-              <a:buSzPct val="92000"/>
-              <a:buFont typeface="Wingdings 2" panose="05020102010507070707" pitchFamily="18" charset="2"/>
-              <a:buNone/>
-              <a:defRPr sz="1600" b="1" kern="1200">
-                <a:solidFill>
-                  <a:schemeClr val="tx2"/>
-                </a:solidFill>
-                <a:latin typeface="+mn-lt"/>
-                <a:ea typeface="+mn-ea"/>
-                <a:cs typeface="+mn-cs"/>
-              </a:defRPr>
-            </a:lvl6pPr>
-            <a:lvl7pPr marL="2743200" indent="0" algn="l" defTabSz="457200" rtl="0" eaLnBrk="1" latinLnBrk="0" hangingPunct="1">
-              <a:spcBef>
-                <a:spcPct val="20000"/>
-              </a:spcBef>
-              <a:spcAft>
-                <a:spcPts val="600"/>
-              </a:spcAft>
-              <a:buClr>
-                <a:schemeClr val="accent2"/>
-              </a:buClr>
-              <a:buSzPct val="92000"/>
-              <a:buFont typeface="Wingdings 2" panose="05020102010507070707" pitchFamily="18" charset="2"/>
-              <a:buNone/>
-              <a:defRPr sz="1600" b="1" kern="1200">
-                <a:solidFill>
-                  <a:schemeClr val="tx2"/>
-                </a:solidFill>
-                <a:latin typeface="+mn-lt"/>
-                <a:ea typeface="+mn-ea"/>
-                <a:cs typeface="+mn-cs"/>
-              </a:defRPr>
-            </a:lvl7pPr>
-            <a:lvl8pPr marL="3200400" indent="0" algn="l" defTabSz="457200" rtl="0" eaLnBrk="1" latinLnBrk="0" hangingPunct="1">
-              <a:spcBef>
-                <a:spcPct val="20000"/>
-              </a:spcBef>
-              <a:spcAft>
-                <a:spcPts val="600"/>
-              </a:spcAft>
-              <a:buClr>
-                <a:schemeClr val="accent2"/>
-              </a:buClr>
-              <a:buSzPct val="92000"/>
-              <a:buFont typeface="Wingdings 2" panose="05020102010507070707" pitchFamily="18" charset="2"/>
-              <a:buNone/>
-              <a:defRPr sz="1600" b="1" kern="1200">
-                <a:solidFill>
-                  <a:schemeClr val="tx2"/>
-                </a:solidFill>
-                <a:latin typeface="+mn-lt"/>
-                <a:ea typeface="+mn-ea"/>
-                <a:cs typeface="+mn-cs"/>
-              </a:defRPr>
-            </a:lvl8pPr>
-            <a:lvl9pPr marL="3657600" indent="0" algn="l" defTabSz="457200" rtl="0" eaLnBrk="1" latinLnBrk="0" hangingPunct="1">
-              <a:spcBef>
-                <a:spcPct val="20000"/>
-              </a:spcBef>
-              <a:spcAft>
-                <a:spcPts val="600"/>
-              </a:spcAft>
-              <a:buClr>
-                <a:schemeClr val="accent2"/>
-              </a:buClr>
-              <a:buSzPct val="92000"/>
-              <a:buFont typeface="Wingdings 2" panose="05020102010507070707" pitchFamily="18" charset="2"/>
-              <a:buNone/>
-              <a:defRPr sz="1600" b="1" kern="1200">
-                <a:solidFill>
-                  <a:schemeClr val="tx2"/>
-                </a:solidFill>
-                <a:latin typeface="+mn-lt"/>
-                <a:ea typeface="+mn-ea"/>
-                <a:cs typeface="+mn-cs"/>
-              </a:defRPr>
-            </a:lvl9pPr>
-          </a:lstStyle>
-          <a:p>
-            <a:r>
-              <a:rPr lang="it-IT" sz="2000" b="0" dirty="0">
-                <a:solidFill>
-                  <a:schemeClr val="tx1"/>
-                </a:solidFill>
-                <a:effectLst/>
-              </a:rPr>
-              <a:t>Un </a:t>
-            </a:r>
-            <a:r>
-              <a:rPr lang="it-IT" sz="2000" dirty="0">
-                <a:solidFill>
-                  <a:schemeClr val="tx1"/>
-                </a:solidFill>
-                <a:effectLst/>
-              </a:rPr>
-              <a:t>lock</a:t>
-            </a:r>
-            <a:r>
-              <a:rPr lang="it-IT" sz="2000" b="0" dirty="0">
-                <a:solidFill>
-                  <a:schemeClr val="tx1"/>
-                </a:solidFill>
-                <a:effectLst/>
-              </a:rPr>
-              <a:t> è analogo a un semaforo con un valore iniziale di 1, equivalente al verde di un semaforo. L'azione "up" di un lock è chiamata "rilascio", mentre l'azione "down" è detta "acquisizione".</a:t>
-            </a:r>
-          </a:p>
-        </p:txBody>
-      </p:sp>
-    </p:spTree>
-    <p:extLst>
-      <p:ext uri="{BB962C8B-B14F-4D97-AF65-F5344CB8AC3E}">
-        <p14:creationId xmlns:p14="http://schemas.microsoft.com/office/powerpoint/2010/main" val="1952330264"/>
-      </p:ext>
-    </p:extLst>
-  </p:cSld>
-  <p:clrMapOvr>
-    <a:masterClrMapping/>
-  </p:clrMapOvr>
-</p:sld>
-</file>
-
-<file path=ppt/slides/slide14.xml><?xml version="1.0" encoding="utf-8"?>
-<p:sld xmlns:a="http://schemas.openxmlformats.org/drawingml/2006/main" xmlns:r="http://schemas.openxmlformats.org/officeDocument/2006/relationships" xmlns:p="http://schemas.openxmlformats.org/presentationml/2006/main">
-  <p:cSld>
-    <p:spTree>
-      <p:nvGrpSpPr>
-        <p:cNvPr id="1" name=""/>
-        <p:cNvGrpSpPr/>
-        <p:nvPr/>
-      </p:nvGrpSpPr>
-      <p:grpSpPr>
-        <a:xfrm>
-          <a:off x="0" y="0"/>
-          <a:ext cx="0" cy="0"/>
-          <a:chOff x="0" y="0"/>
-          <a:chExt cx="0" cy="0"/>
-        </a:xfrm>
-      </p:grpSpPr>
-      <p:sp>
-        <p:nvSpPr>
-          <p:cNvPr id="2" name="Titolo 1">
-            <a:extLst>
-              <a:ext uri="{FF2B5EF4-FFF2-40B4-BE49-F238E27FC236}">
-                <a16:creationId xmlns:a16="http://schemas.microsoft.com/office/drawing/2014/main" id="{69441F67-1949-8EC8-EB98-85670AC3670C}"/>
-              </a:ext>
-            </a:extLst>
-          </p:cNvPr>
-          <p:cNvSpPr>
-            <a:spLocks noGrp="1"/>
-          </p:cNvSpPr>
-          <p:nvPr>
-            <p:ph type="title"/>
-          </p:nvPr>
-        </p:nvSpPr>
-        <p:spPr/>
-        <p:txBody>
-          <a:bodyPr>
-            <a:normAutofit/>
-          </a:bodyPr>
-          <a:lstStyle/>
-          <a:p>
-            <a:r>
-              <a:rPr lang="it-IT" dirty="0"/>
-              <a:t>Meccanismi di sincronizzazione </a:t>
-            </a:r>
-            <a:r>
-              <a:rPr lang="it-IT" sz="1600" dirty="0"/>
               <a:t>– SPINLOCK</a:t>
             </a:r>
             <a:endParaRPr lang="it-IT" dirty="0"/>
@@ -14048,6 +13263,393 @@
     <p:extLst>
       <p:ext uri="{BB962C8B-B14F-4D97-AF65-F5344CB8AC3E}">
         <p14:creationId xmlns:p14="http://schemas.microsoft.com/office/powerpoint/2010/main" val="3698987389"/>
+      </p:ext>
+    </p:extLst>
+  </p:cSld>
+  <p:clrMapOvr>
+    <a:masterClrMapping/>
+  </p:clrMapOvr>
+</p:sld>
+</file>
+
+<file path=ppt/slides/slide13.xml><?xml version="1.0" encoding="utf-8"?>
+<p:sld xmlns:a="http://schemas.openxmlformats.org/drawingml/2006/main" xmlns:r="http://schemas.openxmlformats.org/officeDocument/2006/relationships" xmlns:p="http://schemas.openxmlformats.org/presentationml/2006/main">
+  <p:cSld>
+    <p:spTree>
+      <p:nvGrpSpPr>
+        <p:cNvPr id="1" name=""/>
+        <p:cNvGrpSpPr/>
+        <p:nvPr/>
+      </p:nvGrpSpPr>
+      <p:grpSpPr>
+        <a:xfrm>
+          <a:off x="0" y="0"/>
+          <a:ext cx="0" cy="0"/>
+          <a:chOff x="0" y="0"/>
+          <a:chExt cx="0" cy="0"/>
+        </a:xfrm>
+      </p:grpSpPr>
+      <p:sp>
+        <p:nvSpPr>
+          <p:cNvPr id="2" name="Titolo 1">
+            <a:extLst>
+              <a:ext uri="{FF2B5EF4-FFF2-40B4-BE49-F238E27FC236}">
+                <a16:creationId xmlns:a16="http://schemas.microsoft.com/office/drawing/2014/main" id="{1A511C35-E257-03AB-D204-0A956C12D05C}"/>
+              </a:ext>
+            </a:extLst>
+          </p:cNvPr>
+          <p:cNvSpPr>
+            <a:spLocks noGrp="1"/>
+          </p:cNvSpPr>
+          <p:nvPr>
+            <p:ph type="title"/>
+          </p:nvPr>
+        </p:nvSpPr>
+        <p:spPr>
+          <a:xfrm>
+            <a:off x="581192" y="702156"/>
+            <a:ext cx="11029616" cy="1013800"/>
+          </a:xfrm>
+        </p:spPr>
+        <p:txBody>
+          <a:bodyPr>
+            <a:normAutofit/>
+          </a:bodyPr>
+          <a:lstStyle/>
+          <a:p>
+            <a:r>
+              <a:rPr lang="it-IT">
+                <a:solidFill>
+                  <a:srgbClr val="FFFEFF"/>
+                </a:solidFill>
+              </a:rPr>
+              <a:t>System calls</a:t>
+            </a:r>
+          </a:p>
+        </p:txBody>
+      </p:sp>
+      <p:graphicFrame>
+        <p:nvGraphicFramePr>
+          <p:cNvPr id="5" name="Segnaposto contenuto 2">
+            <a:extLst>
+              <a:ext uri="{FF2B5EF4-FFF2-40B4-BE49-F238E27FC236}">
+                <a16:creationId xmlns:a16="http://schemas.microsoft.com/office/drawing/2014/main" id="{70BCEF6C-68E2-651D-606F-250E5D2ABFA7}"/>
+              </a:ext>
+            </a:extLst>
+          </p:cNvPr>
+          <p:cNvGraphicFramePr>
+            <a:graphicFrameLocks noGrp="1"/>
+          </p:cNvGraphicFramePr>
+          <p:nvPr>
+            <p:ph idx="1"/>
+          </p:nvPr>
+        </p:nvGraphicFramePr>
+        <p:xfrm>
+          <a:off x="581025" y="2181225"/>
+          <a:ext cx="11029950" cy="3678238"/>
+        </p:xfrm>
+        <a:graphic>
+          <a:graphicData uri="http://schemas.openxmlformats.org/drawingml/2006/diagram">
+            <dgm:relIds xmlns:dgm="http://schemas.openxmlformats.org/drawingml/2006/diagram" xmlns:r="http://schemas.openxmlformats.org/officeDocument/2006/relationships" r:dm="rId2" r:lo="rId3" r:qs="rId4" r:cs="rId5"/>
+          </a:graphicData>
+        </a:graphic>
+      </p:graphicFrame>
+    </p:spTree>
+    <p:extLst>
+      <p:ext uri="{BB962C8B-B14F-4D97-AF65-F5344CB8AC3E}">
+        <p14:creationId xmlns:p14="http://schemas.microsoft.com/office/powerpoint/2010/main" val="488791685"/>
+      </p:ext>
+    </p:extLst>
+  </p:cSld>
+  <p:clrMapOvr>
+    <a:masterClrMapping/>
+  </p:clrMapOvr>
+</p:sld>
+</file>
+
+<file path=ppt/slides/slide14.xml><?xml version="1.0" encoding="utf-8"?>
+<p:sld xmlns:a="http://schemas.openxmlformats.org/drawingml/2006/main" xmlns:r="http://schemas.openxmlformats.org/officeDocument/2006/relationships" xmlns:p="http://schemas.openxmlformats.org/presentationml/2006/main">
+  <p:cSld>
+    <p:spTree>
+      <p:nvGrpSpPr>
+        <p:cNvPr id="1" name="">
+          <a:extLst>
+            <a:ext uri="{FF2B5EF4-FFF2-40B4-BE49-F238E27FC236}">
+              <a16:creationId xmlns:a16="http://schemas.microsoft.com/office/drawing/2014/main" id="{4DB107C6-3187-F9C2-B29A-716D02AB9FAF}"/>
+            </a:ext>
+          </a:extLst>
+        </p:cNvPr>
+        <p:cNvGrpSpPr/>
+        <p:nvPr/>
+      </p:nvGrpSpPr>
+      <p:grpSpPr>
+        <a:xfrm>
+          <a:off x="0" y="0"/>
+          <a:ext cx="0" cy="0"/>
+          <a:chOff x="0" y="0"/>
+          <a:chExt cx="0" cy="0"/>
+        </a:xfrm>
+      </p:grpSpPr>
+      <p:sp>
+        <p:nvSpPr>
+          <p:cNvPr id="2" name="Titolo 1">
+            <a:extLst>
+              <a:ext uri="{FF2B5EF4-FFF2-40B4-BE49-F238E27FC236}">
+                <a16:creationId xmlns:a16="http://schemas.microsoft.com/office/drawing/2014/main" id="{4A7BA406-5059-EED5-0C32-07A17E669B05}"/>
+              </a:ext>
+            </a:extLst>
+          </p:cNvPr>
+          <p:cNvSpPr>
+            <a:spLocks noGrp="1"/>
+          </p:cNvSpPr>
+          <p:nvPr>
+            <p:ph type="title"/>
+          </p:nvPr>
+        </p:nvSpPr>
+        <p:spPr/>
+        <p:txBody>
+          <a:bodyPr/>
+          <a:lstStyle/>
+          <a:p>
+            <a:r>
+              <a:rPr lang="it-IT" dirty="0"/>
+              <a:t>System calls</a:t>
+            </a:r>
+          </a:p>
+        </p:txBody>
+      </p:sp>
+      <p:sp>
+        <p:nvSpPr>
+          <p:cNvPr id="5" name="Segnaposto testo 4">
+            <a:extLst>
+              <a:ext uri="{FF2B5EF4-FFF2-40B4-BE49-F238E27FC236}">
+                <a16:creationId xmlns:a16="http://schemas.microsoft.com/office/drawing/2014/main" id="{C6A595F7-B24E-14B1-A2DE-F977BEC69C75}"/>
+              </a:ext>
+            </a:extLst>
+          </p:cNvPr>
+          <p:cNvSpPr>
+            <a:spLocks noGrp="1"/>
+          </p:cNvSpPr>
+          <p:nvPr>
+            <p:ph type="body" idx="1"/>
+          </p:nvPr>
+        </p:nvSpPr>
+        <p:spPr>
+          <a:xfrm>
+            <a:off x="673386" y="2051770"/>
+            <a:ext cx="5087075" cy="873994"/>
+          </a:xfrm>
+        </p:spPr>
+        <p:txBody>
+          <a:bodyPr/>
+          <a:lstStyle/>
+          <a:p>
+            <a:r>
+              <a:rPr lang="en-US" dirty="0"/>
+              <a:t>OS161</a:t>
+            </a:r>
+          </a:p>
+          <a:p>
+            <a:r>
+              <a:rPr lang="en-US" sz="1800" dirty="0">
+                <a:solidFill>
+                  <a:schemeClr val="tx2"/>
+                </a:solidFill>
+              </a:rPr>
+              <a:t>kern/arch/</a:t>
+            </a:r>
+            <a:r>
+              <a:rPr lang="en-US" sz="1800" dirty="0" err="1">
+                <a:solidFill>
+                  <a:schemeClr val="tx2"/>
+                </a:solidFill>
+              </a:rPr>
+              <a:t>mips</a:t>
+            </a:r>
+            <a:r>
+              <a:rPr lang="en-US" sz="1800" dirty="0">
+                <a:solidFill>
+                  <a:schemeClr val="tx2"/>
+                </a:solidFill>
+              </a:rPr>
+              <a:t>/</a:t>
+            </a:r>
+            <a:r>
+              <a:rPr lang="en-US" sz="1800" dirty="0" err="1">
+                <a:solidFill>
+                  <a:schemeClr val="tx2"/>
+                </a:solidFill>
+              </a:rPr>
+              <a:t>syscall</a:t>
+            </a:r>
+            <a:r>
+              <a:rPr lang="en-US" sz="1800" dirty="0">
+                <a:solidFill>
+                  <a:schemeClr val="tx2"/>
+                </a:solidFill>
+              </a:rPr>
+              <a:t>/</a:t>
+            </a:r>
+            <a:r>
+              <a:rPr lang="en-US" sz="1800" dirty="0" err="1">
+                <a:solidFill>
+                  <a:schemeClr val="tx2"/>
+                </a:solidFill>
+              </a:rPr>
+              <a:t>syscall.c</a:t>
+            </a:r>
+            <a:endParaRPr lang="it-IT" sz="1800" dirty="0">
+              <a:solidFill>
+                <a:schemeClr val="tx2"/>
+              </a:solidFill>
+            </a:endParaRPr>
+          </a:p>
+        </p:txBody>
+      </p:sp>
+      <p:sp>
+        <p:nvSpPr>
+          <p:cNvPr id="6" name="Segnaposto testo 5">
+            <a:extLst>
+              <a:ext uri="{FF2B5EF4-FFF2-40B4-BE49-F238E27FC236}">
+                <a16:creationId xmlns:a16="http://schemas.microsoft.com/office/drawing/2014/main" id="{62659CF6-E7AE-5C22-7B34-F5CD584206EF}"/>
+              </a:ext>
+            </a:extLst>
+          </p:cNvPr>
+          <p:cNvSpPr>
+            <a:spLocks noGrp="1"/>
+          </p:cNvSpPr>
+          <p:nvPr>
+            <p:ph type="body" sz="quarter" idx="3"/>
+          </p:nvPr>
+        </p:nvSpPr>
+        <p:spPr>
+          <a:xfrm>
+            <a:off x="6096000" y="2016123"/>
+            <a:ext cx="5087073" cy="910937"/>
+          </a:xfrm>
+        </p:spPr>
+        <p:txBody>
+          <a:bodyPr/>
+          <a:lstStyle/>
+          <a:p>
+            <a:r>
+              <a:rPr lang="it-IT" dirty="0"/>
+              <a:t>PINTOS</a:t>
+            </a:r>
+          </a:p>
+          <a:p>
+            <a:r>
+              <a:rPr lang="it-IT" sz="1800" dirty="0" err="1">
+                <a:solidFill>
+                  <a:schemeClr val="tx2"/>
+                </a:solidFill>
+              </a:rPr>
+              <a:t>src</a:t>
+            </a:r>
+            <a:r>
+              <a:rPr lang="it-IT" sz="1800" dirty="0">
+                <a:solidFill>
+                  <a:schemeClr val="tx2"/>
+                </a:solidFill>
+              </a:rPr>
+              <a:t>/</a:t>
+            </a:r>
+            <a:r>
+              <a:rPr lang="it-IT" sz="1800" dirty="0" err="1">
+                <a:solidFill>
+                  <a:schemeClr val="tx2"/>
+                </a:solidFill>
+              </a:rPr>
+              <a:t>userprog</a:t>
+            </a:r>
+            <a:r>
+              <a:rPr lang="it-IT" sz="1800" dirty="0">
+                <a:solidFill>
+                  <a:schemeClr val="tx2"/>
+                </a:solidFill>
+              </a:rPr>
+              <a:t>/</a:t>
+            </a:r>
+            <a:r>
+              <a:rPr lang="it-IT" sz="1800" dirty="0" err="1">
+                <a:solidFill>
+                  <a:schemeClr val="tx2"/>
+                </a:solidFill>
+              </a:rPr>
+              <a:t>syscall.c</a:t>
+            </a:r>
+            <a:endParaRPr lang="it-IT" b="0" dirty="0">
+              <a:solidFill>
+                <a:srgbClr val="CE9178"/>
+              </a:solidFill>
+              <a:effectLst/>
+              <a:latin typeface="Consolas" panose="020B0609020204030204" pitchFamily="49" charset="0"/>
+            </a:endParaRPr>
+          </a:p>
+        </p:txBody>
+      </p:sp>
+      <p:pic>
+        <p:nvPicPr>
+          <p:cNvPr id="15" name="Segnaposto contenuto 14">
+            <a:extLst>
+              <a:ext uri="{FF2B5EF4-FFF2-40B4-BE49-F238E27FC236}">
+                <a16:creationId xmlns:a16="http://schemas.microsoft.com/office/drawing/2014/main" id="{8EC9F7AA-4ADD-C9BD-8077-39712864C536}"/>
+              </a:ext>
+            </a:extLst>
+          </p:cNvPr>
+          <p:cNvPicPr>
+            <a:picLocks noGrp="1" noChangeAspect="1"/>
+          </p:cNvPicPr>
+          <p:nvPr>
+            <p:ph sz="quarter" idx="4"/>
+          </p:nvPr>
+        </p:nvPicPr>
+        <p:blipFill>
+          <a:blip r:embed="rId2"/>
+          <a:stretch>
+            <a:fillRect/>
+          </a:stretch>
+        </p:blipFill>
+        <p:spPr>
+          <a:xfrm>
+            <a:off x="6096000" y="3566938"/>
+            <a:ext cx="5710920" cy="1741134"/>
+          </a:xfrm>
+        </p:spPr>
+      </p:pic>
+      <p:pic>
+        <p:nvPicPr>
+          <p:cNvPr id="24" name="Segnaposto contenuto 23">
+            <a:extLst>
+              <a:ext uri="{FF2B5EF4-FFF2-40B4-BE49-F238E27FC236}">
+                <a16:creationId xmlns:a16="http://schemas.microsoft.com/office/drawing/2014/main" id="{9A8F9342-8DAE-F88D-3CEF-5B42B1CBAB41}"/>
+              </a:ext>
+            </a:extLst>
+          </p:cNvPr>
+          <p:cNvPicPr>
+            <a:picLocks noGrp="1" noChangeAspect="1"/>
+          </p:cNvPicPr>
+          <p:nvPr>
+            <p:ph sz="half" idx="2"/>
+          </p:nvPr>
+        </p:nvPicPr>
+        <p:blipFill>
+          <a:blip r:embed="rId3"/>
+          <a:stretch>
+            <a:fillRect/>
+          </a:stretch>
+        </p:blipFill>
+        <p:spPr>
+          <a:xfrm>
+            <a:off x="756514" y="3032886"/>
+            <a:ext cx="4464981" cy="3621547"/>
+          </a:xfrm>
+        </p:spPr>
+      </p:pic>
+    </p:spTree>
+    <p:extLst>
+      <p:ext uri="{BB962C8B-B14F-4D97-AF65-F5344CB8AC3E}">
+        <p14:creationId xmlns:p14="http://schemas.microsoft.com/office/powerpoint/2010/main" val="4059111834"/>
       </p:ext>
     </p:extLst>
   </p:cSld>
@@ -14617,406 +14219,6 @@
 <file path=ppt/slides/slide4.xml><?xml version="1.0" encoding="utf-8"?>
 <p:sld xmlns:a="http://schemas.openxmlformats.org/drawingml/2006/main" xmlns:r="http://schemas.openxmlformats.org/officeDocument/2006/relationships" xmlns:p="http://schemas.openxmlformats.org/presentationml/2006/main">
   <p:cSld>
-    <p:bg>
-      <p:bgPr>
-        <a:solidFill>
-          <a:schemeClr val="bg1"/>
-        </a:solidFill>
-        <a:effectLst/>
-      </p:bgPr>
-    </p:bg>
-    <p:spTree>
-      <p:nvGrpSpPr>
-        <p:cNvPr id="1" name=""/>
-        <p:cNvGrpSpPr/>
-        <p:nvPr/>
-      </p:nvGrpSpPr>
-      <p:grpSpPr>
-        <a:xfrm>
-          <a:off x="0" y="0"/>
-          <a:ext cx="0" cy="0"/>
-          <a:chOff x="0" y="0"/>
-          <a:chExt cx="0" cy="0"/>
-        </a:xfrm>
-      </p:grpSpPr>
-      <p:sp>
-        <p:nvSpPr>
-          <p:cNvPr id="2" name="Titolo 1">
-            <a:extLst>
-              <a:ext uri="{FF2B5EF4-FFF2-40B4-BE49-F238E27FC236}">
-                <a16:creationId xmlns:a16="http://schemas.microsoft.com/office/drawing/2014/main" id="{1A511C35-E257-03AB-D204-0A956C12D05C}"/>
-              </a:ext>
-            </a:extLst>
-          </p:cNvPr>
-          <p:cNvSpPr>
-            <a:spLocks noGrp="1"/>
-          </p:cNvSpPr>
-          <p:nvPr>
-            <p:ph type="title"/>
-          </p:nvPr>
-        </p:nvSpPr>
-        <p:spPr>
-          <a:xfrm>
-            <a:off x="581192" y="702156"/>
-            <a:ext cx="11029616" cy="1013800"/>
-          </a:xfrm>
-        </p:spPr>
-        <p:txBody>
-          <a:bodyPr>
-            <a:normAutofit/>
-          </a:bodyPr>
-          <a:lstStyle/>
-          <a:p>
-            <a:r>
-              <a:rPr lang="it-IT">
-                <a:solidFill>
-                  <a:srgbClr val="FFFEFF"/>
-                </a:solidFill>
-              </a:rPr>
-              <a:t>System calls</a:t>
-            </a:r>
-          </a:p>
-        </p:txBody>
-      </p:sp>
-      <p:graphicFrame>
-        <p:nvGraphicFramePr>
-          <p:cNvPr id="5" name="Segnaposto contenuto 2">
-            <a:extLst>
-              <a:ext uri="{FF2B5EF4-FFF2-40B4-BE49-F238E27FC236}">
-                <a16:creationId xmlns:a16="http://schemas.microsoft.com/office/drawing/2014/main" id="{70BCEF6C-68E2-651D-606F-250E5D2ABFA7}"/>
-              </a:ext>
-            </a:extLst>
-          </p:cNvPr>
-          <p:cNvGraphicFramePr>
-            <a:graphicFrameLocks noGrp="1"/>
-          </p:cNvGraphicFramePr>
-          <p:nvPr>
-            <p:ph idx="1"/>
-            <p:extLst>
-              <p:ext uri="{D42A27DB-BD31-4B8C-83A1-F6EECF244321}">
-                <p14:modId xmlns:p14="http://schemas.microsoft.com/office/powerpoint/2010/main" val="1942437161"/>
-              </p:ext>
-            </p:extLst>
-          </p:nvPr>
-        </p:nvGraphicFramePr>
-        <p:xfrm>
-          <a:off x="581025" y="2181225"/>
-          <a:ext cx="11029950" cy="3678238"/>
-        </p:xfrm>
-        <a:graphic>
-          <a:graphicData uri="http://schemas.openxmlformats.org/drawingml/2006/diagram">
-            <dgm:relIds xmlns:dgm="http://schemas.openxmlformats.org/drawingml/2006/diagram" xmlns:r="http://schemas.openxmlformats.org/officeDocument/2006/relationships" r:dm="rId2" r:lo="rId3" r:qs="rId4" r:cs="rId5"/>
-          </a:graphicData>
-        </a:graphic>
-      </p:graphicFrame>
-    </p:spTree>
-    <p:extLst>
-      <p:ext uri="{BB962C8B-B14F-4D97-AF65-F5344CB8AC3E}">
-        <p14:creationId xmlns:p14="http://schemas.microsoft.com/office/powerpoint/2010/main" val="4006432628"/>
-      </p:ext>
-    </p:extLst>
-  </p:cSld>
-  <p:clrMapOvr>
-    <a:masterClrMapping/>
-  </p:clrMapOvr>
-</p:sld>
-</file>
-
-<file path=ppt/slides/slide5.xml><?xml version="1.0" encoding="utf-8"?>
-<p:sld xmlns:a="http://schemas.openxmlformats.org/drawingml/2006/main" xmlns:r="http://schemas.openxmlformats.org/officeDocument/2006/relationships" xmlns:p="http://schemas.openxmlformats.org/presentationml/2006/main">
-  <p:cSld>
-    <p:spTree>
-      <p:nvGrpSpPr>
-        <p:cNvPr id="1" name="">
-          <a:extLst>
-            <a:ext uri="{FF2B5EF4-FFF2-40B4-BE49-F238E27FC236}">
-              <a16:creationId xmlns:a16="http://schemas.microsoft.com/office/drawing/2014/main" id="{4DB107C6-3187-F9C2-B29A-716D02AB9FAF}"/>
-            </a:ext>
-          </a:extLst>
-        </p:cNvPr>
-        <p:cNvGrpSpPr/>
-        <p:nvPr/>
-      </p:nvGrpSpPr>
-      <p:grpSpPr>
-        <a:xfrm>
-          <a:off x="0" y="0"/>
-          <a:ext cx="0" cy="0"/>
-          <a:chOff x="0" y="0"/>
-          <a:chExt cx="0" cy="0"/>
-        </a:xfrm>
-      </p:grpSpPr>
-      <p:sp>
-        <p:nvSpPr>
-          <p:cNvPr id="2" name="Titolo 1">
-            <a:extLst>
-              <a:ext uri="{FF2B5EF4-FFF2-40B4-BE49-F238E27FC236}">
-                <a16:creationId xmlns:a16="http://schemas.microsoft.com/office/drawing/2014/main" id="{4A7BA406-5059-EED5-0C32-07A17E669B05}"/>
-              </a:ext>
-            </a:extLst>
-          </p:cNvPr>
-          <p:cNvSpPr>
-            <a:spLocks noGrp="1"/>
-          </p:cNvSpPr>
-          <p:nvPr>
-            <p:ph type="title"/>
-          </p:nvPr>
-        </p:nvSpPr>
-        <p:spPr/>
-        <p:txBody>
-          <a:bodyPr/>
-          <a:lstStyle/>
-          <a:p>
-            <a:r>
-              <a:rPr lang="it-IT" dirty="0"/>
-              <a:t>System calls</a:t>
-            </a:r>
-          </a:p>
-        </p:txBody>
-      </p:sp>
-      <p:sp>
-        <p:nvSpPr>
-          <p:cNvPr id="5" name="Segnaposto testo 4">
-            <a:extLst>
-              <a:ext uri="{FF2B5EF4-FFF2-40B4-BE49-F238E27FC236}">
-                <a16:creationId xmlns:a16="http://schemas.microsoft.com/office/drawing/2014/main" id="{C6A595F7-B24E-14B1-A2DE-F977BEC69C75}"/>
-              </a:ext>
-            </a:extLst>
-          </p:cNvPr>
-          <p:cNvSpPr>
-            <a:spLocks noGrp="1"/>
-          </p:cNvSpPr>
-          <p:nvPr>
-            <p:ph type="body" idx="1"/>
-          </p:nvPr>
-        </p:nvSpPr>
-        <p:spPr>
-          <a:xfrm>
-            <a:off x="673386" y="2051770"/>
-            <a:ext cx="5087075" cy="873994"/>
-          </a:xfrm>
-        </p:spPr>
-        <p:txBody>
-          <a:bodyPr/>
-          <a:lstStyle/>
-          <a:p>
-            <a:r>
-              <a:rPr lang="en-US" dirty="0"/>
-              <a:t>OS161</a:t>
-            </a:r>
-          </a:p>
-          <a:p>
-            <a:r>
-              <a:rPr lang="en-US" sz="1800" dirty="0">
-                <a:solidFill>
-                  <a:schemeClr val="tx2"/>
-                </a:solidFill>
-              </a:rPr>
-              <a:t>kern/arch/</a:t>
-            </a:r>
-            <a:r>
-              <a:rPr lang="en-US" sz="1800" dirty="0" err="1">
-                <a:solidFill>
-                  <a:schemeClr val="tx2"/>
-                </a:solidFill>
-              </a:rPr>
-              <a:t>mips</a:t>
-            </a:r>
-            <a:r>
-              <a:rPr lang="en-US" sz="1800" dirty="0">
-                <a:solidFill>
-                  <a:schemeClr val="tx2"/>
-                </a:solidFill>
-              </a:rPr>
-              <a:t>/</a:t>
-            </a:r>
-            <a:r>
-              <a:rPr lang="en-US" sz="1800" dirty="0" err="1">
-                <a:solidFill>
-                  <a:schemeClr val="tx2"/>
-                </a:solidFill>
-              </a:rPr>
-              <a:t>syscall</a:t>
-            </a:r>
-            <a:r>
-              <a:rPr lang="en-US" sz="1800" dirty="0">
-                <a:solidFill>
-                  <a:schemeClr val="tx2"/>
-                </a:solidFill>
-              </a:rPr>
-              <a:t>/</a:t>
-            </a:r>
-            <a:r>
-              <a:rPr lang="en-US" sz="1800" dirty="0" err="1">
-                <a:solidFill>
-                  <a:schemeClr val="tx2"/>
-                </a:solidFill>
-              </a:rPr>
-              <a:t>syscall.c</a:t>
-            </a:r>
-            <a:endParaRPr lang="it-IT" sz="1800" dirty="0">
-              <a:solidFill>
-                <a:schemeClr val="tx2"/>
-              </a:solidFill>
-            </a:endParaRPr>
-          </a:p>
-        </p:txBody>
-      </p:sp>
-      <p:sp>
-        <p:nvSpPr>
-          <p:cNvPr id="6" name="Segnaposto testo 5">
-            <a:extLst>
-              <a:ext uri="{FF2B5EF4-FFF2-40B4-BE49-F238E27FC236}">
-                <a16:creationId xmlns:a16="http://schemas.microsoft.com/office/drawing/2014/main" id="{62659CF6-E7AE-5C22-7B34-F5CD584206EF}"/>
-              </a:ext>
-            </a:extLst>
-          </p:cNvPr>
-          <p:cNvSpPr>
-            <a:spLocks noGrp="1"/>
-          </p:cNvSpPr>
-          <p:nvPr>
-            <p:ph type="body" sz="quarter" idx="3"/>
-          </p:nvPr>
-        </p:nvSpPr>
-        <p:spPr>
-          <a:xfrm>
-            <a:off x="6096000" y="2016123"/>
-            <a:ext cx="5087073" cy="910937"/>
-          </a:xfrm>
-        </p:spPr>
-        <p:txBody>
-          <a:bodyPr/>
-          <a:lstStyle/>
-          <a:p>
-            <a:r>
-              <a:rPr lang="it-IT" dirty="0"/>
-              <a:t>PINTOS</a:t>
-            </a:r>
-          </a:p>
-          <a:p>
-            <a:r>
-              <a:rPr lang="it-IT" sz="1800" dirty="0" err="1">
-                <a:solidFill>
-                  <a:schemeClr val="tx2"/>
-                </a:solidFill>
-              </a:rPr>
-              <a:t>src</a:t>
-            </a:r>
-            <a:r>
-              <a:rPr lang="it-IT" sz="1800" dirty="0">
-                <a:solidFill>
-                  <a:schemeClr val="tx2"/>
-                </a:solidFill>
-              </a:rPr>
-              <a:t>/</a:t>
-            </a:r>
-            <a:r>
-              <a:rPr lang="it-IT" sz="1800" dirty="0" err="1">
-                <a:solidFill>
-                  <a:schemeClr val="tx2"/>
-                </a:solidFill>
-              </a:rPr>
-              <a:t>userprog</a:t>
-            </a:r>
-            <a:r>
-              <a:rPr lang="it-IT" sz="1800" dirty="0">
-                <a:solidFill>
-                  <a:schemeClr val="tx2"/>
-                </a:solidFill>
-              </a:rPr>
-              <a:t>/</a:t>
-            </a:r>
-            <a:r>
-              <a:rPr lang="it-IT" sz="1800" dirty="0" err="1">
-                <a:solidFill>
-                  <a:schemeClr val="tx2"/>
-                </a:solidFill>
-              </a:rPr>
-              <a:t>syscall.c</a:t>
-            </a:r>
-            <a:endParaRPr lang="it-IT" b="0" dirty="0">
-              <a:solidFill>
-                <a:srgbClr val="CE9178"/>
-              </a:solidFill>
-              <a:effectLst/>
-              <a:latin typeface="Consolas" panose="020B0609020204030204" pitchFamily="49" charset="0"/>
-            </a:endParaRPr>
-          </a:p>
-        </p:txBody>
-      </p:sp>
-      <p:pic>
-        <p:nvPicPr>
-          <p:cNvPr id="15" name="Segnaposto contenuto 14">
-            <a:extLst>
-              <a:ext uri="{FF2B5EF4-FFF2-40B4-BE49-F238E27FC236}">
-                <a16:creationId xmlns:a16="http://schemas.microsoft.com/office/drawing/2014/main" id="{8EC9F7AA-4ADD-C9BD-8077-39712864C536}"/>
-              </a:ext>
-            </a:extLst>
-          </p:cNvPr>
-          <p:cNvPicPr>
-            <a:picLocks noGrp="1" noChangeAspect="1"/>
-          </p:cNvPicPr>
-          <p:nvPr>
-            <p:ph sz="quarter" idx="4"/>
-          </p:nvPr>
-        </p:nvPicPr>
-        <p:blipFill>
-          <a:blip r:embed="rId2"/>
-          <a:stretch>
-            <a:fillRect/>
-          </a:stretch>
-        </p:blipFill>
-        <p:spPr>
-          <a:xfrm>
-            <a:off x="6096000" y="3566938"/>
-            <a:ext cx="5710920" cy="1741134"/>
-          </a:xfrm>
-        </p:spPr>
-      </p:pic>
-      <p:pic>
-        <p:nvPicPr>
-          <p:cNvPr id="24" name="Segnaposto contenuto 23">
-            <a:extLst>
-              <a:ext uri="{FF2B5EF4-FFF2-40B4-BE49-F238E27FC236}">
-                <a16:creationId xmlns:a16="http://schemas.microsoft.com/office/drawing/2014/main" id="{9A8F9342-8DAE-F88D-3CEF-5B42B1CBAB41}"/>
-              </a:ext>
-            </a:extLst>
-          </p:cNvPr>
-          <p:cNvPicPr>
-            <a:picLocks noGrp="1" noChangeAspect="1"/>
-          </p:cNvPicPr>
-          <p:nvPr>
-            <p:ph sz="half" idx="2"/>
-          </p:nvPr>
-        </p:nvPicPr>
-        <p:blipFill>
-          <a:blip r:embed="rId3"/>
-          <a:stretch>
-            <a:fillRect/>
-          </a:stretch>
-        </p:blipFill>
-        <p:spPr>
-          <a:xfrm>
-            <a:off x="756514" y="3032886"/>
-            <a:ext cx="4464981" cy="3621547"/>
-          </a:xfrm>
-        </p:spPr>
-      </p:pic>
-    </p:spTree>
-    <p:extLst>
-      <p:ext uri="{BB962C8B-B14F-4D97-AF65-F5344CB8AC3E}">
-        <p14:creationId xmlns:p14="http://schemas.microsoft.com/office/powerpoint/2010/main" val="4174609051"/>
-      </p:ext>
-    </p:extLst>
-  </p:cSld>
-  <p:clrMapOvr>
-    <a:masterClrMapping/>
-  </p:clrMapOvr>
-</p:sld>
-</file>
-
-<file path=ppt/slides/slide6.xml><?xml version="1.0" encoding="utf-8"?>
-<p:sld xmlns:a="http://schemas.openxmlformats.org/drawingml/2006/main" xmlns:r="http://schemas.openxmlformats.org/officeDocument/2006/relationships" xmlns:p="http://schemas.openxmlformats.org/presentationml/2006/main">
-  <p:cSld>
     <p:spTree>
       <p:nvGrpSpPr>
         <p:cNvPr id="1" name="">
@@ -15180,7 +14382,7 @@
 </p:sld>
 </file>
 
-<file path=ppt/slides/slide7.xml><?xml version="1.0" encoding="utf-8"?>
+<file path=ppt/slides/slide5.xml><?xml version="1.0" encoding="utf-8"?>
 <p:sld xmlns:a="http://schemas.openxmlformats.org/drawingml/2006/main" xmlns:r="http://schemas.openxmlformats.org/officeDocument/2006/relationships" xmlns:p="http://schemas.openxmlformats.org/presentationml/2006/main">
   <p:cSld>
     <p:spTree>
@@ -15735,7 +14937,7 @@
 </p:sld>
 </file>
 
-<file path=ppt/slides/slide8.xml><?xml version="1.0" encoding="utf-8"?>
+<file path=ppt/slides/slide6.xml><?xml version="1.0" encoding="utf-8"?>
 <p:sld xmlns:a="http://schemas.openxmlformats.org/drawingml/2006/main" xmlns:r="http://schemas.openxmlformats.org/officeDocument/2006/relationships" xmlns:p="http://schemas.openxmlformats.org/presentationml/2006/main">
   <p:cSld>
     <p:spTree>
@@ -16453,7 +15655,7 @@
 </p:sld>
 </file>
 
-<file path=ppt/slides/slide9.xml><?xml version="1.0" encoding="utf-8"?>
+<file path=ppt/slides/slide7.xml><?xml version="1.0" encoding="utf-8"?>
 <p:sld xmlns:a="http://schemas.openxmlformats.org/drawingml/2006/main" xmlns:r="http://schemas.openxmlformats.org/officeDocument/2006/relationships" xmlns:p="http://schemas.openxmlformats.org/presentationml/2006/main">
   <p:cSld>
     <p:spTree>
@@ -17096,6 +16298,791 @@
     <p:extLst>
       <p:ext uri="{BB962C8B-B14F-4D97-AF65-F5344CB8AC3E}">
         <p14:creationId xmlns:p14="http://schemas.microsoft.com/office/powerpoint/2010/main" val="3203019218"/>
+      </p:ext>
+    </p:extLst>
+  </p:cSld>
+  <p:clrMapOvr>
+    <a:masterClrMapping/>
+  </p:clrMapOvr>
+</p:sld>
+</file>
+
+<file path=ppt/slides/slide8.xml><?xml version="1.0" encoding="utf-8"?>
+<p:sld xmlns:a="http://schemas.openxmlformats.org/drawingml/2006/main" xmlns:r="http://schemas.openxmlformats.org/officeDocument/2006/relationships" xmlns:p="http://schemas.openxmlformats.org/presentationml/2006/main">
+  <p:cSld>
+    <p:spTree>
+      <p:nvGrpSpPr>
+        <p:cNvPr id="1" name=""/>
+        <p:cNvGrpSpPr/>
+        <p:nvPr/>
+      </p:nvGrpSpPr>
+      <p:grpSpPr>
+        <a:xfrm>
+          <a:off x="0" y="0"/>
+          <a:ext cx="0" cy="0"/>
+          <a:chOff x="0" y="0"/>
+          <a:chExt cx="0" cy="0"/>
+        </a:xfrm>
+      </p:grpSpPr>
+      <p:sp>
+        <p:nvSpPr>
+          <p:cNvPr id="2" name="Titolo 1">
+            <a:extLst>
+              <a:ext uri="{FF2B5EF4-FFF2-40B4-BE49-F238E27FC236}">
+                <a16:creationId xmlns:a16="http://schemas.microsoft.com/office/drawing/2014/main" id="{A8407669-AD4A-530A-308F-4AD673D020A5}"/>
+              </a:ext>
+            </a:extLst>
+          </p:cNvPr>
+          <p:cNvSpPr>
+            <a:spLocks noGrp="1"/>
+          </p:cNvSpPr>
+          <p:nvPr>
+            <p:ph type="title"/>
+          </p:nvPr>
+        </p:nvSpPr>
+        <p:spPr/>
+        <p:txBody>
+          <a:bodyPr/>
+          <a:lstStyle/>
+          <a:p>
+            <a:r>
+              <a:rPr lang="it-IT" dirty="0" err="1"/>
+              <a:t>Paging</a:t>
+            </a:r>
+            <a:r>
+              <a:rPr lang="it-IT" dirty="0"/>
+              <a:t> e  </a:t>
+            </a:r>
+            <a:r>
+              <a:rPr lang="it-IT" dirty="0" err="1"/>
+              <a:t>virtual</a:t>
+            </a:r>
+            <a:r>
+              <a:rPr lang="it-IT" dirty="0"/>
+              <a:t> </a:t>
+            </a:r>
+            <a:r>
+              <a:rPr lang="it-IT" dirty="0" err="1"/>
+              <a:t>memory</a:t>
+            </a:r>
+            <a:endParaRPr lang="it-IT" dirty="0"/>
+          </a:p>
+        </p:txBody>
+      </p:sp>
+      <p:sp>
+        <p:nvSpPr>
+          <p:cNvPr id="3" name="Segnaposto contenuto 2">
+            <a:extLst>
+              <a:ext uri="{FF2B5EF4-FFF2-40B4-BE49-F238E27FC236}">
+                <a16:creationId xmlns:a16="http://schemas.microsoft.com/office/drawing/2014/main" id="{81551D5C-43AF-6C06-2D96-A6CA08117673}"/>
+              </a:ext>
+            </a:extLst>
+          </p:cNvPr>
+          <p:cNvSpPr>
+            <a:spLocks noGrp="1"/>
+          </p:cNvSpPr>
+          <p:nvPr>
+            <p:ph idx="1"/>
+          </p:nvPr>
+        </p:nvSpPr>
+        <p:spPr/>
+        <p:txBody>
+          <a:bodyPr>
+            <a:normAutofit/>
+          </a:bodyPr>
+          <a:lstStyle/>
+          <a:p>
+            <a:r>
+              <a:rPr lang="it-IT" dirty="0"/>
+              <a:t>La gestione della memoria virtuale è simile in entrambi i SO</a:t>
+            </a:r>
+          </a:p>
+          <a:p>
+            <a:pPr lvl="1"/>
+            <a:r>
+              <a:rPr lang="it-IT" dirty="0"/>
+              <a:t>Uso della paginazione, perciò della Page </a:t>
+            </a:r>
+            <a:r>
+              <a:rPr lang="it-IT" dirty="0" err="1"/>
+              <a:t>Table</a:t>
+            </a:r>
+            <a:endParaRPr lang="it-IT" dirty="0"/>
+          </a:p>
+          <a:p>
+            <a:pPr lvl="1"/>
+            <a:r>
+              <a:rPr lang="it-IT" dirty="0"/>
+              <a:t>Gestione similare della Frame </a:t>
+            </a:r>
+            <a:r>
+              <a:rPr lang="it-IT" dirty="0" err="1"/>
+              <a:t>Table</a:t>
+            </a:r>
+            <a:endParaRPr lang="it-IT" dirty="0"/>
+          </a:p>
+          <a:p>
+            <a:pPr lvl="1"/>
+            <a:r>
+              <a:rPr lang="it-IT" dirty="0"/>
+              <a:t>Stessa gestione dello spazio degli indirizzi dei processi</a:t>
+            </a:r>
+          </a:p>
+          <a:p>
+            <a:r>
+              <a:rPr lang="it-IT" dirty="0"/>
+              <a:t>Uso di strutture dati analoghe</a:t>
+            </a:r>
+          </a:p>
+          <a:p>
+            <a:pPr lvl="1"/>
+            <a:r>
+              <a:rPr lang="it-IT" dirty="0"/>
+              <a:t>Vettori</a:t>
+            </a:r>
+          </a:p>
+          <a:p>
+            <a:pPr lvl="1"/>
+            <a:r>
+              <a:rPr lang="it-IT" dirty="0"/>
+              <a:t>Bitmap</a:t>
+            </a:r>
+          </a:p>
+          <a:p>
+            <a:pPr lvl="1"/>
+            <a:r>
+              <a:rPr lang="it-IT" dirty="0"/>
+              <a:t>Liste</a:t>
+            </a:r>
+          </a:p>
+          <a:p>
+            <a:r>
+              <a:rPr lang="it-IT" dirty="0"/>
+              <a:t>Paginazione più complessa su OS161, quindi con più funzionalità</a:t>
+            </a:r>
+          </a:p>
+        </p:txBody>
+      </p:sp>
+    </p:spTree>
+    <p:extLst>
+      <p:ext uri="{BB962C8B-B14F-4D97-AF65-F5344CB8AC3E}">
+        <p14:creationId xmlns:p14="http://schemas.microsoft.com/office/powerpoint/2010/main" val="450538825"/>
+      </p:ext>
+    </p:extLst>
+  </p:cSld>
+  <p:clrMapOvr>
+    <a:masterClrMapping/>
+  </p:clrMapOvr>
+</p:sld>
+</file>
+
+<file path=ppt/slides/slide9.xml><?xml version="1.0" encoding="utf-8"?>
+<p:sld xmlns:a="http://schemas.openxmlformats.org/drawingml/2006/main" xmlns:r="http://schemas.openxmlformats.org/officeDocument/2006/relationships" xmlns:p="http://schemas.openxmlformats.org/presentationml/2006/main">
+  <p:cSld>
+    <p:spTree>
+      <p:nvGrpSpPr>
+        <p:cNvPr id="1" name=""/>
+        <p:cNvGrpSpPr/>
+        <p:nvPr/>
+      </p:nvGrpSpPr>
+      <p:grpSpPr>
+        <a:xfrm>
+          <a:off x="0" y="0"/>
+          <a:ext cx="0" cy="0"/>
+          <a:chOff x="0" y="0"/>
+          <a:chExt cx="0" cy="0"/>
+        </a:xfrm>
+      </p:grpSpPr>
+      <p:sp>
+        <p:nvSpPr>
+          <p:cNvPr id="2" name="Titolo 1">
+            <a:extLst>
+              <a:ext uri="{FF2B5EF4-FFF2-40B4-BE49-F238E27FC236}">
+                <a16:creationId xmlns:a16="http://schemas.microsoft.com/office/drawing/2014/main" id="{69441F67-1949-8EC8-EB98-85670AC3670C}"/>
+              </a:ext>
+            </a:extLst>
+          </p:cNvPr>
+          <p:cNvSpPr>
+            <a:spLocks noGrp="1"/>
+          </p:cNvSpPr>
+          <p:nvPr>
+            <p:ph type="title"/>
+          </p:nvPr>
+        </p:nvSpPr>
+        <p:spPr/>
+        <p:txBody>
+          <a:bodyPr>
+            <a:normAutofit/>
+          </a:bodyPr>
+          <a:lstStyle/>
+          <a:p>
+            <a:r>
+              <a:rPr lang="it-IT" dirty="0"/>
+              <a:t>Meccanismi di sincronizzazione </a:t>
+            </a:r>
+            <a:r>
+              <a:rPr lang="it-IT" sz="1600" dirty="0"/>
+              <a:t>– Interrupt </a:t>
+            </a:r>
+            <a:r>
+              <a:rPr lang="it-IT" sz="1600" dirty="0" err="1"/>
+              <a:t>disable</a:t>
+            </a:r>
+            <a:endParaRPr lang="it-IT" dirty="0"/>
+          </a:p>
+        </p:txBody>
+      </p:sp>
+      <p:sp>
+        <p:nvSpPr>
+          <p:cNvPr id="4" name="Segnaposto testo 3">
+            <a:extLst>
+              <a:ext uri="{FF2B5EF4-FFF2-40B4-BE49-F238E27FC236}">
+                <a16:creationId xmlns:a16="http://schemas.microsoft.com/office/drawing/2014/main" id="{3484543A-BB31-0207-182F-1F1C206F0C68}"/>
+              </a:ext>
+            </a:extLst>
+          </p:cNvPr>
+          <p:cNvSpPr>
+            <a:spLocks noGrp="1"/>
+          </p:cNvSpPr>
+          <p:nvPr>
+            <p:ph type="body" idx="1"/>
+          </p:nvPr>
+        </p:nvSpPr>
+        <p:spPr>
+          <a:xfrm>
+            <a:off x="887219" y="2913503"/>
+            <a:ext cx="5087075" cy="536005"/>
+          </a:xfrm>
+        </p:spPr>
+        <p:txBody>
+          <a:bodyPr/>
+          <a:lstStyle/>
+          <a:p>
+            <a:r>
+              <a:rPr lang="it-IT" dirty="0"/>
+              <a:t>OS161</a:t>
+            </a:r>
+          </a:p>
+        </p:txBody>
+      </p:sp>
+      <p:sp>
+        <p:nvSpPr>
+          <p:cNvPr id="8" name="Segnaposto contenuto 7">
+            <a:extLst>
+              <a:ext uri="{FF2B5EF4-FFF2-40B4-BE49-F238E27FC236}">
+                <a16:creationId xmlns:a16="http://schemas.microsoft.com/office/drawing/2014/main" id="{A1E5DF89-94E7-98C4-F563-B3A43317A1CE}"/>
+              </a:ext>
+            </a:extLst>
+          </p:cNvPr>
+          <p:cNvSpPr>
+            <a:spLocks noGrp="1"/>
+          </p:cNvSpPr>
+          <p:nvPr>
+            <p:ph sz="half" idx="2"/>
+          </p:nvPr>
+        </p:nvSpPr>
+        <p:spPr>
+          <a:xfrm>
+            <a:off x="581194" y="3588663"/>
+            <a:ext cx="5393100" cy="2934999"/>
+          </a:xfrm>
+        </p:spPr>
+        <p:txBody>
+          <a:bodyPr>
+            <a:normAutofit lnSpcReduction="10000"/>
+          </a:bodyPr>
+          <a:lstStyle/>
+          <a:p>
+            <a:r>
+              <a:rPr lang="it-IT" dirty="0"/>
+              <a:t>Dà la possibilità di modificare la priorità degli interrupt e di abilitarli/disabilitarli</a:t>
+            </a:r>
+          </a:p>
+          <a:p>
+            <a:r>
+              <a:rPr lang="it-IT" b="1" dirty="0"/>
+              <a:t>spl0</a:t>
+            </a:r>
+            <a:r>
+              <a:rPr lang="it-IT" dirty="0"/>
+              <a:t>() </a:t>
+            </a:r>
+            <a:r>
+              <a:rPr lang="it-IT" dirty="0">
+                <a:sym typeface="Wingdings" panose="05000000000000000000" pitchFamily="2" charset="2"/>
+              </a:rPr>
+              <a:t> </a:t>
+            </a:r>
+            <a:r>
+              <a:rPr lang="it-IT" altLang="it-IT" dirty="0"/>
+              <a:t>imposta IPL su 0, abilitando tutti gli interrupt </a:t>
+            </a:r>
+            <a:endParaRPr lang="it-IT" dirty="0"/>
+          </a:p>
+          <a:p>
+            <a:r>
+              <a:rPr lang="it-IT" b="1" dirty="0" err="1"/>
+              <a:t>splhigh</a:t>
+            </a:r>
+            <a:r>
+              <a:rPr lang="it-IT" dirty="0"/>
+              <a:t>() </a:t>
+            </a:r>
+            <a:r>
+              <a:rPr lang="it-IT" dirty="0">
+                <a:sym typeface="Wingdings" panose="05000000000000000000" pitchFamily="2" charset="2"/>
+              </a:rPr>
+              <a:t> i</a:t>
+            </a:r>
+            <a:r>
+              <a:rPr lang="it-IT" altLang="it-IT" dirty="0"/>
+              <a:t>mposta IPL al valore più alto, disabilitando tutti gli interrupt. </a:t>
+            </a:r>
+            <a:endParaRPr lang="it-IT" dirty="0"/>
+          </a:p>
+          <a:p>
+            <a:r>
+              <a:rPr lang="it-IT" b="1" dirty="0" err="1"/>
+              <a:t>splx</a:t>
+            </a:r>
+            <a:r>
+              <a:rPr lang="it-IT" dirty="0"/>
+              <a:t>(S) </a:t>
+            </a:r>
+            <a:r>
+              <a:rPr lang="it-IT" dirty="0">
+                <a:sym typeface="Wingdings" panose="05000000000000000000" pitchFamily="2" charset="2"/>
+              </a:rPr>
+              <a:t> imposta IPL al valore S, abilitando lo stato rappresentato da S</a:t>
+            </a:r>
+          </a:p>
+          <a:p>
+            <a:r>
+              <a:rPr lang="it-IT" sz="1400" i="1" dirty="0" err="1">
+                <a:sym typeface="Wingdings" panose="05000000000000000000" pitchFamily="2" charset="2"/>
+              </a:rPr>
+              <a:t>kern</a:t>
+            </a:r>
+            <a:r>
+              <a:rPr lang="it-IT" sz="1400" i="1" dirty="0">
+                <a:sym typeface="Wingdings" panose="05000000000000000000" pitchFamily="2" charset="2"/>
+              </a:rPr>
+              <a:t>/include/</a:t>
+            </a:r>
+            <a:r>
+              <a:rPr lang="it-IT" sz="1400" i="1" dirty="0" err="1">
+                <a:sym typeface="Wingdings" panose="05000000000000000000" pitchFamily="2" charset="2"/>
+              </a:rPr>
+              <a:t>spl.h</a:t>
+            </a:r>
+            <a:endParaRPr lang="it-IT" sz="1400" i="1" dirty="0"/>
+          </a:p>
+          <a:p>
+            <a:endParaRPr lang="it-IT" dirty="0"/>
+          </a:p>
+        </p:txBody>
+      </p:sp>
+      <p:sp>
+        <p:nvSpPr>
+          <p:cNvPr id="9" name="Segnaposto testo 8">
+            <a:extLst>
+              <a:ext uri="{FF2B5EF4-FFF2-40B4-BE49-F238E27FC236}">
+                <a16:creationId xmlns:a16="http://schemas.microsoft.com/office/drawing/2014/main" id="{00842FCF-9A2A-27B3-4ED6-BB0713CE4444}"/>
+              </a:ext>
+            </a:extLst>
+          </p:cNvPr>
+          <p:cNvSpPr>
+            <a:spLocks noGrp="1"/>
+          </p:cNvSpPr>
+          <p:nvPr>
+            <p:ph type="body" sz="quarter" idx="3"/>
+          </p:nvPr>
+        </p:nvSpPr>
+        <p:spPr>
+          <a:xfrm>
+            <a:off x="6523735" y="2913503"/>
+            <a:ext cx="5087073" cy="553373"/>
+          </a:xfrm>
+        </p:spPr>
+        <p:txBody>
+          <a:bodyPr/>
+          <a:lstStyle/>
+          <a:p>
+            <a:r>
+              <a:rPr lang="it-IT" dirty="0"/>
+              <a:t>PINTOS</a:t>
+            </a:r>
+          </a:p>
+        </p:txBody>
+      </p:sp>
+      <p:sp>
+        <p:nvSpPr>
+          <p:cNvPr id="10" name="Segnaposto contenuto 9">
+            <a:extLst>
+              <a:ext uri="{FF2B5EF4-FFF2-40B4-BE49-F238E27FC236}">
+                <a16:creationId xmlns:a16="http://schemas.microsoft.com/office/drawing/2014/main" id="{3CDA2ECB-1671-3745-42C6-213A778ECD29}"/>
+              </a:ext>
+            </a:extLst>
+          </p:cNvPr>
+          <p:cNvSpPr>
+            <a:spLocks noGrp="1"/>
+          </p:cNvSpPr>
+          <p:nvPr>
+            <p:ph sz="quarter" idx="4"/>
+          </p:nvPr>
+        </p:nvSpPr>
+        <p:spPr>
+          <a:xfrm>
+            <a:off x="6217709" y="3588663"/>
+            <a:ext cx="5393100" cy="2934999"/>
+          </a:xfrm>
+        </p:spPr>
+        <p:txBody>
+          <a:bodyPr>
+            <a:normAutofit lnSpcReduction="10000"/>
+          </a:bodyPr>
+          <a:lstStyle/>
+          <a:p>
+            <a:r>
+              <a:rPr lang="it-IT" dirty="0"/>
+              <a:t>Dà la possibilità di abilitare/disabilitare gli interrupt ma </a:t>
+            </a:r>
+            <a:r>
+              <a:rPr lang="it-IT" b="1" dirty="0"/>
+              <a:t>non</a:t>
+            </a:r>
+            <a:r>
+              <a:rPr lang="it-IT" dirty="0"/>
+              <a:t> dà la possibilità di controllare la priorità degli interrupt</a:t>
+            </a:r>
+          </a:p>
+          <a:p>
+            <a:r>
+              <a:rPr lang="it-IT" b="1" dirty="0" err="1"/>
+              <a:t>intr_enable</a:t>
+            </a:r>
+            <a:r>
+              <a:rPr lang="it-IT" dirty="0"/>
+              <a:t>() </a:t>
+            </a:r>
+            <a:r>
+              <a:rPr lang="it-IT" dirty="0">
+                <a:sym typeface="Wingdings" panose="05000000000000000000" pitchFamily="2" charset="2"/>
+              </a:rPr>
+              <a:t> abilita gli interrupt</a:t>
+            </a:r>
+            <a:endParaRPr lang="it-IT" dirty="0"/>
+          </a:p>
+          <a:p>
+            <a:r>
+              <a:rPr lang="it-IT" b="1" dirty="0" err="1"/>
+              <a:t>intr_disable</a:t>
+            </a:r>
+            <a:r>
+              <a:rPr lang="it-IT" dirty="0"/>
+              <a:t>() </a:t>
+            </a:r>
+            <a:r>
+              <a:rPr lang="it-IT" dirty="0">
+                <a:sym typeface="Wingdings" panose="05000000000000000000" pitchFamily="2" charset="2"/>
+              </a:rPr>
+              <a:t> disabilita gli interrupt</a:t>
+            </a:r>
+          </a:p>
+          <a:p>
+            <a:r>
+              <a:rPr lang="it-IT" sz="1400" i="1" dirty="0" err="1">
+                <a:sym typeface="Wingdings" panose="05000000000000000000" pitchFamily="2" charset="2"/>
+              </a:rPr>
+              <a:t>src</a:t>
+            </a:r>
+            <a:r>
+              <a:rPr lang="it-IT" sz="1400" i="1" dirty="0">
+                <a:sym typeface="Wingdings" panose="05000000000000000000" pitchFamily="2" charset="2"/>
+              </a:rPr>
+              <a:t>/</a:t>
+            </a:r>
+            <a:r>
+              <a:rPr lang="it-IT" sz="1400" i="1" dirty="0" err="1">
+                <a:sym typeface="Wingdings" panose="05000000000000000000" pitchFamily="2" charset="2"/>
+              </a:rPr>
+              <a:t>thread</a:t>
+            </a:r>
+            <a:r>
+              <a:rPr lang="it-IT" sz="1400" i="1" dirty="0">
+                <a:sym typeface="Wingdings" panose="05000000000000000000" pitchFamily="2" charset="2"/>
+              </a:rPr>
+              <a:t>/</a:t>
+            </a:r>
+            <a:r>
+              <a:rPr lang="it-IT" sz="1400" i="1" dirty="0" err="1">
+                <a:sym typeface="Wingdings" panose="05000000000000000000" pitchFamily="2" charset="2"/>
+              </a:rPr>
+              <a:t>interrupt.h</a:t>
+            </a:r>
+            <a:endParaRPr lang="it-IT" sz="1400" dirty="0"/>
+          </a:p>
+        </p:txBody>
+      </p:sp>
+      <p:sp>
+        <p:nvSpPr>
+          <p:cNvPr id="3" name="Segnaposto testo 3">
+            <a:extLst>
+              <a:ext uri="{FF2B5EF4-FFF2-40B4-BE49-F238E27FC236}">
+                <a16:creationId xmlns:a16="http://schemas.microsoft.com/office/drawing/2014/main" id="{DD092F63-1123-8337-F4DC-4B5BF08C3E1F}"/>
+              </a:ext>
+            </a:extLst>
+          </p:cNvPr>
+          <p:cNvSpPr txBox="1">
+            <a:spLocks/>
+          </p:cNvSpPr>
+          <p:nvPr/>
+        </p:nvSpPr>
+        <p:spPr>
+          <a:xfrm>
+            <a:off x="615548" y="1999040"/>
+            <a:ext cx="11245148" cy="921080"/>
+          </a:xfrm>
+          <a:prstGeom prst="rect">
+            <a:avLst/>
+          </a:prstGeom>
+        </p:spPr>
+        <p:txBody>
+          <a:bodyPr vert="horz" lIns="91440" tIns="45720" rIns="91440" bIns="45720" rtlCol="0" anchor="b">
+            <a:noAutofit/>
+          </a:bodyPr>
+          <a:lstStyle>
+            <a:lvl1pPr marL="0" indent="0" algn="l" defTabSz="457200" rtl="0" eaLnBrk="1" latinLnBrk="0" hangingPunct="1">
+              <a:spcBef>
+                <a:spcPct val="20000"/>
+              </a:spcBef>
+              <a:spcAft>
+                <a:spcPts val="600"/>
+              </a:spcAft>
+              <a:buClr>
+                <a:schemeClr val="accent2"/>
+              </a:buClr>
+              <a:buSzPct val="92000"/>
+              <a:buFont typeface="Wingdings 2" panose="05020102010507070707" pitchFamily="18" charset="2"/>
+              <a:buNone/>
+              <a:defRPr sz="2200" b="0" kern="1200">
+                <a:solidFill>
+                  <a:schemeClr val="accent2"/>
+                </a:solidFill>
+                <a:latin typeface="+mn-lt"/>
+                <a:ea typeface="+mn-ea"/>
+                <a:cs typeface="+mn-cs"/>
+              </a:defRPr>
+            </a:lvl1pPr>
+            <a:lvl2pPr marL="457200" indent="0" algn="l" defTabSz="457200" rtl="0" eaLnBrk="1" latinLnBrk="0" hangingPunct="1">
+              <a:spcBef>
+                <a:spcPct val="20000"/>
+              </a:spcBef>
+              <a:spcAft>
+                <a:spcPts val="600"/>
+              </a:spcAft>
+              <a:buClr>
+                <a:schemeClr val="accent2"/>
+              </a:buClr>
+              <a:buSzPct val="92000"/>
+              <a:buFont typeface="Wingdings 2" panose="05020102010507070707" pitchFamily="18" charset="2"/>
+              <a:buNone/>
+              <a:defRPr sz="2000" b="1" kern="1200">
+                <a:solidFill>
+                  <a:schemeClr val="tx2"/>
+                </a:solidFill>
+                <a:latin typeface="+mn-lt"/>
+                <a:ea typeface="+mn-ea"/>
+                <a:cs typeface="+mn-cs"/>
+              </a:defRPr>
+            </a:lvl2pPr>
+            <a:lvl3pPr marL="914400" indent="0" algn="l" defTabSz="457200" rtl="0" eaLnBrk="1" latinLnBrk="0" hangingPunct="1">
+              <a:spcBef>
+                <a:spcPct val="20000"/>
+              </a:spcBef>
+              <a:spcAft>
+                <a:spcPts val="600"/>
+              </a:spcAft>
+              <a:buClr>
+                <a:schemeClr val="accent2"/>
+              </a:buClr>
+              <a:buSzPct val="92000"/>
+              <a:buFont typeface="Wingdings 2" panose="05020102010507070707" pitchFamily="18" charset="2"/>
+              <a:buNone/>
+              <a:defRPr sz="1800" b="1" kern="1200">
+                <a:solidFill>
+                  <a:schemeClr val="tx2"/>
+                </a:solidFill>
+                <a:latin typeface="+mn-lt"/>
+                <a:ea typeface="+mn-ea"/>
+                <a:cs typeface="+mn-cs"/>
+              </a:defRPr>
+            </a:lvl3pPr>
+            <a:lvl4pPr marL="1371600" indent="0" algn="l" defTabSz="457200" rtl="0" eaLnBrk="1" latinLnBrk="0" hangingPunct="1">
+              <a:spcBef>
+                <a:spcPct val="20000"/>
+              </a:spcBef>
+              <a:spcAft>
+                <a:spcPts val="600"/>
+              </a:spcAft>
+              <a:buClr>
+                <a:schemeClr val="accent2"/>
+              </a:buClr>
+              <a:buSzPct val="92000"/>
+              <a:buFont typeface="Wingdings 2" panose="05020102010507070707" pitchFamily="18" charset="2"/>
+              <a:buNone/>
+              <a:defRPr sz="1600" b="1" kern="1200">
+                <a:solidFill>
+                  <a:schemeClr val="tx2"/>
+                </a:solidFill>
+                <a:latin typeface="+mn-lt"/>
+                <a:ea typeface="+mn-ea"/>
+                <a:cs typeface="+mn-cs"/>
+              </a:defRPr>
+            </a:lvl4pPr>
+            <a:lvl5pPr marL="1828800" indent="0" algn="l" defTabSz="457200" rtl="0" eaLnBrk="1" latinLnBrk="0" hangingPunct="1">
+              <a:spcBef>
+                <a:spcPct val="20000"/>
+              </a:spcBef>
+              <a:spcAft>
+                <a:spcPts val="600"/>
+              </a:spcAft>
+              <a:buClr>
+                <a:schemeClr val="accent2"/>
+              </a:buClr>
+              <a:buSzPct val="92000"/>
+              <a:buFont typeface="Wingdings 2" panose="05020102010507070707" pitchFamily="18" charset="2"/>
+              <a:buNone/>
+              <a:defRPr sz="1600" b="1" kern="1200">
+                <a:solidFill>
+                  <a:schemeClr val="tx2"/>
+                </a:solidFill>
+                <a:latin typeface="+mn-lt"/>
+                <a:ea typeface="+mn-ea"/>
+                <a:cs typeface="+mn-cs"/>
+              </a:defRPr>
+            </a:lvl5pPr>
+            <a:lvl6pPr marL="2286000" indent="0" algn="l" defTabSz="457200" rtl="0" eaLnBrk="1" latinLnBrk="0" hangingPunct="1">
+              <a:spcBef>
+                <a:spcPct val="20000"/>
+              </a:spcBef>
+              <a:spcAft>
+                <a:spcPts val="600"/>
+              </a:spcAft>
+              <a:buClr>
+                <a:schemeClr val="accent2"/>
+              </a:buClr>
+              <a:buSzPct val="92000"/>
+              <a:buFont typeface="Wingdings 2" panose="05020102010507070707" pitchFamily="18" charset="2"/>
+              <a:buNone/>
+              <a:defRPr sz="1600" b="1" kern="1200">
+                <a:solidFill>
+                  <a:schemeClr val="tx2"/>
+                </a:solidFill>
+                <a:latin typeface="+mn-lt"/>
+                <a:ea typeface="+mn-ea"/>
+                <a:cs typeface="+mn-cs"/>
+              </a:defRPr>
+            </a:lvl6pPr>
+            <a:lvl7pPr marL="2743200" indent="0" algn="l" defTabSz="457200" rtl="0" eaLnBrk="1" latinLnBrk="0" hangingPunct="1">
+              <a:spcBef>
+                <a:spcPct val="20000"/>
+              </a:spcBef>
+              <a:spcAft>
+                <a:spcPts val="600"/>
+              </a:spcAft>
+              <a:buClr>
+                <a:schemeClr val="accent2"/>
+              </a:buClr>
+              <a:buSzPct val="92000"/>
+              <a:buFont typeface="Wingdings 2" panose="05020102010507070707" pitchFamily="18" charset="2"/>
+              <a:buNone/>
+              <a:defRPr sz="1600" b="1" kern="1200">
+                <a:solidFill>
+                  <a:schemeClr val="tx2"/>
+                </a:solidFill>
+                <a:latin typeface="+mn-lt"/>
+                <a:ea typeface="+mn-ea"/>
+                <a:cs typeface="+mn-cs"/>
+              </a:defRPr>
+            </a:lvl7pPr>
+            <a:lvl8pPr marL="3200400" indent="0" algn="l" defTabSz="457200" rtl="0" eaLnBrk="1" latinLnBrk="0" hangingPunct="1">
+              <a:spcBef>
+                <a:spcPct val="20000"/>
+              </a:spcBef>
+              <a:spcAft>
+                <a:spcPts val="600"/>
+              </a:spcAft>
+              <a:buClr>
+                <a:schemeClr val="accent2"/>
+              </a:buClr>
+              <a:buSzPct val="92000"/>
+              <a:buFont typeface="Wingdings 2" panose="05020102010507070707" pitchFamily="18" charset="2"/>
+              <a:buNone/>
+              <a:defRPr sz="1600" b="1" kern="1200">
+                <a:solidFill>
+                  <a:schemeClr val="tx2"/>
+                </a:solidFill>
+                <a:latin typeface="+mn-lt"/>
+                <a:ea typeface="+mn-ea"/>
+                <a:cs typeface="+mn-cs"/>
+              </a:defRPr>
+            </a:lvl8pPr>
+            <a:lvl9pPr marL="3657600" indent="0" algn="l" defTabSz="457200" rtl="0" eaLnBrk="1" latinLnBrk="0" hangingPunct="1">
+              <a:spcBef>
+                <a:spcPct val="20000"/>
+              </a:spcBef>
+              <a:spcAft>
+                <a:spcPts val="600"/>
+              </a:spcAft>
+              <a:buClr>
+                <a:schemeClr val="accent2"/>
+              </a:buClr>
+              <a:buSzPct val="92000"/>
+              <a:buFont typeface="Wingdings 2" panose="05020102010507070707" pitchFamily="18" charset="2"/>
+              <a:buNone/>
+              <a:defRPr sz="1600" b="1" kern="1200">
+                <a:solidFill>
+                  <a:schemeClr val="tx2"/>
+                </a:solidFill>
+                <a:latin typeface="+mn-lt"/>
+                <a:ea typeface="+mn-ea"/>
+                <a:cs typeface="+mn-cs"/>
+              </a:defRPr>
+            </a:lvl9pPr>
+          </a:lstStyle>
+          <a:p>
+            <a:r>
+              <a:rPr lang="it-IT" sz="2000" dirty="0">
+                <a:solidFill>
+                  <a:schemeClr val="tx1"/>
+                </a:solidFill>
+              </a:rPr>
+              <a:t>Sia OS161 che </a:t>
+            </a:r>
+            <a:r>
+              <a:rPr lang="it-IT" sz="2000" dirty="0" err="1">
+                <a:solidFill>
+                  <a:schemeClr val="tx1"/>
+                </a:solidFill>
+              </a:rPr>
+              <a:t>PintOS</a:t>
+            </a:r>
+            <a:r>
+              <a:rPr lang="it-IT" sz="2000" dirty="0">
+                <a:solidFill>
+                  <a:schemeClr val="tx1"/>
+                </a:solidFill>
+              </a:rPr>
+              <a:t> danno la possibilità di abilitare/disabilitare gli interrupt per poter gestire le sezioni critiche</a:t>
+            </a:r>
+          </a:p>
+        </p:txBody>
+      </p:sp>
+    </p:spTree>
+    <p:extLst>
+      <p:ext uri="{BB962C8B-B14F-4D97-AF65-F5344CB8AC3E}">
+        <p14:creationId xmlns:p14="http://schemas.microsoft.com/office/powerpoint/2010/main" val="151468646"/>
       </p:ext>
     </p:extLst>
   </p:cSld>

</xml_diff>